<commit_message>
Added slide on formal notation; added formal definitions for arrays and tuples
</commit_message>
<xml_diff>
--- a/DataStructures/data_structures.pptx
+++ b/DataStructures/data_structures.pptx
@@ -9,12 +9,13 @@
     <p:sldId id="257" r:id="rId3"/>
     <p:sldId id="258" r:id="rId4"/>
     <p:sldId id="259" r:id="rId5"/>
-    <p:sldId id="260" r:id="rId6"/>
-    <p:sldId id="261" r:id="rId7"/>
-    <p:sldId id="265" r:id="rId8"/>
-    <p:sldId id="262" r:id="rId9"/>
-    <p:sldId id="263" r:id="rId10"/>
-    <p:sldId id="264" r:id="rId11"/>
+    <p:sldId id="266" r:id="rId6"/>
+    <p:sldId id="260" r:id="rId7"/>
+    <p:sldId id="261" r:id="rId8"/>
+    <p:sldId id="265" r:id="rId9"/>
+    <p:sldId id="262" r:id="rId10"/>
+    <p:sldId id="263" r:id="rId11"/>
+    <p:sldId id="264" r:id="rId12"/>
   </p:sldIdLst>
   <p:sldSz cx="12192000" cy="6858000"/>
   <p:notesSz cx="6858000" cy="9144000"/>
@@ -113,6 +114,11 @@
       </a:defRPr>
     </a:lvl9pPr>
   </p:defaultTextStyle>
+  <p:extLst>
+    <p:ext uri="{EFAFB233-063F-42B5-8137-9DF3F51BA10A}">
+      <p15:sldGuideLst xmlns:p15="http://schemas.microsoft.com/office/powerpoint/2012/main"/>
+    </p:ext>
+  </p:extLst>
 </p:presentation>
 </file>
 
@@ -247,7 +253,7 @@
           <a:p>
             <a:fld id="{DCFF0279-4160-4FB5-A95A-9ABB0C14BC92}" type="datetimeFigureOut">
               <a:rPr lang="en-US" smtClean="0"/>
-              <a:t>2016-08-11</a:t>
+              <a:t>2016-08-16</a:t>
             </a:fld>
             <a:endParaRPr lang="en-US"/>
           </a:p>
@@ -417,7 +423,7 @@
           <a:p>
             <a:fld id="{DCFF0279-4160-4FB5-A95A-9ABB0C14BC92}" type="datetimeFigureOut">
               <a:rPr lang="en-US" smtClean="0"/>
-              <a:t>2016-08-11</a:t>
+              <a:t>2016-08-16</a:t>
             </a:fld>
             <a:endParaRPr lang="en-US"/>
           </a:p>
@@ -597,7 +603,7 @@
           <a:p>
             <a:fld id="{DCFF0279-4160-4FB5-A95A-9ABB0C14BC92}" type="datetimeFigureOut">
               <a:rPr lang="en-US" smtClean="0"/>
-              <a:t>2016-08-11</a:t>
+              <a:t>2016-08-16</a:t>
             </a:fld>
             <a:endParaRPr lang="en-US"/>
           </a:p>
@@ -767,7 +773,7 @@
           <a:p>
             <a:fld id="{DCFF0279-4160-4FB5-A95A-9ABB0C14BC92}" type="datetimeFigureOut">
               <a:rPr lang="en-US" smtClean="0"/>
-              <a:t>2016-08-11</a:t>
+              <a:t>2016-08-16</a:t>
             </a:fld>
             <a:endParaRPr lang="en-US"/>
           </a:p>
@@ -1013,7 +1019,7 @@
           <a:p>
             <a:fld id="{DCFF0279-4160-4FB5-A95A-9ABB0C14BC92}" type="datetimeFigureOut">
               <a:rPr lang="en-US" smtClean="0"/>
-              <a:t>2016-08-11</a:t>
+              <a:t>2016-08-16</a:t>
             </a:fld>
             <a:endParaRPr lang="en-US"/>
           </a:p>
@@ -1245,7 +1251,7 @@
           <a:p>
             <a:fld id="{DCFF0279-4160-4FB5-A95A-9ABB0C14BC92}" type="datetimeFigureOut">
               <a:rPr lang="en-US" smtClean="0"/>
-              <a:t>2016-08-11</a:t>
+              <a:t>2016-08-16</a:t>
             </a:fld>
             <a:endParaRPr lang="en-US"/>
           </a:p>
@@ -1612,7 +1618,7 @@
           <a:p>
             <a:fld id="{DCFF0279-4160-4FB5-A95A-9ABB0C14BC92}" type="datetimeFigureOut">
               <a:rPr lang="en-US" smtClean="0"/>
-              <a:t>2016-08-11</a:t>
+              <a:t>2016-08-16</a:t>
             </a:fld>
             <a:endParaRPr lang="en-US"/>
           </a:p>
@@ -1730,7 +1736,7 @@
           <a:p>
             <a:fld id="{DCFF0279-4160-4FB5-A95A-9ABB0C14BC92}" type="datetimeFigureOut">
               <a:rPr lang="en-US" smtClean="0"/>
-              <a:t>2016-08-11</a:t>
+              <a:t>2016-08-16</a:t>
             </a:fld>
             <a:endParaRPr lang="en-US"/>
           </a:p>
@@ -1825,7 +1831,7 @@
           <a:p>
             <a:fld id="{DCFF0279-4160-4FB5-A95A-9ABB0C14BC92}" type="datetimeFigureOut">
               <a:rPr lang="en-US" smtClean="0"/>
-              <a:t>2016-08-11</a:t>
+              <a:t>2016-08-16</a:t>
             </a:fld>
             <a:endParaRPr lang="en-US"/>
           </a:p>
@@ -2102,7 +2108,7 @@
           <a:p>
             <a:fld id="{DCFF0279-4160-4FB5-A95A-9ABB0C14BC92}" type="datetimeFigureOut">
               <a:rPr lang="en-US" smtClean="0"/>
-              <a:t>2016-08-11</a:t>
+              <a:t>2016-08-16</a:t>
             </a:fld>
             <a:endParaRPr lang="en-US"/>
           </a:p>
@@ -2355,7 +2361,7 @@
           <a:p>
             <a:fld id="{DCFF0279-4160-4FB5-A95A-9ABB0C14BC92}" type="datetimeFigureOut">
               <a:rPr lang="en-US" smtClean="0"/>
-              <a:t>2016-08-11</a:t>
+              <a:t>2016-08-16</a:t>
             </a:fld>
             <a:endParaRPr lang="en-US"/>
           </a:p>
@@ -2568,7 +2574,7 @@
           <a:p>
             <a:fld id="{DCFF0279-4160-4FB5-A95A-9ABB0C14BC92}" type="datetimeFigureOut">
               <a:rPr lang="en-US" smtClean="0"/>
-              <a:t>2016-08-11</a:t>
+              <a:t>2016-08-16</a:t>
             </a:fld>
             <a:endParaRPr lang="en-US"/>
           </a:p>
@@ -3102,19 +3108,12 @@
               <a:rPr lang="nl-BE" dirty="0">
                 <a:hlinkClick r:id="rId3"/>
               </a:rPr>
-              <a:t>http://creativecommons.org/publicdomain/zero/1.0</a:t>
-            </a:r>
-            <a:r>
-              <a:rPr lang="nl-BE" dirty="0">
-                <a:hlinkClick r:id="rId3"/>
-              </a:rPr>
-              <a:t>/</a:t>
+              <a:t>http://creativecommons.org/publicdomain/zero/1.0/</a:t>
             </a:r>
             <a:r>
               <a:rPr lang="nl-BE" dirty="0"/>
               <a:t> </a:t>
             </a:r>
-            <a:endParaRPr lang="nl-BE" dirty="0"/>
           </a:p>
         </p:txBody>
       </p:sp>
@@ -3172,6 +3171,182 @@
           <a:p>
             <a:r>
               <a:rPr lang="en-US" dirty="0" smtClean="0"/>
+              <a:t>Set</a:t>
+            </a:r>
+            <a:endParaRPr lang="en-US" dirty="0"/>
+          </a:p>
+        </p:txBody>
+      </p:sp>
+      <p:sp>
+        <p:nvSpPr>
+          <p:cNvPr id="3" name="Content Placeholder 2"/>
+          <p:cNvSpPr>
+            <a:spLocks noGrp="1"/>
+          </p:cNvSpPr>
+          <p:nvPr>
+            <p:ph idx="1"/>
+          </p:nvPr>
+        </p:nvSpPr>
+        <p:spPr>
+          <a:xfrm>
+            <a:off x="838200" y="1825625"/>
+            <a:ext cx="10515600" cy="4351338"/>
+          </a:xfrm>
+        </p:spPr>
+        <p:txBody>
+          <a:bodyPr>
+            <a:normAutofit fontScale="92500" lnSpcReduction="20000"/>
+          </a:bodyPr>
+          <a:lstStyle/>
+          <a:p>
+            <a:r>
+              <a:rPr lang="en-US" dirty="0" smtClean="0"/>
+              <a:t>Characteristics</a:t>
+            </a:r>
+          </a:p>
+          <a:p>
+            <a:pPr lvl="1"/>
+            <a:r>
+              <a:rPr lang="en-US" dirty="0" smtClean="0"/>
+              <a:t>access: iterator</a:t>
+            </a:r>
+          </a:p>
+          <a:p>
+            <a:pPr lvl="1"/>
+            <a:r>
+              <a:rPr lang="en-US" dirty="0" smtClean="0"/>
+              <a:t>unordered</a:t>
+            </a:r>
+          </a:p>
+          <a:p>
+            <a:pPr lvl="1"/>
+            <a:r>
+              <a:rPr lang="en-US" dirty="0" smtClean="0"/>
+              <a:t>size can vary</a:t>
+            </a:r>
+          </a:p>
+          <a:p>
+            <a:pPr lvl="1"/>
+            <a:r>
+              <a:rPr lang="en-US" dirty="0" smtClean="0"/>
+              <a:t>insert/update: O(1)</a:t>
+            </a:r>
+          </a:p>
+          <a:p>
+            <a:pPr lvl="1"/>
+            <a:r>
+              <a:rPr lang="en-US" dirty="0" smtClean="0"/>
+              <a:t>retrieval: O(1)</a:t>
+            </a:r>
+          </a:p>
+          <a:p>
+            <a:pPr lvl="1"/>
+            <a:r>
+              <a:rPr lang="en-US" dirty="0" smtClean="0"/>
+              <a:t>search: O(1)</a:t>
+            </a:r>
+          </a:p>
+          <a:p>
+            <a:pPr lvl="1"/>
+            <a:r>
+              <a:rPr lang="en-US" dirty="0" smtClean="0"/>
+              <a:t>element type: any</a:t>
+            </a:r>
+          </a:p>
+          <a:p>
+            <a:pPr lvl="1"/>
+            <a:r>
+              <a:rPr lang="en-US" dirty="0" smtClean="0"/>
+              <a:t>elements are unique in set</a:t>
+            </a:r>
+          </a:p>
+          <a:p>
+            <a:pPr lvl="1"/>
+            <a:r>
+              <a:rPr lang="en-US" dirty="0" smtClean="0"/>
+              <a:t>operations: union, intersection, …</a:t>
+            </a:r>
+          </a:p>
+          <a:p>
+            <a:r>
+              <a:rPr lang="en-US" dirty="0" smtClean="0"/>
+              <a:t>Implementations</a:t>
+            </a:r>
+          </a:p>
+          <a:p>
+            <a:pPr lvl="1"/>
+            <a:r>
+              <a:rPr lang="en-US" dirty="0" smtClean="0"/>
+              <a:t>C++/Java: standard library</a:t>
+            </a:r>
+          </a:p>
+          <a:p>
+            <a:pPr lvl="1"/>
+            <a:r>
+              <a:rPr lang="en-US" dirty="0" smtClean="0"/>
+              <a:t>Python: core language</a:t>
+            </a:r>
+          </a:p>
+          <a:p>
+            <a:pPr lvl="1"/>
+            <a:endParaRPr lang="en-US" dirty="0"/>
+          </a:p>
+        </p:txBody>
+      </p:sp>
+    </p:spTree>
+    <p:extLst>
+      <p:ext uri="{BB962C8B-B14F-4D97-AF65-F5344CB8AC3E}">
+        <p14:creationId xmlns:p14="http://schemas.microsoft.com/office/powerpoint/2010/main" val="2374377430"/>
+      </p:ext>
+    </p:extLst>
+  </p:cSld>
+  <p:clrMapOvr>
+    <a:masterClrMapping/>
+  </p:clrMapOvr>
+  <p:timing>
+    <p:tnLst>
+      <p:par>
+        <p:cTn id="1" dur="indefinite" restart="never" nodeType="tmRoot"/>
+      </p:par>
+    </p:tnLst>
+  </p:timing>
+</p:sld>
+</file>
+
+<file path=ppt/slides/slide11.xml><?xml version="1.0" encoding="utf-8"?>
+<p:sld xmlns:a="http://schemas.openxmlformats.org/drawingml/2006/main" xmlns:r="http://schemas.openxmlformats.org/officeDocument/2006/relationships" xmlns:p="http://schemas.openxmlformats.org/presentationml/2006/main">
+  <p:cSld>
+    <p:spTree>
+      <p:nvGrpSpPr>
+        <p:cNvPr id="1" name=""/>
+        <p:cNvGrpSpPr/>
+        <p:nvPr/>
+      </p:nvGrpSpPr>
+      <p:grpSpPr>
+        <a:xfrm>
+          <a:off x="0" y="0"/>
+          <a:ext cx="0" cy="0"/>
+          <a:chOff x="0" y="0"/>
+          <a:chExt cx="0" cy="0"/>
+        </a:xfrm>
+      </p:grpSpPr>
+      <p:sp>
+        <p:nvSpPr>
+          <p:cNvPr id="2" name="Title 1"/>
+          <p:cNvSpPr>
+            <a:spLocks noGrp="1"/>
+          </p:cNvSpPr>
+          <p:nvPr>
+            <p:ph type="title"/>
+          </p:nvPr>
+        </p:nvSpPr>
+        <p:spPr/>
+        <p:txBody>
+          <a:bodyPr/>
+          <a:lstStyle/>
+          <a:p>
+            <a:r>
+              <a:rPr lang="en-US" dirty="0" smtClean="0"/>
               <a:t>Dictionary</a:t>
             </a:r>
             <a:endParaRPr lang="en-US" dirty="0"/>
@@ -3783,7 +3958,7 @@
           <a:p>
             <a:r>
               <a:rPr lang="en-US" dirty="0" smtClean="0"/>
-              <a:t>Basic data structures</a:t>
+              <a:t>Notation</a:t>
             </a:r>
             <a:endParaRPr lang="en-US" dirty="0"/>
           </a:p>
@@ -3791,27 +3966,154 @@
       </p:sp>
       <p:sp>
         <p:nvSpPr>
-          <p:cNvPr id="3" name="Text Placeholder 2"/>
-          <p:cNvSpPr>
-            <a:spLocks noGrp="1"/>
-          </p:cNvSpPr>
-          <p:nvPr>
-            <p:ph type="body" idx="1"/>
-          </p:nvPr>
-        </p:nvSpPr>
-        <p:spPr/>
-        <p:txBody>
-          <a:bodyPr/>
-          <a:lstStyle/>
-          <a:p>
-            <a:endParaRPr lang="en-US"/>
-          </a:p>
-        </p:txBody>
-      </p:sp>
+          <p:cNvPr id="3" name="Content Placeholder 2"/>
+          <p:cNvSpPr>
+            <a:spLocks noGrp="1"/>
+          </p:cNvSpPr>
+          <p:nvPr>
+            <p:ph idx="1"/>
+          </p:nvPr>
+        </p:nvSpPr>
+        <p:spPr/>
+        <p:txBody>
+          <a:bodyPr/>
+          <a:lstStyle/>
+          <a:p>
+            <a:r>
+              <a:rPr lang="en-US" dirty="0" smtClean="0"/>
+              <a:t>Type </a:t>
+            </a:r>
+            <a:r>
+              <a:rPr lang="en-US" i="1" dirty="0" smtClean="0"/>
+              <a:t>T</a:t>
+            </a:r>
+            <a:r>
+              <a:rPr lang="en-US" dirty="0" smtClean="0"/>
+              <a:t>: set of values, e.g.,</a:t>
+            </a:r>
+          </a:p>
+          <a:p>
+            <a:pPr lvl="1"/>
+            <a:r>
+              <a:rPr lang="en-US" dirty="0" err="1" smtClean="0"/>
+              <a:t>boolean</a:t>
+            </a:r>
+            <a:r>
+              <a:rPr lang="en-US" dirty="0" smtClean="0"/>
+              <a:t> = {True, False}</a:t>
+            </a:r>
+          </a:p>
+          <a:p>
+            <a:pPr lvl="1"/>
+            <a:r>
+              <a:rPr lang="en-US" dirty="0" err="1" smtClean="0"/>
+              <a:t>int</a:t>
+            </a:r>
+            <a:r>
+              <a:rPr lang="en-US" dirty="0" smtClean="0"/>
+              <a:t> </a:t>
+            </a:r>
+            <a:r>
+              <a:rPr lang="en-US" dirty="0"/>
+              <a:t>= {-</a:t>
+            </a:r>
+            <a:r>
+              <a:rPr lang="en-US" dirty="0" smtClean="0"/>
+              <a:t>2147483648, -</a:t>
+            </a:r>
+            <a:r>
+              <a:rPr lang="en-US" dirty="0"/>
+              <a:t> </a:t>
+            </a:r>
+            <a:r>
+              <a:rPr lang="en-US" dirty="0" smtClean="0"/>
+              <a:t>2147483647, …, -1, 0, 1..., 2147483647}</a:t>
+            </a:r>
+          </a:p>
+          <a:p>
+            <a:r>
+              <a:rPr lang="en-US" dirty="0" smtClean="0"/>
+              <a:t>Property: </a:t>
+            </a:r>
+          </a:p>
+          <a:p>
+            <a:r>
+              <a:rPr lang="en-US" dirty="0" smtClean="0"/>
+              <a:t>Any type: </a:t>
+            </a:r>
+            <a:r>
+              <a:rPr lang="en-US" i="1" dirty="0" smtClean="0"/>
+              <a:t>T</a:t>
+            </a:r>
+            <a:r>
+              <a:rPr lang="en-US" baseline="-25000" dirty="0" smtClean="0"/>
+              <a:t>*</a:t>
+            </a:r>
+            <a:endParaRPr lang="en-US" baseline="-25000" dirty="0"/>
+          </a:p>
+        </p:txBody>
+      </p:sp>
+      <p:graphicFrame>
+        <p:nvGraphicFramePr>
+          <p:cNvPr id="4" name="Object 3"/>
+          <p:cNvGraphicFramePr>
+            <a:graphicFrameLocks noChangeAspect="1"/>
+          </p:cNvGraphicFramePr>
+          <p:nvPr>
+            <p:extLst>
+              <p:ext uri="{D42A27DB-BD31-4B8C-83A1-F6EECF244321}">
+                <p14:modId xmlns:p14="http://schemas.microsoft.com/office/powerpoint/2010/main" val="2880453434"/>
+              </p:ext>
+            </p:extLst>
+          </p:nvPr>
+        </p:nvGraphicFramePr>
+        <p:xfrm>
+          <a:off x="2764991" y="3115758"/>
+          <a:ext cx="4124325" cy="482600"/>
+        </p:xfrm>
+        <a:graphic>
+          <a:graphicData uri="http://schemas.openxmlformats.org/presentationml/2006/ole">
+            <mc:AlternateContent xmlns:mc="http://schemas.openxmlformats.org/markup-compatibility/2006">
+              <mc:Choice xmlns:v="urn:schemas-microsoft-com:vml" Requires="v">
+                <p:oleObj spid="_x0000_s1029" name="Equation" r:id="rId3" imgW="1841400" imgH="215640" progId="Equation.3">
+                  <p:embed/>
+                </p:oleObj>
+              </mc:Choice>
+              <mc:Fallback>
+                <p:oleObj name="Equation" r:id="rId3" imgW="1841400" imgH="215640" progId="Equation.3">
+                  <p:embed/>
+                  <p:pic>
+                    <p:nvPicPr>
+                      <p:cNvPr id="0" name=""/>
+                      <p:cNvPicPr/>
+                      <p:nvPr/>
+                    </p:nvPicPr>
+                    <p:blipFill>
+                      <a:blip r:embed="rId4"/>
+                      <a:stretch>
+                        <a:fillRect/>
+                      </a:stretch>
+                    </p:blipFill>
+                    <p:spPr>
+                      <a:xfrm>
+                        <a:off x="2764991" y="3115758"/>
+                        <a:ext cx="4124325" cy="482600"/>
+                      </a:xfrm>
+                      <a:prstGeom prst="rect">
+                        <a:avLst/>
+                      </a:prstGeom>
+                    </p:spPr>
+                  </p:pic>
+                </p:oleObj>
+              </mc:Fallback>
+            </mc:AlternateContent>
+          </a:graphicData>
+        </a:graphic>
+      </p:graphicFrame>
     </p:spTree>
     <p:extLst>
       <p:ext uri="{BB962C8B-B14F-4D97-AF65-F5344CB8AC3E}">
-        <p14:creationId xmlns:p14="http://schemas.microsoft.com/office/powerpoint/2010/main" val="3539088788"/>
+        <p14:creationId xmlns:p14="http://schemas.microsoft.com/office/powerpoint/2010/main" val="4147142722"/>
       </p:ext>
     </p:extLst>
   </p:cSld>
@@ -3862,7 +4164,7 @@
           <a:p>
             <a:r>
               <a:rPr lang="en-US" dirty="0" smtClean="0"/>
-              <a:t>Array</a:t>
+              <a:t>Basic data structures</a:t>
             </a:r>
             <a:endParaRPr lang="en-US" dirty="0"/>
           </a:p>
@@ -3870,105 +4172,27 @@
       </p:sp>
       <p:sp>
         <p:nvSpPr>
-          <p:cNvPr id="3" name="Content Placeholder 2"/>
-          <p:cNvSpPr>
-            <a:spLocks noGrp="1"/>
-          </p:cNvSpPr>
-          <p:nvPr>
-            <p:ph idx="1"/>
-          </p:nvPr>
-        </p:nvSpPr>
-        <p:spPr/>
-        <p:txBody>
-          <a:bodyPr>
-            <a:normAutofit lnSpcReduction="10000"/>
-          </a:bodyPr>
-          <a:lstStyle/>
-          <a:p>
-            <a:r>
-              <a:rPr lang="en-US" dirty="0" smtClean="0"/>
-              <a:t>Characteristics</a:t>
-            </a:r>
-          </a:p>
-          <a:p>
-            <a:pPr lvl="1"/>
-            <a:r>
-              <a:rPr lang="en-US" dirty="0" smtClean="0"/>
-              <a:t>access: random by ordinal index</a:t>
-            </a:r>
-          </a:p>
-          <a:p>
-            <a:pPr lvl="1"/>
-            <a:r>
-              <a:rPr lang="en-US" dirty="0" smtClean="0"/>
-              <a:t>ordered</a:t>
-            </a:r>
-          </a:p>
-          <a:p>
-            <a:pPr lvl="1"/>
-            <a:r>
-              <a:rPr lang="en-US" dirty="0" smtClean="0"/>
-              <a:t>fixed length</a:t>
-            </a:r>
-          </a:p>
-          <a:p>
-            <a:pPr lvl="1"/>
-            <a:r>
-              <a:rPr lang="en-US" dirty="0" smtClean="0"/>
-              <a:t>insert/update: O(1)</a:t>
-            </a:r>
-          </a:p>
-          <a:p>
-            <a:pPr lvl="1"/>
-            <a:r>
-              <a:rPr lang="en-US" dirty="0" smtClean="0"/>
-              <a:t>retrieval: O(1)</a:t>
-            </a:r>
-          </a:p>
-          <a:p>
-            <a:pPr lvl="1"/>
-            <a:r>
-              <a:rPr lang="en-US" dirty="0" smtClean="0"/>
-              <a:t>search: O(n)</a:t>
-            </a:r>
-          </a:p>
-          <a:p>
-            <a:pPr lvl="1"/>
-            <a:r>
-              <a:rPr lang="en-US" dirty="0" smtClean="0"/>
-              <a:t>element type: homogenous</a:t>
-            </a:r>
-          </a:p>
-          <a:p>
-            <a:r>
-              <a:rPr lang="en-US" dirty="0" smtClean="0"/>
-              <a:t>Implementations</a:t>
-            </a:r>
-          </a:p>
-          <a:p>
-            <a:pPr lvl="1"/>
-            <a:r>
-              <a:rPr lang="en-US" dirty="0" smtClean="0"/>
-              <a:t>C/C++/Fortran/Java: core language</a:t>
-            </a:r>
-          </a:p>
-          <a:p>
-            <a:pPr lvl="1"/>
-            <a:r>
-              <a:rPr lang="en-US" dirty="0" smtClean="0"/>
-              <a:t>Python: array package</a:t>
-            </a:r>
-          </a:p>
-          <a:p>
-            <a:pPr lvl="1"/>
-            <a:endParaRPr lang="en-US" dirty="0"/>
+          <p:cNvPr id="3" name="Text Placeholder 2"/>
+          <p:cNvSpPr>
+            <a:spLocks noGrp="1"/>
+          </p:cNvSpPr>
+          <p:nvPr>
+            <p:ph type="body" idx="1"/>
+          </p:nvPr>
+        </p:nvSpPr>
+        <p:spPr/>
+        <p:txBody>
+          <a:bodyPr/>
+          <a:lstStyle/>
+          <a:p>
+            <a:endParaRPr lang="en-US"/>
           </a:p>
         </p:txBody>
       </p:sp>
     </p:spTree>
     <p:extLst>
       <p:ext uri="{BB962C8B-B14F-4D97-AF65-F5344CB8AC3E}">
-        <p14:creationId xmlns:p14="http://schemas.microsoft.com/office/powerpoint/2010/main" val="3611286983"/>
+        <p14:creationId xmlns:p14="http://schemas.microsoft.com/office/powerpoint/2010/main" val="3539088788"/>
       </p:ext>
     </p:extLst>
   </p:cSld>
@@ -4019,7 +4243,7 @@
           <a:p>
             <a:r>
               <a:rPr lang="en-US" dirty="0" smtClean="0"/>
-              <a:t>Tuple</a:t>
+              <a:t>Array</a:t>
             </a:r>
             <a:endParaRPr lang="en-US" dirty="0"/>
           </a:p>
@@ -4038,7 +4262,7 @@
         <p:spPr/>
         <p:txBody>
           <a:bodyPr>
-            <a:normAutofit/>
+            <a:normAutofit lnSpcReduction="10000"/>
           </a:bodyPr>
           <a:lstStyle/>
           <a:p>
@@ -4051,7 +4275,7 @@
             <a:pPr lvl="1"/>
             <a:r>
               <a:rPr lang="en-US" dirty="0" smtClean="0"/>
-              <a:t>access: random by ordinal index or keyword</a:t>
+              <a:t>access: random by ordinal index</a:t>
             </a:r>
           </a:p>
           <a:p>
@@ -4072,7 +4296,7 @@
             <a:pPr lvl="1"/>
             <a:r>
               <a:rPr lang="en-US" dirty="0" smtClean="0"/>
-              <a:t>insert/update: N/A</a:t>
+              <a:t>insert/update: O(1)</a:t>
             </a:r>
           </a:p>
           <a:p>
@@ -4086,14 +4310,14 @@
             <a:pPr lvl="1"/>
             <a:r>
               <a:rPr lang="en-US" dirty="0" smtClean="0"/>
-              <a:t>search: N/A</a:t>
-            </a:r>
-          </a:p>
-          <a:p>
-            <a:pPr lvl="1"/>
-            <a:r>
-              <a:rPr lang="en-US" dirty="0" smtClean="0"/>
-              <a:t>element type: any</a:t>
+              <a:t>search: O(n)</a:t>
+            </a:r>
+          </a:p>
+          <a:p>
+            <a:pPr lvl="1"/>
+            <a:r>
+              <a:rPr lang="en-US" dirty="0" smtClean="0"/>
+              <a:t>element type: homogenous</a:t>
             </a:r>
           </a:p>
           <a:p>
@@ -4106,7 +4330,14 @@
             <a:pPr lvl="1"/>
             <a:r>
               <a:rPr lang="en-US" dirty="0" smtClean="0"/>
-              <a:t>C/C++/Fortran/Java/Python: core language</a:t>
+              <a:t>C/C++/Fortran/Java: core language</a:t>
+            </a:r>
+          </a:p>
+          <a:p>
+            <a:pPr lvl="1"/>
+            <a:r>
+              <a:rPr lang="en-US" dirty="0" smtClean="0"/>
+              <a:t>Python: array package</a:t>
             </a:r>
           </a:p>
           <a:p>
@@ -4115,10 +4346,116 @@
           </a:p>
         </p:txBody>
       </p:sp>
+      <p:grpSp>
+        <p:nvGrpSpPr>
+          <p:cNvPr id="6" name="Group 5"/>
+          <p:cNvGrpSpPr/>
+          <p:nvPr/>
+        </p:nvGrpSpPr>
+        <p:grpSpPr>
+          <a:xfrm>
+            <a:off x="6307280" y="2566553"/>
+            <a:ext cx="3587755" cy="1034763"/>
+            <a:chOff x="6307280" y="2566553"/>
+            <a:chExt cx="3587755" cy="1034763"/>
+          </a:xfrm>
+        </p:grpSpPr>
+        <p:graphicFrame>
+          <p:nvGraphicFramePr>
+            <p:cNvPr id="4" name="Object 3"/>
+            <p:cNvGraphicFramePr>
+              <a:graphicFrameLocks noChangeAspect="1"/>
+            </p:cNvGraphicFramePr>
+            <p:nvPr>
+              <p:extLst>
+                <p:ext uri="{D42A27DB-BD31-4B8C-83A1-F6EECF244321}">
+                  <p14:modId xmlns:p14="http://schemas.microsoft.com/office/powerpoint/2010/main" val="399471717"/>
+                </p:ext>
+              </p:extLst>
+            </p:nvPr>
+          </p:nvGraphicFramePr>
+          <p:xfrm>
+            <a:off x="7362973" y="3147291"/>
+            <a:ext cx="2532062" cy="454025"/>
+          </p:xfrm>
+          <a:graphic>
+            <a:graphicData uri="http://schemas.openxmlformats.org/presentationml/2006/ole">
+              <mc:AlternateContent xmlns:mc="http://schemas.openxmlformats.org/markup-compatibility/2006">
+                <mc:Choice xmlns:v="urn:schemas-microsoft-com:vml" Requires="v">
+                  <p:oleObj spid="_x0000_s2052" name="Equation" r:id="rId3" imgW="1130040" imgH="203040" progId="Equation.3">
+                    <p:embed/>
+                  </p:oleObj>
+                </mc:Choice>
+                <mc:Fallback>
+                  <p:oleObj name="Equation" r:id="rId3" imgW="1130040" imgH="203040" progId="Equation.3">
+                    <p:embed/>
+                    <p:pic>
+                      <p:nvPicPr>
+                        <p:cNvPr id="0" name=""/>
+                        <p:cNvPicPr/>
+                        <p:nvPr/>
+                      </p:nvPicPr>
+                      <p:blipFill>
+                        <a:blip r:embed="rId4"/>
+                        <a:stretch>
+                          <a:fillRect/>
+                        </a:stretch>
+                      </p:blipFill>
+                      <p:spPr>
+                        <a:xfrm>
+                          <a:off x="7362973" y="3147291"/>
+                          <a:ext cx="2532062" cy="454025"/>
+                        </a:xfrm>
+                        <a:prstGeom prst="rect">
+                          <a:avLst/>
+                        </a:prstGeom>
+                      </p:spPr>
+                    </p:pic>
+                  </p:oleObj>
+                </mc:Fallback>
+              </mc:AlternateContent>
+            </a:graphicData>
+          </a:graphic>
+        </p:graphicFrame>
+        <p:sp>
+          <p:nvSpPr>
+            <p:cNvPr id="5" name="TextBox 4"/>
+            <p:cNvSpPr txBox="1"/>
+            <p:nvPr/>
+          </p:nvSpPr>
+          <p:spPr>
+            <a:xfrm>
+              <a:off x="6307280" y="2566553"/>
+              <a:ext cx="3081677" cy="523220"/>
+            </a:xfrm>
+            <a:prstGeom prst="rect">
+              <a:avLst/>
+            </a:prstGeom>
+            <a:noFill/>
+          </p:spPr>
+          <p:txBody>
+            <a:bodyPr wrap="none" rtlCol="0">
+              <a:spAutoFit/>
+            </a:bodyPr>
+            <a:lstStyle/>
+            <a:p>
+              <a:r>
+                <a:rPr lang="en-US" sz="2800" i="1" dirty="0" smtClean="0"/>
+                <a:t>d</a:t>
+              </a:r>
+              <a:r>
+                <a:rPr lang="en-US" sz="2800" dirty="0" smtClean="0"/>
+                <a:t>-dimensional array</a:t>
+              </a:r>
+              <a:endParaRPr lang="en-US" sz="2800" dirty="0"/>
+            </a:p>
+          </p:txBody>
+        </p:sp>
+      </p:grpSp>
     </p:spTree>
     <p:extLst>
       <p:ext uri="{BB962C8B-B14F-4D97-AF65-F5344CB8AC3E}">
-        <p14:creationId xmlns:p14="http://schemas.microsoft.com/office/powerpoint/2010/main" val="2505608512"/>
+        <p14:creationId xmlns:p14="http://schemas.microsoft.com/office/powerpoint/2010/main" val="3611286983"/>
       </p:ext>
     </p:extLst>
   </p:cSld>
@@ -4169,7 +4506,7 @@
           <a:p>
             <a:r>
               <a:rPr lang="en-US" dirty="0" smtClean="0"/>
-              <a:t>List</a:t>
+              <a:t>Tuple</a:t>
             </a:r>
             <a:endParaRPr lang="en-US" dirty="0"/>
           </a:p>
@@ -4188,7 +4525,7 @@
         <p:spPr/>
         <p:txBody>
           <a:bodyPr>
-            <a:normAutofit fontScale="92500" lnSpcReduction="20000"/>
+            <a:normAutofit/>
           </a:bodyPr>
           <a:lstStyle/>
           <a:p>
@@ -4201,7 +4538,7 @@
             <a:pPr lvl="1"/>
             <a:r>
               <a:rPr lang="en-US" dirty="0" smtClean="0"/>
-              <a:t>access: random by ordinal index</a:t>
+              <a:t>access: random by ordinal index or keyword</a:t>
             </a:r>
           </a:p>
           <a:p>
@@ -4215,35 +4552,28 @@
             <a:pPr lvl="1"/>
             <a:r>
               <a:rPr lang="en-US" dirty="0" smtClean="0"/>
-              <a:t>length can vary</a:t>
-            </a:r>
-          </a:p>
-          <a:p>
-            <a:pPr lvl="1"/>
-            <a:r>
-              <a:rPr lang="en-US" dirty="0" smtClean="0"/>
-              <a:t>insert/update: O(n)</a:t>
-            </a:r>
-          </a:p>
-          <a:p>
-            <a:pPr lvl="1"/>
-            <a:r>
-              <a:rPr lang="en-US" dirty="0" smtClean="0"/>
-              <a:t>retrieval: O(n)</a:t>
-            </a:r>
-          </a:p>
-          <a:p>
-            <a:pPr lvl="1"/>
-            <a:r>
-              <a:rPr lang="en-US" dirty="0" smtClean="0"/>
-              <a:t>search: O(n)</a:t>
-            </a:r>
-          </a:p>
-          <a:p>
-            <a:pPr lvl="1"/>
-            <a:r>
-              <a:rPr lang="en-US" dirty="0" smtClean="0"/>
-              <a:t>prepend/append: O(1)</a:t>
+              <a:t>fixed length</a:t>
+            </a:r>
+          </a:p>
+          <a:p>
+            <a:pPr lvl="1"/>
+            <a:r>
+              <a:rPr lang="en-US" dirty="0" smtClean="0"/>
+              <a:t>insert/update: N/A</a:t>
+            </a:r>
+          </a:p>
+          <a:p>
+            <a:pPr lvl="1"/>
+            <a:r>
+              <a:rPr lang="en-US" dirty="0" smtClean="0"/>
+              <a:t>retrieval: O(1)</a:t>
+            </a:r>
+          </a:p>
+          <a:p>
+            <a:pPr lvl="1"/>
+            <a:r>
+              <a:rPr lang="en-US" dirty="0" smtClean="0"/>
+              <a:t>search: N/A</a:t>
             </a:r>
           </a:p>
           <a:p>
@@ -4254,13 +4584,6 @@
             </a:r>
           </a:p>
           <a:p>
-            <a:pPr lvl="1"/>
-            <a:r>
-              <a:rPr lang="en-US" dirty="0" smtClean="0"/>
-              <a:t>operations: concatenation</a:t>
-            </a:r>
-          </a:p>
-          <a:p>
             <a:r>
               <a:rPr lang="en-US" dirty="0" smtClean="0"/>
               <a:t>Implementations</a:t>
@@ -4270,14 +4593,7 @@
             <a:pPr lvl="1"/>
             <a:r>
               <a:rPr lang="en-US" dirty="0" smtClean="0"/>
-              <a:t>C++/Java: standard library</a:t>
-            </a:r>
-          </a:p>
-          <a:p>
-            <a:pPr lvl="1"/>
-            <a:r>
-              <a:rPr lang="en-US" dirty="0" smtClean="0"/>
-              <a:t>Python: core language</a:t>
+              <a:t>C/C++/Fortran/Java/Python: core language</a:t>
             </a:r>
           </a:p>
           <a:p>
@@ -4286,10 +4602,116 @@
           </a:p>
         </p:txBody>
       </p:sp>
+      <p:grpSp>
+        <p:nvGrpSpPr>
+          <p:cNvPr id="4" name="Group 3"/>
+          <p:cNvGrpSpPr/>
+          <p:nvPr/>
+        </p:nvGrpSpPr>
+        <p:grpSpPr>
+          <a:xfrm>
+            <a:off x="6265716" y="3169229"/>
+            <a:ext cx="3332309" cy="1063046"/>
+            <a:chOff x="6307280" y="2566553"/>
+            <a:chExt cx="3332309" cy="1063046"/>
+          </a:xfrm>
+        </p:grpSpPr>
+        <p:graphicFrame>
+          <p:nvGraphicFramePr>
+            <p:cNvPr id="5" name="Object 4"/>
+            <p:cNvGraphicFramePr>
+              <a:graphicFrameLocks noChangeAspect="1"/>
+            </p:cNvGraphicFramePr>
+            <p:nvPr>
+              <p:extLst>
+                <p:ext uri="{D42A27DB-BD31-4B8C-83A1-F6EECF244321}">
+                  <p14:modId xmlns:p14="http://schemas.microsoft.com/office/powerpoint/2010/main" val="2287256883"/>
+                </p:ext>
+              </p:extLst>
+            </p:nvPr>
+          </p:nvGraphicFramePr>
+          <p:xfrm>
+            <a:off x="7618702" y="3118424"/>
+            <a:ext cx="2020887" cy="511175"/>
+          </p:xfrm>
+          <a:graphic>
+            <a:graphicData uri="http://schemas.openxmlformats.org/presentationml/2006/ole">
+              <mc:AlternateContent xmlns:mc="http://schemas.openxmlformats.org/markup-compatibility/2006">
+                <mc:Choice xmlns:v="urn:schemas-microsoft-com:vml" Requires="v">
+                  <p:oleObj spid="_x0000_s3074" name="Equation" r:id="rId3" imgW="901440" imgH="228600" progId="Equation.3">
+                    <p:embed/>
+                  </p:oleObj>
+                </mc:Choice>
+                <mc:Fallback>
+                  <p:oleObj name="Equation" r:id="rId3" imgW="901440" imgH="228600" progId="Equation.3">
+                    <p:embed/>
+                    <p:pic>
+                      <p:nvPicPr>
+                        <p:cNvPr id="0" name=""/>
+                        <p:cNvPicPr/>
+                        <p:nvPr/>
+                      </p:nvPicPr>
+                      <p:blipFill>
+                        <a:blip r:embed="rId4"/>
+                        <a:stretch>
+                          <a:fillRect/>
+                        </a:stretch>
+                      </p:blipFill>
+                      <p:spPr>
+                        <a:xfrm>
+                          <a:off x="7618702" y="3118424"/>
+                          <a:ext cx="2020887" cy="511175"/>
+                        </a:xfrm>
+                        <a:prstGeom prst="rect">
+                          <a:avLst/>
+                        </a:prstGeom>
+                      </p:spPr>
+                    </p:pic>
+                  </p:oleObj>
+                </mc:Fallback>
+              </mc:AlternateContent>
+            </a:graphicData>
+          </a:graphic>
+        </p:graphicFrame>
+        <p:sp>
+          <p:nvSpPr>
+            <p:cNvPr id="6" name="TextBox 5"/>
+            <p:cNvSpPr txBox="1"/>
+            <p:nvPr/>
+          </p:nvSpPr>
+          <p:spPr>
+            <a:xfrm>
+              <a:off x="6307280" y="2566553"/>
+              <a:ext cx="1237839" cy="523220"/>
+            </a:xfrm>
+            <a:prstGeom prst="rect">
+              <a:avLst/>
+            </a:prstGeom>
+            <a:noFill/>
+          </p:spPr>
+          <p:txBody>
+            <a:bodyPr wrap="none" rtlCol="0">
+              <a:spAutoFit/>
+            </a:bodyPr>
+            <a:lstStyle/>
+            <a:p>
+              <a:r>
+                <a:rPr lang="en-US" sz="2800" i="1" dirty="0" smtClean="0"/>
+                <a:t>d</a:t>
+              </a:r>
+              <a:r>
+                <a:rPr lang="en-US" sz="2800" dirty="0" smtClean="0"/>
+                <a:t>-tuple</a:t>
+              </a:r>
+              <a:endParaRPr lang="en-US" sz="2800" dirty="0"/>
+            </a:p>
+          </p:txBody>
+        </p:sp>
+      </p:grpSp>
     </p:spTree>
     <p:extLst>
       <p:ext uri="{BB962C8B-B14F-4D97-AF65-F5344CB8AC3E}">
-        <p14:creationId xmlns:p14="http://schemas.microsoft.com/office/powerpoint/2010/main" val="2248761884"/>
+        <p14:creationId xmlns:p14="http://schemas.microsoft.com/office/powerpoint/2010/main" val="2505608512"/>
       </p:ext>
     </p:extLst>
   </p:cSld>
@@ -4340,7 +4762,7 @@
           <a:p>
             <a:r>
               <a:rPr lang="en-US" dirty="0" smtClean="0"/>
-              <a:t>Set</a:t>
+              <a:t>List</a:t>
             </a:r>
             <a:endParaRPr lang="en-US" dirty="0"/>
           </a:p>
@@ -4356,12 +4778,7 @@
             <p:ph idx="1"/>
           </p:nvPr>
         </p:nvSpPr>
-        <p:spPr>
-          <a:xfrm>
-            <a:off x="838200" y="1825625"/>
-            <a:ext cx="10515600" cy="4351338"/>
-          </a:xfrm>
-        </p:spPr>
+        <p:spPr/>
         <p:txBody>
           <a:bodyPr>
             <a:normAutofit fontScale="92500" lnSpcReduction="20000"/>
@@ -4377,42 +4794,49 @@
             <a:pPr lvl="1"/>
             <a:r>
               <a:rPr lang="en-US" dirty="0" smtClean="0"/>
-              <a:t>access: iterator</a:t>
-            </a:r>
-          </a:p>
-          <a:p>
-            <a:pPr lvl="1"/>
-            <a:r>
-              <a:rPr lang="en-US" dirty="0" smtClean="0"/>
-              <a:t>unordered</a:t>
-            </a:r>
-          </a:p>
-          <a:p>
-            <a:pPr lvl="1"/>
-            <a:r>
-              <a:rPr lang="en-US" dirty="0" smtClean="0"/>
-              <a:t>size can vary</a:t>
-            </a:r>
-          </a:p>
-          <a:p>
-            <a:pPr lvl="1"/>
-            <a:r>
-              <a:rPr lang="en-US" dirty="0" smtClean="0"/>
-              <a:t>insert/update: O(1)</a:t>
-            </a:r>
-          </a:p>
-          <a:p>
-            <a:pPr lvl="1"/>
-            <a:r>
-              <a:rPr lang="en-US" dirty="0" smtClean="0"/>
-              <a:t>retrieval: O(1)</a:t>
-            </a:r>
-          </a:p>
-          <a:p>
-            <a:pPr lvl="1"/>
-            <a:r>
-              <a:rPr lang="en-US" dirty="0" smtClean="0"/>
-              <a:t>search: O(1)</a:t>
+              <a:t>access: random by ordinal index</a:t>
+            </a:r>
+          </a:p>
+          <a:p>
+            <a:pPr lvl="1"/>
+            <a:r>
+              <a:rPr lang="en-US" dirty="0" smtClean="0"/>
+              <a:t>ordered</a:t>
+            </a:r>
+          </a:p>
+          <a:p>
+            <a:pPr lvl="1"/>
+            <a:r>
+              <a:rPr lang="en-US" dirty="0" smtClean="0"/>
+              <a:t>length can vary</a:t>
+            </a:r>
+          </a:p>
+          <a:p>
+            <a:pPr lvl="1"/>
+            <a:r>
+              <a:rPr lang="en-US" dirty="0" smtClean="0"/>
+              <a:t>insert/update: O(n)</a:t>
+            </a:r>
+          </a:p>
+          <a:p>
+            <a:pPr lvl="1"/>
+            <a:r>
+              <a:rPr lang="en-US" dirty="0" smtClean="0"/>
+              <a:t>retrieval: O(n)</a:t>
+            </a:r>
+          </a:p>
+          <a:p>
+            <a:pPr lvl="1"/>
+            <a:r>
+              <a:rPr lang="en-US" dirty="0" smtClean="0"/>
+              <a:t>search: O(n)</a:t>
+            </a:r>
+          </a:p>
+          <a:p>
+            <a:pPr lvl="1"/>
+            <a:r>
+              <a:rPr lang="en-US" dirty="0" smtClean="0"/>
+              <a:t>prepend/append: O(1)</a:t>
             </a:r>
           </a:p>
           <a:p>
@@ -4426,14 +4850,7 @@
             <a:pPr lvl="1"/>
             <a:r>
               <a:rPr lang="en-US" dirty="0" smtClean="0"/>
-              <a:t>elements are unique in set</a:t>
-            </a:r>
-          </a:p>
-          <a:p>
-            <a:pPr lvl="1"/>
-            <a:r>
-              <a:rPr lang="en-US" dirty="0" smtClean="0"/>
-              <a:t>operations: union, intersection, …</a:t>
+              <a:t>operations: concatenation</a:t>
             </a:r>
           </a:p>
           <a:p>
@@ -4465,7 +4882,7 @@
     </p:spTree>
     <p:extLst>
       <p:ext uri="{BB962C8B-B14F-4D97-AF65-F5344CB8AC3E}">
-        <p14:creationId xmlns:p14="http://schemas.microsoft.com/office/powerpoint/2010/main" val="2374377430"/>
+        <p14:creationId xmlns:p14="http://schemas.microsoft.com/office/powerpoint/2010/main" val="2248761884"/>
       </p:ext>
     </p:extLst>
   </p:cSld>

</xml_diff>

<commit_message>
Added formalism for basic data structures
</commit_message>
<xml_diff>
--- a/DataStructures/data_structures.pptx
+++ b/DataStructures/data_structures.pptx
@@ -2,8 +2,11 @@
 <file path=ppt/presentation.xml><?xml version="1.0" encoding="utf-8"?>
 <p:presentation xmlns:a="http://schemas.openxmlformats.org/drawingml/2006/main" xmlns:r="http://schemas.openxmlformats.org/officeDocument/2006/relationships" xmlns:p="http://schemas.openxmlformats.org/presentationml/2006/main" saveSubsetFonts="1">
   <p:sldMasterIdLst>
-    <p:sldMasterId id="2147483648" r:id="rId1"/>
+    <p:sldMasterId id="2147483660" r:id="rId1"/>
   </p:sldMasterIdLst>
+  <p:notesMasterIdLst>
+    <p:notesMasterId r:id="rId13"/>
+  </p:notesMasterIdLst>
   <p:sldIdLst>
     <p:sldId id="256" r:id="rId2"/>
     <p:sldId id="257" r:id="rId3"/>
@@ -17,7 +20,7 @@
     <p:sldId id="263" r:id="rId11"/>
     <p:sldId id="264" r:id="rId12"/>
   </p:sldIdLst>
-  <p:sldSz cx="12192000" cy="6858000"/>
+  <p:sldSz cx="9144000" cy="6858000" type="screen4x3"/>
   <p:notesSz cx="6858000" cy="9144000"/>
   <p:defaultTextStyle>
     <a:defPPr>
@@ -122,6 +125,440 @@
 </p:presentation>
 </file>
 
+<file path=ppt/notesMasters/notesMaster1.xml><?xml version="1.0" encoding="utf-8"?>
+<p:notesMaster xmlns:a="http://schemas.openxmlformats.org/drawingml/2006/main" xmlns:r="http://schemas.openxmlformats.org/officeDocument/2006/relationships" xmlns:p="http://schemas.openxmlformats.org/presentationml/2006/main">
+  <p:cSld>
+    <p:bg>
+      <p:bgRef idx="1001">
+        <a:schemeClr val="bg1"/>
+      </p:bgRef>
+    </p:bg>
+    <p:spTree>
+      <p:nvGrpSpPr>
+        <p:cNvPr id="1" name=""/>
+        <p:cNvGrpSpPr/>
+        <p:nvPr/>
+      </p:nvGrpSpPr>
+      <p:grpSpPr>
+        <a:xfrm>
+          <a:off x="0" y="0"/>
+          <a:ext cx="0" cy="0"/>
+          <a:chOff x="0" y="0"/>
+          <a:chExt cx="0" cy="0"/>
+        </a:xfrm>
+      </p:grpSpPr>
+      <p:sp>
+        <p:nvSpPr>
+          <p:cNvPr id="2" name="Header Placeholder 1"/>
+          <p:cNvSpPr>
+            <a:spLocks noGrp="1"/>
+          </p:cNvSpPr>
+          <p:nvPr>
+            <p:ph type="hdr" sz="quarter"/>
+          </p:nvPr>
+        </p:nvSpPr>
+        <p:spPr>
+          <a:xfrm>
+            <a:off x="0" y="0"/>
+            <a:ext cx="2971800" cy="458788"/>
+          </a:xfrm>
+          <a:prstGeom prst="rect">
+            <a:avLst/>
+          </a:prstGeom>
+        </p:spPr>
+        <p:txBody>
+          <a:bodyPr vert="horz" lIns="91440" tIns="45720" rIns="91440" bIns="45720" rtlCol="0"/>
+          <a:lstStyle>
+            <a:lvl1pPr algn="l">
+              <a:defRPr sz="1200"/>
+            </a:lvl1pPr>
+          </a:lstStyle>
+          <a:p>
+            <a:endParaRPr lang="en-US"/>
+          </a:p>
+        </p:txBody>
+      </p:sp>
+      <p:sp>
+        <p:nvSpPr>
+          <p:cNvPr id="3" name="Date Placeholder 2"/>
+          <p:cNvSpPr>
+            <a:spLocks noGrp="1"/>
+          </p:cNvSpPr>
+          <p:nvPr>
+            <p:ph type="dt" idx="1"/>
+          </p:nvPr>
+        </p:nvSpPr>
+        <p:spPr>
+          <a:xfrm>
+            <a:off x="3884613" y="0"/>
+            <a:ext cx="2971800" cy="458788"/>
+          </a:xfrm>
+          <a:prstGeom prst="rect">
+            <a:avLst/>
+          </a:prstGeom>
+        </p:spPr>
+        <p:txBody>
+          <a:bodyPr vert="horz" lIns="91440" tIns="45720" rIns="91440" bIns="45720" rtlCol="0"/>
+          <a:lstStyle>
+            <a:lvl1pPr algn="r">
+              <a:defRPr sz="1200"/>
+            </a:lvl1pPr>
+          </a:lstStyle>
+          <a:p>
+            <a:fld id="{D3AF4CC3-573B-48A2-BA19-C88E9EEB8008}" type="datetimeFigureOut">
+              <a:rPr lang="en-US" smtClean="0"/>
+              <a:t>2016-08-17</a:t>
+            </a:fld>
+            <a:endParaRPr lang="en-US"/>
+          </a:p>
+        </p:txBody>
+      </p:sp>
+      <p:sp>
+        <p:nvSpPr>
+          <p:cNvPr id="4" name="Slide Image Placeholder 3"/>
+          <p:cNvSpPr>
+            <a:spLocks noGrp="1" noRot="1" noChangeAspect="1"/>
+          </p:cNvSpPr>
+          <p:nvPr>
+            <p:ph type="sldImg" idx="2"/>
+          </p:nvPr>
+        </p:nvSpPr>
+        <p:spPr>
+          <a:xfrm>
+            <a:off x="1371600" y="1143000"/>
+            <a:ext cx="4114800" cy="3086100"/>
+          </a:xfrm>
+          <a:prstGeom prst="rect">
+            <a:avLst/>
+          </a:prstGeom>
+          <a:noFill/>
+          <a:ln w="12700">
+            <a:solidFill>
+              <a:prstClr val="black"/>
+            </a:solidFill>
+          </a:ln>
+        </p:spPr>
+        <p:txBody>
+          <a:bodyPr vert="horz" lIns="91440" tIns="45720" rIns="91440" bIns="45720" rtlCol="0" anchor="ctr"/>
+          <a:lstStyle/>
+          <a:p>
+            <a:endParaRPr lang="en-US"/>
+          </a:p>
+        </p:txBody>
+      </p:sp>
+      <p:sp>
+        <p:nvSpPr>
+          <p:cNvPr id="5" name="Notes Placeholder 4"/>
+          <p:cNvSpPr>
+            <a:spLocks noGrp="1"/>
+          </p:cNvSpPr>
+          <p:nvPr>
+            <p:ph type="body" sz="quarter" idx="3"/>
+          </p:nvPr>
+        </p:nvSpPr>
+        <p:spPr>
+          <a:xfrm>
+            <a:off x="685800" y="4400550"/>
+            <a:ext cx="5486400" cy="3600450"/>
+          </a:xfrm>
+          <a:prstGeom prst="rect">
+            <a:avLst/>
+          </a:prstGeom>
+        </p:spPr>
+        <p:txBody>
+          <a:bodyPr vert="horz" lIns="91440" tIns="45720" rIns="91440" bIns="45720" rtlCol="0"/>
+          <a:lstStyle/>
+          <a:p>
+            <a:pPr lvl="0"/>
+            <a:r>
+              <a:rPr lang="en-US" smtClean="0"/>
+              <a:t>Click to edit Master text styles</a:t>
+            </a:r>
+          </a:p>
+          <a:p>
+            <a:pPr lvl="1"/>
+            <a:r>
+              <a:rPr lang="en-US" smtClean="0"/>
+              <a:t>Second level</a:t>
+            </a:r>
+          </a:p>
+          <a:p>
+            <a:pPr lvl="2"/>
+            <a:r>
+              <a:rPr lang="en-US" smtClean="0"/>
+              <a:t>Third level</a:t>
+            </a:r>
+          </a:p>
+          <a:p>
+            <a:pPr lvl="3"/>
+            <a:r>
+              <a:rPr lang="en-US" smtClean="0"/>
+              <a:t>Fourth level</a:t>
+            </a:r>
+          </a:p>
+          <a:p>
+            <a:pPr lvl="4"/>
+            <a:r>
+              <a:rPr lang="en-US" smtClean="0"/>
+              <a:t>Fifth level</a:t>
+            </a:r>
+            <a:endParaRPr lang="en-US"/>
+          </a:p>
+        </p:txBody>
+      </p:sp>
+      <p:sp>
+        <p:nvSpPr>
+          <p:cNvPr id="6" name="Footer Placeholder 5"/>
+          <p:cNvSpPr>
+            <a:spLocks noGrp="1"/>
+          </p:cNvSpPr>
+          <p:nvPr>
+            <p:ph type="ftr" sz="quarter" idx="4"/>
+          </p:nvPr>
+        </p:nvSpPr>
+        <p:spPr>
+          <a:xfrm>
+            <a:off x="0" y="8685213"/>
+            <a:ext cx="2971800" cy="458787"/>
+          </a:xfrm>
+          <a:prstGeom prst="rect">
+            <a:avLst/>
+          </a:prstGeom>
+        </p:spPr>
+        <p:txBody>
+          <a:bodyPr vert="horz" lIns="91440" tIns="45720" rIns="91440" bIns="45720" rtlCol="0" anchor="b"/>
+          <a:lstStyle>
+            <a:lvl1pPr algn="l">
+              <a:defRPr sz="1200"/>
+            </a:lvl1pPr>
+          </a:lstStyle>
+          <a:p>
+            <a:endParaRPr lang="en-US"/>
+          </a:p>
+        </p:txBody>
+      </p:sp>
+      <p:sp>
+        <p:nvSpPr>
+          <p:cNvPr id="7" name="Slide Number Placeholder 6"/>
+          <p:cNvSpPr>
+            <a:spLocks noGrp="1"/>
+          </p:cNvSpPr>
+          <p:nvPr>
+            <p:ph type="sldNum" sz="quarter" idx="5"/>
+          </p:nvPr>
+        </p:nvSpPr>
+        <p:spPr>
+          <a:xfrm>
+            <a:off x="3884613" y="8685213"/>
+            <a:ext cx="2971800" cy="458787"/>
+          </a:xfrm>
+          <a:prstGeom prst="rect">
+            <a:avLst/>
+          </a:prstGeom>
+        </p:spPr>
+        <p:txBody>
+          <a:bodyPr vert="horz" lIns="91440" tIns="45720" rIns="91440" bIns="45720" rtlCol="0" anchor="b"/>
+          <a:lstStyle>
+            <a:lvl1pPr algn="r">
+              <a:defRPr sz="1200"/>
+            </a:lvl1pPr>
+          </a:lstStyle>
+          <a:p>
+            <a:fld id="{377ED49E-3B52-4D1C-85F4-C21F07234187}" type="slidenum">
+              <a:rPr lang="en-US" smtClean="0"/>
+              <a:t>‹#›</a:t>
+            </a:fld>
+            <a:endParaRPr lang="en-US"/>
+          </a:p>
+        </p:txBody>
+      </p:sp>
+    </p:spTree>
+    <p:extLst>
+      <p:ext uri="{BB962C8B-B14F-4D97-AF65-F5344CB8AC3E}">
+        <p14:creationId xmlns:p14="http://schemas.microsoft.com/office/powerpoint/2010/main" val="3503529310"/>
+      </p:ext>
+    </p:extLst>
+  </p:cSld>
+  <p:clrMap bg1="lt1" tx1="dk1" bg2="lt2" tx2="dk2" accent1="accent1" accent2="accent2" accent3="accent3" accent4="accent4" accent5="accent5" accent6="accent6" hlink="hlink" folHlink="folHlink"/>
+  <p:notesStyle>
+    <a:lvl1pPr marL="0" algn="l" defTabSz="914400" rtl="0" eaLnBrk="1" latinLnBrk="0" hangingPunct="1">
+      <a:defRPr sz="1200" kern="1200">
+        <a:solidFill>
+          <a:schemeClr val="tx1"/>
+        </a:solidFill>
+        <a:latin typeface="+mn-lt"/>
+        <a:ea typeface="+mn-ea"/>
+        <a:cs typeface="+mn-cs"/>
+      </a:defRPr>
+    </a:lvl1pPr>
+    <a:lvl2pPr marL="457200" algn="l" defTabSz="914400" rtl="0" eaLnBrk="1" latinLnBrk="0" hangingPunct="1">
+      <a:defRPr sz="1200" kern="1200">
+        <a:solidFill>
+          <a:schemeClr val="tx1"/>
+        </a:solidFill>
+        <a:latin typeface="+mn-lt"/>
+        <a:ea typeface="+mn-ea"/>
+        <a:cs typeface="+mn-cs"/>
+      </a:defRPr>
+    </a:lvl2pPr>
+    <a:lvl3pPr marL="914400" algn="l" defTabSz="914400" rtl="0" eaLnBrk="1" latinLnBrk="0" hangingPunct="1">
+      <a:defRPr sz="1200" kern="1200">
+        <a:solidFill>
+          <a:schemeClr val="tx1"/>
+        </a:solidFill>
+        <a:latin typeface="+mn-lt"/>
+        <a:ea typeface="+mn-ea"/>
+        <a:cs typeface="+mn-cs"/>
+      </a:defRPr>
+    </a:lvl3pPr>
+    <a:lvl4pPr marL="1371600" algn="l" defTabSz="914400" rtl="0" eaLnBrk="1" latinLnBrk="0" hangingPunct="1">
+      <a:defRPr sz="1200" kern="1200">
+        <a:solidFill>
+          <a:schemeClr val="tx1"/>
+        </a:solidFill>
+        <a:latin typeface="+mn-lt"/>
+        <a:ea typeface="+mn-ea"/>
+        <a:cs typeface="+mn-cs"/>
+      </a:defRPr>
+    </a:lvl4pPr>
+    <a:lvl5pPr marL="1828800" algn="l" defTabSz="914400" rtl="0" eaLnBrk="1" latinLnBrk="0" hangingPunct="1">
+      <a:defRPr sz="1200" kern="1200">
+        <a:solidFill>
+          <a:schemeClr val="tx1"/>
+        </a:solidFill>
+        <a:latin typeface="+mn-lt"/>
+        <a:ea typeface="+mn-ea"/>
+        <a:cs typeface="+mn-cs"/>
+      </a:defRPr>
+    </a:lvl5pPr>
+    <a:lvl6pPr marL="2286000" algn="l" defTabSz="914400" rtl="0" eaLnBrk="1" latinLnBrk="0" hangingPunct="1">
+      <a:defRPr sz="1200" kern="1200">
+        <a:solidFill>
+          <a:schemeClr val="tx1"/>
+        </a:solidFill>
+        <a:latin typeface="+mn-lt"/>
+        <a:ea typeface="+mn-ea"/>
+        <a:cs typeface="+mn-cs"/>
+      </a:defRPr>
+    </a:lvl6pPr>
+    <a:lvl7pPr marL="2743200" algn="l" defTabSz="914400" rtl="0" eaLnBrk="1" latinLnBrk="0" hangingPunct="1">
+      <a:defRPr sz="1200" kern="1200">
+        <a:solidFill>
+          <a:schemeClr val="tx1"/>
+        </a:solidFill>
+        <a:latin typeface="+mn-lt"/>
+        <a:ea typeface="+mn-ea"/>
+        <a:cs typeface="+mn-cs"/>
+      </a:defRPr>
+    </a:lvl7pPr>
+    <a:lvl8pPr marL="3200400" algn="l" defTabSz="914400" rtl="0" eaLnBrk="1" latinLnBrk="0" hangingPunct="1">
+      <a:defRPr sz="1200" kern="1200">
+        <a:solidFill>
+          <a:schemeClr val="tx1"/>
+        </a:solidFill>
+        <a:latin typeface="+mn-lt"/>
+        <a:ea typeface="+mn-ea"/>
+        <a:cs typeface="+mn-cs"/>
+      </a:defRPr>
+    </a:lvl8pPr>
+    <a:lvl9pPr marL="3657600" algn="l" defTabSz="914400" rtl="0" eaLnBrk="1" latinLnBrk="0" hangingPunct="1">
+      <a:defRPr sz="1200" kern="1200">
+        <a:solidFill>
+          <a:schemeClr val="tx1"/>
+        </a:solidFill>
+        <a:latin typeface="+mn-lt"/>
+        <a:ea typeface="+mn-ea"/>
+        <a:cs typeface="+mn-cs"/>
+      </a:defRPr>
+    </a:lvl9pPr>
+  </p:notesStyle>
+</p:notesMaster>
+</file>
+
+<file path=ppt/notesSlides/notesSlide1.xml><?xml version="1.0" encoding="utf-8"?>
+<p:notes xmlns:a="http://schemas.openxmlformats.org/drawingml/2006/main" xmlns:r="http://schemas.openxmlformats.org/officeDocument/2006/relationships" xmlns:p="http://schemas.openxmlformats.org/presentationml/2006/main">
+  <p:cSld>
+    <p:spTree>
+      <p:nvGrpSpPr>
+        <p:cNvPr id="1" name=""/>
+        <p:cNvGrpSpPr/>
+        <p:nvPr/>
+      </p:nvGrpSpPr>
+      <p:grpSpPr>
+        <a:xfrm>
+          <a:off x="0" y="0"/>
+          <a:ext cx="0" cy="0"/>
+          <a:chOff x="0" y="0"/>
+          <a:chExt cx="0" cy="0"/>
+        </a:xfrm>
+      </p:grpSpPr>
+      <p:sp>
+        <p:nvSpPr>
+          <p:cNvPr id="2" name="Slide Image Placeholder 1"/>
+          <p:cNvSpPr>
+            <a:spLocks noGrp="1" noRot="1" noChangeAspect="1"/>
+          </p:cNvSpPr>
+          <p:nvPr>
+            <p:ph type="sldImg"/>
+          </p:nvPr>
+        </p:nvSpPr>
+        <p:spPr/>
+      </p:sp>
+      <p:sp>
+        <p:nvSpPr>
+          <p:cNvPr id="3" name="Notes Placeholder 2"/>
+          <p:cNvSpPr>
+            <a:spLocks noGrp="1"/>
+          </p:cNvSpPr>
+          <p:nvPr>
+            <p:ph type="body" idx="1"/>
+          </p:nvPr>
+        </p:nvSpPr>
+        <p:spPr/>
+        <p:txBody>
+          <a:bodyPr/>
+          <a:lstStyle/>
+          <a:p>
+            <a:endParaRPr lang="en-US"/>
+          </a:p>
+        </p:txBody>
+      </p:sp>
+      <p:sp>
+        <p:nvSpPr>
+          <p:cNvPr id="4" name="Slide Number Placeholder 3"/>
+          <p:cNvSpPr>
+            <a:spLocks noGrp="1"/>
+          </p:cNvSpPr>
+          <p:nvPr>
+            <p:ph type="sldNum" sz="quarter" idx="10"/>
+          </p:nvPr>
+        </p:nvSpPr>
+        <p:spPr/>
+        <p:txBody>
+          <a:bodyPr/>
+          <a:lstStyle/>
+          <a:p>
+            <a:fld id="{377ED49E-3B52-4D1C-85F4-C21F07234187}" type="slidenum">
+              <a:rPr lang="en-US" smtClean="0"/>
+              <a:t>5</a:t>
+            </a:fld>
+            <a:endParaRPr lang="en-US"/>
+          </a:p>
+        </p:txBody>
+      </p:sp>
+    </p:spTree>
+    <p:extLst>
+      <p:ext uri="{BB962C8B-B14F-4D97-AF65-F5344CB8AC3E}">
+        <p14:creationId xmlns:p14="http://schemas.microsoft.com/office/powerpoint/2010/main" val="667436049"/>
+      </p:ext>
+    </p:extLst>
+  </p:cSld>
+  <p:clrMapOvr>
+    <a:masterClrMapping/>
+  </p:clrMapOvr>
+</p:notes>
+</file>
+
 <file path=ppt/slideLayouts/slideLayout1.xml><?xml version="1.0" encoding="utf-8"?>
 <p:sldLayout xmlns:a="http://schemas.openxmlformats.org/drawingml/2006/main" xmlns:r="http://schemas.openxmlformats.org/officeDocument/2006/relationships" xmlns:p="http://schemas.openxmlformats.org/presentationml/2006/main" type="title" preserve="1">
   <p:cSld name="Title Slide">
@@ -151,8 +588,8 @@
         </p:nvSpPr>
         <p:spPr>
           <a:xfrm>
-            <a:off x="1524000" y="1122363"/>
-            <a:ext cx="9144000" cy="2387600"/>
+            <a:off x="685800" y="1122363"/>
+            <a:ext cx="7772400" cy="2387600"/>
           </a:xfrm>
         </p:spPr>
         <p:txBody>
@@ -167,7 +604,7 @@
               <a:rPr lang="en-US" smtClean="0"/>
               <a:t>Click to edit Master title style</a:t>
             </a:r>
-            <a:endParaRPr lang="en-US"/>
+            <a:endParaRPr lang="en-US" dirty="0"/>
           </a:p>
         </p:txBody>
       </p:sp>
@@ -183,8 +620,8 @@
         </p:nvSpPr>
         <p:spPr>
           <a:xfrm>
-            <a:off x="1524000" y="3602038"/>
-            <a:ext cx="9144000" cy="1655762"/>
+            <a:off x="1143000" y="3602038"/>
+            <a:ext cx="6858000" cy="1655762"/>
           </a:xfrm>
         </p:spPr>
         <p:txBody>
@@ -232,7 +669,7 @@
               <a:rPr lang="en-US" smtClean="0"/>
               <a:t>Click to edit Master subtitle style</a:t>
             </a:r>
-            <a:endParaRPr lang="en-US"/>
+            <a:endParaRPr lang="en-US" dirty="0"/>
           </a:p>
         </p:txBody>
       </p:sp>
@@ -251,9 +688,9 @@
           <a:bodyPr/>
           <a:lstStyle/>
           <a:p>
-            <a:fld id="{DCFF0279-4160-4FB5-A95A-9ABB0C14BC92}" type="datetimeFigureOut">
-              <a:rPr lang="en-US" smtClean="0"/>
-              <a:t>2016-08-16</a:t>
+            <a:fld id="{E7395A51-B5B5-44D7-85E1-1556CCB9180F}" type="datetime1">
+              <a:rPr lang="en-US" smtClean="0"/>
+              <a:t>2016-08-17</a:t>
             </a:fld>
             <a:endParaRPr lang="en-US"/>
           </a:p>
@@ -304,7 +741,7 @@
     </p:spTree>
     <p:extLst>
       <p:ext uri="{BB962C8B-B14F-4D97-AF65-F5344CB8AC3E}">
-        <p14:creationId xmlns:p14="http://schemas.microsoft.com/office/powerpoint/2010/main" val="3848569155"/>
+        <p14:creationId xmlns:p14="http://schemas.microsoft.com/office/powerpoint/2010/main" val="2654523649"/>
       </p:ext>
     </p:extLst>
   </p:cSld>
@@ -350,7 +787,7 @@
               <a:rPr lang="en-US" smtClean="0"/>
               <a:t>Click to edit Master title style</a:t>
             </a:r>
-            <a:endParaRPr lang="en-US"/>
+            <a:endParaRPr lang="en-US" dirty="0"/>
           </a:p>
         </p:txBody>
       </p:sp>
@@ -402,7 +839,7 @@
               <a:rPr lang="en-US" smtClean="0"/>
               <a:t>Fifth level</a:t>
             </a:r>
-            <a:endParaRPr lang="en-US"/>
+            <a:endParaRPr lang="en-US" dirty="0"/>
           </a:p>
         </p:txBody>
       </p:sp>
@@ -421,9 +858,9 @@
           <a:bodyPr/>
           <a:lstStyle/>
           <a:p>
-            <a:fld id="{DCFF0279-4160-4FB5-A95A-9ABB0C14BC92}" type="datetimeFigureOut">
-              <a:rPr lang="en-US" smtClean="0"/>
-              <a:t>2016-08-16</a:t>
+            <a:fld id="{BEDB066D-DA80-4992-B507-A911EFD1878C}" type="datetime1">
+              <a:rPr lang="en-US" smtClean="0"/>
+              <a:t>2016-08-17</a:t>
             </a:fld>
             <a:endParaRPr lang="en-US"/>
           </a:p>
@@ -474,7 +911,7 @@
     </p:spTree>
     <p:extLst>
       <p:ext uri="{BB962C8B-B14F-4D97-AF65-F5344CB8AC3E}">
-        <p14:creationId xmlns:p14="http://schemas.microsoft.com/office/powerpoint/2010/main" val="1450248104"/>
+        <p14:creationId xmlns:p14="http://schemas.microsoft.com/office/powerpoint/2010/main" val="809411708"/>
       </p:ext>
     </p:extLst>
   </p:cSld>
@@ -513,8 +950,8 @@
         </p:nvSpPr>
         <p:spPr>
           <a:xfrm>
-            <a:off x="8724900" y="365125"/>
-            <a:ext cx="2628900" cy="5811838"/>
+            <a:off x="6543675" y="365125"/>
+            <a:ext cx="1971675" cy="5811838"/>
           </a:xfrm>
         </p:spPr>
         <p:txBody>
@@ -525,7 +962,7 @@
               <a:rPr lang="en-US" smtClean="0"/>
               <a:t>Click to edit Master title style</a:t>
             </a:r>
-            <a:endParaRPr lang="en-US"/>
+            <a:endParaRPr lang="en-US" dirty="0"/>
           </a:p>
         </p:txBody>
       </p:sp>
@@ -541,8 +978,8 @@
         </p:nvSpPr>
         <p:spPr>
           <a:xfrm>
-            <a:off x="838200" y="365125"/>
-            <a:ext cx="7734300" cy="5811838"/>
+            <a:off x="628650" y="365125"/>
+            <a:ext cx="5800725" cy="5811838"/>
           </a:xfrm>
         </p:spPr>
         <p:txBody>
@@ -582,7 +1019,7 @@
               <a:rPr lang="en-US" smtClean="0"/>
               <a:t>Fifth level</a:t>
             </a:r>
-            <a:endParaRPr lang="en-US"/>
+            <a:endParaRPr lang="en-US" dirty="0"/>
           </a:p>
         </p:txBody>
       </p:sp>
@@ -601,9 +1038,9 @@
           <a:bodyPr/>
           <a:lstStyle/>
           <a:p>
-            <a:fld id="{DCFF0279-4160-4FB5-A95A-9ABB0C14BC92}" type="datetimeFigureOut">
-              <a:rPr lang="en-US" smtClean="0"/>
-              <a:t>2016-08-16</a:t>
+            <a:fld id="{21259CBD-682A-4ABE-AFE9-CACFF55FE875}" type="datetime1">
+              <a:rPr lang="en-US" smtClean="0"/>
+              <a:t>2016-08-17</a:t>
             </a:fld>
             <a:endParaRPr lang="en-US"/>
           </a:p>
@@ -654,7 +1091,7 @@
     </p:spTree>
     <p:extLst>
       <p:ext uri="{BB962C8B-B14F-4D97-AF65-F5344CB8AC3E}">
-        <p14:creationId xmlns:p14="http://schemas.microsoft.com/office/powerpoint/2010/main" val="2582570845"/>
+        <p14:creationId xmlns:p14="http://schemas.microsoft.com/office/powerpoint/2010/main" val="1486904895"/>
       </p:ext>
     </p:extLst>
   </p:cSld>
@@ -700,7 +1137,7 @@
               <a:rPr lang="en-US" smtClean="0"/>
               <a:t>Click to edit Master title style</a:t>
             </a:r>
-            <a:endParaRPr lang="en-US"/>
+            <a:endParaRPr lang="en-US" dirty="0"/>
           </a:p>
         </p:txBody>
       </p:sp>
@@ -752,7 +1189,7 @@
               <a:rPr lang="en-US" smtClean="0"/>
               <a:t>Fifth level</a:t>
             </a:r>
-            <a:endParaRPr lang="en-US"/>
+            <a:endParaRPr lang="en-US" dirty="0"/>
           </a:p>
         </p:txBody>
       </p:sp>
@@ -771,9 +1208,9 @@
           <a:bodyPr/>
           <a:lstStyle/>
           <a:p>
-            <a:fld id="{DCFF0279-4160-4FB5-A95A-9ABB0C14BC92}" type="datetimeFigureOut">
-              <a:rPr lang="en-US" smtClean="0"/>
-              <a:t>2016-08-16</a:t>
+            <a:fld id="{5F76F78E-A200-421E-B0AA-A6018E81E55E}" type="datetime1">
+              <a:rPr lang="en-US" smtClean="0"/>
+              <a:t>2016-08-17</a:t>
             </a:fld>
             <a:endParaRPr lang="en-US"/>
           </a:p>
@@ -824,7 +1261,7 @@
     </p:spTree>
     <p:extLst>
       <p:ext uri="{BB962C8B-B14F-4D97-AF65-F5344CB8AC3E}">
-        <p14:creationId xmlns:p14="http://schemas.microsoft.com/office/powerpoint/2010/main" val="3560581079"/>
+        <p14:creationId xmlns:p14="http://schemas.microsoft.com/office/powerpoint/2010/main" val="38087392"/>
       </p:ext>
     </p:extLst>
   </p:cSld>
@@ -863,8 +1300,8 @@
         </p:nvSpPr>
         <p:spPr>
           <a:xfrm>
-            <a:off x="831850" y="1709738"/>
-            <a:ext cx="10515600" cy="2852737"/>
+            <a:off x="623888" y="1709739"/>
+            <a:ext cx="7886700" cy="2852737"/>
           </a:xfrm>
         </p:spPr>
         <p:txBody>
@@ -879,7 +1316,7 @@
               <a:rPr lang="en-US" smtClean="0"/>
               <a:t>Click to edit Master title style</a:t>
             </a:r>
-            <a:endParaRPr lang="en-US"/>
+            <a:endParaRPr lang="en-US" dirty="0"/>
           </a:p>
         </p:txBody>
       </p:sp>
@@ -895,8 +1332,8 @@
         </p:nvSpPr>
         <p:spPr>
           <a:xfrm>
-            <a:off x="831850" y="4589463"/>
-            <a:ext cx="10515600" cy="1500187"/>
+            <a:off x="623888" y="4589464"/>
+            <a:ext cx="7886700" cy="1500187"/>
           </a:xfrm>
         </p:spPr>
         <p:txBody>
@@ -906,9 +1343,7 @@
               <a:buNone/>
               <a:defRPr sz="2400">
                 <a:solidFill>
-                  <a:schemeClr val="tx1">
-                    <a:tint val="75000"/>
-                  </a:schemeClr>
+                  <a:schemeClr val="tx1"/>
                 </a:solidFill>
               </a:defRPr>
             </a:lvl1pPr>
@@ -1017,9 +1452,9 @@
           <a:bodyPr/>
           <a:lstStyle/>
           <a:p>
-            <a:fld id="{DCFF0279-4160-4FB5-A95A-9ABB0C14BC92}" type="datetimeFigureOut">
-              <a:rPr lang="en-US" smtClean="0"/>
-              <a:t>2016-08-16</a:t>
+            <a:fld id="{EBEC21EE-ED62-44E3-A586-FF0104F19B99}" type="datetime1">
+              <a:rPr lang="en-US" smtClean="0"/>
+              <a:t>2016-08-17</a:t>
             </a:fld>
             <a:endParaRPr lang="en-US"/>
           </a:p>
@@ -1070,7 +1505,7 @@
     </p:spTree>
     <p:extLst>
       <p:ext uri="{BB962C8B-B14F-4D97-AF65-F5344CB8AC3E}">
-        <p14:creationId xmlns:p14="http://schemas.microsoft.com/office/powerpoint/2010/main" val="2287880047"/>
+        <p14:creationId xmlns:p14="http://schemas.microsoft.com/office/powerpoint/2010/main" val="3297676262"/>
       </p:ext>
     </p:extLst>
   </p:cSld>
@@ -1116,7 +1551,7 @@
               <a:rPr lang="en-US" smtClean="0"/>
               <a:t>Click to edit Master title style</a:t>
             </a:r>
-            <a:endParaRPr lang="en-US"/>
+            <a:endParaRPr lang="en-US" dirty="0"/>
           </a:p>
         </p:txBody>
       </p:sp>
@@ -1132,8 +1567,8 @@
         </p:nvSpPr>
         <p:spPr>
           <a:xfrm>
-            <a:off x="838200" y="1825625"/>
-            <a:ext cx="5181600" cy="4351338"/>
+            <a:off x="628650" y="1825625"/>
+            <a:ext cx="3886200" cy="4351338"/>
           </a:xfrm>
         </p:spPr>
         <p:txBody>
@@ -1173,7 +1608,7 @@
               <a:rPr lang="en-US" smtClean="0"/>
               <a:t>Fifth level</a:t>
             </a:r>
-            <a:endParaRPr lang="en-US"/>
+            <a:endParaRPr lang="en-US" dirty="0"/>
           </a:p>
         </p:txBody>
       </p:sp>
@@ -1189,8 +1624,8 @@
         </p:nvSpPr>
         <p:spPr>
           <a:xfrm>
-            <a:off x="6172200" y="1825625"/>
-            <a:ext cx="5181600" cy="4351338"/>
+            <a:off x="4629150" y="1825625"/>
+            <a:ext cx="3886200" cy="4351338"/>
           </a:xfrm>
         </p:spPr>
         <p:txBody>
@@ -1230,7 +1665,7 @@
               <a:rPr lang="en-US" smtClean="0"/>
               <a:t>Fifth level</a:t>
             </a:r>
-            <a:endParaRPr lang="en-US"/>
+            <a:endParaRPr lang="en-US" dirty="0"/>
           </a:p>
         </p:txBody>
       </p:sp>
@@ -1249,9 +1684,9 @@
           <a:bodyPr/>
           <a:lstStyle/>
           <a:p>
-            <a:fld id="{DCFF0279-4160-4FB5-A95A-9ABB0C14BC92}" type="datetimeFigureOut">
-              <a:rPr lang="en-US" smtClean="0"/>
-              <a:t>2016-08-16</a:t>
+            <a:fld id="{30049BC0-4C66-4CED-BC8E-7AF0BD49C9B5}" type="datetime1">
+              <a:rPr lang="en-US" smtClean="0"/>
+              <a:t>2016-08-17</a:t>
             </a:fld>
             <a:endParaRPr lang="en-US"/>
           </a:p>
@@ -1302,7 +1737,7 @@
     </p:spTree>
     <p:extLst>
       <p:ext uri="{BB962C8B-B14F-4D97-AF65-F5344CB8AC3E}">
-        <p14:creationId xmlns:p14="http://schemas.microsoft.com/office/powerpoint/2010/main" val="1230935122"/>
+        <p14:creationId xmlns:p14="http://schemas.microsoft.com/office/powerpoint/2010/main" val="166112879"/>
       </p:ext>
     </p:extLst>
   </p:cSld>
@@ -1341,8 +1776,8 @@
         </p:nvSpPr>
         <p:spPr>
           <a:xfrm>
-            <a:off x="839788" y="365125"/>
-            <a:ext cx="10515600" cy="1325563"/>
+            <a:off x="629841" y="365126"/>
+            <a:ext cx="7886700" cy="1325563"/>
           </a:xfrm>
         </p:spPr>
         <p:txBody>
@@ -1353,7 +1788,7 @@
               <a:rPr lang="en-US" smtClean="0"/>
               <a:t>Click to edit Master title style</a:t>
             </a:r>
-            <a:endParaRPr lang="en-US"/>
+            <a:endParaRPr lang="en-US" dirty="0"/>
           </a:p>
         </p:txBody>
       </p:sp>
@@ -1369,8 +1804,8 @@
         </p:nvSpPr>
         <p:spPr>
           <a:xfrm>
-            <a:off x="839788" y="1681163"/>
-            <a:ext cx="5157787" cy="823912"/>
+            <a:off x="629842" y="1681163"/>
+            <a:ext cx="3868340" cy="823912"/>
           </a:xfrm>
         </p:spPr>
         <p:txBody>
@@ -1434,8 +1869,8 @@
         </p:nvSpPr>
         <p:spPr>
           <a:xfrm>
-            <a:off x="839788" y="2505075"/>
-            <a:ext cx="5157787" cy="3684588"/>
+            <a:off x="629842" y="2505075"/>
+            <a:ext cx="3868340" cy="3684588"/>
           </a:xfrm>
         </p:spPr>
         <p:txBody>
@@ -1475,7 +1910,7 @@
               <a:rPr lang="en-US" smtClean="0"/>
               <a:t>Fifth level</a:t>
             </a:r>
-            <a:endParaRPr lang="en-US"/>
+            <a:endParaRPr lang="en-US" dirty="0"/>
           </a:p>
         </p:txBody>
       </p:sp>
@@ -1491,8 +1926,8 @@
         </p:nvSpPr>
         <p:spPr>
           <a:xfrm>
-            <a:off x="6172200" y="1681163"/>
-            <a:ext cx="5183188" cy="823912"/>
+            <a:off x="4629150" y="1681163"/>
+            <a:ext cx="3887391" cy="823912"/>
           </a:xfrm>
         </p:spPr>
         <p:txBody>
@@ -1556,8 +1991,8 @@
         </p:nvSpPr>
         <p:spPr>
           <a:xfrm>
-            <a:off x="6172200" y="2505075"/>
-            <a:ext cx="5183188" cy="3684588"/>
+            <a:off x="4629150" y="2505075"/>
+            <a:ext cx="3887391" cy="3684588"/>
           </a:xfrm>
         </p:spPr>
         <p:txBody>
@@ -1597,7 +2032,7 @@
               <a:rPr lang="en-US" smtClean="0"/>
               <a:t>Fifth level</a:t>
             </a:r>
-            <a:endParaRPr lang="en-US"/>
+            <a:endParaRPr lang="en-US" dirty="0"/>
           </a:p>
         </p:txBody>
       </p:sp>
@@ -1616,9 +2051,9 @@
           <a:bodyPr/>
           <a:lstStyle/>
           <a:p>
-            <a:fld id="{DCFF0279-4160-4FB5-A95A-9ABB0C14BC92}" type="datetimeFigureOut">
-              <a:rPr lang="en-US" smtClean="0"/>
-              <a:t>2016-08-16</a:t>
+            <a:fld id="{C7C90E0A-53F1-4115-8AB2-2E28E481FF48}" type="datetime1">
+              <a:rPr lang="en-US" smtClean="0"/>
+              <a:t>2016-08-17</a:t>
             </a:fld>
             <a:endParaRPr lang="en-US"/>
           </a:p>
@@ -1669,7 +2104,7 @@
     </p:spTree>
     <p:extLst>
       <p:ext uri="{BB962C8B-B14F-4D97-AF65-F5344CB8AC3E}">
-        <p14:creationId xmlns:p14="http://schemas.microsoft.com/office/powerpoint/2010/main" val="2538870931"/>
+        <p14:creationId xmlns:p14="http://schemas.microsoft.com/office/powerpoint/2010/main" val="789262679"/>
       </p:ext>
     </p:extLst>
   </p:cSld>
@@ -1715,7 +2150,7 @@
               <a:rPr lang="en-US" smtClean="0"/>
               <a:t>Click to edit Master title style</a:t>
             </a:r>
-            <a:endParaRPr lang="en-US"/>
+            <a:endParaRPr lang="en-US" dirty="0"/>
           </a:p>
         </p:txBody>
       </p:sp>
@@ -1734,9 +2169,9 @@
           <a:bodyPr/>
           <a:lstStyle/>
           <a:p>
-            <a:fld id="{DCFF0279-4160-4FB5-A95A-9ABB0C14BC92}" type="datetimeFigureOut">
-              <a:rPr lang="en-US" smtClean="0"/>
-              <a:t>2016-08-16</a:t>
+            <a:fld id="{AF79CAB3-789B-4117-A859-FC7082686441}" type="datetime1">
+              <a:rPr lang="en-US" smtClean="0"/>
+              <a:t>2016-08-17</a:t>
             </a:fld>
             <a:endParaRPr lang="en-US"/>
           </a:p>
@@ -1787,7 +2222,7 @@
     </p:spTree>
     <p:extLst>
       <p:ext uri="{BB962C8B-B14F-4D97-AF65-F5344CB8AC3E}">
-        <p14:creationId xmlns:p14="http://schemas.microsoft.com/office/powerpoint/2010/main" val="3650305549"/>
+        <p14:creationId xmlns:p14="http://schemas.microsoft.com/office/powerpoint/2010/main" val="683845048"/>
       </p:ext>
     </p:extLst>
   </p:cSld>
@@ -1829,9 +2264,9 @@
           <a:bodyPr/>
           <a:lstStyle/>
           <a:p>
-            <a:fld id="{DCFF0279-4160-4FB5-A95A-9ABB0C14BC92}" type="datetimeFigureOut">
-              <a:rPr lang="en-US" smtClean="0"/>
-              <a:t>2016-08-16</a:t>
+            <a:fld id="{82AE2AC5-51ED-46C8-8F1B-788630EE802E}" type="datetime1">
+              <a:rPr lang="en-US" smtClean="0"/>
+              <a:t>2016-08-17</a:t>
             </a:fld>
             <a:endParaRPr lang="en-US"/>
           </a:p>
@@ -1882,7 +2317,7 @@
     </p:spTree>
     <p:extLst>
       <p:ext uri="{BB962C8B-B14F-4D97-AF65-F5344CB8AC3E}">
-        <p14:creationId xmlns:p14="http://schemas.microsoft.com/office/powerpoint/2010/main" val="412202556"/>
+        <p14:creationId xmlns:p14="http://schemas.microsoft.com/office/powerpoint/2010/main" val="3623592990"/>
       </p:ext>
     </p:extLst>
   </p:cSld>
@@ -1921,8 +2356,8 @@
         </p:nvSpPr>
         <p:spPr>
           <a:xfrm>
-            <a:off x="839788" y="457200"/>
-            <a:ext cx="3932237" cy="1600200"/>
+            <a:off x="629841" y="457200"/>
+            <a:ext cx="2949178" cy="1600200"/>
           </a:xfrm>
         </p:spPr>
         <p:txBody>
@@ -1937,7 +2372,7 @@
               <a:rPr lang="en-US" smtClean="0"/>
               <a:t>Click to edit Master title style</a:t>
             </a:r>
-            <a:endParaRPr lang="en-US"/>
+            <a:endParaRPr lang="en-US" dirty="0"/>
           </a:p>
         </p:txBody>
       </p:sp>
@@ -1953,8 +2388,8 @@
         </p:nvSpPr>
         <p:spPr>
           <a:xfrm>
-            <a:off x="5183188" y="987425"/>
-            <a:ext cx="6172200" cy="4873625"/>
+            <a:off x="3887391" y="987426"/>
+            <a:ext cx="4629150" cy="4873625"/>
           </a:xfrm>
         </p:spPr>
         <p:txBody>
@@ -2022,7 +2457,7 @@
               <a:rPr lang="en-US" smtClean="0"/>
               <a:t>Fifth level</a:t>
             </a:r>
-            <a:endParaRPr lang="en-US"/>
+            <a:endParaRPr lang="en-US" dirty="0"/>
           </a:p>
         </p:txBody>
       </p:sp>
@@ -2038,8 +2473,8 @@
         </p:nvSpPr>
         <p:spPr>
           <a:xfrm>
-            <a:off x="839788" y="2057400"/>
-            <a:ext cx="3932237" cy="3811588"/>
+            <a:off x="629841" y="2057400"/>
+            <a:ext cx="2949178" cy="3811588"/>
           </a:xfrm>
         </p:spPr>
         <p:txBody>
@@ -2106,9 +2541,9 @@
           <a:bodyPr/>
           <a:lstStyle/>
           <a:p>
-            <a:fld id="{DCFF0279-4160-4FB5-A95A-9ABB0C14BC92}" type="datetimeFigureOut">
-              <a:rPr lang="en-US" smtClean="0"/>
-              <a:t>2016-08-16</a:t>
+            <a:fld id="{49D0F6DD-6796-44CA-AF4C-1B2A2288F444}" type="datetime1">
+              <a:rPr lang="en-US" smtClean="0"/>
+              <a:t>2016-08-17</a:t>
             </a:fld>
             <a:endParaRPr lang="en-US"/>
           </a:p>
@@ -2159,7 +2594,7 @@
     </p:spTree>
     <p:extLst>
       <p:ext uri="{BB962C8B-B14F-4D97-AF65-F5344CB8AC3E}">
-        <p14:creationId xmlns:p14="http://schemas.microsoft.com/office/powerpoint/2010/main" val="171069144"/>
+        <p14:creationId xmlns:p14="http://schemas.microsoft.com/office/powerpoint/2010/main" val="1198392945"/>
       </p:ext>
     </p:extLst>
   </p:cSld>
@@ -2198,8 +2633,8 @@
         </p:nvSpPr>
         <p:spPr>
           <a:xfrm>
-            <a:off x="839788" y="457200"/>
-            <a:ext cx="3932237" cy="1600200"/>
+            <a:off x="629841" y="457200"/>
+            <a:ext cx="2949178" cy="1600200"/>
           </a:xfrm>
         </p:spPr>
         <p:txBody>
@@ -2214,7 +2649,7 @@
               <a:rPr lang="en-US" smtClean="0"/>
               <a:t>Click to edit Master title style</a:t>
             </a:r>
-            <a:endParaRPr lang="en-US"/>
+            <a:endParaRPr lang="en-US" dirty="0"/>
           </a:p>
         </p:txBody>
       </p:sp>
@@ -2222,7 +2657,7 @@
         <p:nvSpPr>
           <p:cNvPr id="3" name="Picture Placeholder 2"/>
           <p:cNvSpPr>
-            <a:spLocks noGrp="1"/>
+            <a:spLocks noGrp="1" noChangeAspect="1"/>
           </p:cNvSpPr>
           <p:nvPr>
             <p:ph type="pic" idx="1"/>
@@ -2230,12 +2665,12 @@
         </p:nvSpPr>
         <p:spPr>
           <a:xfrm>
-            <a:off x="5183188" y="987425"/>
-            <a:ext cx="6172200" cy="4873625"/>
+            <a:off x="3887391" y="987426"/>
+            <a:ext cx="4629150" cy="4873625"/>
           </a:xfrm>
         </p:spPr>
         <p:txBody>
-          <a:bodyPr/>
+          <a:bodyPr anchor="t"/>
           <a:lstStyle>
             <a:lvl1pPr marL="0" indent="0">
               <a:buNone/>
@@ -2275,7 +2710,11 @@
             </a:lvl9pPr>
           </a:lstStyle>
           <a:p>
-            <a:endParaRPr lang="en-US"/>
+            <a:r>
+              <a:rPr lang="en-US" smtClean="0"/>
+              <a:t>Click icon to add picture</a:t>
+            </a:r>
+            <a:endParaRPr lang="en-US" dirty="0"/>
           </a:p>
         </p:txBody>
       </p:sp>
@@ -2291,8 +2730,8 @@
         </p:nvSpPr>
         <p:spPr>
           <a:xfrm>
-            <a:off x="839788" y="2057400"/>
-            <a:ext cx="3932237" cy="3811588"/>
+            <a:off x="629841" y="2057400"/>
+            <a:ext cx="2949178" cy="3811588"/>
           </a:xfrm>
         </p:spPr>
         <p:txBody>
@@ -2359,9 +2798,9 @@
           <a:bodyPr/>
           <a:lstStyle/>
           <a:p>
-            <a:fld id="{DCFF0279-4160-4FB5-A95A-9ABB0C14BC92}" type="datetimeFigureOut">
-              <a:rPr lang="en-US" smtClean="0"/>
-              <a:t>2016-08-16</a:t>
+            <a:fld id="{57F6808E-F05D-421A-97B7-12B728993E3B}" type="datetime1">
+              <a:rPr lang="en-US" smtClean="0"/>
+              <a:t>2016-08-17</a:t>
             </a:fld>
             <a:endParaRPr lang="en-US"/>
           </a:p>
@@ -2412,7 +2851,7 @@
     </p:spTree>
     <p:extLst>
       <p:ext uri="{BB962C8B-B14F-4D97-AF65-F5344CB8AC3E}">
-        <p14:creationId xmlns:p14="http://schemas.microsoft.com/office/powerpoint/2010/main" val="1369081277"/>
+        <p14:creationId xmlns:p14="http://schemas.microsoft.com/office/powerpoint/2010/main" val="3679361841"/>
       </p:ext>
     </p:extLst>
   </p:cSld>
@@ -2456,8 +2895,8 @@
         </p:nvSpPr>
         <p:spPr>
           <a:xfrm>
-            <a:off x="838200" y="365125"/>
-            <a:ext cx="10515600" cy="1325563"/>
+            <a:off x="628650" y="365126"/>
+            <a:ext cx="7886700" cy="1325563"/>
           </a:xfrm>
           <a:prstGeom prst="rect">
             <a:avLst/>
@@ -2473,7 +2912,7 @@
               <a:rPr lang="en-US" smtClean="0"/>
               <a:t>Click to edit Master title style</a:t>
             </a:r>
-            <a:endParaRPr lang="en-US"/>
+            <a:endParaRPr lang="en-US" dirty="0"/>
           </a:p>
         </p:txBody>
       </p:sp>
@@ -2489,8 +2928,8 @@
         </p:nvSpPr>
         <p:spPr>
           <a:xfrm>
-            <a:off x="838200" y="1825625"/>
-            <a:ext cx="10515600" cy="4351338"/>
+            <a:off x="628650" y="1825625"/>
+            <a:ext cx="7886700" cy="4351338"/>
           </a:xfrm>
           <a:prstGeom prst="rect">
             <a:avLst/>
@@ -2535,7 +2974,7 @@
               <a:rPr lang="en-US" smtClean="0"/>
               <a:t>Fifth level</a:t>
             </a:r>
-            <a:endParaRPr lang="en-US"/>
+            <a:endParaRPr lang="en-US" dirty="0"/>
           </a:p>
         </p:txBody>
       </p:sp>
@@ -2551,8 +2990,8 @@
         </p:nvSpPr>
         <p:spPr>
           <a:xfrm>
-            <a:off x="838200" y="6356350"/>
-            <a:ext cx="2743200" cy="365125"/>
+            <a:off x="628650" y="6356351"/>
+            <a:ext cx="2057400" cy="365125"/>
           </a:xfrm>
           <a:prstGeom prst="rect">
             <a:avLst/>
@@ -2572,9 +3011,9 @@
             </a:lvl1pPr>
           </a:lstStyle>
           <a:p>
-            <a:fld id="{DCFF0279-4160-4FB5-A95A-9ABB0C14BC92}" type="datetimeFigureOut">
-              <a:rPr lang="en-US" smtClean="0"/>
-              <a:t>2016-08-16</a:t>
+            <a:fld id="{7B995810-2FB7-4DE8-B622-97729F9C53CB}" type="datetime1">
+              <a:rPr lang="en-US" smtClean="0"/>
+              <a:t>2016-08-17</a:t>
             </a:fld>
             <a:endParaRPr lang="en-US"/>
           </a:p>
@@ -2592,8 +3031,8 @@
         </p:nvSpPr>
         <p:spPr>
           <a:xfrm>
-            <a:off x="4038600" y="6356350"/>
-            <a:ext cx="4114800" cy="365125"/>
+            <a:off x="3028950" y="6356351"/>
+            <a:ext cx="3086100" cy="365125"/>
           </a:xfrm>
           <a:prstGeom prst="rect">
             <a:avLst/>
@@ -2629,8 +3068,8 @@
         </p:nvSpPr>
         <p:spPr>
           <a:xfrm>
-            <a:off x="8610600" y="6356350"/>
-            <a:ext cx="2743200" cy="365125"/>
+            <a:off x="6457950" y="6356351"/>
+            <a:ext cx="2057400" cy="365125"/>
           </a:xfrm>
           <a:prstGeom prst="rect">
             <a:avLst/>
@@ -2661,24 +3100,25 @@
     </p:spTree>
     <p:extLst>
       <p:ext uri="{BB962C8B-B14F-4D97-AF65-F5344CB8AC3E}">
-        <p14:creationId xmlns:p14="http://schemas.microsoft.com/office/powerpoint/2010/main" val="1550337656"/>
+        <p14:creationId xmlns:p14="http://schemas.microsoft.com/office/powerpoint/2010/main" val="56201780"/>
       </p:ext>
     </p:extLst>
   </p:cSld>
   <p:clrMap bg1="lt1" tx1="dk1" bg2="lt2" tx2="dk2" accent1="accent1" accent2="accent2" accent3="accent3" accent4="accent4" accent5="accent5" accent6="accent6" hlink="hlink" folHlink="folHlink"/>
   <p:sldLayoutIdLst>
-    <p:sldLayoutId id="2147483649" r:id="rId1"/>
-    <p:sldLayoutId id="2147483650" r:id="rId2"/>
-    <p:sldLayoutId id="2147483651" r:id="rId3"/>
-    <p:sldLayoutId id="2147483652" r:id="rId4"/>
-    <p:sldLayoutId id="2147483653" r:id="rId5"/>
-    <p:sldLayoutId id="2147483654" r:id="rId6"/>
-    <p:sldLayoutId id="2147483655" r:id="rId7"/>
-    <p:sldLayoutId id="2147483656" r:id="rId8"/>
-    <p:sldLayoutId id="2147483657" r:id="rId9"/>
-    <p:sldLayoutId id="2147483658" r:id="rId10"/>
-    <p:sldLayoutId id="2147483659" r:id="rId11"/>
+    <p:sldLayoutId id="2147483661" r:id="rId1"/>
+    <p:sldLayoutId id="2147483662" r:id="rId2"/>
+    <p:sldLayoutId id="2147483663" r:id="rId3"/>
+    <p:sldLayoutId id="2147483664" r:id="rId4"/>
+    <p:sldLayoutId id="2147483665" r:id="rId5"/>
+    <p:sldLayoutId id="2147483666" r:id="rId6"/>
+    <p:sldLayoutId id="2147483667" r:id="rId7"/>
+    <p:sldLayoutId id="2147483668" r:id="rId8"/>
+    <p:sldLayoutId id="2147483669" r:id="rId9"/>
+    <p:sldLayoutId id="2147483670" r:id="rId10"/>
+    <p:sldLayoutId id="2147483671" r:id="rId11"/>
   </p:sldLayoutIdLst>
+  <p:hf hdr="0" ftr="0" dt="0"/>
   <p:txStyles>
     <p:titleStyle>
       <a:lvl1pPr algn="l" defTabSz="914400" rtl="0" eaLnBrk="1" latinLnBrk="0" hangingPunct="1">
@@ -3014,8 +3454,8 @@
         </p:nvSpPr>
         <p:spPr>
           <a:xfrm>
-            <a:off x="2895600" y="3886200"/>
-            <a:ext cx="6400800" cy="1415008"/>
+            <a:off x="2171700" y="3771900"/>
+            <a:ext cx="4800600" cy="1061256"/>
           </a:xfrm>
         </p:spPr>
         <p:txBody>
@@ -3079,8 +3519,8 @@
         </p:nvSpPr>
         <p:spPr>
           <a:xfrm>
-            <a:off x="3299205" y="5445225"/>
-            <a:ext cx="6869573" cy="646331"/>
+            <a:off x="2474405" y="4941171"/>
+            <a:ext cx="5196166" cy="507831"/>
           </a:xfrm>
           <a:prstGeom prst="rect">
             <a:avLst/>
@@ -3094,24 +3534,24 @@
           <a:lstStyle/>
           <a:p>
             <a:r>
-              <a:rPr lang="en-US" b="1" dirty="0"/>
+              <a:rPr lang="en-US" sz="1350" b="1" dirty="0"/>
               <a:t>License</a:t>
             </a:r>
             <a:r>
-              <a:rPr lang="en-US" dirty="0"/>
+              <a:rPr lang="en-US" sz="1350" dirty="0"/>
               <a:t>: this presentation is released under the Creative Commons, see</a:t>
             </a:r>
             <a:br>
-              <a:rPr lang="en-US" dirty="0"/>
+              <a:rPr lang="en-US" sz="1350" dirty="0"/>
             </a:br>
             <a:r>
-              <a:rPr lang="nl-BE" dirty="0">
+              <a:rPr lang="nl-BE" sz="1350" dirty="0">
                 <a:hlinkClick r:id="rId3"/>
               </a:rPr>
               <a:t>http://creativecommons.org/publicdomain/zero/1.0/</a:t>
             </a:r>
             <a:r>
-              <a:rPr lang="nl-BE" dirty="0"/>
+              <a:rPr lang="nl-BE" sz="1350" dirty="0"/>
               <a:t> </a:t>
             </a:r>
           </a:p>
@@ -3189,13 +3629,13 @@
         </p:nvSpPr>
         <p:spPr>
           <a:xfrm>
-            <a:off x="838200" y="1825625"/>
-            <a:ext cx="10515600" cy="4351338"/>
+            <a:off x="628650" y="2226469"/>
+            <a:ext cx="7886700" cy="3769086"/>
           </a:xfrm>
         </p:spPr>
         <p:txBody>
           <a:bodyPr>
-            <a:normAutofit fontScale="92500" lnSpcReduction="20000"/>
+            <a:normAutofit fontScale="85000" lnSpcReduction="20000"/>
           </a:bodyPr>
           <a:lstStyle/>
           <a:p>
@@ -3229,21 +3669,22 @@
             <a:pPr lvl="1"/>
             <a:r>
               <a:rPr lang="en-US" dirty="0" smtClean="0"/>
-              <a:t>insert/update: O(1)</a:t>
-            </a:r>
-          </a:p>
-          <a:p>
-            <a:pPr lvl="1"/>
-            <a:r>
-              <a:rPr lang="en-US" dirty="0" smtClean="0"/>
-              <a:t>retrieval: O(1)</a:t>
-            </a:r>
-          </a:p>
-          <a:p>
-            <a:pPr lvl="1"/>
-            <a:r>
-              <a:rPr lang="en-US" dirty="0" smtClean="0"/>
-              <a:t>search: O(1)</a:t>
+              <a:t>insert/remove: </a:t>
+            </a:r>
+            <a:r>
+              <a:rPr lang="en-US" dirty="0" smtClean="0"/>
+              <a:t>O(1)</a:t>
+            </a:r>
+          </a:p>
+          <a:p>
+            <a:pPr lvl="1"/>
+            <a:r>
+              <a:rPr lang="en-US" dirty="0" smtClean="0"/>
+              <a:t>search</a:t>
+            </a:r>
+            <a:r>
+              <a:rPr lang="en-US" dirty="0" smtClean="0"/>
+              <a:t>: O(1)</a:t>
             </a:r>
           </a:p>
           <a:p>
@@ -3290,6 +3731,139 @@
           <a:p>
             <a:pPr lvl="1"/>
             <a:endParaRPr lang="en-US" dirty="0"/>
+          </a:p>
+        </p:txBody>
+      </p:sp>
+      <p:grpSp>
+        <p:nvGrpSpPr>
+          <p:cNvPr id="4" name="Group 3"/>
+          <p:cNvGrpSpPr/>
+          <p:nvPr/>
+        </p:nvGrpSpPr>
+        <p:grpSpPr>
+          <a:xfrm>
+            <a:off x="6112450" y="3306588"/>
+            <a:ext cx="1196688" cy="775853"/>
+            <a:chOff x="6307280" y="2566553"/>
+            <a:chExt cx="1595584" cy="1034471"/>
+          </a:xfrm>
+        </p:grpSpPr>
+        <p:graphicFrame>
+          <p:nvGraphicFramePr>
+            <p:cNvPr id="5" name="Object 4"/>
+            <p:cNvGraphicFramePr>
+              <a:graphicFrameLocks noChangeAspect="1"/>
+            </p:cNvGraphicFramePr>
+            <p:nvPr>
+              <p:extLst>
+                <p:ext uri="{D42A27DB-BD31-4B8C-83A1-F6EECF244321}">
+                  <p14:modId xmlns:p14="http://schemas.microsoft.com/office/powerpoint/2010/main" val="4128557531"/>
+                </p:ext>
+              </p:extLst>
+            </p:nvPr>
+          </p:nvGraphicFramePr>
+          <p:xfrm>
+            <a:off x="6905914" y="3145412"/>
+            <a:ext cx="996950" cy="455612"/>
+          </p:xfrm>
+          <a:graphic>
+            <a:graphicData uri="http://schemas.openxmlformats.org/presentationml/2006/ole">
+              <mc:AlternateContent xmlns:mc="http://schemas.openxmlformats.org/markup-compatibility/2006">
+                <mc:Choice xmlns:v="urn:schemas-microsoft-com:vml" Requires="v">
+                  <p:oleObj spid="_x0000_s5125" name="Equation" r:id="rId3" imgW="444240" imgH="203040" progId="Equation.3">
+                    <p:embed/>
+                  </p:oleObj>
+                </mc:Choice>
+                <mc:Fallback>
+                  <p:oleObj name="Equation" r:id="rId3" imgW="444240" imgH="203040" progId="Equation.3">
+                    <p:embed/>
+                    <p:pic>
+                      <p:nvPicPr>
+                        <p:cNvPr id="0" name=""/>
+                        <p:cNvPicPr/>
+                        <p:nvPr/>
+                      </p:nvPicPr>
+                      <p:blipFill>
+                        <a:blip r:embed="rId4"/>
+                        <a:stretch>
+                          <a:fillRect/>
+                        </a:stretch>
+                      </p:blipFill>
+                      <p:spPr>
+                        <a:xfrm>
+                          <a:off x="6905914" y="3145412"/>
+                          <a:ext cx="996950" cy="455612"/>
+                        </a:xfrm>
+                        <a:prstGeom prst="rect">
+                          <a:avLst/>
+                        </a:prstGeom>
+                      </p:spPr>
+                    </p:pic>
+                  </p:oleObj>
+                </mc:Fallback>
+              </mc:AlternateContent>
+            </a:graphicData>
+          </a:graphic>
+        </p:graphicFrame>
+        <p:sp>
+          <p:nvSpPr>
+            <p:cNvPr id="6" name="TextBox 5"/>
+            <p:cNvSpPr txBox="1"/>
+            <p:nvPr/>
+          </p:nvSpPr>
+          <p:spPr>
+            <a:xfrm>
+              <a:off x="6307280" y="2566553"/>
+              <a:ext cx="904692" cy="553998"/>
+            </a:xfrm>
+            <a:prstGeom prst="rect">
+              <a:avLst/>
+            </a:prstGeom>
+            <a:noFill/>
+          </p:spPr>
+          <p:txBody>
+            <a:bodyPr wrap="none" rtlCol="0">
+              <a:spAutoFit/>
+            </a:bodyPr>
+            <a:lstStyle/>
+            <a:p>
+              <a:r>
+                <a:rPr lang="en-US" sz="2100" dirty="0"/>
+                <a:t>set </a:t>
+              </a:r>
+              <a:r>
+                <a:rPr lang="en-US" sz="2100" i="1" dirty="0">
+                  <a:latin typeface="Palatino Linotype" panose="02040502050505030304" pitchFamily="18" charset="0"/>
+                </a:rPr>
+                <a:t>s</a:t>
+              </a:r>
+              <a:endParaRPr lang="en-US" sz="2100" i="1" dirty="0">
+                <a:latin typeface="Palatino Linotype" panose="02040502050505030304" pitchFamily="18" charset="0"/>
+              </a:endParaRPr>
+            </a:p>
+          </p:txBody>
+        </p:sp>
+      </p:grpSp>
+      <p:sp>
+        <p:nvSpPr>
+          <p:cNvPr id="7" name="Slide Number Placeholder 6"/>
+          <p:cNvSpPr>
+            <a:spLocks noGrp="1"/>
+          </p:cNvSpPr>
+          <p:nvPr>
+            <p:ph type="sldNum" sz="quarter" idx="12"/>
+          </p:nvPr>
+        </p:nvSpPr>
+        <p:spPr/>
+        <p:txBody>
+          <a:bodyPr/>
+          <a:lstStyle/>
+          <a:p>
+            <a:fld id="{11AD1F4E-1E51-402E-B221-310F004E7D3B}" type="slidenum">
+              <a:rPr lang="en-US" smtClean="0"/>
+              <a:t>10</a:t>
+            </a:fld>
+            <a:endParaRPr lang="en-US"/>
           </a:p>
         </p:txBody>
       </p:sp>
@@ -3365,13 +3939,13 @@
         </p:nvSpPr>
         <p:spPr>
           <a:xfrm>
-            <a:off x="838200" y="1825625"/>
-            <a:ext cx="10515600" cy="4351338"/>
+            <a:off x="628650" y="2226469"/>
+            <a:ext cx="7886700" cy="3883386"/>
           </a:xfrm>
         </p:spPr>
         <p:txBody>
           <a:bodyPr>
-            <a:normAutofit fontScale="92500" lnSpcReduction="20000"/>
+            <a:normAutofit fontScale="85000" lnSpcReduction="20000"/>
           </a:bodyPr>
           <a:lstStyle/>
           <a:p>
@@ -3465,6 +4039,757 @@
           </a:p>
           <a:p>
             <a:pPr lvl="1"/>
+            <a:endParaRPr lang="en-US" dirty="0"/>
+          </a:p>
+        </p:txBody>
+      </p:sp>
+      <p:grpSp>
+        <p:nvGrpSpPr>
+          <p:cNvPr id="4" name="Group 3"/>
+          <p:cNvGrpSpPr/>
+          <p:nvPr/>
+        </p:nvGrpSpPr>
+        <p:grpSpPr>
+          <a:xfrm>
+            <a:off x="5342226" y="3241913"/>
+            <a:ext cx="1670126" cy="786569"/>
+            <a:chOff x="6307280" y="2566553"/>
+            <a:chExt cx="2226834" cy="1048759"/>
+          </a:xfrm>
+        </p:grpSpPr>
+        <p:graphicFrame>
+          <p:nvGraphicFramePr>
+            <p:cNvPr id="5" name="Object 4"/>
+            <p:cNvGraphicFramePr>
+              <a:graphicFrameLocks noChangeAspect="1"/>
+            </p:cNvGraphicFramePr>
+            <p:nvPr>
+              <p:extLst>
+                <p:ext uri="{D42A27DB-BD31-4B8C-83A1-F6EECF244321}">
+                  <p14:modId xmlns:p14="http://schemas.microsoft.com/office/powerpoint/2010/main" val="3284848109"/>
+                </p:ext>
+              </p:extLst>
+            </p:nvPr>
+          </p:nvGraphicFramePr>
+          <p:xfrm>
+            <a:off x="6795802" y="3131124"/>
+            <a:ext cx="1738312" cy="484188"/>
+          </p:xfrm>
+          <a:graphic>
+            <a:graphicData uri="http://schemas.openxmlformats.org/presentationml/2006/ole">
+              <mc:AlternateContent xmlns:mc="http://schemas.openxmlformats.org/markup-compatibility/2006">
+                <mc:Choice xmlns:v="urn:schemas-microsoft-com:vml" Requires="v">
+                  <p:oleObj spid="_x0000_s6153" name="Equation" r:id="rId3" imgW="774360" imgH="215640" progId="Equation.3">
+                    <p:embed/>
+                  </p:oleObj>
+                </mc:Choice>
+                <mc:Fallback>
+                  <p:oleObj name="Equation" r:id="rId3" imgW="774360" imgH="215640" progId="Equation.3">
+                    <p:embed/>
+                    <p:pic>
+                      <p:nvPicPr>
+                        <p:cNvPr id="0" name=""/>
+                        <p:cNvPicPr/>
+                        <p:nvPr/>
+                      </p:nvPicPr>
+                      <p:blipFill>
+                        <a:blip r:embed="rId4"/>
+                        <a:stretch>
+                          <a:fillRect/>
+                        </a:stretch>
+                      </p:blipFill>
+                      <p:spPr>
+                        <a:xfrm>
+                          <a:off x="6795802" y="3131124"/>
+                          <a:ext cx="1738312" cy="484188"/>
+                        </a:xfrm>
+                        <a:prstGeom prst="rect">
+                          <a:avLst/>
+                        </a:prstGeom>
+                      </p:spPr>
+                    </p:pic>
+                  </p:oleObj>
+                </mc:Fallback>
+              </mc:AlternateContent>
+            </a:graphicData>
+          </a:graphic>
+        </p:graphicFrame>
+        <p:sp>
+          <p:nvSpPr>
+            <p:cNvPr id="6" name="TextBox 5"/>
+            <p:cNvSpPr txBox="1"/>
+            <p:nvPr/>
+          </p:nvSpPr>
+          <p:spPr>
+            <a:xfrm>
+              <a:off x="6307280" y="2566553"/>
+              <a:ext cx="1972847" cy="553998"/>
+            </a:xfrm>
+            <a:prstGeom prst="rect">
+              <a:avLst/>
+            </a:prstGeom>
+            <a:noFill/>
+          </p:spPr>
+          <p:txBody>
+            <a:bodyPr wrap="none" rtlCol="0">
+              <a:spAutoFit/>
+            </a:bodyPr>
+            <a:lstStyle/>
+            <a:p>
+              <a:r>
+                <a:rPr lang="en-US" sz="2100" dirty="0"/>
+                <a:t>dictionary </a:t>
+              </a:r>
+              <a:r>
+                <a:rPr lang="en-US" sz="2100" i="1" dirty="0">
+                  <a:latin typeface="Palatino Linotype" panose="02040502050505030304" pitchFamily="18" charset="0"/>
+                </a:rPr>
+                <a:t>d</a:t>
+              </a:r>
+              <a:endParaRPr lang="en-US" sz="2100" i="1" dirty="0">
+                <a:latin typeface="Palatino Linotype" panose="02040502050505030304" pitchFamily="18" charset="0"/>
+              </a:endParaRPr>
+            </a:p>
+          </p:txBody>
+        </p:sp>
+      </p:grpSp>
+      <p:sp>
+        <p:nvSpPr>
+          <p:cNvPr id="11" name="Slide Number Placeholder 10"/>
+          <p:cNvSpPr>
+            <a:spLocks noGrp="1"/>
+          </p:cNvSpPr>
+          <p:nvPr>
+            <p:ph type="sldNum" sz="quarter" idx="12"/>
+          </p:nvPr>
+        </p:nvSpPr>
+        <p:spPr/>
+        <p:txBody>
+          <a:bodyPr/>
+          <a:lstStyle/>
+          <a:p>
+            <a:fld id="{11AD1F4E-1E51-402E-B221-310F004E7D3B}" type="slidenum">
+              <a:rPr lang="en-US" smtClean="0"/>
+              <a:t>11</a:t>
+            </a:fld>
+            <a:endParaRPr lang="en-US"/>
+          </a:p>
+        </p:txBody>
+      </p:sp>
+      <p:grpSp>
+        <p:nvGrpSpPr>
+          <p:cNvPr id="51" name="Group 50"/>
+          <p:cNvGrpSpPr/>
+          <p:nvPr/>
+        </p:nvGrpSpPr>
+        <p:grpSpPr>
+          <a:xfrm>
+            <a:off x="4739124" y="4830888"/>
+            <a:ext cx="3888687" cy="1715385"/>
+            <a:chOff x="4739124" y="4830888"/>
+            <a:chExt cx="3888687" cy="1715385"/>
+          </a:xfrm>
+        </p:grpSpPr>
+        <p:sp>
+          <p:nvSpPr>
+            <p:cNvPr id="7" name="Oval 6"/>
+            <p:cNvSpPr/>
+            <p:nvPr/>
+          </p:nvSpPr>
+          <p:spPr>
+            <a:xfrm>
+              <a:off x="5268191" y="5258955"/>
+              <a:ext cx="892756" cy="1287318"/>
+            </a:xfrm>
+            <a:prstGeom prst="ellipse">
+              <a:avLst/>
+            </a:prstGeom>
+            <a:noFill/>
+            <a:ln>
+              <a:solidFill>
+                <a:schemeClr val="tx1"/>
+              </a:solidFill>
+            </a:ln>
+          </p:spPr>
+          <p:style>
+            <a:lnRef idx="2">
+              <a:schemeClr val="accent1">
+                <a:shade val="50000"/>
+              </a:schemeClr>
+            </a:lnRef>
+            <a:fillRef idx="1">
+              <a:schemeClr val="accent1"/>
+            </a:fillRef>
+            <a:effectRef idx="0">
+              <a:schemeClr val="accent1"/>
+            </a:effectRef>
+            <a:fontRef idx="minor">
+              <a:schemeClr val="lt1"/>
+            </a:fontRef>
+          </p:style>
+          <p:txBody>
+            <a:bodyPr rot="0" spcFirstLastPara="0" vertOverflow="overflow" horzOverflow="overflow" vert="horz" wrap="square" lIns="68580" tIns="34290" rIns="68580" bIns="34290" numCol="1" spcCol="0" rtlCol="0" fromWordArt="0" anchor="ctr" anchorCtr="0" forceAA="0" compatLnSpc="1">
+              <a:prstTxWarp prst="textNoShape">
+                <a:avLst/>
+              </a:prstTxWarp>
+              <a:noAutofit/>
+            </a:bodyPr>
+            <a:lstStyle/>
+            <a:p>
+              <a:pPr algn="ctr"/>
+              <a:endParaRPr lang="en-US" sz="1350"/>
+            </a:p>
+          </p:txBody>
+        </p:sp>
+        <p:sp>
+          <p:nvSpPr>
+            <p:cNvPr id="8" name="Oval 7"/>
+            <p:cNvSpPr/>
+            <p:nvPr/>
+          </p:nvSpPr>
+          <p:spPr>
+            <a:xfrm>
+              <a:off x="6911473" y="5258955"/>
+              <a:ext cx="944053" cy="1287318"/>
+            </a:xfrm>
+            <a:prstGeom prst="ellipse">
+              <a:avLst/>
+            </a:prstGeom>
+            <a:noFill/>
+            <a:ln>
+              <a:solidFill>
+                <a:schemeClr val="tx1"/>
+              </a:solidFill>
+            </a:ln>
+          </p:spPr>
+          <p:style>
+            <a:lnRef idx="2">
+              <a:schemeClr val="accent1">
+                <a:shade val="50000"/>
+              </a:schemeClr>
+            </a:lnRef>
+            <a:fillRef idx="1">
+              <a:schemeClr val="accent1"/>
+            </a:fillRef>
+            <a:effectRef idx="0">
+              <a:schemeClr val="accent1"/>
+            </a:effectRef>
+            <a:fontRef idx="minor">
+              <a:schemeClr val="lt1"/>
+            </a:fontRef>
+          </p:style>
+          <p:txBody>
+            <a:bodyPr rot="0" spcFirstLastPara="0" vertOverflow="overflow" horzOverflow="overflow" vert="horz" wrap="square" lIns="68580" tIns="34290" rIns="68580" bIns="34290" numCol="1" spcCol="0" rtlCol="0" fromWordArt="0" anchor="ctr" anchorCtr="0" forceAA="0" compatLnSpc="1">
+              <a:prstTxWarp prst="textNoShape">
+                <a:avLst/>
+              </a:prstTxWarp>
+              <a:noAutofit/>
+            </a:bodyPr>
+            <a:lstStyle/>
+            <a:p>
+              <a:pPr algn="ctr"/>
+              <a:endParaRPr lang="en-US" sz="1350" dirty="0"/>
+            </a:p>
+          </p:txBody>
+        </p:sp>
+        <p:graphicFrame>
+          <p:nvGraphicFramePr>
+            <p:cNvPr id="9" name="Object 8"/>
+            <p:cNvGraphicFramePr>
+              <a:graphicFrameLocks noChangeAspect="1"/>
+            </p:cNvGraphicFramePr>
+            <p:nvPr>
+              <p:extLst>
+                <p:ext uri="{D42A27DB-BD31-4B8C-83A1-F6EECF244321}">
+                  <p14:modId xmlns:p14="http://schemas.microsoft.com/office/powerpoint/2010/main" val="3590691347"/>
+                </p:ext>
+              </p:extLst>
+            </p:nvPr>
+          </p:nvGraphicFramePr>
+          <p:xfrm>
+            <a:off x="4739124" y="4830888"/>
+            <a:ext cx="1047750" cy="363141"/>
+          </p:xfrm>
+          <a:graphic>
+            <a:graphicData uri="http://schemas.openxmlformats.org/presentationml/2006/ole">
+              <mc:AlternateContent xmlns:mc="http://schemas.openxmlformats.org/markup-compatibility/2006">
+                <mc:Choice xmlns:v="urn:schemas-microsoft-com:vml" Requires="v">
+                  <p:oleObj spid="_x0000_s6154" name="Equation" r:id="rId5" imgW="622080" imgH="215640" progId="Equation.3">
+                    <p:embed/>
+                  </p:oleObj>
+                </mc:Choice>
+                <mc:Fallback>
+                  <p:oleObj name="Equation" r:id="rId5" imgW="622080" imgH="215640" progId="Equation.3">
+                    <p:embed/>
+                    <p:pic>
+                      <p:nvPicPr>
+                        <p:cNvPr id="0" name=""/>
+                        <p:cNvPicPr/>
+                        <p:nvPr/>
+                      </p:nvPicPr>
+                      <p:blipFill>
+                        <a:blip r:embed="rId6"/>
+                        <a:stretch>
+                          <a:fillRect/>
+                        </a:stretch>
+                      </p:blipFill>
+                      <p:spPr>
+                        <a:xfrm>
+                          <a:off x="4739124" y="4830888"/>
+                          <a:ext cx="1047750" cy="363141"/>
+                        </a:xfrm>
+                        <a:prstGeom prst="rect">
+                          <a:avLst/>
+                        </a:prstGeom>
+                      </p:spPr>
+                    </p:pic>
+                  </p:oleObj>
+                </mc:Fallback>
+              </mc:AlternateContent>
+            </a:graphicData>
+          </a:graphic>
+        </p:graphicFrame>
+        <p:graphicFrame>
+          <p:nvGraphicFramePr>
+            <p:cNvPr id="10" name="Object 9"/>
+            <p:cNvGraphicFramePr>
+              <a:graphicFrameLocks noChangeAspect="1"/>
+            </p:cNvGraphicFramePr>
+            <p:nvPr>
+              <p:extLst>
+                <p:ext uri="{D42A27DB-BD31-4B8C-83A1-F6EECF244321}">
+                  <p14:modId xmlns:p14="http://schemas.microsoft.com/office/powerpoint/2010/main" val="2800428492"/>
+                </p:ext>
+              </p:extLst>
+            </p:nvPr>
+          </p:nvGraphicFramePr>
+          <p:xfrm>
+            <a:off x="7365748" y="4830889"/>
+            <a:ext cx="1262063" cy="363140"/>
+          </p:xfrm>
+          <a:graphic>
+            <a:graphicData uri="http://schemas.openxmlformats.org/presentationml/2006/ole">
+              <mc:AlternateContent xmlns:mc="http://schemas.openxmlformats.org/markup-compatibility/2006">
+                <mc:Choice xmlns:v="urn:schemas-microsoft-com:vml" Requires="v">
+                  <p:oleObj spid="_x0000_s6155" name="Equation" r:id="rId7" imgW="749160" imgH="215640" progId="Equation.3">
+                    <p:embed/>
+                  </p:oleObj>
+                </mc:Choice>
+                <mc:Fallback>
+                  <p:oleObj name="Equation" r:id="rId7" imgW="749160" imgH="215640" progId="Equation.3">
+                    <p:embed/>
+                    <p:pic>
+                      <p:nvPicPr>
+                        <p:cNvPr id="0" name=""/>
+                        <p:cNvPicPr/>
+                        <p:nvPr/>
+                      </p:nvPicPr>
+                      <p:blipFill>
+                        <a:blip r:embed="rId8"/>
+                        <a:stretch>
+                          <a:fillRect/>
+                        </a:stretch>
+                      </p:blipFill>
+                      <p:spPr>
+                        <a:xfrm>
+                          <a:off x="7365748" y="4830889"/>
+                          <a:ext cx="1262063" cy="363140"/>
+                        </a:xfrm>
+                        <a:prstGeom prst="rect">
+                          <a:avLst/>
+                        </a:prstGeom>
+                      </p:spPr>
+                    </p:pic>
+                  </p:oleObj>
+                </mc:Fallback>
+              </mc:AlternateContent>
+            </a:graphicData>
+          </a:graphic>
+        </p:graphicFrame>
+        <p:sp>
+          <p:nvSpPr>
+            <p:cNvPr id="12" name="Oval 11"/>
+            <p:cNvSpPr/>
+            <p:nvPr/>
+          </p:nvSpPr>
+          <p:spPr>
+            <a:xfrm>
+              <a:off x="5667054" y="5384226"/>
+              <a:ext cx="83127" cy="83127"/>
+            </a:xfrm>
+            <a:prstGeom prst="ellipse">
+              <a:avLst/>
+            </a:prstGeom>
+            <a:solidFill>
+              <a:schemeClr val="tx1"/>
+            </a:solidFill>
+            <a:ln>
+              <a:solidFill>
+                <a:schemeClr val="tx1"/>
+              </a:solidFill>
+            </a:ln>
+          </p:spPr>
+          <p:style>
+            <a:lnRef idx="2">
+              <a:schemeClr val="accent1">
+                <a:shade val="50000"/>
+              </a:schemeClr>
+            </a:lnRef>
+            <a:fillRef idx="1">
+              <a:schemeClr val="accent1"/>
+            </a:fillRef>
+            <a:effectRef idx="0">
+              <a:schemeClr val="accent1"/>
+            </a:effectRef>
+            <a:fontRef idx="minor">
+              <a:schemeClr val="lt1"/>
+            </a:fontRef>
+          </p:style>
+          <p:txBody>
+            <a:bodyPr rtlCol="0" anchor="ctr"/>
+            <a:lstStyle/>
+            <a:p>
+              <a:pPr algn="ctr"/>
+              <a:endParaRPr lang="en-US"/>
+            </a:p>
+          </p:txBody>
+        </p:sp>
+        <p:sp>
+          <p:nvSpPr>
+            <p:cNvPr id="13" name="Oval 12"/>
+            <p:cNvSpPr/>
+            <p:nvPr/>
+          </p:nvSpPr>
+          <p:spPr>
+            <a:xfrm>
+              <a:off x="5640539" y="5767822"/>
+              <a:ext cx="83127" cy="83127"/>
+            </a:xfrm>
+            <a:prstGeom prst="ellipse">
+              <a:avLst/>
+            </a:prstGeom>
+            <a:solidFill>
+              <a:schemeClr val="tx1"/>
+            </a:solidFill>
+            <a:ln>
+              <a:solidFill>
+                <a:schemeClr val="tx1"/>
+              </a:solidFill>
+            </a:ln>
+          </p:spPr>
+          <p:style>
+            <a:lnRef idx="2">
+              <a:schemeClr val="accent1">
+                <a:shade val="50000"/>
+              </a:schemeClr>
+            </a:lnRef>
+            <a:fillRef idx="1">
+              <a:schemeClr val="accent1"/>
+            </a:fillRef>
+            <a:effectRef idx="0">
+              <a:schemeClr val="accent1"/>
+            </a:effectRef>
+            <a:fontRef idx="minor">
+              <a:schemeClr val="lt1"/>
+            </a:fontRef>
+          </p:style>
+          <p:txBody>
+            <a:bodyPr rtlCol="0" anchor="ctr"/>
+            <a:lstStyle/>
+            <a:p>
+              <a:pPr algn="ctr"/>
+              <a:endParaRPr lang="en-US"/>
+            </a:p>
+          </p:txBody>
+        </p:sp>
+        <p:sp>
+          <p:nvSpPr>
+            <p:cNvPr id="14" name="Oval 13"/>
+            <p:cNvSpPr/>
+            <p:nvPr/>
+          </p:nvSpPr>
+          <p:spPr>
+            <a:xfrm>
+              <a:off x="5823249" y="6148822"/>
+              <a:ext cx="83127" cy="83127"/>
+            </a:xfrm>
+            <a:prstGeom prst="ellipse">
+              <a:avLst/>
+            </a:prstGeom>
+            <a:solidFill>
+              <a:schemeClr val="tx1"/>
+            </a:solidFill>
+            <a:ln>
+              <a:solidFill>
+                <a:schemeClr val="tx1"/>
+              </a:solidFill>
+            </a:ln>
+          </p:spPr>
+          <p:style>
+            <a:lnRef idx="2">
+              <a:schemeClr val="accent1">
+                <a:shade val="50000"/>
+              </a:schemeClr>
+            </a:lnRef>
+            <a:fillRef idx="1">
+              <a:schemeClr val="accent1"/>
+            </a:fillRef>
+            <a:effectRef idx="0">
+              <a:schemeClr val="accent1"/>
+            </a:effectRef>
+            <a:fontRef idx="minor">
+              <a:schemeClr val="lt1"/>
+            </a:fontRef>
+          </p:style>
+          <p:txBody>
+            <a:bodyPr rtlCol="0" anchor="ctr"/>
+            <a:lstStyle/>
+            <a:p>
+              <a:pPr algn="ctr"/>
+              <a:endParaRPr lang="en-US"/>
+            </a:p>
+          </p:txBody>
+        </p:sp>
+        <p:sp>
+          <p:nvSpPr>
+            <p:cNvPr id="15" name="Oval 14"/>
+            <p:cNvSpPr/>
+            <p:nvPr/>
+          </p:nvSpPr>
+          <p:spPr>
+            <a:xfrm>
+              <a:off x="7486650" y="5610378"/>
+              <a:ext cx="83127" cy="83127"/>
+            </a:xfrm>
+            <a:prstGeom prst="ellipse">
+              <a:avLst/>
+            </a:prstGeom>
+            <a:solidFill>
+              <a:schemeClr val="tx1"/>
+            </a:solidFill>
+            <a:ln>
+              <a:solidFill>
+                <a:schemeClr val="tx1"/>
+              </a:solidFill>
+            </a:ln>
+          </p:spPr>
+          <p:style>
+            <a:lnRef idx="2">
+              <a:schemeClr val="accent1">
+                <a:shade val="50000"/>
+              </a:schemeClr>
+            </a:lnRef>
+            <a:fillRef idx="1">
+              <a:schemeClr val="accent1"/>
+            </a:fillRef>
+            <a:effectRef idx="0">
+              <a:schemeClr val="accent1"/>
+            </a:effectRef>
+            <a:fontRef idx="minor">
+              <a:schemeClr val="lt1"/>
+            </a:fontRef>
+          </p:style>
+          <p:txBody>
+            <a:bodyPr rtlCol="0" anchor="ctr"/>
+            <a:lstStyle/>
+            <a:p>
+              <a:pPr algn="ctr"/>
+              <a:endParaRPr lang="en-US"/>
+            </a:p>
+          </p:txBody>
+        </p:sp>
+        <p:sp>
+          <p:nvSpPr>
+            <p:cNvPr id="16" name="Oval 15"/>
+            <p:cNvSpPr/>
+            <p:nvPr/>
+          </p:nvSpPr>
+          <p:spPr>
+            <a:xfrm>
+              <a:off x="7192241" y="6155893"/>
+              <a:ext cx="83127" cy="83127"/>
+            </a:xfrm>
+            <a:prstGeom prst="ellipse">
+              <a:avLst/>
+            </a:prstGeom>
+            <a:solidFill>
+              <a:schemeClr val="tx1"/>
+            </a:solidFill>
+            <a:ln>
+              <a:solidFill>
+                <a:schemeClr val="tx1"/>
+              </a:solidFill>
+            </a:ln>
+          </p:spPr>
+          <p:style>
+            <a:lnRef idx="2">
+              <a:schemeClr val="accent1">
+                <a:shade val="50000"/>
+              </a:schemeClr>
+            </a:lnRef>
+            <a:fillRef idx="1">
+              <a:schemeClr val="accent1"/>
+            </a:fillRef>
+            <a:effectRef idx="0">
+              <a:schemeClr val="accent1"/>
+            </a:effectRef>
+            <a:fontRef idx="minor">
+              <a:schemeClr val="lt1"/>
+            </a:fontRef>
+          </p:style>
+          <p:txBody>
+            <a:bodyPr rtlCol="0" anchor="ctr"/>
+            <a:lstStyle/>
+            <a:p>
+              <a:pPr algn="ctr"/>
+              <a:endParaRPr lang="en-US"/>
+            </a:p>
+          </p:txBody>
+        </p:sp>
+        <p:cxnSp>
+          <p:nvCxnSpPr>
+            <p:cNvPr id="41" name="Straight Arrow Connector 40"/>
+            <p:cNvCxnSpPr>
+              <a:stCxn id="12" idx="5"/>
+              <a:endCxn id="15" idx="1"/>
+            </p:cNvCxnSpPr>
+            <p:nvPr/>
+          </p:nvCxnSpPr>
+          <p:spPr>
+            <a:xfrm>
+              <a:off x="5738007" y="5455179"/>
+              <a:ext cx="1760817" cy="167373"/>
+            </a:xfrm>
+            <a:prstGeom prst="straightConnector1">
+              <a:avLst/>
+            </a:prstGeom>
+            <a:ln>
+              <a:solidFill>
+                <a:schemeClr val="tx1"/>
+              </a:solidFill>
+              <a:tailEnd type="stealth" w="lg" len="lg"/>
+            </a:ln>
+          </p:spPr>
+          <p:style>
+            <a:lnRef idx="1">
+              <a:schemeClr val="accent1"/>
+            </a:lnRef>
+            <a:fillRef idx="0">
+              <a:schemeClr val="accent1"/>
+            </a:fillRef>
+            <a:effectRef idx="0">
+              <a:schemeClr val="accent1"/>
+            </a:effectRef>
+            <a:fontRef idx="minor">
+              <a:schemeClr val="tx1"/>
+            </a:fontRef>
+          </p:style>
+        </p:cxnSp>
+        <p:cxnSp>
+          <p:nvCxnSpPr>
+            <p:cNvPr id="44" name="Straight Arrow Connector 43"/>
+            <p:cNvCxnSpPr>
+              <a:stCxn id="13" idx="6"/>
+              <a:endCxn id="15" idx="3"/>
+            </p:cNvCxnSpPr>
+            <p:nvPr/>
+          </p:nvCxnSpPr>
+          <p:spPr>
+            <a:xfrm flipV="1">
+              <a:off x="5723666" y="5681331"/>
+              <a:ext cx="1775158" cy="128055"/>
+            </a:xfrm>
+            <a:prstGeom prst="straightConnector1">
+              <a:avLst/>
+            </a:prstGeom>
+            <a:ln>
+              <a:solidFill>
+                <a:schemeClr val="tx1"/>
+              </a:solidFill>
+              <a:tailEnd type="stealth" w="lg" len="lg"/>
+            </a:ln>
+          </p:spPr>
+          <p:style>
+            <a:lnRef idx="1">
+              <a:schemeClr val="accent1"/>
+            </a:lnRef>
+            <a:fillRef idx="0">
+              <a:schemeClr val="accent1"/>
+            </a:fillRef>
+            <a:effectRef idx="0">
+              <a:schemeClr val="accent1"/>
+            </a:effectRef>
+            <a:fontRef idx="minor">
+              <a:schemeClr val="tx1"/>
+            </a:fontRef>
+          </p:style>
+        </p:cxnSp>
+        <p:cxnSp>
+          <p:nvCxnSpPr>
+            <p:cNvPr id="47" name="Straight Arrow Connector 46"/>
+            <p:cNvCxnSpPr>
+              <a:stCxn id="14" idx="6"/>
+              <a:endCxn id="16" idx="2"/>
+            </p:cNvCxnSpPr>
+            <p:nvPr/>
+          </p:nvCxnSpPr>
+          <p:spPr>
+            <a:xfrm>
+              <a:off x="5906376" y="6190386"/>
+              <a:ext cx="1285865" cy="7071"/>
+            </a:xfrm>
+            <a:prstGeom prst="straightConnector1">
+              <a:avLst/>
+            </a:prstGeom>
+            <a:ln>
+              <a:solidFill>
+                <a:schemeClr val="tx1"/>
+              </a:solidFill>
+              <a:tailEnd type="stealth" w="lg" len="lg"/>
+            </a:ln>
+          </p:spPr>
+          <p:style>
+            <a:lnRef idx="1">
+              <a:schemeClr val="accent1"/>
+            </a:lnRef>
+            <a:fillRef idx="0">
+              <a:schemeClr val="accent1"/>
+            </a:fillRef>
+            <a:effectRef idx="0">
+              <a:schemeClr val="accent1"/>
+            </a:effectRef>
+            <a:fontRef idx="minor">
+              <a:schemeClr val="tx1"/>
+            </a:fontRef>
+          </p:style>
+        </p:cxnSp>
+      </p:grpSp>
+      <p:sp>
+        <p:nvSpPr>
+          <p:cNvPr id="50" name="TextBox 49"/>
+          <p:cNvSpPr txBox="1"/>
+          <p:nvPr/>
+        </p:nvSpPr>
+        <p:spPr>
+          <a:xfrm>
+            <a:off x="5750181" y="4156406"/>
+            <a:ext cx="1929695" cy="369332"/>
+          </a:xfrm>
+          <a:prstGeom prst="rect">
+            <a:avLst/>
+          </a:prstGeom>
+          <a:noFill/>
+        </p:spPr>
+        <p:txBody>
+          <a:bodyPr wrap="none" rtlCol="0">
+            <a:spAutoFit/>
+          </a:bodyPr>
+          <a:lstStyle/>
+          <a:p>
+            <a:r>
+              <a:rPr lang="en-US" dirty="0" smtClean="0"/>
+              <a:t>surjective function</a:t>
+            </a:r>
             <a:endParaRPr lang="en-US" dirty="0"/>
           </a:p>
         </p:txBody>
@@ -3548,6 +4873,29 @@
           </a:p>
         </p:txBody>
       </p:sp>
+      <p:sp>
+        <p:nvSpPr>
+          <p:cNvPr id="4" name="Slide Number Placeholder 3"/>
+          <p:cNvSpPr>
+            <a:spLocks noGrp="1"/>
+          </p:cNvSpPr>
+          <p:nvPr>
+            <p:ph type="sldNum" sz="quarter" idx="12"/>
+          </p:nvPr>
+        </p:nvSpPr>
+        <p:spPr/>
+        <p:txBody>
+          <a:bodyPr/>
+          <a:lstStyle/>
+          <a:p>
+            <a:fld id="{11AD1F4E-1E51-402E-B221-310F004E7D3B}" type="slidenum">
+              <a:rPr lang="en-US" smtClean="0"/>
+              <a:t>2</a:t>
+            </a:fld>
+            <a:endParaRPr lang="en-US"/>
+          </a:p>
+        </p:txBody>
+      </p:sp>
     </p:spTree>
     <p:extLst>
       <p:ext uri="{BB962C8B-B14F-4D97-AF65-F5344CB8AC3E}">
@@ -3705,8 +5053,8 @@
         </p:nvSpPr>
         <p:spPr>
           <a:xfrm>
-            <a:off x="1413165" y="5008416"/>
-            <a:ext cx="6156301" cy="523220"/>
+            <a:off x="1350819" y="5029199"/>
+            <a:ext cx="4668650" cy="415498"/>
           </a:xfrm>
           <a:prstGeom prst="rect">
             <a:avLst/>
@@ -3725,18 +5073,41 @@
           <a:lstStyle/>
           <a:p>
             <a:r>
-              <a:rPr lang="en-US" sz="2800" dirty="0" smtClean="0"/>
+              <a:rPr lang="en-US" sz="2100" dirty="0"/>
               <a:t>For all languages, many 3</a:t>
             </a:r>
             <a:r>
-              <a:rPr lang="en-US" sz="2800" baseline="30000" dirty="0" smtClean="0"/>
+              <a:rPr lang="en-US" sz="2100" baseline="30000" dirty="0"/>
               <a:t>rd</a:t>
             </a:r>
             <a:r>
-              <a:rPr lang="en-US" sz="2800" dirty="0" smtClean="0"/>
+              <a:rPr lang="en-US" sz="2100" dirty="0"/>
               <a:t> party libraries</a:t>
             </a:r>
-            <a:endParaRPr lang="en-US" sz="2800" dirty="0"/>
+            <a:endParaRPr lang="en-US" sz="2100" dirty="0"/>
+          </a:p>
+        </p:txBody>
+      </p:sp>
+      <p:sp>
+        <p:nvSpPr>
+          <p:cNvPr id="5" name="Slide Number Placeholder 4"/>
+          <p:cNvSpPr>
+            <a:spLocks noGrp="1"/>
+          </p:cNvSpPr>
+          <p:nvPr>
+            <p:ph type="sldNum" sz="quarter" idx="12"/>
+          </p:nvPr>
+        </p:nvSpPr>
+        <p:spPr/>
+        <p:txBody>
+          <a:bodyPr/>
+          <a:lstStyle/>
+          <a:p>
+            <a:fld id="{11AD1F4E-1E51-402E-B221-310F004E7D3B}" type="slidenum">
+              <a:rPr lang="en-US" smtClean="0"/>
+              <a:t>3</a:t>
+            </a:fld>
+            <a:endParaRPr lang="en-US"/>
           </a:p>
         </p:txBody>
       </p:sp>
@@ -3863,44 +5234,24 @@
       </p:sp>
       <p:sp>
         <p:nvSpPr>
-          <p:cNvPr id="4" name="TextBox 3"/>
-          <p:cNvSpPr txBox="1"/>
-          <p:nvPr/>
-        </p:nvSpPr>
-        <p:spPr>
-          <a:xfrm>
-            <a:off x="1413165" y="3875806"/>
-            <a:ext cx="6156301" cy="523220"/>
-          </a:xfrm>
-          <a:prstGeom prst="rect">
-            <a:avLst/>
-          </a:prstGeom>
-          <a:noFill/>
-          <a:ln>
-            <a:solidFill>
-              <a:schemeClr val="tx1"/>
-            </a:solidFill>
-          </a:ln>
-        </p:spPr>
-        <p:txBody>
-          <a:bodyPr wrap="none" rtlCol="0">
-            <a:spAutoFit/>
-          </a:bodyPr>
-          <a:lstStyle/>
-          <a:p>
-            <a:r>
-              <a:rPr lang="en-US" sz="2800" dirty="0" smtClean="0"/>
-              <a:t>For all languages, many 3</a:t>
-            </a:r>
-            <a:r>
-              <a:rPr lang="en-US" sz="2800" baseline="30000" dirty="0" smtClean="0"/>
-              <a:t>rd</a:t>
-            </a:r>
-            <a:r>
-              <a:rPr lang="en-US" sz="2800" dirty="0" smtClean="0"/>
-              <a:t> party libraries</a:t>
-            </a:r>
-            <a:endParaRPr lang="en-US" sz="2800" dirty="0"/>
+          <p:cNvPr id="5" name="Slide Number Placeholder 4"/>
+          <p:cNvSpPr>
+            <a:spLocks noGrp="1"/>
+          </p:cNvSpPr>
+          <p:nvPr>
+            <p:ph type="sldNum" sz="quarter" idx="12"/>
+          </p:nvPr>
+        </p:nvSpPr>
+        <p:spPr/>
+        <p:txBody>
+          <a:bodyPr/>
+          <a:lstStyle/>
+          <a:p>
+            <a:fld id="{11AD1F4E-1E51-402E-B221-310F004E7D3B}" type="slidenum">
+              <a:rPr lang="en-US" smtClean="0"/>
+              <a:t>4</a:t>
+            </a:fld>
+            <a:endParaRPr lang="en-US"/>
           </a:p>
         </p:txBody>
       </p:sp>
@@ -3976,7 +5327,9 @@
         </p:nvSpPr>
         <p:spPr/>
         <p:txBody>
-          <a:bodyPr/>
+          <a:bodyPr>
+            <a:normAutofit fontScale="85000" lnSpcReduction="10000"/>
+          </a:bodyPr>
           <a:lstStyle/>
           <a:p>
             <a:r>
@@ -3984,7 +5337,9 @@
               <a:t>Type </a:t>
             </a:r>
             <a:r>
-              <a:rPr lang="en-US" i="1" dirty="0" smtClean="0"/>
+              <a:rPr lang="en-US" i="1" dirty="0" smtClean="0">
+                <a:latin typeface="Palatino Linotype" panose="02040502050505030304" pitchFamily="18" charset="0"/>
+              </a:rPr>
               <a:t>T</a:t>
             </a:r>
             <a:r>
@@ -4027,8 +5382,43 @@
             </a:r>
             <a:r>
               <a:rPr lang="en-US" dirty="0" smtClean="0"/>
-              <a:t>2147483647, …, -1, 0, 1..., 2147483647}</a:t>
-            </a:r>
+              <a:t>2147483647, …, -1, 0, 1..., 2147483647</a:t>
+            </a:r>
+            <a:r>
+              <a:rPr lang="en-US" dirty="0" smtClean="0"/>
+              <a:t>}</a:t>
+            </a:r>
+          </a:p>
+          <a:p>
+            <a:r>
+              <a:rPr lang="en-US" dirty="0" smtClean="0"/>
+              <a:t>Size of type </a:t>
+            </a:r>
+            <a:r>
+              <a:rPr lang="en-US" i="1" dirty="0">
+                <a:latin typeface="Palatino Linotype" panose="02040502050505030304" pitchFamily="18" charset="0"/>
+              </a:rPr>
+              <a:t>T</a:t>
+            </a:r>
+            <a:r>
+              <a:rPr lang="en-US" dirty="0"/>
+              <a:t>: </a:t>
+            </a:r>
+            <a:r>
+              <a:rPr lang="en-US" dirty="0" smtClean="0"/>
+              <a:t>|</a:t>
+            </a:r>
+            <a:r>
+              <a:rPr lang="en-US" i="1" dirty="0" smtClean="0">
+                <a:latin typeface="Palatino Linotype" panose="02040502050505030304" pitchFamily="18" charset="0"/>
+              </a:rPr>
+              <a:t>T</a:t>
+            </a:r>
+            <a:r>
+              <a:rPr lang="en-US" dirty="0" smtClean="0"/>
+              <a:t>|</a:t>
+            </a:r>
+            <a:endParaRPr lang="en-US" dirty="0" smtClean="0"/>
           </a:p>
           <a:p>
             <a:r>
@@ -4042,14 +5432,304 @@
               <a:t>Any type: </a:t>
             </a:r>
             <a:r>
-              <a:rPr lang="en-US" i="1" dirty="0" smtClean="0"/>
+              <a:rPr lang="en-US" i="1" dirty="0" smtClean="0">
+                <a:latin typeface="Palatino Linotype" panose="02040502050505030304" pitchFamily="18" charset="0"/>
+              </a:rPr>
               <a:t>T</a:t>
             </a:r>
             <a:r>
-              <a:rPr lang="en-US" baseline="-25000" dirty="0" smtClean="0"/>
+              <a:rPr lang="en-US" baseline="-25000" dirty="0" smtClean="0">
+                <a:sym typeface="Symbol" panose="05050102010706020507" pitchFamily="18" charset="2"/>
+              </a:rPr>
+              <a:t></a:t>
+            </a:r>
+          </a:p>
+          <a:p>
+            <a:r>
+              <a:rPr lang="en-US" dirty="0" smtClean="0">
+                <a:sym typeface="Symbol" panose="05050102010706020507" pitchFamily="18" charset="2"/>
+              </a:rPr>
+              <a:t>Power set of </a:t>
+            </a:r>
+            <a:r>
+              <a:rPr lang="en-US" i="1" dirty="0" smtClean="0">
+                <a:latin typeface="Palatino Linotype" panose="02040502050505030304" pitchFamily="18" charset="0"/>
+                <a:sym typeface="Symbol" panose="05050102010706020507" pitchFamily="18" charset="2"/>
+              </a:rPr>
+              <a:t>T</a:t>
+            </a:r>
+            <a:r>
+              <a:rPr lang="en-US" dirty="0" smtClean="0">
+                <a:sym typeface="Symbol" panose="05050102010706020507" pitchFamily="18" charset="2"/>
+              </a:rPr>
+              <a:t>: 2</a:t>
+            </a:r>
+            <a:r>
+              <a:rPr lang="en-US" i="1" baseline="30000" dirty="0" smtClean="0">
+                <a:latin typeface="Palatino Linotype" panose="02040502050505030304" pitchFamily="18" charset="0"/>
+                <a:sym typeface="Symbol" panose="05050102010706020507" pitchFamily="18" charset="2"/>
+              </a:rPr>
+              <a:t>T</a:t>
+            </a:r>
+            <a:r>
+              <a:rPr lang="en-US" dirty="0" smtClean="0">
+                <a:sym typeface="Symbol" panose="05050102010706020507" pitchFamily="18" charset="2"/>
+              </a:rPr>
+              <a:t>, e.g.,</a:t>
+            </a:r>
+          </a:p>
+          <a:p>
+            <a:pPr lvl="1"/>
+            <a:r>
+              <a:rPr lang="en-US" dirty="0" smtClean="0">
+                <a:sym typeface="Symbol" panose="05050102010706020507" pitchFamily="18" charset="2"/>
+              </a:rPr>
+              <a:t>2</a:t>
+            </a:r>
+            <a:r>
+              <a:rPr lang="en-US" baseline="30000" dirty="0" smtClean="0">
+                <a:sym typeface="Symbol" panose="05050102010706020507" pitchFamily="18" charset="2"/>
+              </a:rPr>
+              <a:t>boolean</a:t>
+            </a:r>
+            <a:r>
+              <a:rPr lang="en-US" dirty="0" smtClean="0">
+                <a:sym typeface="Symbol" panose="05050102010706020507" pitchFamily="18" charset="2"/>
+              </a:rPr>
+              <a:t> = {, {True}, {False}, {True, False}}</a:t>
+            </a:r>
+          </a:p>
+          <a:p>
+            <a:pPr lvl="1"/>
+            <a:r>
+              <a:rPr lang="en-US" dirty="0" smtClean="0">
+                <a:sym typeface="Symbol" panose="05050102010706020507" pitchFamily="18" charset="2"/>
+              </a:rPr>
+              <a:t>2</a:t>
+            </a:r>
+            <a:r>
+              <a:rPr lang="en-US" baseline="30000" dirty="0" smtClean="0">
+                <a:sym typeface="Symbol" panose="05050102010706020507" pitchFamily="18" charset="2"/>
+              </a:rPr>
+              <a:t>int</a:t>
+            </a:r>
+            <a:r>
+              <a:rPr lang="en-US" dirty="0" smtClean="0">
+                <a:sym typeface="Symbol" panose="05050102010706020507" pitchFamily="18" charset="2"/>
+              </a:rPr>
+              <a:t> = {, {0}, {1}, {-1}, …, {0, 1}, {0, -1}, …}</a:t>
+            </a:r>
+          </a:p>
+          <a:p>
+            <a:r>
+              <a:rPr lang="en-US" dirty="0" smtClean="0">
+                <a:sym typeface="Symbol" panose="05050102010706020507" pitchFamily="18" charset="2"/>
+              </a:rPr>
+              <a:t>Set of all sequences of </a:t>
+            </a:r>
+            <a:r>
+              <a:rPr lang="en-US" i="1" dirty="0" smtClean="0">
+                <a:latin typeface="Palatino Linotype" panose="02040502050505030304" pitchFamily="18" charset="0"/>
+                <a:sym typeface="Symbol" panose="05050102010706020507" pitchFamily="18" charset="2"/>
+              </a:rPr>
+              <a:t>T</a:t>
+            </a:r>
+            <a:r>
+              <a:rPr lang="en-US" dirty="0" smtClean="0">
+                <a:sym typeface="Symbol" panose="05050102010706020507" pitchFamily="18" charset="2"/>
+              </a:rPr>
+              <a:t>: </a:t>
+            </a:r>
+            <a:r>
+              <a:rPr lang="en-US" i="1" dirty="0" smtClean="0">
+                <a:latin typeface="Palatino Linotype" panose="02040502050505030304" pitchFamily="18" charset="0"/>
+                <a:sym typeface="Symbol" panose="05050102010706020507" pitchFamily="18" charset="2"/>
+              </a:rPr>
+              <a:t>T</a:t>
+            </a:r>
+            <a:r>
+              <a:rPr lang="en-US" baseline="30000" dirty="0" smtClean="0">
+                <a:sym typeface="Symbol" panose="05050102010706020507" pitchFamily="18" charset="2"/>
+              </a:rPr>
               <a:t>*</a:t>
             </a:r>
-            <a:endParaRPr lang="en-US" baseline="-25000" dirty="0"/>
+            <a:r>
+              <a:rPr lang="en-US" dirty="0" smtClean="0">
+                <a:sym typeface="Symbol" panose="05050102010706020507" pitchFamily="18" charset="2"/>
+              </a:rPr>
+              <a:t>, e.g.,</a:t>
+            </a:r>
+          </a:p>
+          <a:p>
+            <a:pPr lvl="1"/>
+            <a:r>
+              <a:rPr lang="en-US" dirty="0" err="1" smtClean="0">
+                <a:sym typeface="Symbol" panose="05050102010706020507" pitchFamily="18" charset="2"/>
+              </a:rPr>
+              <a:t>boolean</a:t>
+            </a:r>
+            <a:r>
+              <a:rPr lang="en-US" baseline="30000" dirty="0" smtClean="0">
+                <a:sym typeface="Symbol" panose="05050102010706020507" pitchFamily="18" charset="2"/>
+              </a:rPr>
+              <a:t>*</a:t>
+            </a:r>
+            <a:r>
+              <a:rPr lang="en-US" dirty="0" smtClean="0">
+                <a:sym typeface="Symbol" panose="05050102010706020507" pitchFamily="18" charset="2"/>
+              </a:rPr>
+              <a:t> = {, True, False, </a:t>
+            </a:r>
+            <a:r>
+              <a:rPr lang="en-US" dirty="0" err="1" smtClean="0">
+                <a:sym typeface="Symbol" panose="05050102010706020507" pitchFamily="18" charset="2"/>
+              </a:rPr>
+              <a:t>TrueTrue</a:t>
+            </a:r>
+            <a:r>
+              <a:rPr lang="en-US" dirty="0" smtClean="0">
+                <a:sym typeface="Symbol" panose="05050102010706020507" pitchFamily="18" charset="2"/>
+              </a:rPr>
+              <a:t>, True</a:t>
+            </a:r>
+            <a:r>
+              <a:rPr lang="en-US" dirty="0">
+                <a:sym typeface="Symbol" panose="05050102010706020507" pitchFamily="18" charset="2"/>
+              </a:rPr>
+              <a:t> </a:t>
+            </a:r>
+            <a:r>
+              <a:rPr lang="en-US" dirty="0" smtClean="0">
+                <a:sym typeface="Symbol" panose="05050102010706020507" pitchFamily="18" charset="2"/>
+              </a:rPr>
+              <a:t>False, False</a:t>
+            </a:r>
+            <a:r>
+              <a:rPr lang="en-US" dirty="0">
+                <a:sym typeface="Symbol" panose="05050102010706020507" pitchFamily="18" charset="2"/>
+              </a:rPr>
+              <a:t> </a:t>
+            </a:r>
+            <a:r>
+              <a:rPr lang="en-US" dirty="0" smtClean="0">
+                <a:sym typeface="Symbol" panose="05050102010706020507" pitchFamily="18" charset="2"/>
+              </a:rPr>
+              <a:t>True,…}</a:t>
+            </a:r>
+          </a:p>
+          <a:p>
+            <a:pPr lvl="1"/>
+            <a:r>
+              <a:rPr lang="en-US" dirty="0" err="1" smtClean="0">
+                <a:sym typeface="Symbol" panose="05050102010706020507" pitchFamily="18" charset="2"/>
+              </a:rPr>
+              <a:t>int</a:t>
+            </a:r>
+            <a:r>
+              <a:rPr lang="en-US" dirty="0">
+                <a:sym typeface="Symbol" panose="05050102010706020507" pitchFamily="18" charset="2"/>
+              </a:rPr>
+              <a:t>* = </a:t>
+            </a:r>
+            <a:r>
+              <a:rPr lang="en-US" dirty="0" smtClean="0">
+                <a:sym typeface="Symbol" panose="05050102010706020507" pitchFamily="18" charset="2"/>
+              </a:rPr>
+              <a:t>{</a:t>
+            </a:r>
+            <a:r>
+              <a:rPr lang="en-US" dirty="0">
+                <a:sym typeface="Symbol" panose="05050102010706020507" pitchFamily="18" charset="2"/>
+              </a:rPr>
+              <a:t> </a:t>
+            </a:r>
+            <a:r>
+              <a:rPr lang="en-US" dirty="0" smtClean="0">
+                <a:sym typeface="Symbol" panose="05050102010706020507" pitchFamily="18" charset="2"/>
+              </a:rPr>
+              <a:t>, 0</a:t>
+            </a:r>
+            <a:r>
+              <a:rPr lang="en-US" dirty="0">
+                <a:sym typeface="Symbol" panose="05050102010706020507" pitchFamily="18" charset="2"/>
+              </a:rPr>
+              <a:t>, 1, …, 0 </a:t>
+            </a:r>
+            <a:r>
+              <a:rPr lang="en-US" dirty="0" smtClean="0">
+                <a:sym typeface="Symbol" panose="05050102010706020507" pitchFamily="18" charset="2"/>
+              </a:rPr>
+              <a:t>0, 0</a:t>
+            </a:r>
+            <a:r>
+              <a:rPr lang="en-US" dirty="0">
+                <a:sym typeface="Symbol" panose="05050102010706020507" pitchFamily="18" charset="2"/>
+              </a:rPr>
+              <a:t> </a:t>
+            </a:r>
+            <a:r>
+              <a:rPr lang="en-US" dirty="0" smtClean="0">
+                <a:sym typeface="Symbol" panose="05050102010706020507" pitchFamily="18" charset="2"/>
+              </a:rPr>
+              <a:t>1, …, 0</a:t>
+            </a:r>
+            <a:r>
+              <a:rPr lang="en-US" dirty="0">
+                <a:sym typeface="Symbol" panose="05050102010706020507" pitchFamily="18" charset="2"/>
+              </a:rPr>
+              <a:t> </a:t>
+            </a:r>
+            <a:r>
+              <a:rPr lang="en-US" dirty="0" smtClean="0">
+                <a:sym typeface="Symbol" panose="05050102010706020507" pitchFamily="18" charset="2"/>
+              </a:rPr>
+              <a:t>0</a:t>
+            </a:r>
+            <a:r>
+              <a:rPr lang="en-US" dirty="0">
+                <a:sym typeface="Symbol" panose="05050102010706020507" pitchFamily="18" charset="2"/>
+              </a:rPr>
+              <a:t> </a:t>
+            </a:r>
+            <a:r>
+              <a:rPr lang="en-US" dirty="0" smtClean="0">
+                <a:sym typeface="Symbol" panose="05050102010706020507" pitchFamily="18" charset="2"/>
+              </a:rPr>
+              <a:t>0, 0</a:t>
+            </a:r>
+            <a:r>
+              <a:rPr lang="en-US" dirty="0">
+                <a:sym typeface="Symbol" panose="05050102010706020507" pitchFamily="18" charset="2"/>
+              </a:rPr>
+              <a:t> </a:t>
+            </a:r>
+            <a:r>
+              <a:rPr lang="en-US" dirty="0" smtClean="0">
+                <a:sym typeface="Symbol" panose="05050102010706020507" pitchFamily="18" charset="2"/>
+              </a:rPr>
+              <a:t>0</a:t>
+            </a:r>
+            <a:r>
+              <a:rPr lang="en-US" dirty="0">
+                <a:sym typeface="Symbol" panose="05050102010706020507" pitchFamily="18" charset="2"/>
+              </a:rPr>
+              <a:t> </a:t>
+            </a:r>
+            <a:r>
+              <a:rPr lang="en-US" dirty="0" smtClean="0">
+                <a:sym typeface="Symbol" panose="05050102010706020507" pitchFamily="18" charset="2"/>
+              </a:rPr>
+              <a:t>1, …}</a:t>
+            </a:r>
+            <a:endParaRPr lang="en-US" dirty="0" smtClean="0">
+              <a:sym typeface="Symbol" panose="05050102010706020507" pitchFamily="18" charset="2"/>
+            </a:endParaRPr>
+          </a:p>
+          <a:p>
+            <a:pPr lvl="1"/>
+            <a:endParaRPr lang="en-US" dirty="0" smtClean="0">
+              <a:sym typeface="Symbol" panose="05050102010706020507" pitchFamily="18" charset="2"/>
+            </a:endParaRPr>
           </a:p>
         </p:txBody>
       </p:sp>
@@ -4062,25 +5742,25 @@
           <p:nvPr>
             <p:extLst>
               <p:ext uri="{D42A27DB-BD31-4B8C-83A1-F6EECF244321}">
-                <p14:modId xmlns:p14="http://schemas.microsoft.com/office/powerpoint/2010/main" val="2880453434"/>
+                <p14:modId xmlns:p14="http://schemas.microsoft.com/office/powerpoint/2010/main" val="2483905168"/>
               </p:ext>
             </p:extLst>
           </p:nvPr>
         </p:nvGraphicFramePr>
         <p:xfrm>
-          <a:off x="2764991" y="3115758"/>
-          <a:ext cx="4124325" cy="482600"/>
+          <a:off x="2221814" y="3308369"/>
+          <a:ext cx="3093244" cy="361950"/>
         </p:xfrm>
         <a:graphic>
           <a:graphicData uri="http://schemas.openxmlformats.org/presentationml/2006/ole">
             <mc:AlternateContent xmlns:mc="http://schemas.openxmlformats.org/markup-compatibility/2006">
               <mc:Choice xmlns:v="urn:schemas-microsoft-com:vml" Requires="v">
-                <p:oleObj spid="_x0000_s1029" name="Equation" r:id="rId3" imgW="1841400" imgH="215640" progId="Equation.3">
+                <p:oleObj spid="_x0000_s1040" name="Equation" r:id="rId4" imgW="1841400" imgH="215640" progId="Equation.3">
                   <p:embed/>
                 </p:oleObj>
               </mc:Choice>
               <mc:Fallback>
-                <p:oleObj name="Equation" r:id="rId3" imgW="1841400" imgH="215640" progId="Equation.3">
+                <p:oleObj name="Equation" r:id="rId4" imgW="1841400" imgH="215640" progId="Equation.3">
                   <p:embed/>
                   <p:pic>
                     <p:nvPicPr>
@@ -4089,15 +5769,15 @@
                       <p:nvPr/>
                     </p:nvPicPr>
                     <p:blipFill>
-                      <a:blip r:embed="rId4"/>
+                      <a:blip r:embed="rId5"/>
                       <a:stretch>
                         <a:fillRect/>
                       </a:stretch>
                     </p:blipFill>
                     <p:spPr>
                       <a:xfrm>
-                        <a:off x="2764991" y="3115758"/>
-                        <a:ext cx="4124325" cy="482600"/>
+                        <a:off x="2221814" y="3308369"/>
+                        <a:ext cx="3093244" cy="361950"/>
                       </a:xfrm>
                       <a:prstGeom prst="rect">
                         <a:avLst/>
@@ -4110,6 +5790,126 @@
           </a:graphicData>
         </a:graphic>
       </p:graphicFrame>
+      <p:sp>
+        <p:nvSpPr>
+          <p:cNvPr id="5" name="TextBox 4"/>
+          <p:cNvSpPr txBox="1"/>
+          <p:nvPr/>
+        </p:nvSpPr>
+        <p:spPr>
+          <a:xfrm>
+            <a:off x="6683951" y="4779821"/>
+            <a:ext cx="1194558" cy="369332"/>
+          </a:xfrm>
+          <a:prstGeom prst="rect">
+            <a:avLst/>
+          </a:prstGeom>
+          <a:noFill/>
+        </p:spPr>
+        <p:txBody>
+          <a:bodyPr wrap="none" rtlCol="0">
+            <a:spAutoFit/>
+          </a:bodyPr>
+          <a:lstStyle/>
+          <a:p>
+            <a:r>
+              <a:rPr lang="en-US" dirty="0">
+                <a:sym typeface="Symbol" panose="05050102010706020507" pitchFamily="18" charset="2"/>
+              </a:rPr>
+              <a:t>|2</a:t>
+            </a:r>
+            <a:r>
+              <a:rPr lang="en-US" i="1" baseline="30000" dirty="0">
+                <a:latin typeface="Palatino Linotype" panose="02040502050505030304" pitchFamily="18" charset="0"/>
+                <a:sym typeface="Symbol" panose="05050102010706020507" pitchFamily="18" charset="2"/>
+              </a:rPr>
+              <a:t>T</a:t>
+            </a:r>
+            <a:r>
+              <a:rPr lang="en-US" dirty="0">
+                <a:sym typeface="Symbol" panose="05050102010706020507" pitchFamily="18" charset="2"/>
+              </a:rPr>
+              <a:t>| = 2</a:t>
+            </a:r>
+            <a:r>
+              <a:rPr lang="en-US" i="1" baseline="30000" dirty="0">
+                <a:latin typeface="Palatino Linotype" panose="02040502050505030304" pitchFamily="18" charset="0"/>
+                <a:sym typeface="Symbol" panose="05050102010706020507" pitchFamily="18" charset="2"/>
+              </a:rPr>
+              <a:t>|T|</a:t>
+            </a:r>
+            <a:endParaRPr lang="en-US" dirty="0"/>
+          </a:p>
+        </p:txBody>
+      </p:sp>
+      <p:sp>
+        <p:nvSpPr>
+          <p:cNvPr id="6" name="TextBox 5"/>
+          <p:cNvSpPr txBox="1"/>
+          <p:nvPr/>
+        </p:nvSpPr>
+        <p:spPr>
+          <a:xfrm>
+            <a:off x="6683951" y="6136870"/>
+            <a:ext cx="1010213" cy="369332"/>
+          </a:xfrm>
+          <a:prstGeom prst="rect">
+            <a:avLst/>
+          </a:prstGeom>
+          <a:noFill/>
+        </p:spPr>
+        <p:txBody>
+          <a:bodyPr wrap="none" rtlCol="0">
+            <a:spAutoFit/>
+          </a:bodyPr>
+          <a:lstStyle/>
+          <a:p>
+            <a:r>
+              <a:rPr lang="en-US" i="1" dirty="0">
+                <a:latin typeface="Palatino Linotype" panose="02040502050505030304" pitchFamily="18" charset="0"/>
+                <a:sym typeface="Symbol" panose="05050102010706020507" pitchFamily="18" charset="2"/>
+              </a:rPr>
+              <a:t>|T</a:t>
+            </a:r>
+            <a:r>
+              <a:rPr lang="en-US" baseline="30000" dirty="0">
+                <a:sym typeface="Symbol" panose="05050102010706020507" pitchFamily="18" charset="2"/>
+              </a:rPr>
+              <a:t>*</a:t>
+            </a:r>
+            <a:r>
+              <a:rPr lang="en-US" dirty="0">
+                <a:sym typeface="Symbol" panose="05050102010706020507" pitchFamily="18" charset="2"/>
+              </a:rPr>
+              <a:t>| = </a:t>
+            </a:r>
+            <a:endParaRPr lang="en-US" dirty="0"/>
+          </a:p>
+        </p:txBody>
+      </p:sp>
+      <p:sp>
+        <p:nvSpPr>
+          <p:cNvPr id="7" name="Slide Number Placeholder 6"/>
+          <p:cNvSpPr>
+            <a:spLocks noGrp="1"/>
+          </p:cNvSpPr>
+          <p:nvPr>
+            <p:ph type="sldNum" sz="quarter" idx="12"/>
+          </p:nvPr>
+        </p:nvSpPr>
+        <p:spPr/>
+        <p:txBody>
+          <a:bodyPr/>
+          <a:lstStyle/>
+          <a:p>
+            <a:fld id="{11AD1F4E-1E51-402E-B221-310F004E7D3B}" type="slidenum">
+              <a:rPr lang="en-US" smtClean="0"/>
+              <a:t>5</a:t>
+            </a:fld>
+            <a:endParaRPr lang="en-US"/>
+          </a:p>
+        </p:txBody>
+      </p:sp>
     </p:spTree>
     <p:extLst>
       <p:ext uri="{BB962C8B-B14F-4D97-AF65-F5344CB8AC3E}">
@@ -4189,6 +5989,29 @@
           </a:p>
         </p:txBody>
       </p:sp>
+      <p:sp>
+        <p:nvSpPr>
+          <p:cNvPr id="4" name="Slide Number Placeholder 3"/>
+          <p:cNvSpPr>
+            <a:spLocks noGrp="1"/>
+          </p:cNvSpPr>
+          <p:nvPr>
+            <p:ph type="sldNum" sz="quarter" idx="12"/>
+          </p:nvPr>
+        </p:nvSpPr>
+        <p:spPr/>
+        <p:txBody>
+          <a:bodyPr/>
+          <a:lstStyle/>
+          <a:p>
+            <a:fld id="{11AD1F4E-1E51-402E-B221-310F004E7D3B}" type="slidenum">
+              <a:rPr lang="en-US" smtClean="0"/>
+              <a:t>6</a:t>
+            </a:fld>
+            <a:endParaRPr lang="en-US"/>
+          </a:p>
+        </p:txBody>
+      </p:sp>
     </p:spTree>
     <p:extLst>
       <p:ext uri="{BB962C8B-B14F-4D97-AF65-F5344CB8AC3E}">
@@ -4354,10 +6177,10 @@
         </p:nvGrpSpPr>
         <p:grpSpPr>
           <a:xfrm>
-            <a:off x="6307280" y="2566553"/>
-            <a:ext cx="3587755" cy="1034763"/>
+            <a:off x="4730462" y="2782167"/>
+            <a:ext cx="2883587" cy="776614"/>
             <a:chOff x="6307280" y="2566553"/>
-            <a:chExt cx="3587755" cy="1034763"/>
+            <a:chExt cx="3844783" cy="1035485"/>
           </a:xfrm>
         </p:grpSpPr>
         <p:graphicFrame>
@@ -4369,25 +6192,25 @@
             <p:nvPr>
               <p:extLst>
                 <p:ext uri="{D42A27DB-BD31-4B8C-83A1-F6EECF244321}">
-                  <p14:modId xmlns:p14="http://schemas.microsoft.com/office/powerpoint/2010/main" val="399471717"/>
+                  <p14:modId xmlns:p14="http://schemas.microsoft.com/office/powerpoint/2010/main" val="3037646371"/>
                 </p:ext>
               </p:extLst>
             </p:nvPr>
           </p:nvGraphicFramePr>
           <p:xfrm>
-            <a:off x="7362973" y="3147291"/>
-            <a:ext cx="2532062" cy="454025"/>
+            <a:off x="7107238" y="3148013"/>
+            <a:ext cx="3044825" cy="454025"/>
           </p:xfrm>
           <a:graphic>
             <a:graphicData uri="http://schemas.openxmlformats.org/presentationml/2006/ole">
               <mc:AlternateContent xmlns:mc="http://schemas.openxmlformats.org/markup-compatibility/2006">
                 <mc:Choice xmlns:v="urn:schemas-microsoft-com:vml" Requires="v">
-                  <p:oleObj spid="_x0000_s2052" name="Equation" r:id="rId3" imgW="1130040" imgH="203040" progId="Equation.3">
+                  <p:oleObj spid="_x0000_s2060" name="Equation" r:id="rId3" imgW="1358640" imgH="203040" progId="Equation.3">
                     <p:embed/>
                   </p:oleObj>
                 </mc:Choice>
                 <mc:Fallback>
-                  <p:oleObj name="Equation" r:id="rId3" imgW="1130040" imgH="203040" progId="Equation.3">
+                  <p:oleObj name="Equation" r:id="rId3" imgW="1358640" imgH="203040" progId="Equation.3">
                     <p:embed/>
                     <p:pic>
                       <p:nvPicPr>
@@ -4403,8 +6226,8 @@
                       </p:blipFill>
                       <p:spPr>
                         <a:xfrm>
-                          <a:off x="7362973" y="3147291"/>
-                          <a:ext cx="2532062" cy="454025"/>
+                          <a:off x="7107238" y="3148013"/>
+                          <a:ext cx="3044825" cy="454025"/>
                         </a:xfrm>
                         <a:prstGeom prst="rect">
                           <a:avLst/>
@@ -4426,7 +6249,7 @@
           <p:spPr>
             <a:xfrm>
               <a:off x="6307280" y="2566553"/>
-              <a:ext cx="3081677" cy="523220"/>
+              <a:ext cx="3386911" cy="553997"/>
             </a:xfrm>
             <a:prstGeom prst="rect">
               <a:avLst/>
@@ -4440,18 +6263,49 @@
             <a:lstStyle/>
             <a:p>
               <a:r>
-                <a:rPr lang="en-US" sz="2800" i="1" dirty="0" smtClean="0"/>
+                <a:rPr lang="en-US" sz="2100" i="1" dirty="0"/>
                 <a:t>d</a:t>
               </a:r>
               <a:r>
-                <a:rPr lang="en-US" sz="2800" dirty="0" smtClean="0"/>
-                <a:t>-dimensional array</a:t>
+                <a:rPr lang="en-US" sz="2100" dirty="0"/>
+                <a:t>-dimensional array </a:t>
               </a:r>
-              <a:endParaRPr lang="en-US" sz="2800" dirty="0"/>
+              <a:r>
+                <a:rPr lang="en-US" sz="2100" i="1" dirty="0">
+                  <a:latin typeface="Palatino Linotype" panose="02040502050505030304" pitchFamily="18" charset="0"/>
+                </a:rPr>
+                <a:t>a</a:t>
+              </a:r>
+              <a:endParaRPr lang="en-US" sz="2100" i="1" dirty="0">
+                <a:latin typeface="Palatino Linotype" panose="02040502050505030304" pitchFamily="18" charset="0"/>
+              </a:endParaRPr>
             </a:p>
           </p:txBody>
         </p:sp>
       </p:grpSp>
+      <p:sp>
+        <p:nvSpPr>
+          <p:cNvPr id="7" name="Slide Number Placeholder 6"/>
+          <p:cNvSpPr>
+            <a:spLocks noGrp="1"/>
+          </p:cNvSpPr>
+          <p:nvPr>
+            <p:ph type="sldNum" sz="quarter" idx="12"/>
+          </p:nvPr>
+        </p:nvSpPr>
+        <p:spPr/>
+        <p:txBody>
+          <a:bodyPr/>
+          <a:lstStyle/>
+          <a:p>
+            <a:fld id="{11AD1F4E-1E51-402E-B221-310F004E7D3B}" type="slidenum">
+              <a:rPr lang="en-US" smtClean="0"/>
+              <a:t>7</a:t>
+            </a:fld>
+            <a:endParaRPr lang="en-US"/>
+          </a:p>
+        </p:txBody>
+      </p:sp>
     </p:spTree>
     <p:extLst>
       <p:ext uri="{BB962C8B-B14F-4D97-AF65-F5344CB8AC3E}">
@@ -4610,10 +6464,10 @@
         </p:nvGrpSpPr>
         <p:grpSpPr>
           <a:xfrm>
-            <a:off x="6265716" y="3169229"/>
-            <a:ext cx="3332309" cy="1063046"/>
+            <a:off x="4699287" y="3234172"/>
+            <a:ext cx="2659967" cy="797285"/>
             <a:chOff x="6307280" y="2566553"/>
-            <a:chExt cx="3332309" cy="1063046"/>
+            <a:chExt cx="3546622" cy="1063046"/>
           </a:xfrm>
         </p:grpSpPr>
         <p:graphicFrame>
@@ -4625,25 +6479,25 @@
             <p:nvPr>
               <p:extLst>
                 <p:ext uri="{D42A27DB-BD31-4B8C-83A1-F6EECF244321}">
-                  <p14:modId xmlns:p14="http://schemas.microsoft.com/office/powerpoint/2010/main" val="2287256883"/>
+                  <p14:modId xmlns:p14="http://schemas.microsoft.com/office/powerpoint/2010/main" val="872199375"/>
                 </p:ext>
               </p:extLst>
             </p:nvPr>
           </p:nvGraphicFramePr>
           <p:xfrm>
-            <a:off x="7618702" y="3118424"/>
-            <a:ext cx="2020887" cy="511175"/>
+            <a:off x="7405977" y="3118424"/>
+            <a:ext cx="2447925" cy="511175"/>
           </p:xfrm>
           <a:graphic>
             <a:graphicData uri="http://schemas.openxmlformats.org/presentationml/2006/ole">
               <mc:AlternateContent xmlns:mc="http://schemas.openxmlformats.org/markup-compatibility/2006">
                 <mc:Choice xmlns:v="urn:schemas-microsoft-com:vml" Requires="v">
-                  <p:oleObj spid="_x0000_s3074" name="Equation" r:id="rId3" imgW="901440" imgH="228600" progId="Equation.3">
+                  <p:oleObj spid="_x0000_s3083" name="Equation" r:id="rId3" imgW="1091880" imgH="228600" progId="Equation.3">
                     <p:embed/>
                   </p:oleObj>
                 </mc:Choice>
                 <mc:Fallback>
-                  <p:oleObj name="Equation" r:id="rId3" imgW="901440" imgH="228600" progId="Equation.3">
+                  <p:oleObj name="Equation" r:id="rId3" imgW="1091880" imgH="228600" progId="Equation.3">
                     <p:embed/>
                     <p:pic>
                       <p:nvPicPr>
@@ -4659,8 +6513,8 @@
                       </p:blipFill>
                       <p:spPr>
                         <a:xfrm>
-                          <a:off x="7618702" y="3118424"/>
-                          <a:ext cx="2020887" cy="511175"/>
+                          <a:off x="7405977" y="3118424"/>
+                          <a:ext cx="2447925" cy="511175"/>
                         </a:xfrm>
                         <a:prstGeom prst="rect">
                           <a:avLst/>
@@ -4682,7 +6536,7 @@
           <p:spPr>
             <a:xfrm>
               <a:off x="6307280" y="2566553"/>
-              <a:ext cx="1237839" cy="523220"/>
+              <a:ext cx="1498701" cy="553997"/>
             </a:xfrm>
             <a:prstGeom prst="rect">
               <a:avLst/>
@@ -4696,18 +6550,49 @@
             <a:lstStyle/>
             <a:p>
               <a:r>
-                <a:rPr lang="en-US" sz="2800" i="1" dirty="0" smtClean="0"/>
+                <a:rPr lang="en-US" sz="2100" i="1" dirty="0"/>
                 <a:t>d</a:t>
               </a:r>
               <a:r>
-                <a:rPr lang="en-US" sz="2800" dirty="0" smtClean="0"/>
-                <a:t>-tuple</a:t>
+                <a:rPr lang="en-US" sz="2100" dirty="0"/>
+                <a:t>-tuple </a:t>
               </a:r>
-              <a:endParaRPr lang="en-US" sz="2800" dirty="0"/>
+              <a:r>
+                <a:rPr lang="en-US" sz="2100" i="1" dirty="0">
+                  <a:latin typeface="Palatino Linotype" panose="02040502050505030304" pitchFamily="18" charset="0"/>
+                </a:rPr>
+                <a:t>t</a:t>
+              </a:r>
+              <a:endParaRPr lang="en-US" sz="2100" i="1" dirty="0">
+                <a:latin typeface="Palatino Linotype" panose="02040502050505030304" pitchFamily="18" charset="0"/>
+              </a:endParaRPr>
             </a:p>
           </p:txBody>
         </p:sp>
       </p:grpSp>
+      <p:sp>
+        <p:nvSpPr>
+          <p:cNvPr id="7" name="Slide Number Placeholder 6"/>
+          <p:cNvSpPr>
+            <a:spLocks noGrp="1"/>
+          </p:cNvSpPr>
+          <p:nvPr>
+            <p:ph type="sldNum" sz="quarter" idx="12"/>
+          </p:nvPr>
+        </p:nvSpPr>
+        <p:spPr/>
+        <p:txBody>
+          <a:bodyPr/>
+          <a:lstStyle/>
+          <a:p>
+            <a:fld id="{11AD1F4E-1E51-402E-B221-310F004E7D3B}" type="slidenum">
+              <a:rPr lang="en-US" smtClean="0"/>
+              <a:t>8</a:t>
+            </a:fld>
+            <a:endParaRPr lang="en-US"/>
+          </a:p>
+        </p:txBody>
+      </p:sp>
     </p:spTree>
     <p:extLst>
       <p:ext uri="{BB962C8B-B14F-4D97-AF65-F5344CB8AC3E}">
@@ -4836,7 +6721,19 @@
             <a:pPr lvl="1"/>
             <a:r>
               <a:rPr lang="en-US" dirty="0" smtClean="0"/>
-              <a:t>prepend/append: O(1)</a:t>
+              <a:t>prepend/append/pop/</a:t>
+            </a:r>
+            <a:r>
+              <a:rPr lang="en-US" dirty="0" err="1" smtClean="0"/>
+              <a:t>unshift</a:t>
+            </a:r>
+            <a:r>
+              <a:rPr lang="en-US" dirty="0" smtClean="0"/>
+              <a:t>: </a:t>
+            </a:r>
+            <a:r>
+              <a:rPr lang="en-US" dirty="0" smtClean="0"/>
+              <a:t>O(1)</a:t>
             </a:r>
           </a:p>
           <a:p>
@@ -4876,6 +6773,139 @@
           <a:p>
             <a:pPr lvl="1"/>
             <a:endParaRPr lang="en-US" dirty="0"/>
+          </a:p>
+        </p:txBody>
+      </p:sp>
+      <p:grpSp>
+        <p:nvGrpSpPr>
+          <p:cNvPr id="4" name="Group 3"/>
+          <p:cNvGrpSpPr/>
+          <p:nvPr/>
+        </p:nvGrpSpPr>
+        <p:grpSpPr>
+          <a:xfrm>
+            <a:off x="6457950" y="3296518"/>
+            <a:ext cx="1174823" cy="808001"/>
+            <a:chOff x="6307280" y="2566553"/>
+            <a:chExt cx="1566431" cy="1077334"/>
+          </a:xfrm>
+        </p:grpSpPr>
+        <p:graphicFrame>
+          <p:nvGraphicFramePr>
+            <p:cNvPr id="5" name="Object 4"/>
+            <p:cNvGraphicFramePr>
+              <a:graphicFrameLocks noChangeAspect="1"/>
+            </p:cNvGraphicFramePr>
+            <p:nvPr>
+              <p:extLst>
+                <p:ext uri="{D42A27DB-BD31-4B8C-83A1-F6EECF244321}">
+                  <p14:modId xmlns:p14="http://schemas.microsoft.com/office/powerpoint/2010/main" val="2802905344"/>
+                </p:ext>
+              </p:extLst>
+            </p:nvPr>
+          </p:nvGraphicFramePr>
+          <p:xfrm>
+            <a:off x="6933911" y="3104137"/>
+            <a:ext cx="939800" cy="539750"/>
+          </p:xfrm>
+          <a:graphic>
+            <a:graphicData uri="http://schemas.openxmlformats.org/presentationml/2006/ole">
+              <mc:AlternateContent xmlns:mc="http://schemas.openxmlformats.org/markup-compatibility/2006">
+                <mc:Choice xmlns:v="urn:schemas-microsoft-com:vml" Requires="v">
+                  <p:oleObj spid="_x0000_s4102" name="Equation" r:id="rId3" imgW="419040" imgH="241200" progId="Equation.3">
+                    <p:embed/>
+                  </p:oleObj>
+                </mc:Choice>
+                <mc:Fallback>
+                  <p:oleObj name="Equation" r:id="rId3" imgW="419040" imgH="241200" progId="Equation.3">
+                    <p:embed/>
+                    <p:pic>
+                      <p:nvPicPr>
+                        <p:cNvPr id="0" name=""/>
+                        <p:cNvPicPr/>
+                        <p:nvPr/>
+                      </p:nvPicPr>
+                      <p:blipFill>
+                        <a:blip r:embed="rId4"/>
+                        <a:stretch>
+                          <a:fillRect/>
+                        </a:stretch>
+                      </p:blipFill>
+                      <p:spPr>
+                        <a:xfrm>
+                          <a:off x="6933911" y="3104137"/>
+                          <a:ext cx="939800" cy="539750"/>
+                        </a:xfrm>
+                        <a:prstGeom prst="rect">
+                          <a:avLst/>
+                        </a:prstGeom>
+                      </p:spPr>
+                    </p:pic>
+                  </p:oleObj>
+                </mc:Fallback>
+              </mc:AlternateContent>
+            </a:graphicData>
+          </a:graphic>
+        </p:graphicFrame>
+        <p:sp>
+          <p:nvSpPr>
+            <p:cNvPr id="6" name="TextBox 5"/>
+            <p:cNvSpPr txBox="1"/>
+            <p:nvPr/>
+          </p:nvSpPr>
+          <p:spPr>
+            <a:xfrm>
+              <a:off x="6307280" y="2566553"/>
+              <a:ext cx="851344" cy="553997"/>
+            </a:xfrm>
+            <a:prstGeom prst="rect">
+              <a:avLst/>
+            </a:prstGeom>
+            <a:noFill/>
+          </p:spPr>
+          <p:txBody>
+            <a:bodyPr wrap="none" rtlCol="0">
+              <a:spAutoFit/>
+            </a:bodyPr>
+            <a:lstStyle/>
+            <a:p>
+              <a:r>
+                <a:rPr lang="en-US" sz="2100" dirty="0"/>
+                <a:t>list </a:t>
+              </a:r>
+              <a:r>
+                <a:rPr lang="en-US" sz="2100" i="1" dirty="0">
+                  <a:latin typeface="Palatino Linotype" panose="02040502050505030304" pitchFamily="18" charset="0"/>
+                </a:rPr>
+                <a:t>l</a:t>
+              </a:r>
+              <a:endParaRPr lang="en-US" sz="2100" i="1" dirty="0">
+                <a:latin typeface="Palatino Linotype" panose="02040502050505030304" pitchFamily="18" charset="0"/>
+              </a:endParaRPr>
+            </a:p>
+          </p:txBody>
+        </p:sp>
+      </p:grpSp>
+      <p:sp>
+        <p:nvSpPr>
+          <p:cNvPr id="7" name="Slide Number Placeholder 6"/>
+          <p:cNvSpPr>
+            <a:spLocks noGrp="1"/>
+          </p:cNvSpPr>
+          <p:nvPr>
+            <p:ph type="sldNum" sz="quarter" idx="12"/>
+          </p:nvPr>
+        </p:nvSpPr>
+        <p:spPr/>
+        <p:txBody>
+          <a:bodyPr/>
+          <a:lstStyle/>
+          <a:p>
+            <a:fld id="{11AD1F4E-1E51-402E-B221-310F004E7D3B}" type="slidenum">
+              <a:rPr lang="en-US" smtClean="0"/>
+              <a:t>9</a:t>
+            </a:fld>
+            <a:endParaRPr lang="en-US"/>
           </a:p>
         </p:txBody>
       </p:sp>
@@ -4900,6 +6930,267 @@
 </file>
 
 <file path=ppt/theme/theme1.xml><?xml version="1.0" encoding="utf-8"?>
+<a:theme xmlns:a="http://schemas.openxmlformats.org/drawingml/2006/main" name="Office Theme">
+  <a:themeElements>
+    <a:clrScheme name="Office Theme">
+      <a:dk1>
+        <a:sysClr val="windowText" lastClr="000000"/>
+      </a:dk1>
+      <a:lt1>
+        <a:sysClr val="window" lastClr="FFFFFF"/>
+      </a:lt1>
+      <a:dk2>
+        <a:srgbClr val="44546A"/>
+      </a:dk2>
+      <a:lt2>
+        <a:srgbClr val="E7E6E6"/>
+      </a:lt2>
+      <a:accent1>
+        <a:srgbClr val="5B9BD5"/>
+      </a:accent1>
+      <a:accent2>
+        <a:srgbClr val="ED7D31"/>
+      </a:accent2>
+      <a:accent3>
+        <a:srgbClr val="A5A5A5"/>
+      </a:accent3>
+      <a:accent4>
+        <a:srgbClr val="FFC000"/>
+      </a:accent4>
+      <a:accent5>
+        <a:srgbClr val="4472C4"/>
+      </a:accent5>
+      <a:accent6>
+        <a:srgbClr val="70AD47"/>
+      </a:accent6>
+      <a:hlink>
+        <a:srgbClr val="0563C1"/>
+      </a:hlink>
+      <a:folHlink>
+        <a:srgbClr val="954F72"/>
+      </a:folHlink>
+    </a:clrScheme>
+    <a:fontScheme name="Office Theme">
+      <a:majorFont>
+        <a:latin typeface="Calibri Light" panose="020F0302020204030204"/>
+        <a:ea typeface=""/>
+        <a:cs typeface=""/>
+        <a:font script="Jpan" typeface="ＭＳ Ｐゴシック"/>
+        <a:font script="Hang" typeface="맑은 고딕"/>
+        <a:font script="Hans" typeface="宋体"/>
+        <a:font script="Hant" typeface="新細明體"/>
+        <a:font script="Arab" typeface="Times New Roman"/>
+        <a:font script="Hebr" typeface="Times New Roman"/>
+        <a:font script="Thai" typeface="Angsana New"/>
+        <a:font script="Ethi" typeface="Nyala"/>
+        <a:font script="Beng" typeface="Vrinda"/>
+        <a:font script="Gujr" typeface="Shruti"/>
+        <a:font script="Khmr" typeface="MoolBoran"/>
+        <a:font script="Knda" typeface="Tunga"/>
+        <a:font script="Guru" typeface="Raavi"/>
+        <a:font script="Cans" typeface="Euphemia"/>
+        <a:font script="Cher" typeface="Plantagenet Cherokee"/>
+        <a:font script="Yiii" typeface="Microsoft Yi Baiti"/>
+        <a:font script="Tibt" typeface="Microsoft Himalaya"/>
+        <a:font script="Thaa" typeface="MV Boli"/>
+        <a:font script="Deva" typeface="Mangal"/>
+        <a:font script="Telu" typeface="Gautami"/>
+        <a:font script="Taml" typeface="Latha"/>
+        <a:font script="Syrc" typeface="Estrangelo Edessa"/>
+        <a:font script="Orya" typeface="Kalinga"/>
+        <a:font script="Mlym" typeface="Kartika"/>
+        <a:font script="Laoo" typeface="DokChampa"/>
+        <a:font script="Sinh" typeface="Iskoola Pota"/>
+        <a:font script="Mong" typeface="Mongolian Baiti"/>
+        <a:font script="Viet" typeface="Times New Roman"/>
+        <a:font script="Uigh" typeface="Microsoft Uighur"/>
+        <a:font script="Geor" typeface="Sylfaen"/>
+      </a:majorFont>
+      <a:minorFont>
+        <a:latin typeface="Calibri" panose="020F0502020204030204"/>
+        <a:ea typeface=""/>
+        <a:cs typeface=""/>
+        <a:font script="Jpan" typeface="ＭＳ Ｐゴシック"/>
+        <a:font script="Hang" typeface="맑은 고딕"/>
+        <a:font script="Hans" typeface="宋体"/>
+        <a:font script="Hant" typeface="新細明體"/>
+        <a:font script="Arab" typeface="Arial"/>
+        <a:font script="Hebr" typeface="Arial"/>
+        <a:font script="Thai" typeface="Cordia New"/>
+        <a:font script="Ethi" typeface="Nyala"/>
+        <a:font script="Beng" typeface="Vrinda"/>
+        <a:font script="Gujr" typeface="Shruti"/>
+        <a:font script="Khmr" typeface="DaunPenh"/>
+        <a:font script="Knda" typeface="Tunga"/>
+        <a:font script="Guru" typeface="Raavi"/>
+        <a:font script="Cans" typeface="Euphemia"/>
+        <a:font script="Cher" typeface="Plantagenet Cherokee"/>
+        <a:font script="Yiii" typeface="Microsoft Yi Baiti"/>
+        <a:font script="Tibt" typeface="Microsoft Himalaya"/>
+        <a:font script="Thaa" typeface="MV Boli"/>
+        <a:font script="Deva" typeface="Mangal"/>
+        <a:font script="Telu" typeface="Gautami"/>
+        <a:font script="Taml" typeface="Latha"/>
+        <a:font script="Syrc" typeface="Estrangelo Edessa"/>
+        <a:font script="Orya" typeface="Kalinga"/>
+        <a:font script="Mlym" typeface="Kartika"/>
+        <a:font script="Laoo" typeface="DokChampa"/>
+        <a:font script="Sinh" typeface="Iskoola Pota"/>
+        <a:font script="Mong" typeface="Mongolian Baiti"/>
+        <a:font script="Viet" typeface="Arial"/>
+        <a:font script="Uigh" typeface="Microsoft Uighur"/>
+        <a:font script="Geor" typeface="Sylfaen"/>
+      </a:minorFont>
+    </a:fontScheme>
+    <a:fmtScheme name="Office Theme">
+      <a:fillStyleLst>
+        <a:solidFill>
+          <a:schemeClr val="phClr"/>
+        </a:solidFill>
+        <a:gradFill rotWithShape="1">
+          <a:gsLst>
+            <a:gs pos="0">
+              <a:schemeClr val="phClr">
+                <a:lumMod val="110000"/>
+                <a:satMod val="105000"/>
+                <a:tint val="67000"/>
+              </a:schemeClr>
+            </a:gs>
+            <a:gs pos="50000">
+              <a:schemeClr val="phClr">
+                <a:lumMod val="105000"/>
+                <a:satMod val="103000"/>
+                <a:tint val="73000"/>
+              </a:schemeClr>
+            </a:gs>
+            <a:gs pos="100000">
+              <a:schemeClr val="phClr">
+                <a:lumMod val="105000"/>
+                <a:satMod val="109000"/>
+                <a:tint val="81000"/>
+              </a:schemeClr>
+            </a:gs>
+          </a:gsLst>
+          <a:lin ang="5400000" scaled="0"/>
+        </a:gradFill>
+        <a:gradFill rotWithShape="1">
+          <a:gsLst>
+            <a:gs pos="0">
+              <a:schemeClr val="phClr">
+                <a:satMod val="103000"/>
+                <a:lumMod val="102000"/>
+                <a:tint val="94000"/>
+              </a:schemeClr>
+            </a:gs>
+            <a:gs pos="50000">
+              <a:schemeClr val="phClr">
+                <a:satMod val="110000"/>
+                <a:lumMod val="100000"/>
+                <a:shade val="100000"/>
+              </a:schemeClr>
+            </a:gs>
+            <a:gs pos="100000">
+              <a:schemeClr val="phClr">
+                <a:lumMod val="99000"/>
+                <a:satMod val="120000"/>
+                <a:shade val="78000"/>
+              </a:schemeClr>
+            </a:gs>
+          </a:gsLst>
+          <a:lin ang="5400000" scaled="0"/>
+        </a:gradFill>
+      </a:fillStyleLst>
+      <a:lnStyleLst>
+        <a:ln w="6350" cap="flat" cmpd="sng" algn="ctr">
+          <a:solidFill>
+            <a:schemeClr val="phClr"/>
+          </a:solidFill>
+          <a:prstDash val="solid"/>
+          <a:miter lim="800000"/>
+        </a:ln>
+        <a:ln w="12700" cap="flat" cmpd="sng" algn="ctr">
+          <a:solidFill>
+            <a:schemeClr val="phClr"/>
+          </a:solidFill>
+          <a:prstDash val="solid"/>
+          <a:miter lim="800000"/>
+        </a:ln>
+        <a:ln w="19050" cap="flat" cmpd="sng" algn="ctr">
+          <a:solidFill>
+            <a:schemeClr val="phClr"/>
+          </a:solidFill>
+          <a:prstDash val="solid"/>
+          <a:miter lim="800000"/>
+        </a:ln>
+      </a:lnStyleLst>
+      <a:effectStyleLst>
+        <a:effectStyle>
+          <a:effectLst/>
+        </a:effectStyle>
+        <a:effectStyle>
+          <a:effectLst/>
+        </a:effectStyle>
+        <a:effectStyle>
+          <a:effectLst>
+            <a:outerShdw blurRad="57150" dist="19050" dir="5400000" algn="ctr" rotWithShape="0">
+              <a:srgbClr val="000000">
+                <a:alpha val="63000"/>
+              </a:srgbClr>
+            </a:outerShdw>
+          </a:effectLst>
+        </a:effectStyle>
+      </a:effectStyleLst>
+      <a:bgFillStyleLst>
+        <a:solidFill>
+          <a:schemeClr val="phClr"/>
+        </a:solidFill>
+        <a:solidFill>
+          <a:schemeClr val="phClr">
+            <a:tint val="95000"/>
+            <a:satMod val="170000"/>
+          </a:schemeClr>
+        </a:solidFill>
+        <a:gradFill rotWithShape="1">
+          <a:gsLst>
+            <a:gs pos="0">
+              <a:schemeClr val="phClr">
+                <a:tint val="93000"/>
+                <a:satMod val="150000"/>
+                <a:shade val="98000"/>
+                <a:lumMod val="102000"/>
+              </a:schemeClr>
+            </a:gs>
+            <a:gs pos="50000">
+              <a:schemeClr val="phClr">
+                <a:tint val="98000"/>
+                <a:satMod val="130000"/>
+                <a:shade val="90000"/>
+                <a:lumMod val="103000"/>
+              </a:schemeClr>
+            </a:gs>
+            <a:gs pos="100000">
+              <a:schemeClr val="phClr">
+                <a:shade val="63000"/>
+                <a:satMod val="120000"/>
+              </a:schemeClr>
+            </a:gs>
+          </a:gsLst>
+          <a:lin ang="5400000" scaled="0"/>
+        </a:gradFill>
+      </a:bgFillStyleLst>
+    </a:fmtScheme>
+  </a:themeElements>
+  <a:objectDefaults/>
+  <a:extraClrSchemeLst/>
+  <a:extLst>
+    <a:ext uri="{05A4C25C-085E-4340-85A3-A5531E510DB2}">
+      <thm15:themeFamily xmlns:thm15="http://schemas.microsoft.com/office/thememl/2012/main" name="Office Theme" id="{62F939B6-93AF-4DB8-9C6B-D6C7DFDC589F}" vid="{4A3C46E8-61CC-4603-A589-7422A47A8E4A}"/>
+    </a:ext>
+  </a:extLst>
+</a:theme>
+</file>
+
+<file path=ppt/theme/theme2.xml><?xml version="1.0" encoding="utf-8"?>
 <a:theme xmlns:a="http://schemas.openxmlformats.org/drawingml/2006/main" name="Office Theme">
   <a:themeElements>
     <a:clrScheme name="Office">

</xml_diff>

<commit_message>
Added C++ and Python code examples
</commit_message>
<xml_diff>
--- a/DataStructures/data_structures.pptx
+++ b/DataStructures/data_structures.pptx
@@ -5,20 +5,24 @@
     <p:sldMasterId id="2147483660" r:id="rId1"/>
   </p:sldMasterIdLst>
   <p:notesMasterIdLst>
-    <p:notesMasterId r:id="rId13"/>
+    <p:notesMasterId r:id="rId17"/>
   </p:notesMasterIdLst>
   <p:sldIdLst>
     <p:sldId id="256" r:id="rId2"/>
     <p:sldId id="257" r:id="rId3"/>
     <p:sldId id="258" r:id="rId4"/>
     <p:sldId id="259" r:id="rId5"/>
-    <p:sldId id="266" r:id="rId6"/>
-    <p:sldId id="260" r:id="rId7"/>
-    <p:sldId id="261" r:id="rId8"/>
-    <p:sldId id="265" r:id="rId9"/>
-    <p:sldId id="262" r:id="rId10"/>
-    <p:sldId id="263" r:id="rId11"/>
-    <p:sldId id="264" r:id="rId12"/>
+    <p:sldId id="268" r:id="rId6"/>
+    <p:sldId id="266" r:id="rId7"/>
+    <p:sldId id="260" r:id="rId8"/>
+    <p:sldId id="261" r:id="rId9"/>
+    <p:sldId id="267" r:id="rId10"/>
+    <p:sldId id="265" r:id="rId11"/>
+    <p:sldId id="269" r:id="rId12"/>
+    <p:sldId id="262" r:id="rId13"/>
+    <p:sldId id="270" r:id="rId14"/>
+    <p:sldId id="263" r:id="rId15"/>
+    <p:sldId id="264" r:id="rId16"/>
   </p:sldIdLst>
   <p:sldSz cx="9144000" cy="6858000" type="screen4x3"/>
   <p:notesSz cx="6858000" cy="9144000"/>
@@ -540,7 +544,7 @@
           <a:p>
             <a:fld id="{377ED49E-3B52-4D1C-85F4-C21F07234187}" type="slidenum">
               <a:rPr lang="en-US" smtClean="0"/>
-              <a:t>5</a:t>
+              <a:t>6</a:t>
             </a:fld>
             <a:endParaRPr lang="en-US"/>
           </a:p>
@@ -3611,6 +3615,1643 @@
           <a:p>
             <a:r>
               <a:rPr lang="en-US" dirty="0" smtClean="0"/>
+              <a:t>Tuple</a:t>
+            </a:r>
+            <a:endParaRPr lang="en-US" dirty="0"/>
+          </a:p>
+        </p:txBody>
+      </p:sp>
+      <p:sp>
+        <p:nvSpPr>
+          <p:cNvPr id="3" name="Content Placeholder 2"/>
+          <p:cNvSpPr>
+            <a:spLocks noGrp="1"/>
+          </p:cNvSpPr>
+          <p:nvPr>
+            <p:ph idx="1"/>
+          </p:nvPr>
+        </p:nvSpPr>
+        <p:spPr/>
+        <p:txBody>
+          <a:bodyPr>
+            <a:normAutofit/>
+          </a:bodyPr>
+          <a:lstStyle/>
+          <a:p>
+            <a:r>
+              <a:rPr lang="en-US" dirty="0" smtClean="0"/>
+              <a:t>Characteristics</a:t>
+            </a:r>
+          </a:p>
+          <a:p>
+            <a:pPr lvl="1"/>
+            <a:r>
+              <a:rPr lang="en-US" dirty="0" smtClean="0"/>
+              <a:t>access: random by ordinal index or keyword</a:t>
+            </a:r>
+          </a:p>
+          <a:p>
+            <a:pPr lvl="1"/>
+            <a:r>
+              <a:rPr lang="en-US" dirty="0" smtClean="0"/>
+              <a:t>ordered</a:t>
+            </a:r>
+          </a:p>
+          <a:p>
+            <a:pPr lvl="1"/>
+            <a:r>
+              <a:rPr lang="en-US" dirty="0" smtClean="0"/>
+              <a:t>fixed length</a:t>
+            </a:r>
+          </a:p>
+          <a:p>
+            <a:pPr lvl="1"/>
+            <a:r>
+              <a:rPr lang="en-US" dirty="0" smtClean="0"/>
+              <a:t>insert/update: N/A</a:t>
+            </a:r>
+          </a:p>
+          <a:p>
+            <a:pPr lvl="1"/>
+            <a:r>
+              <a:rPr lang="en-US" dirty="0" smtClean="0"/>
+              <a:t>retrieval: O(1)</a:t>
+            </a:r>
+          </a:p>
+          <a:p>
+            <a:pPr lvl="1"/>
+            <a:r>
+              <a:rPr lang="en-US" dirty="0" smtClean="0"/>
+              <a:t>search: N/A</a:t>
+            </a:r>
+          </a:p>
+          <a:p>
+            <a:pPr lvl="1"/>
+            <a:r>
+              <a:rPr lang="en-US" dirty="0" smtClean="0"/>
+              <a:t>element type: any</a:t>
+            </a:r>
+          </a:p>
+          <a:p>
+            <a:r>
+              <a:rPr lang="en-US" dirty="0" smtClean="0"/>
+              <a:t>Implementations</a:t>
+            </a:r>
+          </a:p>
+          <a:p>
+            <a:pPr lvl="1"/>
+            <a:r>
+              <a:rPr lang="en-US" dirty="0" smtClean="0"/>
+              <a:t>C/C++/Fortran/Java/Python: core language</a:t>
+            </a:r>
+          </a:p>
+          <a:p>
+            <a:pPr lvl="1"/>
+            <a:endParaRPr lang="en-US" dirty="0"/>
+          </a:p>
+        </p:txBody>
+      </p:sp>
+      <p:grpSp>
+        <p:nvGrpSpPr>
+          <p:cNvPr id="4" name="Group 3"/>
+          <p:cNvGrpSpPr/>
+          <p:nvPr/>
+        </p:nvGrpSpPr>
+        <p:grpSpPr>
+          <a:xfrm>
+            <a:off x="4699287" y="3234172"/>
+            <a:ext cx="2659967" cy="797285"/>
+            <a:chOff x="6307280" y="2566553"/>
+            <a:chExt cx="3546622" cy="1063046"/>
+          </a:xfrm>
+        </p:grpSpPr>
+        <p:graphicFrame>
+          <p:nvGraphicFramePr>
+            <p:cNvPr id="5" name="Object 4"/>
+            <p:cNvGraphicFramePr>
+              <a:graphicFrameLocks noChangeAspect="1"/>
+            </p:cNvGraphicFramePr>
+            <p:nvPr>
+              <p:extLst>
+                <p:ext uri="{D42A27DB-BD31-4B8C-83A1-F6EECF244321}">
+                  <p14:modId xmlns:p14="http://schemas.microsoft.com/office/powerpoint/2010/main" val="872199375"/>
+                </p:ext>
+              </p:extLst>
+            </p:nvPr>
+          </p:nvGraphicFramePr>
+          <p:xfrm>
+            <a:off x="7405977" y="3118424"/>
+            <a:ext cx="2447925" cy="511175"/>
+          </p:xfrm>
+          <a:graphic>
+            <a:graphicData uri="http://schemas.openxmlformats.org/presentationml/2006/ole">
+              <mc:AlternateContent xmlns:mc="http://schemas.openxmlformats.org/markup-compatibility/2006">
+                <mc:Choice xmlns:v="urn:schemas-microsoft-com:vml" Requires="v">
+                  <p:oleObj spid="_x0000_s3087" name="Equation" r:id="rId3" imgW="1091880" imgH="228600" progId="Equation.3">
+                    <p:embed/>
+                  </p:oleObj>
+                </mc:Choice>
+                <mc:Fallback>
+                  <p:oleObj name="Equation" r:id="rId3" imgW="1091880" imgH="228600" progId="Equation.3">
+                    <p:embed/>
+                    <p:pic>
+                      <p:nvPicPr>
+                        <p:cNvPr id="0" name=""/>
+                        <p:cNvPicPr/>
+                        <p:nvPr/>
+                      </p:nvPicPr>
+                      <p:blipFill>
+                        <a:blip r:embed="rId4"/>
+                        <a:stretch>
+                          <a:fillRect/>
+                        </a:stretch>
+                      </p:blipFill>
+                      <p:spPr>
+                        <a:xfrm>
+                          <a:off x="7405977" y="3118424"/>
+                          <a:ext cx="2447925" cy="511175"/>
+                        </a:xfrm>
+                        <a:prstGeom prst="rect">
+                          <a:avLst/>
+                        </a:prstGeom>
+                      </p:spPr>
+                    </p:pic>
+                  </p:oleObj>
+                </mc:Fallback>
+              </mc:AlternateContent>
+            </a:graphicData>
+          </a:graphic>
+        </p:graphicFrame>
+        <p:sp>
+          <p:nvSpPr>
+            <p:cNvPr id="6" name="TextBox 5"/>
+            <p:cNvSpPr txBox="1"/>
+            <p:nvPr/>
+          </p:nvSpPr>
+          <p:spPr>
+            <a:xfrm>
+              <a:off x="6307280" y="2566553"/>
+              <a:ext cx="1498701" cy="553997"/>
+            </a:xfrm>
+            <a:prstGeom prst="rect">
+              <a:avLst/>
+            </a:prstGeom>
+            <a:noFill/>
+          </p:spPr>
+          <p:txBody>
+            <a:bodyPr wrap="none" rtlCol="0">
+              <a:spAutoFit/>
+            </a:bodyPr>
+            <a:lstStyle/>
+            <a:p>
+              <a:r>
+                <a:rPr lang="en-US" sz="2100" i="1" dirty="0"/>
+                <a:t>d</a:t>
+              </a:r>
+              <a:r>
+                <a:rPr lang="en-US" sz="2100" dirty="0"/>
+                <a:t>-tuple </a:t>
+              </a:r>
+              <a:r>
+                <a:rPr lang="en-US" sz="2100" i="1" dirty="0">
+                  <a:latin typeface="Palatino Linotype" panose="02040502050505030304" pitchFamily="18" charset="0"/>
+                </a:rPr>
+                <a:t>t</a:t>
+              </a:r>
+            </a:p>
+          </p:txBody>
+        </p:sp>
+      </p:grpSp>
+      <p:sp>
+        <p:nvSpPr>
+          <p:cNvPr id="7" name="Slide Number Placeholder 6"/>
+          <p:cNvSpPr>
+            <a:spLocks noGrp="1"/>
+          </p:cNvSpPr>
+          <p:nvPr>
+            <p:ph type="sldNum" sz="quarter" idx="12"/>
+          </p:nvPr>
+        </p:nvSpPr>
+        <p:spPr/>
+        <p:txBody>
+          <a:bodyPr/>
+          <a:lstStyle/>
+          <a:p>
+            <a:fld id="{11AD1F4E-1E51-402E-B221-310F004E7D3B}" type="slidenum">
+              <a:rPr lang="en-US" smtClean="0"/>
+              <a:t>10</a:t>
+            </a:fld>
+            <a:endParaRPr lang="en-US"/>
+          </a:p>
+        </p:txBody>
+      </p:sp>
+    </p:spTree>
+    <p:extLst>
+      <p:ext uri="{BB962C8B-B14F-4D97-AF65-F5344CB8AC3E}">
+        <p14:creationId xmlns:p14="http://schemas.microsoft.com/office/powerpoint/2010/main" val="2505608512"/>
+      </p:ext>
+    </p:extLst>
+  </p:cSld>
+  <p:clrMapOvr>
+    <a:masterClrMapping/>
+  </p:clrMapOvr>
+  <p:timing>
+    <p:tnLst>
+      <p:par>
+        <p:cTn id="1" dur="indefinite" restart="never" nodeType="tmRoot"/>
+      </p:par>
+    </p:tnLst>
+  </p:timing>
+</p:sld>
+</file>
+
+<file path=ppt/slides/slide11.xml><?xml version="1.0" encoding="utf-8"?>
+<p:sld xmlns:a="http://schemas.openxmlformats.org/drawingml/2006/main" xmlns:r="http://schemas.openxmlformats.org/officeDocument/2006/relationships" xmlns:p="http://schemas.openxmlformats.org/presentationml/2006/main">
+  <p:cSld>
+    <p:spTree>
+      <p:nvGrpSpPr>
+        <p:cNvPr id="1" name=""/>
+        <p:cNvGrpSpPr/>
+        <p:nvPr/>
+      </p:nvGrpSpPr>
+      <p:grpSpPr>
+        <a:xfrm>
+          <a:off x="0" y="0"/>
+          <a:ext cx="0" cy="0"/>
+          <a:chOff x="0" y="0"/>
+          <a:chExt cx="0" cy="0"/>
+        </a:xfrm>
+      </p:grpSpPr>
+      <p:sp>
+        <p:nvSpPr>
+          <p:cNvPr id="2" name="Title 1"/>
+          <p:cNvSpPr>
+            <a:spLocks noGrp="1"/>
+          </p:cNvSpPr>
+          <p:nvPr>
+            <p:ph type="title"/>
+          </p:nvPr>
+        </p:nvSpPr>
+        <p:spPr/>
+        <p:txBody>
+          <a:bodyPr/>
+          <a:lstStyle/>
+          <a:p>
+            <a:r>
+              <a:rPr lang="en-US" dirty="0" smtClean="0"/>
+              <a:t>Tuple examples</a:t>
+            </a:r>
+            <a:endParaRPr lang="en-US" dirty="0"/>
+          </a:p>
+        </p:txBody>
+      </p:sp>
+      <p:sp>
+        <p:nvSpPr>
+          <p:cNvPr id="4" name="Slide Number Placeholder 3"/>
+          <p:cNvSpPr>
+            <a:spLocks noGrp="1"/>
+          </p:cNvSpPr>
+          <p:nvPr>
+            <p:ph type="sldNum" sz="quarter" idx="12"/>
+          </p:nvPr>
+        </p:nvSpPr>
+        <p:spPr/>
+        <p:txBody>
+          <a:bodyPr/>
+          <a:lstStyle/>
+          <a:p>
+            <a:fld id="{11AD1F4E-1E51-402E-B221-310F004E7D3B}" type="slidenum">
+              <a:rPr lang="en-US" smtClean="0"/>
+              <a:t>11</a:t>
+            </a:fld>
+            <a:endParaRPr lang="en-US"/>
+          </a:p>
+        </p:txBody>
+      </p:sp>
+      <p:sp>
+        <p:nvSpPr>
+          <p:cNvPr id="5" name="TextBox 4"/>
+          <p:cNvSpPr txBox="1"/>
+          <p:nvPr/>
+        </p:nvSpPr>
+        <p:spPr>
+          <a:xfrm>
+            <a:off x="628650" y="1704105"/>
+            <a:ext cx="5829300" cy="2585323"/>
+          </a:xfrm>
+          <a:prstGeom prst="rect">
+            <a:avLst/>
+          </a:prstGeom>
+          <a:solidFill>
+            <a:schemeClr val="tx2">
+              <a:lumMod val="40000"/>
+              <a:lumOff val="60000"/>
+            </a:schemeClr>
+          </a:solidFill>
+          <a:ln>
+            <a:solidFill>
+              <a:schemeClr val="tx1"/>
+            </a:solidFill>
+          </a:ln>
+        </p:spPr>
+        <p:txBody>
+          <a:bodyPr wrap="square" rtlCol="0">
+            <a:spAutoFit/>
+          </a:bodyPr>
+          <a:lstStyle/>
+          <a:p>
+            <a:r>
+              <a:rPr lang="en-US" dirty="0" err="1" smtClean="0">
+                <a:latin typeface="Courier New" panose="02070309020205020404" pitchFamily="49" charset="0"/>
+                <a:cs typeface="Courier New" panose="02070309020205020404" pitchFamily="49" charset="0"/>
+              </a:rPr>
+              <a:t>struct</a:t>
+            </a:r>
+            <a:r>
+              <a:rPr lang="en-US" dirty="0" smtClean="0">
+                <a:latin typeface="Courier New" panose="02070309020205020404" pitchFamily="49" charset="0"/>
+                <a:cs typeface="Courier New" panose="02070309020205020404" pitchFamily="49" charset="0"/>
+              </a:rPr>
+              <a:t> Data {</a:t>
+            </a:r>
+          </a:p>
+          <a:p>
+            <a:r>
+              <a:rPr lang="en-US" dirty="0">
+                <a:latin typeface="Courier New" panose="02070309020205020404" pitchFamily="49" charset="0"/>
+                <a:cs typeface="Courier New" panose="02070309020205020404" pitchFamily="49" charset="0"/>
+              </a:rPr>
+              <a:t> </a:t>
+            </a:r>
+            <a:r>
+              <a:rPr lang="en-US" dirty="0" smtClean="0">
+                <a:latin typeface="Courier New" panose="02070309020205020404" pitchFamily="49" charset="0"/>
+                <a:cs typeface="Courier New" panose="02070309020205020404" pitchFamily="49" charset="0"/>
+              </a:rPr>
+              <a:t>   double alpha;</a:t>
+            </a:r>
+          </a:p>
+          <a:p>
+            <a:r>
+              <a:rPr lang="en-US" dirty="0">
+                <a:latin typeface="Courier New" panose="02070309020205020404" pitchFamily="49" charset="0"/>
+                <a:cs typeface="Courier New" panose="02070309020205020404" pitchFamily="49" charset="0"/>
+              </a:rPr>
+              <a:t> </a:t>
+            </a:r>
+            <a:r>
+              <a:rPr lang="en-US" dirty="0" smtClean="0">
+                <a:latin typeface="Courier New" panose="02070309020205020404" pitchFamily="49" charset="0"/>
+                <a:cs typeface="Courier New" panose="02070309020205020404" pitchFamily="49" charset="0"/>
+              </a:rPr>
+              <a:t>   </a:t>
+            </a:r>
+            <a:r>
+              <a:rPr lang="en-US" dirty="0" err="1" smtClean="0">
+                <a:latin typeface="Courier New" panose="02070309020205020404" pitchFamily="49" charset="0"/>
+                <a:cs typeface="Courier New" panose="02070309020205020404" pitchFamily="49" charset="0"/>
+              </a:rPr>
+              <a:t>int</a:t>
+            </a:r>
+            <a:r>
+              <a:rPr lang="en-US" dirty="0" smtClean="0">
+                <a:latin typeface="Courier New" panose="02070309020205020404" pitchFamily="49" charset="0"/>
+                <a:cs typeface="Courier New" panose="02070309020205020404" pitchFamily="49" charset="0"/>
+              </a:rPr>
+              <a:t> n;</a:t>
+            </a:r>
+          </a:p>
+          <a:p>
+            <a:r>
+              <a:rPr lang="en-US" dirty="0" smtClean="0">
+                <a:latin typeface="Courier New" panose="02070309020205020404" pitchFamily="49" charset="0"/>
+                <a:cs typeface="Courier New" panose="02070309020205020404" pitchFamily="49" charset="0"/>
+              </a:rPr>
+              <a:t>};</a:t>
+            </a:r>
+          </a:p>
+          <a:p>
+            <a:r>
+              <a:rPr lang="en-US" dirty="0" err="1" smtClean="0">
+                <a:latin typeface="Courier New" panose="02070309020205020404" pitchFamily="49" charset="0"/>
+                <a:cs typeface="Courier New" panose="02070309020205020404" pitchFamily="49" charset="0"/>
+              </a:rPr>
+              <a:t>struct</a:t>
+            </a:r>
+            <a:r>
+              <a:rPr lang="en-US" dirty="0" smtClean="0">
+                <a:latin typeface="Courier New" panose="02070309020205020404" pitchFamily="49" charset="0"/>
+                <a:cs typeface="Courier New" panose="02070309020205020404" pitchFamily="49" charset="0"/>
+              </a:rPr>
+              <a:t> Data </a:t>
+            </a:r>
+            <a:r>
+              <a:rPr lang="en-US" dirty="0" err="1" smtClean="0">
+                <a:latin typeface="Courier New" panose="02070309020205020404" pitchFamily="49" charset="0"/>
+                <a:cs typeface="Courier New" panose="02070309020205020404" pitchFamily="49" charset="0"/>
+              </a:rPr>
+              <a:t>data</a:t>
+            </a:r>
+            <a:r>
+              <a:rPr lang="en-US" dirty="0" smtClean="0">
+                <a:latin typeface="Courier New" panose="02070309020205020404" pitchFamily="49" charset="0"/>
+                <a:cs typeface="Courier New" panose="02070309020205020404" pitchFamily="49" charset="0"/>
+              </a:rPr>
+              <a:t> = {</a:t>
+            </a:r>
+          </a:p>
+          <a:p>
+            <a:r>
+              <a:rPr lang="en-US" dirty="0">
+                <a:latin typeface="Courier New" panose="02070309020205020404" pitchFamily="49" charset="0"/>
+                <a:cs typeface="Courier New" panose="02070309020205020404" pitchFamily="49" charset="0"/>
+              </a:rPr>
+              <a:t> </a:t>
+            </a:r>
+            <a:r>
+              <a:rPr lang="en-US" dirty="0" smtClean="0">
+                <a:latin typeface="Courier New" panose="02070309020205020404" pitchFamily="49" charset="0"/>
+                <a:cs typeface="Courier New" panose="02070309020205020404" pitchFamily="49" charset="0"/>
+              </a:rPr>
+              <a:t>   .alpha = 3.5,</a:t>
+            </a:r>
+          </a:p>
+          <a:p>
+            <a:r>
+              <a:rPr lang="en-US" dirty="0">
+                <a:latin typeface="Courier New" panose="02070309020205020404" pitchFamily="49" charset="0"/>
+                <a:cs typeface="Courier New" panose="02070309020205020404" pitchFamily="49" charset="0"/>
+              </a:rPr>
+              <a:t> </a:t>
+            </a:r>
+            <a:r>
+              <a:rPr lang="en-US" dirty="0" smtClean="0">
+                <a:latin typeface="Courier New" panose="02070309020205020404" pitchFamily="49" charset="0"/>
+                <a:cs typeface="Courier New" panose="02070309020205020404" pitchFamily="49" charset="0"/>
+              </a:rPr>
+              <a:t>   .n = 10</a:t>
+            </a:r>
+          </a:p>
+          <a:p>
+            <a:r>
+              <a:rPr lang="en-US" dirty="0" smtClean="0">
+                <a:latin typeface="Courier New" panose="02070309020205020404" pitchFamily="49" charset="0"/>
+                <a:cs typeface="Courier New" panose="02070309020205020404" pitchFamily="49" charset="0"/>
+              </a:rPr>
+              <a:t>};</a:t>
+            </a:r>
+          </a:p>
+          <a:p>
+            <a:r>
+              <a:rPr lang="en-US" dirty="0" err="1" smtClean="0">
+                <a:latin typeface="Courier New" panose="02070309020205020404" pitchFamily="49" charset="0"/>
+                <a:cs typeface="Courier New" panose="02070309020205020404" pitchFamily="49" charset="0"/>
+              </a:rPr>
+              <a:t>data.alpha</a:t>
+            </a:r>
+            <a:r>
+              <a:rPr lang="en-US" dirty="0" smtClean="0">
+                <a:latin typeface="Courier New" panose="02070309020205020404" pitchFamily="49" charset="0"/>
+                <a:cs typeface="Courier New" panose="02070309020205020404" pitchFamily="49" charset="0"/>
+              </a:rPr>
+              <a:t> = 0.5*</a:t>
+            </a:r>
+            <a:r>
+              <a:rPr lang="en-US" dirty="0" err="1" smtClean="0">
+                <a:latin typeface="Courier New" panose="02070309020205020404" pitchFamily="49" charset="0"/>
+                <a:cs typeface="Courier New" panose="02070309020205020404" pitchFamily="49" charset="0"/>
+              </a:rPr>
+              <a:t>data.n</a:t>
+            </a:r>
+            <a:r>
+              <a:rPr lang="en-US" dirty="0" smtClean="0">
+                <a:latin typeface="Courier New" panose="02070309020205020404" pitchFamily="49" charset="0"/>
+                <a:cs typeface="Courier New" panose="02070309020205020404" pitchFamily="49" charset="0"/>
+              </a:rPr>
+              <a:t>;</a:t>
+            </a:r>
+            <a:endParaRPr lang="en-US" dirty="0">
+              <a:latin typeface="Courier New" panose="02070309020205020404" pitchFamily="49" charset="0"/>
+              <a:cs typeface="Courier New" panose="02070309020205020404" pitchFamily="49" charset="0"/>
+            </a:endParaRPr>
+          </a:p>
+        </p:txBody>
+      </p:sp>
+      <p:sp>
+        <p:nvSpPr>
+          <p:cNvPr id="6" name="TextBox 5"/>
+          <p:cNvSpPr txBox="1"/>
+          <p:nvPr/>
+        </p:nvSpPr>
+        <p:spPr>
+          <a:xfrm>
+            <a:off x="628650" y="4734791"/>
+            <a:ext cx="5836854" cy="1477328"/>
+          </a:xfrm>
+          <a:prstGeom prst="rect">
+            <a:avLst/>
+          </a:prstGeom>
+          <a:solidFill>
+            <a:schemeClr val="accent4">
+              <a:lumMod val="40000"/>
+              <a:lumOff val="60000"/>
+            </a:schemeClr>
+          </a:solidFill>
+          <a:ln>
+            <a:solidFill>
+              <a:schemeClr val="tx1"/>
+            </a:solidFill>
+          </a:ln>
+        </p:spPr>
+        <p:txBody>
+          <a:bodyPr wrap="none" rtlCol="0">
+            <a:spAutoFit/>
+          </a:bodyPr>
+          <a:lstStyle/>
+          <a:p>
+            <a:r>
+              <a:rPr lang="en-US" dirty="0" smtClean="0">
+                <a:latin typeface="Courier New" panose="02070309020205020404" pitchFamily="49" charset="0"/>
+                <a:cs typeface="Courier New" panose="02070309020205020404" pitchFamily="49" charset="0"/>
+              </a:rPr>
+              <a:t>from collections import </a:t>
+            </a:r>
+            <a:r>
+              <a:rPr lang="en-US" dirty="0" err="1" smtClean="0">
+                <a:latin typeface="Courier New" panose="02070309020205020404" pitchFamily="49" charset="0"/>
+                <a:cs typeface="Courier New" panose="02070309020205020404" pitchFamily="49" charset="0"/>
+              </a:rPr>
+              <a:t>namedtuple</a:t>
+            </a:r>
+            <a:endParaRPr lang="en-US" dirty="0" smtClean="0">
+              <a:latin typeface="Courier New" panose="02070309020205020404" pitchFamily="49" charset="0"/>
+              <a:cs typeface="Courier New" panose="02070309020205020404" pitchFamily="49" charset="0"/>
+            </a:endParaRPr>
+          </a:p>
+          <a:p>
+            <a:r>
+              <a:rPr lang="en-US" dirty="0" smtClean="0">
+                <a:latin typeface="Courier New" panose="02070309020205020404" pitchFamily="49" charset="0"/>
+                <a:cs typeface="Courier New" panose="02070309020205020404" pitchFamily="49" charset="0"/>
+              </a:rPr>
+              <a:t>Data = </a:t>
+            </a:r>
+            <a:r>
+              <a:rPr lang="en-US" dirty="0" err="1" smtClean="0">
+                <a:latin typeface="Courier New" panose="02070309020205020404" pitchFamily="49" charset="0"/>
+                <a:cs typeface="Courier New" panose="02070309020205020404" pitchFamily="49" charset="0"/>
+              </a:rPr>
+              <a:t>namedtuple</a:t>
+            </a:r>
+            <a:r>
+              <a:rPr lang="en-US" dirty="0" smtClean="0">
+                <a:latin typeface="Courier New" panose="02070309020205020404" pitchFamily="49" charset="0"/>
+                <a:cs typeface="Courier New" panose="02070309020205020404" pitchFamily="49" charset="0"/>
+              </a:rPr>
+              <a:t>('Data', ['alpha', 'n'])</a:t>
+            </a:r>
+          </a:p>
+          <a:p>
+            <a:r>
+              <a:rPr lang="en-US" dirty="0" smtClean="0">
+                <a:latin typeface="Courier New" panose="02070309020205020404" pitchFamily="49" charset="0"/>
+                <a:cs typeface="Courier New" panose="02070309020205020404" pitchFamily="49" charset="0"/>
+              </a:rPr>
+              <a:t>data = Data(alpha=3.5, n=10)</a:t>
+            </a:r>
+          </a:p>
+          <a:p>
+            <a:r>
+              <a:rPr lang="en-US" dirty="0" smtClean="0">
+                <a:latin typeface="Courier New" panose="02070309020205020404" pitchFamily="49" charset="0"/>
+                <a:cs typeface="Courier New" panose="02070309020205020404" pitchFamily="49" charset="0"/>
+              </a:rPr>
+              <a:t>print(</a:t>
+            </a:r>
+            <a:r>
+              <a:rPr lang="en-US" dirty="0" err="1" smtClean="0">
+                <a:latin typeface="Courier New" panose="02070309020205020404" pitchFamily="49" charset="0"/>
+                <a:cs typeface="Courier New" panose="02070309020205020404" pitchFamily="49" charset="0"/>
+              </a:rPr>
+              <a:t>data.alpha</a:t>
+            </a:r>
+            <a:r>
+              <a:rPr lang="en-US" dirty="0" smtClean="0">
+                <a:latin typeface="Courier New" panose="02070309020205020404" pitchFamily="49" charset="0"/>
+                <a:cs typeface="Courier New" panose="02070309020205020404" pitchFamily="49" charset="0"/>
+              </a:rPr>
+              <a:t>, data[1])</a:t>
+            </a:r>
+          </a:p>
+          <a:p>
+            <a:r>
+              <a:rPr lang="en-US" dirty="0" err="1" smtClean="0">
+                <a:latin typeface="Courier New" panose="02070309020205020404" pitchFamily="49" charset="0"/>
+                <a:cs typeface="Courier New" panose="02070309020205020404" pitchFamily="49" charset="0"/>
+              </a:rPr>
+              <a:t>data.n</a:t>
+            </a:r>
+            <a:r>
+              <a:rPr lang="en-US" dirty="0" smtClean="0">
+                <a:latin typeface="Courier New" panose="02070309020205020404" pitchFamily="49" charset="0"/>
+                <a:cs typeface="Courier New" panose="02070309020205020404" pitchFamily="49" charset="0"/>
+              </a:rPr>
+              <a:t> = 100</a:t>
+            </a:r>
+          </a:p>
+        </p:txBody>
+      </p:sp>
+      <p:cxnSp>
+        <p:nvCxnSpPr>
+          <p:cNvPr id="7" name="Straight Connector 6"/>
+          <p:cNvCxnSpPr/>
+          <p:nvPr/>
+        </p:nvCxnSpPr>
+        <p:spPr>
+          <a:xfrm>
+            <a:off x="498764" y="5902036"/>
+            <a:ext cx="2088572" cy="310083"/>
+          </a:xfrm>
+          <a:prstGeom prst="line">
+            <a:avLst/>
+          </a:prstGeom>
+          <a:ln w="38100">
+            <a:solidFill>
+              <a:srgbClr val="C00000"/>
+            </a:solidFill>
+          </a:ln>
+        </p:spPr>
+        <p:style>
+          <a:lnRef idx="1">
+            <a:schemeClr val="accent1"/>
+          </a:lnRef>
+          <a:fillRef idx="0">
+            <a:schemeClr val="accent1"/>
+          </a:fillRef>
+          <a:effectRef idx="0">
+            <a:schemeClr val="accent1"/>
+          </a:effectRef>
+          <a:fontRef idx="minor">
+            <a:schemeClr val="tx1"/>
+          </a:fontRef>
+        </p:style>
+      </p:cxnSp>
+    </p:spTree>
+    <p:extLst>
+      <p:ext uri="{BB962C8B-B14F-4D97-AF65-F5344CB8AC3E}">
+        <p14:creationId xmlns:p14="http://schemas.microsoft.com/office/powerpoint/2010/main" val="2082031519"/>
+      </p:ext>
+    </p:extLst>
+  </p:cSld>
+  <p:clrMapOvr>
+    <a:masterClrMapping/>
+  </p:clrMapOvr>
+  <p:timing>
+    <p:tnLst>
+      <p:par>
+        <p:cTn id="1" dur="indefinite" restart="never" nodeType="tmRoot"/>
+      </p:par>
+    </p:tnLst>
+  </p:timing>
+</p:sld>
+</file>
+
+<file path=ppt/slides/slide12.xml><?xml version="1.0" encoding="utf-8"?>
+<p:sld xmlns:a="http://schemas.openxmlformats.org/drawingml/2006/main" xmlns:r="http://schemas.openxmlformats.org/officeDocument/2006/relationships" xmlns:p="http://schemas.openxmlformats.org/presentationml/2006/main">
+  <p:cSld>
+    <p:spTree>
+      <p:nvGrpSpPr>
+        <p:cNvPr id="1" name=""/>
+        <p:cNvGrpSpPr/>
+        <p:nvPr/>
+      </p:nvGrpSpPr>
+      <p:grpSpPr>
+        <a:xfrm>
+          <a:off x="0" y="0"/>
+          <a:ext cx="0" cy="0"/>
+          <a:chOff x="0" y="0"/>
+          <a:chExt cx="0" cy="0"/>
+        </a:xfrm>
+      </p:grpSpPr>
+      <p:sp>
+        <p:nvSpPr>
+          <p:cNvPr id="2" name="Title 1"/>
+          <p:cNvSpPr>
+            <a:spLocks noGrp="1"/>
+          </p:cNvSpPr>
+          <p:nvPr>
+            <p:ph type="title"/>
+          </p:nvPr>
+        </p:nvSpPr>
+        <p:spPr/>
+        <p:txBody>
+          <a:bodyPr/>
+          <a:lstStyle/>
+          <a:p>
+            <a:r>
+              <a:rPr lang="en-US" dirty="0" smtClean="0"/>
+              <a:t>List</a:t>
+            </a:r>
+            <a:endParaRPr lang="en-US" dirty="0"/>
+          </a:p>
+        </p:txBody>
+      </p:sp>
+      <p:sp>
+        <p:nvSpPr>
+          <p:cNvPr id="3" name="Content Placeholder 2"/>
+          <p:cNvSpPr>
+            <a:spLocks noGrp="1"/>
+          </p:cNvSpPr>
+          <p:nvPr>
+            <p:ph idx="1"/>
+          </p:nvPr>
+        </p:nvSpPr>
+        <p:spPr/>
+        <p:txBody>
+          <a:bodyPr>
+            <a:normAutofit fontScale="92500" lnSpcReduction="20000"/>
+          </a:bodyPr>
+          <a:lstStyle/>
+          <a:p>
+            <a:r>
+              <a:rPr lang="en-US" dirty="0" smtClean="0"/>
+              <a:t>Characteristics</a:t>
+            </a:r>
+          </a:p>
+          <a:p>
+            <a:pPr lvl="1"/>
+            <a:r>
+              <a:rPr lang="en-US" dirty="0" smtClean="0"/>
+              <a:t>access: random by ordinal index</a:t>
+            </a:r>
+          </a:p>
+          <a:p>
+            <a:pPr lvl="1"/>
+            <a:r>
+              <a:rPr lang="en-US" dirty="0" smtClean="0"/>
+              <a:t>ordered</a:t>
+            </a:r>
+          </a:p>
+          <a:p>
+            <a:pPr lvl="1"/>
+            <a:r>
+              <a:rPr lang="en-US" dirty="0" smtClean="0"/>
+              <a:t>length can vary</a:t>
+            </a:r>
+          </a:p>
+          <a:p>
+            <a:pPr lvl="1"/>
+            <a:r>
+              <a:rPr lang="en-US" dirty="0" smtClean="0"/>
+              <a:t>insert/update: O(n)</a:t>
+            </a:r>
+          </a:p>
+          <a:p>
+            <a:pPr lvl="1"/>
+            <a:r>
+              <a:rPr lang="en-US" dirty="0" smtClean="0"/>
+              <a:t>retrieval: O(n)</a:t>
+            </a:r>
+          </a:p>
+          <a:p>
+            <a:pPr lvl="1"/>
+            <a:r>
+              <a:rPr lang="en-US" dirty="0" smtClean="0"/>
+              <a:t>search: O(n)</a:t>
+            </a:r>
+          </a:p>
+          <a:p>
+            <a:pPr lvl="1"/>
+            <a:r>
+              <a:rPr lang="en-US" dirty="0" smtClean="0"/>
+              <a:t>prepend/append/pop/</a:t>
+            </a:r>
+            <a:r>
+              <a:rPr lang="en-US" dirty="0" err="1" smtClean="0"/>
+              <a:t>unshift</a:t>
+            </a:r>
+            <a:r>
+              <a:rPr lang="en-US" dirty="0" smtClean="0"/>
+              <a:t>: O(1)</a:t>
+            </a:r>
+          </a:p>
+          <a:p>
+            <a:pPr lvl="1"/>
+            <a:r>
+              <a:rPr lang="en-US" dirty="0" smtClean="0"/>
+              <a:t>element type: any</a:t>
+            </a:r>
+          </a:p>
+          <a:p>
+            <a:pPr lvl="1"/>
+            <a:r>
+              <a:rPr lang="en-US" dirty="0" smtClean="0"/>
+              <a:t>operations: concatenation</a:t>
+            </a:r>
+          </a:p>
+          <a:p>
+            <a:r>
+              <a:rPr lang="en-US" dirty="0" smtClean="0"/>
+              <a:t>Implementations</a:t>
+            </a:r>
+          </a:p>
+          <a:p>
+            <a:pPr lvl="1"/>
+            <a:r>
+              <a:rPr lang="en-US" dirty="0" smtClean="0"/>
+              <a:t>C++/Java: standard library</a:t>
+            </a:r>
+          </a:p>
+          <a:p>
+            <a:pPr lvl="1"/>
+            <a:r>
+              <a:rPr lang="en-US" dirty="0" smtClean="0"/>
+              <a:t>Python: core language</a:t>
+            </a:r>
+          </a:p>
+          <a:p>
+            <a:pPr lvl="1"/>
+            <a:endParaRPr lang="en-US" dirty="0"/>
+          </a:p>
+        </p:txBody>
+      </p:sp>
+      <p:grpSp>
+        <p:nvGrpSpPr>
+          <p:cNvPr id="4" name="Group 3"/>
+          <p:cNvGrpSpPr/>
+          <p:nvPr/>
+        </p:nvGrpSpPr>
+        <p:grpSpPr>
+          <a:xfrm>
+            <a:off x="6457950" y="3296518"/>
+            <a:ext cx="1174823" cy="808001"/>
+            <a:chOff x="6307280" y="2566553"/>
+            <a:chExt cx="1566431" cy="1077334"/>
+          </a:xfrm>
+        </p:grpSpPr>
+        <p:graphicFrame>
+          <p:nvGraphicFramePr>
+            <p:cNvPr id="5" name="Object 4"/>
+            <p:cNvGraphicFramePr>
+              <a:graphicFrameLocks noChangeAspect="1"/>
+            </p:cNvGraphicFramePr>
+            <p:nvPr>
+              <p:extLst>
+                <p:ext uri="{D42A27DB-BD31-4B8C-83A1-F6EECF244321}">
+                  <p14:modId xmlns:p14="http://schemas.microsoft.com/office/powerpoint/2010/main" val="2802905344"/>
+                </p:ext>
+              </p:extLst>
+            </p:nvPr>
+          </p:nvGraphicFramePr>
+          <p:xfrm>
+            <a:off x="6933911" y="3104137"/>
+            <a:ext cx="939800" cy="539750"/>
+          </p:xfrm>
+          <a:graphic>
+            <a:graphicData uri="http://schemas.openxmlformats.org/presentationml/2006/ole">
+              <mc:AlternateContent xmlns:mc="http://schemas.openxmlformats.org/markup-compatibility/2006">
+                <mc:Choice xmlns:v="urn:schemas-microsoft-com:vml" Requires="v">
+                  <p:oleObj spid="_x0000_s4106" name="Equation" r:id="rId3" imgW="419040" imgH="241200" progId="Equation.3">
+                    <p:embed/>
+                  </p:oleObj>
+                </mc:Choice>
+                <mc:Fallback>
+                  <p:oleObj name="Equation" r:id="rId3" imgW="419040" imgH="241200" progId="Equation.3">
+                    <p:embed/>
+                    <p:pic>
+                      <p:nvPicPr>
+                        <p:cNvPr id="0" name=""/>
+                        <p:cNvPicPr/>
+                        <p:nvPr/>
+                      </p:nvPicPr>
+                      <p:blipFill>
+                        <a:blip r:embed="rId4"/>
+                        <a:stretch>
+                          <a:fillRect/>
+                        </a:stretch>
+                      </p:blipFill>
+                      <p:spPr>
+                        <a:xfrm>
+                          <a:off x="6933911" y="3104137"/>
+                          <a:ext cx="939800" cy="539750"/>
+                        </a:xfrm>
+                        <a:prstGeom prst="rect">
+                          <a:avLst/>
+                        </a:prstGeom>
+                      </p:spPr>
+                    </p:pic>
+                  </p:oleObj>
+                </mc:Fallback>
+              </mc:AlternateContent>
+            </a:graphicData>
+          </a:graphic>
+        </p:graphicFrame>
+        <p:sp>
+          <p:nvSpPr>
+            <p:cNvPr id="6" name="TextBox 5"/>
+            <p:cNvSpPr txBox="1"/>
+            <p:nvPr/>
+          </p:nvSpPr>
+          <p:spPr>
+            <a:xfrm>
+              <a:off x="6307280" y="2566553"/>
+              <a:ext cx="851344" cy="553997"/>
+            </a:xfrm>
+            <a:prstGeom prst="rect">
+              <a:avLst/>
+            </a:prstGeom>
+            <a:noFill/>
+          </p:spPr>
+          <p:txBody>
+            <a:bodyPr wrap="none" rtlCol="0">
+              <a:spAutoFit/>
+            </a:bodyPr>
+            <a:lstStyle/>
+            <a:p>
+              <a:r>
+                <a:rPr lang="en-US" sz="2100" dirty="0"/>
+                <a:t>list </a:t>
+              </a:r>
+              <a:r>
+                <a:rPr lang="en-US" sz="2100" i="1" dirty="0">
+                  <a:latin typeface="Palatino Linotype" panose="02040502050505030304" pitchFamily="18" charset="0"/>
+                </a:rPr>
+                <a:t>l</a:t>
+              </a:r>
+            </a:p>
+          </p:txBody>
+        </p:sp>
+      </p:grpSp>
+      <p:sp>
+        <p:nvSpPr>
+          <p:cNvPr id="7" name="Slide Number Placeholder 6"/>
+          <p:cNvSpPr>
+            <a:spLocks noGrp="1"/>
+          </p:cNvSpPr>
+          <p:nvPr>
+            <p:ph type="sldNum" sz="quarter" idx="12"/>
+          </p:nvPr>
+        </p:nvSpPr>
+        <p:spPr/>
+        <p:txBody>
+          <a:bodyPr/>
+          <a:lstStyle/>
+          <a:p>
+            <a:fld id="{11AD1F4E-1E51-402E-B221-310F004E7D3B}" type="slidenum">
+              <a:rPr lang="en-US" smtClean="0"/>
+              <a:t>12</a:t>
+            </a:fld>
+            <a:endParaRPr lang="en-US"/>
+          </a:p>
+        </p:txBody>
+      </p:sp>
+    </p:spTree>
+    <p:extLst>
+      <p:ext uri="{BB962C8B-B14F-4D97-AF65-F5344CB8AC3E}">
+        <p14:creationId xmlns:p14="http://schemas.microsoft.com/office/powerpoint/2010/main" val="2248761884"/>
+      </p:ext>
+    </p:extLst>
+  </p:cSld>
+  <p:clrMapOvr>
+    <a:masterClrMapping/>
+  </p:clrMapOvr>
+  <p:timing>
+    <p:tnLst>
+      <p:par>
+        <p:cTn id="1" dur="indefinite" restart="never" nodeType="tmRoot"/>
+      </p:par>
+    </p:tnLst>
+  </p:timing>
+</p:sld>
+</file>
+
+<file path=ppt/slides/slide13.xml><?xml version="1.0" encoding="utf-8"?>
+<p:sld xmlns:a="http://schemas.openxmlformats.org/drawingml/2006/main" xmlns:r="http://schemas.openxmlformats.org/officeDocument/2006/relationships" xmlns:p="http://schemas.openxmlformats.org/presentationml/2006/main">
+  <p:cSld>
+    <p:spTree>
+      <p:nvGrpSpPr>
+        <p:cNvPr id="1" name=""/>
+        <p:cNvGrpSpPr/>
+        <p:nvPr/>
+      </p:nvGrpSpPr>
+      <p:grpSpPr>
+        <a:xfrm>
+          <a:off x="0" y="0"/>
+          <a:ext cx="0" cy="0"/>
+          <a:chOff x="0" y="0"/>
+          <a:chExt cx="0" cy="0"/>
+        </a:xfrm>
+      </p:grpSpPr>
+      <p:sp>
+        <p:nvSpPr>
+          <p:cNvPr id="2" name="Title 1"/>
+          <p:cNvSpPr>
+            <a:spLocks noGrp="1"/>
+          </p:cNvSpPr>
+          <p:nvPr>
+            <p:ph type="title"/>
+          </p:nvPr>
+        </p:nvSpPr>
+        <p:spPr/>
+        <p:txBody>
+          <a:bodyPr/>
+          <a:lstStyle/>
+          <a:p>
+            <a:r>
+              <a:rPr lang="en-US" dirty="0" smtClean="0"/>
+              <a:t>List examples</a:t>
+            </a:r>
+            <a:endParaRPr lang="en-US" dirty="0"/>
+          </a:p>
+        </p:txBody>
+      </p:sp>
+      <p:sp>
+        <p:nvSpPr>
+          <p:cNvPr id="4" name="Slide Number Placeholder 3"/>
+          <p:cNvSpPr>
+            <a:spLocks noGrp="1"/>
+          </p:cNvSpPr>
+          <p:nvPr>
+            <p:ph type="sldNum" sz="quarter" idx="12"/>
+          </p:nvPr>
+        </p:nvSpPr>
+        <p:spPr/>
+        <p:txBody>
+          <a:bodyPr/>
+          <a:lstStyle/>
+          <a:p>
+            <a:fld id="{11AD1F4E-1E51-402E-B221-310F004E7D3B}" type="slidenum">
+              <a:rPr lang="en-US" smtClean="0"/>
+              <a:t>13</a:t>
+            </a:fld>
+            <a:endParaRPr lang="en-US"/>
+          </a:p>
+        </p:txBody>
+      </p:sp>
+      <p:sp>
+        <p:nvSpPr>
+          <p:cNvPr id="5" name="TextBox 4"/>
+          <p:cNvSpPr txBox="1"/>
+          <p:nvPr/>
+        </p:nvSpPr>
+        <p:spPr>
+          <a:xfrm>
+            <a:off x="628650" y="1704105"/>
+            <a:ext cx="6665768" cy="2308324"/>
+          </a:xfrm>
+          <a:prstGeom prst="rect">
+            <a:avLst/>
+          </a:prstGeom>
+          <a:solidFill>
+            <a:schemeClr val="tx2">
+              <a:lumMod val="40000"/>
+              <a:lumOff val="60000"/>
+            </a:schemeClr>
+          </a:solidFill>
+          <a:ln>
+            <a:solidFill>
+              <a:schemeClr val="tx1"/>
+            </a:solidFill>
+          </a:ln>
+        </p:spPr>
+        <p:txBody>
+          <a:bodyPr wrap="square" rtlCol="0">
+            <a:spAutoFit/>
+          </a:bodyPr>
+          <a:lstStyle/>
+          <a:p>
+            <a:r>
+              <a:rPr lang="en-US" dirty="0" smtClean="0">
+                <a:latin typeface="Courier New" panose="02070309020205020404" pitchFamily="49" charset="0"/>
+                <a:cs typeface="Courier New" panose="02070309020205020404" pitchFamily="49" charset="0"/>
+              </a:rPr>
+              <a:t>#include &lt;</a:t>
+            </a:r>
+            <a:r>
+              <a:rPr lang="en-US" dirty="0" err="1" smtClean="0">
+                <a:latin typeface="Courier New" panose="02070309020205020404" pitchFamily="49" charset="0"/>
+                <a:cs typeface="Courier New" panose="02070309020205020404" pitchFamily="49" charset="0"/>
+              </a:rPr>
+              <a:t>iostream</a:t>
+            </a:r>
+            <a:r>
+              <a:rPr lang="en-US" dirty="0" smtClean="0">
+                <a:latin typeface="Courier New" panose="02070309020205020404" pitchFamily="49" charset="0"/>
+                <a:cs typeface="Courier New" panose="02070309020205020404" pitchFamily="49" charset="0"/>
+              </a:rPr>
+              <a:t>&gt;</a:t>
+            </a:r>
+          </a:p>
+          <a:p>
+            <a:r>
+              <a:rPr lang="en-US" dirty="0" smtClean="0">
+                <a:latin typeface="Courier New" panose="02070309020205020404" pitchFamily="49" charset="0"/>
+                <a:cs typeface="Courier New" panose="02070309020205020404" pitchFamily="49" charset="0"/>
+              </a:rPr>
+              <a:t>#include &lt;list&gt;</a:t>
+            </a:r>
+          </a:p>
+          <a:p>
+            <a:r>
+              <a:rPr lang="en-US" dirty="0" err="1" smtClean="0">
+                <a:latin typeface="Courier New" panose="02070309020205020404" pitchFamily="49" charset="0"/>
+                <a:cs typeface="Courier New" panose="02070309020205020404" pitchFamily="49" charset="0"/>
+              </a:rPr>
+              <a:t>std</a:t>
+            </a:r>
+            <a:r>
+              <a:rPr lang="en-US" dirty="0" smtClean="0">
+                <a:latin typeface="Courier New" panose="02070309020205020404" pitchFamily="49" charset="0"/>
+                <a:cs typeface="Courier New" panose="02070309020205020404" pitchFamily="49" charset="0"/>
+              </a:rPr>
+              <a:t>::list&lt;</a:t>
+            </a:r>
+            <a:r>
+              <a:rPr lang="en-US" dirty="0" err="1" smtClean="0">
+                <a:latin typeface="Courier New" panose="02070309020205020404" pitchFamily="49" charset="0"/>
+                <a:cs typeface="Courier New" panose="02070309020205020404" pitchFamily="49" charset="0"/>
+              </a:rPr>
+              <a:t>int</a:t>
+            </a:r>
+            <a:r>
+              <a:rPr lang="en-US" dirty="0" smtClean="0">
+                <a:latin typeface="Courier New" panose="02070309020205020404" pitchFamily="49" charset="0"/>
+                <a:cs typeface="Courier New" panose="02070309020205020404" pitchFamily="49" charset="0"/>
+              </a:rPr>
+              <a:t>&gt; l;</a:t>
+            </a:r>
+          </a:p>
+          <a:p>
+            <a:r>
+              <a:rPr lang="en-US" dirty="0" smtClean="0">
+                <a:latin typeface="Courier New" panose="02070309020205020404" pitchFamily="49" charset="0"/>
+                <a:cs typeface="Courier New" panose="02070309020205020404" pitchFamily="49" charset="0"/>
+              </a:rPr>
+              <a:t>for (</a:t>
+            </a:r>
+            <a:r>
+              <a:rPr lang="en-US" dirty="0" err="1" smtClean="0">
+                <a:latin typeface="Courier New" panose="02070309020205020404" pitchFamily="49" charset="0"/>
+                <a:cs typeface="Courier New" panose="02070309020205020404" pitchFamily="49" charset="0"/>
+              </a:rPr>
+              <a:t>i</a:t>
+            </a:r>
+            <a:r>
+              <a:rPr lang="en-US" dirty="0" smtClean="0">
+                <a:latin typeface="Courier New" panose="02070309020205020404" pitchFamily="49" charset="0"/>
+                <a:cs typeface="Courier New" panose="02070309020205020404" pitchFamily="49" charset="0"/>
+              </a:rPr>
+              <a:t> = 0; </a:t>
+            </a:r>
+            <a:r>
+              <a:rPr lang="en-US" dirty="0" err="1" smtClean="0">
+                <a:latin typeface="Courier New" panose="02070309020205020404" pitchFamily="49" charset="0"/>
+                <a:cs typeface="Courier New" panose="02070309020205020404" pitchFamily="49" charset="0"/>
+              </a:rPr>
+              <a:t>i</a:t>
+            </a:r>
+            <a:r>
+              <a:rPr lang="en-US" dirty="0" smtClean="0">
+                <a:latin typeface="Courier New" panose="02070309020205020404" pitchFamily="49" charset="0"/>
+                <a:cs typeface="Courier New" panose="02070309020205020404" pitchFamily="49" charset="0"/>
+              </a:rPr>
+              <a:t> &lt; 10; </a:t>
+            </a:r>
+            <a:r>
+              <a:rPr lang="en-US" dirty="0" err="1" smtClean="0">
+                <a:latin typeface="Courier New" panose="02070309020205020404" pitchFamily="49" charset="0"/>
+                <a:cs typeface="Courier New" panose="02070309020205020404" pitchFamily="49" charset="0"/>
+              </a:rPr>
+              <a:t>i</a:t>
+            </a:r>
+            <a:r>
+              <a:rPr lang="en-US" dirty="0" smtClean="0">
+                <a:latin typeface="Courier New" panose="02070309020205020404" pitchFamily="49" charset="0"/>
+                <a:cs typeface="Courier New" panose="02070309020205020404" pitchFamily="49" charset="0"/>
+              </a:rPr>
+              <a:t>++)</a:t>
+            </a:r>
+          </a:p>
+          <a:p>
+            <a:r>
+              <a:rPr lang="en-US" dirty="0">
+                <a:latin typeface="Courier New" panose="02070309020205020404" pitchFamily="49" charset="0"/>
+                <a:cs typeface="Courier New" panose="02070309020205020404" pitchFamily="49" charset="0"/>
+              </a:rPr>
+              <a:t> </a:t>
+            </a:r>
+            <a:r>
+              <a:rPr lang="en-US" dirty="0" smtClean="0">
+                <a:latin typeface="Courier New" panose="02070309020205020404" pitchFamily="49" charset="0"/>
+                <a:cs typeface="Courier New" panose="02070309020205020404" pitchFamily="49" charset="0"/>
+              </a:rPr>
+              <a:t>   </a:t>
+            </a:r>
+            <a:r>
+              <a:rPr lang="en-US" dirty="0" err="1" smtClean="0">
+                <a:latin typeface="Courier New" panose="02070309020205020404" pitchFamily="49" charset="0"/>
+                <a:cs typeface="Courier New" panose="02070309020205020404" pitchFamily="49" charset="0"/>
+              </a:rPr>
+              <a:t>l.push_back</a:t>
+            </a:r>
+            <a:r>
+              <a:rPr lang="en-US" dirty="0" smtClean="0">
+                <a:latin typeface="Courier New" panose="02070309020205020404" pitchFamily="49" charset="0"/>
+                <a:cs typeface="Courier New" panose="02070309020205020404" pitchFamily="49" charset="0"/>
+              </a:rPr>
+              <a:t>(</a:t>
+            </a:r>
+            <a:r>
+              <a:rPr lang="en-US" dirty="0" err="1" smtClean="0">
+                <a:latin typeface="Courier New" panose="02070309020205020404" pitchFamily="49" charset="0"/>
+                <a:cs typeface="Courier New" panose="02070309020205020404" pitchFamily="49" charset="0"/>
+              </a:rPr>
+              <a:t>i</a:t>
+            </a:r>
+            <a:r>
+              <a:rPr lang="en-US" dirty="0" smtClean="0">
+                <a:latin typeface="Courier New" panose="02070309020205020404" pitchFamily="49" charset="0"/>
+                <a:cs typeface="Courier New" panose="02070309020205020404" pitchFamily="49" charset="0"/>
+              </a:rPr>
+              <a:t>);</a:t>
+            </a:r>
+          </a:p>
+          <a:p>
+            <a:r>
+              <a:rPr lang="en-US" dirty="0" smtClean="0">
+                <a:latin typeface="Courier New" panose="02070309020205020404" pitchFamily="49" charset="0"/>
+                <a:cs typeface="Courier New" panose="02070309020205020404" pitchFamily="49" charset="0"/>
+              </a:rPr>
+              <a:t>for </a:t>
+            </a:r>
+            <a:r>
+              <a:rPr lang="en-US" dirty="0">
+                <a:latin typeface="Courier New" panose="02070309020205020404" pitchFamily="49" charset="0"/>
+                <a:cs typeface="Courier New" panose="02070309020205020404" pitchFamily="49" charset="0"/>
+              </a:rPr>
+              <a:t>(</a:t>
+            </a:r>
+            <a:r>
+              <a:rPr lang="en-US" dirty="0" err="1">
+                <a:latin typeface="Courier New" panose="02070309020205020404" pitchFamily="49" charset="0"/>
+                <a:cs typeface="Courier New" panose="02070309020205020404" pitchFamily="49" charset="0"/>
+              </a:rPr>
+              <a:t>std</a:t>
+            </a:r>
+            <a:r>
+              <a:rPr lang="en-US" dirty="0">
+                <a:latin typeface="Courier New" panose="02070309020205020404" pitchFamily="49" charset="0"/>
+                <a:cs typeface="Courier New" panose="02070309020205020404" pitchFamily="49" charset="0"/>
+              </a:rPr>
+              <a:t>::list&lt;</a:t>
+            </a:r>
+            <a:r>
+              <a:rPr lang="en-US" dirty="0" err="1">
+                <a:latin typeface="Courier New" panose="02070309020205020404" pitchFamily="49" charset="0"/>
+                <a:cs typeface="Courier New" panose="02070309020205020404" pitchFamily="49" charset="0"/>
+              </a:rPr>
+              <a:t>int</a:t>
+            </a:r>
+            <a:r>
+              <a:rPr lang="en-US" dirty="0">
+                <a:latin typeface="Courier New" panose="02070309020205020404" pitchFamily="49" charset="0"/>
+                <a:cs typeface="Courier New" panose="02070309020205020404" pitchFamily="49" charset="0"/>
+              </a:rPr>
+              <a:t>&gt;::iterator </a:t>
+            </a:r>
+            <a:r>
+              <a:rPr lang="en-US" dirty="0" err="1">
+                <a:latin typeface="Courier New" panose="02070309020205020404" pitchFamily="49" charset="0"/>
+                <a:cs typeface="Courier New" panose="02070309020205020404" pitchFamily="49" charset="0"/>
+              </a:rPr>
+              <a:t>iter</a:t>
+            </a:r>
+            <a:r>
+              <a:rPr lang="en-US" dirty="0">
+                <a:latin typeface="Courier New" panose="02070309020205020404" pitchFamily="49" charset="0"/>
+                <a:cs typeface="Courier New" panose="02070309020205020404" pitchFamily="49" charset="0"/>
+              </a:rPr>
+              <a:t> = </a:t>
+            </a:r>
+            <a:r>
+              <a:rPr lang="en-US" dirty="0" err="1" smtClean="0">
+                <a:latin typeface="Courier New" panose="02070309020205020404" pitchFamily="49" charset="0"/>
+                <a:cs typeface="Courier New" panose="02070309020205020404" pitchFamily="49" charset="0"/>
+              </a:rPr>
+              <a:t>l.begin</a:t>
+            </a:r>
+            <a:r>
+              <a:rPr lang="en-US" dirty="0">
+                <a:latin typeface="Courier New" panose="02070309020205020404" pitchFamily="49" charset="0"/>
+                <a:cs typeface="Courier New" panose="02070309020205020404" pitchFamily="49" charset="0"/>
+              </a:rPr>
+              <a:t>();</a:t>
+            </a:r>
+          </a:p>
+          <a:p>
+            <a:r>
+              <a:rPr lang="en-US" dirty="0">
+                <a:latin typeface="Courier New" panose="02070309020205020404" pitchFamily="49" charset="0"/>
+                <a:cs typeface="Courier New" panose="02070309020205020404" pitchFamily="49" charset="0"/>
+              </a:rPr>
+              <a:t>            </a:t>
+            </a:r>
+            <a:r>
+              <a:rPr lang="en-US" dirty="0" err="1">
+                <a:latin typeface="Courier New" panose="02070309020205020404" pitchFamily="49" charset="0"/>
+                <a:cs typeface="Courier New" panose="02070309020205020404" pitchFamily="49" charset="0"/>
+              </a:rPr>
+              <a:t>iter</a:t>
+            </a:r>
+            <a:r>
+              <a:rPr lang="en-US" dirty="0">
+                <a:latin typeface="Courier New" panose="02070309020205020404" pitchFamily="49" charset="0"/>
+                <a:cs typeface="Courier New" panose="02070309020205020404" pitchFamily="49" charset="0"/>
+              </a:rPr>
+              <a:t> != </a:t>
+            </a:r>
+            <a:r>
+              <a:rPr lang="en-US" dirty="0" err="1" smtClean="0">
+                <a:latin typeface="Courier New" panose="02070309020205020404" pitchFamily="49" charset="0"/>
+                <a:cs typeface="Courier New" panose="02070309020205020404" pitchFamily="49" charset="0"/>
+              </a:rPr>
+              <a:t>l.end</a:t>
+            </a:r>
+            <a:r>
+              <a:rPr lang="en-US" dirty="0">
+                <a:latin typeface="Courier New" panose="02070309020205020404" pitchFamily="49" charset="0"/>
+                <a:cs typeface="Courier New" panose="02070309020205020404" pitchFamily="49" charset="0"/>
+              </a:rPr>
+              <a:t>(); </a:t>
+            </a:r>
+            <a:r>
+              <a:rPr lang="en-US" dirty="0" err="1">
+                <a:latin typeface="Courier New" panose="02070309020205020404" pitchFamily="49" charset="0"/>
+                <a:cs typeface="Courier New" panose="02070309020205020404" pitchFamily="49" charset="0"/>
+              </a:rPr>
+              <a:t>iter</a:t>
+            </a:r>
+            <a:r>
+              <a:rPr lang="en-US" dirty="0" smtClean="0">
+                <a:latin typeface="Courier New" panose="02070309020205020404" pitchFamily="49" charset="0"/>
+                <a:cs typeface="Courier New" panose="02070309020205020404" pitchFamily="49" charset="0"/>
+              </a:rPr>
+              <a:t>++)</a:t>
+            </a:r>
+            <a:endParaRPr lang="en-US" dirty="0">
+              <a:latin typeface="Courier New" panose="02070309020205020404" pitchFamily="49" charset="0"/>
+              <a:cs typeface="Courier New" panose="02070309020205020404" pitchFamily="49" charset="0"/>
+            </a:endParaRPr>
+          </a:p>
+          <a:p>
+            <a:r>
+              <a:rPr lang="en-US" dirty="0" smtClean="0">
+                <a:latin typeface="Courier New" panose="02070309020205020404" pitchFamily="49" charset="0"/>
+                <a:cs typeface="Courier New" panose="02070309020205020404" pitchFamily="49" charset="0"/>
+              </a:rPr>
+              <a:t>    </a:t>
+            </a:r>
+            <a:r>
+              <a:rPr lang="en-US" dirty="0" err="1">
+                <a:latin typeface="Courier New" panose="02070309020205020404" pitchFamily="49" charset="0"/>
+                <a:cs typeface="Courier New" panose="02070309020205020404" pitchFamily="49" charset="0"/>
+              </a:rPr>
+              <a:t>std</a:t>
+            </a:r>
+            <a:r>
+              <a:rPr lang="en-US" dirty="0">
+                <a:latin typeface="Courier New" panose="02070309020205020404" pitchFamily="49" charset="0"/>
+                <a:cs typeface="Courier New" panose="02070309020205020404" pitchFamily="49" charset="0"/>
+              </a:rPr>
+              <a:t>::</a:t>
+            </a:r>
+            <a:r>
+              <a:rPr lang="en-US" dirty="0" err="1">
+                <a:latin typeface="Courier New" panose="02070309020205020404" pitchFamily="49" charset="0"/>
+                <a:cs typeface="Courier New" panose="02070309020205020404" pitchFamily="49" charset="0"/>
+              </a:rPr>
+              <a:t>cout</a:t>
+            </a:r>
+            <a:r>
+              <a:rPr lang="en-US" dirty="0">
+                <a:latin typeface="Courier New" panose="02070309020205020404" pitchFamily="49" charset="0"/>
+                <a:cs typeface="Courier New" panose="02070309020205020404" pitchFamily="49" charset="0"/>
+              </a:rPr>
+              <a:t> &lt;&lt; "1: " &lt;&lt; *</a:t>
+            </a:r>
+            <a:r>
+              <a:rPr lang="en-US" dirty="0" err="1">
+                <a:latin typeface="Courier New" panose="02070309020205020404" pitchFamily="49" charset="0"/>
+                <a:cs typeface="Courier New" panose="02070309020205020404" pitchFamily="49" charset="0"/>
+              </a:rPr>
+              <a:t>iter</a:t>
+            </a:r>
+            <a:r>
+              <a:rPr lang="en-US" dirty="0">
+                <a:latin typeface="Courier New" panose="02070309020205020404" pitchFamily="49" charset="0"/>
+                <a:cs typeface="Courier New" panose="02070309020205020404" pitchFamily="49" charset="0"/>
+              </a:rPr>
+              <a:t> &lt;&lt; </a:t>
+            </a:r>
+            <a:r>
+              <a:rPr lang="en-US" dirty="0" err="1">
+                <a:latin typeface="Courier New" panose="02070309020205020404" pitchFamily="49" charset="0"/>
+                <a:cs typeface="Courier New" panose="02070309020205020404" pitchFamily="49" charset="0"/>
+              </a:rPr>
+              <a:t>std</a:t>
+            </a:r>
+            <a:r>
+              <a:rPr lang="en-US" dirty="0">
+                <a:latin typeface="Courier New" panose="02070309020205020404" pitchFamily="49" charset="0"/>
+                <a:cs typeface="Courier New" panose="02070309020205020404" pitchFamily="49" charset="0"/>
+              </a:rPr>
+              <a:t>::</a:t>
+            </a:r>
+            <a:r>
+              <a:rPr lang="en-US" dirty="0" err="1">
+                <a:latin typeface="Courier New" panose="02070309020205020404" pitchFamily="49" charset="0"/>
+                <a:cs typeface="Courier New" panose="02070309020205020404" pitchFamily="49" charset="0"/>
+              </a:rPr>
+              <a:t>endl</a:t>
+            </a:r>
+            <a:r>
+              <a:rPr lang="en-US" dirty="0" smtClean="0">
+                <a:latin typeface="Courier New" panose="02070309020205020404" pitchFamily="49" charset="0"/>
+                <a:cs typeface="Courier New" panose="02070309020205020404" pitchFamily="49" charset="0"/>
+              </a:rPr>
+              <a:t>;</a:t>
+            </a:r>
+            <a:endParaRPr lang="en-US" dirty="0">
+              <a:latin typeface="Courier New" panose="02070309020205020404" pitchFamily="49" charset="0"/>
+              <a:cs typeface="Courier New" panose="02070309020205020404" pitchFamily="49" charset="0"/>
+            </a:endParaRPr>
+          </a:p>
+        </p:txBody>
+      </p:sp>
+      <p:sp>
+        <p:nvSpPr>
+          <p:cNvPr id="6" name="TextBox 5"/>
+          <p:cNvSpPr txBox="1"/>
+          <p:nvPr/>
+        </p:nvSpPr>
+        <p:spPr>
+          <a:xfrm>
+            <a:off x="628650" y="4323830"/>
+            <a:ext cx="6665768" cy="1477328"/>
+          </a:xfrm>
+          <a:prstGeom prst="rect">
+            <a:avLst/>
+          </a:prstGeom>
+          <a:solidFill>
+            <a:schemeClr val="accent4">
+              <a:lumMod val="40000"/>
+              <a:lumOff val="60000"/>
+            </a:schemeClr>
+          </a:solidFill>
+          <a:ln>
+            <a:solidFill>
+              <a:schemeClr val="tx1"/>
+            </a:solidFill>
+          </a:ln>
+        </p:spPr>
+        <p:txBody>
+          <a:bodyPr wrap="square" rtlCol="0">
+            <a:spAutoFit/>
+          </a:bodyPr>
+          <a:lstStyle/>
+          <a:p>
+            <a:r>
+              <a:rPr lang="en-US" dirty="0" smtClean="0">
+                <a:latin typeface="Courier New" panose="02070309020205020404" pitchFamily="49" charset="0"/>
+                <a:cs typeface="Courier New" panose="02070309020205020404" pitchFamily="49" charset="0"/>
+              </a:rPr>
+              <a:t>l = list()</a:t>
+            </a:r>
+          </a:p>
+          <a:p>
+            <a:r>
+              <a:rPr lang="en-US" dirty="0" smtClean="0">
+                <a:latin typeface="Courier New" panose="02070309020205020404" pitchFamily="49" charset="0"/>
+                <a:cs typeface="Courier New" panose="02070309020205020404" pitchFamily="49" charset="0"/>
+              </a:rPr>
+              <a:t>for x in range(10):</a:t>
+            </a:r>
+          </a:p>
+          <a:p>
+            <a:r>
+              <a:rPr lang="en-US" dirty="0">
+                <a:latin typeface="Courier New" panose="02070309020205020404" pitchFamily="49" charset="0"/>
+                <a:cs typeface="Courier New" panose="02070309020205020404" pitchFamily="49" charset="0"/>
+              </a:rPr>
+              <a:t> </a:t>
+            </a:r>
+            <a:r>
+              <a:rPr lang="en-US" dirty="0" smtClean="0">
+                <a:latin typeface="Courier New" panose="02070309020205020404" pitchFamily="49" charset="0"/>
+                <a:cs typeface="Courier New" panose="02070309020205020404" pitchFamily="49" charset="0"/>
+              </a:rPr>
+              <a:t>   </a:t>
+            </a:r>
+            <a:r>
+              <a:rPr lang="en-US" dirty="0" err="1" smtClean="0">
+                <a:latin typeface="Courier New" panose="02070309020205020404" pitchFamily="49" charset="0"/>
+                <a:cs typeface="Courier New" panose="02070309020205020404" pitchFamily="49" charset="0"/>
+              </a:rPr>
+              <a:t>l.append</a:t>
+            </a:r>
+            <a:r>
+              <a:rPr lang="en-US" dirty="0" smtClean="0">
+                <a:latin typeface="Courier New" panose="02070309020205020404" pitchFamily="49" charset="0"/>
+                <a:cs typeface="Courier New" panose="02070309020205020404" pitchFamily="49" charset="0"/>
+              </a:rPr>
+              <a:t>(x)</a:t>
+            </a:r>
+            <a:endParaRPr lang="en-US" dirty="0">
+              <a:latin typeface="Courier New" panose="02070309020205020404" pitchFamily="49" charset="0"/>
+              <a:cs typeface="Courier New" panose="02070309020205020404" pitchFamily="49" charset="0"/>
+            </a:endParaRPr>
+          </a:p>
+          <a:p>
+            <a:r>
+              <a:rPr lang="en-US" dirty="0" smtClean="0">
+                <a:latin typeface="Courier New" panose="02070309020205020404" pitchFamily="49" charset="0"/>
+                <a:cs typeface="Courier New" panose="02070309020205020404" pitchFamily="49" charset="0"/>
+              </a:rPr>
+              <a:t>for x in l:</a:t>
+            </a:r>
+          </a:p>
+          <a:p>
+            <a:r>
+              <a:rPr lang="en-US" dirty="0">
+                <a:latin typeface="Courier New" panose="02070309020205020404" pitchFamily="49" charset="0"/>
+                <a:cs typeface="Courier New" panose="02070309020205020404" pitchFamily="49" charset="0"/>
+              </a:rPr>
+              <a:t> </a:t>
+            </a:r>
+            <a:r>
+              <a:rPr lang="en-US" dirty="0" smtClean="0">
+                <a:latin typeface="Courier New" panose="02070309020205020404" pitchFamily="49" charset="0"/>
+                <a:cs typeface="Courier New" panose="02070309020205020404" pitchFamily="49" charset="0"/>
+              </a:rPr>
+              <a:t>   print('l: {0:d}'.format(x))</a:t>
+            </a:r>
+          </a:p>
+        </p:txBody>
+      </p:sp>
+    </p:spTree>
+    <p:extLst>
+      <p:ext uri="{BB962C8B-B14F-4D97-AF65-F5344CB8AC3E}">
+        <p14:creationId xmlns:p14="http://schemas.microsoft.com/office/powerpoint/2010/main" val="3534822962"/>
+      </p:ext>
+    </p:extLst>
+  </p:cSld>
+  <p:clrMapOvr>
+    <a:masterClrMapping/>
+  </p:clrMapOvr>
+  <p:timing>
+    <p:tnLst>
+      <p:par>
+        <p:cTn id="1" dur="indefinite" restart="never" nodeType="tmRoot"/>
+      </p:par>
+    </p:tnLst>
+  </p:timing>
+</p:sld>
+</file>
+
+<file path=ppt/slides/slide14.xml><?xml version="1.0" encoding="utf-8"?>
+<p:sld xmlns:a="http://schemas.openxmlformats.org/drawingml/2006/main" xmlns:r="http://schemas.openxmlformats.org/officeDocument/2006/relationships" xmlns:p="http://schemas.openxmlformats.org/presentationml/2006/main">
+  <p:cSld>
+    <p:spTree>
+      <p:nvGrpSpPr>
+        <p:cNvPr id="1" name=""/>
+        <p:cNvGrpSpPr/>
+        <p:nvPr/>
+      </p:nvGrpSpPr>
+      <p:grpSpPr>
+        <a:xfrm>
+          <a:off x="0" y="0"/>
+          <a:ext cx="0" cy="0"/>
+          <a:chOff x="0" y="0"/>
+          <a:chExt cx="0" cy="0"/>
+        </a:xfrm>
+      </p:grpSpPr>
+      <p:sp>
+        <p:nvSpPr>
+          <p:cNvPr id="2" name="Title 1"/>
+          <p:cNvSpPr>
+            <a:spLocks noGrp="1"/>
+          </p:cNvSpPr>
+          <p:nvPr>
+            <p:ph type="title"/>
+          </p:nvPr>
+        </p:nvSpPr>
+        <p:spPr/>
+        <p:txBody>
+          <a:bodyPr/>
+          <a:lstStyle/>
+          <a:p>
+            <a:r>
+              <a:rPr lang="en-US" dirty="0" smtClean="0"/>
               <a:t>Set</a:t>
             </a:r>
             <a:endParaRPr lang="en-US" dirty="0"/>
@@ -3669,22 +5310,14 @@
             <a:pPr lvl="1"/>
             <a:r>
               <a:rPr lang="en-US" dirty="0" smtClean="0"/>
-              <a:t>insert/remove: </a:t>
-            </a:r>
-            <a:r>
-              <a:rPr lang="en-US" dirty="0" smtClean="0"/>
-              <a:t>O(1)</a:t>
+              <a:t>insert/remove: O(1)</a:t>
             </a:r>
           </a:p>
           <a:p>
             <a:pPr lvl="1"/>
             <a:r>
               <a:rPr lang="en-US" dirty="0" smtClean="0"/>
-              <a:t>search</a:t>
-            </a:r>
-            <a:r>
-              <a:rPr lang="en-US" dirty="0" smtClean="0"/>
-              <a:t>: O(1)</a:t>
+              <a:t>search: O(1)</a:t>
             </a:r>
           </a:p>
           <a:p>
@@ -3770,7 +5403,7 @@
             <a:graphicData uri="http://schemas.openxmlformats.org/presentationml/2006/ole">
               <mc:AlternateContent xmlns:mc="http://schemas.openxmlformats.org/markup-compatibility/2006">
                 <mc:Choice xmlns:v="urn:schemas-microsoft-com:vml" Requires="v">
-                  <p:oleObj spid="_x0000_s5125" name="Equation" r:id="rId3" imgW="444240" imgH="203040" progId="Equation.3">
+                  <p:oleObj spid="_x0000_s5129" name="Equation" r:id="rId3" imgW="444240" imgH="203040" progId="Equation.3">
                     <p:embed/>
                   </p:oleObj>
                 </mc:Choice>
@@ -3837,9 +5470,6 @@
                 </a:rPr>
                 <a:t>s</a:t>
               </a:r>
-              <a:endParaRPr lang="en-US" sz="2100" i="1" dirty="0">
-                <a:latin typeface="Palatino Linotype" panose="02040502050505030304" pitchFamily="18" charset="0"/>
-              </a:endParaRPr>
             </a:p>
           </p:txBody>
         </p:sp>
@@ -3861,7 +5491,7 @@
           <a:p>
             <a:fld id="{11AD1F4E-1E51-402E-B221-310F004E7D3B}" type="slidenum">
               <a:rPr lang="en-US" smtClean="0"/>
-              <a:t>10</a:t>
+              <a:t>14</a:t>
             </a:fld>
             <a:endParaRPr lang="en-US"/>
           </a:p>
@@ -3887,7 +5517,7 @@
 </p:sld>
 </file>
 
-<file path=ppt/slides/slide11.xml><?xml version="1.0" encoding="utf-8"?>
+<file path=ppt/slides/slide15.xml><?xml version="1.0" encoding="utf-8"?>
 <p:sld xmlns:a="http://schemas.openxmlformats.org/drawingml/2006/main" xmlns:r="http://schemas.openxmlformats.org/officeDocument/2006/relationships" xmlns:p="http://schemas.openxmlformats.org/presentationml/2006/main">
   <p:cSld>
     <p:spTree>
@@ -4079,7 +5709,7 @@
             <a:graphicData uri="http://schemas.openxmlformats.org/presentationml/2006/ole">
               <mc:AlternateContent xmlns:mc="http://schemas.openxmlformats.org/markup-compatibility/2006">
                 <mc:Choice xmlns:v="urn:schemas-microsoft-com:vml" Requires="v">
-                  <p:oleObj spid="_x0000_s6153" name="Equation" r:id="rId3" imgW="774360" imgH="215640" progId="Equation.3">
+                  <p:oleObj spid="_x0000_s6165" name="Equation" r:id="rId3" imgW="774360" imgH="215640" progId="Equation.3">
                     <p:embed/>
                   </p:oleObj>
                 </mc:Choice>
@@ -4146,9 +5776,6 @@
                 </a:rPr>
                 <a:t>d</a:t>
               </a:r>
-              <a:endParaRPr lang="en-US" sz="2100" i="1" dirty="0">
-                <a:latin typeface="Palatino Linotype" panose="02040502050505030304" pitchFamily="18" charset="0"/>
-              </a:endParaRPr>
             </a:p>
           </p:txBody>
         </p:sp>
@@ -4170,7 +5797,7 @@
           <a:p>
             <a:fld id="{11AD1F4E-1E51-402E-B221-310F004E7D3B}" type="slidenum">
               <a:rPr lang="en-US" smtClean="0"/>
-              <a:t>11</a:t>
+              <a:t>15</a:t>
             </a:fld>
             <a:endParaRPr lang="en-US"/>
           </a:p>
@@ -4314,7 +5941,7 @@
             <a:graphicData uri="http://schemas.openxmlformats.org/presentationml/2006/ole">
               <mc:AlternateContent xmlns:mc="http://schemas.openxmlformats.org/markup-compatibility/2006">
                 <mc:Choice xmlns:v="urn:schemas-microsoft-com:vml" Requires="v">
-                  <p:oleObj spid="_x0000_s6154" name="Equation" r:id="rId5" imgW="622080" imgH="215640" progId="Equation.3">
+                  <p:oleObj spid="_x0000_s6166" name="Equation" r:id="rId5" imgW="622080" imgH="215640" progId="Equation.3">
                     <p:embed/>
                   </p:oleObj>
                 </mc:Choice>
@@ -4371,7 +5998,7 @@
             <a:graphicData uri="http://schemas.openxmlformats.org/presentationml/2006/ole">
               <mc:AlternateContent xmlns:mc="http://schemas.openxmlformats.org/markup-compatibility/2006">
                 <mc:Choice xmlns:v="urn:schemas-microsoft-com:vml" Requires="v">
-                  <p:oleObj spid="_x0000_s6155" name="Equation" r:id="rId7" imgW="749160" imgH="215640" progId="Equation.3">
+                  <p:oleObj spid="_x0000_s6167" name="Equation" r:id="rId7" imgW="749160" imgH="215640" progId="Equation.3">
                     <p:embed/>
                   </p:oleObj>
                 </mc:Choice>
@@ -4462,7 +6089,7 @@
           </p:nvSpPr>
           <p:spPr>
             <a:xfrm>
-              <a:off x="5640539" y="5767822"/>
+              <a:off x="5463894" y="5989130"/>
               <a:ext cx="83127" cy="83127"/>
             </a:xfrm>
             <a:prstGeom prst="ellipse">
@@ -4696,8 +6323,8 @@
           </p:nvCxnSpPr>
           <p:spPr>
             <a:xfrm flipV="1">
-              <a:off x="5723666" y="5681331"/>
-              <a:ext cx="1775158" cy="128055"/>
+              <a:off x="5547021" y="5681331"/>
+              <a:ext cx="1951803" cy="349363"/>
             </a:xfrm>
             <a:prstGeom prst="straightConnector1">
               <a:avLst/>
@@ -5084,7 +6711,6 @@
               <a:rPr lang="en-US" sz="2100" dirty="0"/>
               <a:t> party libraries</a:t>
             </a:r>
-            <a:endParaRPr lang="en-US" sz="2100" dirty="0"/>
           </a:p>
         </p:txBody>
       </p:sp>
@@ -5255,6 +6881,41 @@
           </a:p>
         </p:txBody>
       </p:sp>
+      <p:sp>
+        <p:nvSpPr>
+          <p:cNvPr id="6" name="TextBox 5"/>
+          <p:cNvSpPr txBox="1"/>
+          <p:nvPr/>
+        </p:nvSpPr>
+        <p:spPr>
+          <a:xfrm>
+            <a:off x="1205347" y="3906981"/>
+            <a:ext cx="4468980" cy="415498"/>
+          </a:xfrm>
+          <a:prstGeom prst="rect">
+            <a:avLst/>
+          </a:prstGeom>
+          <a:noFill/>
+          <a:ln>
+            <a:solidFill>
+              <a:schemeClr val="tx1"/>
+            </a:solidFill>
+          </a:ln>
+        </p:spPr>
+        <p:txBody>
+          <a:bodyPr wrap="none" rtlCol="0">
+            <a:spAutoFit/>
+          </a:bodyPr>
+          <a:lstStyle/>
+          <a:p>
+            <a:r>
+              <a:rPr lang="en-US" sz="2100" dirty="0" smtClean="0"/>
+              <a:t>Which data structure to use in models?</a:t>
+            </a:r>
+            <a:endParaRPr lang="en-US" sz="2100" dirty="0"/>
+          </a:p>
+        </p:txBody>
+      </p:sp>
     </p:spTree>
     <p:extLst>
       <p:ext uri="{BB962C8B-B14F-4D97-AF65-F5344CB8AC3E}">
@@ -5309,6 +6970,296 @@
           <a:p>
             <a:r>
               <a:rPr lang="en-US" dirty="0" smtClean="0"/>
+              <a:t>Conventions</a:t>
+            </a:r>
+            <a:endParaRPr lang="en-US" dirty="0"/>
+          </a:p>
+        </p:txBody>
+      </p:sp>
+      <p:sp>
+        <p:nvSpPr>
+          <p:cNvPr id="3" name="Content Placeholder 2"/>
+          <p:cNvSpPr>
+            <a:spLocks noGrp="1"/>
+          </p:cNvSpPr>
+          <p:nvPr>
+            <p:ph idx="1"/>
+          </p:nvPr>
+        </p:nvSpPr>
+        <p:spPr/>
+        <p:txBody>
+          <a:bodyPr/>
+          <a:lstStyle/>
+          <a:p>
+            <a:r>
+              <a:rPr lang="en-US" dirty="0" smtClean="0"/>
+              <a:t>Source code: </a:t>
+            </a:r>
+            <a:r>
+              <a:rPr lang="en-US" dirty="0" smtClean="0">
+                <a:latin typeface="Courier New" panose="02070309020205020404" pitchFamily="49" charset="0"/>
+                <a:cs typeface="Courier New" panose="02070309020205020404" pitchFamily="49" charset="0"/>
+              </a:rPr>
+              <a:t>monospaced font</a:t>
+            </a:r>
+          </a:p>
+          <a:p>
+            <a:r>
+              <a:rPr lang="en-US" dirty="0" smtClean="0">
+                <a:cs typeface="Courier New" panose="02070309020205020404" pitchFamily="49" charset="0"/>
+              </a:rPr>
+              <a:t>C++ fragment</a:t>
+            </a:r>
+          </a:p>
+          <a:p>
+            <a:endParaRPr lang="en-US" dirty="0">
+              <a:cs typeface="Courier New" panose="02070309020205020404" pitchFamily="49" charset="0"/>
+            </a:endParaRPr>
+          </a:p>
+          <a:p>
+            <a:endParaRPr lang="en-US" dirty="0" smtClean="0">
+              <a:cs typeface="Courier New" panose="02070309020205020404" pitchFamily="49" charset="0"/>
+            </a:endParaRPr>
+          </a:p>
+          <a:p>
+            <a:endParaRPr lang="en-US" dirty="0">
+              <a:cs typeface="Courier New" panose="02070309020205020404" pitchFamily="49" charset="0"/>
+            </a:endParaRPr>
+          </a:p>
+          <a:p>
+            <a:r>
+              <a:rPr lang="en-US" dirty="0" smtClean="0">
+                <a:cs typeface="Courier New" panose="02070309020205020404" pitchFamily="49" charset="0"/>
+              </a:rPr>
+              <a:t>Python fragment</a:t>
+            </a:r>
+            <a:endParaRPr lang="en-US" dirty="0">
+              <a:cs typeface="Courier New" panose="02070309020205020404" pitchFamily="49" charset="0"/>
+            </a:endParaRPr>
+          </a:p>
+        </p:txBody>
+      </p:sp>
+      <p:sp>
+        <p:nvSpPr>
+          <p:cNvPr id="4" name="Slide Number Placeholder 3"/>
+          <p:cNvSpPr>
+            <a:spLocks noGrp="1"/>
+          </p:cNvSpPr>
+          <p:nvPr>
+            <p:ph type="sldNum" sz="quarter" idx="12"/>
+          </p:nvPr>
+        </p:nvSpPr>
+        <p:spPr/>
+        <p:txBody>
+          <a:bodyPr/>
+          <a:lstStyle/>
+          <a:p>
+            <a:fld id="{11AD1F4E-1E51-402E-B221-310F004E7D3B}" type="slidenum">
+              <a:rPr lang="en-US" smtClean="0"/>
+              <a:t>5</a:t>
+            </a:fld>
+            <a:endParaRPr lang="en-US"/>
+          </a:p>
+        </p:txBody>
+      </p:sp>
+      <p:sp>
+        <p:nvSpPr>
+          <p:cNvPr id="5" name="TextBox 4"/>
+          <p:cNvSpPr txBox="1"/>
+          <p:nvPr/>
+        </p:nvSpPr>
+        <p:spPr>
+          <a:xfrm>
+            <a:off x="1657352" y="2899064"/>
+            <a:ext cx="5561138" cy="923330"/>
+          </a:xfrm>
+          <a:prstGeom prst="rect">
+            <a:avLst/>
+          </a:prstGeom>
+          <a:solidFill>
+            <a:schemeClr val="tx2">
+              <a:lumMod val="40000"/>
+              <a:lumOff val="60000"/>
+            </a:schemeClr>
+          </a:solidFill>
+          <a:ln>
+            <a:solidFill>
+              <a:schemeClr val="tx1"/>
+            </a:solidFill>
+          </a:ln>
+        </p:spPr>
+        <p:txBody>
+          <a:bodyPr wrap="square" rtlCol="0">
+            <a:spAutoFit/>
+          </a:bodyPr>
+          <a:lstStyle/>
+          <a:p>
+            <a:r>
+              <a:rPr lang="en-US" dirty="0" err="1" smtClean="0">
+                <a:latin typeface="Courier New" panose="02070309020205020404" pitchFamily="49" charset="0"/>
+                <a:cs typeface="Courier New" panose="02070309020205020404" pitchFamily="49" charset="0"/>
+              </a:rPr>
+              <a:t>int</a:t>
+            </a:r>
+            <a:r>
+              <a:rPr lang="en-US" dirty="0" smtClean="0">
+                <a:latin typeface="Courier New" panose="02070309020205020404" pitchFamily="49" charset="0"/>
+                <a:cs typeface="Courier New" panose="02070309020205020404" pitchFamily="49" charset="0"/>
+              </a:rPr>
+              <a:t> a[10];</a:t>
+            </a:r>
+          </a:p>
+          <a:p>
+            <a:r>
+              <a:rPr lang="en-US" dirty="0" smtClean="0">
+                <a:latin typeface="Courier New" panose="02070309020205020404" pitchFamily="49" charset="0"/>
+                <a:cs typeface="Courier New" panose="02070309020205020404" pitchFamily="49" charset="0"/>
+              </a:rPr>
+              <a:t>a[0] = 12;</a:t>
+            </a:r>
+          </a:p>
+          <a:p>
+            <a:r>
+              <a:rPr lang="en-US" dirty="0" smtClean="0">
+                <a:latin typeface="Courier New" panose="02070309020205020404" pitchFamily="49" charset="0"/>
+                <a:cs typeface="Courier New" panose="02070309020205020404" pitchFamily="49" charset="0"/>
+              </a:rPr>
+              <a:t>a[1] = a[0] + 13;</a:t>
+            </a:r>
+            <a:endParaRPr lang="en-US" dirty="0">
+              <a:latin typeface="Courier New" panose="02070309020205020404" pitchFamily="49" charset="0"/>
+              <a:cs typeface="Courier New" panose="02070309020205020404" pitchFamily="49" charset="0"/>
+            </a:endParaRPr>
+          </a:p>
+        </p:txBody>
+      </p:sp>
+      <p:sp>
+        <p:nvSpPr>
+          <p:cNvPr id="6" name="TextBox 5"/>
+          <p:cNvSpPr txBox="1"/>
+          <p:nvPr/>
+        </p:nvSpPr>
+        <p:spPr>
+          <a:xfrm>
+            <a:off x="1657352" y="4953002"/>
+            <a:ext cx="5561138" cy="1200329"/>
+          </a:xfrm>
+          <a:prstGeom prst="rect">
+            <a:avLst/>
+          </a:prstGeom>
+          <a:solidFill>
+            <a:schemeClr val="accent4">
+              <a:lumMod val="40000"/>
+              <a:lumOff val="60000"/>
+            </a:schemeClr>
+          </a:solidFill>
+          <a:ln>
+            <a:solidFill>
+              <a:schemeClr val="tx1"/>
+            </a:solidFill>
+          </a:ln>
+        </p:spPr>
+        <p:txBody>
+          <a:bodyPr wrap="none" rtlCol="0">
+            <a:spAutoFit/>
+          </a:bodyPr>
+          <a:lstStyle/>
+          <a:p>
+            <a:r>
+              <a:rPr lang="en-US" dirty="0" smtClean="0">
+                <a:latin typeface="Courier New" panose="02070309020205020404" pitchFamily="49" charset="0"/>
+                <a:cs typeface="Courier New" panose="02070309020205020404" pitchFamily="49" charset="0"/>
+              </a:rPr>
+              <a:t>from array import array</a:t>
+            </a:r>
+          </a:p>
+          <a:p>
+            <a:r>
+              <a:rPr lang="en-US" dirty="0" smtClean="0">
+                <a:latin typeface="Courier New" panose="02070309020205020404" pitchFamily="49" charset="0"/>
+                <a:cs typeface="Courier New" panose="02070309020205020404" pitchFamily="49" charset="0"/>
+              </a:rPr>
+              <a:t>a = array('l', (0 for _ in range(100)))</a:t>
+            </a:r>
+          </a:p>
+          <a:p>
+            <a:r>
+              <a:rPr lang="en-US" dirty="0" smtClean="0">
+                <a:latin typeface="Courier New" panose="02070309020205020404" pitchFamily="49" charset="0"/>
+                <a:cs typeface="Courier New" panose="02070309020205020404" pitchFamily="49" charset="0"/>
+              </a:rPr>
+              <a:t>a[0] = 12</a:t>
+            </a:r>
+          </a:p>
+          <a:p>
+            <a:r>
+              <a:rPr lang="en-US" dirty="0" smtClean="0">
+                <a:latin typeface="Courier New" panose="02070309020205020404" pitchFamily="49" charset="0"/>
+                <a:cs typeface="Courier New" panose="02070309020205020404" pitchFamily="49" charset="0"/>
+              </a:rPr>
+              <a:t>a[1] = a[0] + 13</a:t>
+            </a:r>
+            <a:endParaRPr lang="en-US" dirty="0">
+              <a:latin typeface="Courier New" panose="02070309020205020404" pitchFamily="49" charset="0"/>
+              <a:cs typeface="Courier New" panose="02070309020205020404" pitchFamily="49" charset="0"/>
+            </a:endParaRPr>
+          </a:p>
+        </p:txBody>
+      </p:sp>
+    </p:spTree>
+    <p:extLst>
+      <p:ext uri="{BB962C8B-B14F-4D97-AF65-F5344CB8AC3E}">
+        <p14:creationId xmlns:p14="http://schemas.microsoft.com/office/powerpoint/2010/main" val="4056741942"/>
+      </p:ext>
+    </p:extLst>
+  </p:cSld>
+  <p:clrMapOvr>
+    <a:masterClrMapping/>
+  </p:clrMapOvr>
+  <p:timing>
+    <p:tnLst>
+      <p:par>
+        <p:cTn id="1" dur="indefinite" restart="never" nodeType="tmRoot"/>
+      </p:par>
+    </p:tnLst>
+  </p:timing>
+</p:sld>
+</file>
+
+<file path=ppt/slides/slide6.xml><?xml version="1.0" encoding="utf-8"?>
+<p:sld xmlns:a="http://schemas.openxmlformats.org/drawingml/2006/main" xmlns:r="http://schemas.openxmlformats.org/officeDocument/2006/relationships" xmlns:p="http://schemas.openxmlformats.org/presentationml/2006/main">
+  <p:cSld>
+    <p:spTree>
+      <p:nvGrpSpPr>
+        <p:cNvPr id="1" name=""/>
+        <p:cNvGrpSpPr/>
+        <p:nvPr/>
+      </p:nvGrpSpPr>
+      <p:grpSpPr>
+        <a:xfrm>
+          <a:off x="0" y="0"/>
+          <a:ext cx="0" cy="0"/>
+          <a:chOff x="0" y="0"/>
+          <a:chExt cx="0" cy="0"/>
+        </a:xfrm>
+      </p:grpSpPr>
+      <p:sp>
+        <p:nvSpPr>
+          <p:cNvPr id="2" name="Title 1"/>
+          <p:cNvSpPr>
+            <a:spLocks noGrp="1"/>
+          </p:cNvSpPr>
+          <p:nvPr>
+            <p:ph type="title"/>
+          </p:nvPr>
+        </p:nvSpPr>
+        <p:spPr/>
+        <p:txBody>
+          <a:bodyPr/>
+          <a:lstStyle/>
+          <a:p>
+            <a:r>
+              <a:rPr lang="en-US" dirty="0" smtClean="0"/>
               <a:t>Notation</a:t>
             </a:r>
             <a:endParaRPr lang="en-US" dirty="0"/>
@@ -5382,11 +7333,7 @@
             </a:r>
             <a:r>
               <a:rPr lang="en-US" dirty="0" smtClean="0"/>
-              <a:t>2147483647, …, -1, 0, 1..., 2147483647</a:t>
-            </a:r>
-            <a:r>
-              <a:rPr lang="en-US" dirty="0" smtClean="0"/>
-              <a:t>}</a:t>
+              <a:t>2147483647, …, -1, 0, 1..., 2147483647}</a:t>
             </a:r>
           </a:p>
           <a:p>
@@ -5418,7 +7365,6 @@
               <a:rPr lang="en-US" dirty="0" smtClean="0"/>
               <a:t>|</a:t>
             </a:r>
-            <a:endParaRPr lang="en-US" dirty="0" smtClean="0"/>
           </a:p>
           <a:p>
             <a:r>
@@ -5721,9 +7667,6 @@
               </a:rPr>
               <a:t>1, …}</a:t>
             </a:r>
-            <a:endParaRPr lang="en-US" dirty="0" smtClean="0">
-              <a:sym typeface="Symbol" panose="05050102010706020507" pitchFamily="18" charset="2"/>
-            </a:endParaRPr>
           </a:p>
           <a:p>
             <a:pPr lvl="1"/>
@@ -5755,7 +7698,7 @@
           <a:graphicData uri="http://schemas.openxmlformats.org/presentationml/2006/ole">
             <mc:AlternateContent xmlns:mc="http://schemas.openxmlformats.org/markup-compatibility/2006">
               <mc:Choice xmlns:v="urn:schemas-microsoft-com:vml" Requires="v">
-                <p:oleObj spid="_x0000_s1040" name="Equation" r:id="rId4" imgW="1841400" imgH="215640" progId="Equation.3">
+                <p:oleObj spid="_x0000_s1044" name="Equation" r:id="rId4" imgW="1841400" imgH="215640" progId="Equation.3">
                   <p:embed/>
                 </p:oleObj>
               </mc:Choice>
@@ -5904,7 +7847,7 @@
           <a:p>
             <a:fld id="{11AD1F4E-1E51-402E-B221-310F004E7D3B}" type="slidenum">
               <a:rPr lang="en-US" smtClean="0"/>
-              <a:t>5</a:t>
+              <a:t>6</a:t>
             </a:fld>
             <a:endParaRPr lang="en-US"/>
           </a:p>
@@ -5930,7 +7873,7 @@
 </p:sld>
 </file>
 
-<file path=ppt/slides/slide6.xml><?xml version="1.0" encoding="utf-8"?>
+<file path=ppt/slides/slide7.xml><?xml version="1.0" encoding="utf-8"?>
 <p:sld xmlns:a="http://schemas.openxmlformats.org/drawingml/2006/main" xmlns:r="http://schemas.openxmlformats.org/officeDocument/2006/relationships" xmlns:p="http://schemas.openxmlformats.org/presentationml/2006/main">
   <p:cSld>
     <p:spTree>
@@ -6006,7 +7949,7 @@
           <a:p>
             <a:fld id="{11AD1F4E-1E51-402E-B221-310F004E7D3B}" type="slidenum">
               <a:rPr lang="en-US" smtClean="0"/>
-              <a:t>6</a:t>
+              <a:t>7</a:t>
             </a:fld>
             <a:endParaRPr lang="en-US"/>
           </a:p>
@@ -6032,7 +7975,7 @@
 </p:sld>
 </file>
 
-<file path=ppt/slides/slide7.xml><?xml version="1.0" encoding="utf-8"?>
+<file path=ppt/slides/slide8.xml><?xml version="1.0" encoding="utf-8"?>
 <p:sld xmlns:a="http://schemas.openxmlformats.org/drawingml/2006/main" xmlns:r="http://schemas.openxmlformats.org/officeDocument/2006/relationships" xmlns:p="http://schemas.openxmlformats.org/presentationml/2006/main">
   <p:cSld>
     <p:spTree>
@@ -6205,7 +8148,7 @@
             <a:graphicData uri="http://schemas.openxmlformats.org/presentationml/2006/ole">
               <mc:AlternateContent xmlns:mc="http://schemas.openxmlformats.org/markup-compatibility/2006">
                 <mc:Choice xmlns:v="urn:schemas-microsoft-com:vml" Requires="v">
-                  <p:oleObj spid="_x0000_s2060" name="Equation" r:id="rId3" imgW="1358640" imgH="203040" progId="Equation.3">
+                  <p:oleObj spid="_x0000_s2064" name="Equation" r:id="rId3" imgW="1358640" imgH="203040" progId="Equation.3">
                     <p:embed/>
                   </p:oleObj>
                 </mc:Choice>
@@ -6276,9 +8219,6 @@
                 </a:rPr>
                 <a:t>a</a:t>
               </a:r>
-              <a:endParaRPr lang="en-US" sz="2100" i="1" dirty="0">
-                <a:latin typeface="Palatino Linotype" panose="02040502050505030304" pitchFamily="18" charset="0"/>
-              </a:endParaRPr>
             </a:p>
           </p:txBody>
         </p:sp>
@@ -6300,7 +8240,7 @@
           <a:p>
             <a:fld id="{11AD1F4E-1E51-402E-B221-310F004E7D3B}" type="slidenum">
               <a:rPr lang="en-US" smtClean="0"/>
-              <a:t>7</a:t>
+              <a:t>8</a:t>
             </a:fld>
             <a:endParaRPr lang="en-US"/>
           </a:p>
@@ -6310,293 +8250,6 @@
     <p:extLst>
       <p:ext uri="{BB962C8B-B14F-4D97-AF65-F5344CB8AC3E}">
         <p14:creationId xmlns:p14="http://schemas.microsoft.com/office/powerpoint/2010/main" val="3611286983"/>
-      </p:ext>
-    </p:extLst>
-  </p:cSld>
-  <p:clrMapOvr>
-    <a:masterClrMapping/>
-  </p:clrMapOvr>
-  <p:timing>
-    <p:tnLst>
-      <p:par>
-        <p:cTn id="1" dur="indefinite" restart="never" nodeType="tmRoot"/>
-      </p:par>
-    </p:tnLst>
-  </p:timing>
-</p:sld>
-</file>
-
-<file path=ppt/slides/slide8.xml><?xml version="1.0" encoding="utf-8"?>
-<p:sld xmlns:a="http://schemas.openxmlformats.org/drawingml/2006/main" xmlns:r="http://schemas.openxmlformats.org/officeDocument/2006/relationships" xmlns:p="http://schemas.openxmlformats.org/presentationml/2006/main">
-  <p:cSld>
-    <p:spTree>
-      <p:nvGrpSpPr>
-        <p:cNvPr id="1" name=""/>
-        <p:cNvGrpSpPr/>
-        <p:nvPr/>
-      </p:nvGrpSpPr>
-      <p:grpSpPr>
-        <a:xfrm>
-          <a:off x="0" y="0"/>
-          <a:ext cx="0" cy="0"/>
-          <a:chOff x="0" y="0"/>
-          <a:chExt cx="0" cy="0"/>
-        </a:xfrm>
-      </p:grpSpPr>
-      <p:sp>
-        <p:nvSpPr>
-          <p:cNvPr id="2" name="Title 1"/>
-          <p:cNvSpPr>
-            <a:spLocks noGrp="1"/>
-          </p:cNvSpPr>
-          <p:nvPr>
-            <p:ph type="title"/>
-          </p:nvPr>
-        </p:nvSpPr>
-        <p:spPr/>
-        <p:txBody>
-          <a:bodyPr/>
-          <a:lstStyle/>
-          <a:p>
-            <a:r>
-              <a:rPr lang="en-US" dirty="0" smtClean="0"/>
-              <a:t>Tuple</a:t>
-            </a:r>
-            <a:endParaRPr lang="en-US" dirty="0"/>
-          </a:p>
-        </p:txBody>
-      </p:sp>
-      <p:sp>
-        <p:nvSpPr>
-          <p:cNvPr id="3" name="Content Placeholder 2"/>
-          <p:cNvSpPr>
-            <a:spLocks noGrp="1"/>
-          </p:cNvSpPr>
-          <p:nvPr>
-            <p:ph idx="1"/>
-          </p:nvPr>
-        </p:nvSpPr>
-        <p:spPr/>
-        <p:txBody>
-          <a:bodyPr>
-            <a:normAutofit/>
-          </a:bodyPr>
-          <a:lstStyle/>
-          <a:p>
-            <a:r>
-              <a:rPr lang="en-US" dirty="0" smtClean="0"/>
-              <a:t>Characteristics</a:t>
-            </a:r>
-          </a:p>
-          <a:p>
-            <a:pPr lvl="1"/>
-            <a:r>
-              <a:rPr lang="en-US" dirty="0" smtClean="0"/>
-              <a:t>access: random by ordinal index or keyword</a:t>
-            </a:r>
-          </a:p>
-          <a:p>
-            <a:pPr lvl="1"/>
-            <a:r>
-              <a:rPr lang="en-US" dirty="0" smtClean="0"/>
-              <a:t>ordered</a:t>
-            </a:r>
-          </a:p>
-          <a:p>
-            <a:pPr lvl="1"/>
-            <a:r>
-              <a:rPr lang="en-US" dirty="0" smtClean="0"/>
-              <a:t>fixed length</a:t>
-            </a:r>
-          </a:p>
-          <a:p>
-            <a:pPr lvl="1"/>
-            <a:r>
-              <a:rPr lang="en-US" dirty="0" smtClean="0"/>
-              <a:t>insert/update: N/A</a:t>
-            </a:r>
-          </a:p>
-          <a:p>
-            <a:pPr lvl="1"/>
-            <a:r>
-              <a:rPr lang="en-US" dirty="0" smtClean="0"/>
-              <a:t>retrieval: O(1)</a:t>
-            </a:r>
-          </a:p>
-          <a:p>
-            <a:pPr lvl="1"/>
-            <a:r>
-              <a:rPr lang="en-US" dirty="0" smtClean="0"/>
-              <a:t>search: N/A</a:t>
-            </a:r>
-          </a:p>
-          <a:p>
-            <a:pPr lvl="1"/>
-            <a:r>
-              <a:rPr lang="en-US" dirty="0" smtClean="0"/>
-              <a:t>element type: any</a:t>
-            </a:r>
-          </a:p>
-          <a:p>
-            <a:r>
-              <a:rPr lang="en-US" dirty="0" smtClean="0"/>
-              <a:t>Implementations</a:t>
-            </a:r>
-          </a:p>
-          <a:p>
-            <a:pPr lvl="1"/>
-            <a:r>
-              <a:rPr lang="en-US" dirty="0" smtClean="0"/>
-              <a:t>C/C++/Fortran/Java/Python: core language</a:t>
-            </a:r>
-          </a:p>
-          <a:p>
-            <a:pPr lvl="1"/>
-            <a:endParaRPr lang="en-US" dirty="0"/>
-          </a:p>
-        </p:txBody>
-      </p:sp>
-      <p:grpSp>
-        <p:nvGrpSpPr>
-          <p:cNvPr id="4" name="Group 3"/>
-          <p:cNvGrpSpPr/>
-          <p:nvPr/>
-        </p:nvGrpSpPr>
-        <p:grpSpPr>
-          <a:xfrm>
-            <a:off x="4699287" y="3234172"/>
-            <a:ext cx="2659967" cy="797285"/>
-            <a:chOff x="6307280" y="2566553"/>
-            <a:chExt cx="3546622" cy="1063046"/>
-          </a:xfrm>
-        </p:grpSpPr>
-        <p:graphicFrame>
-          <p:nvGraphicFramePr>
-            <p:cNvPr id="5" name="Object 4"/>
-            <p:cNvGraphicFramePr>
-              <a:graphicFrameLocks noChangeAspect="1"/>
-            </p:cNvGraphicFramePr>
-            <p:nvPr>
-              <p:extLst>
-                <p:ext uri="{D42A27DB-BD31-4B8C-83A1-F6EECF244321}">
-                  <p14:modId xmlns:p14="http://schemas.microsoft.com/office/powerpoint/2010/main" val="872199375"/>
-                </p:ext>
-              </p:extLst>
-            </p:nvPr>
-          </p:nvGraphicFramePr>
-          <p:xfrm>
-            <a:off x="7405977" y="3118424"/>
-            <a:ext cx="2447925" cy="511175"/>
-          </p:xfrm>
-          <a:graphic>
-            <a:graphicData uri="http://schemas.openxmlformats.org/presentationml/2006/ole">
-              <mc:AlternateContent xmlns:mc="http://schemas.openxmlformats.org/markup-compatibility/2006">
-                <mc:Choice xmlns:v="urn:schemas-microsoft-com:vml" Requires="v">
-                  <p:oleObj spid="_x0000_s3083" name="Equation" r:id="rId3" imgW="1091880" imgH="228600" progId="Equation.3">
-                    <p:embed/>
-                  </p:oleObj>
-                </mc:Choice>
-                <mc:Fallback>
-                  <p:oleObj name="Equation" r:id="rId3" imgW="1091880" imgH="228600" progId="Equation.3">
-                    <p:embed/>
-                    <p:pic>
-                      <p:nvPicPr>
-                        <p:cNvPr id="0" name=""/>
-                        <p:cNvPicPr/>
-                        <p:nvPr/>
-                      </p:nvPicPr>
-                      <p:blipFill>
-                        <a:blip r:embed="rId4"/>
-                        <a:stretch>
-                          <a:fillRect/>
-                        </a:stretch>
-                      </p:blipFill>
-                      <p:spPr>
-                        <a:xfrm>
-                          <a:off x="7405977" y="3118424"/>
-                          <a:ext cx="2447925" cy="511175"/>
-                        </a:xfrm>
-                        <a:prstGeom prst="rect">
-                          <a:avLst/>
-                        </a:prstGeom>
-                      </p:spPr>
-                    </p:pic>
-                  </p:oleObj>
-                </mc:Fallback>
-              </mc:AlternateContent>
-            </a:graphicData>
-          </a:graphic>
-        </p:graphicFrame>
-        <p:sp>
-          <p:nvSpPr>
-            <p:cNvPr id="6" name="TextBox 5"/>
-            <p:cNvSpPr txBox="1"/>
-            <p:nvPr/>
-          </p:nvSpPr>
-          <p:spPr>
-            <a:xfrm>
-              <a:off x="6307280" y="2566553"/>
-              <a:ext cx="1498701" cy="553997"/>
-            </a:xfrm>
-            <a:prstGeom prst="rect">
-              <a:avLst/>
-            </a:prstGeom>
-            <a:noFill/>
-          </p:spPr>
-          <p:txBody>
-            <a:bodyPr wrap="none" rtlCol="0">
-              <a:spAutoFit/>
-            </a:bodyPr>
-            <a:lstStyle/>
-            <a:p>
-              <a:r>
-                <a:rPr lang="en-US" sz="2100" i="1" dirty="0"/>
-                <a:t>d</a:t>
-              </a:r>
-              <a:r>
-                <a:rPr lang="en-US" sz="2100" dirty="0"/>
-                <a:t>-tuple </a:t>
-              </a:r>
-              <a:r>
-                <a:rPr lang="en-US" sz="2100" i="1" dirty="0">
-                  <a:latin typeface="Palatino Linotype" panose="02040502050505030304" pitchFamily="18" charset="0"/>
-                </a:rPr>
-                <a:t>t</a:t>
-              </a:r>
-              <a:endParaRPr lang="en-US" sz="2100" i="1" dirty="0">
-                <a:latin typeface="Palatino Linotype" panose="02040502050505030304" pitchFamily="18" charset="0"/>
-              </a:endParaRPr>
-            </a:p>
-          </p:txBody>
-        </p:sp>
-      </p:grpSp>
-      <p:sp>
-        <p:nvSpPr>
-          <p:cNvPr id="7" name="Slide Number Placeholder 6"/>
-          <p:cNvSpPr>
-            <a:spLocks noGrp="1"/>
-          </p:cNvSpPr>
-          <p:nvPr>
-            <p:ph type="sldNum" sz="quarter" idx="12"/>
-          </p:nvPr>
-        </p:nvSpPr>
-        <p:spPr/>
-        <p:txBody>
-          <a:bodyPr/>
-          <a:lstStyle/>
-          <a:p>
-            <a:fld id="{11AD1F4E-1E51-402E-B221-310F004E7D3B}" type="slidenum">
-              <a:rPr lang="en-US" smtClean="0"/>
-              <a:t>8</a:t>
-            </a:fld>
-            <a:endParaRPr lang="en-US"/>
-          </a:p>
-        </p:txBody>
-      </p:sp>
-    </p:spTree>
-    <p:extLst>
-      <p:ext uri="{BB962C8B-B14F-4D97-AF65-F5344CB8AC3E}">
-        <p14:creationId xmlns:p14="http://schemas.microsoft.com/office/powerpoint/2010/main" val="2505608512"/>
       </p:ext>
     </p:extLst>
   </p:cSld>
@@ -6647,7 +8300,7 @@
           <a:p>
             <a:r>
               <a:rPr lang="en-US" dirty="0" smtClean="0"/>
-              <a:t>List</a:t>
+              <a:t>Array examples</a:t>
             </a:r>
             <a:endParaRPr lang="en-US" dirty="0"/>
           </a:p>
@@ -6655,240 +8308,7 @@
       </p:sp>
       <p:sp>
         <p:nvSpPr>
-          <p:cNvPr id="3" name="Content Placeholder 2"/>
-          <p:cNvSpPr>
-            <a:spLocks noGrp="1"/>
-          </p:cNvSpPr>
-          <p:nvPr>
-            <p:ph idx="1"/>
-          </p:nvPr>
-        </p:nvSpPr>
-        <p:spPr/>
-        <p:txBody>
-          <a:bodyPr>
-            <a:normAutofit fontScale="92500" lnSpcReduction="20000"/>
-          </a:bodyPr>
-          <a:lstStyle/>
-          <a:p>
-            <a:r>
-              <a:rPr lang="en-US" dirty="0" smtClean="0"/>
-              <a:t>Characteristics</a:t>
-            </a:r>
-          </a:p>
-          <a:p>
-            <a:pPr lvl="1"/>
-            <a:r>
-              <a:rPr lang="en-US" dirty="0" smtClean="0"/>
-              <a:t>access: random by ordinal index</a:t>
-            </a:r>
-          </a:p>
-          <a:p>
-            <a:pPr lvl="1"/>
-            <a:r>
-              <a:rPr lang="en-US" dirty="0" smtClean="0"/>
-              <a:t>ordered</a:t>
-            </a:r>
-          </a:p>
-          <a:p>
-            <a:pPr lvl="1"/>
-            <a:r>
-              <a:rPr lang="en-US" dirty="0" smtClean="0"/>
-              <a:t>length can vary</a:t>
-            </a:r>
-          </a:p>
-          <a:p>
-            <a:pPr lvl="1"/>
-            <a:r>
-              <a:rPr lang="en-US" dirty="0" smtClean="0"/>
-              <a:t>insert/update: O(n)</a:t>
-            </a:r>
-          </a:p>
-          <a:p>
-            <a:pPr lvl="1"/>
-            <a:r>
-              <a:rPr lang="en-US" dirty="0" smtClean="0"/>
-              <a:t>retrieval: O(n)</a:t>
-            </a:r>
-          </a:p>
-          <a:p>
-            <a:pPr lvl="1"/>
-            <a:r>
-              <a:rPr lang="en-US" dirty="0" smtClean="0"/>
-              <a:t>search: O(n)</a:t>
-            </a:r>
-          </a:p>
-          <a:p>
-            <a:pPr lvl="1"/>
-            <a:r>
-              <a:rPr lang="en-US" dirty="0" smtClean="0"/>
-              <a:t>prepend/append/pop/</a:t>
-            </a:r>
-            <a:r>
-              <a:rPr lang="en-US" dirty="0" err="1" smtClean="0"/>
-              <a:t>unshift</a:t>
-            </a:r>
-            <a:r>
-              <a:rPr lang="en-US" dirty="0" smtClean="0"/>
-              <a:t>: </a:t>
-            </a:r>
-            <a:r>
-              <a:rPr lang="en-US" dirty="0" smtClean="0"/>
-              <a:t>O(1)</a:t>
-            </a:r>
-          </a:p>
-          <a:p>
-            <a:pPr lvl="1"/>
-            <a:r>
-              <a:rPr lang="en-US" dirty="0" smtClean="0"/>
-              <a:t>element type: any</a:t>
-            </a:r>
-          </a:p>
-          <a:p>
-            <a:pPr lvl="1"/>
-            <a:r>
-              <a:rPr lang="en-US" dirty="0" smtClean="0"/>
-              <a:t>operations: concatenation</a:t>
-            </a:r>
-          </a:p>
-          <a:p>
-            <a:r>
-              <a:rPr lang="en-US" dirty="0" smtClean="0"/>
-              <a:t>Implementations</a:t>
-            </a:r>
-          </a:p>
-          <a:p>
-            <a:pPr lvl="1"/>
-            <a:r>
-              <a:rPr lang="en-US" dirty="0" smtClean="0"/>
-              <a:t>C++/Java: standard library</a:t>
-            </a:r>
-          </a:p>
-          <a:p>
-            <a:pPr lvl="1"/>
-            <a:r>
-              <a:rPr lang="en-US" dirty="0" smtClean="0"/>
-              <a:t>Python: core language</a:t>
-            </a:r>
-          </a:p>
-          <a:p>
-            <a:pPr lvl="1"/>
-            <a:endParaRPr lang="en-US" dirty="0"/>
-          </a:p>
-        </p:txBody>
-      </p:sp>
-      <p:grpSp>
-        <p:nvGrpSpPr>
-          <p:cNvPr id="4" name="Group 3"/>
-          <p:cNvGrpSpPr/>
-          <p:nvPr/>
-        </p:nvGrpSpPr>
-        <p:grpSpPr>
-          <a:xfrm>
-            <a:off x="6457950" y="3296518"/>
-            <a:ext cx="1174823" cy="808001"/>
-            <a:chOff x="6307280" y="2566553"/>
-            <a:chExt cx="1566431" cy="1077334"/>
-          </a:xfrm>
-        </p:grpSpPr>
-        <p:graphicFrame>
-          <p:nvGraphicFramePr>
-            <p:cNvPr id="5" name="Object 4"/>
-            <p:cNvGraphicFramePr>
-              <a:graphicFrameLocks noChangeAspect="1"/>
-            </p:cNvGraphicFramePr>
-            <p:nvPr>
-              <p:extLst>
-                <p:ext uri="{D42A27DB-BD31-4B8C-83A1-F6EECF244321}">
-                  <p14:modId xmlns:p14="http://schemas.microsoft.com/office/powerpoint/2010/main" val="2802905344"/>
-                </p:ext>
-              </p:extLst>
-            </p:nvPr>
-          </p:nvGraphicFramePr>
-          <p:xfrm>
-            <a:off x="6933911" y="3104137"/>
-            <a:ext cx="939800" cy="539750"/>
-          </p:xfrm>
-          <a:graphic>
-            <a:graphicData uri="http://schemas.openxmlformats.org/presentationml/2006/ole">
-              <mc:AlternateContent xmlns:mc="http://schemas.openxmlformats.org/markup-compatibility/2006">
-                <mc:Choice xmlns:v="urn:schemas-microsoft-com:vml" Requires="v">
-                  <p:oleObj spid="_x0000_s4102" name="Equation" r:id="rId3" imgW="419040" imgH="241200" progId="Equation.3">
-                    <p:embed/>
-                  </p:oleObj>
-                </mc:Choice>
-                <mc:Fallback>
-                  <p:oleObj name="Equation" r:id="rId3" imgW="419040" imgH="241200" progId="Equation.3">
-                    <p:embed/>
-                    <p:pic>
-                      <p:nvPicPr>
-                        <p:cNvPr id="0" name=""/>
-                        <p:cNvPicPr/>
-                        <p:nvPr/>
-                      </p:nvPicPr>
-                      <p:blipFill>
-                        <a:blip r:embed="rId4"/>
-                        <a:stretch>
-                          <a:fillRect/>
-                        </a:stretch>
-                      </p:blipFill>
-                      <p:spPr>
-                        <a:xfrm>
-                          <a:off x="6933911" y="3104137"/>
-                          <a:ext cx="939800" cy="539750"/>
-                        </a:xfrm>
-                        <a:prstGeom prst="rect">
-                          <a:avLst/>
-                        </a:prstGeom>
-                      </p:spPr>
-                    </p:pic>
-                  </p:oleObj>
-                </mc:Fallback>
-              </mc:AlternateContent>
-            </a:graphicData>
-          </a:graphic>
-        </p:graphicFrame>
-        <p:sp>
-          <p:nvSpPr>
-            <p:cNvPr id="6" name="TextBox 5"/>
-            <p:cNvSpPr txBox="1"/>
-            <p:nvPr/>
-          </p:nvSpPr>
-          <p:spPr>
-            <a:xfrm>
-              <a:off x="6307280" y="2566553"/>
-              <a:ext cx="851344" cy="553997"/>
-            </a:xfrm>
-            <a:prstGeom prst="rect">
-              <a:avLst/>
-            </a:prstGeom>
-            <a:noFill/>
-          </p:spPr>
-          <p:txBody>
-            <a:bodyPr wrap="none" rtlCol="0">
-              <a:spAutoFit/>
-            </a:bodyPr>
-            <a:lstStyle/>
-            <a:p>
-              <a:r>
-                <a:rPr lang="en-US" sz="2100" dirty="0"/>
-                <a:t>list </a:t>
-              </a:r>
-              <a:r>
-                <a:rPr lang="en-US" sz="2100" i="1" dirty="0">
-                  <a:latin typeface="Palatino Linotype" panose="02040502050505030304" pitchFamily="18" charset="0"/>
-                </a:rPr>
-                <a:t>l</a:t>
-              </a:r>
-              <a:endParaRPr lang="en-US" sz="2100" i="1" dirty="0">
-                <a:latin typeface="Palatino Linotype" panose="02040502050505030304" pitchFamily="18" charset="0"/>
-              </a:endParaRPr>
-            </a:p>
-          </p:txBody>
-        </p:sp>
-      </p:grpSp>
-      <p:sp>
-        <p:nvSpPr>
-          <p:cNvPr id="7" name="Slide Number Placeholder 6"/>
+          <p:cNvPr id="4" name="Slide Number Placeholder 3"/>
           <p:cNvSpPr>
             <a:spLocks noGrp="1"/>
           </p:cNvSpPr>
@@ -6909,10 +8329,154 @@
           </a:p>
         </p:txBody>
       </p:sp>
+      <p:sp>
+        <p:nvSpPr>
+          <p:cNvPr id="5" name="TextBox 4"/>
+          <p:cNvSpPr txBox="1"/>
+          <p:nvPr/>
+        </p:nvSpPr>
+        <p:spPr>
+          <a:xfrm>
+            <a:off x="628650" y="2244436"/>
+            <a:ext cx="5561138" cy="923330"/>
+          </a:xfrm>
+          <a:prstGeom prst="rect">
+            <a:avLst/>
+          </a:prstGeom>
+          <a:solidFill>
+            <a:schemeClr val="tx2">
+              <a:lumMod val="40000"/>
+              <a:lumOff val="60000"/>
+            </a:schemeClr>
+          </a:solidFill>
+          <a:ln>
+            <a:solidFill>
+              <a:schemeClr val="tx1"/>
+            </a:solidFill>
+          </a:ln>
+        </p:spPr>
+        <p:txBody>
+          <a:bodyPr wrap="square" rtlCol="0">
+            <a:spAutoFit/>
+          </a:bodyPr>
+          <a:lstStyle/>
+          <a:p>
+            <a:r>
+              <a:rPr lang="en-US" dirty="0" err="1" smtClean="0">
+                <a:latin typeface="Courier New" panose="02070309020205020404" pitchFamily="49" charset="0"/>
+                <a:cs typeface="Courier New" panose="02070309020205020404" pitchFamily="49" charset="0"/>
+              </a:rPr>
+              <a:t>int</a:t>
+            </a:r>
+            <a:r>
+              <a:rPr lang="en-US" dirty="0" smtClean="0">
+                <a:latin typeface="Courier New" panose="02070309020205020404" pitchFamily="49" charset="0"/>
+                <a:cs typeface="Courier New" panose="02070309020205020404" pitchFamily="49" charset="0"/>
+              </a:rPr>
+              <a:t> a[10];</a:t>
+            </a:r>
+          </a:p>
+          <a:p>
+            <a:r>
+              <a:rPr lang="en-US" dirty="0" smtClean="0">
+                <a:latin typeface="Courier New" panose="02070309020205020404" pitchFamily="49" charset="0"/>
+                <a:cs typeface="Courier New" panose="02070309020205020404" pitchFamily="49" charset="0"/>
+              </a:rPr>
+              <a:t>a[0] = 12;</a:t>
+            </a:r>
+          </a:p>
+          <a:p>
+            <a:r>
+              <a:rPr lang="en-US" dirty="0" smtClean="0">
+                <a:latin typeface="Courier New" panose="02070309020205020404" pitchFamily="49" charset="0"/>
+                <a:cs typeface="Courier New" panose="02070309020205020404" pitchFamily="49" charset="0"/>
+              </a:rPr>
+              <a:t>a[1] = a[0] + 13;</a:t>
+            </a:r>
+            <a:endParaRPr lang="en-US" dirty="0">
+              <a:latin typeface="Courier New" panose="02070309020205020404" pitchFamily="49" charset="0"/>
+              <a:cs typeface="Courier New" panose="02070309020205020404" pitchFamily="49" charset="0"/>
+            </a:endParaRPr>
+          </a:p>
+        </p:txBody>
+      </p:sp>
+      <p:sp>
+        <p:nvSpPr>
+          <p:cNvPr id="6" name="TextBox 5"/>
+          <p:cNvSpPr txBox="1"/>
+          <p:nvPr/>
+        </p:nvSpPr>
+        <p:spPr>
+          <a:xfrm>
+            <a:off x="628650" y="3487882"/>
+            <a:ext cx="5561138" cy="1200329"/>
+          </a:xfrm>
+          <a:prstGeom prst="rect">
+            <a:avLst/>
+          </a:prstGeom>
+          <a:solidFill>
+            <a:schemeClr val="accent4">
+              <a:lumMod val="40000"/>
+              <a:lumOff val="60000"/>
+            </a:schemeClr>
+          </a:solidFill>
+          <a:ln>
+            <a:solidFill>
+              <a:schemeClr val="tx1"/>
+            </a:solidFill>
+          </a:ln>
+        </p:spPr>
+        <p:txBody>
+          <a:bodyPr wrap="none" rtlCol="0">
+            <a:spAutoFit/>
+          </a:bodyPr>
+          <a:lstStyle/>
+          <a:p>
+            <a:r>
+              <a:rPr lang="en-US" dirty="0" smtClean="0">
+                <a:latin typeface="Courier New" panose="02070309020205020404" pitchFamily="49" charset="0"/>
+                <a:cs typeface="Courier New" panose="02070309020205020404" pitchFamily="49" charset="0"/>
+              </a:rPr>
+              <a:t>from array import array</a:t>
+            </a:r>
+          </a:p>
+          <a:p>
+            <a:r>
+              <a:rPr lang="en-US" dirty="0" smtClean="0">
+                <a:latin typeface="Courier New" panose="02070309020205020404" pitchFamily="49" charset="0"/>
+                <a:cs typeface="Courier New" panose="02070309020205020404" pitchFamily="49" charset="0"/>
+              </a:rPr>
+              <a:t>a = array('l', (0 for _ in range(100)))</a:t>
+            </a:r>
+          </a:p>
+          <a:p>
+            <a:r>
+              <a:rPr lang="en-US" dirty="0" smtClean="0">
+                <a:latin typeface="Courier New" panose="02070309020205020404" pitchFamily="49" charset="0"/>
+                <a:cs typeface="Courier New" panose="02070309020205020404" pitchFamily="49" charset="0"/>
+              </a:rPr>
+              <a:t>a[0] = 12</a:t>
+            </a:r>
+          </a:p>
+          <a:p>
+            <a:r>
+              <a:rPr lang="en-US" dirty="0" smtClean="0">
+                <a:latin typeface="Courier New" panose="02070309020205020404" pitchFamily="49" charset="0"/>
+                <a:cs typeface="Courier New" panose="02070309020205020404" pitchFamily="49" charset="0"/>
+              </a:rPr>
+              <a:t>a[1] = a[0] + 13</a:t>
+            </a:r>
+            <a:endParaRPr lang="en-US" dirty="0">
+              <a:latin typeface="Courier New" panose="02070309020205020404" pitchFamily="49" charset="0"/>
+              <a:cs typeface="Courier New" panose="02070309020205020404" pitchFamily="49" charset="0"/>
+            </a:endParaRPr>
+          </a:p>
+        </p:txBody>
+      </p:sp>
     </p:spTree>
     <p:extLst>
       <p:ext uri="{BB962C8B-B14F-4D97-AF65-F5344CB8AC3E}">
-        <p14:creationId xmlns:p14="http://schemas.microsoft.com/office/powerpoint/2010/main" val="2248761884"/>
+        <p14:creationId xmlns:p14="http://schemas.microsoft.com/office/powerpoint/2010/main" val="377249263"/>
       </p:ext>
     </p:extLst>
   </p:cSld>

</xml_diff>

<commit_message>
Added code samples for set and dictionary
</commit_message>
<xml_diff>
--- a/DataStructures/data_structures.pptx
+++ b/DataStructures/data_structures.pptx
@@ -5,7 +5,7 @@
     <p:sldMasterId id="2147483660" r:id="rId1"/>
   </p:sldMasterIdLst>
   <p:notesMasterIdLst>
-    <p:notesMasterId r:id="rId17"/>
+    <p:notesMasterId r:id="rId19"/>
   </p:notesMasterIdLst>
   <p:sldIdLst>
     <p:sldId id="256" r:id="rId2"/>
@@ -22,7 +22,9 @@
     <p:sldId id="262" r:id="rId13"/>
     <p:sldId id="270" r:id="rId14"/>
     <p:sldId id="263" r:id="rId15"/>
-    <p:sldId id="264" r:id="rId16"/>
+    <p:sldId id="271" r:id="rId16"/>
+    <p:sldId id="264" r:id="rId17"/>
+    <p:sldId id="272" r:id="rId18"/>
   </p:sldIdLst>
   <p:sldSz cx="9144000" cy="6858000" type="screen4x3"/>
   <p:notesSz cx="6858000" cy="9144000"/>
@@ -3747,7 +3749,7 @@
             <a:graphicData uri="http://schemas.openxmlformats.org/presentationml/2006/ole">
               <mc:AlternateContent xmlns:mc="http://schemas.openxmlformats.org/markup-compatibility/2006">
                 <mc:Choice xmlns:v="urn:schemas-microsoft-com:vml" Requires="v">
-                  <p:oleObj spid="_x0000_s3087" name="Equation" r:id="rId3" imgW="1091880" imgH="228600" progId="Equation.3">
+                  <p:oleObj spid="_x0000_s3090" name="Equation" r:id="rId3" imgW="1091880" imgH="228600" progId="Equation.3">
                     <p:embed/>
                   </p:oleObj>
                 </mc:Choice>
@@ -4511,7 +4513,7 @@
             <a:graphicData uri="http://schemas.openxmlformats.org/presentationml/2006/ole">
               <mc:AlternateContent xmlns:mc="http://schemas.openxmlformats.org/markup-compatibility/2006">
                 <mc:Choice xmlns:v="urn:schemas-microsoft-com:vml" Requires="v">
-                  <p:oleObj spid="_x0000_s4106" name="Equation" r:id="rId3" imgW="419040" imgH="241200" progId="Equation.3">
+                  <p:oleObj spid="_x0000_s4109" name="Equation" r:id="rId3" imgW="419040" imgH="241200" progId="Equation.3">
                     <p:embed/>
                   </p:oleObj>
                 </mc:Choice>
@@ -4697,7 +4699,7 @@
         <p:spPr>
           <a:xfrm>
             <a:off x="628650" y="1704105"/>
-            <a:ext cx="6665768" cy="2308324"/>
+            <a:ext cx="6665768" cy="2031325"/>
           </a:xfrm>
           <a:prstGeom prst="rect">
             <a:avLst/>
@@ -4882,121 +4884,56 @@
                 <a:latin typeface="Courier New" panose="02070309020205020404" pitchFamily="49" charset="0"/>
                 <a:cs typeface="Courier New" panose="02070309020205020404" pitchFamily="49" charset="0"/>
               </a:rPr>
-              <a:t>for </a:t>
+              <a:t>for (auto it </a:t>
             </a:r>
             <a:r>
               <a:rPr lang="en-US" dirty="0">
                 <a:latin typeface="Courier New" panose="02070309020205020404" pitchFamily="49" charset="0"/>
                 <a:cs typeface="Courier New" panose="02070309020205020404" pitchFamily="49" charset="0"/>
               </a:rPr>
-              <a:t>(</a:t>
-            </a:r>
-            <a:r>
-              <a:rPr lang="en-US" dirty="0" err="1">
-                <a:latin typeface="Courier New" panose="02070309020205020404" pitchFamily="49" charset="0"/>
-                <a:cs typeface="Courier New" panose="02070309020205020404" pitchFamily="49" charset="0"/>
-              </a:rPr>
-              <a:t>std</a:t>
+              <a:t>= </a:t>
+            </a:r>
+            <a:r>
+              <a:rPr lang="en-US" dirty="0" err="1" smtClean="0">
+                <a:latin typeface="Courier New" panose="02070309020205020404" pitchFamily="49" charset="0"/>
+                <a:cs typeface="Courier New" panose="02070309020205020404" pitchFamily="49" charset="0"/>
+              </a:rPr>
+              <a:t>l.begin</a:t>
+            </a:r>
+            <a:r>
+              <a:rPr lang="en-US" dirty="0" smtClean="0">
+                <a:latin typeface="Courier New" panose="02070309020205020404" pitchFamily="49" charset="0"/>
+                <a:cs typeface="Courier New" panose="02070309020205020404" pitchFamily="49" charset="0"/>
+              </a:rPr>
+              <a:t>(); it </a:t>
             </a:r>
             <a:r>
               <a:rPr lang="en-US" dirty="0">
                 <a:latin typeface="Courier New" panose="02070309020205020404" pitchFamily="49" charset="0"/>
                 <a:cs typeface="Courier New" panose="02070309020205020404" pitchFamily="49" charset="0"/>
               </a:rPr>
-              <a:t>::list&lt;</a:t>
-            </a:r>
-            <a:r>
-              <a:rPr lang="en-US" dirty="0" err="1">
-                <a:latin typeface="Courier New" panose="02070309020205020404" pitchFamily="49" charset="0"/>
-                <a:cs typeface="Courier New" panose="02070309020205020404" pitchFamily="49" charset="0"/>
-              </a:rPr>
-              <a:t>int</a:t>
+              <a:t>!= </a:t>
+            </a:r>
+            <a:r>
+              <a:rPr lang="en-US" dirty="0" err="1" smtClean="0">
+                <a:latin typeface="Courier New" panose="02070309020205020404" pitchFamily="49" charset="0"/>
+                <a:cs typeface="Courier New" panose="02070309020205020404" pitchFamily="49" charset="0"/>
+              </a:rPr>
+              <a:t>l.end</a:t>
             </a:r>
             <a:r>
               <a:rPr lang="en-US" dirty="0">
                 <a:latin typeface="Courier New" panose="02070309020205020404" pitchFamily="49" charset="0"/>
                 <a:cs typeface="Courier New" panose="02070309020205020404" pitchFamily="49" charset="0"/>
               </a:rPr>
-              <a:t>&gt;::iterator </a:t>
-            </a:r>
-            <a:r>
-              <a:rPr lang="en-US" dirty="0" err="1">
-                <a:latin typeface="Courier New" panose="02070309020205020404" pitchFamily="49" charset="0"/>
-                <a:cs typeface="Courier New" panose="02070309020205020404" pitchFamily="49" charset="0"/>
-              </a:rPr>
-              <a:t>iter</a:t>
-            </a:r>
-            <a:r>
-              <a:rPr lang="en-US" dirty="0">
-                <a:latin typeface="Courier New" panose="02070309020205020404" pitchFamily="49" charset="0"/>
-                <a:cs typeface="Courier New" panose="02070309020205020404" pitchFamily="49" charset="0"/>
-              </a:rPr>
-              <a:t> = </a:t>
-            </a:r>
-            <a:r>
-              <a:rPr lang="en-US" dirty="0" err="1" smtClean="0">
-                <a:latin typeface="Courier New" panose="02070309020205020404" pitchFamily="49" charset="0"/>
-                <a:cs typeface="Courier New" panose="02070309020205020404" pitchFamily="49" charset="0"/>
-              </a:rPr>
-              <a:t>l.begin</a:t>
-            </a:r>
-            <a:r>
-              <a:rPr lang="en-US" dirty="0">
-                <a:latin typeface="Courier New" panose="02070309020205020404" pitchFamily="49" charset="0"/>
-                <a:cs typeface="Courier New" panose="02070309020205020404" pitchFamily="49" charset="0"/>
-              </a:rPr>
-              <a:t>();</a:t>
-            </a:r>
-          </a:p>
-          <a:p>
-            <a:r>
-              <a:rPr lang="en-US" dirty="0">
-                <a:latin typeface="Courier New" panose="02070309020205020404" pitchFamily="49" charset="0"/>
-                <a:cs typeface="Courier New" panose="02070309020205020404" pitchFamily="49" charset="0"/>
-              </a:rPr>
-              <a:t>            </a:t>
-            </a:r>
-            <a:r>
-              <a:rPr lang="en-US" dirty="0" err="1">
-                <a:latin typeface="Courier New" panose="02070309020205020404" pitchFamily="49" charset="0"/>
-                <a:cs typeface="Courier New" panose="02070309020205020404" pitchFamily="49" charset="0"/>
-              </a:rPr>
-              <a:t>iter</a:t>
-            </a:r>
-            <a:r>
-              <a:rPr lang="en-US" dirty="0">
-                <a:latin typeface="Courier New" panose="02070309020205020404" pitchFamily="49" charset="0"/>
-                <a:cs typeface="Courier New" panose="02070309020205020404" pitchFamily="49" charset="0"/>
-              </a:rPr>
-              <a:t> != </a:t>
-            </a:r>
-            <a:r>
-              <a:rPr lang="en-US" dirty="0" err="1" smtClean="0">
-                <a:latin typeface="Courier New" panose="02070309020205020404" pitchFamily="49" charset="0"/>
-                <a:cs typeface="Courier New" panose="02070309020205020404" pitchFamily="49" charset="0"/>
-              </a:rPr>
-              <a:t>l.end</a:t>
-            </a:r>
-            <a:r>
-              <a:rPr lang="en-US" dirty="0">
-                <a:latin typeface="Courier New" panose="02070309020205020404" pitchFamily="49" charset="0"/>
-                <a:cs typeface="Courier New" panose="02070309020205020404" pitchFamily="49" charset="0"/>
-              </a:rPr>
               <a:t>(); </a:t>
             </a:r>
             <a:r>
-              <a:rPr lang="en-US" dirty="0" err="1">
-                <a:latin typeface="Courier New" panose="02070309020205020404" pitchFamily="49" charset="0"/>
-                <a:cs typeface="Courier New" panose="02070309020205020404" pitchFamily="49" charset="0"/>
-              </a:rPr>
-              <a:t>iter</a:t>
-            </a:r>
-            <a:r>
-              <a:rPr lang="en-US" dirty="0" smtClean="0">
-                <a:latin typeface="Courier New" panose="02070309020205020404" pitchFamily="49" charset="0"/>
-                <a:cs typeface="Courier New" panose="02070309020205020404" pitchFamily="49" charset="0"/>
-              </a:rPr>
-              <a:t>++)</a:t>
+              <a:rPr lang="en-US" dirty="0" smtClean="0">
+                <a:latin typeface="Courier New" panose="02070309020205020404" pitchFamily="49" charset="0"/>
+                <a:cs typeface="Courier New" panose="02070309020205020404" pitchFamily="49" charset="0"/>
+              </a:rPr>
+              <a:t>it++)</a:t>
             </a:r>
             <a:endParaRPr lang="en-US" dirty="0">
               <a:latin typeface="Courier New" panose="02070309020205020404" pitchFamily="49" charset="0"/>
@@ -5037,21 +4974,21 @@
                 <a:latin typeface="Courier New" panose="02070309020205020404" pitchFamily="49" charset="0"/>
                 <a:cs typeface="Courier New" panose="02070309020205020404" pitchFamily="49" charset="0"/>
               </a:rPr>
-              <a:t> &lt;&lt; "1: " &lt;&lt; *</a:t>
-            </a:r>
-            <a:r>
-              <a:rPr lang="en-US" dirty="0" err="1">
-                <a:latin typeface="Courier New" panose="02070309020205020404" pitchFamily="49" charset="0"/>
-                <a:cs typeface="Courier New" panose="02070309020205020404" pitchFamily="49" charset="0"/>
-              </a:rPr>
-              <a:t>iter</a:t>
+              <a:t> &lt;&lt; </a:t>
+            </a:r>
+            <a:r>
+              <a:rPr lang="en-US" dirty="0" smtClean="0">
+                <a:latin typeface="Courier New" panose="02070309020205020404" pitchFamily="49" charset="0"/>
+                <a:cs typeface="Courier New" panose="02070309020205020404" pitchFamily="49" charset="0"/>
+              </a:rPr>
+              <a:t>*it </a:t>
             </a:r>
             <a:r>
               <a:rPr lang="en-US" dirty="0">
                 <a:latin typeface="Courier New" panose="02070309020205020404" pitchFamily="49" charset="0"/>
                 <a:cs typeface="Courier New" panose="02070309020205020404" pitchFamily="49" charset="0"/>
               </a:rPr>
-              <a:t> &lt;&lt; </a:t>
+              <a:t>&lt;&lt; </a:t>
             </a:r>
             <a:r>
               <a:rPr lang="en-US" dirty="0" err="1">
@@ -5193,7 +5130,7 @@
                 <a:latin typeface="Courier New" panose="02070309020205020404" pitchFamily="49" charset="0"/>
                 <a:cs typeface="Courier New" panose="02070309020205020404" pitchFamily="49" charset="0"/>
               </a:rPr>
-              <a:t>   print('l: {0:d}'.format(x))</a:t>
+              <a:t>   print('{0:d}'.format(x))</a:t>
             </a:r>
           </a:p>
         </p:txBody>
@@ -5403,7 +5340,7 @@
             <a:graphicData uri="http://schemas.openxmlformats.org/presentationml/2006/ole">
               <mc:AlternateContent xmlns:mc="http://schemas.openxmlformats.org/markup-compatibility/2006">
                 <mc:Choice xmlns:v="urn:schemas-microsoft-com:vml" Requires="v">
-                  <p:oleObj spid="_x0000_s5129" name="Equation" r:id="rId3" imgW="444240" imgH="203040" progId="Equation.3">
+                  <p:oleObj spid="_x0000_s5132" name="Equation" r:id="rId3" imgW="444240" imgH="203040" progId="Equation.3">
                     <p:embed/>
                   </p:oleObj>
                 </mc:Choice>
@@ -5551,6 +5488,647 @@
           <a:p>
             <a:r>
               <a:rPr lang="en-US" dirty="0" smtClean="0"/>
+              <a:t>Set examples</a:t>
+            </a:r>
+            <a:endParaRPr lang="en-US" dirty="0"/>
+          </a:p>
+        </p:txBody>
+      </p:sp>
+      <p:sp>
+        <p:nvSpPr>
+          <p:cNvPr id="4" name="Slide Number Placeholder 3"/>
+          <p:cNvSpPr>
+            <a:spLocks noGrp="1"/>
+          </p:cNvSpPr>
+          <p:nvPr>
+            <p:ph type="sldNum" sz="quarter" idx="12"/>
+          </p:nvPr>
+        </p:nvSpPr>
+        <p:spPr/>
+        <p:txBody>
+          <a:bodyPr/>
+          <a:lstStyle/>
+          <a:p>
+            <a:fld id="{11AD1F4E-1E51-402E-B221-310F004E7D3B}" type="slidenum">
+              <a:rPr lang="en-US" smtClean="0"/>
+              <a:t>15</a:t>
+            </a:fld>
+            <a:endParaRPr lang="en-US"/>
+          </a:p>
+        </p:txBody>
+      </p:sp>
+      <p:sp>
+        <p:nvSpPr>
+          <p:cNvPr id="5" name="TextBox 4"/>
+          <p:cNvSpPr txBox="1"/>
+          <p:nvPr/>
+        </p:nvSpPr>
+        <p:spPr>
+          <a:xfrm>
+            <a:off x="628649" y="1704105"/>
+            <a:ext cx="7886701" cy="1754326"/>
+          </a:xfrm>
+          <a:prstGeom prst="rect">
+            <a:avLst/>
+          </a:prstGeom>
+          <a:solidFill>
+            <a:schemeClr val="tx2">
+              <a:lumMod val="40000"/>
+              <a:lumOff val="60000"/>
+            </a:schemeClr>
+          </a:solidFill>
+          <a:ln>
+            <a:solidFill>
+              <a:schemeClr val="tx1"/>
+            </a:solidFill>
+          </a:ln>
+        </p:spPr>
+        <p:txBody>
+          <a:bodyPr wrap="square" rtlCol="0">
+            <a:spAutoFit/>
+          </a:bodyPr>
+          <a:lstStyle/>
+          <a:p>
+            <a:r>
+              <a:rPr lang="en-US" dirty="0" err="1" smtClean="0">
+                <a:latin typeface="Courier New" panose="02070309020205020404" pitchFamily="49" charset="0"/>
+                <a:cs typeface="Courier New" panose="02070309020205020404" pitchFamily="49" charset="0"/>
+              </a:rPr>
+              <a:t>std</a:t>
+            </a:r>
+            <a:r>
+              <a:rPr lang="en-US" dirty="0" smtClean="0">
+                <a:latin typeface="Courier New" panose="02070309020205020404" pitchFamily="49" charset="0"/>
+                <a:cs typeface="Courier New" panose="02070309020205020404" pitchFamily="49" charset="0"/>
+              </a:rPr>
+              <a:t>::</a:t>
+            </a:r>
+            <a:r>
+              <a:rPr lang="en-US" dirty="0" err="1" smtClean="0">
+                <a:latin typeface="Courier New" panose="02070309020205020404" pitchFamily="49" charset="0"/>
+                <a:cs typeface="Courier New" panose="02070309020205020404" pitchFamily="49" charset="0"/>
+              </a:rPr>
+              <a:t>unordered_set</a:t>
+            </a:r>
+            <a:r>
+              <a:rPr lang="en-US" dirty="0" smtClean="0">
+                <a:latin typeface="Courier New" panose="02070309020205020404" pitchFamily="49" charset="0"/>
+                <a:cs typeface="Courier New" panose="02070309020205020404" pitchFamily="49" charset="0"/>
+              </a:rPr>
+              <a:t>&lt;</a:t>
+            </a:r>
+            <a:r>
+              <a:rPr lang="en-US" dirty="0" err="1" smtClean="0">
+                <a:latin typeface="Courier New" panose="02070309020205020404" pitchFamily="49" charset="0"/>
+                <a:cs typeface="Courier New" panose="02070309020205020404" pitchFamily="49" charset="0"/>
+              </a:rPr>
+              <a:t>int</a:t>
+            </a:r>
+            <a:r>
+              <a:rPr lang="en-US" dirty="0">
+                <a:latin typeface="Courier New" panose="02070309020205020404" pitchFamily="49" charset="0"/>
+                <a:cs typeface="Courier New" panose="02070309020205020404" pitchFamily="49" charset="0"/>
+              </a:rPr>
+              <a:t>&gt; </a:t>
+            </a:r>
+            <a:r>
+              <a:rPr lang="en-US" dirty="0" smtClean="0">
+                <a:latin typeface="Courier New" panose="02070309020205020404" pitchFamily="49" charset="0"/>
+                <a:cs typeface="Courier New" panose="02070309020205020404" pitchFamily="49" charset="0"/>
+              </a:rPr>
+              <a:t>s;</a:t>
+            </a:r>
+            <a:endParaRPr lang="en-US" dirty="0">
+              <a:latin typeface="Courier New" panose="02070309020205020404" pitchFamily="49" charset="0"/>
+              <a:cs typeface="Courier New" panose="02070309020205020404" pitchFamily="49" charset="0"/>
+            </a:endParaRPr>
+          </a:p>
+          <a:p>
+            <a:r>
+              <a:rPr lang="en-US" dirty="0" smtClean="0">
+                <a:latin typeface="Courier New" panose="02070309020205020404" pitchFamily="49" charset="0"/>
+                <a:cs typeface="Courier New" panose="02070309020205020404" pitchFamily="49" charset="0"/>
+              </a:rPr>
+              <a:t>for </a:t>
+            </a:r>
+            <a:r>
+              <a:rPr lang="en-US" dirty="0">
+                <a:latin typeface="Courier New" panose="02070309020205020404" pitchFamily="49" charset="0"/>
+                <a:cs typeface="Courier New" panose="02070309020205020404" pitchFamily="49" charset="0"/>
+              </a:rPr>
+              <a:t>(</a:t>
+            </a:r>
+            <a:r>
+              <a:rPr lang="en-US" dirty="0" err="1">
+                <a:latin typeface="Courier New" panose="02070309020205020404" pitchFamily="49" charset="0"/>
+                <a:cs typeface="Courier New" panose="02070309020205020404" pitchFamily="49" charset="0"/>
+              </a:rPr>
+              <a:t>int</a:t>
+            </a:r>
+            <a:r>
+              <a:rPr lang="en-US" dirty="0">
+                <a:latin typeface="Courier New" panose="02070309020205020404" pitchFamily="49" charset="0"/>
+                <a:cs typeface="Courier New" panose="02070309020205020404" pitchFamily="49" charset="0"/>
+              </a:rPr>
+              <a:t> </a:t>
+            </a:r>
+            <a:r>
+              <a:rPr lang="en-US" dirty="0" err="1">
+                <a:latin typeface="Courier New" panose="02070309020205020404" pitchFamily="49" charset="0"/>
+                <a:cs typeface="Courier New" panose="02070309020205020404" pitchFamily="49" charset="0"/>
+              </a:rPr>
+              <a:t>i</a:t>
+            </a:r>
+            <a:r>
+              <a:rPr lang="en-US" dirty="0">
+                <a:latin typeface="Courier New" panose="02070309020205020404" pitchFamily="49" charset="0"/>
+                <a:cs typeface="Courier New" panose="02070309020205020404" pitchFamily="49" charset="0"/>
+              </a:rPr>
+              <a:t> = 0; </a:t>
+            </a:r>
+            <a:r>
+              <a:rPr lang="en-US" dirty="0" err="1">
+                <a:latin typeface="Courier New" panose="02070309020205020404" pitchFamily="49" charset="0"/>
+                <a:cs typeface="Courier New" panose="02070309020205020404" pitchFamily="49" charset="0"/>
+              </a:rPr>
+              <a:t>i</a:t>
+            </a:r>
+            <a:r>
+              <a:rPr lang="en-US" dirty="0">
+                <a:latin typeface="Courier New" panose="02070309020205020404" pitchFamily="49" charset="0"/>
+                <a:cs typeface="Courier New" panose="02070309020205020404" pitchFamily="49" charset="0"/>
+              </a:rPr>
+              <a:t> &lt; 10; </a:t>
+            </a:r>
+            <a:r>
+              <a:rPr lang="en-US" dirty="0" err="1">
+                <a:latin typeface="Courier New" panose="02070309020205020404" pitchFamily="49" charset="0"/>
+                <a:cs typeface="Courier New" panose="02070309020205020404" pitchFamily="49" charset="0"/>
+              </a:rPr>
+              <a:t>i</a:t>
+            </a:r>
+            <a:r>
+              <a:rPr lang="en-US" dirty="0" smtClean="0">
+                <a:latin typeface="Courier New" panose="02070309020205020404" pitchFamily="49" charset="0"/>
+                <a:cs typeface="Courier New" panose="02070309020205020404" pitchFamily="49" charset="0"/>
+              </a:rPr>
+              <a:t>++)</a:t>
+            </a:r>
+            <a:endParaRPr lang="en-US" dirty="0">
+              <a:latin typeface="Courier New" panose="02070309020205020404" pitchFamily="49" charset="0"/>
+              <a:cs typeface="Courier New" panose="02070309020205020404" pitchFamily="49" charset="0"/>
+            </a:endParaRPr>
+          </a:p>
+          <a:p>
+            <a:r>
+              <a:rPr lang="en-US" dirty="0" smtClean="0">
+                <a:latin typeface="Courier New" panose="02070309020205020404" pitchFamily="49" charset="0"/>
+                <a:cs typeface="Courier New" panose="02070309020205020404" pitchFamily="49" charset="0"/>
+              </a:rPr>
+              <a:t>    </a:t>
+            </a:r>
+            <a:r>
+              <a:rPr lang="en-US" dirty="0" err="1" smtClean="0">
+                <a:latin typeface="Courier New" panose="02070309020205020404" pitchFamily="49" charset="0"/>
+                <a:cs typeface="Courier New" panose="02070309020205020404" pitchFamily="49" charset="0"/>
+              </a:rPr>
+              <a:t>s.insert</a:t>
+            </a:r>
+            <a:r>
+              <a:rPr lang="en-US" dirty="0" smtClean="0">
+                <a:latin typeface="Courier New" panose="02070309020205020404" pitchFamily="49" charset="0"/>
+                <a:cs typeface="Courier New" panose="02070309020205020404" pitchFamily="49" charset="0"/>
+              </a:rPr>
+              <a:t>(</a:t>
+            </a:r>
+            <a:r>
+              <a:rPr lang="en-US" dirty="0" err="1" smtClean="0">
+                <a:latin typeface="Courier New" panose="02070309020205020404" pitchFamily="49" charset="0"/>
+                <a:cs typeface="Courier New" panose="02070309020205020404" pitchFamily="49" charset="0"/>
+              </a:rPr>
+              <a:t>i</a:t>
+            </a:r>
+            <a:r>
+              <a:rPr lang="en-US" dirty="0" smtClean="0">
+                <a:latin typeface="Courier New" panose="02070309020205020404" pitchFamily="49" charset="0"/>
+                <a:cs typeface="Courier New" panose="02070309020205020404" pitchFamily="49" charset="0"/>
+              </a:rPr>
+              <a:t> </a:t>
+            </a:r>
+            <a:r>
+              <a:rPr lang="en-US" dirty="0">
+                <a:latin typeface="Courier New" panose="02070309020205020404" pitchFamily="49" charset="0"/>
+                <a:cs typeface="Courier New" panose="02070309020205020404" pitchFamily="49" charset="0"/>
+              </a:rPr>
+              <a:t>% 7</a:t>
+            </a:r>
+            <a:r>
+              <a:rPr lang="en-US" dirty="0" smtClean="0">
+                <a:latin typeface="Courier New" panose="02070309020205020404" pitchFamily="49" charset="0"/>
+                <a:cs typeface="Courier New" panose="02070309020205020404" pitchFamily="49" charset="0"/>
+              </a:rPr>
+              <a:t>);</a:t>
+            </a:r>
+          </a:p>
+          <a:p>
+            <a:r>
+              <a:rPr lang="en-US" dirty="0" err="1" smtClean="0">
+                <a:latin typeface="Courier New" panose="02070309020205020404" pitchFamily="49" charset="0"/>
+                <a:cs typeface="Courier New" panose="02070309020205020404" pitchFamily="49" charset="0"/>
+              </a:rPr>
+              <a:t>std:cout</a:t>
+            </a:r>
+            <a:r>
+              <a:rPr lang="en-US" dirty="0" smtClean="0">
+                <a:latin typeface="Courier New" panose="02070309020205020404" pitchFamily="49" charset="0"/>
+                <a:cs typeface="Courier New" panose="02070309020205020404" pitchFamily="49" charset="0"/>
+              </a:rPr>
+              <a:t> &lt;&lt; "set size = " &lt;&lt; </a:t>
+            </a:r>
+            <a:r>
+              <a:rPr lang="en-US" dirty="0" err="1" smtClean="0">
+                <a:latin typeface="Courier New" panose="02070309020205020404" pitchFamily="49" charset="0"/>
+                <a:cs typeface="Courier New" panose="02070309020205020404" pitchFamily="49" charset="0"/>
+              </a:rPr>
+              <a:t>s.size</a:t>
+            </a:r>
+            <a:r>
+              <a:rPr lang="en-US" dirty="0" smtClean="0">
+                <a:latin typeface="Courier New" panose="02070309020205020404" pitchFamily="49" charset="0"/>
+                <a:cs typeface="Courier New" panose="02070309020205020404" pitchFamily="49" charset="0"/>
+              </a:rPr>
+              <a:t>() &lt;&lt; </a:t>
+            </a:r>
+            <a:r>
+              <a:rPr lang="en-US" dirty="0" err="1" smtClean="0">
+                <a:latin typeface="Courier New" panose="02070309020205020404" pitchFamily="49" charset="0"/>
+                <a:cs typeface="Courier New" panose="02070309020205020404" pitchFamily="49" charset="0"/>
+              </a:rPr>
+              <a:t>std</a:t>
+            </a:r>
+            <a:r>
+              <a:rPr lang="en-US" dirty="0" smtClean="0">
+                <a:latin typeface="Courier New" panose="02070309020205020404" pitchFamily="49" charset="0"/>
+                <a:cs typeface="Courier New" panose="02070309020205020404" pitchFamily="49" charset="0"/>
+              </a:rPr>
+              <a:t>::</a:t>
+            </a:r>
+            <a:r>
+              <a:rPr lang="en-US" dirty="0" err="1" smtClean="0">
+                <a:latin typeface="Courier New" panose="02070309020205020404" pitchFamily="49" charset="0"/>
+                <a:cs typeface="Courier New" panose="02070309020205020404" pitchFamily="49" charset="0"/>
+              </a:rPr>
+              <a:t>endl</a:t>
+            </a:r>
+            <a:r>
+              <a:rPr lang="en-US" dirty="0" smtClean="0">
+                <a:latin typeface="Courier New" panose="02070309020205020404" pitchFamily="49" charset="0"/>
+                <a:cs typeface="Courier New" panose="02070309020205020404" pitchFamily="49" charset="0"/>
+              </a:rPr>
+              <a:t>;</a:t>
+            </a:r>
+            <a:endParaRPr lang="en-US" dirty="0">
+              <a:latin typeface="Courier New" panose="02070309020205020404" pitchFamily="49" charset="0"/>
+              <a:cs typeface="Courier New" panose="02070309020205020404" pitchFamily="49" charset="0"/>
+            </a:endParaRPr>
+          </a:p>
+          <a:p>
+            <a:r>
+              <a:rPr lang="en-US" dirty="0" smtClean="0">
+                <a:latin typeface="Courier New" panose="02070309020205020404" pitchFamily="49" charset="0"/>
+                <a:cs typeface="Courier New" panose="02070309020205020404" pitchFamily="49" charset="0"/>
+              </a:rPr>
+              <a:t>for (auto it </a:t>
+            </a:r>
+            <a:r>
+              <a:rPr lang="en-US" dirty="0">
+                <a:latin typeface="Courier New" panose="02070309020205020404" pitchFamily="49" charset="0"/>
+                <a:cs typeface="Courier New" panose="02070309020205020404" pitchFamily="49" charset="0"/>
+              </a:rPr>
+              <a:t>= </a:t>
+            </a:r>
+            <a:r>
+              <a:rPr lang="en-US" dirty="0" err="1" smtClean="0">
+                <a:latin typeface="Courier New" panose="02070309020205020404" pitchFamily="49" charset="0"/>
+                <a:cs typeface="Courier New" panose="02070309020205020404" pitchFamily="49" charset="0"/>
+              </a:rPr>
+              <a:t>s.begin</a:t>
+            </a:r>
+            <a:r>
+              <a:rPr lang="en-US" dirty="0" smtClean="0">
+                <a:latin typeface="Courier New" panose="02070309020205020404" pitchFamily="49" charset="0"/>
+                <a:cs typeface="Courier New" panose="02070309020205020404" pitchFamily="49" charset="0"/>
+              </a:rPr>
+              <a:t>(); it </a:t>
+            </a:r>
+            <a:r>
+              <a:rPr lang="en-US" dirty="0">
+                <a:latin typeface="Courier New" panose="02070309020205020404" pitchFamily="49" charset="0"/>
+                <a:cs typeface="Courier New" panose="02070309020205020404" pitchFamily="49" charset="0"/>
+              </a:rPr>
+              <a:t>!= </a:t>
+            </a:r>
+            <a:r>
+              <a:rPr lang="en-US" dirty="0" err="1" smtClean="0">
+                <a:latin typeface="Courier New" panose="02070309020205020404" pitchFamily="49" charset="0"/>
+                <a:cs typeface="Courier New" panose="02070309020205020404" pitchFamily="49" charset="0"/>
+              </a:rPr>
+              <a:t>s.end</a:t>
+            </a:r>
+            <a:r>
+              <a:rPr lang="en-US" dirty="0">
+                <a:latin typeface="Courier New" panose="02070309020205020404" pitchFamily="49" charset="0"/>
+                <a:cs typeface="Courier New" panose="02070309020205020404" pitchFamily="49" charset="0"/>
+              </a:rPr>
+              <a:t>(); </a:t>
+            </a:r>
+            <a:r>
+              <a:rPr lang="en-US" dirty="0" smtClean="0">
+                <a:latin typeface="Courier New" panose="02070309020205020404" pitchFamily="49" charset="0"/>
+                <a:cs typeface="Courier New" panose="02070309020205020404" pitchFamily="49" charset="0"/>
+              </a:rPr>
+              <a:t>it++)</a:t>
+            </a:r>
+            <a:endParaRPr lang="en-US" dirty="0">
+              <a:latin typeface="Courier New" panose="02070309020205020404" pitchFamily="49" charset="0"/>
+              <a:cs typeface="Courier New" panose="02070309020205020404" pitchFamily="49" charset="0"/>
+            </a:endParaRPr>
+          </a:p>
+          <a:p>
+            <a:r>
+              <a:rPr lang="en-US" dirty="0">
+                <a:latin typeface="Courier New" panose="02070309020205020404" pitchFamily="49" charset="0"/>
+                <a:cs typeface="Courier New" panose="02070309020205020404" pitchFamily="49" charset="0"/>
+              </a:rPr>
+              <a:t>    </a:t>
+            </a:r>
+            <a:r>
+              <a:rPr lang="en-US" dirty="0" err="1" smtClean="0">
+                <a:latin typeface="Courier New" panose="02070309020205020404" pitchFamily="49" charset="0"/>
+                <a:cs typeface="Courier New" panose="02070309020205020404" pitchFamily="49" charset="0"/>
+              </a:rPr>
+              <a:t>std</a:t>
+            </a:r>
+            <a:r>
+              <a:rPr lang="en-US" dirty="0">
+                <a:latin typeface="Courier New" panose="02070309020205020404" pitchFamily="49" charset="0"/>
+                <a:cs typeface="Courier New" panose="02070309020205020404" pitchFamily="49" charset="0"/>
+              </a:rPr>
+              <a:t>::</a:t>
+            </a:r>
+            <a:r>
+              <a:rPr lang="en-US" dirty="0" err="1">
+                <a:latin typeface="Courier New" panose="02070309020205020404" pitchFamily="49" charset="0"/>
+                <a:cs typeface="Courier New" panose="02070309020205020404" pitchFamily="49" charset="0"/>
+              </a:rPr>
+              <a:t>cout</a:t>
+            </a:r>
+            <a:r>
+              <a:rPr lang="en-US" dirty="0">
+                <a:latin typeface="Courier New" panose="02070309020205020404" pitchFamily="49" charset="0"/>
+                <a:cs typeface="Courier New" panose="02070309020205020404" pitchFamily="49" charset="0"/>
+              </a:rPr>
+              <a:t> &lt;&lt; *</a:t>
+            </a:r>
+            <a:r>
+              <a:rPr lang="en-US" dirty="0" smtClean="0">
+                <a:latin typeface="Courier New" panose="02070309020205020404" pitchFamily="49" charset="0"/>
+                <a:cs typeface="Courier New" panose="02070309020205020404" pitchFamily="49" charset="0"/>
+              </a:rPr>
+              <a:t>it </a:t>
+            </a:r>
+            <a:r>
+              <a:rPr lang="en-US" dirty="0">
+                <a:latin typeface="Courier New" panose="02070309020205020404" pitchFamily="49" charset="0"/>
+                <a:cs typeface="Courier New" panose="02070309020205020404" pitchFamily="49" charset="0"/>
+              </a:rPr>
+              <a:t>&lt;&lt; </a:t>
+            </a:r>
+            <a:r>
+              <a:rPr lang="en-US" dirty="0" err="1">
+                <a:latin typeface="Courier New" panose="02070309020205020404" pitchFamily="49" charset="0"/>
+                <a:cs typeface="Courier New" panose="02070309020205020404" pitchFamily="49" charset="0"/>
+              </a:rPr>
+              <a:t>std</a:t>
+            </a:r>
+            <a:r>
+              <a:rPr lang="en-US" dirty="0">
+                <a:latin typeface="Courier New" panose="02070309020205020404" pitchFamily="49" charset="0"/>
+                <a:cs typeface="Courier New" panose="02070309020205020404" pitchFamily="49" charset="0"/>
+              </a:rPr>
+              <a:t>::</a:t>
+            </a:r>
+            <a:r>
+              <a:rPr lang="en-US" dirty="0" err="1">
+                <a:latin typeface="Courier New" panose="02070309020205020404" pitchFamily="49" charset="0"/>
+                <a:cs typeface="Courier New" panose="02070309020205020404" pitchFamily="49" charset="0"/>
+              </a:rPr>
+              <a:t>endl</a:t>
+            </a:r>
+            <a:r>
+              <a:rPr lang="en-US" dirty="0">
+                <a:latin typeface="Courier New" panose="02070309020205020404" pitchFamily="49" charset="0"/>
+                <a:cs typeface="Courier New" panose="02070309020205020404" pitchFamily="49" charset="0"/>
+              </a:rPr>
+              <a:t>;</a:t>
+            </a:r>
+          </a:p>
+        </p:txBody>
+      </p:sp>
+      <p:sp>
+        <p:nvSpPr>
+          <p:cNvPr id="6" name="TextBox 5"/>
+          <p:cNvSpPr txBox="1"/>
+          <p:nvPr/>
+        </p:nvSpPr>
+        <p:spPr>
+          <a:xfrm>
+            <a:off x="628650" y="4323830"/>
+            <a:ext cx="7886700" cy="1754326"/>
+          </a:xfrm>
+          <a:prstGeom prst="rect">
+            <a:avLst/>
+          </a:prstGeom>
+          <a:solidFill>
+            <a:schemeClr val="accent4">
+              <a:lumMod val="40000"/>
+              <a:lumOff val="60000"/>
+            </a:schemeClr>
+          </a:solidFill>
+          <a:ln>
+            <a:solidFill>
+              <a:schemeClr val="tx1"/>
+            </a:solidFill>
+          </a:ln>
+        </p:spPr>
+        <p:txBody>
+          <a:bodyPr wrap="square" rtlCol="0">
+            <a:spAutoFit/>
+          </a:bodyPr>
+          <a:lstStyle/>
+          <a:p>
+            <a:r>
+              <a:rPr lang="en-US" dirty="0">
+                <a:latin typeface="Courier New" panose="02070309020205020404" pitchFamily="49" charset="0"/>
+                <a:cs typeface="Courier New" panose="02070309020205020404" pitchFamily="49" charset="0"/>
+              </a:rPr>
+              <a:t>s</a:t>
+            </a:r>
+            <a:r>
+              <a:rPr lang="en-US" dirty="0" smtClean="0">
+                <a:latin typeface="Courier New" panose="02070309020205020404" pitchFamily="49" charset="0"/>
+                <a:cs typeface="Courier New" panose="02070309020205020404" pitchFamily="49" charset="0"/>
+              </a:rPr>
+              <a:t> = set()</a:t>
+            </a:r>
+          </a:p>
+          <a:p>
+            <a:r>
+              <a:rPr lang="en-US" dirty="0" smtClean="0">
+                <a:latin typeface="Courier New" panose="02070309020205020404" pitchFamily="49" charset="0"/>
+                <a:cs typeface="Courier New" panose="02070309020205020404" pitchFamily="49" charset="0"/>
+              </a:rPr>
+              <a:t>for x in range(10):</a:t>
+            </a:r>
+          </a:p>
+          <a:p>
+            <a:r>
+              <a:rPr lang="en-US" dirty="0">
+                <a:latin typeface="Courier New" panose="02070309020205020404" pitchFamily="49" charset="0"/>
+                <a:cs typeface="Courier New" panose="02070309020205020404" pitchFamily="49" charset="0"/>
+              </a:rPr>
+              <a:t> </a:t>
+            </a:r>
+            <a:r>
+              <a:rPr lang="en-US" dirty="0" smtClean="0">
+                <a:latin typeface="Courier New" panose="02070309020205020404" pitchFamily="49" charset="0"/>
+                <a:cs typeface="Courier New" panose="02070309020205020404" pitchFamily="49" charset="0"/>
+              </a:rPr>
+              <a:t>   </a:t>
+            </a:r>
+            <a:r>
+              <a:rPr lang="en-US" dirty="0" err="1" smtClean="0">
+                <a:latin typeface="Courier New" panose="02070309020205020404" pitchFamily="49" charset="0"/>
+                <a:cs typeface="Courier New" panose="02070309020205020404" pitchFamily="49" charset="0"/>
+              </a:rPr>
+              <a:t>s.add</a:t>
+            </a:r>
+            <a:r>
+              <a:rPr lang="en-US" dirty="0" smtClean="0">
+                <a:latin typeface="Courier New" panose="02070309020205020404" pitchFamily="49" charset="0"/>
+                <a:cs typeface="Courier New" panose="02070309020205020404" pitchFamily="49" charset="0"/>
+              </a:rPr>
+              <a:t>(x)</a:t>
+            </a:r>
+          </a:p>
+          <a:p>
+            <a:r>
+              <a:rPr lang="en-US" dirty="0" smtClean="0">
+                <a:latin typeface="Courier New" panose="02070309020205020404" pitchFamily="49" charset="0"/>
+                <a:cs typeface="Courier New" panose="02070309020205020404" pitchFamily="49" charset="0"/>
+              </a:rPr>
+              <a:t>print('set size = {0:d}'.format(</a:t>
+            </a:r>
+            <a:r>
+              <a:rPr lang="en-US" dirty="0" err="1" smtClean="0">
+                <a:latin typeface="Courier New" panose="02070309020205020404" pitchFamily="49" charset="0"/>
+                <a:cs typeface="Courier New" panose="02070309020205020404" pitchFamily="49" charset="0"/>
+              </a:rPr>
+              <a:t>len</a:t>
+            </a:r>
+            <a:r>
+              <a:rPr lang="en-US" dirty="0" smtClean="0">
+                <a:latin typeface="Courier New" panose="02070309020205020404" pitchFamily="49" charset="0"/>
+                <a:cs typeface="Courier New" panose="02070309020205020404" pitchFamily="49" charset="0"/>
+              </a:rPr>
+              <a:t>(s)))</a:t>
+            </a:r>
+            <a:endParaRPr lang="en-US" dirty="0">
+              <a:latin typeface="Courier New" panose="02070309020205020404" pitchFamily="49" charset="0"/>
+              <a:cs typeface="Courier New" panose="02070309020205020404" pitchFamily="49" charset="0"/>
+            </a:endParaRPr>
+          </a:p>
+          <a:p>
+            <a:r>
+              <a:rPr lang="en-US" dirty="0" smtClean="0">
+                <a:latin typeface="Courier New" panose="02070309020205020404" pitchFamily="49" charset="0"/>
+                <a:cs typeface="Courier New" panose="02070309020205020404" pitchFamily="49" charset="0"/>
+              </a:rPr>
+              <a:t>for x in s:</a:t>
+            </a:r>
+          </a:p>
+          <a:p>
+            <a:r>
+              <a:rPr lang="en-US" dirty="0">
+                <a:latin typeface="Courier New" panose="02070309020205020404" pitchFamily="49" charset="0"/>
+                <a:cs typeface="Courier New" panose="02070309020205020404" pitchFamily="49" charset="0"/>
+              </a:rPr>
+              <a:t> </a:t>
+            </a:r>
+            <a:r>
+              <a:rPr lang="en-US" dirty="0" smtClean="0">
+                <a:latin typeface="Courier New" panose="02070309020205020404" pitchFamily="49" charset="0"/>
+                <a:cs typeface="Courier New" panose="02070309020205020404" pitchFamily="49" charset="0"/>
+              </a:rPr>
+              <a:t>   print('{0:d}'.format(x))</a:t>
+            </a:r>
+          </a:p>
+        </p:txBody>
+      </p:sp>
+    </p:spTree>
+    <p:extLst>
+      <p:ext uri="{BB962C8B-B14F-4D97-AF65-F5344CB8AC3E}">
+        <p14:creationId xmlns:p14="http://schemas.microsoft.com/office/powerpoint/2010/main" val="502842373"/>
+      </p:ext>
+    </p:extLst>
+  </p:cSld>
+  <p:clrMapOvr>
+    <a:masterClrMapping/>
+  </p:clrMapOvr>
+  <p:timing>
+    <p:tnLst>
+      <p:par>
+        <p:cTn id="1" dur="indefinite" restart="never" nodeType="tmRoot"/>
+      </p:par>
+    </p:tnLst>
+  </p:timing>
+</p:sld>
+</file>
+
+<file path=ppt/slides/slide16.xml><?xml version="1.0" encoding="utf-8"?>
+<p:sld xmlns:a="http://schemas.openxmlformats.org/drawingml/2006/main" xmlns:r="http://schemas.openxmlformats.org/officeDocument/2006/relationships" xmlns:p="http://schemas.openxmlformats.org/presentationml/2006/main">
+  <p:cSld>
+    <p:spTree>
+      <p:nvGrpSpPr>
+        <p:cNvPr id="1" name=""/>
+        <p:cNvGrpSpPr/>
+        <p:nvPr/>
+      </p:nvGrpSpPr>
+      <p:grpSpPr>
+        <a:xfrm>
+          <a:off x="0" y="0"/>
+          <a:ext cx="0" cy="0"/>
+          <a:chOff x="0" y="0"/>
+          <a:chExt cx="0" cy="0"/>
+        </a:xfrm>
+      </p:grpSpPr>
+      <p:sp>
+        <p:nvSpPr>
+          <p:cNvPr id="2" name="Title 1"/>
+          <p:cNvSpPr>
+            <a:spLocks noGrp="1"/>
+          </p:cNvSpPr>
+          <p:nvPr>
+            <p:ph type="title"/>
+          </p:nvPr>
+        </p:nvSpPr>
+        <p:spPr/>
+        <p:txBody>
+          <a:bodyPr/>
+          <a:lstStyle/>
+          <a:p>
+            <a:r>
+              <a:rPr lang="en-US" dirty="0" smtClean="0"/>
               <a:t>Dictionary</a:t>
             </a:r>
             <a:endParaRPr lang="en-US" dirty="0"/>
@@ -5709,7 +6287,7 @@
             <a:graphicData uri="http://schemas.openxmlformats.org/presentationml/2006/ole">
               <mc:AlternateContent xmlns:mc="http://schemas.openxmlformats.org/markup-compatibility/2006">
                 <mc:Choice xmlns:v="urn:schemas-microsoft-com:vml" Requires="v">
-                  <p:oleObj spid="_x0000_s6165" name="Equation" r:id="rId3" imgW="774360" imgH="215640" progId="Equation.3">
+                  <p:oleObj spid="_x0000_s6174" name="Equation" r:id="rId3" imgW="774360" imgH="215640" progId="Equation.3">
                     <p:embed/>
                   </p:oleObj>
                 </mc:Choice>
@@ -5797,7 +6375,7 @@
           <a:p>
             <a:fld id="{11AD1F4E-1E51-402E-B221-310F004E7D3B}" type="slidenum">
               <a:rPr lang="en-US" smtClean="0"/>
-              <a:t>15</a:t>
+              <a:t>16</a:t>
             </a:fld>
             <a:endParaRPr lang="en-US"/>
           </a:p>
@@ -5941,7 +6519,7 @@
             <a:graphicData uri="http://schemas.openxmlformats.org/presentationml/2006/ole">
               <mc:AlternateContent xmlns:mc="http://schemas.openxmlformats.org/markup-compatibility/2006">
                 <mc:Choice xmlns:v="urn:schemas-microsoft-com:vml" Requires="v">
-                  <p:oleObj spid="_x0000_s6166" name="Equation" r:id="rId5" imgW="622080" imgH="215640" progId="Equation.3">
+                  <p:oleObj spid="_x0000_s6175" name="Equation" r:id="rId5" imgW="622080" imgH="215640" progId="Equation.3">
                     <p:embed/>
                   </p:oleObj>
                 </mc:Choice>
@@ -5998,7 +6576,7 @@
             <a:graphicData uri="http://schemas.openxmlformats.org/presentationml/2006/ole">
               <mc:AlternateContent xmlns:mc="http://schemas.openxmlformats.org/markup-compatibility/2006">
                 <mc:Choice xmlns:v="urn:schemas-microsoft-com:vml" Requires="v">
-                  <p:oleObj spid="_x0000_s6167" name="Equation" r:id="rId7" imgW="749160" imgH="215640" progId="Equation.3">
+                  <p:oleObj spid="_x0000_s6176" name="Equation" r:id="rId7" imgW="749160" imgH="215640" progId="Equation.3">
                     <p:embed/>
                   </p:oleObj>
                 </mc:Choice>
@@ -6441,6 +7019,727 @@
 </p:sld>
 </file>
 
+<file path=ppt/slides/slide17.xml><?xml version="1.0" encoding="utf-8"?>
+<p:sld xmlns:a="http://schemas.openxmlformats.org/drawingml/2006/main" xmlns:r="http://schemas.openxmlformats.org/officeDocument/2006/relationships" xmlns:p="http://schemas.openxmlformats.org/presentationml/2006/main">
+  <p:cSld>
+    <p:spTree>
+      <p:nvGrpSpPr>
+        <p:cNvPr id="1" name=""/>
+        <p:cNvGrpSpPr/>
+        <p:nvPr/>
+      </p:nvGrpSpPr>
+      <p:grpSpPr>
+        <a:xfrm>
+          <a:off x="0" y="0"/>
+          <a:ext cx="0" cy="0"/>
+          <a:chOff x="0" y="0"/>
+          <a:chExt cx="0" cy="0"/>
+        </a:xfrm>
+      </p:grpSpPr>
+      <p:sp>
+        <p:nvSpPr>
+          <p:cNvPr id="2" name="Title 1"/>
+          <p:cNvSpPr>
+            <a:spLocks noGrp="1"/>
+          </p:cNvSpPr>
+          <p:nvPr>
+            <p:ph type="title"/>
+          </p:nvPr>
+        </p:nvSpPr>
+        <p:spPr/>
+        <p:txBody>
+          <a:bodyPr/>
+          <a:lstStyle/>
+          <a:p>
+            <a:r>
+              <a:rPr lang="en-US" dirty="0" smtClean="0"/>
+              <a:t>Dictionary examples</a:t>
+            </a:r>
+            <a:endParaRPr lang="en-US" dirty="0"/>
+          </a:p>
+        </p:txBody>
+      </p:sp>
+      <p:sp>
+        <p:nvSpPr>
+          <p:cNvPr id="4" name="Slide Number Placeholder 3"/>
+          <p:cNvSpPr>
+            <a:spLocks noGrp="1"/>
+          </p:cNvSpPr>
+          <p:nvPr>
+            <p:ph type="sldNum" sz="quarter" idx="12"/>
+          </p:nvPr>
+        </p:nvSpPr>
+        <p:spPr/>
+        <p:txBody>
+          <a:bodyPr/>
+          <a:lstStyle/>
+          <a:p>
+            <a:fld id="{11AD1F4E-1E51-402E-B221-310F004E7D3B}" type="slidenum">
+              <a:rPr lang="en-US" smtClean="0"/>
+              <a:t>17</a:t>
+            </a:fld>
+            <a:endParaRPr lang="en-US"/>
+          </a:p>
+        </p:txBody>
+      </p:sp>
+      <p:sp>
+        <p:nvSpPr>
+          <p:cNvPr id="5" name="TextBox 4"/>
+          <p:cNvSpPr txBox="1"/>
+          <p:nvPr/>
+        </p:nvSpPr>
+        <p:spPr>
+          <a:xfrm>
+            <a:off x="124691" y="1579414"/>
+            <a:ext cx="8842665" cy="2862322"/>
+          </a:xfrm>
+          <a:prstGeom prst="rect">
+            <a:avLst/>
+          </a:prstGeom>
+          <a:solidFill>
+            <a:schemeClr val="tx2">
+              <a:lumMod val="40000"/>
+              <a:lumOff val="60000"/>
+            </a:schemeClr>
+          </a:solidFill>
+          <a:ln>
+            <a:solidFill>
+              <a:schemeClr val="tx1"/>
+            </a:solidFill>
+          </a:ln>
+        </p:spPr>
+        <p:txBody>
+          <a:bodyPr wrap="square" rtlCol="0">
+            <a:spAutoFit/>
+          </a:bodyPr>
+          <a:lstStyle/>
+          <a:p>
+            <a:r>
+              <a:rPr lang="en-US" dirty="0" smtClean="0">
+                <a:latin typeface="Courier New" panose="02070309020205020404" pitchFamily="49" charset="0"/>
+                <a:cs typeface="Courier New" panose="02070309020205020404" pitchFamily="49" charset="0"/>
+              </a:rPr>
+              <a:t>…</a:t>
+            </a:r>
+          </a:p>
+          <a:p>
+            <a:r>
+              <a:rPr lang="en-US" dirty="0" smtClean="0">
+                <a:latin typeface="Courier New" panose="02070309020205020404" pitchFamily="49" charset="0"/>
+                <a:cs typeface="Courier New" panose="02070309020205020404" pitchFamily="49" charset="0"/>
+              </a:rPr>
+              <a:t>#</a:t>
+            </a:r>
+            <a:r>
+              <a:rPr lang="en-US" dirty="0">
+                <a:latin typeface="Courier New" panose="02070309020205020404" pitchFamily="49" charset="0"/>
+                <a:cs typeface="Courier New" panose="02070309020205020404" pitchFamily="49" charset="0"/>
+              </a:rPr>
+              <a:t>include &lt;map&gt;</a:t>
+            </a:r>
+          </a:p>
+          <a:p>
+            <a:r>
+              <a:rPr lang="en-US" dirty="0">
+                <a:latin typeface="Courier New" panose="02070309020205020404" pitchFamily="49" charset="0"/>
+                <a:cs typeface="Courier New" panose="02070309020205020404" pitchFamily="49" charset="0"/>
+              </a:rPr>
+              <a:t>#include &lt;string&gt;</a:t>
+            </a:r>
+          </a:p>
+          <a:p>
+            <a:r>
+              <a:rPr lang="en-US" dirty="0" err="1" smtClean="0">
+                <a:latin typeface="Courier New" panose="02070309020205020404" pitchFamily="49" charset="0"/>
+                <a:cs typeface="Courier New" panose="02070309020205020404" pitchFamily="49" charset="0"/>
+              </a:rPr>
+              <a:t>std</a:t>
+            </a:r>
+            <a:r>
+              <a:rPr lang="en-US" dirty="0">
+                <a:latin typeface="Courier New" panose="02070309020205020404" pitchFamily="49" charset="0"/>
+                <a:cs typeface="Courier New" panose="02070309020205020404" pitchFamily="49" charset="0"/>
+              </a:rPr>
+              <a:t>::list&lt;</a:t>
+            </a:r>
+            <a:r>
+              <a:rPr lang="en-US" dirty="0" err="1">
+                <a:latin typeface="Courier New" panose="02070309020205020404" pitchFamily="49" charset="0"/>
+                <a:cs typeface="Courier New" panose="02070309020205020404" pitchFamily="49" charset="0"/>
+              </a:rPr>
+              <a:t>std</a:t>
+            </a:r>
+            <a:r>
+              <a:rPr lang="en-US" dirty="0">
+                <a:latin typeface="Courier New" panose="02070309020205020404" pitchFamily="49" charset="0"/>
+                <a:cs typeface="Courier New" panose="02070309020205020404" pitchFamily="49" charset="0"/>
+              </a:rPr>
+              <a:t>::string&gt; keys = {"a", "b", "c"};</a:t>
+            </a:r>
+          </a:p>
+          <a:p>
+            <a:r>
+              <a:rPr lang="en-US" dirty="0" err="1" smtClean="0">
+                <a:latin typeface="Courier New" panose="02070309020205020404" pitchFamily="49" charset="0"/>
+                <a:cs typeface="Courier New" panose="02070309020205020404" pitchFamily="49" charset="0"/>
+              </a:rPr>
+              <a:t>std</a:t>
+            </a:r>
+            <a:r>
+              <a:rPr lang="en-US" dirty="0">
+                <a:latin typeface="Courier New" panose="02070309020205020404" pitchFamily="49" charset="0"/>
+                <a:cs typeface="Courier New" panose="02070309020205020404" pitchFamily="49" charset="0"/>
+              </a:rPr>
+              <a:t>::map&lt;</a:t>
+            </a:r>
+            <a:r>
+              <a:rPr lang="en-US" dirty="0" err="1">
+                <a:latin typeface="Courier New" panose="02070309020205020404" pitchFamily="49" charset="0"/>
+                <a:cs typeface="Courier New" panose="02070309020205020404" pitchFamily="49" charset="0"/>
+              </a:rPr>
+              <a:t>std</a:t>
+            </a:r>
+            <a:r>
+              <a:rPr lang="en-US" dirty="0">
+                <a:latin typeface="Courier New" panose="02070309020205020404" pitchFamily="49" charset="0"/>
+                <a:cs typeface="Courier New" panose="02070309020205020404" pitchFamily="49" charset="0"/>
+              </a:rPr>
+              <a:t>::string, </a:t>
+            </a:r>
+            <a:r>
+              <a:rPr lang="en-US" dirty="0" err="1">
+                <a:latin typeface="Courier New" panose="02070309020205020404" pitchFamily="49" charset="0"/>
+                <a:cs typeface="Courier New" panose="02070309020205020404" pitchFamily="49" charset="0"/>
+              </a:rPr>
+              <a:t>int</a:t>
+            </a:r>
+            <a:r>
+              <a:rPr lang="en-US" dirty="0">
+                <a:latin typeface="Courier New" panose="02070309020205020404" pitchFamily="49" charset="0"/>
+                <a:cs typeface="Courier New" panose="02070309020205020404" pitchFamily="49" charset="0"/>
+              </a:rPr>
+              <a:t>&gt; </a:t>
+            </a:r>
+            <a:r>
+              <a:rPr lang="en-US" dirty="0" smtClean="0">
+                <a:latin typeface="Courier New" panose="02070309020205020404" pitchFamily="49" charset="0"/>
+                <a:cs typeface="Courier New" panose="02070309020205020404" pitchFamily="49" charset="0"/>
+              </a:rPr>
+              <a:t>m;</a:t>
+            </a:r>
+            <a:endParaRPr lang="en-US" dirty="0">
+              <a:latin typeface="Courier New" panose="02070309020205020404" pitchFamily="49" charset="0"/>
+              <a:cs typeface="Courier New" panose="02070309020205020404" pitchFamily="49" charset="0"/>
+            </a:endParaRPr>
+          </a:p>
+          <a:p>
+            <a:r>
+              <a:rPr lang="en-US" dirty="0" err="1" smtClean="0">
+                <a:latin typeface="Courier New" panose="02070309020205020404" pitchFamily="49" charset="0"/>
+                <a:cs typeface="Courier New" panose="02070309020205020404" pitchFamily="49" charset="0"/>
+              </a:rPr>
+              <a:t>int</a:t>
+            </a:r>
+            <a:r>
+              <a:rPr lang="en-US" dirty="0" smtClean="0">
+                <a:latin typeface="Courier New" panose="02070309020205020404" pitchFamily="49" charset="0"/>
+                <a:cs typeface="Courier New" panose="02070309020205020404" pitchFamily="49" charset="0"/>
+              </a:rPr>
+              <a:t> </a:t>
+            </a:r>
+            <a:r>
+              <a:rPr lang="en-US" dirty="0" err="1">
+                <a:latin typeface="Courier New" panose="02070309020205020404" pitchFamily="49" charset="0"/>
+                <a:cs typeface="Courier New" panose="02070309020205020404" pitchFamily="49" charset="0"/>
+              </a:rPr>
+              <a:t>i</a:t>
+            </a:r>
+            <a:r>
+              <a:rPr lang="en-US" dirty="0">
+                <a:latin typeface="Courier New" panose="02070309020205020404" pitchFamily="49" charset="0"/>
+                <a:cs typeface="Courier New" panose="02070309020205020404" pitchFamily="49" charset="0"/>
+              </a:rPr>
+              <a:t> = 0;</a:t>
+            </a:r>
+          </a:p>
+          <a:p>
+            <a:r>
+              <a:rPr lang="en-US" dirty="0" smtClean="0">
+                <a:latin typeface="Courier New" panose="02070309020205020404" pitchFamily="49" charset="0"/>
+                <a:cs typeface="Courier New" panose="02070309020205020404" pitchFamily="49" charset="0"/>
+              </a:rPr>
+              <a:t>for </a:t>
+            </a:r>
+            <a:r>
+              <a:rPr lang="en-US" dirty="0">
+                <a:latin typeface="Courier New" panose="02070309020205020404" pitchFamily="49" charset="0"/>
+                <a:cs typeface="Courier New" panose="02070309020205020404" pitchFamily="49" charset="0"/>
+              </a:rPr>
+              <a:t>(auto </a:t>
+            </a:r>
+            <a:r>
+              <a:rPr lang="en-US" dirty="0" smtClean="0">
+                <a:latin typeface="Courier New" panose="02070309020205020404" pitchFamily="49" charset="0"/>
+                <a:cs typeface="Courier New" panose="02070309020205020404" pitchFamily="49" charset="0"/>
+              </a:rPr>
+              <a:t>it </a:t>
+            </a:r>
+            <a:r>
+              <a:rPr lang="en-US" dirty="0">
+                <a:latin typeface="Courier New" panose="02070309020205020404" pitchFamily="49" charset="0"/>
+                <a:cs typeface="Courier New" panose="02070309020205020404" pitchFamily="49" charset="0"/>
+              </a:rPr>
+              <a:t>= </a:t>
+            </a:r>
+            <a:r>
+              <a:rPr lang="en-US" dirty="0" err="1">
+                <a:latin typeface="Courier New" panose="02070309020205020404" pitchFamily="49" charset="0"/>
+                <a:cs typeface="Courier New" panose="02070309020205020404" pitchFamily="49" charset="0"/>
+              </a:rPr>
+              <a:t>keys.begin</a:t>
+            </a:r>
+            <a:r>
+              <a:rPr lang="en-US" dirty="0">
+                <a:latin typeface="Courier New" panose="02070309020205020404" pitchFamily="49" charset="0"/>
+                <a:cs typeface="Courier New" panose="02070309020205020404" pitchFamily="49" charset="0"/>
+              </a:rPr>
+              <a:t>(); </a:t>
+            </a:r>
+            <a:r>
+              <a:rPr lang="en-US" dirty="0" smtClean="0">
+                <a:latin typeface="Courier New" panose="02070309020205020404" pitchFamily="49" charset="0"/>
+                <a:cs typeface="Courier New" panose="02070309020205020404" pitchFamily="49" charset="0"/>
+              </a:rPr>
+              <a:t>it </a:t>
+            </a:r>
+            <a:r>
+              <a:rPr lang="en-US" dirty="0">
+                <a:latin typeface="Courier New" panose="02070309020205020404" pitchFamily="49" charset="0"/>
+                <a:cs typeface="Courier New" panose="02070309020205020404" pitchFamily="49" charset="0"/>
+              </a:rPr>
+              <a:t>!= </a:t>
+            </a:r>
+            <a:r>
+              <a:rPr lang="en-US" dirty="0" err="1">
+                <a:latin typeface="Courier New" panose="02070309020205020404" pitchFamily="49" charset="0"/>
+                <a:cs typeface="Courier New" panose="02070309020205020404" pitchFamily="49" charset="0"/>
+              </a:rPr>
+              <a:t>keys.end</a:t>
+            </a:r>
+            <a:r>
+              <a:rPr lang="en-US" dirty="0">
+                <a:latin typeface="Courier New" panose="02070309020205020404" pitchFamily="49" charset="0"/>
+                <a:cs typeface="Courier New" panose="02070309020205020404" pitchFamily="49" charset="0"/>
+              </a:rPr>
+              <a:t>(); </a:t>
+            </a:r>
+            <a:r>
+              <a:rPr lang="en-US" dirty="0" smtClean="0">
+                <a:latin typeface="Courier New" panose="02070309020205020404" pitchFamily="49" charset="0"/>
+                <a:cs typeface="Courier New" panose="02070309020205020404" pitchFamily="49" charset="0"/>
+              </a:rPr>
+              <a:t>it++)</a:t>
+            </a:r>
+            <a:endParaRPr lang="en-US" dirty="0">
+              <a:latin typeface="Courier New" panose="02070309020205020404" pitchFamily="49" charset="0"/>
+              <a:cs typeface="Courier New" panose="02070309020205020404" pitchFamily="49" charset="0"/>
+            </a:endParaRPr>
+          </a:p>
+          <a:p>
+            <a:r>
+              <a:rPr lang="en-US" dirty="0">
+                <a:latin typeface="Courier New" panose="02070309020205020404" pitchFamily="49" charset="0"/>
+                <a:cs typeface="Courier New" panose="02070309020205020404" pitchFamily="49" charset="0"/>
+              </a:rPr>
+              <a:t>    </a:t>
+            </a:r>
+            <a:r>
+              <a:rPr lang="en-US" dirty="0" smtClean="0">
+                <a:latin typeface="Courier New" panose="02070309020205020404" pitchFamily="49" charset="0"/>
+                <a:cs typeface="Courier New" panose="02070309020205020404" pitchFamily="49" charset="0"/>
+              </a:rPr>
+              <a:t>m[*it] </a:t>
+            </a:r>
+            <a:r>
+              <a:rPr lang="en-US" dirty="0">
+                <a:latin typeface="Courier New" panose="02070309020205020404" pitchFamily="49" charset="0"/>
+                <a:cs typeface="Courier New" panose="02070309020205020404" pitchFamily="49" charset="0"/>
+              </a:rPr>
+              <a:t>= ++</a:t>
+            </a:r>
+            <a:r>
+              <a:rPr lang="en-US" dirty="0" err="1">
+                <a:latin typeface="Courier New" panose="02070309020205020404" pitchFamily="49" charset="0"/>
+                <a:cs typeface="Courier New" panose="02070309020205020404" pitchFamily="49" charset="0"/>
+              </a:rPr>
+              <a:t>i</a:t>
+            </a:r>
+            <a:r>
+              <a:rPr lang="en-US" dirty="0">
+                <a:latin typeface="Courier New" panose="02070309020205020404" pitchFamily="49" charset="0"/>
+                <a:cs typeface="Courier New" panose="02070309020205020404" pitchFamily="49" charset="0"/>
+              </a:rPr>
+              <a:t>;</a:t>
+            </a:r>
+          </a:p>
+          <a:p>
+            <a:r>
+              <a:rPr lang="en-US" dirty="0" smtClean="0">
+                <a:latin typeface="Courier New" panose="02070309020205020404" pitchFamily="49" charset="0"/>
+                <a:cs typeface="Courier New" panose="02070309020205020404" pitchFamily="49" charset="0"/>
+              </a:rPr>
+              <a:t>for </a:t>
+            </a:r>
+            <a:r>
+              <a:rPr lang="en-US" dirty="0">
+                <a:latin typeface="Courier New" panose="02070309020205020404" pitchFamily="49" charset="0"/>
+                <a:cs typeface="Courier New" panose="02070309020205020404" pitchFamily="49" charset="0"/>
+              </a:rPr>
+              <a:t>(auto </a:t>
+            </a:r>
+            <a:r>
+              <a:rPr lang="en-US" dirty="0" smtClean="0">
+                <a:latin typeface="Courier New" panose="02070309020205020404" pitchFamily="49" charset="0"/>
+                <a:cs typeface="Courier New" panose="02070309020205020404" pitchFamily="49" charset="0"/>
+              </a:rPr>
+              <a:t>it </a:t>
+            </a:r>
+            <a:r>
+              <a:rPr lang="en-US" dirty="0">
+                <a:latin typeface="Courier New" panose="02070309020205020404" pitchFamily="49" charset="0"/>
+                <a:cs typeface="Courier New" panose="02070309020205020404" pitchFamily="49" charset="0"/>
+              </a:rPr>
+              <a:t>= </a:t>
+            </a:r>
+            <a:r>
+              <a:rPr lang="en-US" dirty="0" smtClean="0">
+                <a:latin typeface="Courier New" panose="02070309020205020404" pitchFamily="49" charset="0"/>
+                <a:cs typeface="Courier New" panose="02070309020205020404" pitchFamily="49" charset="0"/>
+              </a:rPr>
+              <a:t>m(); it </a:t>
+            </a:r>
+            <a:r>
+              <a:rPr lang="en-US" dirty="0">
+                <a:latin typeface="Courier New" panose="02070309020205020404" pitchFamily="49" charset="0"/>
+                <a:cs typeface="Courier New" panose="02070309020205020404" pitchFamily="49" charset="0"/>
+              </a:rPr>
+              <a:t>!= </a:t>
+            </a:r>
+            <a:r>
+              <a:rPr lang="en-US" dirty="0" smtClean="0">
+                <a:latin typeface="Courier New" panose="02070309020205020404" pitchFamily="49" charset="0"/>
+                <a:cs typeface="Courier New" panose="02070309020205020404" pitchFamily="49" charset="0"/>
+              </a:rPr>
+              <a:t>m(); it++)</a:t>
+            </a:r>
+            <a:endParaRPr lang="en-US" dirty="0">
+              <a:latin typeface="Courier New" panose="02070309020205020404" pitchFamily="49" charset="0"/>
+              <a:cs typeface="Courier New" panose="02070309020205020404" pitchFamily="49" charset="0"/>
+            </a:endParaRPr>
+          </a:p>
+          <a:p>
+            <a:r>
+              <a:rPr lang="en-US" dirty="0" smtClean="0">
+                <a:latin typeface="Courier New" panose="02070309020205020404" pitchFamily="49" charset="0"/>
+                <a:cs typeface="Courier New" panose="02070309020205020404" pitchFamily="49" charset="0"/>
+              </a:rPr>
+              <a:t>    </a:t>
+            </a:r>
+            <a:r>
+              <a:rPr lang="en-US" dirty="0" err="1">
+                <a:latin typeface="Courier New" panose="02070309020205020404" pitchFamily="49" charset="0"/>
+                <a:cs typeface="Courier New" panose="02070309020205020404" pitchFamily="49" charset="0"/>
+              </a:rPr>
+              <a:t>std</a:t>
+            </a:r>
+            <a:r>
+              <a:rPr lang="en-US" dirty="0">
+                <a:latin typeface="Courier New" panose="02070309020205020404" pitchFamily="49" charset="0"/>
+                <a:cs typeface="Courier New" panose="02070309020205020404" pitchFamily="49" charset="0"/>
+              </a:rPr>
+              <a:t>::</a:t>
+            </a:r>
+            <a:r>
+              <a:rPr lang="en-US" dirty="0" err="1">
+                <a:latin typeface="Courier New" panose="02070309020205020404" pitchFamily="49" charset="0"/>
+                <a:cs typeface="Courier New" panose="02070309020205020404" pitchFamily="49" charset="0"/>
+              </a:rPr>
+              <a:t>cout</a:t>
+            </a:r>
+            <a:r>
+              <a:rPr lang="en-US" dirty="0">
+                <a:latin typeface="Courier New" panose="02070309020205020404" pitchFamily="49" charset="0"/>
+                <a:cs typeface="Courier New" panose="02070309020205020404" pitchFamily="49" charset="0"/>
+              </a:rPr>
+              <a:t> &lt;&lt; </a:t>
+            </a:r>
+            <a:r>
+              <a:rPr lang="en-US" dirty="0" smtClean="0">
+                <a:latin typeface="Courier New" panose="02070309020205020404" pitchFamily="49" charset="0"/>
+                <a:cs typeface="Courier New" panose="02070309020205020404" pitchFamily="49" charset="0"/>
+              </a:rPr>
+              <a:t>it-</a:t>
+            </a:r>
+            <a:r>
+              <a:rPr lang="en-US" dirty="0">
+                <a:latin typeface="Courier New" panose="02070309020205020404" pitchFamily="49" charset="0"/>
+                <a:cs typeface="Courier New" panose="02070309020205020404" pitchFamily="49" charset="0"/>
+              </a:rPr>
+              <a:t>&gt;first &lt;&lt; </a:t>
+            </a:r>
+            <a:r>
+              <a:rPr lang="en-US" dirty="0" smtClean="0">
+                <a:latin typeface="Courier New" panose="02070309020205020404" pitchFamily="49" charset="0"/>
+                <a:cs typeface="Courier New" panose="02070309020205020404" pitchFamily="49" charset="0"/>
+              </a:rPr>
+              <a:t>"-&gt;" </a:t>
+            </a:r>
+            <a:r>
+              <a:rPr lang="en-US" dirty="0">
+                <a:latin typeface="Courier New" panose="02070309020205020404" pitchFamily="49" charset="0"/>
+                <a:cs typeface="Courier New" panose="02070309020205020404" pitchFamily="49" charset="0"/>
+              </a:rPr>
+              <a:t>&lt;&lt; </a:t>
+            </a:r>
+            <a:r>
+              <a:rPr lang="en-US" dirty="0" smtClean="0">
+                <a:latin typeface="Courier New" panose="02070309020205020404" pitchFamily="49" charset="0"/>
+                <a:cs typeface="Courier New" panose="02070309020205020404" pitchFamily="49" charset="0"/>
+              </a:rPr>
+              <a:t>it-</a:t>
+            </a:r>
+            <a:r>
+              <a:rPr lang="en-US" dirty="0">
+                <a:latin typeface="Courier New" panose="02070309020205020404" pitchFamily="49" charset="0"/>
+                <a:cs typeface="Courier New" panose="02070309020205020404" pitchFamily="49" charset="0"/>
+              </a:rPr>
+              <a:t>&gt;</a:t>
+            </a:r>
+            <a:r>
+              <a:rPr lang="en-US" dirty="0" smtClean="0">
+                <a:latin typeface="Courier New" panose="02070309020205020404" pitchFamily="49" charset="0"/>
+                <a:cs typeface="Courier New" panose="02070309020205020404" pitchFamily="49" charset="0"/>
+              </a:rPr>
+              <a:t>second &lt;&lt; </a:t>
+            </a:r>
+            <a:r>
+              <a:rPr lang="en-US" dirty="0" err="1" smtClean="0">
+                <a:latin typeface="Courier New" panose="02070309020205020404" pitchFamily="49" charset="0"/>
+                <a:cs typeface="Courier New" panose="02070309020205020404" pitchFamily="49" charset="0"/>
+              </a:rPr>
+              <a:t>std</a:t>
+            </a:r>
+            <a:r>
+              <a:rPr lang="en-US" dirty="0">
+                <a:latin typeface="Courier New" panose="02070309020205020404" pitchFamily="49" charset="0"/>
+                <a:cs typeface="Courier New" panose="02070309020205020404" pitchFamily="49" charset="0"/>
+              </a:rPr>
+              <a:t>::</a:t>
+            </a:r>
+            <a:r>
+              <a:rPr lang="en-US" dirty="0" err="1">
+                <a:latin typeface="Courier New" panose="02070309020205020404" pitchFamily="49" charset="0"/>
+                <a:cs typeface="Courier New" panose="02070309020205020404" pitchFamily="49" charset="0"/>
+              </a:rPr>
+              <a:t>endl</a:t>
+            </a:r>
+            <a:r>
+              <a:rPr lang="en-US" dirty="0">
+                <a:latin typeface="Courier New" panose="02070309020205020404" pitchFamily="49" charset="0"/>
+                <a:cs typeface="Courier New" panose="02070309020205020404" pitchFamily="49" charset="0"/>
+              </a:rPr>
+              <a:t>;</a:t>
+            </a:r>
+            <a:endParaRPr lang="en-US" dirty="0" smtClean="0">
+              <a:latin typeface="Courier New" panose="02070309020205020404" pitchFamily="49" charset="0"/>
+              <a:cs typeface="Courier New" panose="02070309020205020404" pitchFamily="49" charset="0"/>
+            </a:endParaRPr>
+          </a:p>
+        </p:txBody>
+      </p:sp>
+      <p:sp>
+        <p:nvSpPr>
+          <p:cNvPr id="6" name="TextBox 5"/>
+          <p:cNvSpPr txBox="1"/>
+          <p:nvPr/>
+        </p:nvSpPr>
+        <p:spPr>
+          <a:xfrm>
+            <a:off x="124691" y="4690151"/>
+            <a:ext cx="7216486" cy="2031325"/>
+          </a:xfrm>
+          <a:prstGeom prst="rect">
+            <a:avLst/>
+          </a:prstGeom>
+          <a:solidFill>
+            <a:schemeClr val="accent4">
+              <a:lumMod val="40000"/>
+              <a:lumOff val="60000"/>
+            </a:schemeClr>
+          </a:solidFill>
+          <a:ln>
+            <a:solidFill>
+              <a:schemeClr val="tx1"/>
+            </a:solidFill>
+          </a:ln>
+        </p:spPr>
+        <p:txBody>
+          <a:bodyPr wrap="square" rtlCol="0">
+            <a:spAutoFit/>
+          </a:bodyPr>
+          <a:lstStyle/>
+          <a:p>
+            <a:r>
+              <a:rPr lang="en-US" dirty="0" smtClean="0">
+                <a:latin typeface="Courier New" panose="02070309020205020404" pitchFamily="49" charset="0"/>
+                <a:cs typeface="Courier New" panose="02070309020205020404" pitchFamily="49" charset="0"/>
+              </a:rPr>
+              <a:t>keys = list('a', 'b', 'c')</a:t>
+            </a:r>
+          </a:p>
+          <a:p>
+            <a:r>
+              <a:rPr lang="en-US" dirty="0">
+                <a:latin typeface="Courier New" panose="02070309020205020404" pitchFamily="49" charset="0"/>
+                <a:cs typeface="Courier New" panose="02070309020205020404" pitchFamily="49" charset="0"/>
+              </a:rPr>
+              <a:t>d</a:t>
+            </a:r>
+            <a:r>
+              <a:rPr lang="en-US" dirty="0" smtClean="0">
+                <a:latin typeface="Courier New" panose="02070309020205020404" pitchFamily="49" charset="0"/>
+                <a:cs typeface="Courier New" panose="02070309020205020404" pitchFamily="49" charset="0"/>
+              </a:rPr>
+              <a:t> = </a:t>
+            </a:r>
+            <a:r>
+              <a:rPr lang="en-US" dirty="0" err="1" smtClean="0">
+                <a:latin typeface="Courier New" panose="02070309020205020404" pitchFamily="49" charset="0"/>
+                <a:cs typeface="Courier New" panose="02070309020205020404" pitchFamily="49" charset="0"/>
+              </a:rPr>
+              <a:t>dict</a:t>
+            </a:r>
+            <a:r>
+              <a:rPr lang="en-US" dirty="0" smtClean="0">
+                <a:latin typeface="Courier New" panose="02070309020205020404" pitchFamily="49" charset="0"/>
+                <a:cs typeface="Courier New" panose="02070309020205020404" pitchFamily="49" charset="0"/>
+              </a:rPr>
+              <a:t>()</a:t>
+            </a:r>
+          </a:p>
+          <a:p>
+            <a:r>
+              <a:rPr lang="en-US" dirty="0" smtClean="0">
+                <a:latin typeface="Courier New" panose="02070309020205020404" pitchFamily="49" charset="0"/>
+                <a:cs typeface="Courier New" panose="02070309020205020404" pitchFamily="49" charset="0"/>
+              </a:rPr>
+              <a:t>for key in keys:</a:t>
+            </a:r>
+          </a:p>
+          <a:p>
+            <a:r>
+              <a:rPr lang="en-US" dirty="0">
+                <a:latin typeface="Courier New" panose="02070309020205020404" pitchFamily="49" charset="0"/>
+                <a:cs typeface="Courier New" panose="02070309020205020404" pitchFamily="49" charset="0"/>
+              </a:rPr>
+              <a:t> </a:t>
+            </a:r>
+            <a:r>
+              <a:rPr lang="en-US" dirty="0" smtClean="0">
+                <a:latin typeface="Courier New" panose="02070309020205020404" pitchFamily="49" charset="0"/>
+                <a:cs typeface="Courier New" panose="02070309020205020404" pitchFamily="49" charset="0"/>
+              </a:rPr>
+              <a:t>   d[key] = x</a:t>
+            </a:r>
+          </a:p>
+          <a:p>
+            <a:r>
+              <a:rPr lang="en-US" dirty="0" smtClean="0">
+                <a:latin typeface="Courier New" panose="02070309020205020404" pitchFamily="49" charset="0"/>
+                <a:cs typeface="Courier New" panose="02070309020205020404" pitchFamily="49" charset="0"/>
+              </a:rPr>
+              <a:t>print(</a:t>
+            </a:r>
+            <a:r>
+              <a:rPr lang="en-US" dirty="0" err="1" smtClean="0">
+                <a:latin typeface="Courier New" panose="02070309020205020404" pitchFamily="49" charset="0"/>
+                <a:cs typeface="Courier New" panose="02070309020205020404" pitchFamily="49" charset="0"/>
+              </a:rPr>
+              <a:t>dict</a:t>
+            </a:r>
+            <a:r>
+              <a:rPr lang="en-US" dirty="0" smtClean="0">
+                <a:latin typeface="Courier New" panose="02070309020205020404" pitchFamily="49" charset="0"/>
+                <a:cs typeface="Courier New" panose="02070309020205020404" pitchFamily="49" charset="0"/>
+              </a:rPr>
+              <a:t> size = {0:d}'.format(</a:t>
+            </a:r>
+            <a:r>
+              <a:rPr lang="en-US" dirty="0" err="1" smtClean="0">
+                <a:latin typeface="Courier New" panose="02070309020205020404" pitchFamily="49" charset="0"/>
+                <a:cs typeface="Courier New" panose="02070309020205020404" pitchFamily="49" charset="0"/>
+              </a:rPr>
+              <a:t>len</a:t>
+            </a:r>
+            <a:r>
+              <a:rPr lang="en-US" dirty="0" smtClean="0">
+                <a:latin typeface="Courier New" panose="02070309020205020404" pitchFamily="49" charset="0"/>
+                <a:cs typeface="Courier New" panose="02070309020205020404" pitchFamily="49" charset="0"/>
+              </a:rPr>
+              <a:t>(d)))</a:t>
+            </a:r>
+            <a:endParaRPr lang="en-US" dirty="0">
+              <a:latin typeface="Courier New" panose="02070309020205020404" pitchFamily="49" charset="0"/>
+              <a:cs typeface="Courier New" panose="02070309020205020404" pitchFamily="49" charset="0"/>
+            </a:endParaRPr>
+          </a:p>
+          <a:p>
+            <a:r>
+              <a:rPr lang="en-US" dirty="0" smtClean="0">
+                <a:latin typeface="Courier New" panose="02070309020205020404" pitchFamily="49" charset="0"/>
+                <a:cs typeface="Courier New" panose="02070309020205020404" pitchFamily="49" charset="0"/>
+              </a:rPr>
+              <a:t>for key in d:</a:t>
+            </a:r>
+          </a:p>
+          <a:p>
+            <a:r>
+              <a:rPr lang="en-US" dirty="0">
+                <a:latin typeface="Courier New" panose="02070309020205020404" pitchFamily="49" charset="0"/>
+                <a:cs typeface="Courier New" panose="02070309020205020404" pitchFamily="49" charset="0"/>
+              </a:rPr>
+              <a:t> </a:t>
+            </a:r>
+            <a:r>
+              <a:rPr lang="en-US" dirty="0" smtClean="0">
+                <a:latin typeface="Courier New" panose="02070309020205020404" pitchFamily="49" charset="0"/>
+                <a:cs typeface="Courier New" panose="02070309020205020404" pitchFamily="49" charset="0"/>
+              </a:rPr>
+              <a:t>   print('{0} -&gt; {1:d}'.format(key, d[key]))</a:t>
+            </a:r>
+          </a:p>
+        </p:txBody>
+      </p:sp>
+    </p:spTree>
+    <p:extLst>
+      <p:ext uri="{BB962C8B-B14F-4D97-AF65-F5344CB8AC3E}">
+        <p14:creationId xmlns:p14="http://schemas.microsoft.com/office/powerpoint/2010/main" val="3159559741"/>
+      </p:ext>
+    </p:extLst>
+  </p:cSld>
+  <p:clrMapOvr>
+    <a:masterClrMapping/>
+  </p:clrMapOvr>
+  <p:timing>
+    <p:tnLst>
+      <p:par>
+        <p:cTn id="1" dur="indefinite" restart="never" nodeType="tmRoot"/>
+      </p:par>
+    </p:tnLst>
+  </p:timing>
+</p:sld>
+</file>
+
 <file path=ppt/slides/slide2.xml><?xml version="1.0" encoding="utf-8"?>
 <p:sld xmlns:a="http://schemas.openxmlformats.org/drawingml/2006/main" xmlns:r="http://schemas.openxmlformats.org/officeDocument/2006/relationships" xmlns:p="http://schemas.openxmlformats.org/presentationml/2006/main">
   <p:cSld>
@@ -7698,7 +8997,7 @@
           <a:graphicData uri="http://schemas.openxmlformats.org/presentationml/2006/ole">
             <mc:AlternateContent xmlns:mc="http://schemas.openxmlformats.org/markup-compatibility/2006">
               <mc:Choice xmlns:v="urn:schemas-microsoft-com:vml" Requires="v">
-                <p:oleObj spid="_x0000_s1044" name="Equation" r:id="rId4" imgW="1841400" imgH="215640" progId="Equation.3">
+                <p:oleObj spid="_x0000_s1047" name="Equation" r:id="rId4" imgW="1841400" imgH="215640" progId="Equation.3">
                   <p:embed/>
                 </p:oleObj>
               </mc:Choice>
@@ -8148,7 +9447,7 @@
             <a:graphicData uri="http://schemas.openxmlformats.org/presentationml/2006/ole">
               <mc:AlternateContent xmlns:mc="http://schemas.openxmlformats.org/markup-compatibility/2006">
                 <mc:Choice xmlns:v="urn:schemas-microsoft-com:vml" Requires="v">
-                  <p:oleObj spid="_x0000_s2064" name="Equation" r:id="rId3" imgW="1358640" imgH="203040" progId="Equation.3">
+                  <p:oleObj spid="_x0000_s2067" name="Equation" r:id="rId3" imgW="1358640" imgH="203040" progId="Equation.3">
                     <p:embed/>
                   </p:oleObj>
                 </mc:Choice>

</xml_diff>

<commit_message>
Now using unordered_set, unordered_map and auto typing for iterators
</commit_message>
<xml_diff>
--- a/DataStructures/data_structures.pptx
+++ b/DataStructures/data_structures.pptx
@@ -213,7 +213,7 @@
           <a:p>
             <a:fld id="{D3AF4CC3-573B-48A2-BA19-C88E9EEB8008}" type="datetimeFigureOut">
               <a:rPr lang="en-US" smtClean="0"/>
-              <a:t>2016-08-17</a:t>
+              <a:t>2016-08-18</a:t>
             </a:fld>
             <a:endParaRPr lang="en-US"/>
           </a:p>
@@ -696,7 +696,7 @@
           <a:p>
             <a:fld id="{E7395A51-B5B5-44D7-85E1-1556CCB9180F}" type="datetime1">
               <a:rPr lang="en-US" smtClean="0"/>
-              <a:t>2016-08-17</a:t>
+              <a:t>2016-08-18</a:t>
             </a:fld>
             <a:endParaRPr lang="en-US"/>
           </a:p>
@@ -866,7 +866,7 @@
           <a:p>
             <a:fld id="{BEDB066D-DA80-4992-B507-A911EFD1878C}" type="datetime1">
               <a:rPr lang="en-US" smtClean="0"/>
-              <a:t>2016-08-17</a:t>
+              <a:t>2016-08-18</a:t>
             </a:fld>
             <a:endParaRPr lang="en-US"/>
           </a:p>
@@ -1046,7 +1046,7 @@
           <a:p>
             <a:fld id="{21259CBD-682A-4ABE-AFE9-CACFF55FE875}" type="datetime1">
               <a:rPr lang="en-US" smtClean="0"/>
-              <a:t>2016-08-17</a:t>
+              <a:t>2016-08-18</a:t>
             </a:fld>
             <a:endParaRPr lang="en-US"/>
           </a:p>
@@ -1216,7 +1216,7 @@
           <a:p>
             <a:fld id="{5F76F78E-A200-421E-B0AA-A6018E81E55E}" type="datetime1">
               <a:rPr lang="en-US" smtClean="0"/>
-              <a:t>2016-08-17</a:t>
+              <a:t>2016-08-18</a:t>
             </a:fld>
             <a:endParaRPr lang="en-US"/>
           </a:p>
@@ -1460,7 +1460,7 @@
           <a:p>
             <a:fld id="{EBEC21EE-ED62-44E3-A586-FF0104F19B99}" type="datetime1">
               <a:rPr lang="en-US" smtClean="0"/>
-              <a:t>2016-08-17</a:t>
+              <a:t>2016-08-18</a:t>
             </a:fld>
             <a:endParaRPr lang="en-US"/>
           </a:p>
@@ -1692,7 +1692,7 @@
           <a:p>
             <a:fld id="{30049BC0-4C66-4CED-BC8E-7AF0BD49C9B5}" type="datetime1">
               <a:rPr lang="en-US" smtClean="0"/>
-              <a:t>2016-08-17</a:t>
+              <a:t>2016-08-18</a:t>
             </a:fld>
             <a:endParaRPr lang="en-US"/>
           </a:p>
@@ -2059,7 +2059,7 @@
           <a:p>
             <a:fld id="{C7C90E0A-53F1-4115-8AB2-2E28E481FF48}" type="datetime1">
               <a:rPr lang="en-US" smtClean="0"/>
-              <a:t>2016-08-17</a:t>
+              <a:t>2016-08-18</a:t>
             </a:fld>
             <a:endParaRPr lang="en-US"/>
           </a:p>
@@ -2177,7 +2177,7 @@
           <a:p>
             <a:fld id="{AF79CAB3-789B-4117-A859-FC7082686441}" type="datetime1">
               <a:rPr lang="en-US" smtClean="0"/>
-              <a:t>2016-08-17</a:t>
+              <a:t>2016-08-18</a:t>
             </a:fld>
             <a:endParaRPr lang="en-US"/>
           </a:p>
@@ -2272,7 +2272,7 @@
           <a:p>
             <a:fld id="{82AE2AC5-51ED-46C8-8F1B-788630EE802E}" type="datetime1">
               <a:rPr lang="en-US" smtClean="0"/>
-              <a:t>2016-08-17</a:t>
+              <a:t>2016-08-18</a:t>
             </a:fld>
             <a:endParaRPr lang="en-US"/>
           </a:p>
@@ -2549,7 +2549,7 @@
           <a:p>
             <a:fld id="{49D0F6DD-6796-44CA-AF4C-1B2A2288F444}" type="datetime1">
               <a:rPr lang="en-US" smtClean="0"/>
-              <a:t>2016-08-17</a:t>
+              <a:t>2016-08-18</a:t>
             </a:fld>
             <a:endParaRPr lang="en-US"/>
           </a:p>
@@ -2806,7 +2806,7 @@
           <a:p>
             <a:fld id="{57F6808E-F05D-421A-97B7-12B728993E3B}" type="datetime1">
               <a:rPr lang="en-US" smtClean="0"/>
-              <a:t>2016-08-17</a:t>
+              <a:t>2016-08-18</a:t>
             </a:fld>
             <a:endParaRPr lang="en-US"/>
           </a:p>
@@ -3019,7 +3019,7 @@
           <a:p>
             <a:fld id="{7B995810-2FB7-4DE8-B622-97729F9C53CB}" type="datetime1">
               <a:rPr lang="en-US" smtClean="0"/>
-              <a:t>2016-08-17</a:t>
+              <a:t>2016-08-18</a:t>
             </a:fld>
             <a:endParaRPr lang="en-US"/>
           </a:p>
@@ -3749,7 +3749,7 @@
             <a:graphicData uri="http://schemas.openxmlformats.org/presentationml/2006/ole">
               <mc:AlternateContent xmlns:mc="http://schemas.openxmlformats.org/markup-compatibility/2006">
                 <mc:Choice xmlns:v="urn:schemas-microsoft-com:vml" Requires="v">
-                  <p:oleObj spid="_x0000_s3090" name="Equation" r:id="rId3" imgW="1091880" imgH="228600" progId="Equation.3">
+                  <p:oleObj spid="_x0000_s3092" name="Equation" r:id="rId3" imgW="1091880" imgH="228600" progId="Equation.3">
                     <p:embed/>
                   </p:oleObj>
                 </mc:Choice>
@@ -4298,6 +4298,55 @@
           </a:fontRef>
         </p:style>
       </p:cxnSp>
+      <p:sp>
+        <p:nvSpPr>
+          <p:cNvPr id="3" name="TextBox 2"/>
+          <p:cNvSpPr txBox="1"/>
+          <p:nvPr/>
+        </p:nvSpPr>
+        <p:spPr>
+          <a:xfrm>
+            <a:off x="6826827" y="5299364"/>
+            <a:ext cx="1319785" cy="646331"/>
+          </a:xfrm>
+          <a:prstGeom prst="rect">
+            <a:avLst/>
+          </a:prstGeom>
+          <a:noFill/>
+          <a:ln>
+            <a:solidFill>
+              <a:schemeClr val="tx1"/>
+            </a:solidFill>
+          </a:ln>
+        </p:spPr>
+        <p:txBody>
+          <a:bodyPr wrap="none" rtlCol="0">
+            <a:spAutoFit/>
+          </a:bodyPr>
+          <a:lstStyle/>
+          <a:p>
+            <a:r>
+              <a:rPr lang="en-US" dirty="0" smtClean="0">
+                <a:latin typeface="Courier New" panose="02070309020205020404" pitchFamily="49" charset="0"/>
+                <a:cs typeface="Courier New" panose="02070309020205020404" pitchFamily="49" charset="0"/>
+              </a:rPr>
+              <a:t>tuple</a:t>
+            </a:r>
+            <a:r>
+              <a:rPr lang="en-US" dirty="0" smtClean="0"/>
+              <a:t>s are</a:t>
+            </a:r>
+            <a:br>
+              <a:rPr lang="en-US" dirty="0" smtClean="0"/>
+            </a:br>
+            <a:r>
+              <a:rPr lang="en-US" dirty="0" smtClean="0"/>
+              <a:t>immutable</a:t>
+            </a:r>
+            <a:endParaRPr lang="en-US" dirty="0"/>
+          </a:p>
+        </p:txBody>
+      </p:sp>
     </p:spTree>
     <p:extLst>
       <p:ext uri="{BB962C8B-B14F-4D97-AF65-F5344CB8AC3E}">
@@ -4513,7 +4562,7 @@
             <a:graphicData uri="http://schemas.openxmlformats.org/presentationml/2006/ole">
               <mc:AlternateContent xmlns:mc="http://schemas.openxmlformats.org/markup-compatibility/2006">
                 <mc:Choice xmlns:v="urn:schemas-microsoft-com:vml" Requires="v">
-                  <p:oleObj spid="_x0000_s4109" name="Equation" r:id="rId3" imgW="419040" imgH="241200" progId="Equation.3">
+                  <p:oleObj spid="_x0000_s4111" name="Equation" r:id="rId3" imgW="419040" imgH="241200" progId="Equation.3">
                     <p:embed/>
                   </p:oleObj>
                 </mc:Choice>
@@ -5340,7 +5389,7 @@
             <a:graphicData uri="http://schemas.openxmlformats.org/presentationml/2006/ole">
               <mc:AlternateContent xmlns:mc="http://schemas.openxmlformats.org/markup-compatibility/2006">
                 <mc:Choice xmlns:v="urn:schemas-microsoft-com:vml" Requires="v">
-                  <p:oleObj spid="_x0000_s5132" name="Equation" r:id="rId3" imgW="444240" imgH="203040" progId="Equation.3">
+                  <p:oleObj spid="_x0000_s5134" name="Equation" r:id="rId3" imgW="444240" imgH="203040" progId="Equation.3">
                     <p:embed/>
                   </p:oleObj>
                 </mc:Choice>
@@ -5526,7 +5575,7 @@
         <p:spPr>
           <a:xfrm>
             <a:off x="628649" y="1704105"/>
-            <a:ext cx="7886701" cy="1754326"/>
+            <a:ext cx="7886701" cy="2308324"/>
           </a:xfrm>
           <a:prstGeom prst="rect">
             <a:avLst/>
@@ -5548,6 +5597,38 @@
             <a:spAutoFit/>
           </a:bodyPr>
           <a:lstStyle/>
+          <a:p>
+            <a:r>
+              <a:rPr lang="en-US" dirty="0" smtClean="0">
+                <a:latin typeface="Courier New" panose="02070309020205020404" pitchFamily="49" charset="0"/>
+                <a:cs typeface="Courier New" panose="02070309020205020404" pitchFamily="49" charset="0"/>
+              </a:rPr>
+              <a:t>…</a:t>
+            </a:r>
+          </a:p>
+          <a:p>
+            <a:r>
+              <a:rPr lang="en-US" dirty="0" smtClean="0">
+                <a:latin typeface="Courier New" panose="02070309020205020404" pitchFamily="49" charset="0"/>
+                <a:cs typeface="Courier New" panose="02070309020205020404" pitchFamily="49" charset="0"/>
+              </a:rPr>
+              <a:t>#include &lt;</a:t>
+            </a:r>
+            <a:r>
+              <a:rPr lang="en-US" dirty="0" err="1" smtClean="0">
+                <a:latin typeface="Courier New" panose="02070309020205020404" pitchFamily="49" charset="0"/>
+                <a:cs typeface="Courier New" panose="02070309020205020404" pitchFamily="49" charset="0"/>
+              </a:rPr>
+              <a:t>unordered_set</a:t>
+            </a:r>
+            <a:r>
+              <a:rPr lang="en-US" dirty="0" smtClean="0">
+                <a:latin typeface="Courier New" panose="02070309020205020404" pitchFamily="49" charset="0"/>
+                <a:cs typeface="Courier New" panose="02070309020205020404" pitchFamily="49" charset="0"/>
+              </a:rPr>
+              <a:t>&gt;</a:t>
+            </a:r>
+          </a:p>
           <a:p>
             <a:r>
               <a:rPr lang="en-US" dirty="0" err="1" smtClean="0">
@@ -6287,7 +6368,7 @@
             <a:graphicData uri="http://schemas.openxmlformats.org/presentationml/2006/ole">
               <mc:AlternateContent xmlns:mc="http://schemas.openxmlformats.org/markup-compatibility/2006">
                 <mc:Choice xmlns:v="urn:schemas-microsoft-com:vml" Requires="v">
-                  <p:oleObj spid="_x0000_s6174" name="Equation" r:id="rId3" imgW="774360" imgH="215640" progId="Equation.3">
+                  <p:oleObj spid="_x0000_s6180" name="Equation" r:id="rId3" imgW="774360" imgH="215640" progId="Equation.3">
                     <p:embed/>
                   </p:oleObj>
                 </mc:Choice>
@@ -6519,7 +6600,7 @@
             <a:graphicData uri="http://schemas.openxmlformats.org/presentationml/2006/ole">
               <mc:AlternateContent xmlns:mc="http://schemas.openxmlformats.org/markup-compatibility/2006">
                 <mc:Choice xmlns:v="urn:schemas-microsoft-com:vml" Requires="v">
-                  <p:oleObj spid="_x0000_s6175" name="Equation" r:id="rId5" imgW="622080" imgH="215640" progId="Equation.3">
+                  <p:oleObj spid="_x0000_s6181" name="Equation" r:id="rId5" imgW="622080" imgH="215640" progId="Equation.3">
                     <p:embed/>
                   </p:oleObj>
                 </mc:Choice>
@@ -6576,7 +6657,7 @@
             <a:graphicData uri="http://schemas.openxmlformats.org/presentationml/2006/ole">
               <mc:AlternateContent xmlns:mc="http://schemas.openxmlformats.org/markup-compatibility/2006">
                 <mc:Choice xmlns:v="urn:schemas-microsoft-com:vml" Requires="v">
-                  <p:oleObj spid="_x0000_s6176" name="Equation" r:id="rId7" imgW="749160" imgH="215640" progId="Equation.3">
+                  <p:oleObj spid="_x0000_s6182" name="Equation" r:id="rId7" imgW="749160" imgH="215640" progId="Equation.3">
                     <p:embed/>
                   </p:oleObj>
                 </mc:Choice>
@@ -7135,15 +7216,36 @@
                 <a:latin typeface="Courier New" panose="02070309020205020404" pitchFamily="49" charset="0"/>
                 <a:cs typeface="Courier New" panose="02070309020205020404" pitchFamily="49" charset="0"/>
               </a:rPr>
-              <a:t>include &lt;map&gt;</a:t>
-            </a:r>
-          </a:p>
-          <a:p>
+              <a:t>include </a:t>
+            </a:r>
+            <a:r>
+              <a:rPr lang="en-US" dirty="0" smtClean="0">
+                <a:latin typeface="Courier New" panose="02070309020205020404" pitchFamily="49" charset="0"/>
+                <a:cs typeface="Courier New" panose="02070309020205020404" pitchFamily="49" charset="0"/>
+              </a:rPr>
+              <a:t>&lt;</a:t>
+            </a:r>
+            <a:r>
+              <a:rPr lang="en-US" dirty="0" err="1" smtClean="0">
+                <a:latin typeface="Courier New" panose="02070309020205020404" pitchFamily="49" charset="0"/>
+                <a:cs typeface="Courier New" panose="02070309020205020404" pitchFamily="49" charset="0"/>
+              </a:rPr>
+              <a:t>unordered_map</a:t>
+            </a:r>
             <a:r>
               <a:rPr lang="en-US" dirty="0">
                 <a:latin typeface="Courier New" panose="02070309020205020404" pitchFamily="49" charset="0"/>
                 <a:cs typeface="Courier New" panose="02070309020205020404" pitchFamily="49" charset="0"/>
               </a:rPr>
+              <a:t>&gt;</a:t>
+            </a:r>
+          </a:p>
+          <a:p>
+            <a:r>
+              <a:rPr lang="en-US" dirty="0">
+                <a:latin typeface="Courier New" panose="02070309020205020404" pitchFamily="49" charset="0"/>
+                <a:cs typeface="Courier New" panose="02070309020205020404" pitchFamily="49" charset="0"/>
+              </a:rPr>
               <a:t>#include &lt;string&gt;</a:t>
             </a:r>
           </a:p>
@@ -7186,14 +7288,28 @@
               <a:t>std</a:t>
             </a:r>
             <a:r>
-              <a:rPr lang="en-US" dirty="0">
-                <a:latin typeface="Courier New" panose="02070309020205020404" pitchFamily="49" charset="0"/>
-                <a:cs typeface="Courier New" panose="02070309020205020404" pitchFamily="49" charset="0"/>
-              </a:rPr>
-              <a:t>::map&lt;</a:t>
-            </a:r>
-            <a:r>
-              <a:rPr lang="en-US" dirty="0" err="1">
+              <a:rPr lang="en-US" dirty="0" smtClean="0">
+                <a:latin typeface="Courier New" panose="02070309020205020404" pitchFamily="49" charset="0"/>
+                <a:cs typeface="Courier New" panose="02070309020205020404" pitchFamily="49" charset="0"/>
+              </a:rPr>
+              <a:t>::</a:t>
+            </a:r>
+            <a:r>
+              <a:rPr lang="en-US" dirty="0" err="1" smtClean="0">
+                <a:latin typeface="Courier New" panose="02070309020205020404" pitchFamily="49" charset="0"/>
+                <a:cs typeface="Courier New" panose="02070309020205020404" pitchFamily="49" charset="0"/>
+              </a:rPr>
+              <a:t>unordered_map</a:t>
+            </a:r>
+            <a:r>
+              <a:rPr lang="en-US" dirty="0" smtClean="0">
+                <a:latin typeface="Courier New" panose="02070309020205020404" pitchFamily="49" charset="0"/>
+                <a:cs typeface="Courier New" panose="02070309020205020404" pitchFamily="49" charset="0"/>
+              </a:rPr>
+              <a:t>&lt;</a:t>
+            </a:r>
+            <a:r>
+              <a:rPr lang="en-US" dirty="0" err="1" smtClean="0">
                 <a:latin typeface="Courier New" panose="02070309020205020404" pitchFamily="49" charset="0"/>
                 <a:cs typeface="Courier New" panose="02070309020205020404" pitchFamily="49" charset="0"/>
               </a:rPr>
@@ -8997,7 +9113,7 @@
           <a:graphicData uri="http://schemas.openxmlformats.org/presentationml/2006/ole">
             <mc:AlternateContent xmlns:mc="http://schemas.openxmlformats.org/markup-compatibility/2006">
               <mc:Choice xmlns:v="urn:schemas-microsoft-com:vml" Requires="v">
-                <p:oleObj spid="_x0000_s1047" name="Equation" r:id="rId4" imgW="1841400" imgH="215640" progId="Equation.3">
+                <p:oleObj spid="_x0000_s1049" name="Equation" r:id="rId4" imgW="1841400" imgH="215640" progId="Equation.3">
                   <p:embed/>
                 </p:oleObj>
               </mc:Choice>
@@ -9447,7 +9563,7 @@
             <a:graphicData uri="http://schemas.openxmlformats.org/presentationml/2006/ole">
               <mc:AlternateContent xmlns:mc="http://schemas.openxmlformats.org/markup-compatibility/2006">
                 <mc:Choice xmlns:v="urn:schemas-microsoft-com:vml" Requires="v">
-                  <p:oleObj spid="_x0000_s2067" name="Equation" r:id="rId3" imgW="1358640" imgH="203040" progId="Equation.3">
+                  <p:oleObj spid="_x0000_s2069" name="Equation" r:id="rId3" imgW="1358640" imgH="203040" progId="Equation.3">
                     <p:embed/>
                   </p:oleObj>
                 </mc:Choice>

</xml_diff>

<commit_message>
Started slides on derived data structures
</commit_message>
<xml_diff>
--- a/DataStructures/data_structures.pptx
+++ b/DataStructures/data_structures.pptx
@@ -5,7 +5,7 @@
     <p:sldMasterId id="2147483660" r:id="rId1"/>
   </p:sldMasterIdLst>
   <p:notesMasterIdLst>
-    <p:notesMasterId r:id="rId19"/>
+    <p:notesMasterId r:id="rId22"/>
   </p:notesMasterIdLst>
   <p:sldIdLst>
     <p:sldId id="256" r:id="rId2"/>
@@ -15,16 +15,19 @@
     <p:sldId id="268" r:id="rId6"/>
     <p:sldId id="266" r:id="rId7"/>
     <p:sldId id="260" r:id="rId8"/>
-    <p:sldId id="261" r:id="rId9"/>
-    <p:sldId id="267" r:id="rId10"/>
-    <p:sldId id="265" r:id="rId11"/>
-    <p:sldId id="269" r:id="rId12"/>
-    <p:sldId id="262" r:id="rId13"/>
-    <p:sldId id="270" r:id="rId14"/>
-    <p:sldId id="263" r:id="rId15"/>
-    <p:sldId id="271" r:id="rId16"/>
-    <p:sldId id="264" r:id="rId17"/>
-    <p:sldId id="272" r:id="rId18"/>
+    <p:sldId id="274" r:id="rId9"/>
+    <p:sldId id="261" r:id="rId10"/>
+    <p:sldId id="267" r:id="rId11"/>
+    <p:sldId id="265" r:id="rId12"/>
+    <p:sldId id="269" r:id="rId13"/>
+    <p:sldId id="262" r:id="rId14"/>
+    <p:sldId id="270" r:id="rId15"/>
+    <p:sldId id="263" r:id="rId16"/>
+    <p:sldId id="271" r:id="rId17"/>
+    <p:sldId id="264" r:id="rId18"/>
+    <p:sldId id="272" r:id="rId19"/>
+    <p:sldId id="273" r:id="rId20"/>
+    <p:sldId id="275" r:id="rId21"/>
   </p:sldIdLst>
   <p:sldSz cx="9144000" cy="6858000" type="screen4x3"/>
   <p:notesSz cx="6858000" cy="9144000"/>
@@ -3617,6 +3620,233 @@
           <a:p>
             <a:r>
               <a:rPr lang="en-US" dirty="0" smtClean="0"/>
+              <a:t>Array examples</a:t>
+            </a:r>
+            <a:endParaRPr lang="en-US" dirty="0"/>
+          </a:p>
+        </p:txBody>
+      </p:sp>
+      <p:sp>
+        <p:nvSpPr>
+          <p:cNvPr id="4" name="Slide Number Placeholder 3"/>
+          <p:cNvSpPr>
+            <a:spLocks noGrp="1"/>
+          </p:cNvSpPr>
+          <p:nvPr>
+            <p:ph type="sldNum" sz="quarter" idx="12"/>
+          </p:nvPr>
+        </p:nvSpPr>
+        <p:spPr/>
+        <p:txBody>
+          <a:bodyPr/>
+          <a:lstStyle/>
+          <a:p>
+            <a:fld id="{11AD1F4E-1E51-402E-B221-310F004E7D3B}" type="slidenum">
+              <a:rPr lang="en-US" smtClean="0"/>
+              <a:t>10</a:t>
+            </a:fld>
+            <a:endParaRPr lang="en-US"/>
+          </a:p>
+        </p:txBody>
+      </p:sp>
+      <p:sp>
+        <p:nvSpPr>
+          <p:cNvPr id="5" name="TextBox 4"/>
+          <p:cNvSpPr txBox="1"/>
+          <p:nvPr/>
+        </p:nvSpPr>
+        <p:spPr>
+          <a:xfrm>
+            <a:off x="628650" y="2244436"/>
+            <a:ext cx="5561138" cy="923330"/>
+          </a:xfrm>
+          <a:prstGeom prst="rect">
+            <a:avLst/>
+          </a:prstGeom>
+          <a:solidFill>
+            <a:schemeClr val="tx2">
+              <a:lumMod val="40000"/>
+              <a:lumOff val="60000"/>
+            </a:schemeClr>
+          </a:solidFill>
+          <a:ln>
+            <a:solidFill>
+              <a:schemeClr val="tx1"/>
+            </a:solidFill>
+          </a:ln>
+        </p:spPr>
+        <p:txBody>
+          <a:bodyPr wrap="square" rtlCol="0">
+            <a:spAutoFit/>
+          </a:bodyPr>
+          <a:lstStyle/>
+          <a:p>
+            <a:r>
+              <a:rPr lang="en-US" dirty="0" err="1" smtClean="0">
+                <a:latin typeface="Courier New" panose="02070309020205020404" pitchFamily="49" charset="0"/>
+                <a:cs typeface="Courier New" panose="02070309020205020404" pitchFamily="49" charset="0"/>
+              </a:rPr>
+              <a:t>int</a:t>
+            </a:r>
+            <a:r>
+              <a:rPr lang="en-US" dirty="0" smtClean="0">
+                <a:latin typeface="Courier New" panose="02070309020205020404" pitchFamily="49" charset="0"/>
+                <a:cs typeface="Courier New" panose="02070309020205020404" pitchFamily="49" charset="0"/>
+              </a:rPr>
+              <a:t> a[10];</a:t>
+            </a:r>
+          </a:p>
+          <a:p>
+            <a:r>
+              <a:rPr lang="en-US" dirty="0" smtClean="0">
+                <a:latin typeface="Courier New" panose="02070309020205020404" pitchFamily="49" charset="0"/>
+                <a:cs typeface="Courier New" panose="02070309020205020404" pitchFamily="49" charset="0"/>
+              </a:rPr>
+              <a:t>a[0] = 12;</a:t>
+            </a:r>
+          </a:p>
+          <a:p>
+            <a:r>
+              <a:rPr lang="en-US" dirty="0" smtClean="0">
+                <a:latin typeface="Courier New" panose="02070309020205020404" pitchFamily="49" charset="0"/>
+                <a:cs typeface="Courier New" panose="02070309020205020404" pitchFamily="49" charset="0"/>
+              </a:rPr>
+              <a:t>a[1] = a[0] + 13;</a:t>
+            </a:r>
+            <a:endParaRPr lang="en-US" dirty="0">
+              <a:latin typeface="Courier New" panose="02070309020205020404" pitchFamily="49" charset="0"/>
+              <a:cs typeface="Courier New" panose="02070309020205020404" pitchFamily="49" charset="0"/>
+            </a:endParaRPr>
+          </a:p>
+        </p:txBody>
+      </p:sp>
+      <p:sp>
+        <p:nvSpPr>
+          <p:cNvPr id="6" name="TextBox 5"/>
+          <p:cNvSpPr txBox="1"/>
+          <p:nvPr/>
+        </p:nvSpPr>
+        <p:spPr>
+          <a:xfrm>
+            <a:off x="628650" y="3487882"/>
+            <a:ext cx="5561138" cy="1200329"/>
+          </a:xfrm>
+          <a:prstGeom prst="rect">
+            <a:avLst/>
+          </a:prstGeom>
+          <a:solidFill>
+            <a:schemeClr val="accent4">
+              <a:lumMod val="40000"/>
+              <a:lumOff val="60000"/>
+            </a:schemeClr>
+          </a:solidFill>
+          <a:ln>
+            <a:solidFill>
+              <a:schemeClr val="tx1"/>
+            </a:solidFill>
+          </a:ln>
+        </p:spPr>
+        <p:txBody>
+          <a:bodyPr wrap="none" rtlCol="0">
+            <a:spAutoFit/>
+          </a:bodyPr>
+          <a:lstStyle/>
+          <a:p>
+            <a:r>
+              <a:rPr lang="en-US" dirty="0" smtClean="0">
+                <a:latin typeface="Courier New" panose="02070309020205020404" pitchFamily="49" charset="0"/>
+                <a:cs typeface="Courier New" panose="02070309020205020404" pitchFamily="49" charset="0"/>
+              </a:rPr>
+              <a:t>from array import array</a:t>
+            </a:r>
+          </a:p>
+          <a:p>
+            <a:r>
+              <a:rPr lang="en-US" dirty="0" smtClean="0">
+                <a:latin typeface="Courier New" panose="02070309020205020404" pitchFamily="49" charset="0"/>
+                <a:cs typeface="Courier New" panose="02070309020205020404" pitchFamily="49" charset="0"/>
+              </a:rPr>
+              <a:t>a = array('l', (0 for _ in range(100)))</a:t>
+            </a:r>
+          </a:p>
+          <a:p>
+            <a:r>
+              <a:rPr lang="en-US" dirty="0" smtClean="0">
+                <a:latin typeface="Courier New" panose="02070309020205020404" pitchFamily="49" charset="0"/>
+                <a:cs typeface="Courier New" panose="02070309020205020404" pitchFamily="49" charset="0"/>
+              </a:rPr>
+              <a:t>a[0] = 12</a:t>
+            </a:r>
+          </a:p>
+          <a:p>
+            <a:r>
+              <a:rPr lang="en-US" dirty="0" smtClean="0">
+                <a:latin typeface="Courier New" panose="02070309020205020404" pitchFamily="49" charset="0"/>
+                <a:cs typeface="Courier New" panose="02070309020205020404" pitchFamily="49" charset="0"/>
+              </a:rPr>
+              <a:t>a[1] = a[0] + 13</a:t>
+            </a:r>
+            <a:endParaRPr lang="en-US" dirty="0">
+              <a:latin typeface="Courier New" panose="02070309020205020404" pitchFamily="49" charset="0"/>
+              <a:cs typeface="Courier New" panose="02070309020205020404" pitchFamily="49" charset="0"/>
+            </a:endParaRPr>
+          </a:p>
+        </p:txBody>
+      </p:sp>
+    </p:spTree>
+    <p:extLst>
+      <p:ext uri="{BB962C8B-B14F-4D97-AF65-F5344CB8AC3E}">
+        <p14:creationId xmlns:p14="http://schemas.microsoft.com/office/powerpoint/2010/main" val="377249263"/>
+      </p:ext>
+    </p:extLst>
+  </p:cSld>
+  <p:clrMapOvr>
+    <a:masterClrMapping/>
+  </p:clrMapOvr>
+  <p:timing>
+    <p:tnLst>
+      <p:par>
+        <p:cTn id="1" dur="indefinite" restart="never" nodeType="tmRoot"/>
+      </p:par>
+    </p:tnLst>
+  </p:timing>
+</p:sld>
+</file>
+
+<file path=ppt/slides/slide11.xml><?xml version="1.0" encoding="utf-8"?>
+<p:sld xmlns:a="http://schemas.openxmlformats.org/drawingml/2006/main" xmlns:r="http://schemas.openxmlformats.org/officeDocument/2006/relationships" xmlns:p="http://schemas.openxmlformats.org/presentationml/2006/main">
+  <p:cSld>
+    <p:spTree>
+      <p:nvGrpSpPr>
+        <p:cNvPr id="1" name=""/>
+        <p:cNvGrpSpPr/>
+        <p:nvPr/>
+      </p:nvGrpSpPr>
+      <p:grpSpPr>
+        <a:xfrm>
+          <a:off x="0" y="0"/>
+          <a:ext cx="0" cy="0"/>
+          <a:chOff x="0" y="0"/>
+          <a:chExt cx="0" cy="0"/>
+        </a:xfrm>
+      </p:grpSpPr>
+      <p:sp>
+        <p:nvSpPr>
+          <p:cNvPr id="2" name="Title 1"/>
+          <p:cNvSpPr>
+            <a:spLocks noGrp="1"/>
+          </p:cNvSpPr>
+          <p:nvPr>
+            <p:ph type="title"/>
+          </p:nvPr>
+        </p:nvSpPr>
+        <p:spPr/>
+        <p:txBody>
+          <a:bodyPr/>
+          <a:lstStyle/>
+          <a:p>
+            <a:r>
+              <a:rPr lang="en-US" dirty="0" smtClean="0"/>
               <a:t>Tuple</a:t>
             </a:r>
             <a:endParaRPr lang="en-US" dirty="0"/>
@@ -3749,7 +3979,7 @@
             <a:graphicData uri="http://schemas.openxmlformats.org/presentationml/2006/ole">
               <mc:AlternateContent xmlns:mc="http://schemas.openxmlformats.org/markup-compatibility/2006">
                 <mc:Choice xmlns:v="urn:schemas-microsoft-com:vml" Requires="v">
-                  <p:oleObj spid="_x0000_s3092" name="Equation" r:id="rId3" imgW="1091880" imgH="228600" progId="Equation.3">
+                  <p:oleObj spid="_x0000_s3094" name="Equation" r:id="rId3" imgW="1091880" imgH="228600" progId="Equation.3">
                     <p:embed/>
                   </p:oleObj>
                 </mc:Choice>
@@ -3841,7 +4071,7 @@
           <a:p>
             <a:fld id="{11AD1F4E-1E51-402E-B221-310F004E7D3B}" type="slidenum">
               <a:rPr lang="en-US" smtClean="0"/>
-              <a:t>10</a:t>
+              <a:t>11</a:t>
             </a:fld>
             <a:endParaRPr lang="en-US"/>
           </a:p>
@@ -3867,7 +4097,7 @@
 </p:sld>
 </file>
 
-<file path=ppt/slides/slide11.xml><?xml version="1.0" encoding="utf-8"?>
+<file path=ppt/slides/slide12.xml><?xml version="1.0" encoding="utf-8"?>
 <p:sld xmlns:a="http://schemas.openxmlformats.org/drawingml/2006/main" xmlns:r="http://schemas.openxmlformats.org/officeDocument/2006/relationships" xmlns:p="http://schemas.openxmlformats.org/presentationml/2006/main">
   <p:cSld>
     <p:spTree>
@@ -3924,7 +4154,7 @@
           <a:p>
             <a:fld id="{11AD1F4E-1E51-402E-B221-310F004E7D3B}" type="slidenum">
               <a:rPr lang="en-US" smtClean="0"/>
-              <a:t>11</a:t>
+              <a:t>12</a:t>
             </a:fld>
             <a:endParaRPr lang="en-US"/>
           </a:p>
@@ -4367,7 +4597,7 @@
 </p:sld>
 </file>
 
-<file path=ppt/slides/slide12.xml><?xml version="1.0" encoding="utf-8"?>
+<file path=ppt/slides/slide13.xml><?xml version="1.0" encoding="utf-8"?>
 <p:sld xmlns:a="http://schemas.openxmlformats.org/drawingml/2006/main" xmlns:r="http://schemas.openxmlformats.org/officeDocument/2006/relationships" xmlns:p="http://schemas.openxmlformats.org/presentationml/2006/main">
   <p:cSld>
     <p:spTree>
@@ -4562,7 +4792,7 @@
             <a:graphicData uri="http://schemas.openxmlformats.org/presentationml/2006/ole">
               <mc:AlternateContent xmlns:mc="http://schemas.openxmlformats.org/markup-compatibility/2006">
                 <mc:Choice xmlns:v="urn:schemas-microsoft-com:vml" Requires="v">
-                  <p:oleObj spid="_x0000_s4111" name="Equation" r:id="rId3" imgW="419040" imgH="241200" progId="Equation.3">
+                  <p:oleObj spid="_x0000_s4113" name="Equation" r:id="rId3" imgW="419040" imgH="241200" progId="Equation.3">
                     <p:embed/>
                   </p:oleObj>
                 </mc:Choice>
@@ -4650,7 +4880,7 @@
           <a:p>
             <a:fld id="{11AD1F4E-1E51-402E-B221-310F004E7D3B}" type="slidenum">
               <a:rPr lang="en-US" smtClean="0"/>
-              <a:t>12</a:t>
+              <a:t>13</a:t>
             </a:fld>
             <a:endParaRPr lang="en-US"/>
           </a:p>
@@ -4676,7 +4906,7 @@
 </p:sld>
 </file>
 
-<file path=ppt/slides/slide13.xml><?xml version="1.0" encoding="utf-8"?>
+<file path=ppt/slides/slide14.xml><?xml version="1.0" encoding="utf-8"?>
 <p:sld xmlns:a="http://schemas.openxmlformats.org/drawingml/2006/main" xmlns:r="http://schemas.openxmlformats.org/officeDocument/2006/relationships" xmlns:p="http://schemas.openxmlformats.org/presentationml/2006/main">
   <p:cSld>
     <p:spTree>
@@ -4733,7 +4963,7 @@
           <a:p>
             <a:fld id="{11AD1F4E-1E51-402E-B221-310F004E7D3B}" type="slidenum">
               <a:rPr lang="en-US" smtClean="0"/>
-              <a:t>13</a:t>
+              <a:t>14</a:t>
             </a:fld>
             <a:endParaRPr lang="en-US"/>
           </a:p>
@@ -5204,7 +5434,7 @@
 </p:sld>
 </file>
 
-<file path=ppt/slides/slide14.xml><?xml version="1.0" encoding="utf-8"?>
+<file path=ppt/slides/slide15.xml><?xml version="1.0" encoding="utf-8"?>
 <p:sld xmlns:a="http://schemas.openxmlformats.org/drawingml/2006/main" xmlns:r="http://schemas.openxmlformats.org/officeDocument/2006/relationships" xmlns:p="http://schemas.openxmlformats.org/presentationml/2006/main">
   <p:cSld>
     <p:spTree>
@@ -5389,7 +5619,7 @@
             <a:graphicData uri="http://schemas.openxmlformats.org/presentationml/2006/ole">
               <mc:AlternateContent xmlns:mc="http://schemas.openxmlformats.org/markup-compatibility/2006">
                 <mc:Choice xmlns:v="urn:schemas-microsoft-com:vml" Requires="v">
-                  <p:oleObj spid="_x0000_s5134" name="Equation" r:id="rId3" imgW="444240" imgH="203040" progId="Equation.3">
+                  <p:oleObj spid="_x0000_s5136" name="Equation" r:id="rId3" imgW="444240" imgH="203040" progId="Equation.3">
                     <p:embed/>
                   </p:oleObj>
                 </mc:Choice>
@@ -5477,7 +5707,7 @@
           <a:p>
             <a:fld id="{11AD1F4E-1E51-402E-B221-310F004E7D3B}" type="slidenum">
               <a:rPr lang="en-US" smtClean="0"/>
-              <a:t>14</a:t>
+              <a:t>15</a:t>
             </a:fld>
             <a:endParaRPr lang="en-US"/>
           </a:p>
@@ -5503,7 +5733,7 @@
 </p:sld>
 </file>
 
-<file path=ppt/slides/slide15.xml><?xml version="1.0" encoding="utf-8"?>
+<file path=ppt/slides/slide16.xml><?xml version="1.0" encoding="utf-8"?>
 <p:sld xmlns:a="http://schemas.openxmlformats.org/drawingml/2006/main" xmlns:r="http://schemas.openxmlformats.org/officeDocument/2006/relationships" xmlns:p="http://schemas.openxmlformats.org/presentationml/2006/main">
   <p:cSld>
     <p:spTree>
@@ -5560,7 +5790,7 @@
           <a:p>
             <a:fld id="{11AD1F4E-1E51-402E-B221-310F004E7D3B}" type="slidenum">
               <a:rPr lang="en-US" smtClean="0"/>
-              <a:t>15</a:t>
+              <a:t>16</a:t>
             </a:fld>
             <a:endParaRPr lang="en-US"/>
           </a:p>
@@ -6176,7 +6406,7 @@
 </p:sld>
 </file>
 
-<file path=ppt/slides/slide16.xml><?xml version="1.0" encoding="utf-8"?>
+<file path=ppt/slides/slide17.xml><?xml version="1.0" encoding="utf-8"?>
 <p:sld xmlns:a="http://schemas.openxmlformats.org/drawingml/2006/main" xmlns:r="http://schemas.openxmlformats.org/officeDocument/2006/relationships" xmlns:p="http://schemas.openxmlformats.org/presentationml/2006/main">
   <p:cSld>
     <p:spTree>
@@ -6368,7 +6598,7 @@
             <a:graphicData uri="http://schemas.openxmlformats.org/presentationml/2006/ole">
               <mc:AlternateContent xmlns:mc="http://schemas.openxmlformats.org/markup-compatibility/2006">
                 <mc:Choice xmlns:v="urn:schemas-microsoft-com:vml" Requires="v">
-                  <p:oleObj spid="_x0000_s6180" name="Equation" r:id="rId3" imgW="774360" imgH="215640" progId="Equation.3">
+                  <p:oleObj spid="_x0000_s6186" name="Equation" r:id="rId3" imgW="774360" imgH="215640" progId="Equation.3">
                     <p:embed/>
                   </p:oleObj>
                 </mc:Choice>
@@ -6456,7 +6686,7 @@
           <a:p>
             <a:fld id="{11AD1F4E-1E51-402E-B221-310F004E7D3B}" type="slidenum">
               <a:rPr lang="en-US" smtClean="0"/>
-              <a:t>16</a:t>
+              <a:t>17</a:t>
             </a:fld>
             <a:endParaRPr lang="en-US"/>
           </a:p>
@@ -6600,7 +6830,7 @@
             <a:graphicData uri="http://schemas.openxmlformats.org/presentationml/2006/ole">
               <mc:AlternateContent xmlns:mc="http://schemas.openxmlformats.org/markup-compatibility/2006">
                 <mc:Choice xmlns:v="urn:schemas-microsoft-com:vml" Requires="v">
-                  <p:oleObj spid="_x0000_s6181" name="Equation" r:id="rId5" imgW="622080" imgH="215640" progId="Equation.3">
+                  <p:oleObj spid="_x0000_s6187" name="Equation" r:id="rId5" imgW="622080" imgH="215640" progId="Equation.3">
                     <p:embed/>
                   </p:oleObj>
                 </mc:Choice>
@@ -6657,7 +6887,7 @@
             <a:graphicData uri="http://schemas.openxmlformats.org/presentationml/2006/ole">
               <mc:AlternateContent xmlns:mc="http://schemas.openxmlformats.org/markup-compatibility/2006">
                 <mc:Choice xmlns:v="urn:schemas-microsoft-com:vml" Requires="v">
-                  <p:oleObj spid="_x0000_s6182" name="Equation" r:id="rId7" imgW="749160" imgH="215640" progId="Equation.3">
+                  <p:oleObj spid="_x0000_s6188" name="Equation" r:id="rId7" imgW="749160" imgH="215640" progId="Equation.3">
                     <p:embed/>
                   </p:oleObj>
                 </mc:Choice>
@@ -7100,7 +7330,7 @@
 </p:sld>
 </file>
 
-<file path=ppt/slides/slide17.xml><?xml version="1.0" encoding="utf-8"?>
+<file path=ppt/slides/slide18.xml><?xml version="1.0" encoding="utf-8"?>
 <p:sld xmlns:a="http://schemas.openxmlformats.org/drawingml/2006/main" xmlns:r="http://schemas.openxmlformats.org/officeDocument/2006/relationships" xmlns:p="http://schemas.openxmlformats.org/presentationml/2006/main">
   <p:cSld>
     <p:spTree>
@@ -7157,7 +7387,7 @@
           <a:p>
             <a:fld id="{11AD1F4E-1E51-402E-B221-310F004E7D3B}" type="slidenum">
               <a:rPr lang="en-US" smtClean="0"/>
-              <a:t>17</a:t>
+              <a:t>18</a:t>
             </a:fld>
             <a:endParaRPr lang="en-US"/>
           </a:p>
@@ -7840,6 +8070,108 @@
     <p:extLst>
       <p:ext uri="{BB962C8B-B14F-4D97-AF65-F5344CB8AC3E}">
         <p14:creationId xmlns:p14="http://schemas.microsoft.com/office/powerpoint/2010/main" val="3159559741"/>
+      </p:ext>
+    </p:extLst>
+  </p:cSld>
+  <p:clrMapOvr>
+    <a:masterClrMapping/>
+  </p:clrMapOvr>
+  <p:timing>
+    <p:tnLst>
+      <p:par>
+        <p:cTn id="1" dur="indefinite" restart="never" nodeType="tmRoot"/>
+      </p:par>
+    </p:tnLst>
+  </p:timing>
+</p:sld>
+</file>
+
+<file path=ppt/slides/slide19.xml><?xml version="1.0" encoding="utf-8"?>
+<p:sld xmlns:a="http://schemas.openxmlformats.org/drawingml/2006/main" xmlns:r="http://schemas.openxmlformats.org/officeDocument/2006/relationships" xmlns:p="http://schemas.openxmlformats.org/presentationml/2006/main">
+  <p:cSld>
+    <p:spTree>
+      <p:nvGrpSpPr>
+        <p:cNvPr id="1" name=""/>
+        <p:cNvGrpSpPr/>
+        <p:nvPr/>
+      </p:nvGrpSpPr>
+      <p:grpSpPr>
+        <a:xfrm>
+          <a:off x="0" y="0"/>
+          <a:ext cx="0" cy="0"/>
+          <a:chOff x="0" y="0"/>
+          <a:chExt cx="0" cy="0"/>
+        </a:xfrm>
+      </p:grpSpPr>
+      <p:sp>
+        <p:nvSpPr>
+          <p:cNvPr id="4" name="Title 3"/>
+          <p:cNvSpPr>
+            <a:spLocks noGrp="1"/>
+          </p:cNvSpPr>
+          <p:nvPr>
+            <p:ph type="title"/>
+          </p:nvPr>
+        </p:nvSpPr>
+        <p:spPr/>
+        <p:txBody>
+          <a:bodyPr/>
+          <a:lstStyle/>
+          <a:p>
+            <a:r>
+              <a:rPr lang="en-US" dirty="0" smtClean="0"/>
+              <a:t>Derived data structures</a:t>
+            </a:r>
+            <a:endParaRPr lang="en-US" dirty="0"/>
+          </a:p>
+        </p:txBody>
+      </p:sp>
+      <p:sp>
+        <p:nvSpPr>
+          <p:cNvPr id="5" name="Text Placeholder 4"/>
+          <p:cNvSpPr>
+            <a:spLocks noGrp="1"/>
+          </p:cNvSpPr>
+          <p:nvPr>
+            <p:ph type="body" idx="1"/>
+          </p:nvPr>
+        </p:nvSpPr>
+        <p:spPr/>
+        <p:txBody>
+          <a:bodyPr/>
+          <a:lstStyle/>
+          <a:p>
+            <a:endParaRPr lang="en-US"/>
+          </a:p>
+        </p:txBody>
+      </p:sp>
+      <p:sp>
+        <p:nvSpPr>
+          <p:cNvPr id="3" name="Slide Number Placeholder 2"/>
+          <p:cNvSpPr>
+            <a:spLocks noGrp="1"/>
+          </p:cNvSpPr>
+          <p:nvPr>
+            <p:ph type="sldNum" sz="quarter" idx="12"/>
+          </p:nvPr>
+        </p:nvSpPr>
+        <p:spPr/>
+        <p:txBody>
+          <a:bodyPr/>
+          <a:lstStyle/>
+          <a:p>
+            <a:fld id="{11AD1F4E-1E51-402E-B221-310F004E7D3B}" type="slidenum">
+              <a:rPr lang="en-US" smtClean="0"/>
+              <a:t>19</a:t>
+            </a:fld>
+            <a:endParaRPr lang="en-US"/>
+          </a:p>
+        </p:txBody>
+      </p:sp>
+    </p:spTree>
+    <p:extLst>
+      <p:ext uri="{BB962C8B-B14F-4D97-AF65-F5344CB8AC3E}">
+        <p14:creationId xmlns:p14="http://schemas.microsoft.com/office/powerpoint/2010/main" val="3769330791"/>
       </p:ext>
     </p:extLst>
   </p:cSld>
@@ -7942,6 +8274,177 @@
     <p:extLst>
       <p:ext uri="{BB962C8B-B14F-4D97-AF65-F5344CB8AC3E}">
         <p14:creationId xmlns:p14="http://schemas.microsoft.com/office/powerpoint/2010/main" val="33640868"/>
+      </p:ext>
+    </p:extLst>
+  </p:cSld>
+  <p:clrMapOvr>
+    <a:masterClrMapping/>
+  </p:clrMapOvr>
+  <p:timing>
+    <p:tnLst>
+      <p:par>
+        <p:cTn id="1" dur="indefinite" restart="never" nodeType="tmRoot"/>
+      </p:par>
+    </p:tnLst>
+  </p:timing>
+</p:sld>
+</file>
+
+<file path=ppt/slides/slide20.xml><?xml version="1.0" encoding="utf-8"?>
+<p:sld xmlns:a="http://schemas.openxmlformats.org/drawingml/2006/main" xmlns:r="http://schemas.openxmlformats.org/officeDocument/2006/relationships" xmlns:p="http://schemas.openxmlformats.org/presentationml/2006/main">
+  <p:cSld>
+    <p:spTree>
+      <p:nvGrpSpPr>
+        <p:cNvPr id="1" name=""/>
+        <p:cNvGrpSpPr/>
+        <p:nvPr/>
+      </p:nvGrpSpPr>
+      <p:grpSpPr>
+        <a:xfrm>
+          <a:off x="0" y="0"/>
+          <a:ext cx="0" cy="0"/>
+          <a:chOff x="0" y="0"/>
+          <a:chExt cx="0" cy="0"/>
+        </a:xfrm>
+      </p:grpSpPr>
+      <p:sp>
+        <p:nvSpPr>
+          <p:cNvPr id="2" name="Title 1"/>
+          <p:cNvSpPr>
+            <a:spLocks noGrp="1"/>
+          </p:cNvSpPr>
+          <p:nvPr>
+            <p:ph type="title"/>
+          </p:nvPr>
+        </p:nvSpPr>
+        <p:spPr/>
+        <p:txBody>
+          <a:bodyPr/>
+          <a:lstStyle/>
+          <a:p>
+            <a:r>
+              <a:rPr lang="en-US" dirty="0" smtClean="0"/>
+              <a:t>Stack</a:t>
+            </a:r>
+            <a:endParaRPr lang="en-US" dirty="0"/>
+          </a:p>
+        </p:txBody>
+      </p:sp>
+      <p:sp>
+        <p:nvSpPr>
+          <p:cNvPr id="3" name="Content Placeholder 2"/>
+          <p:cNvSpPr>
+            <a:spLocks noGrp="1"/>
+          </p:cNvSpPr>
+          <p:nvPr>
+            <p:ph idx="1"/>
+          </p:nvPr>
+        </p:nvSpPr>
+        <p:spPr/>
+        <p:txBody>
+          <a:bodyPr>
+            <a:normAutofit/>
+          </a:bodyPr>
+          <a:lstStyle/>
+          <a:p>
+            <a:r>
+              <a:rPr lang="en-US" dirty="0" smtClean="0"/>
+              <a:t>Characteristics</a:t>
+            </a:r>
+          </a:p>
+          <a:p>
+            <a:pPr lvl="1"/>
+            <a:r>
+              <a:rPr lang="en-US" dirty="0" smtClean="0"/>
+              <a:t>access: </a:t>
+            </a:r>
+            <a:r>
+              <a:rPr lang="en-US" dirty="0" smtClean="0"/>
+              <a:t>only top</a:t>
+            </a:r>
+            <a:endParaRPr lang="en-US" dirty="0" smtClean="0"/>
+          </a:p>
+          <a:p>
+            <a:pPr lvl="1"/>
+            <a:r>
+              <a:rPr lang="en-US" dirty="0" smtClean="0"/>
+              <a:t>ordered</a:t>
+            </a:r>
+          </a:p>
+          <a:p>
+            <a:pPr lvl="1"/>
+            <a:r>
+              <a:rPr lang="en-US" dirty="0" smtClean="0"/>
+              <a:t>length can vary</a:t>
+            </a:r>
+          </a:p>
+          <a:p>
+            <a:pPr lvl="1"/>
+            <a:r>
+              <a:rPr lang="en-US" dirty="0" smtClean="0"/>
+              <a:t>push/peek/pull: O(1)</a:t>
+            </a:r>
+            <a:endParaRPr lang="en-US" dirty="0" smtClean="0"/>
+          </a:p>
+          <a:p>
+            <a:pPr lvl="1"/>
+            <a:r>
+              <a:rPr lang="en-US" dirty="0" smtClean="0"/>
+              <a:t>element type: </a:t>
+            </a:r>
+            <a:r>
+              <a:rPr lang="en-US" dirty="0" smtClean="0"/>
+              <a:t>any</a:t>
+            </a:r>
+            <a:endParaRPr lang="en-US" dirty="0" smtClean="0"/>
+          </a:p>
+          <a:p>
+            <a:r>
+              <a:rPr lang="en-US" dirty="0" smtClean="0"/>
+              <a:t>Implementations</a:t>
+            </a:r>
+          </a:p>
+          <a:p>
+            <a:pPr lvl="1"/>
+            <a:r>
+              <a:rPr lang="en-US" dirty="0" smtClean="0"/>
+              <a:t>as list</a:t>
+            </a:r>
+            <a:endParaRPr lang="en-US" dirty="0" smtClean="0"/>
+          </a:p>
+          <a:p>
+            <a:pPr lvl="1"/>
+            <a:endParaRPr lang="en-US" dirty="0"/>
+          </a:p>
+        </p:txBody>
+      </p:sp>
+      <p:sp>
+        <p:nvSpPr>
+          <p:cNvPr id="7" name="Slide Number Placeholder 6"/>
+          <p:cNvSpPr>
+            <a:spLocks noGrp="1"/>
+          </p:cNvSpPr>
+          <p:nvPr>
+            <p:ph type="sldNum" sz="quarter" idx="12"/>
+          </p:nvPr>
+        </p:nvSpPr>
+        <p:spPr/>
+        <p:txBody>
+          <a:bodyPr/>
+          <a:lstStyle/>
+          <a:p>
+            <a:fld id="{11AD1F4E-1E51-402E-B221-310F004E7D3B}" type="slidenum">
+              <a:rPr lang="en-US" smtClean="0"/>
+              <a:t>20</a:t>
+            </a:fld>
+            <a:endParaRPr lang="en-US"/>
+          </a:p>
+        </p:txBody>
+      </p:sp>
+    </p:spTree>
+    <p:extLst>
+      <p:ext uri="{BB962C8B-B14F-4D97-AF65-F5344CB8AC3E}">
+        <p14:creationId xmlns:p14="http://schemas.microsoft.com/office/powerpoint/2010/main" val="3540411585"/>
       </p:ext>
     </p:extLst>
   </p:cSld>
@@ -9113,7 +9616,7 @@
           <a:graphicData uri="http://schemas.openxmlformats.org/presentationml/2006/ole">
             <mc:AlternateContent xmlns:mc="http://schemas.openxmlformats.org/markup-compatibility/2006">
               <mc:Choice xmlns:v="urn:schemas-microsoft-com:vml" Requires="v">
-                <p:oleObj spid="_x0000_s1049" name="Equation" r:id="rId4" imgW="1841400" imgH="215640" progId="Equation.3">
+                <p:oleObj spid="_x0000_s1051" name="Equation" r:id="rId4" imgW="1841400" imgH="215640" progId="Equation.3">
                   <p:embed/>
                 </p:oleObj>
               </mc:Choice>
@@ -9424,6 +9927,173 @@
           <a:p>
             <a:r>
               <a:rPr lang="en-US" dirty="0" smtClean="0"/>
+              <a:t>Basic data structures</a:t>
+            </a:r>
+            <a:endParaRPr lang="en-US" dirty="0"/>
+          </a:p>
+        </p:txBody>
+      </p:sp>
+      <p:sp>
+        <p:nvSpPr>
+          <p:cNvPr id="3" name="Content Placeholder 2"/>
+          <p:cNvSpPr>
+            <a:spLocks noGrp="1"/>
+          </p:cNvSpPr>
+          <p:nvPr>
+            <p:ph idx="1"/>
+          </p:nvPr>
+        </p:nvSpPr>
+        <p:spPr/>
+        <p:txBody>
+          <a:bodyPr/>
+          <a:lstStyle/>
+          <a:p>
+            <a:r>
+              <a:rPr lang="en-US" dirty="0" smtClean="0"/>
+              <a:t>Data structures provided</a:t>
+            </a:r>
+          </a:p>
+          <a:p>
+            <a:pPr lvl="1"/>
+            <a:r>
+              <a:rPr lang="en-US" dirty="0" smtClean="0"/>
+              <a:t>core language</a:t>
+            </a:r>
+          </a:p>
+          <a:p>
+            <a:pPr lvl="1"/>
+            <a:r>
+              <a:rPr lang="en-US" dirty="0" smtClean="0"/>
+              <a:t>standard libraries</a:t>
+            </a:r>
+          </a:p>
+          <a:p>
+            <a:r>
+              <a:rPr lang="en-US" dirty="0" smtClean="0"/>
+              <a:t>Other data structures can be implemented on top</a:t>
+            </a:r>
+          </a:p>
+          <a:p>
+            <a:r>
+              <a:rPr lang="en-US" dirty="0" smtClean="0"/>
+              <a:t>Contents</a:t>
+            </a:r>
+          </a:p>
+          <a:p>
+            <a:pPr lvl="1"/>
+            <a:r>
+              <a:rPr lang="en-US" dirty="0" smtClean="0"/>
+              <a:t>array</a:t>
+            </a:r>
+          </a:p>
+          <a:p>
+            <a:pPr lvl="1"/>
+            <a:r>
+              <a:rPr lang="en-US" dirty="0" smtClean="0"/>
+              <a:t>tuple</a:t>
+            </a:r>
+          </a:p>
+          <a:p>
+            <a:pPr lvl="1"/>
+            <a:r>
+              <a:rPr lang="en-US" dirty="0" smtClean="0"/>
+              <a:t>list</a:t>
+            </a:r>
+          </a:p>
+          <a:p>
+            <a:pPr lvl="1"/>
+            <a:r>
+              <a:rPr lang="en-US" dirty="0" smtClean="0"/>
+              <a:t>set</a:t>
+            </a:r>
+          </a:p>
+          <a:p>
+            <a:pPr lvl="1"/>
+            <a:r>
+              <a:rPr lang="en-US" dirty="0" smtClean="0"/>
+              <a:t>map</a:t>
+            </a:r>
+            <a:endParaRPr lang="en-US" dirty="0"/>
+          </a:p>
+        </p:txBody>
+      </p:sp>
+      <p:sp>
+        <p:nvSpPr>
+          <p:cNvPr id="4" name="Slide Number Placeholder 3"/>
+          <p:cNvSpPr>
+            <a:spLocks noGrp="1"/>
+          </p:cNvSpPr>
+          <p:nvPr>
+            <p:ph type="sldNum" sz="quarter" idx="12"/>
+          </p:nvPr>
+        </p:nvSpPr>
+        <p:spPr/>
+        <p:txBody>
+          <a:bodyPr/>
+          <a:lstStyle/>
+          <a:p>
+            <a:fld id="{11AD1F4E-1E51-402E-B221-310F004E7D3B}" type="slidenum">
+              <a:rPr lang="en-US" smtClean="0"/>
+              <a:t>8</a:t>
+            </a:fld>
+            <a:endParaRPr lang="en-US"/>
+          </a:p>
+        </p:txBody>
+      </p:sp>
+    </p:spTree>
+    <p:extLst>
+      <p:ext uri="{BB962C8B-B14F-4D97-AF65-F5344CB8AC3E}">
+        <p14:creationId xmlns:p14="http://schemas.microsoft.com/office/powerpoint/2010/main" val="3787370389"/>
+      </p:ext>
+    </p:extLst>
+  </p:cSld>
+  <p:clrMapOvr>
+    <a:masterClrMapping/>
+  </p:clrMapOvr>
+  <p:timing>
+    <p:tnLst>
+      <p:par>
+        <p:cTn id="1" dur="indefinite" restart="never" nodeType="tmRoot"/>
+      </p:par>
+    </p:tnLst>
+  </p:timing>
+</p:sld>
+</file>
+
+<file path=ppt/slides/slide9.xml><?xml version="1.0" encoding="utf-8"?>
+<p:sld xmlns:a="http://schemas.openxmlformats.org/drawingml/2006/main" xmlns:r="http://schemas.openxmlformats.org/officeDocument/2006/relationships" xmlns:p="http://schemas.openxmlformats.org/presentationml/2006/main">
+  <p:cSld>
+    <p:spTree>
+      <p:nvGrpSpPr>
+        <p:cNvPr id="1" name=""/>
+        <p:cNvGrpSpPr/>
+        <p:nvPr/>
+      </p:nvGrpSpPr>
+      <p:grpSpPr>
+        <a:xfrm>
+          <a:off x="0" y="0"/>
+          <a:ext cx="0" cy="0"/>
+          <a:chOff x="0" y="0"/>
+          <a:chExt cx="0" cy="0"/>
+        </a:xfrm>
+      </p:grpSpPr>
+      <p:sp>
+        <p:nvSpPr>
+          <p:cNvPr id="2" name="Title 1"/>
+          <p:cNvSpPr>
+            <a:spLocks noGrp="1"/>
+          </p:cNvSpPr>
+          <p:nvPr>
+            <p:ph type="title"/>
+          </p:nvPr>
+        </p:nvSpPr>
+        <p:spPr/>
+        <p:txBody>
+          <a:bodyPr/>
+          <a:lstStyle/>
+          <a:p>
+            <a:r>
+              <a:rPr lang="en-US" dirty="0" smtClean="0"/>
               <a:t>Array</a:t>
             </a:r>
             <a:endParaRPr lang="en-US" dirty="0"/>
@@ -9563,7 +10233,7 @@
             <a:graphicData uri="http://schemas.openxmlformats.org/presentationml/2006/ole">
               <mc:AlternateContent xmlns:mc="http://schemas.openxmlformats.org/markup-compatibility/2006">
                 <mc:Choice xmlns:v="urn:schemas-microsoft-com:vml" Requires="v">
-                  <p:oleObj spid="_x0000_s2069" name="Equation" r:id="rId3" imgW="1358640" imgH="203040" progId="Equation.3">
+                  <p:oleObj spid="_x0000_s2071" name="Equation" r:id="rId3" imgW="1358640" imgH="203040" progId="Equation.3">
                     <p:embed/>
                   </p:oleObj>
                 </mc:Choice>
@@ -9655,7 +10325,7 @@
           <a:p>
             <a:fld id="{11AD1F4E-1E51-402E-B221-310F004E7D3B}" type="slidenum">
               <a:rPr lang="en-US" smtClean="0"/>
-              <a:t>8</a:t>
+              <a:t>9</a:t>
             </a:fld>
             <a:endParaRPr lang="en-US"/>
           </a:p>
@@ -9665,233 +10335,6 @@
     <p:extLst>
       <p:ext uri="{BB962C8B-B14F-4D97-AF65-F5344CB8AC3E}">
         <p14:creationId xmlns:p14="http://schemas.microsoft.com/office/powerpoint/2010/main" val="3611286983"/>
-      </p:ext>
-    </p:extLst>
-  </p:cSld>
-  <p:clrMapOvr>
-    <a:masterClrMapping/>
-  </p:clrMapOvr>
-  <p:timing>
-    <p:tnLst>
-      <p:par>
-        <p:cTn id="1" dur="indefinite" restart="never" nodeType="tmRoot"/>
-      </p:par>
-    </p:tnLst>
-  </p:timing>
-</p:sld>
-</file>
-
-<file path=ppt/slides/slide9.xml><?xml version="1.0" encoding="utf-8"?>
-<p:sld xmlns:a="http://schemas.openxmlformats.org/drawingml/2006/main" xmlns:r="http://schemas.openxmlformats.org/officeDocument/2006/relationships" xmlns:p="http://schemas.openxmlformats.org/presentationml/2006/main">
-  <p:cSld>
-    <p:spTree>
-      <p:nvGrpSpPr>
-        <p:cNvPr id="1" name=""/>
-        <p:cNvGrpSpPr/>
-        <p:nvPr/>
-      </p:nvGrpSpPr>
-      <p:grpSpPr>
-        <a:xfrm>
-          <a:off x="0" y="0"/>
-          <a:ext cx="0" cy="0"/>
-          <a:chOff x="0" y="0"/>
-          <a:chExt cx="0" cy="0"/>
-        </a:xfrm>
-      </p:grpSpPr>
-      <p:sp>
-        <p:nvSpPr>
-          <p:cNvPr id="2" name="Title 1"/>
-          <p:cNvSpPr>
-            <a:spLocks noGrp="1"/>
-          </p:cNvSpPr>
-          <p:nvPr>
-            <p:ph type="title"/>
-          </p:nvPr>
-        </p:nvSpPr>
-        <p:spPr/>
-        <p:txBody>
-          <a:bodyPr/>
-          <a:lstStyle/>
-          <a:p>
-            <a:r>
-              <a:rPr lang="en-US" dirty="0" smtClean="0"/>
-              <a:t>Array examples</a:t>
-            </a:r>
-            <a:endParaRPr lang="en-US" dirty="0"/>
-          </a:p>
-        </p:txBody>
-      </p:sp>
-      <p:sp>
-        <p:nvSpPr>
-          <p:cNvPr id="4" name="Slide Number Placeholder 3"/>
-          <p:cNvSpPr>
-            <a:spLocks noGrp="1"/>
-          </p:cNvSpPr>
-          <p:nvPr>
-            <p:ph type="sldNum" sz="quarter" idx="12"/>
-          </p:nvPr>
-        </p:nvSpPr>
-        <p:spPr/>
-        <p:txBody>
-          <a:bodyPr/>
-          <a:lstStyle/>
-          <a:p>
-            <a:fld id="{11AD1F4E-1E51-402E-B221-310F004E7D3B}" type="slidenum">
-              <a:rPr lang="en-US" smtClean="0"/>
-              <a:t>9</a:t>
-            </a:fld>
-            <a:endParaRPr lang="en-US"/>
-          </a:p>
-        </p:txBody>
-      </p:sp>
-      <p:sp>
-        <p:nvSpPr>
-          <p:cNvPr id="5" name="TextBox 4"/>
-          <p:cNvSpPr txBox="1"/>
-          <p:nvPr/>
-        </p:nvSpPr>
-        <p:spPr>
-          <a:xfrm>
-            <a:off x="628650" y="2244436"/>
-            <a:ext cx="5561138" cy="923330"/>
-          </a:xfrm>
-          <a:prstGeom prst="rect">
-            <a:avLst/>
-          </a:prstGeom>
-          <a:solidFill>
-            <a:schemeClr val="tx2">
-              <a:lumMod val="40000"/>
-              <a:lumOff val="60000"/>
-            </a:schemeClr>
-          </a:solidFill>
-          <a:ln>
-            <a:solidFill>
-              <a:schemeClr val="tx1"/>
-            </a:solidFill>
-          </a:ln>
-        </p:spPr>
-        <p:txBody>
-          <a:bodyPr wrap="square" rtlCol="0">
-            <a:spAutoFit/>
-          </a:bodyPr>
-          <a:lstStyle/>
-          <a:p>
-            <a:r>
-              <a:rPr lang="en-US" dirty="0" err="1" smtClean="0">
-                <a:latin typeface="Courier New" panose="02070309020205020404" pitchFamily="49" charset="0"/>
-                <a:cs typeface="Courier New" panose="02070309020205020404" pitchFamily="49" charset="0"/>
-              </a:rPr>
-              <a:t>int</a:t>
-            </a:r>
-            <a:r>
-              <a:rPr lang="en-US" dirty="0" smtClean="0">
-                <a:latin typeface="Courier New" panose="02070309020205020404" pitchFamily="49" charset="0"/>
-                <a:cs typeface="Courier New" panose="02070309020205020404" pitchFamily="49" charset="0"/>
-              </a:rPr>
-              <a:t> a[10];</a:t>
-            </a:r>
-          </a:p>
-          <a:p>
-            <a:r>
-              <a:rPr lang="en-US" dirty="0" smtClean="0">
-                <a:latin typeface="Courier New" panose="02070309020205020404" pitchFamily="49" charset="0"/>
-                <a:cs typeface="Courier New" panose="02070309020205020404" pitchFamily="49" charset="0"/>
-              </a:rPr>
-              <a:t>a[0] = 12;</a:t>
-            </a:r>
-          </a:p>
-          <a:p>
-            <a:r>
-              <a:rPr lang="en-US" dirty="0" smtClean="0">
-                <a:latin typeface="Courier New" panose="02070309020205020404" pitchFamily="49" charset="0"/>
-                <a:cs typeface="Courier New" panose="02070309020205020404" pitchFamily="49" charset="0"/>
-              </a:rPr>
-              <a:t>a[1] = a[0] + 13;</a:t>
-            </a:r>
-            <a:endParaRPr lang="en-US" dirty="0">
-              <a:latin typeface="Courier New" panose="02070309020205020404" pitchFamily="49" charset="0"/>
-              <a:cs typeface="Courier New" panose="02070309020205020404" pitchFamily="49" charset="0"/>
-            </a:endParaRPr>
-          </a:p>
-        </p:txBody>
-      </p:sp>
-      <p:sp>
-        <p:nvSpPr>
-          <p:cNvPr id="6" name="TextBox 5"/>
-          <p:cNvSpPr txBox="1"/>
-          <p:nvPr/>
-        </p:nvSpPr>
-        <p:spPr>
-          <a:xfrm>
-            <a:off x="628650" y="3487882"/>
-            <a:ext cx="5561138" cy="1200329"/>
-          </a:xfrm>
-          <a:prstGeom prst="rect">
-            <a:avLst/>
-          </a:prstGeom>
-          <a:solidFill>
-            <a:schemeClr val="accent4">
-              <a:lumMod val="40000"/>
-              <a:lumOff val="60000"/>
-            </a:schemeClr>
-          </a:solidFill>
-          <a:ln>
-            <a:solidFill>
-              <a:schemeClr val="tx1"/>
-            </a:solidFill>
-          </a:ln>
-        </p:spPr>
-        <p:txBody>
-          <a:bodyPr wrap="none" rtlCol="0">
-            <a:spAutoFit/>
-          </a:bodyPr>
-          <a:lstStyle/>
-          <a:p>
-            <a:r>
-              <a:rPr lang="en-US" dirty="0" smtClean="0">
-                <a:latin typeface="Courier New" panose="02070309020205020404" pitchFamily="49" charset="0"/>
-                <a:cs typeface="Courier New" panose="02070309020205020404" pitchFamily="49" charset="0"/>
-              </a:rPr>
-              <a:t>from array import array</a:t>
-            </a:r>
-          </a:p>
-          <a:p>
-            <a:r>
-              <a:rPr lang="en-US" dirty="0" smtClean="0">
-                <a:latin typeface="Courier New" panose="02070309020205020404" pitchFamily="49" charset="0"/>
-                <a:cs typeface="Courier New" panose="02070309020205020404" pitchFamily="49" charset="0"/>
-              </a:rPr>
-              <a:t>a = array('l', (0 for _ in range(100)))</a:t>
-            </a:r>
-          </a:p>
-          <a:p>
-            <a:r>
-              <a:rPr lang="en-US" dirty="0" smtClean="0">
-                <a:latin typeface="Courier New" panose="02070309020205020404" pitchFamily="49" charset="0"/>
-                <a:cs typeface="Courier New" panose="02070309020205020404" pitchFamily="49" charset="0"/>
-              </a:rPr>
-              <a:t>a[0] = 12</a:t>
-            </a:r>
-          </a:p>
-          <a:p>
-            <a:r>
-              <a:rPr lang="en-US" dirty="0" smtClean="0">
-                <a:latin typeface="Courier New" panose="02070309020205020404" pitchFamily="49" charset="0"/>
-                <a:cs typeface="Courier New" panose="02070309020205020404" pitchFamily="49" charset="0"/>
-              </a:rPr>
-              <a:t>a[1] = a[0] + 13</a:t>
-            </a:r>
-            <a:endParaRPr lang="en-US" dirty="0">
-              <a:latin typeface="Courier New" panose="02070309020205020404" pitchFamily="49" charset="0"/>
-              <a:cs typeface="Courier New" panose="02070309020205020404" pitchFamily="49" charset="0"/>
-            </a:endParaRPr>
-          </a:p>
-        </p:txBody>
-      </p:sp>
-    </p:spTree>
-    <p:extLst>
-      <p:ext uri="{BB962C8B-B14F-4D97-AF65-F5344CB8AC3E}">
-        <p14:creationId xmlns:p14="http://schemas.microsoft.com/office/powerpoint/2010/main" val="377249263"/>
       </p:ext>
     </p:extLst>
   </p:cSld>

</xml_diff>

<commit_message>
Added ADT slides for most data structures
</commit_message>
<xml_diff>
--- a/DataStructures/data_structures.pptx
+++ b/DataStructures/data_structures.pptx
@@ -5,7 +5,7 @@
     <p:sldMasterId id="2147483660" r:id="rId1"/>
   </p:sldMasterIdLst>
   <p:notesMasterIdLst>
-    <p:notesMasterId r:id="rId22"/>
+    <p:notesMasterId r:id="rId26"/>
   </p:notesMasterIdLst>
   <p:sldIdLst>
     <p:sldId id="256" r:id="rId2"/>
@@ -17,17 +17,21 @@
     <p:sldId id="260" r:id="rId8"/>
     <p:sldId id="274" r:id="rId9"/>
     <p:sldId id="261" r:id="rId10"/>
-    <p:sldId id="267" r:id="rId11"/>
-    <p:sldId id="265" r:id="rId12"/>
-    <p:sldId id="269" r:id="rId13"/>
-    <p:sldId id="262" r:id="rId14"/>
-    <p:sldId id="270" r:id="rId15"/>
-    <p:sldId id="263" r:id="rId16"/>
-    <p:sldId id="271" r:id="rId17"/>
-    <p:sldId id="264" r:id="rId18"/>
-    <p:sldId id="272" r:id="rId19"/>
-    <p:sldId id="273" r:id="rId20"/>
-    <p:sldId id="275" r:id="rId21"/>
+    <p:sldId id="276" r:id="rId11"/>
+    <p:sldId id="267" r:id="rId12"/>
+    <p:sldId id="265" r:id="rId13"/>
+    <p:sldId id="277" r:id="rId14"/>
+    <p:sldId id="269" r:id="rId15"/>
+    <p:sldId id="262" r:id="rId16"/>
+    <p:sldId id="278" r:id="rId17"/>
+    <p:sldId id="270" r:id="rId18"/>
+    <p:sldId id="263" r:id="rId19"/>
+    <p:sldId id="279" r:id="rId20"/>
+    <p:sldId id="271" r:id="rId21"/>
+    <p:sldId id="264" r:id="rId22"/>
+    <p:sldId id="272" r:id="rId23"/>
+    <p:sldId id="273" r:id="rId24"/>
+    <p:sldId id="275" r:id="rId25"/>
   </p:sldIdLst>
   <p:sldSz cx="9144000" cy="6858000" type="screen4x3"/>
   <p:notesSz cx="6858000" cy="9144000"/>
@@ -216,7 +220,7 @@
           <a:p>
             <a:fld id="{D3AF4CC3-573B-48A2-BA19-C88E9EEB8008}" type="datetimeFigureOut">
               <a:rPr lang="en-US" smtClean="0"/>
-              <a:t>2016-08-18</a:t>
+              <a:t>2016-08-22</a:t>
             </a:fld>
             <a:endParaRPr lang="en-US"/>
           </a:p>
@@ -699,7 +703,7 @@
           <a:p>
             <a:fld id="{E7395A51-B5B5-44D7-85E1-1556CCB9180F}" type="datetime1">
               <a:rPr lang="en-US" smtClean="0"/>
-              <a:t>2016-08-18</a:t>
+              <a:t>2016-08-22</a:t>
             </a:fld>
             <a:endParaRPr lang="en-US"/>
           </a:p>
@@ -869,7 +873,7 @@
           <a:p>
             <a:fld id="{BEDB066D-DA80-4992-B507-A911EFD1878C}" type="datetime1">
               <a:rPr lang="en-US" smtClean="0"/>
-              <a:t>2016-08-18</a:t>
+              <a:t>2016-08-22</a:t>
             </a:fld>
             <a:endParaRPr lang="en-US"/>
           </a:p>
@@ -1049,7 +1053,7 @@
           <a:p>
             <a:fld id="{21259CBD-682A-4ABE-AFE9-CACFF55FE875}" type="datetime1">
               <a:rPr lang="en-US" smtClean="0"/>
-              <a:t>2016-08-18</a:t>
+              <a:t>2016-08-22</a:t>
             </a:fld>
             <a:endParaRPr lang="en-US"/>
           </a:p>
@@ -1219,7 +1223,7 @@
           <a:p>
             <a:fld id="{5F76F78E-A200-421E-B0AA-A6018E81E55E}" type="datetime1">
               <a:rPr lang="en-US" smtClean="0"/>
-              <a:t>2016-08-18</a:t>
+              <a:t>2016-08-22</a:t>
             </a:fld>
             <a:endParaRPr lang="en-US"/>
           </a:p>
@@ -1463,7 +1467,7 @@
           <a:p>
             <a:fld id="{EBEC21EE-ED62-44E3-A586-FF0104F19B99}" type="datetime1">
               <a:rPr lang="en-US" smtClean="0"/>
-              <a:t>2016-08-18</a:t>
+              <a:t>2016-08-22</a:t>
             </a:fld>
             <a:endParaRPr lang="en-US"/>
           </a:p>
@@ -1695,7 +1699,7 @@
           <a:p>
             <a:fld id="{30049BC0-4C66-4CED-BC8E-7AF0BD49C9B5}" type="datetime1">
               <a:rPr lang="en-US" smtClean="0"/>
-              <a:t>2016-08-18</a:t>
+              <a:t>2016-08-22</a:t>
             </a:fld>
             <a:endParaRPr lang="en-US"/>
           </a:p>
@@ -2062,7 +2066,7 @@
           <a:p>
             <a:fld id="{C7C90E0A-53F1-4115-8AB2-2E28E481FF48}" type="datetime1">
               <a:rPr lang="en-US" smtClean="0"/>
-              <a:t>2016-08-18</a:t>
+              <a:t>2016-08-22</a:t>
             </a:fld>
             <a:endParaRPr lang="en-US"/>
           </a:p>
@@ -2180,7 +2184,7 @@
           <a:p>
             <a:fld id="{AF79CAB3-789B-4117-A859-FC7082686441}" type="datetime1">
               <a:rPr lang="en-US" smtClean="0"/>
-              <a:t>2016-08-18</a:t>
+              <a:t>2016-08-22</a:t>
             </a:fld>
             <a:endParaRPr lang="en-US"/>
           </a:p>
@@ -2275,7 +2279,7 @@
           <a:p>
             <a:fld id="{82AE2AC5-51ED-46C8-8F1B-788630EE802E}" type="datetime1">
               <a:rPr lang="en-US" smtClean="0"/>
-              <a:t>2016-08-18</a:t>
+              <a:t>2016-08-22</a:t>
             </a:fld>
             <a:endParaRPr lang="en-US"/>
           </a:p>
@@ -2552,7 +2556,7 @@
           <a:p>
             <a:fld id="{49D0F6DD-6796-44CA-AF4C-1B2A2288F444}" type="datetime1">
               <a:rPr lang="en-US" smtClean="0"/>
-              <a:t>2016-08-18</a:t>
+              <a:t>2016-08-22</a:t>
             </a:fld>
             <a:endParaRPr lang="en-US"/>
           </a:p>
@@ -2809,7 +2813,7 @@
           <a:p>
             <a:fld id="{57F6808E-F05D-421A-97B7-12B728993E3B}" type="datetime1">
               <a:rPr lang="en-US" smtClean="0"/>
-              <a:t>2016-08-18</a:t>
+              <a:t>2016-08-22</a:t>
             </a:fld>
             <a:endParaRPr lang="en-US"/>
           </a:p>
@@ -3022,7 +3026,7 @@
           <a:p>
             <a:fld id="{7B995810-2FB7-4DE8-B622-97729F9C53CB}" type="datetime1">
               <a:rPr lang="en-US" smtClean="0"/>
-              <a:t>2016-08-18</a:t>
+              <a:t>2016-08-22</a:t>
             </a:fld>
             <a:endParaRPr lang="en-US"/>
           </a:p>
@@ -3620,6 +3624,130 @@
           <a:p>
             <a:r>
               <a:rPr lang="en-US" dirty="0" smtClean="0"/>
+              <a:t>Array ADT</a:t>
+            </a:r>
+            <a:endParaRPr lang="en-US" dirty="0"/>
+          </a:p>
+        </p:txBody>
+      </p:sp>
+      <p:sp>
+        <p:nvSpPr>
+          <p:cNvPr id="3" name="Content Placeholder 2"/>
+          <p:cNvSpPr>
+            <a:spLocks noGrp="1"/>
+          </p:cNvSpPr>
+          <p:nvPr>
+            <p:ph idx="1"/>
+          </p:nvPr>
+        </p:nvSpPr>
+        <p:spPr/>
+        <p:txBody>
+          <a:bodyPr/>
+          <a:lstStyle/>
+          <a:p>
+            <a:r>
+              <a:rPr lang="en-US" dirty="0" smtClean="0"/>
+              <a:t>EMPTY_ARRAY(length)</a:t>
+            </a:r>
+          </a:p>
+          <a:p>
+            <a:r>
+              <a:rPr lang="en-US" dirty="0" smtClean="0"/>
+              <a:t>ARRAY.SET(index, value)</a:t>
+            </a:r>
+          </a:p>
+          <a:p>
+            <a:r>
+              <a:rPr lang="en-US" dirty="0" smtClean="0"/>
+              <a:t>ARRAY.GET(index)</a:t>
+            </a:r>
+          </a:p>
+          <a:p>
+            <a:r>
+              <a:rPr lang="en-US" dirty="0" smtClean="0"/>
+              <a:t>ARRAY.LENGTH</a:t>
+            </a:r>
+            <a:endParaRPr lang="en-US" dirty="0"/>
+          </a:p>
+        </p:txBody>
+      </p:sp>
+      <p:sp>
+        <p:nvSpPr>
+          <p:cNvPr id="4" name="Slide Number Placeholder 3"/>
+          <p:cNvSpPr>
+            <a:spLocks noGrp="1"/>
+          </p:cNvSpPr>
+          <p:nvPr>
+            <p:ph type="sldNum" sz="quarter" idx="12"/>
+          </p:nvPr>
+        </p:nvSpPr>
+        <p:spPr/>
+        <p:txBody>
+          <a:bodyPr/>
+          <a:lstStyle/>
+          <a:p>
+            <a:fld id="{11AD1F4E-1E51-402E-B221-310F004E7D3B}" type="slidenum">
+              <a:rPr lang="en-US" smtClean="0"/>
+              <a:t>10</a:t>
+            </a:fld>
+            <a:endParaRPr lang="en-US"/>
+          </a:p>
+        </p:txBody>
+      </p:sp>
+    </p:spTree>
+    <p:extLst>
+      <p:ext uri="{BB962C8B-B14F-4D97-AF65-F5344CB8AC3E}">
+        <p14:creationId xmlns:p14="http://schemas.microsoft.com/office/powerpoint/2010/main" val="1211691370"/>
+      </p:ext>
+    </p:extLst>
+  </p:cSld>
+  <p:clrMapOvr>
+    <a:masterClrMapping/>
+  </p:clrMapOvr>
+  <p:timing>
+    <p:tnLst>
+      <p:par>
+        <p:cTn id="1" dur="indefinite" restart="never" nodeType="tmRoot"/>
+      </p:par>
+    </p:tnLst>
+  </p:timing>
+</p:sld>
+</file>
+
+<file path=ppt/slides/slide11.xml><?xml version="1.0" encoding="utf-8"?>
+<p:sld xmlns:a="http://schemas.openxmlformats.org/drawingml/2006/main" xmlns:r="http://schemas.openxmlformats.org/officeDocument/2006/relationships" xmlns:p="http://schemas.openxmlformats.org/presentationml/2006/main">
+  <p:cSld>
+    <p:spTree>
+      <p:nvGrpSpPr>
+        <p:cNvPr id="1" name=""/>
+        <p:cNvGrpSpPr/>
+        <p:nvPr/>
+      </p:nvGrpSpPr>
+      <p:grpSpPr>
+        <a:xfrm>
+          <a:off x="0" y="0"/>
+          <a:ext cx="0" cy="0"/>
+          <a:chOff x="0" y="0"/>
+          <a:chExt cx="0" cy="0"/>
+        </a:xfrm>
+      </p:grpSpPr>
+      <p:sp>
+        <p:nvSpPr>
+          <p:cNvPr id="2" name="Title 1"/>
+          <p:cNvSpPr>
+            <a:spLocks noGrp="1"/>
+          </p:cNvSpPr>
+          <p:nvPr>
+            <p:ph type="title"/>
+          </p:nvPr>
+        </p:nvSpPr>
+        <p:spPr/>
+        <p:txBody>
+          <a:bodyPr/>
+          <a:lstStyle/>
+          <a:p>
+            <a:r>
+              <a:rPr lang="en-US" dirty="0" smtClean="0"/>
               <a:t>Array examples</a:t>
             </a:r>
             <a:endParaRPr lang="en-US" dirty="0"/>
@@ -3643,7 +3771,7 @@
           <a:p>
             <a:fld id="{11AD1F4E-1E51-402E-B221-310F004E7D3B}" type="slidenum">
               <a:rPr lang="en-US" smtClean="0"/>
-              <a:t>10</a:t>
+              <a:t>11</a:t>
             </a:fld>
             <a:endParaRPr lang="en-US"/>
           </a:p>
@@ -3813,7 +3941,7 @@
 </p:sld>
 </file>
 
-<file path=ppt/slides/slide11.xml><?xml version="1.0" encoding="utf-8"?>
+<file path=ppt/slides/slide12.xml><?xml version="1.0" encoding="utf-8"?>
 <p:sld xmlns:a="http://schemas.openxmlformats.org/drawingml/2006/main" xmlns:r="http://schemas.openxmlformats.org/officeDocument/2006/relationships" xmlns:p="http://schemas.openxmlformats.org/presentationml/2006/main">
   <p:cSld>
     <p:spTree>
@@ -3979,7 +4107,7 @@
             <a:graphicData uri="http://schemas.openxmlformats.org/presentationml/2006/ole">
               <mc:AlternateContent xmlns:mc="http://schemas.openxmlformats.org/markup-compatibility/2006">
                 <mc:Choice xmlns:v="urn:schemas-microsoft-com:vml" Requires="v">
-                  <p:oleObj spid="_x0000_s3094" name="Equation" r:id="rId3" imgW="1091880" imgH="228600" progId="Equation.3">
+                  <p:oleObj spid="_x0000_s3096" name="Equation" r:id="rId3" imgW="1091880" imgH="228600" progId="Equation.3">
                     <p:embed/>
                   </p:oleObj>
                 </mc:Choice>
@@ -4071,7 +4199,7 @@
           <a:p>
             <a:fld id="{11AD1F4E-1E51-402E-B221-310F004E7D3B}" type="slidenum">
               <a:rPr lang="en-US" smtClean="0"/>
-              <a:t>11</a:t>
+              <a:t>12</a:t>
             </a:fld>
             <a:endParaRPr lang="en-US"/>
           </a:p>
@@ -4097,7 +4225,7 @@
 </p:sld>
 </file>
 
-<file path=ppt/slides/slide12.xml><?xml version="1.0" encoding="utf-8"?>
+<file path=ppt/slides/slide13.xml><?xml version="1.0" encoding="utf-8"?>
 <p:sld xmlns:a="http://schemas.openxmlformats.org/drawingml/2006/main" xmlns:r="http://schemas.openxmlformats.org/officeDocument/2006/relationships" xmlns:p="http://schemas.openxmlformats.org/presentationml/2006/main">
   <p:cSld>
     <p:spTree>
@@ -4131,6 +4259,160 @@
           <a:p>
             <a:r>
               <a:rPr lang="en-US" dirty="0" smtClean="0"/>
+              <a:t>Tuple ADT</a:t>
+            </a:r>
+            <a:endParaRPr lang="en-US" dirty="0"/>
+          </a:p>
+        </p:txBody>
+      </p:sp>
+      <p:sp>
+        <p:nvSpPr>
+          <p:cNvPr id="3" name="Content Placeholder 2"/>
+          <p:cNvSpPr>
+            <a:spLocks noGrp="1"/>
+          </p:cNvSpPr>
+          <p:nvPr>
+            <p:ph idx="1"/>
+          </p:nvPr>
+        </p:nvSpPr>
+        <p:spPr/>
+        <p:txBody>
+          <a:bodyPr/>
+          <a:lstStyle/>
+          <a:p>
+            <a:r>
+              <a:rPr lang="en-US" dirty="0" smtClean="0"/>
+              <a:t>NEW_TUPLE(key</a:t>
+            </a:r>
+            <a:r>
+              <a:rPr lang="en-US" baseline="-25000" dirty="0" smtClean="0"/>
+              <a:t>1</a:t>
+            </a:r>
+            <a:r>
+              <a:rPr lang="en-US" dirty="0" smtClean="0"/>
+              <a:t>=value</a:t>
+            </a:r>
+            <a:r>
+              <a:rPr lang="en-US" baseline="-25000" dirty="0" smtClean="0"/>
+              <a:t>1</a:t>
+            </a:r>
+            <a:r>
+              <a:rPr lang="en-US" dirty="0" smtClean="0"/>
+              <a:t>,…, </a:t>
+            </a:r>
+            <a:r>
+              <a:rPr lang="en-US" dirty="0" err="1" smtClean="0"/>
+              <a:t>key</a:t>
+            </a:r>
+            <a:r>
+              <a:rPr lang="en-US" i="1" baseline="-25000" dirty="0" err="1" smtClean="0"/>
+              <a:t>d</a:t>
+            </a:r>
+            <a:r>
+              <a:rPr lang="en-US" dirty="0" smtClean="0"/>
+              <a:t> = value</a:t>
+            </a:r>
+            <a:r>
+              <a:rPr lang="en-US" i="1" baseline="-25000" dirty="0" smtClean="0"/>
+              <a:t>d</a:t>
+            </a:r>
+            <a:r>
+              <a:rPr lang="en-US" dirty="0" smtClean="0"/>
+              <a:t>)</a:t>
+            </a:r>
+          </a:p>
+          <a:p>
+            <a:r>
+              <a:rPr lang="en-US" dirty="0" smtClean="0"/>
+              <a:t>TUPLE.GET(key)</a:t>
+            </a:r>
+          </a:p>
+          <a:p>
+            <a:r>
+              <a:rPr lang="en-US" dirty="0" smtClean="0"/>
+              <a:t>TUPLE.SET(key, value) if key in tuple</a:t>
+            </a:r>
+            <a:endParaRPr lang="en-US" dirty="0"/>
+          </a:p>
+        </p:txBody>
+      </p:sp>
+      <p:sp>
+        <p:nvSpPr>
+          <p:cNvPr id="4" name="Slide Number Placeholder 3"/>
+          <p:cNvSpPr>
+            <a:spLocks noGrp="1"/>
+          </p:cNvSpPr>
+          <p:nvPr>
+            <p:ph type="sldNum" sz="quarter" idx="12"/>
+          </p:nvPr>
+        </p:nvSpPr>
+        <p:spPr/>
+        <p:txBody>
+          <a:bodyPr/>
+          <a:lstStyle/>
+          <a:p>
+            <a:fld id="{11AD1F4E-1E51-402E-B221-310F004E7D3B}" type="slidenum">
+              <a:rPr lang="en-US" smtClean="0"/>
+              <a:t>13</a:t>
+            </a:fld>
+            <a:endParaRPr lang="en-US"/>
+          </a:p>
+        </p:txBody>
+      </p:sp>
+    </p:spTree>
+    <p:extLst>
+      <p:ext uri="{BB962C8B-B14F-4D97-AF65-F5344CB8AC3E}">
+        <p14:creationId xmlns:p14="http://schemas.microsoft.com/office/powerpoint/2010/main" val="2642791340"/>
+      </p:ext>
+    </p:extLst>
+  </p:cSld>
+  <p:clrMapOvr>
+    <a:masterClrMapping/>
+  </p:clrMapOvr>
+  <p:timing>
+    <p:tnLst>
+      <p:par>
+        <p:cTn id="1" dur="indefinite" restart="never" nodeType="tmRoot"/>
+      </p:par>
+    </p:tnLst>
+  </p:timing>
+</p:sld>
+</file>
+
+<file path=ppt/slides/slide14.xml><?xml version="1.0" encoding="utf-8"?>
+<p:sld xmlns:a="http://schemas.openxmlformats.org/drawingml/2006/main" xmlns:r="http://schemas.openxmlformats.org/officeDocument/2006/relationships" xmlns:p="http://schemas.openxmlformats.org/presentationml/2006/main">
+  <p:cSld>
+    <p:spTree>
+      <p:nvGrpSpPr>
+        <p:cNvPr id="1" name=""/>
+        <p:cNvGrpSpPr/>
+        <p:nvPr/>
+      </p:nvGrpSpPr>
+      <p:grpSpPr>
+        <a:xfrm>
+          <a:off x="0" y="0"/>
+          <a:ext cx="0" cy="0"/>
+          <a:chOff x="0" y="0"/>
+          <a:chExt cx="0" cy="0"/>
+        </a:xfrm>
+      </p:grpSpPr>
+      <p:sp>
+        <p:nvSpPr>
+          <p:cNvPr id="2" name="Title 1"/>
+          <p:cNvSpPr>
+            <a:spLocks noGrp="1"/>
+          </p:cNvSpPr>
+          <p:nvPr>
+            <p:ph type="title"/>
+          </p:nvPr>
+        </p:nvSpPr>
+        <p:spPr/>
+        <p:txBody>
+          <a:bodyPr/>
+          <a:lstStyle/>
+          <a:p>
+            <a:r>
+              <a:rPr lang="en-US" dirty="0" smtClean="0"/>
               <a:t>Tuple examples</a:t>
             </a:r>
             <a:endParaRPr lang="en-US" dirty="0"/>
@@ -4154,7 +4436,7 @@
           <a:p>
             <a:fld id="{11AD1F4E-1E51-402E-B221-310F004E7D3B}" type="slidenum">
               <a:rPr lang="en-US" smtClean="0"/>
-              <a:t>12</a:t>
+              <a:t>14</a:t>
             </a:fld>
             <a:endParaRPr lang="en-US"/>
           </a:p>
@@ -4597,7 +4879,7 @@
 </p:sld>
 </file>
 
-<file path=ppt/slides/slide13.xml><?xml version="1.0" encoding="utf-8"?>
+<file path=ppt/slides/slide15.xml><?xml version="1.0" encoding="utf-8"?>
 <p:sld xmlns:a="http://schemas.openxmlformats.org/drawingml/2006/main" xmlns:r="http://schemas.openxmlformats.org/officeDocument/2006/relationships" xmlns:p="http://schemas.openxmlformats.org/presentationml/2006/main">
   <p:cSld>
     <p:spTree>
@@ -4792,7 +5074,7 @@
             <a:graphicData uri="http://schemas.openxmlformats.org/presentationml/2006/ole">
               <mc:AlternateContent xmlns:mc="http://schemas.openxmlformats.org/markup-compatibility/2006">
                 <mc:Choice xmlns:v="urn:schemas-microsoft-com:vml" Requires="v">
-                  <p:oleObj spid="_x0000_s4113" name="Equation" r:id="rId3" imgW="419040" imgH="241200" progId="Equation.3">
+                  <p:oleObj spid="_x0000_s4115" name="Equation" r:id="rId3" imgW="419040" imgH="241200" progId="Equation.3">
                     <p:embed/>
                   </p:oleObj>
                 </mc:Choice>
@@ -4880,7 +5162,7 @@
           <a:p>
             <a:fld id="{11AD1F4E-1E51-402E-B221-310F004E7D3B}" type="slidenum">
               <a:rPr lang="en-US" smtClean="0"/>
-              <a:t>13</a:t>
+              <a:t>15</a:t>
             </a:fld>
             <a:endParaRPr lang="en-US"/>
           </a:p>
@@ -4906,7 +5188,7 @@
 </p:sld>
 </file>
 
-<file path=ppt/slides/slide14.xml><?xml version="1.0" encoding="utf-8"?>
+<file path=ppt/slides/slide16.xml><?xml version="1.0" encoding="utf-8"?>
 <p:sld xmlns:a="http://schemas.openxmlformats.org/drawingml/2006/main" xmlns:r="http://schemas.openxmlformats.org/officeDocument/2006/relationships" xmlns:p="http://schemas.openxmlformats.org/presentationml/2006/main">
   <p:cSld>
     <p:spTree>
@@ -4940,6 +5222,130 @@
           <a:p>
             <a:r>
               <a:rPr lang="en-US" dirty="0" smtClean="0"/>
+              <a:t>List ADT</a:t>
+            </a:r>
+            <a:endParaRPr lang="en-US" dirty="0"/>
+          </a:p>
+        </p:txBody>
+      </p:sp>
+      <p:sp>
+        <p:nvSpPr>
+          <p:cNvPr id="3" name="Content Placeholder 2"/>
+          <p:cNvSpPr>
+            <a:spLocks noGrp="1"/>
+          </p:cNvSpPr>
+          <p:nvPr>
+            <p:ph idx="1"/>
+          </p:nvPr>
+        </p:nvSpPr>
+        <p:spPr/>
+        <p:txBody>
+          <a:bodyPr/>
+          <a:lstStyle/>
+          <a:p>
+            <a:r>
+              <a:rPr lang="en-US" dirty="0" smtClean="0"/>
+              <a:t>NEW_LIST()</a:t>
+            </a:r>
+          </a:p>
+          <a:p>
+            <a:r>
+              <a:rPr lang="en-US" dirty="0" smtClean="0"/>
+              <a:t>LIST.APPEND(value)</a:t>
+            </a:r>
+          </a:p>
+          <a:p>
+            <a:r>
+              <a:rPr lang="en-US" dirty="0" smtClean="0"/>
+              <a:t>LIST.POP()</a:t>
+            </a:r>
+          </a:p>
+          <a:p>
+            <a:r>
+              <a:rPr lang="en-US" dirty="0" smtClean="0"/>
+              <a:t>LIST.IS_EMPTY()</a:t>
+            </a:r>
+            <a:endParaRPr lang="en-US" dirty="0"/>
+          </a:p>
+        </p:txBody>
+      </p:sp>
+      <p:sp>
+        <p:nvSpPr>
+          <p:cNvPr id="4" name="Slide Number Placeholder 3"/>
+          <p:cNvSpPr>
+            <a:spLocks noGrp="1"/>
+          </p:cNvSpPr>
+          <p:nvPr>
+            <p:ph type="sldNum" sz="quarter" idx="12"/>
+          </p:nvPr>
+        </p:nvSpPr>
+        <p:spPr/>
+        <p:txBody>
+          <a:bodyPr/>
+          <a:lstStyle/>
+          <a:p>
+            <a:fld id="{11AD1F4E-1E51-402E-B221-310F004E7D3B}" type="slidenum">
+              <a:rPr lang="en-US" smtClean="0"/>
+              <a:t>16</a:t>
+            </a:fld>
+            <a:endParaRPr lang="en-US"/>
+          </a:p>
+        </p:txBody>
+      </p:sp>
+    </p:spTree>
+    <p:extLst>
+      <p:ext uri="{BB962C8B-B14F-4D97-AF65-F5344CB8AC3E}">
+        <p14:creationId xmlns:p14="http://schemas.microsoft.com/office/powerpoint/2010/main" val="3234860607"/>
+      </p:ext>
+    </p:extLst>
+  </p:cSld>
+  <p:clrMapOvr>
+    <a:masterClrMapping/>
+  </p:clrMapOvr>
+  <p:timing>
+    <p:tnLst>
+      <p:par>
+        <p:cTn id="1" dur="indefinite" restart="never" nodeType="tmRoot"/>
+      </p:par>
+    </p:tnLst>
+  </p:timing>
+</p:sld>
+</file>
+
+<file path=ppt/slides/slide17.xml><?xml version="1.0" encoding="utf-8"?>
+<p:sld xmlns:a="http://schemas.openxmlformats.org/drawingml/2006/main" xmlns:r="http://schemas.openxmlformats.org/officeDocument/2006/relationships" xmlns:p="http://schemas.openxmlformats.org/presentationml/2006/main">
+  <p:cSld>
+    <p:spTree>
+      <p:nvGrpSpPr>
+        <p:cNvPr id="1" name=""/>
+        <p:cNvGrpSpPr/>
+        <p:nvPr/>
+      </p:nvGrpSpPr>
+      <p:grpSpPr>
+        <a:xfrm>
+          <a:off x="0" y="0"/>
+          <a:ext cx="0" cy="0"/>
+          <a:chOff x="0" y="0"/>
+          <a:chExt cx="0" cy="0"/>
+        </a:xfrm>
+      </p:grpSpPr>
+      <p:sp>
+        <p:nvSpPr>
+          <p:cNvPr id="2" name="Title 1"/>
+          <p:cNvSpPr>
+            <a:spLocks noGrp="1"/>
+          </p:cNvSpPr>
+          <p:nvPr>
+            <p:ph type="title"/>
+          </p:nvPr>
+        </p:nvSpPr>
+        <p:spPr/>
+        <p:txBody>
+          <a:bodyPr/>
+          <a:lstStyle/>
+          <a:p>
+            <a:r>
+              <a:rPr lang="en-US" dirty="0" smtClean="0"/>
               <a:t>List examples</a:t>
             </a:r>
             <a:endParaRPr lang="en-US" dirty="0"/>
@@ -4963,7 +5369,7 @@
           <a:p>
             <a:fld id="{11AD1F4E-1E51-402E-B221-310F004E7D3B}" type="slidenum">
               <a:rPr lang="en-US" smtClean="0"/>
-              <a:t>14</a:t>
+              <a:t>17</a:t>
             </a:fld>
             <a:endParaRPr lang="en-US"/>
           </a:p>
@@ -5434,7 +5840,7 @@
 </p:sld>
 </file>
 
-<file path=ppt/slides/slide15.xml><?xml version="1.0" encoding="utf-8"?>
+<file path=ppt/slides/slide18.xml><?xml version="1.0" encoding="utf-8"?>
 <p:sld xmlns:a="http://schemas.openxmlformats.org/drawingml/2006/main" xmlns:r="http://schemas.openxmlformats.org/officeDocument/2006/relationships" xmlns:p="http://schemas.openxmlformats.org/presentationml/2006/main">
   <p:cSld>
     <p:spTree>
@@ -5619,7 +6025,7 @@
             <a:graphicData uri="http://schemas.openxmlformats.org/presentationml/2006/ole">
               <mc:AlternateContent xmlns:mc="http://schemas.openxmlformats.org/markup-compatibility/2006">
                 <mc:Choice xmlns:v="urn:schemas-microsoft-com:vml" Requires="v">
-                  <p:oleObj spid="_x0000_s5136" name="Equation" r:id="rId3" imgW="444240" imgH="203040" progId="Equation.3">
+                  <p:oleObj spid="_x0000_s5138" name="Equation" r:id="rId3" imgW="444240" imgH="203040" progId="Equation.3">
                     <p:embed/>
                   </p:oleObj>
                 </mc:Choice>
@@ -5707,7 +6113,7 @@
           <a:p>
             <a:fld id="{11AD1F4E-1E51-402E-B221-310F004E7D3B}" type="slidenum">
               <a:rPr lang="en-US" smtClean="0"/>
-              <a:t>15</a:t>
+              <a:t>18</a:t>
             </a:fld>
             <a:endParaRPr lang="en-US"/>
           </a:p>
@@ -5733,7 +6139,7 @@
 </p:sld>
 </file>
 
-<file path=ppt/slides/slide16.xml><?xml version="1.0" encoding="utf-8"?>
+<file path=ppt/slides/slide19.xml><?xml version="1.0" encoding="utf-8"?>
 <p:sld xmlns:a="http://schemas.openxmlformats.org/drawingml/2006/main" xmlns:r="http://schemas.openxmlformats.org/officeDocument/2006/relationships" xmlns:p="http://schemas.openxmlformats.org/presentationml/2006/main">
   <p:cSld>
     <p:spTree>
@@ -5767,6 +6173,238 @@
           <a:p>
             <a:r>
               <a:rPr lang="en-US" dirty="0" smtClean="0"/>
+              <a:t>Set ADT</a:t>
+            </a:r>
+            <a:endParaRPr lang="en-US" dirty="0"/>
+          </a:p>
+        </p:txBody>
+      </p:sp>
+      <p:sp>
+        <p:nvSpPr>
+          <p:cNvPr id="3" name="Content Placeholder 2"/>
+          <p:cNvSpPr>
+            <a:spLocks noGrp="1"/>
+          </p:cNvSpPr>
+          <p:nvPr>
+            <p:ph idx="1"/>
+          </p:nvPr>
+        </p:nvSpPr>
+        <p:spPr/>
+        <p:txBody>
+          <a:bodyPr/>
+          <a:lstStyle/>
+          <a:p>
+            <a:r>
+              <a:rPr lang="en-US" dirty="0" smtClean="0"/>
+              <a:t>EMPTY_SET()</a:t>
+            </a:r>
+          </a:p>
+          <a:p>
+            <a:r>
+              <a:rPr lang="en-US" dirty="0" smtClean="0"/>
+              <a:t>SET.ADD(value)</a:t>
+            </a:r>
+          </a:p>
+          <a:p>
+            <a:r>
+              <a:rPr lang="en-US" dirty="0" smtClean="0"/>
+              <a:t>SET.HAS_VALUE(value)</a:t>
+            </a:r>
+          </a:p>
+          <a:p>
+            <a:r>
+              <a:rPr lang="en-US" dirty="0" smtClean="0"/>
+              <a:t>SET.IS_EMPTY()</a:t>
+            </a:r>
+          </a:p>
+          <a:p>
+            <a:r>
+              <a:rPr lang="en-US" smtClean="0"/>
+              <a:t>SET.REMOVE(value)</a:t>
+            </a:r>
+            <a:endParaRPr lang="en-US"/>
+          </a:p>
+        </p:txBody>
+      </p:sp>
+      <p:sp>
+        <p:nvSpPr>
+          <p:cNvPr id="4" name="Slide Number Placeholder 3"/>
+          <p:cNvSpPr>
+            <a:spLocks noGrp="1"/>
+          </p:cNvSpPr>
+          <p:nvPr>
+            <p:ph type="sldNum" sz="quarter" idx="12"/>
+          </p:nvPr>
+        </p:nvSpPr>
+        <p:spPr/>
+        <p:txBody>
+          <a:bodyPr/>
+          <a:lstStyle/>
+          <a:p>
+            <a:fld id="{11AD1F4E-1E51-402E-B221-310F004E7D3B}" type="slidenum">
+              <a:rPr lang="en-US" smtClean="0"/>
+              <a:t>19</a:t>
+            </a:fld>
+            <a:endParaRPr lang="en-US"/>
+          </a:p>
+        </p:txBody>
+      </p:sp>
+    </p:spTree>
+    <p:extLst>
+      <p:ext uri="{BB962C8B-B14F-4D97-AF65-F5344CB8AC3E}">
+        <p14:creationId xmlns:p14="http://schemas.microsoft.com/office/powerpoint/2010/main" val="3557580445"/>
+      </p:ext>
+    </p:extLst>
+  </p:cSld>
+  <p:clrMapOvr>
+    <a:masterClrMapping/>
+  </p:clrMapOvr>
+  <p:timing>
+    <p:tnLst>
+      <p:par>
+        <p:cTn id="1" dur="indefinite" restart="never" nodeType="tmRoot"/>
+      </p:par>
+    </p:tnLst>
+  </p:timing>
+</p:sld>
+</file>
+
+<file path=ppt/slides/slide2.xml><?xml version="1.0" encoding="utf-8"?>
+<p:sld xmlns:a="http://schemas.openxmlformats.org/drawingml/2006/main" xmlns:r="http://schemas.openxmlformats.org/officeDocument/2006/relationships" xmlns:p="http://schemas.openxmlformats.org/presentationml/2006/main">
+  <p:cSld>
+    <p:spTree>
+      <p:nvGrpSpPr>
+        <p:cNvPr id="1" name=""/>
+        <p:cNvGrpSpPr/>
+        <p:nvPr/>
+      </p:nvGrpSpPr>
+      <p:grpSpPr>
+        <a:xfrm>
+          <a:off x="0" y="0"/>
+          <a:ext cx="0" cy="0"/>
+          <a:chOff x="0" y="0"/>
+          <a:chExt cx="0" cy="0"/>
+        </a:xfrm>
+      </p:grpSpPr>
+      <p:sp>
+        <p:nvSpPr>
+          <p:cNvPr id="2" name="Title 1"/>
+          <p:cNvSpPr>
+            <a:spLocks noGrp="1"/>
+          </p:cNvSpPr>
+          <p:nvPr>
+            <p:ph type="title"/>
+          </p:nvPr>
+        </p:nvSpPr>
+        <p:spPr/>
+        <p:txBody>
+          <a:bodyPr/>
+          <a:lstStyle/>
+          <a:p>
+            <a:r>
+              <a:rPr lang="en-US" dirty="0" smtClean="0"/>
+              <a:t>Introduction</a:t>
+            </a:r>
+            <a:endParaRPr lang="en-US" dirty="0"/>
+          </a:p>
+        </p:txBody>
+      </p:sp>
+      <p:sp>
+        <p:nvSpPr>
+          <p:cNvPr id="3" name="Text Placeholder 2"/>
+          <p:cNvSpPr>
+            <a:spLocks noGrp="1"/>
+          </p:cNvSpPr>
+          <p:nvPr>
+            <p:ph type="body" idx="1"/>
+          </p:nvPr>
+        </p:nvSpPr>
+        <p:spPr/>
+        <p:txBody>
+          <a:bodyPr/>
+          <a:lstStyle/>
+          <a:p>
+            <a:endParaRPr lang="en-US"/>
+          </a:p>
+        </p:txBody>
+      </p:sp>
+      <p:sp>
+        <p:nvSpPr>
+          <p:cNvPr id="4" name="Slide Number Placeholder 3"/>
+          <p:cNvSpPr>
+            <a:spLocks noGrp="1"/>
+          </p:cNvSpPr>
+          <p:nvPr>
+            <p:ph type="sldNum" sz="quarter" idx="12"/>
+          </p:nvPr>
+        </p:nvSpPr>
+        <p:spPr/>
+        <p:txBody>
+          <a:bodyPr/>
+          <a:lstStyle/>
+          <a:p>
+            <a:fld id="{11AD1F4E-1E51-402E-B221-310F004E7D3B}" type="slidenum">
+              <a:rPr lang="en-US" smtClean="0"/>
+              <a:t>2</a:t>
+            </a:fld>
+            <a:endParaRPr lang="en-US"/>
+          </a:p>
+        </p:txBody>
+      </p:sp>
+    </p:spTree>
+    <p:extLst>
+      <p:ext uri="{BB962C8B-B14F-4D97-AF65-F5344CB8AC3E}">
+        <p14:creationId xmlns:p14="http://schemas.microsoft.com/office/powerpoint/2010/main" val="33640868"/>
+      </p:ext>
+    </p:extLst>
+  </p:cSld>
+  <p:clrMapOvr>
+    <a:masterClrMapping/>
+  </p:clrMapOvr>
+  <p:timing>
+    <p:tnLst>
+      <p:par>
+        <p:cTn id="1" dur="indefinite" restart="never" nodeType="tmRoot"/>
+      </p:par>
+    </p:tnLst>
+  </p:timing>
+</p:sld>
+</file>
+
+<file path=ppt/slides/slide20.xml><?xml version="1.0" encoding="utf-8"?>
+<p:sld xmlns:a="http://schemas.openxmlformats.org/drawingml/2006/main" xmlns:r="http://schemas.openxmlformats.org/officeDocument/2006/relationships" xmlns:p="http://schemas.openxmlformats.org/presentationml/2006/main">
+  <p:cSld>
+    <p:spTree>
+      <p:nvGrpSpPr>
+        <p:cNvPr id="1" name=""/>
+        <p:cNvGrpSpPr/>
+        <p:nvPr/>
+      </p:nvGrpSpPr>
+      <p:grpSpPr>
+        <a:xfrm>
+          <a:off x="0" y="0"/>
+          <a:ext cx="0" cy="0"/>
+          <a:chOff x="0" y="0"/>
+          <a:chExt cx="0" cy="0"/>
+        </a:xfrm>
+      </p:grpSpPr>
+      <p:sp>
+        <p:nvSpPr>
+          <p:cNvPr id="2" name="Title 1"/>
+          <p:cNvSpPr>
+            <a:spLocks noGrp="1"/>
+          </p:cNvSpPr>
+          <p:nvPr>
+            <p:ph type="title"/>
+          </p:nvPr>
+        </p:nvSpPr>
+        <p:spPr/>
+        <p:txBody>
+          <a:bodyPr/>
+          <a:lstStyle/>
+          <a:p>
+            <a:r>
+              <a:rPr lang="en-US" dirty="0" smtClean="0"/>
               <a:t>Set examples</a:t>
             </a:r>
             <a:endParaRPr lang="en-US" dirty="0"/>
@@ -5790,7 +6428,7 @@
           <a:p>
             <a:fld id="{11AD1F4E-1E51-402E-B221-310F004E7D3B}" type="slidenum">
               <a:rPr lang="en-US" smtClean="0"/>
-              <a:t>16</a:t>
+              <a:t>20</a:t>
             </a:fld>
             <a:endParaRPr lang="en-US"/>
           </a:p>
@@ -6406,7 +7044,7 @@
 </p:sld>
 </file>
 
-<file path=ppt/slides/slide17.xml><?xml version="1.0" encoding="utf-8"?>
+<file path=ppt/slides/slide21.xml><?xml version="1.0" encoding="utf-8"?>
 <p:sld xmlns:a="http://schemas.openxmlformats.org/drawingml/2006/main" xmlns:r="http://schemas.openxmlformats.org/officeDocument/2006/relationships" xmlns:p="http://schemas.openxmlformats.org/presentationml/2006/main">
   <p:cSld>
     <p:spTree>
@@ -6598,7 +7236,7 @@
             <a:graphicData uri="http://schemas.openxmlformats.org/presentationml/2006/ole">
               <mc:AlternateContent xmlns:mc="http://schemas.openxmlformats.org/markup-compatibility/2006">
                 <mc:Choice xmlns:v="urn:schemas-microsoft-com:vml" Requires="v">
-                  <p:oleObj spid="_x0000_s6186" name="Equation" r:id="rId3" imgW="774360" imgH="215640" progId="Equation.3">
+                  <p:oleObj spid="_x0000_s6192" name="Equation" r:id="rId3" imgW="774360" imgH="215640" progId="Equation.3">
                     <p:embed/>
                   </p:oleObj>
                 </mc:Choice>
@@ -6686,7 +7324,7 @@
           <a:p>
             <a:fld id="{11AD1F4E-1E51-402E-B221-310F004E7D3B}" type="slidenum">
               <a:rPr lang="en-US" smtClean="0"/>
-              <a:t>17</a:t>
+              <a:t>21</a:t>
             </a:fld>
             <a:endParaRPr lang="en-US"/>
           </a:p>
@@ -6830,7 +7468,7 @@
             <a:graphicData uri="http://schemas.openxmlformats.org/presentationml/2006/ole">
               <mc:AlternateContent xmlns:mc="http://schemas.openxmlformats.org/markup-compatibility/2006">
                 <mc:Choice xmlns:v="urn:schemas-microsoft-com:vml" Requires="v">
-                  <p:oleObj spid="_x0000_s6187" name="Equation" r:id="rId5" imgW="622080" imgH="215640" progId="Equation.3">
+                  <p:oleObj spid="_x0000_s6193" name="Equation" r:id="rId5" imgW="622080" imgH="215640" progId="Equation.3">
                     <p:embed/>
                   </p:oleObj>
                 </mc:Choice>
@@ -6887,7 +7525,7 @@
             <a:graphicData uri="http://schemas.openxmlformats.org/presentationml/2006/ole">
               <mc:AlternateContent xmlns:mc="http://schemas.openxmlformats.org/markup-compatibility/2006">
                 <mc:Choice xmlns:v="urn:schemas-microsoft-com:vml" Requires="v">
-                  <p:oleObj spid="_x0000_s6188" name="Equation" r:id="rId7" imgW="749160" imgH="215640" progId="Equation.3">
+                  <p:oleObj spid="_x0000_s6194" name="Equation" r:id="rId7" imgW="749160" imgH="215640" progId="Equation.3">
                     <p:embed/>
                   </p:oleObj>
                 </mc:Choice>
@@ -7330,7 +7968,7 @@
 </p:sld>
 </file>
 
-<file path=ppt/slides/slide18.xml><?xml version="1.0" encoding="utf-8"?>
+<file path=ppt/slides/slide22.xml><?xml version="1.0" encoding="utf-8"?>
 <p:sld xmlns:a="http://schemas.openxmlformats.org/drawingml/2006/main" xmlns:r="http://schemas.openxmlformats.org/officeDocument/2006/relationships" xmlns:p="http://schemas.openxmlformats.org/presentationml/2006/main">
   <p:cSld>
     <p:spTree>
@@ -7387,7 +8025,7 @@
           <a:p>
             <a:fld id="{11AD1F4E-1E51-402E-B221-310F004E7D3B}" type="slidenum">
               <a:rPr lang="en-US" smtClean="0"/>
-              <a:t>18</a:t>
+              <a:t>22</a:t>
             </a:fld>
             <a:endParaRPr lang="en-US"/>
           </a:p>
@@ -8086,7 +8724,7 @@
 </p:sld>
 </file>
 
-<file path=ppt/slides/slide19.xml><?xml version="1.0" encoding="utf-8"?>
+<file path=ppt/slides/slide23.xml><?xml version="1.0" encoding="utf-8"?>
 <p:sld xmlns:a="http://schemas.openxmlformats.org/drawingml/2006/main" xmlns:r="http://schemas.openxmlformats.org/officeDocument/2006/relationships" xmlns:p="http://schemas.openxmlformats.org/presentationml/2006/main">
   <p:cSld>
     <p:spTree>
@@ -8162,7 +8800,7 @@
           <a:p>
             <a:fld id="{11AD1F4E-1E51-402E-B221-310F004E7D3B}" type="slidenum">
               <a:rPr lang="en-US" smtClean="0"/>
-              <a:t>19</a:t>
+              <a:t>23</a:t>
             </a:fld>
             <a:endParaRPr lang="en-US"/>
           </a:p>
@@ -8188,7 +8826,7 @@
 </p:sld>
 </file>
 
-<file path=ppt/slides/slide2.xml><?xml version="1.0" encoding="utf-8"?>
+<file path=ppt/slides/slide24.xml><?xml version="1.0" encoding="utf-8"?>
 <p:sld xmlns:a="http://schemas.openxmlformats.org/drawingml/2006/main" xmlns:r="http://schemas.openxmlformats.org/officeDocument/2006/relationships" xmlns:p="http://schemas.openxmlformats.org/presentationml/2006/main">
   <p:cSld>
     <p:spTree>
@@ -8222,108 +8860,6 @@
           <a:p>
             <a:r>
               <a:rPr lang="en-US" dirty="0" smtClean="0"/>
-              <a:t>Introduction</a:t>
-            </a:r>
-            <a:endParaRPr lang="en-US" dirty="0"/>
-          </a:p>
-        </p:txBody>
-      </p:sp>
-      <p:sp>
-        <p:nvSpPr>
-          <p:cNvPr id="3" name="Text Placeholder 2"/>
-          <p:cNvSpPr>
-            <a:spLocks noGrp="1"/>
-          </p:cNvSpPr>
-          <p:nvPr>
-            <p:ph type="body" idx="1"/>
-          </p:nvPr>
-        </p:nvSpPr>
-        <p:spPr/>
-        <p:txBody>
-          <a:bodyPr/>
-          <a:lstStyle/>
-          <a:p>
-            <a:endParaRPr lang="en-US"/>
-          </a:p>
-        </p:txBody>
-      </p:sp>
-      <p:sp>
-        <p:nvSpPr>
-          <p:cNvPr id="4" name="Slide Number Placeholder 3"/>
-          <p:cNvSpPr>
-            <a:spLocks noGrp="1"/>
-          </p:cNvSpPr>
-          <p:nvPr>
-            <p:ph type="sldNum" sz="quarter" idx="12"/>
-          </p:nvPr>
-        </p:nvSpPr>
-        <p:spPr/>
-        <p:txBody>
-          <a:bodyPr/>
-          <a:lstStyle/>
-          <a:p>
-            <a:fld id="{11AD1F4E-1E51-402E-B221-310F004E7D3B}" type="slidenum">
-              <a:rPr lang="en-US" smtClean="0"/>
-              <a:t>2</a:t>
-            </a:fld>
-            <a:endParaRPr lang="en-US"/>
-          </a:p>
-        </p:txBody>
-      </p:sp>
-    </p:spTree>
-    <p:extLst>
-      <p:ext uri="{BB962C8B-B14F-4D97-AF65-F5344CB8AC3E}">
-        <p14:creationId xmlns:p14="http://schemas.microsoft.com/office/powerpoint/2010/main" val="33640868"/>
-      </p:ext>
-    </p:extLst>
-  </p:cSld>
-  <p:clrMapOvr>
-    <a:masterClrMapping/>
-  </p:clrMapOvr>
-  <p:timing>
-    <p:tnLst>
-      <p:par>
-        <p:cTn id="1" dur="indefinite" restart="never" nodeType="tmRoot"/>
-      </p:par>
-    </p:tnLst>
-  </p:timing>
-</p:sld>
-</file>
-
-<file path=ppt/slides/slide20.xml><?xml version="1.0" encoding="utf-8"?>
-<p:sld xmlns:a="http://schemas.openxmlformats.org/drawingml/2006/main" xmlns:r="http://schemas.openxmlformats.org/officeDocument/2006/relationships" xmlns:p="http://schemas.openxmlformats.org/presentationml/2006/main">
-  <p:cSld>
-    <p:spTree>
-      <p:nvGrpSpPr>
-        <p:cNvPr id="1" name=""/>
-        <p:cNvGrpSpPr/>
-        <p:nvPr/>
-      </p:nvGrpSpPr>
-      <p:grpSpPr>
-        <a:xfrm>
-          <a:off x="0" y="0"/>
-          <a:ext cx="0" cy="0"/>
-          <a:chOff x="0" y="0"/>
-          <a:chExt cx="0" cy="0"/>
-        </a:xfrm>
-      </p:grpSpPr>
-      <p:sp>
-        <p:nvSpPr>
-          <p:cNvPr id="2" name="Title 1"/>
-          <p:cNvSpPr>
-            <a:spLocks noGrp="1"/>
-          </p:cNvSpPr>
-          <p:nvPr>
-            <p:ph type="title"/>
-          </p:nvPr>
-        </p:nvSpPr>
-        <p:spPr/>
-        <p:txBody>
-          <a:bodyPr/>
-          <a:lstStyle/>
-          <a:p>
-            <a:r>
-              <a:rPr lang="en-US" dirty="0" smtClean="0"/>
               <a:t>Stack</a:t>
             </a:r>
             <a:endParaRPr lang="en-US" dirty="0"/>
@@ -8356,13 +8892,8 @@
             <a:pPr lvl="1"/>
             <a:r>
               <a:rPr lang="en-US" dirty="0" smtClean="0"/>
-              <a:t>access: </a:t>
-            </a:r>
-            <a:r>
-              <a:rPr lang="en-US" dirty="0" smtClean="0"/>
-              <a:t>only top</a:t>
-            </a:r>
-            <a:endParaRPr lang="en-US" dirty="0" smtClean="0"/>
+              <a:t>access: only top</a:t>
+            </a:r>
           </a:p>
           <a:p>
             <a:pPr lvl="1"/>
@@ -8384,19 +8915,13 @@
               <a:rPr lang="en-US" dirty="0" smtClean="0"/>
               <a:t>push/peek/pull: O(1)</a:t>
             </a:r>
-            <a:endParaRPr lang="en-US" dirty="0" smtClean="0"/>
           </a:p>
           <a:p>
             <a:pPr lvl="1"/>
             <a:r>
               <a:rPr lang="en-US" dirty="0" smtClean="0"/>
-              <a:t>element type: </a:t>
-            </a:r>
-            <a:r>
-              <a:rPr lang="en-US" dirty="0" smtClean="0"/>
-              <a:t>any</a:t>
-            </a:r>
-            <a:endParaRPr lang="en-US" dirty="0" smtClean="0"/>
+              <a:t>element type: any</a:t>
+            </a:r>
           </a:p>
           <a:p>
             <a:r>
@@ -8410,7 +8935,6 @@
               <a:rPr lang="en-US" dirty="0" smtClean="0"/>
               <a:t>as list</a:t>
             </a:r>
-            <a:endParaRPr lang="en-US" dirty="0" smtClean="0"/>
           </a:p>
           <a:p>
             <a:pPr lvl="1"/>
@@ -8435,7 +8959,7 @@
           <a:p>
             <a:fld id="{11AD1F4E-1E51-402E-B221-310F004E7D3B}" type="slidenum">
               <a:rPr lang="en-US" smtClean="0"/>
-              <a:t>20</a:t>
+              <a:t>24</a:t>
             </a:fld>
             <a:endParaRPr lang="en-US"/>
           </a:p>
@@ -9616,7 +10140,7 @@
           <a:graphicData uri="http://schemas.openxmlformats.org/presentationml/2006/ole">
             <mc:AlternateContent xmlns:mc="http://schemas.openxmlformats.org/markup-compatibility/2006">
               <mc:Choice xmlns:v="urn:schemas-microsoft-com:vml" Requires="v">
-                <p:oleObj spid="_x0000_s1051" name="Equation" r:id="rId4" imgW="1841400" imgH="215640" progId="Equation.3">
+                <p:oleObj spid="_x0000_s1053" name="Equation" r:id="rId4" imgW="1841400" imgH="215640" progId="Equation.3">
                   <p:embed/>
                 </p:oleObj>
               </mc:Choice>
@@ -10233,7 +10757,7 @@
             <a:graphicData uri="http://schemas.openxmlformats.org/presentationml/2006/ole">
               <mc:AlternateContent xmlns:mc="http://schemas.openxmlformats.org/markup-compatibility/2006">
                 <mc:Choice xmlns:v="urn:schemas-microsoft-com:vml" Requires="v">
-                  <p:oleObj spid="_x0000_s2071" name="Equation" r:id="rId3" imgW="1358640" imgH="203040" progId="Equation.3">
+                  <p:oleObj spid="_x0000_s2073" name="Equation" r:id="rId3" imgW="1358640" imgH="203040" progId="Equation.3">
                     <p:embed/>
                   </p:oleObj>
                 </mc:Choice>

</xml_diff>

<commit_message>
Fixed typo in ADT
</commit_message>
<xml_diff>
--- a/DataStructures/data_structures.pptx
+++ b/DataStructures/data_structures.pptx
@@ -4107,7 +4107,7 @@
             <a:graphicData uri="http://schemas.openxmlformats.org/presentationml/2006/ole">
               <mc:AlternateContent xmlns:mc="http://schemas.openxmlformats.org/markup-compatibility/2006">
                 <mc:Choice xmlns:v="urn:schemas-microsoft-com:vml" Requires="v">
-                  <p:oleObj spid="_x0000_s3096" name="Equation" r:id="rId3" imgW="1091880" imgH="228600" progId="Equation.3">
+                  <p:oleObj spid="_x0000_s3098" name="Equation" r:id="rId3" imgW="1091880" imgH="228600" progId="Equation.3">
                     <p:embed/>
                   </p:oleObj>
                 </mc:Choice>
@@ -5074,7 +5074,7 @@
             <a:graphicData uri="http://schemas.openxmlformats.org/presentationml/2006/ole">
               <mc:AlternateContent xmlns:mc="http://schemas.openxmlformats.org/markup-compatibility/2006">
                 <mc:Choice xmlns:v="urn:schemas-microsoft-com:vml" Requires="v">
-                  <p:oleObj spid="_x0000_s4115" name="Equation" r:id="rId3" imgW="419040" imgH="241200" progId="Equation.3">
+                  <p:oleObj spid="_x0000_s4117" name="Equation" r:id="rId3" imgW="419040" imgH="241200" progId="Equation.3">
                     <p:embed/>
                   </p:oleObj>
                 </mc:Choice>
@@ -6025,7 +6025,7 @@
             <a:graphicData uri="http://schemas.openxmlformats.org/presentationml/2006/ole">
               <mc:AlternateContent xmlns:mc="http://schemas.openxmlformats.org/markup-compatibility/2006">
                 <mc:Choice xmlns:v="urn:schemas-microsoft-com:vml" Requires="v">
-                  <p:oleObj spid="_x0000_s5138" name="Equation" r:id="rId3" imgW="444240" imgH="203040" progId="Equation.3">
+                  <p:oleObj spid="_x0000_s5140" name="Equation" r:id="rId3" imgW="444240" imgH="203040" progId="Equation.3">
                     <p:embed/>
                   </p:oleObj>
                 </mc:Choice>
@@ -6219,10 +6219,10 @@
           </a:p>
           <a:p>
             <a:r>
-              <a:rPr lang="en-US" smtClean="0"/>
+              <a:rPr lang="en-US" dirty="0" smtClean="0"/>
               <a:t>SET.REMOVE(value)</a:t>
             </a:r>
-            <a:endParaRPr lang="en-US"/>
+            <a:endParaRPr lang="en-US" dirty="0"/>
           </a:p>
         </p:txBody>
       </p:sp>
@@ -7236,7 +7236,7 @@
             <a:graphicData uri="http://schemas.openxmlformats.org/presentationml/2006/ole">
               <mc:AlternateContent xmlns:mc="http://schemas.openxmlformats.org/markup-compatibility/2006">
                 <mc:Choice xmlns:v="urn:schemas-microsoft-com:vml" Requires="v">
-                  <p:oleObj spid="_x0000_s6192" name="Equation" r:id="rId3" imgW="774360" imgH="215640" progId="Equation.3">
+                  <p:oleObj spid="_x0000_s6198" name="Equation" r:id="rId3" imgW="774360" imgH="215640" progId="Equation.3">
                     <p:embed/>
                   </p:oleObj>
                 </mc:Choice>
@@ -7468,7 +7468,7 @@
             <a:graphicData uri="http://schemas.openxmlformats.org/presentationml/2006/ole">
               <mc:AlternateContent xmlns:mc="http://schemas.openxmlformats.org/markup-compatibility/2006">
                 <mc:Choice xmlns:v="urn:schemas-microsoft-com:vml" Requires="v">
-                  <p:oleObj spid="_x0000_s6193" name="Equation" r:id="rId5" imgW="622080" imgH="215640" progId="Equation.3">
+                  <p:oleObj spid="_x0000_s6199" name="Equation" r:id="rId5" imgW="622080" imgH="215640" progId="Equation.3">
                     <p:embed/>
                   </p:oleObj>
                 </mc:Choice>
@@ -7525,7 +7525,7 @@
             <a:graphicData uri="http://schemas.openxmlformats.org/presentationml/2006/ole">
               <mc:AlternateContent xmlns:mc="http://schemas.openxmlformats.org/markup-compatibility/2006">
                 <mc:Choice xmlns:v="urn:schemas-microsoft-com:vml" Requires="v">
-                  <p:oleObj spid="_x0000_s6194" name="Equation" r:id="rId7" imgW="749160" imgH="215640" progId="Equation.3">
+                  <p:oleObj spid="_x0000_s6200" name="Equation" r:id="rId7" imgW="749160" imgH="215640" progId="Equation.3">
                     <p:embed/>
                   </p:oleObj>
                 </mc:Choice>
@@ -10140,7 +10140,7 @@
           <a:graphicData uri="http://schemas.openxmlformats.org/presentationml/2006/ole">
             <mc:AlternateContent xmlns:mc="http://schemas.openxmlformats.org/markup-compatibility/2006">
               <mc:Choice xmlns:v="urn:schemas-microsoft-com:vml" Requires="v">
-                <p:oleObj spid="_x0000_s1053" name="Equation" r:id="rId4" imgW="1841400" imgH="215640" progId="Equation.3">
+                <p:oleObj spid="_x0000_s1055" name="Equation" r:id="rId4" imgW="1841400" imgH="215640" progId="Equation.3">
                   <p:embed/>
                 </p:oleObj>
               </mc:Choice>
@@ -10757,7 +10757,7 @@
             <a:graphicData uri="http://schemas.openxmlformats.org/presentationml/2006/ole">
               <mc:AlternateContent xmlns:mc="http://schemas.openxmlformats.org/markup-compatibility/2006">
                 <mc:Choice xmlns:v="urn:schemas-microsoft-com:vml" Requires="v">
-                  <p:oleObj spid="_x0000_s2073" name="Equation" r:id="rId3" imgW="1358640" imgH="203040" progId="Equation.3">
+                  <p:oleObj spid="_x0000_s2075" name="Equation" r:id="rId3" imgW="1358640" imgH="203040" progId="Equation.3">
                     <p:embed/>
                   </p:oleObj>
                 </mc:Choice>

</xml_diff>

<commit_message>
Added sttack and queue slides
</commit_message>
<xml_diff>
--- a/DataStructures/data_structures.pptx
+++ b/DataStructures/data_structures.pptx
@@ -5,7 +5,7 @@
     <p:sldMasterId id="2147483660" r:id="rId1"/>
   </p:sldMasterIdLst>
   <p:notesMasterIdLst>
-    <p:notesMasterId r:id="rId26"/>
+    <p:notesMasterId r:id="rId32"/>
   </p:notesMasterIdLst>
   <p:sldIdLst>
     <p:sldId id="256" r:id="rId2"/>
@@ -29,9 +29,15 @@
     <p:sldId id="279" r:id="rId20"/>
     <p:sldId id="271" r:id="rId21"/>
     <p:sldId id="264" r:id="rId22"/>
-    <p:sldId id="272" r:id="rId23"/>
-    <p:sldId id="273" r:id="rId24"/>
-    <p:sldId id="275" r:id="rId25"/>
+    <p:sldId id="280" r:id="rId23"/>
+    <p:sldId id="272" r:id="rId24"/>
+    <p:sldId id="273" r:id="rId25"/>
+    <p:sldId id="275" r:id="rId26"/>
+    <p:sldId id="281" r:id="rId27"/>
+    <p:sldId id="282" r:id="rId28"/>
+    <p:sldId id="284" r:id="rId29"/>
+    <p:sldId id="283" r:id="rId30"/>
+    <p:sldId id="285" r:id="rId31"/>
   </p:sldIdLst>
   <p:sldSz cx="9144000" cy="6858000" type="screen4x3"/>
   <p:notesSz cx="6858000" cy="9144000"/>
@@ -563,6 +569,90 @@
     <p:extLst>
       <p:ext uri="{BB962C8B-B14F-4D97-AF65-F5344CB8AC3E}">
         <p14:creationId xmlns:p14="http://schemas.microsoft.com/office/powerpoint/2010/main" val="667436049"/>
+      </p:ext>
+    </p:extLst>
+  </p:cSld>
+  <p:clrMapOvr>
+    <a:masterClrMapping/>
+  </p:clrMapOvr>
+</p:notes>
+</file>
+
+<file path=ppt/notesSlides/notesSlide2.xml><?xml version="1.0" encoding="utf-8"?>
+<p:notes xmlns:a="http://schemas.openxmlformats.org/drawingml/2006/main" xmlns:r="http://schemas.openxmlformats.org/officeDocument/2006/relationships" xmlns:p="http://schemas.openxmlformats.org/presentationml/2006/main">
+  <p:cSld>
+    <p:spTree>
+      <p:nvGrpSpPr>
+        <p:cNvPr id="1" name=""/>
+        <p:cNvGrpSpPr/>
+        <p:nvPr/>
+      </p:nvGrpSpPr>
+      <p:grpSpPr>
+        <a:xfrm>
+          <a:off x="0" y="0"/>
+          <a:ext cx="0" cy="0"/>
+          <a:chOff x="0" y="0"/>
+          <a:chExt cx="0" cy="0"/>
+        </a:xfrm>
+      </p:grpSpPr>
+      <p:sp>
+        <p:nvSpPr>
+          <p:cNvPr id="2" name="Slide Image Placeholder 1"/>
+          <p:cNvSpPr>
+            <a:spLocks noGrp="1" noRot="1" noChangeAspect="1"/>
+          </p:cNvSpPr>
+          <p:nvPr>
+            <p:ph type="sldImg"/>
+          </p:nvPr>
+        </p:nvSpPr>
+        <p:spPr/>
+      </p:sp>
+      <p:sp>
+        <p:nvSpPr>
+          <p:cNvPr id="3" name="Notes Placeholder 2"/>
+          <p:cNvSpPr>
+            <a:spLocks noGrp="1"/>
+          </p:cNvSpPr>
+          <p:nvPr>
+            <p:ph type="body" idx="1"/>
+          </p:nvPr>
+        </p:nvSpPr>
+        <p:spPr/>
+        <p:txBody>
+          <a:bodyPr/>
+          <a:lstStyle/>
+          <a:p>
+            <a:endParaRPr lang="en-US" dirty="0"/>
+          </a:p>
+        </p:txBody>
+      </p:sp>
+      <p:sp>
+        <p:nvSpPr>
+          <p:cNvPr id="4" name="Slide Number Placeholder 3"/>
+          <p:cNvSpPr>
+            <a:spLocks noGrp="1"/>
+          </p:cNvSpPr>
+          <p:nvPr>
+            <p:ph type="sldNum" sz="quarter" idx="10"/>
+          </p:nvPr>
+        </p:nvSpPr>
+        <p:spPr/>
+        <p:txBody>
+          <a:bodyPr/>
+          <a:lstStyle/>
+          <a:p>
+            <a:fld id="{377ED49E-3B52-4D1C-85F4-C21F07234187}" type="slidenum">
+              <a:rPr lang="en-US" smtClean="0"/>
+              <a:t>22</a:t>
+            </a:fld>
+            <a:endParaRPr lang="en-US"/>
+          </a:p>
+        </p:txBody>
+      </p:sp>
+    </p:spTree>
+    <p:extLst>
+      <p:ext uri="{BB962C8B-B14F-4D97-AF65-F5344CB8AC3E}">
+        <p14:creationId xmlns:p14="http://schemas.microsoft.com/office/powerpoint/2010/main" val="2313221006"/>
       </p:ext>
     </p:extLst>
   </p:cSld>
@@ -3647,8 +3737,25 @@
           <a:p>
             <a:r>
               <a:rPr lang="en-US" dirty="0" smtClean="0"/>
-              <a:t>EMPTY_ARRAY(length)</a:t>
-            </a:r>
+              <a:t>EMPTY_ARRAY(length</a:t>
+            </a:r>
+            <a:r>
+              <a:rPr lang="en-US" dirty="0"/>
+              <a:t>) </a:t>
+            </a:r>
+            <a:r>
+              <a:rPr lang="en-US" dirty="0">
+                <a:sym typeface="Symbol" panose="05050102010706020507" pitchFamily="18" charset="2"/>
+              </a:rPr>
+              <a:t> </a:t>
+            </a:r>
+            <a:r>
+              <a:rPr lang="en-US" dirty="0" smtClean="0">
+                <a:sym typeface="Symbol" panose="05050102010706020507" pitchFamily="18" charset="2"/>
+              </a:rPr>
+              <a:t>array</a:t>
+            </a:r>
+            <a:endParaRPr lang="en-US" dirty="0" smtClean="0"/>
           </a:p>
           <a:p>
             <a:r>
@@ -3659,13 +3766,36 @@
           <a:p>
             <a:r>
               <a:rPr lang="en-US" dirty="0" smtClean="0"/>
-              <a:t>ARRAY.GET(index)</a:t>
-            </a:r>
-          </a:p>
-          <a:p>
-            <a:r>
-              <a:rPr lang="en-US" dirty="0" smtClean="0"/>
-              <a:t>ARRAY.LENGTH</a:t>
+              <a:t>ARRAY.GET(index</a:t>
+            </a:r>
+            <a:r>
+              <a:rPr lang="en-US" dirty="0"/>
+              <a:t>) </a:t>
+            </a:r>
+            <a:r>
+              <a:rPr lang="en-US" dirty="0">
+                <a:sym typeface="Symbol" panose="05050102010706020507" pitchFamily="18" charset="2"/>
+              </a:rPr>
+              <a:t> value</a:t>
+            </a:r>
+            <a:endParaRPr lang="en-US" dirty="0" smtClean="0"/>
+          </a:p>
+          <a:p>
+            <a:r>
+              <a:rPr lang="en-US" dirty="0"/>
+              <a:t>ARRAY.LENGTH </a:t>
+            </a:r>
+            <a:r>
+              <a:rPr lang="en-US" dirty="0">
+                <a:sym typeface="Symbol" panose="05050102010706020507" pitchFamily="18" charset="2"/>
+              </a:rPr>
+              <a:t> </a:t>
+            </a:r>
+            <a:r>
+              <a:rPr lang="en-US" dirty="0" smtClean="0">
+                <a:sym typeface="Symbol" panose="05050102010706020507" pitchFamily="18" charset="2"/>
+              </a:rPr>
+              <a:t>length</a:t>
             </a:r>
             <a:endParaRPr lang="en-US" dirty="0"/>
           </a:p>
@@ -4107,7 +4237,7 @@
             <a:graphicData uri="http://schemas.openxmlformats.org/presentationml/2006/ole">
               <mc:AlternateContent xmlns:mc="http://schemas.openxmlformats.org/markup-compatibility/2006">
                 <mc:Choice xmlns:v="urn:schemas-microsoft-com:vml" Requires="v">
-                  <p:oleObj spid="_x0000_s3098" name="Equation" r:id="rId3" imgW="1091880" imgH="228600" progId="Equation.3">
+                  <p:oleObj spid="_x0000_s3100" name="Equation" r:id="rId3" imgW="1091880" imgH="228600" progId="Equation.3">
                     <p:embed/>
                   </p:oleObj>
                 </mc:Choice>
@@ -4317,15 +4447,39 @@
               <a:t>d</a:t>
             </a:r>
             <a:r>
-              <a:rPr lang="en-US" dirty="0" smtClean="0"/>
-              <a:t>)</a:t>
-            </a:r>
-          </a:p>
-          <a:p>
-            <a:r>
-              <a:rPr lang="en-US" dirty="0" smtClean="0"/>
-              <a:t>TUPLE.GET(key)</a:t>
-            </a:r>
+              <a:rPr lang="en-US" dirty="0"/>
+              <a:t>) </a:t>
+            </a:r>
+            <a:r>
+              <a:rPr lang="en-US" dirty="0">
+                <a:sym typeface="Symbol" panose="05050102010706020507" pitchFamily="18" charset="2"/>
+              </a:rPr>
+              <a:t> </a:t>
+            </a:r>
+            <a:r>
+              <a:rPr lang="en-US" dirty="0" smtClean="0">
+                <a:sym typeface="Symbol" panose="05050102010706020507" pitchFamily="18" charset="2"/>
+              </a:rPr>
+              <a:t>tuple</a:t>
+            </a:r>
+            <a:endParaRPr lang="en-US" dirty="0" smtClean="0"/>
+          </a:p>
+          <a:p>
+            <a:r>
+              <a:rPr lang="en-US" dirty="0" smtClean="0"/>
+              <a:t>TUPLE.GET(key</a:t>
+            </a:r>
+            <a:r>
+              <a:rPr lang="en-US" dirty="0" smtClean="0"/>
+              <a:t>) </a:t>
+            </a:r>
+            <a:r>
+              <a:rPr lang="en-US" dirty="0" smtClean="0">
+                <a:sym typeface="Symbol" panose="05050102010706020507" pitchFamily="18" charset="2"/>
+              </a:rPr>
+              <a:t> value</a:t>
+            </a:r>
+            <a:endParaRPr lang="en-US" dirty="0" smtClean="0"/>
           </a:p>
           <a:p>
             <a:r>
@@ -5074,7 +5228,7 @@
             <a:graphicData uri="http://schemas.openxmlformats.org/presentationml/2006/ole">
               <mc:AlternateContent xmlns:mc="http://schemas.openxmlformats.org/markup-compatibility/2006">
                 <mc:Choice xmlns:v="urn:schemas-microsoft-com:vml" Requires="v">
-                  <p:oleObj spid="_x0000_s4117" name="Equation" r:id="rId3" imgW="419040" imgH="241200" progId="Equation.3">
+                  <p:oleObj spid="_x0000_s4119" name="Equation" r:id="rId3" imgW="419040" imgH="241200" progId="Equation.3">
                     <p:embed/>
                   </p:oleObj>
                 </mc:Choice>
@@ -5240,30 +5394,105 @@
         </p:nvSpPr>
         <p:spPr/>
         <p:txBody>
-          <a:bodyPr/>
-          <a:lstStyle/>
-          <a:p>
-            <a:r>
-              <a:rPr lang="en-US" dirty="0" smtClean="0"/>
-              <a:t>NEW_LIST()</a:t>
-            </a:r>
-          </a:p>
-          <a:p>
-            <a:r>
-              <a:rPr lang="en-US" dirty="0" smtClean="0"/>
-              <a:t>LIST.APPEND(value)</a:t>
-            </a:r>
-          </a:p>
-          <a:p>
-            <a:r>
-              <a:rPr lang="en-US" dirty="0" smtClean="0"/>
-              <a:t>LIST.POP()</a:t>
-            </a:r>
-          </a:p>
-          <a:p>
-            <a:r>
-              <a:rPr lang="en-US" dirty="0" smtClean="0"/>
-              <a:t>LIST.IS_EMPTY()</a:t>
+          <a:bodyPr>
+            <a:normAutofit/>
+          </a:bodyPr>
+          <a:lstStyle/>
+          <a:p>
+            <a:r>
+              <a:rPr lang="en-US" dirty="0"/>
+              <a:t>NEW_LIST() </a:t>
+            </a:r>
+            <a:r>
+              <a:rPr lang="en-US" dirty="0">
+                <a:sym typeface="Symbol" panose="05050102010706020507" pitchFamily="18" charset="2"/>
+              </a:rPr>
+              <a:t> </a:t>
+            </a:r>
+            <a:r>
+              <a:rPr lang="en-US" dirty="0" smtClean="0">
+                <a:sym typeface="Symbol" panose="05050102010706020507" pitchFamily="18" charset="2"/>
+              </a:rPr>
+              <a:t>list</a:t>
+            </a:r>
+            <a:endParaRPr lang="en-US" dirty="0" smtClean="0"/>
+          </a:p>
+          <a:p>
+            <a:r>
+              <a:rPr lang="en-US" dirty="0" smtClean="0"/>
+              <a:t>LIST.INSERT(index, value)</a:t>
+            </a:r>
+            <a:endParaRPr lang="en-US" dirty="0" smtClean="0"/>
+          </a:p>
+          <a:p>
+            <a:r>
+              <a:rPr lang="en-US" dirty="0" smtClean="0"/>
+              <a:t>LIST.GET(index)</a:t>
+            </a:r>
+            <a:r>
+              <a:rPr lang="en-US" dirty="0"/>
+              <a:t> </a:t>
+            </a:r>
+            <a:r>
+              <a:rPr lang="en-US" dirty="0">
+                <a:sym typeface="Symbol" panose="05050102010706020507" pitchFamily="18" charset="2"/>
+              </a:rPr>
+              <a:t> </a:t>
+            </a:r>
+            <a:r>
+              <a:rPr lang="en-US" dirty="0" smtClean="0">
+                <a:sym typeface="Symbol" panose="05050102010706020507" pitchFamily="18" charset="2"/>
+              </a:rPr>
+              <a:t>value</a:t>
+            </a:r>
+          </a:p>
+          <a:p>
+            <a:r>
+              <a:rPr lang="en-US" dirty="0" smtClean="0">
+                <a:sym typeface="Symbol" panose="05050102010706020507" pitchFamily="18" charset="2"/>
+              </a:rPr>
+              <a:t>LIST.SET(index, value)</a:t>
+            </a:r>
+            <a:endParaRPr lang="en-US" dirty="0" smtClean="0"/>
+          </a:p>
+          <a:p>
+            <a:r>
+              <a:rPr lang="en-US" dirty="0" smtClean="0"/>
+              <a:t>LIST.IS_EMPTY</a:t>
+            </a:r>
+            <a:r>
+              <a:rPr lang="en-US" dirty="0"/>
+              <a:t>() </a:t>
+            </a:r>
+            <a:r>
+              <a:rPr lang="en-US" dirty="0" smtClean="0">
+                <a:sym typeface="Symbol" panose="05050102010706020507" pitchFamily="18" charset="2"/>
+              </a:rPr>
+              <a:t> Boolean</a:t>
+            </a:r>
+          </a:p>
+          <a:p>
+            <a:r>
+              <a:rPr lang="en-US" dirty="0" smtClean="0">
+                <a:sym typeface="Symbol" panose="05050102010706020507" pitchFamily="18" charset="2"/>
+              </a:rPr>
+              <a:t>LIST.LENGTH()</a:t>
+            </a:r>
+            <a:r>
+              <a:rPr lang="en-US" dirty="0" smtClean="0"/>
+              <a:t> </a:t>
+            </a:r>
+            <a:r>
+              <a:rPr lang="en-US" dirty="0">
+                <a:sym typeface="Symbol" panose="05050102010706020507" pitchFamily="18" charset="2"/>
+              </a:rPr>
+              <a:t> </a:t>
+            </a:r>
+            <a:r>
+              <a:rPr lang="en-US" dirty="0" smtClean="0">
+                <a:sym typeface="Symbol" panose="05050102010706020507" pitchFamily="18" charset="2"/>
+              </a:rPr>
+              <a:t>length</a:t>
             </a:r>
             <a:endParaRPr lang="en-US" dirty="0"/>
           </a:p>
@@ -6025,7 +6254,7 @@
             <a:graphicData uri="http://schemas.openxmlformats.org/presentationml/2006/ole">
               <mc:AlternateContent xmlns:mc="http://schemas.openxmlformats.org/markup-compatibility/2006">
                 <mc:Choice xmlns:v="urn:schemas-microsoft-com:vml" Requires="v">
-                  <p:oleObj spid="_x0000_s5140" name="Equation" r:id="rId3" imgW="444240" imgH="203040" progId="Equation.3">
+                  <p:oleObj spid="_x0000_s5142" name="Equation" r:id="rId3" imgW="444240" imgH="203040" progId="Equation.3">
                     <p:embed/>
                   </p:oleObj>
                 </mc:Choice>
@@ -6196,8 +6425,25 @@
           <a:p>
             <a:r>
               <a:rPr lang="en-US" dirty="0" smtClean="0"/>
-              <a:t>EMPTY_SET()</a:t>
-            </a:r>
+              <a:t>EMPTY_SET</a:t>
+            </a:r>
+            <a:r>
+              <a:rPr lang="en-US" dirty="0"/>
+              <a:t>() </a:t>
+            </a:r>
+            <a:r>
+              <a:rPr lang="en-US" dirty="0">
+                <a:sym typeface="Symbol" panose="05050102010706020507" pitchFamily="18" charset="2"/>
+              </a:rPr>
+              <a:t> </a:t>
+            </a:r>
+            <a:r>
+              <a:rPr lang="en-US" dirty="0" smtClean="0">
+                <a:sym typeface="Symbol" panose="05050102010706020507" pitchFamily="18" charset="2"/>
+              </a:rPr>
+              <a:t>set</a:t>
+            </a:r>
+            <a:endParaRPr lang="en-US" dirty="0" smtClean="0"/>
           </a:p>
           <a:p>
             <a:r>
@@ -6208,19 +6454,75 @@
           <a:p>
             <a:r>
               <a:rPr lang="en-US" dirty="0" smtClean="0"/>
-              <a:t>SET.HAS_VALUE(value)</a:t>
-            </a:r>
-          </a:p>
-          <a:p>
-            <a:r>
-              <a:rPr lang="en-US" dirty="0" smtClean="0"/>
-              <a:t>SET.IS_EMPTY()</a:t>
-            </a:r>
-          </a:p>
-          <a:p>
-            <a:r>
-              <a:rPr lang="en-US" dirty="0" smtClean="0"/>
-              <a:t>SET.REMOVE(value)</a:t>
+              <a:t>SET.HAS_VALUE(value</a:t>
+            </a:r>
+            <a:r>
+              <a:rPr lang="en-US" dirty="0"/>
+              <a:t>) </a:t>
+            </a:r>
+            <a:r>
+              <a:rPr lang="en-US" dirty="0">
+                <a:sym typeface="Symbol" panose="05050102010706020507" pitchFamily="18" charset="2"/>
+              </a:rPr>
+              <a:t> </a:t>
+            </a:r>
+            <a:r>
+              <a:rPr lang="en-US" dirty="0" err="1" smtClean="0">
+                <a:sym typeface="Symbol" panose="05050102010706020507" pitchFamily="18" charset="2"/>
+              </a:rPr>
+              <a:t>boolean</a:t>
+            </a:r>
+            <a:endParaRPr lang="en-US" dirty="0" smtClean="0"/>
+          </a:p>
+          <a:p>
+            <a:r>
+              <a:rPr lang="en-US" dirty="0" smtClean="0"/>
+              <a:t>SET.IS_EMPTY</a:t>
+            </a:r>
+            <a:r>
+              <a:rPr lang="en-US" dirty="0"/>
+              <a:t>() </a:t>
+            </a:r>
+            <a:r>
+              <a:rPr lang="en-US" dirty="0">
+                <a:sym typeface="Symbol" panose="05050102010706020507" pitchFamily="18" charset="2"/>
+              </a:rPr>
+              <a:t> </a:t>
+            </a:r>
+            <a:r>
+              <a:rPr lang="en-US" dirty="0" err="1" smtClean="0">
+                <a:sym typeface="Symbol" panose="05050102010706020507" pitchFamily="18" charset="2"/>
+              </a:rPr>
+              <a:t>boolean</a:t>
+            </a:r>
+            <a:endParaRPr lang="en-US" dirty="0" smtClean="0"/>
+          </a:p>
+          <a:p>
+            <a:r>
+              <a:rPr lang="en-US" dirty="0" smtClean="0"/>
+              <a:t>SET.REMOVE(value</a:t>
+            </a:r>
+            <a:r>
+              <a:rPr lang="en-US" dirty="0" smtClean="0"/>
+              <a:t>)</a:t>
+            </a:r>
+          </a:p>
+          <a:p>
+            <a:r>
+              <a:rPr lang="en-US" dirty="0" smtClean="0"/>
+              <a:t>SET.SIZE() </a:t>
+            </a:r>
+            <a:r>
+              <a:rPr lang="en-US" dirty="0">
+                <a:sym typeface="Symbol" panose="05050102010706020507" pitchFamily="18" charset="2"/>
+              </a:rPr>
+              <a:t> </a:t>
+            </a:r>
+            <a:r>
+              <a:rPr lang="en-US" dirty="0" smtClean="0">
+                <a:sym typeface="Symbol" panose="05050102010706020507" pitchFamily="18" charset="2"/>
+              </a:rPr>
+              <a:t>size</a:t>
             </a:r>
             <a:endParaRPr lang="en-US" dirty="0"/>
           </a:p>
@@ -7236,7 +7538,7 @@
             <a:graphicData uri="http://schemas.openxmlformats.org/presentationml/2006/ole">
               <mc:AlternateContent xmlns:mc="http://schemas.openxmlformats.org/markup-compatibility/2006">
                 <mc:Choice xmlns:v="urn:schemas-microsoft-com:vml" Requires="v">
-                  <p:oleObj spid="_x0000_s6198" name="Equation" r:id="rId3" imgW="774360" imgH="215640" progId="Equation.3">
+                  <p:oleObj spid="_x0000_s6204" name="Equation" r:id="rId3" imgW="774360" imgH="215640" progId="Equation.3">
                     <p:embed/>
                   </p:oleObj>
                 </mc:Choice>
@@ -7468,7 +7770,7 @@
             <a:graphicData uri="http://schemas.openxmlformats.org/presentationml/2006/ole">
               <mc:AlternateContent xmlns:mc="http://schemas.openxmlformats.org/markup-compatibility/2006">
                 <mc:Choice xmlns:v="urn:schemas-microsoft-com:vml" Requires="v">
-                  <p:oleObj spid="_x0000_s6199" name="Equation" r:id="rId5" imgW="622080" imgH="215640" progId="Equation.3">
+                  <p:oleObj spid="_x0000_s6205" name="Equation" r:id="rId5" imgW="622080" imgH="215640" progId="Equation.3">
                     <p:embed/>
                   </p:oleObj>
                 </mc:Choice>
@@ -7525,7 +7827,7 @@
             <a:graphicData uri="http://schemas.openxmlformats.org/presentationml/2006/ole">
               <mc:AlternateContent xmlns:mc="http://schemas.openxmlformats.org/markup-compatibility/2006">
                 <mc:Choice xmlns:v="urn:schemas-microsoft-com:vml" Requires="v">
-                  <p:oleObj spid="_x0000_s6200" name="Equation" r:id="rId7" imgW="749160" imgH="215640" progId="Equation.3">
+                  <p:oleObj spid="_x0000_s6206" name="Equation" r:id="rId7" imgW="749160" imgH="215640" progId="Equation.3">
                     <p:embed/>
                   </p:oleObj>
                 </mc:Choice>
@@ -8002,7 +8304,161 @@
           <a:p>
             <a:r>
               <a:rPr lang="en-US" dirty="0" smtClean="0"/>
-              <a:t>Dictionary examples</a:t>
+              <a:t>Dictionary ADT</a:t>
+            </a:r>
+            <a:endParaRPr lang="en-US" dirty="0"/>
+          </a:p>
+        </p:txBody>
+      </p:sp>
+      <p:sp>
+        <p:nvSpPr>
+          <p:cNvPr id="3" name="Content Placeholder 2"/>
+          <p:cNvSpPr>
+            <a:spLocks noGrp="1"/>
+          </p:cNvSpPr>
+          <p:nvPr>
+            <p:ph idx="1"/>
+          </p:nvPr>
+        </p:nvSpPr>
+        <p:spPr/>
+        <p:txBody>
+          <a:bodyPr/>
+          <a:lstStyle/>
+          <a:p>
+            <a:r>
+              <a:rPr lang="en-US" dirty="0" smtClean="0"/>
+              <a:t>EMPTY_DICT()</a:t>
+            </a:r>
+            <a:r>
+              <a:rPr lang="en-US" dirty="0"/>
+              <a:t> </a:t>
+            </a:r>
+            <a:r>
+              <a:rPr lang="en-US" dirty="0">
+                <a:sym typeface="Symbol" panose="05050102010706020507" pitchFamily="18" charset="2"/>
+              </a:rPr>
+              <a:t> </a:t>
+            </a:r>
+            <a:r>
+              <a:rPr lang="en-US" dirty="0" smtClean="0">
+                <a:sym typeface="Symbol" panose="05050102010706020507" pitchFamily="18" charset="2"/>
+              </a:rPr>
+              <a:t>dictionary</a:t>
+            </a:r>
+          </a:p>
+          <a:p>
+            <a:r>
+              <a:rPr lang="en-US" dirty="0" smtClean="0">
+                <a:sym typeface="Symbol" panose="05050102010706020507" pitchFamily="18" charset="2"/>
+              </a:rPr>
+              <a:t>DICT.SET(key, value)</a:t>
+            </a:r>
+          </a:p>
+          <a:p>
+            <a:r>
+              <a:rPr lang="en-US" dirty="0" smtClean="0">
+                <a:sym typeface="Symbol" panose="05050102010706020507" pitchFamily="18" charset="2"/>
+              </a:rPr>
+              <a:t>DICT.HAS_KEY(key)</a:t>
+            </a:r>
+            <a:r>
+              <a:rPr lang="en-US" dirty="0"/>
+              <a:t> </a:t>
+            </a:r>
+            <a:r>
+              <a:rPr lang="en-US" dirty="0">
+                <a:sym typeface="Symbol" panose="05050102010706020507" pitchFamily="18" charset="2"/>
+              </a:rPr>
+              <a:t> </a:t>
+            </a:r>
+            <a:r>
+              <a:rPr lang="en-US" dirty="0" smtClean="0">
+                <a:sym typeface="Symbol" panose="05050102010706020507" pitchFamily="18" charset="2"/>
+              </a:rPr>
+              <a:t>Boolean</a:t>
+            </a:r>
+          </a:p>
+          <a:p>
+            <a:r>
+              <a:rPr lang="en-US" dirty="0" smtClean="0">
+                <a:sym typeface="Symbol" panose="05050102010706020507" pitchFamily="18" charset="2"/>
+              </a:rPr>
+              <a:t>DICT.GET(key)</a:t>
+            </a:r>
+            <a:r>
+              <a:rPr lang="en-US" dirty="0"/>
+              <a:t> </a:t>
+            </a:r>
+            <a:r>
+              <a:rPr lang="en-US" dirty="0">
+                <a:sym typeface="Symbol" panose="05050102010706020507" pitchFamily="18" charset="2"/>
+              </a:rPr>
+              <a:t> </a:t>
+            </a:r>
+            <a:r>
+              <a:rPr lang="en-US" dirty="0" smtClean="0">
+                <a:sym typeface="Symbol" panose="05050102010706020507" pitchFamily="18" charset="2"/>
+              </a:rPr>
+              <a:t>value if DICT.HAS_KEY(key)</a:t>
+            </a:r>
+          </a:p>
+          <a:p>
+            <a:r>
+              <a:rPr lang="en-US" dirty="0" smtClean="0">
+                <a:sym typeface="Symbol" panose="05050102010706020507" pitchFamily="18" charset="2"/>
+              </a:rPr>
+              <a:t>DICT.REMOVE(key)</a:t>
+            </a:r>
+          </a:p>
+          <a:p>
+            <a:r>
+              <a:rPr lang="en-US" dirty="0" smtClean="0">
+                <a:sym typeface="Symbol" panose="05050102010706020507" pitchFamily="18" charset="2"/>
+              </a:rPr>
+              <a:t>DICT.IS_EMPTY()</a:t>
+            </a:r>
+            <a:r>
+              <a:rPr lang="en-US" dirty="0"/>
+              <a:t> </a:t>
+            </a:r>
+            <a:r>
+              <a:rPr lang="en-US" dirty="0">
+                <a:sym typeface="Symbol" panose="05050102010706020507" pitchFamily="18" charset="2"/>
+              </a:rPr>
+              <a:t> </a:t>
+            </a:r>
+            <a:r>
+              <a:rPr lang="en-US" dirty="0" err="1" smtClean="0">
+                <a:sym typeface="Symbol" panose="05050102010706020507" pitchFamily="18" charset="2"/>
+              </a:rPr>
+              <a:t>boolean</a:t>
+            </a:r>
+            <a:endParaRPr lang="en-US" dirty="0" smtClean="0">
+              <a:sym typeface="Symbol" panose="05050102010706020507" pitchFamily="18" charset="2"/>
+            </a:endParaRPr>
+          </a:p>
+          <a:p>
+            <a:r>
+              <a:rPr lang="en-US" dirty="0" smtClean="0">
+                <a:sym typeface="Symbol" panose="05050102010706020507" pitchFamily="18" charset="2"/>
+              </a:rPr>
+              <a:t>DICT.SIZE()</a:t>
+            </a:r>
+            <a:r>
+              <a:rPr lang="en-US" dirty="0" smtClean="0"/>
+              <a:t> </a:t>
+            </a:r>
+            <a:r>
+              <a:rPr lang="en-US" dirty="0">
+                <a:sym typeface="Symbol" panose="05050102010706020507" pitchFamily="18" charset="2"/>
+              </a:rPr>
+              <a:t> </a:t>
+            </a:r>
+            <a:r>
+              <a:rPr lang="en-US" dirty="0" smtClean="0">
+                <a:sym typeface="Symbol" panose="05050102010706020507" pitchFamily="18" charset="2"/>
+              </a:rPr>
+              <a:t>size</a:t>
             </a:r>
             <a:endParaRPr lang="en-US" dirty="0"/>
           </a:p>
@@ -8031,683 +8487,10 @@
           </a:p>
         </p:txBody>
       </p:sp>
-      <p:sp>
-        <p:nvSpPr>
-          <p:cNvPr id="5" name="TextBox 4"/>
-          <p:cNvSpPr txBox="1"/>
-          <p:nvPr/>
-        </p:nvSpPr>
-        <p:spPr>
-          <a:xfrm>
-            <a:off x="124691" y="1579414"/>
-            <a:ext cx="8842665" cy="2862322"/>
-          </a:xfrm>
-          <a:prstGeom prst="rect">
-            <a:avLst/>
-          </a:prstGeom>
-          <a:solidFill>
-            <a:schemeClr val="tx2">
-              <a:lumMod val="40000"/>
-              <a:lumOff val="60000"/>
-            </a:schemeClr>
-          </a:solidFill>
-          <a:ln>
-            <a:solidFill>
-              <a:schemeClr val="tx1"/>
-            </a:solidFill>
-          </a:ln>
-        </p:spPr>
-        <p:txBody>
-          <a:bodyPr wrap="square" rtlCol="0">
-            <a:spAutoFit/>
-          </a:bodyPr>
-          <a:lstStyle/>
-          <a:p>
-            <a:r>
-              <a:rPr lang="en-US" dirty="0" smtClean="0">
-                <a:latin typeface="Courier New" panose="02070309020205020404" pitchFamily="49" charset="0"/>
-                <a:cs typeface="Courier New" panose="02070309020205020404" pitchFamily="49" charset="0"/>
-              </a:rPr>
-              <a:t>…</a:t>
-            </a:r>
-          </a:p>
-          <a:p>
-            <a:r>
-              <a:rPr lang="en-US" dirty="0" smtClean="0">
-                <a:latin typeface="Courier New" panose="02070309020205020404" pitchFamily="49" charset="0"/>
-                <a:cs typeface="Courier New" panose="02070309020205020404" pitchFamily="49" charset="0"/>
-              </a:rPr>
-              <a:t>#</a:t>
-            </a:r>
-            <a:r>
-              <a:rPr lang="en-US" dirty="0">
-                <a:latin typeface="Courier New" panose="02070309020205020404" pitchFamily="49" charset="0"/>
-                <a:cs typeface="Courier New" panose="02070309020205020404" pitchFamily="49" charset="0"/>
-              </a:rPr>
-              <a:t>include </a:t>
-            </a:r>
-            <a:r>
-              <a:rPr lang="en-US" dirty="0" smtClean="0">
-                <a:latin typeface="Courier New" panose="02070309020205020404" pitchFamily="49" charset="0"/>
-                <a:cs typeface="Courier New" panose="02070309020205020404" pitchFamily="49" charset="0"/>
-              </a:rPr>
-              <a:t>&lt;</a:t>
-            </a:r>
-            <a:r>
-              <a:rPr lang="en-US" dirty="0" err="1" smtClean="0">
-                <a:latin typeface="Courier New" panose="02070309020205020404" pitchFamily="49" charset="0"/>
-                <a:cs typeface="Courier New" panose="02070309020205020404" pitchFamily="49" charset="0"/>
-              </a:rPr>
-              <a:t>unordered_map</a:t>
-            </a:r>
-            <a:r>
-              <a:rPr lang="en-US" dirty="0">
-                <a:latin typeface="Courier New" panose="02070309020205020404" pitchFamily="49" charset="0"/>
-                <a:cs typeface="Courier New" panose="02070309020205020404" pitchFamily="49" charset="0"/>
-              </a:rPr>
-              <a:t>&gt;</a:t>
-            </a:r>
-          </a:p>
-          <a:p>
-            <a:r>
-              <a:rPr lang="en-US" dirty="0">
-                <a:latin typeface="Courier New" panose="02070309020205020404" pitchFamily="49" charset="0"/>
-                <a:cs typeface="Courier New" panose="02070309020205020404" pitchFamily="49" charset="0"/>
-              </a:rPr>
-              <a:t>#include &lt;string&gt;</a:t>
-            </a:r>
-          </a:p>
-          <a:p>
-            <a:r>
-              <a:rPr lang="en-US" dirty="0" err="1" smtClean="0">
-                <a:latin typeface="Courier New" panose="02070309020205020404" pitchFamily="49" charset="0"/>
-                <a:cs typeface="Courier New" panose="02070309020205020404" pitchFamily="49" charset="0"/>
-              </a:rPr>
-              <a:t>std</a:t>
-            </a:r>
-            <a:r>
-              <a:rPr lang="en-US" dirty="0">
-                <a:latin typeface="Courier New" panose="02070309020205020404" pitchFamily="49" charset="0"/>
-                <a:cs typeface="Courier New" panose="02070309020205020404" pitchFamily="49" charset="0"/>
-              </a:rPr>
-              <a:t>::list&lt;</a:t>
-            </a:r>
-            <a:r>
-              <a:rPr lang="en-US" dirty="0" err="1">
-                <a:latin typeface="Courier New" panose="02070309020205020404" pitchFamily="49" charset="0"/>
-                <a:cs typeface="Courier New" panose="02070309020205020404" pitchFamily="49" charset="0"/>
-              </a:rPr>
-              <a:t>std</a:t>
-            </a:r>
-            <a:r>
-              <a:rPr lang="en-US" dirty="0">
-                <a:latin typeface="Courier New" panose="02070309020205020404" pitchFamily="49" charset="0"/>
-                <a:cs typeface="Courier New" panose="02070309020205020404" pitchFamily="49" charset="0"/>
-              </a:rPr>
-              <a:t>::string&gt; keys = {"a", "b", "c"};</a:t>
-            </a:r>
-          </a:p>
-          <a:p>
-            <a:r>
-              <a:rPr lang="en-US" dirty="0" err="1" smtClean="0">
-                <a:latin typeface="Courier New" panose="02070309020205020404" pitchFamily="49" charset="0"/>
-                <a:cs typeface="Courier New" panose="02070309020205020404" pitchFamily="49" charset="0"/>
-              </a:rPr>
-              <a:t>std</a:t>
-            </a:r>
-            <a:r>
-              <a:rPr lang="en-US" dirty="0" smtClean="0">
-                <a:latin typeface="Courier New" panose="02070309020205020404" pitchFamily="49" charset="0"/>
-                <a:cs typeface="Courier New" panose="02070309020205020404" pitchFamily="49" charset="0"/>
-              </a:rPr>
-              <a:t>::</a:t>
-            </a:r>
-            <a:r>
-              <a:rPr lang="en-US" dirty="0" err="1" smtClean="0">
-                <a:latin typeface="Courier New" panose="02070309020205020404" pitchFamily="49" charset="0"/>
-                <a:cs typeface="Courier New" panose="02070309020205020404" pitchFamily="49" charset="0"/>
-              </a:rPr>
-              <a:t>unordered_map</a:t>
-            </a:r>
-            <a:r>
-              <a:rPr lang="en-US" dirty="0" smtClean="0">
-                <a:latin typeface="Courier New" panose="02070309020205020404" pitchFamily="49" charset="0"/>
-                <a:cs typeface="Courier New" panose="02070309020205020404" pitchFamily="49" charset="0"/>
-              </a:rPr>
-              <a:t>&lt;</a:t>
-            </a:r>
-            <a:r>
-              <a:rPr lang="en-US" dirty="0" err="1" smtClean="0">
-                <a:latin typeface="Courier New" panose="02070309020205020404" pitchFamily="49" charset="0"/>
-                <a:cs typeface="Courier New" panose="02070309020205020404" pitchFamily="49" charset="0"/>
-              </a:rPr>
-              <a:t>std</a:t>
-            </a:r>
-            <a:r>
-              <a:rPr lang="en-US" dirty="0">
-                <a:latin typeface="Courier New" panose="02070309020205020404" pitchFamily="49" charset="0"/>
-                <a:cs typeface="Courier New" panose="02070309020205020404" pitchFamily="49" charset="0"/>
-              </a:rPr>
-              <a:t>::string, </a:t>
-            </a:r>
-            <a:r>
-              <a:rPr lang="en-US" dirty="0" err="1">
-                <a:latin typeface="Courier New" panose="02070309020205020404" pitchFamily="49" charset="0"/>
-                <a:cs typeface="Courier New" panose="02070309020205020404" pitchFamily="49" charset="0"/>
-              </a:rPr>
-              <a:t>int</a:t>
-            </a:r>
-            <a:r>
-              <a:rPr lang="en-US" dirty="0">
-                <a:latin typeface="Courier New" panose="02070309020205020404" pitchFamily="49" charset="0"/>
-                <a:cs typeface="Courier New" panose="02070309020205020404" pitchFamily="49" charset="0"/>
-              </a:rPr>
-              <a:t>&gt; </a:t>
-            </a:r>
-            <a:r>
-              <a:rPr lang="en-US" dirty="0" smtClean="0">
-                <a:latin typeface="Courier New" panose="02070309020205020404" pitchFamily="49" charset="0"/>
-                <a:cs typeface="Courier New" panose="02070309020205020404" pitchFamily="49" charset="0"/>
-              </a:rPr>
-              <a:t>m;</a:t>
-            </a:r>
-            <a:endParaRPr lang="en-US" dirty="0">
-              <a:latin typeface="Courier New" panose="02070309020205020404" pitchFamily="49" charset="0"/>
-              <a:cs typeface="Courier New" panose="02070309020205020404" pitchFamily="49" charset="0"/>
-            </a:endParaRPr>
-          </a:p>
-          <a:p>
-            <a:r>
-              <a:rPr lang="en-US" dirty="0" err="1" smtClean="0">
-                <a:latin typeface="Courier New" panose="02070309020205020404" pitchFamily="49" charset="0"/>
-                <a:cs typeface="Courier New" panose="02070309020205020404" pitchFamily="49" charset="0"/>
-              </a:rPr>
-              <a:t>int</a:t>
-            </a:r>
-            <a:r>
-              <a:rPr lang="en-US" dirty="0" smtClean="0">
-                <a:latin typeface="Courier New" panose="02070309020205020404" pitchFamily="49" charset="0"/>
-                <a:cs typeface="Courier New" panose="02070309020205020404" pitchFamily="49" charset="0"/>
-              </a:rPr>
-              <a:t> </a:t>
-            </a:r>
-            <a:r>
-              <a:rPr lang="en-US" dirty="0" err="1">
-                <a:latin typeface="Courier New" panose="02070309020205020404" pitchFamily="49" charset="0"/>
-                <a:cs typeface="Courier New" panose="02070309020205020404" pitchFamily="49" charset="0"/>
-              </a:rPr>
-              <a:t>i</a:t>
-            </a:r>
-            <a:r>
-              <a:rPr lang="en-US" dirty="0">
-                <a:latin typeface="Courier New" panose="02070309020205020404" pitchFamily="49" charset="0"/>
-                <a:cs typeface="Courier New" panose="02070309020205020404" pitchFamily="49" charset="0"/>
-              </a:rPr>
-              <a:t> = 0;</a:t>
-            </a:r>
-          </a:p>
-          <a:p>
-            <a:r>
-              <a:rPr lang="en-US" dirty="0" smtClean="0">
-                <a:latin typeface="Courier New" panose="02070309020205020404" pitchFamily="49" charset="0"/>
-                <a:cs typeface="Courier New" panose="02070309020205020404" pitchFamily="49" charset="0"/>
-              </a:rPr>
-              <a:t>for </a:t>
-            </a:r>
-            <a:r>
-              <a:rPr lang="en-US" dirty="0">
-                <a:latin typeface="Courier New" panose="02070309020205020404" pitchFamily="49" charset="0"/>
-                <a:cs typeface="Courier New" panose="02070309020205020404" pitchFamily="49" charset="0"/>
-              </a:rPr>
-              <a:t>(auto </a:t>
-            </a:r>
-            <a:r>
-              <a:rPr lang="en-US" dirty="0" smtClean="0">
-                <a:latin typeface="Courier New" panose="02070309020205020404" pitchFamily="49" charset="0"/>
-                <a:cs typeface="Courier New" panose="02070309020205020404" pitchFamily="49" charset="0"/>
-              </a:rPr>
-              <a:t>it </a:t>
-            </a:r>
-            <a:r>
-              <a:rPr lang="en-US" dirty="0">
-                <a:latin typeface="Courier New" panose="02070309020205020404" pitchFamily="49" charset="0"/>
-                <a:cs typeface="Courier New" panose="02070309020205020404" pitchFamily="49" charset="0"/>
-              </a:rPr>
-              <a:t>= </a:t>
-            </a:r>
-            <a:r>
-              <a:rPr lang="en-US" dirty="0" err="1">
-                <a:latin typeface="Courier New" panose="02070309020205020404" pitchFamily="49" charset="0"/>
-                <a:cs typeface="Courier New" panose="02070309020205020404" pitchFamily="49" charset="0"/>
-              </a:rPr>
-              <a:t>keys.begin</a:t>
-            </a:r>
-            <a:r>
-              <a:rPr lang="en-US" dirty="0">
-                <a:latin typeface="Courier New" panose="02070309020205020404" pitchFamily="49" charset="0"/>
-                <a:cs typeface="Courier New" panose="02070309020205020404" pitchFamily="49" charset="0"/>
-              </a:rPr>
-              <a:t>(); </a:t>
-            </a:r>
-            <a:r>
-              <a:rPr lang="en-US" dirty="0" smtClean="0">
-                <a:latin typeface="Courier New" panose="02070309020205020404" pitchFamily="49" charset="0"/>
-                <a:cs typeface="Courier New" panose="02070309020205020404" pitchFamily="49" charset="0"/>
-              </a:rPr>
-              <a:t>it </a:t>
-            </a:r>
-            <a:r>
-              <a:rPr lang="en-US" dirty="0">
-                <a:latin typeface="Courier New" panose="02070309020205020404" pitchFamily="49" charset="0"/>
-                <a:cs typeface="Courier New" panose="02070309020205020404" pitchFamily="49" charset="0"/>
-              </a:rPr>
-              <a:t>!= </a:t>
-            </a:r>
-            <a:r>
-              <a:rPr lang="en-US" dirty="0" err="1">
-                <a:latin typeface="Courier New" panose="02070309020205020404" pitchFamily="49" charset="0"/>
-                <a:cs typeface="Courier New" panose="02070309020205020404" pitchFamily="49" charset="0"/>
-              </a:rPr>
-              <a:t>keys.end</a:t>
-            </a:r>
-            <a:r>
-              <a:rPr lang="en-US" dirty="0">
-                <a:latin typeface="Courier New" panose="02070309020205020404" pitchFamily="49" charset="0"/>
-                <a:cs typeface="Courier New" panose="02070309020205020404" pitchFamily="49" charset="0"/>
-              </a:rPr>
-              <a:t>(); </a:t>
-            </a:r>
-            <a:r>
-              <a:rPr lang="en-US" dirty="0" smtClean="0">
-                <a:latin typeface="Courier New" panose="02070309020205020404" pitchFamily="49" charset="0"/>
-                <a:cs typeface="Courier New" panose="02070309020205020404" pitchFamily="49" charset="0"/>
-              </a:rPr>
-              <a:t>it++)</a:t>
-            </a:r>
-            <a:endParaRPr lang="en-US" dirty="0">
-              <a:latin typeface="Courier New" panose="02070309020205020404" pitchFamily="49" charset="0"/>
-              <a:cs typeface="Courier New" panose="02070309020205020404" pitchFamily="49" charset="0"/>
-            </a:endParaRPr>
-          </a:p>
-          <a:p>
-            <a:r>
-              <a:rPr lang="en-US" dirty="0">
-                <a:latin typeface="Courier New" panose="02070309020205020404" pitchFamily="49" charset="0"/>
-                <a:cs typeface="Courier New" panose="02070309020205020404" pitchFamily="49" charset="0"/>
-              </a:rPr>
-              <a:t>    </a:t>
-            </a:r>
-            <a:r>
-              <a:rPr lang="en-US" dirty="0" smtClean="0">
-                <a:latin typeface="Courier New" panose="02070309020205020404" pitchFamily="49" charset="0"/>
-                <a:cs typeface="Courier New" panose="02070309020205020404" pitchFamily="49" charset="0"/>
-              </a:rPr>
-              <a:t>m[*it] </a:t>
-            </a:r>
-            <a:r>
-              <a:rPr lang="en-US" dirty="0">
-                <a:latin typeface="Courier New" panose="02070309020205020404" pitchFamily="49" charset="0"/>
-                <a:cs typeface="Courier New" panose="02070309020205020404" pitchFamily="49" charset="0"/>
-              </a:rPr>
-              <a:t>= ++</a:t>
-            </a:r>
-            <a:r>
-              <a:rPr lang="en-US" dirty="0" err="1">
-                <a:latin typeface="Courier New" panose="02070309020205020404" pitchFamily="49" charset="0"/>
-                <a:cs typeface="Courier New" panose="02070309020205020404" pitchFamily="49" charset="0"/>
-              </a:rPr>
-              <a:t>i</a:t>
-            </a:r>
-            <a:r>
-              <a:rPr lang="en-US" dirty="0">
-                <a:latin typeface="Courier New" panose="02070309020205020404" pitchFamily="49" charset="0"/>
-                <a:cs typeface="Courier New" panose="02070309020205020404" pitchFamily="49" charset="0"/>
-              </a:rPr>
-              <a:t>;</a:t>
-            </a:r>
-          </a:p>
-          <a:p>
-            <a:r>
-              <a:rPr lang="en-US" dirty="0" smtClean="0">
-                <a:latin typeface="Courier New" panose="02070309020205020404" pitchFamily="49" charset="0"/>
-                <a:cs typeface="Courier New" panose="02070309020205020404" pitchFamily="49" charset="0"/>
-              </a:rPr>
-              <a:t>for </a:t>
-            </a:r>
-            <a:r>
-              <a:rPr lang="en-US" dirty="0">
-                <a:latin typeface="Courier New" panose="02070309020205020404" pitchFamily="49" charset="0"/>
-                <a:cs typeface="Courier New" panose="02070309020205020404" pitchFamily="49" charset="0"/>
-              </a:rPr>
-              <a:t>(auto </a:t>
-            </a:r>
-            <a:r>
-              <a:rPr lang="en-US" dirty="0" smtClean="0">
-                <a:latin typeface="Courier New" panose="02070309020205020404" pitchFamily="49" charset="0"/>
-                <a:cs typeface="Courier New" panose="02070309020205020404" pitchFamily="49" charset="0"/>
-              </a:rPr>
-              <a:t>it </a:t>
-            </a:r>
-            <a:r>
-              <a:rPr lang="en-US" dirty="0">
-                <a:latin typeface="Courier New" panose="02070309020205020404" pitchFamily="49" charset="0"/>
-                <a:cs typeface="Courier New" panose="02070309020205020404" pitchFamily="49" charset="0"/>
-              </a:rPr>
-              <a:t>= </a:t>
-            </a:r>
-            <a:r>
-              <a:rPr lang="en-US" dirty="0" smtClean="0">
-                <a:latin typeface="Courier New" panose="02070309020205020404" pitchFamily="49" charset="0"/>
-                <a:cs typeface="Courier New" panose="02070309020205020404" pitchFamily="49" charset="0"/>
-              </a:rPr>
-              <a:t>m(); it </a:t>
-            </a:r>
-            <a:r>
-              <a:rPr lang="en-US" dirty="0">
-                <a:latin typeface="Courier New" panose="02070309020205020404" pitchFamily="49" charset="0"/>
-                <a:cs typeface="Courier New" panose="02070309020205020404" pitchFamily="49" charset="0"/>
-              </a:rPr>
-              <a:t>!= </a:t>
-            </a:r>
-            <a:r>
-              <a:rPr lang="en-US" dirty="0" smtClean="0">
-                <a:latin typeface="Courier New" panose="02070309020205020404" pitchFamily="49" charset="0"/>
-                <a:cs typeface="Courier New" panose="02070309020205020404" pitchFamily="49" charset="0"/>
-              </a:rPr>
-              <a:t>m(); it++)</a:t>
-            </a:r>
-            <a:endParaRPr lang="en-US" dirty="0">
-              <a:latin typeface="Courier New" panose="02070309020205020404" pitchFamily="49" charset="0"/>
-              <a:cs typeface="Courier New" panose="02070309020205020404" pitchFamily="49" charset="0"/>
-            </a:endParaRPr>
-          </a:p>
-          <a:p>
-            <a:r>
-              <a:rPr lang="en-US" dirty="0" smtClean="0">
-                <a:latin typeface="Courier New" panose="02070309020205020404" pitchFamily="49" charset="0"/>
-                <a:cs typeface="Courier New" panose="02070309020205020404" pitchFamily="49" charset="0"/>
-              </a:rPr>
-              <a:t>    </a:t>
-            </a:r>
-            <a:r>
-              <a:rPr lang="en-US" dirty="0" err="1">
-                <a:latin typeface="Courier New" panose="02070309020205020404" pitchFamily="49" charset="0"/>
-                <a:cs typeface="Courier New" panose="02070309020205020404" pitchFamily="49" charset="0"/>
-              </a:rPr>
-              <a:t>std</a:t>
-            </a:r>
-            <a:r>
-              <a:rPr lang="en-US" dirty="0">
-                <a:latin typeface="Courier New" panose="02070309020205020404" pitchFamily="49" charset="0"/>
-                <a:cs typeface="Courier New" panose="02070309020205020404" pitchFamily="49" charset="0"/>
-              </a:rPr>
-              <a:t>::</a:t>
-            </a:r>
-            <a:r>
-              <a:rPr lang="en-US" dirty="0" err="1">
-                <a:latin typeface="Courier New" panose="02070309020205020404" pitchFamily="49" charset="0"/>
-                <a:cs typeface="Courier New" panose="02070309020205020404" pitchFamily="49" charset="0"/>
-              </a:rPr>
-              <a:t>cout</a:t>
-            </a:r>
-            <a:r>
-              <a:rPr lang="en-US" dirty="0">
-                <a:latin typeface="Courier New" panose="02070309020205020404" pitchFamily="49" charset="0"/>
-                <a:cs typeface="Courier New" panose="02070309020205020404" pitchFamily="49" charset="0"/>
-              </a:rPr>
-              <a:t> &lt;&lt; </a:t>
-            </a:r>
-            <a:r>
-              <a:rPr lang="en-US" dirty="0" smtClean="0">
-                <a:latin typeface="Courier New" panose="02070309020205020404" pitchFamily="49" charset="0"/>
-                <a:cs typeface="Courier New" panose="02070309020205020404" pitchFamily="49" charset="0"/>
-              </a:rPr>
-              <a:t>it-</a:t>
-            </a:r>
-            <a:r>
-              <a:rPr lang="en-US" dirty="0">
-                <a:latin typeface="Courier New" panose="02070309020205020404" pitchFamily="49" charset="0"/>
-                <a:cs typeface="Courier New" panose="02070309020205020404" pitchFamily="49" charset="0"/>
-              </a:rPr>
-              <a:t>&gt;first &lt;&lt; </a:t>
-            </a:r>
-            <a:r>
-              <a:rPr lang="en-US" dirty="0" smtClean="0">
-                <a:latin typeface="Courier New" panose="02070309020205020404" pitchFamily="49" charset="0"/>
-                <a:cs typeface="Courier New" panose="02070309020205020404" pitchFamily="49" charset="0"/>
-              </a:rPr>
-              <a:t>"-&gt;" </a:t>
-            </a:r>
-            <a:r>
-              <a:rPr lang="en-US" dirty="0">
-                <a:latin typeface="Courier New" panose="02070309020205020404" pitchFamily="49" charset="0"/>
-                <a:cs typeface="Courier New" panose="02070309020205020404" pitchFamily="49" charset="0"/>
-              </a:rPr>
-              <a:t>&lt;&lt; </a:t>
-            </a:r>
-            <a:r>
-              <a:rPr lang="en-US" dirty="0" smtClean="0">
-                <a:latin typeface="Courier New" panose="02070309020205020404" pitchFamily="49" charset="0"/>
-                <a:cs typeface="Courier New" panose="02070309020205020404" pitchFamily="49" charset="0"/>
-              </a:rPr>
-              <a:t>it-</a:t>
-            </a:r>
-            <a:r>
-              <a:rPr lang="en-US" dirty="0">
-                <a:latin typeface="Courier New" panose="02070309020205020404" pitchFamily="49" charset="0"/>
-                <a:cs typeface="Courier New" panose="02070309020205020404" pitchFamily="49" charset="0"/>
-              </a:rPr>
-              <a:t>&gt;</a:t>
-            </a:r>
-            <a:r>
-              <a:rPr lang="en-US" dirty="0" smtClean="0">
-                <a:latin typeface="Courier New" panose="02070309020205020404" pitchFamily="49" charset="0"/>
-                <a:cs typeface="Courier New" panose="02070309020205020404" pitchFamily="49" charset="0"/>
-              </a:rPr>
-              <a:t>second &lt;&lt; </a:t>
-            </a:r>
-            <a:r>
-              <a:rPr lang="en-US" dirty="0" err="1" smtClean="0">
-                <a:latin typeface="Courier New" panose="02070309020205020404" pitchFamily="49" charset="0"/>
-                <a:cs typeface="Courier New" panose="02070309020205020404" pitchFamily="49" charset="0"/>
-              </a:rPr>
-              <a:t>std</a:t>
-            </a:r>
-            <a:r>
-              <a:rPr lang="en-US" dirty="0">
-                <a:latin typeface="Courier New" panose="02070309020205020404" pitchFamily="49" charset="0"/>
-                <a:cs typeface="Courier New" panose="02070309020205020404" pitchFamily="49" charset="0"/>
-              </a:rPr>
-              <a:t>::</a:t>
-            </a:r>
-            <a:r>
-              <a:rPr lang="en-US" dirty="0" err="1">
-                <a:latin typeface="Courier New" panose="02070309020205020404" pitchFamily="49" charset="0"/>
-                <a:cs typeface="Courier New" panose="02070309020205020404" pitchFamily="49" charset="0"/>
-              </a:rPr>
-              <a:t>endl</a:t>
-            </a:r>
-            <a:r>
-              <a:rPr lang="en-US" dirty="0">
-                <a:latin typeface="Courier New" panose="02070309020205020404" pitchFamily="49" charset="0"/>
-                <a:cs typeface="Courier New" panose="02070309020205020404" pitchFamily="49" charset="0"/>
-              </a:rPr>
-              <a:t>;</a:t>
-            </a:r>
-            <a:endParaRPr lang="en-US" dirty="0" smtClean="0">
-              <a:latin typeface="Courier New" panose="02070309020205020404" pitchFamily="49" charset="0"/>
-              <a:cs typeface="Courier New" panose="02070309020205020404" pitchFamily="49" charset="0"/>
-            </a:endParaRPr>
-          </a:p>
-        </p:txBody>
-      </p:sp>
-      <p:sp>
-        <p:nvSpPr>
-          <p:cNvPr id="6" name="TextBox 5"/>
-          <p:cNvSpPr txBox="1"/>
-          <p:nvPr/>
-        </p:nvSpPr>
-        <p:spPr>
-          <a:xfrm>
-            <a:off x="124691" y="4690151"/>
-            <a:ext cx="7216486" cy="2031325"/>
-          </a:xfrm>
-          <a:prstGeom prst="rect">
-            <a:avLst/>
-          </a:prstGeom>
-          <a:solidFill>
-            <a:schemeClr val="accent4">
-              <a:lumMod val="40000"/>
-              <a:lumOff val="60000"/>
-            </a:schemeClr>
-          </a:solidFill>
-          <a:ln>
-            <a:solidFill>
-              <a:schemeClr val="tx1"/>
-            </a:solidFill>
-          </a:ln>
-        </p:spPr>
-        <p:txBody>
-          <a:bodyPr wrap="square" rtlCol="0">
-            <a:spAutoFit/>
-          </a:bodyPr>
-          <a:lstStyle/>
-          <a:p>
-            <a:r>
-              <a:rPr lang="en-US" dirty="0" smtClean="0">
-                <a:latin typeface="Courier New" panose="02070309020205020404" pitchFamily="49" charset="0"/>
-                <a:cs typeface="Courier New" panose="02070309020205020404" pitchFamily="49" charset="0"/>
-              </a:rPr>
-              <a:t>keys = list('a', 'b', 'c')</a:t>
-            </a:r>
-          </a:p>
-          <a:p>
-            <a:r>
-              <a:rPr lang="en-US" dirty="0">
-                <a:latin typeface="Courier New" panose="02070309020205020404" pitchFamily="49" charset="0"/>
-                <a:cs typeface="Courier New" panose="02070309020205020404" pitchFamily="49" charset="0"/>
-              </a:rPr>
-              <a:t>d</a:t>
-            </a:r>
-            <a:r>
-              <a:rPr lang="en-US" dirty="0" smtClean="0">
-                <a:latin typeface="Courier New" panose="02070309020205020404" pitchFamily="49" charset="0"/>
-                <a:cs typeface="Courier New" panose="02070309020205020404" pitchFamily="49" charset="0"/>
-              </a:rPr>
-              <a:t> = </a:t>
-            </a:r>
-            <a:r>
-              <a:rPr lang="en-US" dirty="0" err="1" smtClean="0">
-                <a:latin typeface="Courier New" panose="02070309020205020404" pitchFamily="49" charset="0"/>
-                <a:cs typeface="Courier New" panose="02070309020205020404" pitchFamily="49" charset="0"/>
-              </a:rPr>
-              <a:t>dict</a:t>
-            </a:r>
-            <a:r>
-              <a:rPr lang="en-US" dirty="0" smtClean="0">
-                <a:latin typeface="Courier New" panose="02070309020205020404" pitchFamily="49" charset="0"/>
-                <a:cs typeface="Courier New" panose="02070309020205020404" pitchFamily="49" charset="0"/>
-              </a:rPr>
-              <a:t>()</a:t>
-            </a:r>
-          </a:p>
-          <a:p>
-            <a:r>
-              <a:rPr lang="en-US" dirty="0" smtClean="0">
-                <a:latin typeface="Courier New" panose="02070309020205020404" pitchFamily="49" charset="0"/>
-                <a:cs typeface="Courier New" panose="02070309020205020404" pitchFamily="49" charset="0"/>
-              </a:rPr>
-              <a:t>for key in keys:</a:t>
-            </a:r>
-          </a:p>
-          <a:p>
-            <a:r>
-              <a:rPr lang="en-US" dirty="0">
-                <a:latin typeface="Courier New" panose="02070309020205020404" pitchFamily="49" charset="0"/>
-                <a:cs typeface="Courier New" panose="02070309020205020404" pitchFamily="49" charset="0"/>
-              </a:rPr>
-              <a:t> </a:t>
-            </a:r>
-            <a:r>
-              <a:rPr lang="en-US" dirty="0" smtClean="0">
-                <a:latin typeface="Courier New" panose="02070309020205020404" pitchFamily="49" charset="0"/>
-                <a:cs typeface="Courier New" panose="02070309020205020404" pitchFamily="49" charset="0"/>
-              </a:rPr>
-              <a:t>   d[key] = x</a:t>
-            </a:r>
-          </a:p>
-          <a:p>
-            <a:r>
-              <a:rPr lang="en-US" dirty="0" smtClean="0">
-                <a:latin typeface="Courier New" panose="02070309020205020404" pitchFamily="49" charset="0"/>
-                <a:cs typeface="Courier New" panose="02070309020205020404" pitchFamily="49" charset="0"/>
-              </a:rPr>
-              <a:t>print(</a:t>
-            </a:r>
-            <a:r>
-              <a:rPr lang="en-US" dirty="0" err="1" smtClean="0">
-                <a:latin typeface="Courier New" panose="02070309020205020404" pitchFamily="49" charset="0"/>
-                <a:cs typeface="Courier New" panose="02070309020205020404" pitchFamily="49" charset="0"/>
-              </a:rPr>
-              <a:t>dict</a:t>
-            </a:r>
-            <a:r>
-              <a:rPr lang="en-US" dirty="0" smtClean="0">
-                <a:latin typeface="Courier New" panose="02070309020205020404" pitchFamily="49" charset="0"/>
-                <a:cs typeface="Courier New" panose="02070309020205020404" pitchFamily="49" charset="0"/>
-              </a:rPr>
-              <a:t> size = {0:d}'.format(</a:t>
-            </a:r>
-            <a:r>
-              <a:rPr lang="en-US" dirty="0" err="1" smtClean="0">
-                <a:latin typeface="Courier New" panose="02070309020205020404" pitchFamily="49" charset="0"/>
-                <a:cs typeface="Courier New" panose="02070309020205020404" pitchFamily="49" charset="0"/>
-              </a:rPr>
-              <a:t>len</a:t>
-            </a:r>
-            <a:r>
-              <a:rPr lang="en-US" dirty="0" smtClean="0">
-                <a:latin typeface="Courier New" panose="02070309020205020404" pitchFamily="49" charset="0"/>
-                <a:cs typeface="Courier New" panose="02070309020205020404" pitchFamily="49" charset="0"/>
-              </a:rPr>
-              <a:t>(d)))</a:t>
-            </a:r>
-            <a:endParaRPr lang="en-US" dirty="0">
-              <a:latin typeface="Courier New" panose="02070309020205020404" pitchFamily="49" charset="0"/>
-              <a:cs typeface="Courier New" panose="02070309020205020404" pitchFamily="49" charset="0"/>
-            </a:endParaRPr>
-          </a:p>
-          <a:p>
-            <a:r>
-              <a:rPr lang="en-US" dirty="0" smtClean="0">
-                <a:latin typeface="Courier New" panose="02070309020205020404" pitchFamily="49" charset="0"/>
-                <a:cs typeface="Courier New" panose="02070309020205020404" pitchFamily="49" charset="0"/>
-              </a:rPr>
-              <a:t>for key in d:</a:t>
-            </a:r>
-          </a:p>
-          <a:p>
-            <a:r>
-              <a:rPr lang="en-US" dirty="0">
-                <a:latin typeface="Courier New" panose="02070309020205020404" pitchFamily="49" charset="0"/>
-                <a:cs typeface="Courier New" panose="02070309020205020404" pitchFamily="49" charset="0"/>
-              </a:rPr>
-              <a:t> </a:t>
-            </a:r>
-            <a:r>
-              <a:rPr lang="en-US" dirty="0" smtClean="0">
-                <a:latin typeface="Courier New" panose="02070309020205020404" pitchFamily="49" charset="0"/>
-                <a:cs typeface="Courier New" panose="02070309020205020404" pitchFamily="49" charset="0"/>
-              </a:rPr>
-              <a:t>   print('{0} -&gt; {1:d}'.format(key, d[key]))</a:t>
-            </a:r>
-          </a:p>
-        </p:txBody>
-      </p:sp>
     </p:spTree>
     <p:extLst>
       <p:ext uri="{BB962C8B-B14F-4D97-AF65-F5344CB8AC3E}">
-        <p14:creationId xmlns:p14="http://schemas.microsoft.com/office/powerpoint/2010/main" val="3159559741"/>
+        <p14:creationId xmlns:p14="http://schemas.microsoft.com/office/powerpoint/2010/main" val="1145184231"/>
       </p:ext>
     </p:extLst>
   </p:cSld>
@@ -8743,7 +8526,7 @@
       </p:grpSpPr>
       <p:sp>
         <p:nvSpPr>
-          <p:cNvPr id="4" name="Title 3"/>
+          <p:cNvPr id="2" name="Title 1"/>
           <p:cNvSpPr>
             <a:spLocks noGrp="1"/>
           </p:cNvSpPr>
@@ -8758,7 +8541,7 @@
           <a:p>
             <a:r>
               <a:rPr lang="en-US" dirty="0" smtClean="0"/>
-              <a:t>Derived data structures</a:t>
+              <a:t>Dictionary examples</a:t>
             </a:r>
             <a:endParaRPr lang="en-US" dirty="0"/>
           </a:p>
@@ -8766,26 +8549,7 @@
       </p:sp>
       <p:sp>
         <p:nvSpPr>
-          <p:cNvPr id="5" name="Text Placeholder 4"/>
-          <p:cNvSpPr>
-            <a:spLocks noGrp="1"/>
-          </p:cNvSpPr>
-          <p:nvPr>
-            <p:ph type="body" idx="1"/>
-          </p:nvPr>
-        </p:nvSpPr>
-        <p:spPr/>
-        <p:txBody>
-          <a:bodyPr/>
-          <a:lstStyle/>
-          <a:p>
-            <a:endParaRPr lang="en-US"/>
-          </a:p>
-        </p:txBody>
-      </p:sp>
-      <p:sp>
-        <p:nvSpPr>
-          <p:cNvPr id="3" name="Slide Number Placeholder 2"/>
+          <p:cNvPr id="4" name="Slide Number Placeholder 3"/>
           <p:cNvSpPr>
             <a:spLocks noGrp="1"/>
           </p:cNvSpPr>
@@ -8806,10 +8570,683 @@
           </a:p>
         </p:txBody>
       </p:sp>
+      <p:sp>
+        <p:nvSpPr>
+          <p:cNvPr id="5" name="TextBox 4"/>
+          <p:cNvSpPr txBox="1"/>
+          <p:nvPr/>
+        </p:nvSpPr>
+        <p:spPr>
+          <a:xfrm>
+            <a:off x="124691" y="1579414"/>
+            <a:ext cx="8842665" cy="2862322"/>
+          </a:xfrm>
+          <a:prstGeom prst="rect">
+            <a:avLst/>
+          </a:prstGeom>
+          <a:solidFill>
+            <a:schemeClr val="tx2">
+              <a:lumMod val="40000"/>
+              <a:lumOff val="60000"/>
+            </a:schemeClr>
+          </a:solidFill>
+          <a:ln>
+            <a:solidFill>
+              <a:schemeClr val="tx1"/>
+            </a:solidFill>
+          </a:ln>
+        </p:spPr>
+        <p:txBody>
+          <a:bodyPr wrap="square" rtlCol="0">
+            <a:spAutoFit/>
+          </a:bodyPr>
+          <a:lstStyle/>
+          <a:p>
+            <a:r>
+              <a:rPr lang="en-US" dirty="0" smtClean="0">
+                <a:latin typeface="Courier New" panose="02070309020205020404" pitchFamily="49" charset="0"/>
+                <a:cs typeface="Courier New" panose="02070309020205020404" pitchFamily="49" charset="0"/>
+              </a:rPr>
+              <a:t>…</a:t>
+            </a:r>
+          </a:p>
+          <a:p>
+            <a:r>
+              <a:rPr lang="en-US" dirty="0" smtClean="0">
+                <a:latin typeface="Courier New" panose="02070309020205020404" pitchFamily="49" charset="0"/>
+                <a:cs typeface="Courier New" panose="02070309020205020404" pitchFamily="49" charset="0"/>
+              </a:rPr>
+              <a:t>#</a:t>
+            </a:r>
+            <a:r>
+              <a:rPr lang="en-US" dirty="0">
+                <a:latin typeface="Courier New" panose="02070309020205020404" pitchFamily="49" charset="0"/>
+                <a:cs typeface="Courier New" panose="02070309020205020404" pitchFamily="49" charset="0"/>
+              </a:rPr>
+              <a:t>include </a:t>
+            </a:r>
+            <a:r>
+              <a:rPr lang="en-US" dirty="0" smtClean="0">
+                <a:latin typeface="Courier New" panose="02070309020205020404" pitchFamily="49" charset="0"/>
+                <a:cs typeface="Courier New" panose="02070309020205020404" pitchFamily="49" charset="0"/>
+              </a:rPr>
+              <a:t>&lt;</a:t>
+            </a:r>
+            <a:r>
+              <a:rPr lang="en-US" dirty="0" err="1" smtClean="0">
+                <a:latin typeface="Courier New" panose="02070309020205020404" pitchFamily="49" charset="0"/>
+                <a:cs typeface="Courier New" panose="02070309020205020404" pitchFamily="49" charset="0"/>
+              </a:rPr>
+              <a:t>unordered_map</a:t>
+            </a:r>
+            <a:r>
+              <a:rPr lang="en-US" dirty="0">
+                <a:latin typeface="Courier New" panose="02070309020205020404" pitchFamily="49" charset="0"/>
+                <a:cs typeface="Courier New" panose="02070309020205020404" pitchFamily="49" charset="0"/>
+              </a:rPr>
+              <a:t>&gt;</a:t>
+            </a:r>
+          </a:p>
+          <a:p>
+            <a:r>
+              <a:rPr lang="en-US" dirty="0">
+                <a:latin typeface="Courier New" panose="02070309020205020404" pitchFamily="49" charset="0"/>
+                <a:cs typeface="Courier New" panose="02070309020205020404" pitchFamily="49" charset="0"/>
+              </a:rPr>
+              <a:t>#include &lt;string&gt;</a:t>
+            </a:r>
+          </a:p>
+          <a:p>
+            <a:r>
+              <a:rPr lang="en-US" dirty="0" err="1" smtClean="0">
+                <a:latin typeface="Courier New" panose="02070309020205020404" pitchFamily="49" charset="0"/>
+                <a:cs typeface="Courier New" panose="02070309020205020404" pitchFamily="49" charset="0"/>
+              </a:rPr>
+              <a:t>std</a:t>
+            </a:r>
+            <a:r>
+              <a:rPr lang="en-US" dirty="0">
+                <a:latin typeface="Courier New" panose="02070309020205020404" pitchFamily="49" charset="0"/>
+                <a:cs typeface="Courier New" panose="02070309020205020404" pitchFamily="49" charset="0"/>
+              </a:rPr>
+              <a:t>::list&lt;</a:t>
+            </a:r>
+            <a:r>
+              <a:rPr lang="en-US" dirty="0" err="1">
+                <a:latin typeface="Courier New" panose="02070309020205020404" pitchFamily="49" charset="0"/>
+                <a:cs typeface="Courier New" panose="02070309020205020404" pitchFamily="49" charset="0"/>
+              </a:rPr>
+              <a:t>std</a:t>
+            </a:r>
+            <a:r>
+              <a:rPr lang="en-US" dirty="0">
+                <a:latin typeface="Courier New" panose="02070309020205020404" pitchFamily="49" charset="0"/>
+                <a:cs typeface="Courier New" panose="02070309020205020404" pitchFamily="49" charset="0"/>
+              </a:rPr>
+              <a:t>::string&gt; keys = {"a", "b", "c"};</a:t>
+            </a:r>
+          </a:p>
+          <a:p>
+            <a:r>
+              <a:rPr lang="en-US" dirty="0" err="1" smtClean="0">
+                <a:latin typeface="Courier New" panose="02070309020205020404" pitchFamily="49" charset="0"/>
+                <a:cs typeface="Courier New" panose="02070309020205020404" pitchFamily="49" charset="0"/>
+              </a:rPr>
+              <a:t>std</a:t>
+            </a:r>
+            <a:r>
+              <a:rPr lang="en-US" dirty="0" smtClean="0">
+                <a:latin typeface="Courier New" panose="02070309020205020404" pitchFamily="49" charset="0"/>
+                <a:cs typeface="Courier New" panose="02070309020205020404" pitchFamily="49" charset="0"/>
+              </a:rPr>
+              <a:t>::</a:t>
+            </a:r>
+            <a:r>
+              <a:rPr lang="en-US" dirty="0" err="1" smtClean="0">
+                <a:latin typeface="Courier New" panose="02070309020205020404" pitchFamily="49" charset="0"/>
+                <a:cs typeface="Courier New" panose="02070309020205020404" pitchFamily="49" charset="0"/>
+              </a:rPr>
+              <a:t>unordered_map</a:t>
+            </a:r>
+            <a:r>
+              <a:rPr lang="en-US" dirty="0" smtClean="0">
+                <a:latin typeface="Courier New" panose="02070309020205020404" pitchFamily="49" charset="0"/>
+                <a:cs typeface="Courier New" panose="02070309020205020404" pitchFamily="49" charset="0"/>
+              </a:rPr>
+              <a:t>&lt;</a:t>
+            </a:r>
+            <a:r>
+              <a:rPr lang="en-US" dirty="0" err="1" smtClean="0">
+                <a:latin typeface="Courier New" panose="02070309020205020404" pitchFamily="49" charset="0"/>
+                <a:cs typeface="Courier New" panose="02070309020205020404" pitchFamily="49" charset="0"/>
+              </a:rPr>
+              <a:t>std</a:t>
+            </a:r>
+            <a:r>
+              <a:rPr lang="en-US" dirty="0">
+                <a:latin typeface="Courier New" panose="02070309020205020404" pitchFamily="49" charset="0"/>
+                <a:cs typeface="Courier New" panose="02070309020205020404" pitchFamily="49" charset="0"/>
+              </a:rPr>
+              <a:t>::string, </a:t>
+            </a:r>
+            <a:r>
+              <a:rPr lang="en-US" dirty="0" err="1">
+                <a:latin typeface="Courier New" panose="02070309020205020404" pitchFamily="49" charset="0"/>
+                <a:cs typeface="Courier New" panose="02070309020205020404" pitchFamily="49" charset="0"/>
+              </a:rPr>
+              <a:t>int</a:t>
+            </a:r>
+            <a:r>
+              <a:rPr lang="en-US" dirty="0">
+                <a:latin typeface="Courier New" panose="02070309020205020404" pitchFamily="49" charset="0"/>
+                <a:cs typeface="Courier New" panose="02070309020205020404" pitchFamily="49" charset="0"/>
+              </a:rPr>
+              <a:t>&gt; </a:t>
+            </a:r>
+            <a:r>
+              <a:rPr lang="en-US" dirty="0" smtClean="0">
+                <a:latin typeface="Courier New" panose="02070309020205020404" pitchFamily="49" charset="0"/>
+                <a:cs typeface="Courier New" panose="02070309020205020404" pitchFamily="49" charset="0"/>
+              </a:rPr>
+              <a:t>m;</a:t>
+            </a:r>
+            <a:endParaRPr lang="en-US" dirty="0">
+              <a:latin typeface="Courier New" panose="02070309020205020404" pitchFamily="49" charset="0"/>
+              <a:cs typeface="Courier New" panose="02070309020205020404" pitchFamily="49" charset="0"/>
+            </a:endParaRPr>
+          </a:p>
+          <a:p>
+            <a:r>
+              <a:rPr lang="en-US" dirty="0" err="1" smtClean="0">
+                <a:latin typeface="Courier New" panose="02070309020205020404" pitchFamily="49" charset="0"/>
+                <a:cs typeface="Courier New" panose="02070309020205020404" pitchFamily="49" charset="0"/>
+              </a:rPr>
+              <a:t>int</a:t>
+            </a:r>
+            <a:r>
+              <a:rPr lang="en-US" dirty="0" smtClean="0">
+                <a:latin typeface="Courier New" panose="02070309020205020404" pitchFamily="49" charset="0"/>
+                <a:cs typeface="Courier New" panose="02070309020205020404" pitchFamily="49" charset="0"/>
+              </a:rPr>
+              <a:t> </a:t>
+            </a:r>
+            <a:r>
+              <a:rPr lang="en-US" dirty="0" err="1">
+                <a:latin typeface="Courier New" panose="02070309020205020404" pitchFamily="49" charset="0"/>
+                <a:cs typeface="Courier New" panose="02070309020205020404" pitchFamily="49" charset="0"/>
+              </a:rPr>
+              <a:t>i</a:t>
+            </a:r>
+            <a:r>
+              <a:rPr lang="en-US" dirty="0">
+                <a:latin typeface="Courier New" panose="02070309020205020404" pitchFamily="49" charset="0"/>
+                <a:cs typeface="Courier New" panose="02070309020205020404" pitchFamily="49" charset="0"/>
+              </a:rPr>
+              <a:t> = 0;</a:t>
+            </a:r>
+          </a:p>
+          <a:p>
+            <a:r>
+              <a:rPr lang="en-US" dirty="0" smtClean="0">
+                <a:latin typeface="Courier New" panose="02070309020205020404" pitchFamily="49" charset="0"/>
+                <a:cs typeface="Courier New" panose="02070309020205020404" pitchFamily="49" charset="0"/>
+              </a:rPr>
+              <a:t>for </a:t>
+            </a:r>
+            <a:r>
+              <a:rPr lang="en-US" dirty="0">
+                <a:latin typeface="Courier New" panose="02070309020205020404" pitchFamily="49" charset="0"/>
+                <a:cs typeface="Courier New" panose="02070309020205020404" pitchFamily="49" charset="0"/>
+              </a:rPr>
+              <a:t>(auto </a:t>
+            </a:r>
+            <a:r>
+              <a:rPr lang="en-US" dirty="0" smtClean="0">
+                <a:latin typeface="Courier New" panose="02070309020205020404" pitchFamily="49" charset="0"/>
+                <a:cs typeface="Courier New" panose="02070309020205020404" pitchFamily="49" charset="0"/>
+              </a:rPr>
+              <a:t>it </a:t>
+            </a:r>
+            <a:r>
+              <a:rPr lang="en-US" dirty="0">
+                <a:latin typeface="Courier New" panose="02070309020205020404" pitchFamily="49" charset="0"/>
+                <a:cs typeface="Courier New" panose="02070309020205020404" pitchFamily="49" charset="0"/>
+              </a:rPr>
+              <a:t>= </a:t>
+            </a:r>
+            <a:r>
+              <a:rPr lang="en-US" dirty="0" err="1">
+                <a:latin typeface="Courier New" panose="02070309020205020404" pitchFamily="49" charset="0"/>
+                <a:cs typeface="Courier New" panose="02070309020205020404" pitchFamily="49" charset="0"/>
+              </a:rPr>
+              <a:t>keys.begin</a:t>
+            </a:r>
+            <a:r>
+              <a:rPr lang="en-US" dirty="0">
+                <a:latin typeface="Courier New" panose="02070309020205020404" pitchFamily="49" charset="0"/>
+                <a:cs typeface="Courier New" panose="02070309020205020404" pitchFamily="49" charset="0"/>
+              </a:rPr>
+              <a:t>(); </a:t>
+            </a:r>
+            <a:r>
+              <a:rPr lang="en-US" dirty="0" smtClean="0">
+                <a:latin typeface="Courier New" panose="02070309020205020404" pitchFamily="49" charset="0"/>
+                <a:cs typeface="Courier New" panose="02070309020205020404" pitchFamily="49" charset="0"/>
+              </a:rPr>
+              <a:t>it </a:t>
+            </a:r>
+            <a:r>
+              <a:rPr lang="en-US" dirty="0">
+                <a:latin typeface="Courier New" panose="02070309020205020404" pitchFamily="49" charset="0"/>
+                <a:cs typeface="Courier New" panose="02070309020205020404" pitchFamily="49" charset="0"/>
+              </a:rPr>
+              <a:t>!= </a:t>
+            </a:r>
+            <a:r>
+              <a:rPr lang="en-US" dirty="0" err="1">
+                <a:latin typeface="Courier New" panose="02070309020205020404" pitchFamily="49" charset="0"/>
+                <a:cs typeface="Courier New" panose="02070309020205020404" pitchFamily="49" charset="0"/>
+              </a:rPr>
+              <a:t>keys.end</a:t>
+            </a:r>
+            <a:r>
+              <a:rPr lang="en-US" dirty="0">
+                <a:latin typeface="Courier New" panose="02070309020205020404" pitchFamily="49" charset="0"/>
+                <a:cs typeface="Courier New" panose="02070309020205020404" pitchFamily="49" charset="0"/>
+              </a:rPr>
+              <a:t>(); </a:t>
+            </a:r>
+            <a:r>
+              <a:rPr lang="en-US" dirty="0" smtClean="0">
+                <a:latin typeface="Courier New" panose="02070309020205020404" pitchFamily="49" charset="0"/>
+                <a:cs typeface="Courier New" panose="02070309020205020404" pitchFamily="49" charset="0"/>
+              </a:rPr>
+              <a:t>it++)</a:t>
+            </a:r>
+            <a:endParaRPr lang="en-US" dirty="0">
+              <a:latin typeface="Courier New" panose="02070309020205020404" pitchFamily="49" charset="0"/>
+              <a:cs typeface="Courier New" panose="02070309020205020404" pitchFamily="49" charset="0"/>
+            </a:endParaRPr>
+          </a:p>
+          <a:p>
+            <a:r>
+              <a:rPr lang="en-US" dirty="0">
+                <a:latin typeface="Courier New" panose="02070309020205020404" pitchFamily="49" charset="0"/>
+                <a:cs typeface="Courier New" panose="02070309020205020404" pitchFamily="49" charset="0"/>
+              </a:rPr>
+              <a:t>    </a:t>
+            </a:r>
+            <a:r>
+              <a:rPr lang="en-US" dirty="0" smtClean="0">
+                <a:latin typeface="Courier New" panose="02070309020205020404" pitchFamily="49" charset="0"/>
+                <a:cs typeface="Courier New" panose="02070309020205020404" pitchFamily="49" charset="0"/>
+              </a:rPr>
+              <a:t>m[*it] </a:t>
+            </a:r>
+            <a:r>
+              <a:rPr lang="en-US" dirty="0">
+                <a:latin typeface="Courier New" panose="02070309020205020404" pitchFamily="49" charset="0"/>
+                <a:cs typeface="Courier New" panose="02070309020205020404" pitchFamily="49" charset="0"/>
+              </a:rPr>
+              <a:t>= ++</a:t>
+            </a:r>
+            <a:r>
+              <a:rPr lang="en-US" dirty="0" err="1">
+                <a:latin typeface="Courier New" panose="02070309020205020404" pitchFamily="49" charset="0"/>
+                <a:cs typeface="Courier New" panose="02070309020205020404" pitchFamily="49" charset="0"/>
+              </a:rPr>
+              <a:t>i</a:t>
+            </a:r>
+            <a:r>
+              <a:rPr lang="en-US" dirty="0">
+                <a:latin typeface="Courier New" panose="02070309020205020404" pitchFamily="49" charset="0"/>
+                <a:cs typeface="Courier New" panose="02070309020205020404" pitchFamily="49" charset="0"/>
+              </a:rPr>
+              <a:t>;</a:t>
+            </a:r>
+          </a:p>
+          <a:p>
+            <a:r>
+              <a:rPr lang="en-US" dirty="0" smtClean="0">
+                <a:latin typeface="Courier New" panose="02070309020205020404" pitchFamily="49" charset="0"/>
+                <a:cs typeface="Courier New" panose="02070309020205020404" pitchFamily="49" charset="0"/>
+              </a:rPr>
+              <a:t>for </a:t>
+            </a:r>
+            <a:r>
+              <a:rPr lang="en-US" dirty="0">
+                <a:latin typeface="Courier New" panose="02070309020205020404" pitchFamily="49" charset="0"/>
+                <a:cs typeface="Courier New" panose="02070309020205020404" pitchFamily="49" charset="0"/>
+              </a:rPr>
+              <a:t>(auto </a:t>
+            </a:r>
+            <a:r>
+              <a:rPr lang="en-US" dirty="0" smtClean="0">
+                <a:latin typeface="Courier New" panose="02070309020205020404" pitchFamily="49" charset="0"/>
+                <a:cs typeface="Courier New" panose="02070309020205020404" pitchFamily="49" charset="0"/>
+              </a:rPr>
+              <a:t>it </a:t>
+            </a:r>
+            <a:r>
+              <a:rPr lang="en-US" dirty="0">
+                <a:latin typeface="Courier New" panose="02070309020205020404" pitchFamily="49" charset="0"/>
+                <a:cs typeface="Courier New" panose="02070309020205020404" pitchFamily="49" charset="0"/>
+              </a:rPr>
+              <a:t>= </a:t>
+            </a:r>
+            <a:r>
+              <a:rPr lang="en-US" dirty="0" smtClean="0">
+                <a:latin typeface="Courier New" panose="02070309020205020404" pitchFamily="49" charset="0"/>
+                <a:cs typeface="Courier New" panose="02070309020205020404" pitchFamily="49" charset="0"/>
+              </a:rPr>
+              <a:t>m(); it </a:t>
+            </a:r>
+            <a:r>
+              <a:rPr lang="en-US" dirty="0">
+                <a:latin typeface="Courier New" panose="02070309020205020404" pitchFamily="49" charset="0"/>
+                <a:cs typeface="Courier New" panose="02070309020205020404" pitchFamily="49" charset="0"/>
+              </a:rPr>
+              <a:t>!= </a:t>
+            </a:r>
+            <a:r>
+              <a:rPr lang="en-US" dirty="0" smtClean="0">
+                <a:latin typeface="Courier New" panose="02070309020205020404" pitchFamily="49" charset="0"/>
+                <a:cs typeface="Courier New" panose="02070309020205020404" pitchFamily="49" charset="0"/>
+              </a:rPr>
+              <a:t>m(); it++)</a:t>
+            </a:r>
+            <a:endParaRPr lang="en-US" dirty="0">
+              <a:latin typeface="Courier New" panose="02070309020205020404" pitchFamily="49" charset="0"/>
+              <a:cs typeface="Courier New" panose="02070309020205020404" pitchFamily="49" charset="0"/>
+            </a:endParaRPr>
+          </a:p>
+          <a:p>
+            <a:r>
+              <a:rPr lang="en-US" dirty="0" smtClean="0">
+                <a:latin typeface="Courier New" panose="02070309020205020404" pitchFamily="49" charset="0"/>
+                <a:cs typeface="Courier New" panose="02070309020205020404" pitchFamily="49" charset="0"/>
+              </a:rPr>
+              <a:t>    </a:t>
+            </a:r>
+            <a:r>
+              <a:rPr lang="en-US" dirty="0" err="1">
+                <a:latin typeface="Courier New" panose="02070309020205020404" pitchFamily="49" charset="0"/>
+                <a:cs typeface="Courier New" panose="02070309020205020404" pitchFamily="49" charset="0"/>
+              </a:rPr>
+              <a:t>std</a:t>
+            </a:r>
+            <a:r>
+              <a:rPr lang="en-US" dirty="0">
+                <a:latin typeface="Courier New" panose="02070309020205020404" pitchFamily="49" charset="0"/>
+                <a:cs typeface="Courier New" panose="02070309020205020404" pitchFamily="49" charset="0"/>
+              </a:rPr>
+              <a:t>::</a:t>
+            </a:r>
+            <a:r>
+              <a:rPr lang="en-US" dirty="0" err="1">
+                <a:latin typeface="Courier New" panose="02070309020205020404" pitchFamily="49" charset="0"/>
+                <a:cs typeface="Courier New" panose="02070309020205020404" pitchFamily="49" charset="0"/>
+              </a:rPr>
+              <a:t>cout</a:t>
+            </a:r>
+            <a:r>
+              <a:rPr lang="en-US" dirty="0">
+                <a:latin typeface="Courier New" panose="02070309020205020404" pitchFamily="49" charset="0"/>
+                <a:cs typeface="Courier New" panose="02070309020205020404" pitchFamily="49" charset="0"/>
+              </a:rPr>
+              <a:t> &lt;&lt; </a:t>
+            </a:r>
+            <a:r>
+              <a:rPr lang="en-US" dirty="0" smtClean="0">
+                <a:latin typeface="Courier New" panose="02070309020205020404" pitchFamily="49" charset="0"/>
+                <a:cs typeface="Courier New" panose="02070309020205020404" pitchFamily="49" charset="0"/>
+              </a:rPr>
+              <a:t>it-</a:t>
+            </a:r>
+            <a:r>
+              <a:rPr lang="en-US" dirty="0">
+                <a:latin typeface="Courier New" panose="02070309020205020404" pitchFamily="49" charset="0"/>
+                <a:cs typeface="Courier New" panose="02070309020205020404" pitchFamily="49" charset="0"/>
+              </a:rPr>
+              <a:t>&gt;first &lt;&lt; </a:t>
+            </a:r>
+            <a:r>
+              <a:rPr lang="en-US" dirty="0" smtClean="0">
+                <a:latin typeface="Courier New" panose="02070309020205020404" pitchFamily="49" charset="0"/>
+                <a:cs typeface="Courier New" panose="02070309020205020404" pitchFamily="49" charset="0"/>
+              </a:rPr>
+              <a:t>"-&gt;" </a:t>
+            </a:r>
+            <a:r>
+              <a:rPr lang="en-US" dirty="0">
+                <a:latin typeface="Courier New" panose="02070309020205020404" pitchFamily="49" charset="0"/>
+                <a:cs typeface="Courier New" panose="02070309020205020404" pitchFamily="49" charset="0"/>
+              </a:rPr>
+              <a:t>&lt;&lt; </a:t>
+            </a:r>
+            <a:r>
+              <a:rPr lang="en-US" dirty="0" smtClean="0">
+                <a:latin typeface="Courier New" panose="02070309020205020404" pitchFamily="49" charset="0"/>
+                <a:cs typeface="Courier New" panose="02070309020205020404" pitchFamily="49" charset="0"/>
+              </a:rPr>
+              <a:t>it-</a:t>
+            </a:r>
+            <a:r>
+              <a:rPr lang="en-US" dirty="0">
+                <a:latin typeface="Courier New" panose="02070309020205020404" pitchFamily="49" charset="0"/>
+                <a:cs typeface="Courier New" panose="02070309020205020404" pitchFamily="49" charset="0"/>
+              </a:rPr>
+              <a:t>&gt;</a:t>
+            </a:r>
+            <a:r>
+              <a:rPr lang="en-US" dirty="0" smtClean="0">
+                <a:latin typeface="Courier New" panose="02070309020205020404" pitchFamily="49" charset="0"/>
+                <a:cs typeface="Courier New" panose="02070309020205020404" pitchFamily="49" charset="0"/>
+              </a:rPr>
+              <a:t>second &lt;&lt; </a:t>
+            </a:r>
+            <a:r>
+              <a:rPr lang="en-US" dirty="0" err="1" smtClean="0">
+                <a:latin typeface="Courier New" panose="02070309020205020404" pitchFamily="49" charset="0"/>
+                <a:cs typeface="Courier New" panose="02070309020205020404" pitchFamily="49" charset="0"/>
+              </a:rPr>
+              <a:t>std</a:t>
+            </a:r>
+            <a:r>
+              <a:rPr lang="en-US" dirty="0">
+                <a:latin typeface="Courier New" panose="02070309020205020404" pitchFamily="49" charset="0"/>
+                <a:cs typeface="Courier New" panose="02070309020205020404" pitchFamily="49" charset="0"/>
+              </a:rPr>
+              <a:t>::</a:t>
+            </a:r>
+            <a:r>
+              <a:rPr lang="en-US" dirty="0" err="1">
+                <a:latin typeface="Courier New" panose="02070309020205020404" pitchFamily="49" charset="0"/>
+                <a:cs typeface="Courier New" panose="02070309020205020404" pitchFamily="49" charset="0"/>
+              </a:rPr>
+              <a:t>endl</a:t>
+            </a:r>
+            <a:r>
+              <a:rPr lang="en-US" dirty="0">
+                <a:latin typeface="Courier New" panose="02070309020205020404" pitchFamily="49" charset="0"/>
+                <a:cs typeface="Courier New" panose="02070309020205020404" pitchFamily="49" charset="0"/>
+              </a:rPr>
+              <a:t>;</a:t>
+            </a:r>
+            <a:endParaRPr lang="en-US" dirty="0" smtClean="0">
+              <a:latin typeface="Courier New" panose="02070309020205020404" pitchFamily="49" charset="0"/>
+              <a:cs typeface="Courier New" panose="02070309020205020404" pitchFamily="49" charset="0"/>
+            </a:endParaRPr>
+          </a:p>
+        </p:txBody>
+      </p:sp>
+      <p:sp>
+        <p:nvSpPr>
+          <p:cNvPr id="6" name="TextBox 5"/>
+          <p:cNvSpPr txBox="1"/>
+          <p:nvPr/>
+        </p:nvSpPr>
+        <p:spPr>
+          <a:xfrm>
+            <a:off x="124691" y="4690151"/>
+            <a:ext cx="7216486" cy="2031325"/>
+          </a:xfrm>
+          <a:prstGeom prst="rect">
+            <a:avLst/>
+          </a:prstGeom>
+          <a:solidFill>
+            <a:schemeClr val="accent4">
+              <a:lumMod val="40000"/>
+              <a:lumOff val="60000"/>
+            </a:schemeClr>
+          </a:solidFill>
+          <a:ln>
+            <a:solidFill>
+              <a:schemeClr val="tx1"/>
+            </a:solidFill>
+          </a:ln>
+        </p:spPr>
+        <p:txBody>
+          <a:bodyPr wrap="square" rtlCol="0">
+            <a:spAutoFit/>
+          </a:bodyPr>
+          <a:lstStyle/>
+          <a:p>
+            <a:r>
+              <a:rPr lang="en-US" dirty="0" smtClean="0">
+                <a:latin typeface="Courier New" panose="02070309020205020404" pitchFamily="49" charset="0"/>
+                <a:cs typeface="Courier New" panose="02070309020205020404" pitchFamily="49" charset="0"/>
+              </a:rPr>
+              <a:t>keys = list('a', 'b', 'c')</a:t>
+            </a:r>
+          </a:p>
+          <a:p>
+            <a:r>
+              <a:rPr lang="en-US" dirty="0">
+                <a:latin typeface="Courier New" panose="02070309020205020404" pitchFamily="49" charset="0"/>
+                <a:cs typeface="Courier New" panose="02070309020205020404" pitchFamily="49" charset="0"/>
+              </a:rPr>
+              <a:t>d</a:t>
+            </a:r>
+            <a:r>
+              <a:rPr lang="en-US" dirty="0" smtClean="0">
+                <a:latin typeface="Courier New" panose="02070309020205020404" pitchFamily="49" charset="0"/>
+                <a:cs typeface="Courier New" panose="02070309020205020404" pitchFamily="49" charset="0"/>
+              </a:rPr>
+              <a:t> = </a:t>
+            </a:r>
+            <a:r>
+              <a:rPr lang="en-US" dirty="0" err="1" smtClean="0">
+                <a:latin typeface="Courier New" panose="02070309020205020404" pitchFamily="49" charset="0"/>
+                <a:cs typeface="Courier New" panose="02070309020205020404" pitchFamily="49" charset="0"/>
+              </a:rPr>
+              <a:t>dict</a:t>
+            </a:r>
+            <a:r>
+              <a:rPr lang="en-US" dirty="0" smtClean="0">
+                <a:latin typeface="Courier New" panose="02070309020205020404" pitchFamily="49" charset="0"/>
+                <a:cs typeface="Courier New" panose="02070309020205020404" pitchFamily="49" charset="0"/>
+              </a:rPr>
+              <a:t>()</a:t>
+            </a:r>
+          </a:p>
+          <a:p>
+            <a:r>
+              <a:rPr lang="en-US" dirty="0" smtClean="0">
+                <a:latin typeface="Courier New" panose="02070309020205020404" pitchFamily="49" charset="0"/>
+                <a:cs typeface="Courier New" panose="02070309020205020404" pitchFamily="49" charset="0"/>
+              </a:rPr>
+              <a:t>for key in keys:</a:t>
+            </a:r>
+          </a:p>
+          <a:p>
+            <a:r>
+              <a:rPr lang="en-US" dirty="0">
+                <a:latin typeface="Courier New" panose="02070309020205020404" pitchFamily="49" charset="0"/>
+                <a:cs typeface="Courier New" panose="02070309020205020404" pitchFamily="49" charset="0"/>
+              </a:rPr>
+              <a:t> </a:t>
+            </a:r>
+            <a:r>
+              <a:rPr lang="en-US" dirty="0" smtClean="0">
+                <a:latin typeface="Courier New" panose="02070309020205020404" pitchFamily="49" charset="0"/>
+                <a:cs typeface="Courier New" panose="02070309020205020404" pitchFamily="49" charset="0"/>
+              </a:rPr>
+              <a:t>   d[key] = x</a:t>
+            </a:r>
+          </a:p>
+          <a:p>
+            <a:r>
+              <a:rPr lang="en-US" dirty="0" smtClean="0">
+                <a:latin typeface="Courier New" panose="02070309020205020404" pitchFamily="49" charset="0"/>
+                <a:cs typeface="Courier New" panose="02070309020205020404" pitchFamily="49" charset="0"/>
+              </a:rPr>
+              <a:t>print(</a:t>
+            </a:r>
+            <a:r>
+              <a:rPr lang="en-US" dirty="0" err="1" smtClean="0">
+                <a:latin typeface="Courier New" panose="02070309020205020404" pitchFamily="49" charset="0"/>
+                <a:cs typeface="Courier New" panose="02070309020205020404" pitchFamily="49" charset="0"/>
+              </a:rPr>
+              <a:t>dict</a:t>
+            </a:r>
+            <a:r>
+              <a:rPr lang="en-US" dirty="0" smtClean="0">
+                <a:latin typeface="Courier New" panose="02070309020205020404" pitchFamily="49" charset="0"/>
+                <a:cs typeface="Courier New" panose="02070309020205020404" pitchFamily="49" charset="0"/>
+              </a:rPr>
+              <a:t> size = {0:d}'.format(</a:t>
+            </a:r>
+            <a:r>
+              <a:rPr lang="en-US" dirty="0" err="1" smtClean="0">
+                <a:latin typeface="Courier New" panose="02070309020205020404" pitchFamily="49" charset="0"/>
+                <a:cs typeface="Courier New" panose="02070309020205020404" pitchFamily="49" charset="0"/>
+              </a:rPr>
+              <a:t>len</a:t>
+            </a:r>
+            <a:r>
+              <a:rPr lang="en-US" dirty="0" smtClean="0">
+                <a:latin typeface="Courier New" panose="02070309020205020404" pitchFamily="49" charset="0"/>
+                <a:cs typeface="Courier New" panose="02070309020205020404" pitchFamily="49" charset="0"/>
+              </a:rPr>
+              <a:t>(d)))</a:t>
+            </a:r>
+            <a:endParaRPr lang="en-US" dirty="0">
+              <a:latin typeface="Courier New" panose="02070309020205020404" pitchFamily="49" charset="0"/>
+              <a:cs typeface="Courier New" panose="02070309020205020404" pitchFamily="49" charset="0"/>
+            </a:endParaRPr>
+          </a:p>
+          <a:p>
+            <a:r>
+              <a:rPr lang="en-US" dirty="0" smtClean="0">
+                <a:latin typeface="Courier New" panose="02070309020205020404" pitchFamily="49" charset="0"/>
+                <a:cs typeface="Courier New" panose="02070309020205020404" pitchFamily="49" charset="0"/>
+              </a:rPr>
+              <a:t>for key in d:</a:t>
+            </a:r>
+          </a:p>
+          <a:p>
+            <a:r>
+              <a:rPr lang="en-US" dirty="0">
+                <a:latin typeface="Courier New" panose="02070309020205020404" pitchFamily="49" charset="0"/>
+                <a:cs typeface="Courier New" panose="02070309020205020404" pitchFamily="49" charset="0"/>
+              </a:rPr>
+              <a:t> </a:t>
+            </a:r>
+            <a:r>
+              <a:rPr lang="en-US" dirty="0" smtClean="0">
+                <a:latin typeface="Courier New" panose="02070309020205020404" pitchFamily="49" charset="0"/>
+                <a:cs typeface="Courier New" panose="02070309020205020404" pitchFamily="49" charset="0"/>
+              </a:rPr>
+              <a:t>   print('{0} -&gt; {1:d}'.format(key, d[key]))</a:t>
+            </a:r>
+          </a:p>
+        </p:txBody>
+      </p:sp>
     </p:spTree>
     <p:extLst>
       <p:ext uri="{BB962C8B-B14F-4D97-AF65-F5344CB8AC3E}">
-        <p14:creationId xmlns:p14="http://schemas.microsoft.com/office/powerpoint/2010/main" val="3769330791"/>
+        <p14:creationId xmlns:p14="http://schemas.microsoft.com/office/powerpoint/2010/main" val="3159559741"/>
       </p:ext>
     </p:extLst>
   </p:cSld>
@@ -8845,7 +9282,7 @@
       </p:grpSpPr>
       <p:sp>
         <p:nvSpPr>
-          <p:cNvPr id="2" name="Title 1"/>
+          <p:cNvPr id="4" name="Title 3"/>
           <p:cNvSpPr>
             <a:spLocks noGrp="1"/>
           </p:cNvSpPr>
@@ -8860,7 +9297,7 @@
           <a:p>
             <a:r>
               <a:rPr lang="en-US" dirty="0" smtClean="0"/>
-              <a:t>Stack</a:t>
+              <a:t>Derived data structures</a:t>
             </a:r>
             <a:endParaRPr lang="en-US" dirty="0"/>
           </a:p>
@@ -8868,83 +9305,26 @@
       </p:sp>
       <p:sp>
         <p:nvSpPr>
-          <p:cNvPr id="3" name="Content Placeholder 2"/>
-          <p:cNvSpPr>
-            <a:spLocks noGrp="1"/>
-          </p:cNvSpPr>
-          <p:nvPr>
-            <p:ph idx="1"/>
+          <p:cNvPr id="5" name="Text Placeholder 4"/>
+          <p:cNvSpPr>
+            <a:spLocks noGrp="1"/>
+          </p:cNvSpPr>
+          <p:nvPr>
+            <p:ph type="body" idx="1"/>
           </p:nvPr>
         </p:nvSpPr>
         <p:spPr/>
         <p:txBody>
-          <a:bodyPr>
-            <a:normAutofit/>
-          </a:bodyPr>
-          <a:lstStyle/>
-          <a:p>
-            <a:r>
-              <a:rPr lang="en-US" dirty="0" smtClean="0"/>
-              <a:t>Characteristics</a:t>
-            </a:r>
-          </a:p>
-          <a:p>
-            <a:pPr lvl="1"/>
-            <a:r>
-              <a:rPr lang="en-US" dirty="0" smtClean="0"/>
-              <a:t>access: only top</a:t>
-            </a:r>
-          </a:p>
-          <a:p>
-            <a:pPr lvl="1"/>
-            <a:r>
-              <a:rPr lang="en-US" dirty="0" smtClean="0"/>
-              <a:t>ordered</a:t>
-            </a:r>
-          </a:p>
-          <a:p>
-            <a:pPr lvl="1"/>
-            <a:r>
-              <a:rPr lang="en-US" dirty="0" smtClean="0"/>
-              <a:t>length can vary</a:t>
-            </a:r>
-          </a:p>
-          <a:p>
-            <a:pPr lvl="1"/>
-            <a:r>
-              <a:rPr lang="en-US" dirty="0" smtClean="0"/>
-              <a:t>push/peek/pull: O(1)</a:t>
-            </a:r>
-          </a:p>
-          <a:p>
-            <a:pPr lvl="1"/>
-            <a:r>
-              <a:rPr lang="en-US" dirty="0" smtClean="0"/>
-              <a:t>element type: any</a:t>
-            </a:r>
-          </a:p>
-          <a:p>
-            <a:r>
-              <a:rPr lang="en-US" dirty="0" smtClean="0"/>
-              <a:t>Implementations</a:t>
-            </a:r>
-          </a:p>
-          <a:p>
-            <a:pPr lvl="1"/>
-            <a:r>
-              <a:rPr lang="en-US" dirty="0" smtClean="0"/>
-              <a:t>as list</a:t>
-            </a:r>
-          </a:p>
-          <a:p>
-            <a:pPr lvl="1"/>
-            <a:endParaRPr lang="en-US" dirty="0"/>
-          </a:p>
-        </p:txBody>
-      </p:sp>
-      <p:sp>
-        <p:nvSpPr>
-          <p:cNvPr id="7" name="Slide Number Placeholder 6"/>
+          <a:bodyPr/>
+          <a:lstStyle/>
+          <a:p>
+            <a:endParaRPr lang="en-US"/>
+          </a:p>
+        </p:txBody>
+      </p:sp>
+      <p:sp>
+        <p:nvSpPr>
+          <p:cNvPr id="3" name="Slide Number Placeholder 2"/>
           <p:cNvSpPr>
             <a:spLocks noGrp="1"/>
           </p:cNvSpPr>
@@ -8968,7 +9348,1353 @@
     </p:spTree>
     <p:extLst>
       <p:ext uri="{BB962C8B-B14F-4D97-AF65-F5344CB8AC3E}">
+        <p14:creationId xmlns:p14="http://schemas.microsoft.com/office/powerpoint/2010/main" val="3769330791"/>
+      </p:ext>
+    </p:extLst>
+  </p:cSld>
+  <p:clrMapOvr>
+    <a:masterClrMapping/>
+  </p:clrMapOvr>
+  <p:timing>
+    <p:tnLst>
+      <p:par>
+        <p:cTn id="1" dur="indefinite" restart="never" nodeType="tmRoot"/>
+      </p:par>
+    </p:tnLst>
+  </p:timing>
+</p:sld>
+</file>
+
+<file path=ppt/slides/slide25.xml><?xml version="1.0" encoding="utf-8"?>
+<p:sld xmlns:a="http://schemas.openxmlformats.org/drawingml/2006/main" xmlns:r="http://schemas.openxmlformats.org/officeDocument/2006/relationships" xmlns:p="http://schemas.openxmlformats.org/presentationml/2006/main">
+  <p:cSld>
+    <p:spTree>
+      <p:nvGrpSpPr>
+        <p:cNvPr id="1" name=""/>
+        <p:cNvGrpSpPr/>
+        <p:nvPr/>
+      </p:nvGrpSpPr>
+      <p:grpSpPr>
+        <a:xfrm>
+          <a:off x="0" y="0"/>
+          <a:ext cx="0" cy="0"/>
+          <a:chOff x="0" y="0"/>
+          <a:chExt cx="0" cy="0"/>
+        </a:xfrm>
+      </p:grpSpPr>
+      <p:sp>
+        <p:nvSpPr>
+          <p:cNvPr id="2" name="Title 1"/>
+          <p:cNvSpPr>
+            <a:spLocks noGrp="1"/>
+          </p:cNvSpPr>
+          <p:nvPr>
+            <p:ph type="title"/>
+          </p:nvPr>
+        </p:nvSpPr>
+        <p:spPr/>
+        <p:txBody>
+          <a:bodyPr/>
+          <a:lstStyle/>
+          <a:p>
+            <a:r>
+              <a:rPr lang="en-US" dirty="0" smtClean="0"/>
+              <a:t>Stack</a:t>
+            </a:r>
+            <a:endParaRPr lang="en-US" dirty="0"/>
+          </a:p>
+        </p:txBody>
+      </p:sp>
+      <p:sp>
+        <p:nvSpPr>
+          <p:cNvPr id="3" name="Content Placeholder 2"/>
+          <p:cNvSpPr>
+            <a:spLocks noGrp="1"/>
+          </p:cNvSpPr>
+          <p:nvPr>
+            <p:ph idx="1"/>
+          </p:nvPr>
+        </p:nvSpPr>
+        <p:spPr/>
+        <p:txBody>
+          <a:bodyPr>
+            <a:normAutofit/>
+          </a:bodyPr>
+          <a:lstStyle/>
+          <a:p>
+            <a:r>
+              <a:rPr lang="en-US" dirty="0" smtClean="0"/>
+              <a:t>Characteristics</a:t>
+            </a:r>
+          </a:p>
+          <a:p>
+            <a:pPr lvl="1"/>
+            <a:r>
+              <a:rPr lang="en-US" dirty="0" smtClean="0"/>
+              <a:t>access: only top</a:t>
+            </a:r>
+          </a:p>
+          <a:p>
+            <a:pPr lvl="1"/>
+            <a:r>
+              <a:rPr lang="en-US" dirty="0" smtClean="0"/>
+              <a:t>ordered</a:t>
+            </a:r>
+          </a:p>
+          <a:p>
+            <a:pPr lvl="1"/>
+            <a:r>
+              <a:rPr lang="en-US" dirty="0" smtClean="0"/>
+              <a:t>length can vary</a:t>
+            </a:r>
+          </a:p>
+          <a:p>
+            <a:pPr lvl="1"/>
+            <a:r>
+              <a:rPr lang="en-US" dirty="0" smtClean="0"/>
+              <a:t>push/peek/pull: O(1)</a:t>
+            </a:r>
+          </a:p>
+          <a:p>
+            <a:pPr lvl="1"/>
+            <a:r>
+              <a:rPr lang="en-US" dirty="0" smtClean="0"/>
+              <a:t>element type: any</a:t>
+            </a:r>
+          </a:p>
+          <a:p>
+            <a:r>
+              <a:rPr lang="en-US" dirty="0" smtClean="0"/>
+              <a:t>Implementations</a:t>
+            </a:r>
+          </a:p>
+          <a:p>
+            <a:pPr lvl="1"/>
+            <a:r>
+              <a:rPr lang="en-US" dirty="0" smtClean="0"/>
+              <a:t>as list</a:t>
+            </a:r>
+          </a:p>
+          <a:p>
+            <a:pPr lvl="1"/>
+            <a:endParaRPr lang="en-US" dirty="0"/>
+          </a:p>
+        </p:txBody>
+      </p:sp>
+      <p:sp>
+        <p:nvSpPr>
+          <p:cNvPr id="7" name="Slide Number Placeholder 6"/>
+          <p:cNvSpPr>
+            <a:spLocks noGrp="1"/>
+          </p:cNvSpPr>
+          <p:nvPr>
+            <p:ph type="sldNum" sz="quarter" idx="12"/>
+          </p:nvPr>
+        </p:nvSpPr>
+        <p:spPr/>
+        <p:txBody>
+          <a:bodyPr/>
+          <a:lstStyle/>
+          <a:p>
+            <a:fld id="{11AD1F4E-1E51-402E-B221-310F004E7D3B}" type="slidenum">
+              <a:rPr lang="en-US" smtClean="0"/>
+              <a:t>25</a:t>
+            </a:fld>
+            <a:endParaRPr lang="en-US"/>
+          </a:p>
+        </p:txBody>
+      </p:sp>
+    </p:spTree>
+    <p:extLst>
+      <p:ext uri="{BB962C8B-B14F-4D97-AF65-F5344CB8AC3E}">
         <p14:creationId xmlns:p14="http://schemas.microsoft.com/office/powerpoint/2010/main" val="3540411585"/>
+      </p:ext>
+    </p:extLst>
+  </p:cSld>
+  <p:clrMapOvr>
+    <a:masterClrMapping/>
+  </p:clrMapOvr>
+  <p:timing>
+    <p:tnLst>
+      <p:par>
+        <p:cTn id="1" dur="indefinite" restart="never" nodeType="tmRoot"/>
+      </p:par>
+    </p:tnLst>
+  </p:timing>
+</p:sld>
+</file>
+
+<file path=ppt/slides/slide26.xml><?xml version="1.0" encoding="utf-8"?>
+<p:sld xmlns:a="http://schemas.openxmlformats.org/drawingml/2006/main" xmlns:r="http://schemas.openxmlformats.org/officeDocument/2006/relationships" xmlns:p="http://schemas.openxmlformats.org/presentationml/2006/main">
+  <p:cSld>
+    <p:spTree>
+      <p:nvGrpSpPr>
+        <p:cNvPr id="1" name=""/>
+        <p:cNvGrpSpPr/>
+        <p:nvPr/>
+      </p:nvGrpSpPr>
+      <p:grpSpPr>
+        <a:xfrm>
+          <a:off x="0" y="0"/>
+          <a:ext cx="0" cy="0"/>
+          <a:chOff x="0" y="0"/>
+          <a:chExt cx="0" cy="0"/>
+        </a:xfrm>
+      </p:grpSpPr>
+      <p:sp>
+        <p:nvSpPr>
+          <p:cNvPr id="2" name="Title 1"/>
+          <p:cNvSpPr>
+            <a:spLocks noGrp="1"/>
+          </p:cNvSpPr>
+          <p:nvPr>
+            <p:ph type="title"/>
+          </p:nvPr>
+        </p:nvSpPr>
+        <p:spPr/>
+        <p:txBody>
+          <a:bodyPr/>
+          <a:lstStyle/>
+          <a:p>
+            <a:r>
+              <a:rPr lang="en-US" dirty="0" smtClean="0"/>
+              <a:t>Stack ADT</a:t>
+            </a:r>
+            <a:endParaRPr lang="en-US" dirty="0"/>
+          </a:p>
+        </p:txBody>
+      </p:sp>
+      <p:sp>
+        <p:nvSpPr>
+          <p:cNvPr id="3" name="Content Placeholder 2"/>
+          <p:cNvSpPr>
+            <a:spLocks noGrp="1"/>
+          </p:cNvSpPr>
+          <p:nvPr>
+            <p:ph idx="1"/>
+          </p:nvPr>
+        </p:nvSpPr>
+        <p:spPr/>
+        <p:txBody>
+          <a:bodyPr/>
+          <a:lstStyle/>
+          <a:p>
+            <a:r>
+              <a:rPr lang="en-US" dirty="0" smtClean="0"/>
+              <a:t>EMPTY_STACK()</a:t>
+            </a:r>
+            <a:r>
+              <a:rPr lang="en-US" dirty="0"/>
+              <a:t> </a:t>
+            </a:r>
+            <a:r>
+              <a:rPr lang="en-US" dirty="0">
+                <a:sym typeface="Symbol" panose="05050102010706020507" pitchFamily="18" charset="2"/>
+              </a:rPr>
+              <a:t> </a:t>
+            </a:r>
+            <a:r>
+              <a:rPr lang="en-US" dirty="0" smtClean="0">
+                <a:sym typeface="Symbol" panose="05050102010706020507" pitchFamily="18" charset="2"/>
+              </a:rPr>
+              <a:t>stack</a:t>
+            </a:r>
+          </a:p>
+          <a:p>
+            <a:r>
+              <a:rPr lang="en-US" dirty="0" smtClean="0">
+                <a:sym typeface="Symbol" panose="05050102010706020507" pitchFamily="18" charset="2"/>
+              </a:rPr>
+              <a:t>STACK.PUSH(value)</a:t>
+            </a:r>
+          </a:p>
+          <a:p>
+            <a:r>
+              <a:rPr lang="en-US" dirty="0" smtClean="0">
+                <a:sym typeface="Symbol" panose="05050102010706020507" pitchFamily="18" charset="2"/>
+              </a:rPr>
+              <a:t>STACK.POP()</a:t>
+            </a:r>
+          </a:p>
+          <a:p>
+            <a:r>
+              <a:rPr lang="en-US" dirty="0" smtClean="0">
+                <a:sym typeface="Symbol" panose="05050102010706020507" pitchFamily="18" charset="2"/>
+              </a:rPr>
+              <a:t>STACK.TOP()</a:t>
+            </a:r>
+            <a:r>
+              <a:rPr lang="en-US" dirty="0"/>
+              <a:t> </a:t>
+            </a:r>
+            <a:r>
+              <a:rPr lang="en-US" dirty="0">
+                <a:sym typeface="Symbol" panose="05050102010706020507" pitchFamily="18" charset="2"/>
+              </a:rPr>
+              <a:t> </a:t>
+            </a:r>
+            <a:r>
+              <a:rPr lang="en-US" dirty="0" smtClean="0">
+                <a:sym typeface="Symbol" panose="05050102010706020507" pitchFamily="18" charset="2"/>
+              </a:rPr>
+              <a:t>value</a:t>
+            </a:r>
+          </a:p>
+          <a:p>
+            <a:r>
+              <a:rPr lang="en-US" dirty="0" smtClean="0">
+                <a:sym typeface="Symbol" panose="05050102010706020507" pitchFamily="18" charset="2"/>
+              </a:rPr>
+              <a:t>STACK.IS_EMPTY()</a:t>
+            </a:r>
+            <a:r>
+              <a:rPr lang="en-US" dirty="0"/>
+              <a:t> </a:t>
+            </a:r>
+            <a:r>
+              <a:rPr lang="en-US" dirty="0">
+                <a:sym typeface="Symbol" panose="05050102010706020507" pitchFamily="18" charset="2"/>
+              </a:rPr>
+              <a:t> </a:t>
+            </a:r>
+            <a:r>
+              <a:rPr lang="en-US" dirty="0" smtClean="0">
+                <a:sym typeface="Symbol" panose="05050102010706020507" pitchFamily="18" charset="2"/>
+              </a:rPr>
+              <a:t>Boolean</a:t>
+            </a:r>
+          </a:p>
+          <a:p>
+            <a:r>
+              <a:rPr lang="en-US" dirty="0" smtClean="0">
+                <a:sym typeface="Symbol" panose="05050102010706020507" pitchFamily="18" charset="2"/>
+              </a:rPr>
+              <a:t>STACK.SIZE()</a:t>
+            </a:r>
+            <a:r>
+              <a:rPr lang="en-US" dirty="0"/>
+              <a:t> </a:t>
+            </a:r>
+            <a:r>
+              <a:rPr lang="en-US" dirty="0">
+                <a:sym typeface="Symbol" panose="05050102010706020507" pitchFamily="18" charset="2"/>
+              </a:rPr>
+              <a:t> </a:t>
+            </a:r>
+            <a:r>
+              <a:rPr lang="en-US" dirty="0" smtClean="0">
+                <a:sym typeface="Symbol" panose="05050102010706020507" pitchFamily="18" charset="2"/>
+              </a:rPr>
+              <a:t>size</a:t>
+            </a:r>
+            <a:endParaRPr lang="en-US" dirty="0"/>
+          </a:p>
+        </p:txBody>
+      </p:sp>
+      <p:sp>
+        <p:nvSpPr>
+          <p:cNvPr id="4" name="Slide Number Placeholder 3"/>
+          <p:cNvSpPr>
+            <a:spLocks noGrp="1"/>
+          </p:cNvSpPr>
+          <p:nvPr>
+            <p:ph type="sldNum" sz="quarter" idx="12"/>
+          </p:nvPr>
+        </p:nvSpPr>
+        <p:spPr/>
+        <p:txBody>
+          <a:bodyPr/>
+          <a:lstStyle/>
+          <a:p>
+            <a:fld id="{11AD1F4E-1E51-402E-B221-310F004E7D3B}" type="slidenum">
+              <a:rPr lang="en-US" smtClean="0"/>
+              <a:t>26</a:t>
+            </a:fld>
+            <a:endParaRPr lang="en-US"/>
+          </a:p>
+        </p:txBody>
+      </p:sp>
+    </p:spTree>
+    <p:extLst>
+      <p:ext uri="{BB962C8B-B14F-4D97-AF65-F5344CB8AC3E}">
+        <p14:creationId xmlns:p14="http://schemas.microsoft.com/office/powerpoint/2010/main" val="3731668153"/>
+      </p:ext>
+    </p:extLst>
+  </p:cSld>
+  <p:clrMapOvr>
+    <a:masterClrMapping/>
+  </p:clrMapOvr>
+  <p:timing>
+    <p:tnLst>
+      <p:par>
+        <p:cTn id="1" dur="indefinite" restart="never" nodeType="tmRoot"/>
+      </p:par>
+    </p:tnLst>
+  </p:timing>
+</p:sld>
+</file>
+
+<file path=ppt/slides/slide27.xml><?xml version="1.0" encoding="utf-8"?>
+<p:sld xmlns:a="http://schemas.openxmlformats.org/drawingml/2006/main" xmlns:r="http://schemas.openxmlformats.org/officeDocument/2006/relationships" xmlns:p="http://schemas.openxmlformats.org/presentationml/2006/main">
+  <p:cSld>
+    <p:spTree>
+      <p:nvGrpSpPr>
+        <p:cNvPr id="1" name=""/>
+        <p:cNvGrpSpPr/>
+        <p:nvPr/>
+      </p:nvGrpSpPr>
+      <p:grpSpPr>
+        <a:xfrm>
+          <a:off x="0" y="0"/>
+          <a:ext cx="0" cy="0"/>
+          <a:chOff x="0" y="0"/>
+          <a:chExt cx="0" cy="0"/>
+        </a:xfrm>
+      </p:grpSpPr>
+      <p:sp>
+        <p:nvSpPr>
+          <p:cNvPr id="2" name="Title 1"/>
+          <p:cNvSpPr>
+            <a:spLocks noGrp="1"/>
+          </p:cNvSpPr>
+          <p:nvPr>
+            <p:ph type="title"/>
+          </p:nvPr>
+        </p:nvSpPr>
+        <p:spPr/>
+        <p:txBody>
+          <a:bodyPr/>
+          <a:lstStyle/>
+          <a:p>
+            <a:r>
+              <a:rPr lang="en-US" dirty="0" smtClean="0"/>
+              <a:t>Stack examples</a:t>
+            </a:r>
+            <a:endParaRPr lang="en-US" dirty="0"/>
+          </a:p>
+        </p:txBody>
+      </p:sp>
+      <p:sp>
+        <p:nvSpPr>
+          <p:cNvPr id="4" name="Slide Number Placeholder 3"/>
+          <p:cNvSpPr>
+            <a:spLocks noGrp="1"/>
+          </p:cNvSpPr>
+          <p:nvPr>
+            <p:ph type="sldNum" sz="quarter" idx="12"/>
+          </p:nvPr>
+        </p:nvSpPr>
+        <p:spPr/>
+        <p:txBody>
+          <a:bodyPr/>
+          <a:lstStyle/>
+          <a:p>
+            <a:fld id="{11AD1F4E-1E51-402E-B221-310F004E7D3B}" type="slidenum">
+              <a:rPr lang="en-US" smtClean="0"/>
+              <a:t>27</a:t>
+            </a:fld>
+            <a:endParaRPr lang="en-US"/>
+          </a:p>
+        </p:txBody>
+      </p:sp>
+      <p:sp>
+        <p:nvSpPr>
+          <p:cNvPr id="5" name="TextBox 4"/>
+          <p:cNvSpPr txBox="1"/>
+          <p:nvPr/>
+        </p:nvSpPr>
+        <p:spPr>
+          <a:xfrm>
+            <a:off x="628650" y="1704105"/>
+            <a:ext cx="6665768" cy="2585323"/>
+          </a:xfrm>
+          <a:prstGeom prst="rect">
+            <a:avLst/>
+          </a:prstGeom>
+          <a:solidFill>
+            <a:schemeClr val="tx2">
+              <a:lumMod val="40000"/>
+              <a:lumOff val="60000"/>
+            </a:schemeClr>
+          </a:solidFill>
+          <a:ln>
+            <a:solidFill>
+              <a:schemeClr val="tx1"/>
+            </a:solidFill>
+          </a:ln>
+        </p:spPr>
+        <p:txBody>
+          <a:bodyPr wrap="square" rtlCol="0">
+            <a:spAutoFit/>
+          </a:bodyPr>
+          <a:lstStyle/>
+          <a:p>
+            <a:r>
+              <a:rPr lang="en-US" dirty="0" smtClean="0">
+                <a:latin typeface="Courier New" panose="02070309020205020404" pitchFamily="49" charset="0"/>
+                <a:cs typeface="Courier New" panose="02070309020205020404" pitchFamily="49" charset="0"/>
+              </a:rPr>
+              <a:t>#include &lt;</a:t>
+            </a:r>
+            <a:r>
+              <a:rPr lang="en-US" dirty="0" err="1" smtClean="0">
+                <a:latin typeface="Courier New" panose="02070309020205020404" pitchFamily="49" charset="0"/>
+                <a:cs typeface="Courier New" panose="02070309020205020404" pitchFamily="49" charset="0"/>
+              </a:rPr>
+              <a:t>iostream</a:t>
+            </a:r>
+            <a:r>
+              <a:rPr lang="en-US" dirty="0" smtClean="0">
+                <a:latin typeface="Courier New" panose="02070309020205020404" pitchFamily="49" charset="0"/>
+                <a:cs typeface="Courier New" panose="02070309020205020404" pitchFamily="49" charset="0"/>
+              </a:rPr>
+              <a:t>&gt;</a:t>
+            </a:r>
+          </a:p>
+          <a:p>
+            <a:r>
+              <a:rPr lang="en-US" dirty="0" smtClean="0">
+                <a:latin typeface="Courier New" panose="02070309020205020404" pitchFamily="49" charset="0"/>
+                <a:cs typeface="Courier New" panose="02070309020205020404" pitchFamily="49" charset="0"/>
+              </a:rPr>
+              <a:t>#include </a:t>
+            </a:r>
+            <a:r>
+              <a:rPr lang="en-US" dirty="0" smtClean="0">
+                <a:latin typeface="Courier New" panose="02070309020205020404" pitchFamily="49" charset="0"/>
+                <a:cs typeface="Courier New" panose="02070309020205020404" pitchFamily="49" charset="0"/>
+              </a:rPr>
+              <a:t>&lt;stack&gt;</a:t>
+            </a:r>
+            <a:endParaRPr lang="en-US" dirty="0" smtClean="0">
+              <a:latin typeface="Courier New" panose="02070309020205020404" pitchFamily="49" charset="0"/>
+              <a:cs typeface="Courier New" panose="02070309020205020404" pitchFamily="49" charset="0"/>
+            </a:endParaRPr>
+          </a:p>
+          <a:p>
+            <a:r>
+              <a:rPr lang="en-US" dirty="0" err="1" smtClean="0">
+                <a:latin typeface="Courier New" panose="02070309020205020404" pitchFamily="49" charset="0"/>
+                <a:cs typeface="Courier New" panose="02070309020205020404" pitchFamily="49" charset="0"/>
+              </a:rPr>
+              <a:t>std</a:t>
+            </a:r>
+            <a:r>
+              <a:rPr lang="en-US" dirty="0" smtClean="0">
+                <a:latin typeface="Courier New" panose="02070309020205020404" pitchFamily="49" charset="0"/>
+                <a:cs typeface="Courier New" panose="02070309020205020404" pitchFamily="49" charset="0"/>
+              </a:rPr>
+              <a:t>::stack&lt;</a:t>
+            </a:r>
+            <a:r>
+              <a:rPr lang="en-US" dirty="0" err="1" smtClean="0">
+                <a:latin typeface="Courier New" panose="02070309020205020404" pitchFamily="49" charset="0"/>
+                <a:cs typeface="Courier New" panose="02070309020205020404" pitchFamily="49" charset="0"/>
+              </a:rPr>
+              <a:t>int</a:t>
+            </a:r>
+            <a:r>
+              <a:rPr lang="en-US" dirty="0" smtClean="0">
+                <a:latin typeface="Courier New" panose="02070309020205020404" pitchFamily="49" charset="0"/>
+                <a:cs typeface="Courier New" panose="02070309020205020404" pitchFamily="49" charset="0"/>
+              </a:rPr>
+              <a:t>&gt; </a:t>
+            </a:r>
+            <a:r>
+              <a:rPr lang="en-US" dirty="0" smtClean="0">
+                <a:latin typeface="Courier New" panose="02070309020205020404" pitchFamily="49" charset="0"/>
+                <a:cs typeface="Courier New" panose="02070309020205020404" pitchFamily="49" charset="0"/>
+              </a:rPr>
+              <a:t>s;</a:t>
+            </a:r>
+            <a:endParaRPr lang="en-US" dirty="0" smtClean="0">
+              <a:latin typeface="Courier New" panose="02070309020205020404" pitchFamily="49" charset="0"/>
+              <a:cs typeface="Courier New" panose="02070309020205020404" pitchFamily="49" charset="0"/>
+            </a:endParaRPr>
+          </a:p>
+          <a:p>
+            <a:r>
+              <a:rPr lang="en-US" dirty="0" smtClean="0">
+                <a:latin typeface="Courier New" panose="02070309020205020404" pitchFamily="49" charset="0"/>
+                <a:cs typeface="Courier New" panose="02070309020205020404" pitchFamily="49" charset="0"/>
+              </a:rPr>
+              <a:t>for (</a:t>
+            </a:r>
+            <a:r>
+              <a:rPr lang="en-US" dirty="0" err="1" smtClean="0">
+                <a:latin typeface="Courier New" panose="02070309020205020404" pitchFamily="49" charset="0"/>
+                <a:cs typeface="Courier New" panose="02070309020205020404" pitchFamily="49" charset="0"/>
+              </a:rPr>
+              <a:t>i</a:t>
+            </a:r>
+            <a:r>
+              <a:rPr lang="en-US" dirty="0" smtClean="0">
+                <a:latin typeface="Courier New" panose="02070309020205020404" pitchFamily="49" charset="0"/>
+                <a:cs typeface="Courier New" panose="02070309020205020404" pitchFamily="49" charset="0"/>
+              </a:rPr>
+              <a:t> = 0; </a:t>
+            </a:r>
+            <a:r>
+              <a:rPr lang="en-US" dirty="0" err="1" smtClean="0">
+                <a:latin typeface="Courier New" panose="02070309020205020404" pitchFamily="49" charset="0"/>
+                <a:cs typeface="Courier New" panose="02070309020205020404" pitchFamily="49" charset="0"/>
+              </a:rPr>
+              <a:t>i</a:t>
+            </a:r>
+            <a:r>
+              <a:rPr lang="en-US" dirty="0" smtClean="0">
+                <a:latin typeface="Courier New" panose="02070309020205020404" pitchFamily="49" charset="0"/>
+                <a:cs typeface="Courier New" panose="02070309020205020404" pitchFamily="49" charset="0"/>
+              </a:rPr>
+              <a:t> &lt; 10; </a:t>
+            </a:r>
+            <a:r>
+              <a:rPr lang="en-US" dirty="0" err="1" smtClean="0">
+                <a:latin typeface="Courier New" panose="02070309020205020404" pitchFamily="49" charset="0"/>
+                <a:cs typeface="Courier New" panose="02070309020205020404" pitchFamily="49" charset="0"/>
+              </a:rPr>
+              <a:t>i</a:t>
+            </a:r>
+            <a:r>
+              <a:rPr lang="en-US" dirty="0" smtClean="0">
+                <a:latin typeface="Courier New" panose="02070309020205020404" pitchFamily="49" charset="0"/>
+                <a:cs typeface="Courier New" panose="02070309020205020404" pitchFamily="49" charset="0"/>
+              </a:rPr>
+              <a:t>++)</a:t>
+            </a:r>
+          </a:p>
+          <a:p>
+            <a:r>
+              <a:rPr lang="en-US" dirty="0">
+                <a:latin typeface="Courier New" panose="02070309020205020404" pitchFamily="49" charset="0"/>
+                <a:cs typeface="Courier New" panose="02070309020205020404" pitchFamily="49" charset="0"/>
+              </a:rPr>
+              <a:t> </a:t>
+            </a:r>
+            <a:r>
+              <a:rPr lang="en-US" dirty="0" smtClean="0">
+                <a:latin typeface="Courier New" panose="02070309020205020404" pitchFamily="49" charset="0"/>
+                <a:cs typeface="Courier New" panose="02070309020205020404" pitchFamily="49" charset="0"/>
+              </a:rPr>
+              <a:t>   </a:t>
+            </a:r>
+            <a:r>
+              <a:rPr lang="en-US" dirty="0" err="1" smtClean="0">
+                <a:latin typeface="Courier New" panose="02070309020205020404" pitchFamily="49" charset="0"/>
+                <a:cs typeface="Courier New" panose="02070309020205020404" pitchFamily="49" charset="0"/>
+              </a:rPr>
+              <a:t>s</a:t>
+            </a:r>
+            <a:r>
+              <a:rPr lang="en-US" dirty="0" err="1" smtClean="0">
+                <a:latin typeface="Courier New" panose="02070309020205020404" pitchFamily="49" charset="0"/>
+                <a:cs typeface="Courier New" panose="02070309020205020404" pitchFamily="49" charset="0"/>
+              </a:rPr>
+              <a:t>.push</a:t>
+            </a:r>
+            <a:r>
+              <a:rPr lang="en-US" dirty="0" smtClean="0">
+                <a:latin typeface="Courier New" panose="02070309020205020404" pitchFamily="49" charset="0"/>
+                <a:cs typeface="Courier New" panose="02070309020205020404" pitchFamily="49" charset="0"/>
+              </a:rPr>
+              <a:t>(</a:t>
+            </a:r>
+            <a:r>
+              <a:rPr lang="en-US" dirty="0" err="1" smtClean="0">
+                <a:latin typeface="Courier New" panose="02070309020205020404" pitchFamily="49" charset="0"/>
+                <a:cs typeface="Courier New" panose="02070309020205020404" pitchFamily="49" charset="0"/>
+              </a:rPr>
+              <a:t>i</a:t>
+            </a:r>
+            <a:r>
+              <a:rPr lang="en-US" dirty="0" smtClean="0">
+                <a:latin typeface="Courier New" panose="02070309020205020404" pitchFamily="49" charset="0"/>
+                <a:cs typeface="Courier New" panose="02070309020205020404" pitchFamily="49" charset="0"/>
+              </a:rPr>
+              <a:t>);</a:t>
+            </a:r>
+          </a:p>
+          <a:p>
+            <a:r>
+              <a:rPr lang="en-US" dirty="0" smtClean="0">
+                <a:latin typeface="Courier New" panose="02070309020205020404" pitchFamily="49" charset="0"/>
+                <a:cs typeface="Courier New" panose="02070309020205020404" pitchFamily="49" charset="0"/>
+              </a:rPr>
+              <a:t>while (!</a:t>
+            </a:r>
+            <a:r>
+              <a:rPr lang="en-US" dirty="0" err="1" smtClean="0">
+                <a:latin typeface="Courier New" panose="02070309020205020404" pitchFamily="49" charset="0"/>
+                <a:cs typeface="Courier New" panose="02070309020205020404" pitchFamily="49" charset="0"/>
+              </a:rPr>
+              <a:t>s.empty</a:t>
+            </a:r>
+            <a:r>
+              <a:rPr lang="en-US" dirty="0" smtClean="0">
+                <a:latin typeface="Courier New" panose="02070309020205020404" pitchFamily="49" charset="0"/>
+                <a:cs typeface="Courier New" panose="02070309020205020404" pitchFamily="49" charset="0"/>
+              </a:rPr>
+              <a:t>()) {</a:t>
+            </a:r>
+            <a:endParaRPr lang="en-US" dirty="0">
+              <a:latin typeface="Courier New" panose="02070309020205020404" pitchFamily="49" charset="0"/>
+              <a:cs typeface="Courier New" panose="02070309020205020404" pitchFamily="49" charset="0"/>
+            </a:endParaRPr>
+          </a:p>
+          <a:p>
+            <a:r>
+              <a:rPr lang="en-US" dirty="0" smtClean="0">
+                <a:latin typeface="Courier New" panose="02070309020205020404" pitchFamily="49" charset="0"/>
+                <a:cs typeface="Courier New" panose="02070309020205020404" pitchFamily="49" charset="0"/>
+              </a:rPr>
+              <a:t>    </a:t>
+            </a:r>
+            <a:r>
+              <a:rPr lang="en-US" dirty="0" err="1">
+                <a:latin typeface="Courier New" panose="02070309020205020404" pitchFamily="49" charset="0"/>
+                <a:cs typeface="Courier New" panose="02070309020205020404" pitchFamily="49" charset="0"/>
+              </a:rPr>
+              <a:t>std</a:t>
+            </a:r>
+            <a:r>
+              <a:rPr lang="en-US" dirty="0">
+                <a:latin typeface="Courier New" panose="02070309020205020404" pitchFamily="49" charset="0"/>
+                <a:cs typeface="Courier New" panose="02070309020205020404" pitchFamily="49" charset="0"/>
+              </a:rPr>
+              <a:t>::</a:t>
+            </a:r>
+            <a:r>
+              <a:rPr lang="en-US" dirty="0" err="1">
+                <a:latin typeface="Courier New" panose="02070309020205020404" pitchFamily="49" charset="0"/>
+                <a:cs typeface="Courier New" panose="02070309020205020404" pitchFamily="49" charset="0"/>
+              </a:rPr>
+              <a:t>cout</a:t>
+            </a:r>
+            <a:r>
+              <a:rPr lang="en-US" dirty="0">
+                <a:latin typeface="Courier New" panose="02070309020205020404" pitchFamily="49" charset="0"/>
+                <a:cs typeface="Courier New" panose="02070309020205020404" pitchFamily="49" charset="0"/>
+              </a:rPr>
+              <a:t> &lt;&lt; </a:t>
+            </a:r>
+            <a:r>
+              <a:rPr lang="en-US" dirty="0" err="1" smtClean="0">
+                <a:latin typeface="Courier New" panose="02070309020205020404" pitchFamily="49" charset="0"/>
+                <a:cs typeface="Courier New" panose="02070309020205020404" pitchFamily="49" charset="0"/>
+              </a:rPr>
+              <a:t>s.top</a:t>
+            </a:r>
+            <a:r>
+              <a:rPr lang="en-US" dirty="0" smtClean="0">
+                <a:latin typeface="Courier New" panose="02070309020205020404" pitchFamily="49" charset="0"/>
+                <a:cs typeface="Courier New" panose="02070309020205020404" pitchFamily="49" charset="0"/>
+              </a:rPr>
+              <a:t>()</a:t>
+            </a:r>
+            <a:r>
+              <a:rPr lang="en-US" dirty="0" smtClean="0">
+                <a:latin typeface="Courier New" panose="02070309020205020404" pitchFamily="49" charset="0"/>
+                <a:cs typeface="Courier New" panose="02070309020205020404" pitchFamily="49" charset="0"/>
+              </a:rPr>
+              <a:t> </a:t>
+            </a:r>
+            <a:r>
+              <a:rPr lang="en-US" dirty="0">
+                <a:latin typeface="Courier New" panose="02070309020205020404" pitchFamily="49" charset="0"/>
+                <a:cs typeface="Courier New" panose="02070309020205020404" pitchFamily="49" charset="0"/>
+              </a:rPr>
+              <a:t>&lt;&lt; </a:t>
+            </a:r>
+            <a:r>
+              <a:rPr lang="en-US" dirty="0" err="1">
+                <a:latin typeface="Courier New" panose="02070309020205020404" pitchFamily="49" charset="0"/>
+                <a:cs typeface="Courier New" panose="02070309020205020404" pitchFamily="49" charset="0"/>
+              </a:rPr>
+              <a:t>std</a:t>
+            </a:r>
+            <a:r>
+              <a:rPr lang="en-US" dirty="0">
+                <a:latin typeface="Courier New" panose="02070309020205020404" pitchFamily="49" charset="0"/>
+                <a:cs typeface="Courier New" panose="02070309020205020404" pitchFamily="49" charset="0"/>
+              </a:rPr>
+              <a:t>::</a:t>
+            </a:r>
+            <a:r>
+              <a:rPr lang="en-US" dirty="0" err="1">
+                <a:latin typeface="Courier New" panose="02070309020205020404" pitchFamily="49" charset="0"/>
+                <a:cs typeface="Courier New" panose="02070309020205020404" pitchFamily="49" charset="0"/>
+              </a:rPr>
+              <a:t>endl</a:t>
+            </a:r>
+            <a:r>
+              <a:rPr lang="en-US" dirty="0" smtClean="0">
+                <a:latin typeface="Courier New" panose="02070309020205020404" pitchFamily="49" charset="0"/>
+                <a:cs typeface="Courier New" panose="02070309020205020404" pitchFamily="49" charset="0"/>
+              </a:rPr>
+              <a:t>;</a:t>
+            </a:r>
+          </a:p>
+          <a:p>
+            <a:r>
+              <a:rPr lang="en-US" dirty="0">
+                <a:latin typeface="Courier New" panose="02070309020205020404" pitchFamily="49" charset="0"/>
+                <a:cs typeface="Courier New" panose="02070309020205020404" pitchFamily="49" charset="0"/>
+              </a:rPr>
+              <a:t> </a:t>
+            </a:r>
+            <a:r>
+              <a:rPr lang="en-US" dirty="0" smtClean="0">
+                <a:latin typeface="Courier New" panose="02070309020205020404" pitchFamily="49" charset="0"/>
+                <a:cs typeface="Courier New" panose="02070309020205020404" pitchFamily="49" charset="0"/>
+              </a:rPr>
+              <a:t>   </a:t>
+            </a:r>
+            <a:r>
+              <a:rPr lang="en-US" dirty="0" err="1" smtClean="0">
+                <a:latin typeface="Courier New" panose="02070309020205020404" pitchFamily="49" charset="0"/>
+                <a:cs typeface="Courier New" panose="02070309020205020404" pitchFamily="49" charset="0"/>
+              </a:rPr>
+              <a:t>s.pop</a:t>
+            </a:r>
+            <a:r>
+              <a:rPr lang="en-US" dirty="0" smtClean="0">
+                <a:latin typeface="Courier New" panose="02070309020205020404" pitchFamily="49" charset="0"/>
+                <a:cs typeface="Courier New" panose="02070309020205020404" pitchFamily="49" charset="0"/>
+              </a:rPr>
+              <a:t>();</a:t>
+            </a:r>
+          </a:p>
+          <a:p>
+            <a:r>
+              <a:rPr lang="en-US" dirty="0">
+                <a:latin typeface="Courier New" panose="02070309020205020404" pitchFamily="49" charset="0"/>
+                <a:cs typeface="Courier New" panose="02070309020205020404" pitchFamily="49" charset="0"/>
+              </a:rPr>
+              <a:t>}</a:t>
+            </a:r>
+            <a:endParaRPr lang="en-US" dirty="0">
+              <a:latin typeface="Courier New" panose="02070309020205020404" pitchFamily="49" charset="0"/>
+              <a:cs typeface="Courier New" panose="02070309020205020404" pitchFamily="49" charset="0"/>
+            </a:endParaRPr>
+          </a:p>
+        </p:txBody>
+      </p:sp>
+      <p:sp>
+        <p:nvSpPr>
+          <p:cNvPr id="6" name="TextBox 5"/>
+          <p:cNvSpPr txBox="1"/>
+          <p:nvPr/>
+        </p:nvSpPr>
+        <p:spPr>
+          <a:xfrm>
+            <a:off x="628650" y="4562823"/>
+            <a:ext cx="6665768" cy="1477328"/>
+          </a:xfrm>
+          <a:prstGeom prst="rect">
+            <a:avLst/>
+          </a:prstGeom>
+          <a:solidFill>
+            <a:schemeClr val="accent4">
+              <a:lumMod val="40000"/>
+              <a:lumOff val="60000"/>
+            </a:schemeClr>
+          </a:solidFill>
+          <a:ln>
+            <a:solidFill>
+              <a:schemeClr val="tx1"/>
+            </a:solidFill>
+          </a:ln>
+        </p:spPr>
+        <p:txBody>
+          <a:bodyPr wrap="square" rtlCol="0">
+            <a:spAutoFit/>
+          </a:bodyPr>
+          <a:lstStyle/>
+          <a:p>
+            <a:r>
+              <a:rPr lang="en-US" dirty="0">
+                <a:latin typeface="Courier New" panose="02070309020205020404" pitchFamily="49" charset="0"/>
+                <a:cs typeface="Courier New" panose="02070309020205020404" pitchFamily="49" charset="0"/>
+              </a:rPr>
+              <a:t>s</a:t>
+            </a:r>
+            <a:r>
+              <a:rPr lang="en-US" dirty="0" smtClean="0">
+                <a:latin typeface="Courier New" panose="02070309020205020404" pitchFamily="49" charset="0"/>
+                <a:cs typeface="Courier New" panose="02070309020205020404" pitchFamily="49" charset="0"/>
+              </a:rPr>
+              <a:t> </a:t>
+            </a:r>
+            <a:r>
+              <a:rPr lang="en-US" dirty="0" smtClean="0">
+                <a:latin typeface="Courier New" panose="02070309020205020404" pitchFamily="49" charset="0"/>
+                <a:cs typeface="Courier New" panose="02070309020205020404" pitchFamily="49" charset="0"/>
+              </a:rPr>
+              <a:t>= list()</a:t>
+            </a:r>
+          </a:p>
+          <a:p>
+            <a:r>
+              <a:rPr lang="en-US" dirty="0" smtClean="0">
+                <a:latin typeface="Courier New" panose="02070309020205020404" pitchFamily="49" charset="0"/>
+                <a:cs typeface="Courier New" panose="02070309020205020404" pitchFamily="49" charset="0"/>
+              </a:rPr>
+              <a:t>for x in range(10):</a:t>
+            </a:r>
+          </a:p>
+          <a:p>
+            <a:r>
+              <a:rPr lang="en-US" dirty="0">
+                <a:latin typeface="Courier New" panose="02070309020205020404" pitchFamily="49" charset="0"/>
+                <a:cs typeface="Courier New" panose="02070309020205020404" pitchFamily="49" charset="0"/>
+              </a:rPr>
+              <a:t> </a:t>
+            </a:r>
+            <a:r>
+              <a:rPr lang="en-US" dirty="0" smtClean="0">
+                <a:latin typeface="Courier New" panose="02070309020205020404" pitchFamily="49" charset="0"/>
+                <a:cs typeface="Courier New" panose="02070309020205020404" pitchFamily="49" charset="0"/>
+              </a:rPr>
+              <a:t>   </a:t>
+            </a:r>
+            <a:r>
+              <a:rPr lang="en-US" dirty="0" err="1" smtClean="0">
+                <a:latin typeface="Courier New" panose="02070309020205020404" pitchFamily="49" charset="0"/>
+                <a:cs typeface="Courier New" panose="02070309020205020404" pitchFamily="49" charset="0"/>
+              </a:rPr>
+              <a:t>l.append</a:t>
+            </a:r>
+            <a:r>
+              <a:rPr lang="en-US" dirty="0" smtClean="0">
+                <a:latin typeface="Courier New" panose="02070309020205020404" pitchFamily="49" charset="0"/>
+                <a:cs typeface="Courier New" panose="02070309020205020404" pitchFamily="49" charset="0"/>
+              </a:rPr>
+              <a:t>(x)</a:t>
+            </a:r>
+            <a:endParaRPr lang="en-US" dirty="0">
+              <a:latin typeface="Courier New" panose="02070309020205020404" pitchFamily="49" charset="0"/>
+              <a:cs typeface="Courier New" panose="02070309020205020404" pitchFamily="49" charset="0"/>
+            </a:endParaRPr>
+          </a:p>
+          <a:p>
+            <a:r>
+              <a:rPr lang="en-US" dirty="0" smtClean="0">
+                <a:latin typeface="Courier New" panose="02070309020205020404" pitchFamily="49" charset="0"/>
+                <a:cs typeface="Courier New" panose="02070309020205020404" pitchFamily="49" charset="0"/>
+              </a:rPr>
+              <a:t>while s:</a:t>
+            </a:r>
+            <a:endParaRPr lang="en-US" dirty="0" smtClean="0">
+              <a:latin typeface="Courier New" panose="02070309020205020404" pitchFamily="49" charset="0"/>
+              <a:cs typeface="Courier New" panose="02070309020205020404" pitchFamily="49" charset="0"/>
+            </a:endParaRPr>
+          </a:p>
+          <a:p>
+            <a:r>
+              <a:rPr lang="en-US" dirty="0">
+                <a:latin typeface="Courier New" panose="02070309020205020404" pitchFamily="49" charset="0"/>
+                <a:cs typeface="Courier New" panose="02070309020205020404" pitchFamily="49" charset="0"/>
+              </a:rPr>
+              <a:t> </a:t>
+            </a:r>
+            <a:r>
+              <a:rPr lang="en-US" dirty="0" smtClean="0">
+                <a:latin typeface="Courier New" panose="02070309020205020404" pitchFamily="49" charset="0"/>
+                <a:cs typeface="Courier New" panose="02070309020205020404" pitchFamily="49" charset="0"/>
+              </a:rPr>
+              <a:t>   print('{0:d}'.</a:t>
+            </a:r>
+            <a:r>
+              <a:rPr lang="en-US" dirty="0" smtClean="0">
+                <a:latin typeface="Courier New" panose="02070309020205020404" pitchFamily="49" charset="0"/>
+                <a:cs typeface="Courier New" panose="02070309020205020404" pitchFamily="49" charset="0"/>
+              </a:rPr>
+              <a:t>format(</a:t>
+            </a:r>
+            <a:r>
+              <a:rPr lang="en-US" dirty="0" err="1" smtClean="0">
+                <a:latin typeface="Courier New" panose="02070309020205020404" pitchFamily="49" charset="0"/>
+                <a:cs typeface="Courier New" panose="02070309020205020404" pitchFamily="49" charset="0"/>
+              </a:rPr>
+              <a:t>s.pop</a:t>
+            </a:r>
+            <a:r>
+              <a:rPr lang="en-US" dirty="0" smtClean="0">
+                <a:latin typeface="Courier New" panose="02070309020205020404" pitchFamily="49" charset="0"/>
+                <a:cs typeface="Courier New" panose="02070309020205020404" pitchFamily="49" charset="0"/>
+              </a:rPr>
+              <a:t>()))</a:t>
+            </a:r>
+            <a:endParaRPr lang="en-US" dirty="0" smtClean="0">
+              <a:latin typeface="Courier New" panose="02070309020205020404" pitchFamily="49" charset="0"/>
+              <a:cs typeface="Courier New" panose="02070309020205020404" pitchFamily="49" charset="0"/>
+            </a:endParaRPr>
+          </a:p>
+        </p:txBody>
+      </p:sp>
+    </p:spTree>
+    <p:extLst>
+      <p:ext uri="{BB962C8B-B14F-4D97-AF65-F5344CB8AC3E}">
+        <p14:creationId xmlns:p14="http://schemas.microsoft.com/office/powerpoint/2010/main" val="961629525"/>
+      </p:ext>
+    </p:extLst>
+  </p:cSld>
+  <p:clrMapOvr>
+    <a:masterClrMapping/>
+  </p:clrMapOvr>
+  <p:timing>
+    <p:tnLst>
+      <p:par>
+        <p:cTn id="1" dur="indefinite" restart="never" nodeType="tmRoot"/>
+      </p:par>
+    </p:tnLst>
+  </p:timing>
+</p:sld>
+</file>
+
+<file path=ppt/slides/slide28.xml><?xml version="1.0" encoding="utf-8"?>
+<p:sld xmlns:a="http://schemas.openxmlformats.org/drawingml/2006/main" xmlns:r="http://schemas.openxmlformats.org/officeDocument/2006/relationships" xmlns:p="http://schemas.openxmlformats.org/presentationml/2006/main">
+  <p:cSld>
+    <p:spTree>
+      <p:nvGrpSpPr>
+        <p:cNvPr id="1" name=""/>
+        <p:cNvGrpSpPr/>
+        <p:nvPr/>
+      </p:nvGrpSpPr>
+      <p:grpSpPr>
+        <a:xfrm>
+          <a:off x="0" y="0"/>
+          <a:ext cx="0" cy="0"/>
+          <a:chOff x="0" y="0"/>
+          <a:chExt cx="0" cy="0"/>
+        </a:xfrm>
+      </p:grpSpPr>
+      <p:sp>
+        <p:nvSpPr>
+          <p:cNvPr id="2" name="Title 1"/>
+          <p:cNvSpPr>
+            <a:spLocks noGrp="1"/>
+          </p:cNvSpPr>
+          <p:nvPr>
+            <p:ph type="title"/>
+          </p:nvPr>
+        </p:nvSpPr>
+        <p:spPr/>
+        <p:txBody>
+          <a:bodyPr/>
+          <a:lstStyle/>
+          <a:p>
+            <a:r>
+              <a:rPr lang="en-US" dirty="0" smtClean="0"/>
+              <a:t>Queue</a:t>
+            </a:r>
+            <a:endParaRPr lang="en-US" dirty="0"/>
+          </a:p>
+        </p:txBody>
+      </p:sp>
+      <p:sp>
+        <p:nvSpPr>
+          <p:cNvPr id="3" name="Content Placeholder 2"/>
+          <p:cNvSpPr>
+            <a:spLocks noGrp="1"/>
+          </p:cNvSpPr>
+          <p:nvPr>
+            <p:ph idx="1"/>
+          </p:nvPr>
+        </p:nvSpPr>
+        <p:spPr/>
+        <p:txBody>
+          <a:bodyPr>
+            <a:normAutofit/>
+          </a:bodyPr>
+          <a:lstStyle/>
+          <a:p>
+            <a:r>
+              <a:rPr lang="en-US" dirty="0" smtClean="0"/>
+              <a:t>Characteristics</a:t>
+            </a:r>
+          </a:p>
+          <a:p>
+            <a:pPr lvl="1"/>
+            <a:r>
+              <a:rPr lang="en-US" dirty="0" smtClean="0"/>
+              <a:t>access: only </a:t>
+            </a:r>
+            <a:r>
+              <a:rPr lang="en-US" dirty="0" smtClean="0"/>
+              <a:t>front</a:t>
+            </a:r>
+            <a:endParaRPr lang="en-US" dirty="0" smtClean="0"/>
+          </a:p>
+          <a:p>
+            <a:pPr lvl="1"/>
+            <a:r>
+              <a:rPr lang="en-US" dirty="0" smtClean="0"/>
+              <a:t>ordered</a:t>
+            </a:r>
+          </a:p>
+          <a:p>
+            <a:pPr lvl="1"/>
+            <a:r>
+              <a:rPr lang="en-US" dirty="0" smtClean="0"/>
+              <a:t>length can vary</a:t>
+            </a:r>
+          </a:p>
+          <a:p>
+            <a:pPr lvl="1"/>
+            <a:r>
+              <a:rPr lang="en-US" dirty="0" smtClean="0"/>
+              <a:t>push/front/pop: </a:t>
+            </a:r>
+            <a:r>
+              <a:rPr lang="en-US" dirty="0" smtClean="0"/>
+              <a:t>O(1)</a:t>
+            </a:r>
+          </a:p>
+          <a:p>
+            <a:pPr lvl="1"/>
+            <a:r>
+              <a:rPr lang="en-US" dirty="0" smtClean="0"/>
+              <a:t>element type: any</a:t>
+            </a:r>
+          </a:p>
+          <a:p>
+            <a:r>
+              <a:rPr lang="en-US" dirty="0" smtClean="0"/>
+              <a:t>Implementations</a:t>
+            </a:r>
+          </a:p>
+          <a:p>
+            <a:pPr lvl="1"/>
+            <a:r>
+              <a:rPr lang="en-US" dirty="0" smtClean="0"/>
+              <a:t>as list</a:t>
+            </a:r>
+          </a:p>
+          <a:p>
+            <a:pPr lvl="1"/>
+            <a:endParaRPr lang="en-US" dirty="0"/>
+          </a:p>
+        </p:txBody>
+      </p:sp>
+      <p:sp>
+        <p:nvSpPr>
+          <p:cNvPr id="7" name="Slide Number Placeholder 6"/>
+          <p:cNvSpPr>
+            <a:spLocks noGrp="1"/>
+          </p:cNvSpPr>
+          <p:nvPr>
+            <p:ph type="sldNum" sz="quarter" idx="12"/>
+          </p:nvPr>
+        </p:nvSpPr>
+        <p:spPr/>
+        <p:txBody>
+          <a:bodyPr/>
+          <a:lstStyle/>
+          <a:p>
+            <a:fld id="{11AD1F4E-1E51-402E-B221-310F004E7D3B}" type="slidenum">
+              <a:rPr lang="en-US" smtClean="0"/>
+              <a:t>28</a:t>
+            </a:fld>
+            <a:endParaRPr lang="en-US"/>
+          </a:p>
+        </p:txBody>
+      </p:sp>
+    </p:spTree>
+    <p:extLst>
+      <p:ext uri="{BB962C8B-B14F-4D97-AF65-F5344CB8AC3E}">
+        <p14:creationId xmlns:p14="http://schemas.microsoft.com/office/powerpoint/2010/main" val="432384342"/>
+      </p:ext>
+    </p:extLst>
+  </p:cSld>
+  <p:clrMapOvr>
+    <a:masterClrMapping/>
+  </p:clrMapOvr>
+  <p:timing>
+    <p:tnLst>
+      <p:par>
+        <p:cTn id="1" dur="indefinite" restart="never" nodeType="tmRoot"/>
+      </p:par>
+    </p:tnLst>
+  </p:timing>
+</p:sld>
+</file>
+
+<file path=ppt/slides/slide29.xml><?xml version="1.0" encoding="utf-8"?>
+<p:sld xmlns:a="http://schemas.openxmlformats.org/drawingml/2006/main" xmlns:r="http://schemas.openxmlformats.org/officeDocument/2006/relationships" xmlns:p="http://schemas.openxmlformats.org/presentationml/2006/main">
+  <p:cSld>
+    <p:spTree>
+      <p:nvGrpSpPr>
+        <p:cNvPr id="1" name=""/>
+        <p:cNvGrpSpPr/>
+        <p:nvPr/>
+      </p:nvGrpSpPr>
+      <p:grpSpPr>
+        <a:xfrm>
+          <a:off x="0" y="0"/>
+          <a:ext cx="0" cy="0"/>
+          <a:chOff x="0" y="0"/>
+          <a:chExt cx="0" cy="0"/>
+        </a:xfrm>
+      </p:grpSpPr>
+      <p:sp>
+        <p:nvSpPr>
+          <p:cNvPr id="2" name="Title 1"/>
+          <p:cNvSpPr>
+            <a:spLocks noGrp="1"/>
+          </p:cNvSpPr>
+          <p:nvPr>
+            <p:ph type="title"/>
+          </p:nvPr>
+        </p:nvSpPr>
+        <p:spPr/>
+        <p:txBody>
+          <a:bodyPr/>
+          <a:lstStyle/>
+          <a:p>
+            <a:r>
+              <a:rPr lang="en-US" dirty="0" smtClean="0"/>
+              <a:t>Queue ADT</a:t>
+            </a:r>
+            <a:endParaRPr lang="en-US" dirty="0"/>
+          </a:p>
+        </p:txBody>
+      </p:sp>
+      <p:sp>
+        <p:nvSpPr>
+          <p:cNvPr id="3" name="Content Placeholder 2"/>
+          <p:cNvSpPr>
+            <a:spLocks noGrp="1"/>
+          </p:cNvSpPr>
+          <p:nvPr>
+            <p:ph idx="1"/>
+          </p:nvPr>
+        </p:nvSpPr>
+        <p:spPr/>
+        <p:txBody>
+          <a:bodyPr/>
+          <a:lstStyle/>
+          <a:p>
+            <a:r>
+              <a:rPr lang="en-US" dirty="0" smtClean="0"/>
+              <a:t>EMPTY_QUEUE() </a:t>
+            </a:r>
+            <a:r>
+              <a:rPr lang="en-US" dirty="0" smtClean="0">
+                <a:sym typeface="Symbol" panose="05050102010706020507" pitchFamily="18" charset="2"/>
+              </a:rPr>
+              <a:t> queue</a:t>
+            </a:r>
+            <a:endParaRPr lang="en-US" dirty="0" smtClean="0"/>
+          </a:p>
+          <a:p>
+            <a:r>
+              <a:rPr lang="en-US" dirty="0" smtClean="0"/>
+              <a:t>QUEUE.PUSH(value</a:t>
+            </a:r>
+            <a:r>
+              <a:rPr lang="en-US" dirty="0"/>
+              <a:t>)</a:t>
+            </a:r>
+          </a:p>
+          <a:p>
+            <a:r>
+              <a:rPr lang="en-US" dirty="0" smtClean="0"/>
+              <a:t>QUEUE.POP()</a:t>
+            </a:r>
+          </a:p>
+          <a:p>
+            <a:r>
+              <a:rPr lang="en-US" dirty="0" smtClean="0"/>
+              <a:t>QUEUE.FRONT()</a:t>
+            </a:r>
+            <a:r>
+              <a:rPr lang="en-US" dirty="0"/>
+              <a:t> </a:t>
+            </a:r>
+            <a:r>
+              <a:rPr lang="en-US" dirty="0">
+                <a:sym typeface="Symbol" panose="05050102010706020507" pitchFamily="18" charset="2"/>
+              </a:rPr>
+              <a:t> queue</a:t>
+            </a:r>
+            <a:endParaRPr lang="en-US" dirty="0"/>
+          </a:p>
+          <a:p>
+            <a:r>
+              <a:rPr lang="en-US" dirty="0" smtClean="0"/>
+              <a:t>QUEUE.IS_EMPTY()</a:t>
+            </a:r>
+            <a:r>
+              <a:rPr lang="en-US" dirty="0"/>
+              <a:t> </a:t>
+            </a:r>
+            <a:r>
+              <a:rPr lang="en-US" dirty="0">
+                <a:sym typeface="Symbol" panose="05050102010706020507" pitchFamily="18" charset="2"/>
+              </a:rPr>
+              <a:t> </a:t>
+            </a:r>
+            <a:r>
+              <a:rPr lang="en-US" dirty="0" err="1" smtClean="0">
+                <a:sym typeface="Symbol" panose="05050102010706020507" pitchFamily="18" charset="2"/>
+              </a:rPr>
+              <a:t>boolean</a:t>
+            </a:r>
+            <a:endParaRPr lang="en-US" dirty="0" smtClean="0"/>
+          </a:p>
+          <a:p>
+            <a:r>
+              <a:rPr lang="en-US" dirty="0" smtClean="0"/>
+              <a:t>QUEUE.LENGTH</a:t>
+            </a:r>
+            <a:r>
+              <a:rPr lang="en-US" dirty="0"/>
+              <a:t> </a:t>
+            </a:r>
+            <a:r>
+              <a:rPr lang="en-US" dirty="0">
+                <a:sym typeface="Symbol" panose="05050102010706020507" pitchFamily="18" charset="2"/>
+              </a:rPr>
+              <a:t> </a:t>
+            </a:r>
+            <a:r>
+              <a:rPr lang="en-US" dirty="0" smtClean="0">
+                <a:sym typeface="Symbol" panose="05050102010706020507" pitchFamily="18" charset="2"/>
+              </a:rPr>
+              <a:t>length</a:t>
+            </a:r>
+            <a:endParaRPr lang="en-US" dirty="0"/>
+          </a:p>
+        </p:txBody>
+      </p:sp>
+      <p:sp>
+        <p:nvSpPr>
+          <p:cNvPr id="4" name="Slide Number Placeholder 3"/>
+          <p:cNvSpPr>
+            <a:spLocks noGrp="1"/>
+          </p:cNvSpPr>
+          <p:nvPr>
+            <p:ph type="sldNum" sz="quarter" idx="12"/>
+          </p:nvPr>
+        </p:nvSpPr>
+        <p:spPr/>
+        <p:txBody>
+          <a:bodyPr/>
+          <a:lstStyle/>
+          <a:p>
+            <a:fld id="{11AD1F4E-1E51-402E-B221-310F004E7D3B}" type="slidenum">
+              <a:rPr lang="en-US" smtClean="0"/>
+              <a:t>29</a:t>
+            </a:fld>
+            <a:endParaRPr lang="en-US"/>
+          </a:p>
+        </p:txBody>
+      </p:sp>
+    </p:spTree>
+    <p:extLst>
+      <p:ext uri="{BB962C8B-B14F-4D97-AF65-F5344CB8AC3E}">
+        <p14:creationId xmlns:p14="http://schemas.microsoft.com/office/powerpoint/2010/main" val="1534393266"/>
       </p:ext>
     </p:extLst>
   </p:cSld>
@@ -9183,6 +10909,638 @@
     <p:extLst>
       <p:ext uri="{BB962C8B-B14F-4D97-AF65-F5344CB8AC3E}">
         <p14:creationId xmlns:p14="http://schemas.microsoft.com/office/powerpoint/2010/main" val="2709702978"/>
+      </p:ext>
+    </p:extLst>
+  </p:cSld>
+  <p:clrMapOvr>
+    <a:masterClrMapping/>
+  </p:clrMapOvr>
+  <p:timing>
+    <p:tnLst>
+      <p:par>
+        <p:cTn id="1" dur="indefinite" restart="never" nodeType="tmRoot"/>
+      </p:par>
+    </p:tnLst>
+  </p:timing>
+</p:sld>
+</file>
+
+<file path=ppt/slides/slide30.xml><?xml version="1.0" encoding="utf-8"?>
+<p:sld xmlns:a="http://schemas.openxmlformats.org/drawingml/2006/main" xmlns:r="http://schemas.openxmlformats.org/officeDocument/2006/relationships" xmlns:p="http://schemas.openxmlformats.org/presentationml/2006/main">
+  <p:cSld>
+    <p:spTree>
+      <p:nvGrpSpPr>
+        <p:cNvPr id="1" name=""/>
+        <p:cNvGrpSpPr/>
+        <p:nvPr/>
+      </p:nvGrpSpPr>
+      <p:grpSpPr>
+        <a:xfrm>
+          <a:off x="0" y="0"/>
+          <a:ext cx="0" cy="0"/>
+          <a:chOff x="0" y="0"/>
+          <a:chExt cx="0" cy="0"/>
+        </a:xfrm>
+      </p:grpSpPr>
+      <p:sp>
+        <p:nvSpPr>
+          <p:cNvPr id="2" name="Title 1"/>
+          <p:cNvSpPr>
+            <a:spLocks noGrp="1"/>
+          </p:cNvSpPr>
+          <p:nvPr>
+            <p:ph type="title"/>
+          </p:nvPr>
+        </p:nvSpPr>
+        <p:spPr/>
+        <p:txBody>
+          <a:bodyPr/>
+          <a:lstStyle/>
+          <a:p>
+            <a:r>
+              <a:rPr lang="en-US" dirty="0" smtClean="0"/>
+              <a:t>Queue examples</a:t>
+            </a:r>
+            <a:endParaRPr lang="en-US" dirty="0"/>
+          </a:p>
+        </p:txBody>
+      </p:sp>
+      <p:sp>
+        <p:nvSpPr>
+          <p:cNvPr id="4" name="Slide Number Placeholder 3"/>
+          <p:cNvSpPr>
+            <a:spLocks noGrp="1"/>
+          </p:cNvSpPr>
+          <p:nvPr>
+            <p:ph type="sldNum" sz="quarter" idx="12"/>
+          </p:nvPr>
+        </p:nvSpPr>
+        <p:spPr/>
+        <p:txBody>
+          <a:bodyPr/>
+          <a:lstStyle/>
+          <a:p>
+            <a:fld id="{11AD1F4E-1E51-402E-B221-310F004E7D3B}" type="slidenum">
+              <a:rPr lang="en-US" smtClean="0"/>
+              <a:t>30</a:t>
+            </a:fld>
+            <a:endParaRPr lang="en-US"/>
+          </a:p>
+        </p:txBody>
+      </p:sp>
+      <p:sp>
+        <p:nvSpPr>
+          <p:cNvPr id="5" name="TextBox 4"/>
+          <p:cNvSpPr txBox="1"/>
+          <p:nvPr/>
+        </p:nvSpPr>
+        <p:spPr>
+          <a:xfrm>
+            <a:off x="628650" y="1704105"/>
+            <a:ext cx="6665768" cy="2585323"/>
+          </a:xfrm>
+          <a:prstGeom prst="rect">
+            <a:avLst/>
+          </a:prstGeom>
+          <a:solidFill>
+            <a:schemeClr val="tx2">
+              <a:lumMod val="40000"/>
+              <a:lumOff val="60000"/>
+            </a:schemeClr>
+          </a:solidFill>
+          <a:ln>
+            <a:solidFill>
+              <a:schemeClr val="tx1"/>
+            </a:solidFill>
+          </a:ln>
+        </p:spPr>
+        <p:txBody>
+          <a:bodyPr wrap="square" rtlCol="0">
+            <a:spAutoFit/>
+          </a:bodyPr>
+          <a:lstStyle/>
+          <a:p>
+            <a:r>
+              <a:rPr lang="en-US" dirty="0" smtClean="0">
+                <a:latin typeface="Courier New" panose="02070309020205020404" pitchFamily="49" charset="0"/>
+                <a:cs typeface="Courier New" panose="02070309020205020404" pitchFamily="49" charset="0"/>
+              </a:rPr>
+              <a:t>#include &lt;</a:t>
+            </a:r>
+            <a:r>
+              <a:rPr lang="en-US" dirty="0" err="1" smtClean="0">
+                <a:latin typeface="Courier New" panose="02070309020205020404" pitchFamily="49" charset="0"/>
+                <a:cs typeface="Courier New" panose="02070309020205020404" pitchFamily="49" charset="0"/>
+              </a:rPr>
+              <a:t>iostream</a:t>
+            </a:r>
+            <a:r>
+              <a:rPr lang="en-US" dirty="0" smtClean="0">
+                <a:latin typeface="Courier New" panose="02070309020205020404" pitchFamily="49" charset="0"/>
+                <a:cs typeface="Courier New" panose="02070309020205020404" pitchFamily="49" charset="0"/>
+              </a:rPr>
+              <a:t>&gt;</a:t>
+            </a:r>
+          </a:p>
+          <a:p>
+            <a:r>
+              <a:rPr lang="en-US" dirty="0" smtClean="0">
+                <a:latin typeface="Courier New" panose="02070309020205020404" pitchFamily="49" charset="0"/>
+                <a:cs typeface="Courier New" panose="02070309020205020404" pitchFamily="49" charset="0"/>
+              </a:rPr>
+              <a:t>#include </a:t>
+            </a:r>
+            <a:r>
+              <a:rPr lang="en-US" dirty="0" smtClean="0">
+                <a:latin typeface="Courier New" panose="02070309020205020404" pitchFamily="49" charset="0"/>
+                <a:cs typeface="Courier New" panose="02070309020205020404" pitchFamily="49" charset="0"/>
+              </a:rPr>
+              <a:t>&lt;queue&gt;</a:t>
+            </a:r>
+            <a:endParaRPr lang="en-US" dirty="0" smtClean="0">
+              <a:latin typeface="Courier New" panose="02070309020205020404" pitchFamily="49" charset="0"/>
+              <a:cs typeface="Courier New" panose="02070309020205020404" pitchFamily="49" charset="0"/>
+            </a:endParaRPr>
+          </a:p>
+          <a:p>
+            <a:r>
+              <a:rPr lang="en-US" dirty="0" err="1" smtClean="0">
+                <a:latin typeface="Courier New" panose="02070309020205020404" pitchFamily="49" charset="0"/>
+                <a:cs typeface="Courier New" panose="02070309020205020404" pitchFamily="49" charset="0"/>
+              </a:rPr>
+              <a:t>std</a:t>
+            </a:r>
+            <a:r>
+              <a:rPr lang="en-US" dirty="0" smtClean="0">
+                <a:latin typeface="Courier New" panose="02070309020205020404" pitchFamily="49" charset="0"/>
+                <a:cs typeface="Courier New" panose="02070309020205020404" pitchFamily="49" charset="0"/>
+              </a:rPr>
+              <a:t>::queue&lt;</a:t>
+            </a:r>
+            <a:r>
+              <a:rPr lang="en-US" dirty="0" err="1" smtClean="0">
+                <a:latin typeface="Courier New" panose="02070309020205020404" pitchFamily="49" charset="0"/>
+                <a:cs typeface="Courier New" panose="02070309020205020404" pitchFamily="49" charset="0"/>
+              </a:rPr>
+              <a:t>int</a:t>
+            </a:r>
+            <a:r>
+              <a:rPr lang="en-US" dirty="0" smtClean="0">
+                <a:latin typeface="Courier New" panose="02070309020205020404" pitchFamily="49" charset="0"/>
+                <a:cs typeface="Courier New" panose="02070309020205020404" pitchFamily="49" charset="0"/>
+              </a:rPr>
+              <a:t>&gt; </a:t>
+            </a:r>
+            <a:r>
+              <a:rPr lang="en-US" dirty="0" smtClean="0">
+                <a:latin typeface="Courier New" panose="02070309020205020404" pitchFamily="49" charset="0"/>
+                <a:cs typeface="Courier New" panose="02070309020205020404" pitchFamily="49" charset="0"/>
+              </a:rPr>
+              <a:t>q;</a:t>
+            </a:r>
+            <a:endParaRPr lang="en-US" dirty="0" smtClean="0">
+              <a:latin typeface="Courier New" panose="02070309020205020404" pitchFamily="49" charset="0"/>
+              <a:cs typeface="Courier New" panose="02070309020205020404" pitchFamily="49" charset="0"/>
+            </a:endParaRPr>
+          </a:p>
+          <a:p>
+            <a:r>
+              <a:rPr lang="en-US" dirty="0" smtClean="0">
+                <a:latin typeface="Courier New" panose="02070309020205020404" pitchFamily="49" charset="0"/>
+                <a:cs typeface="Courier New" panose="02070309020205020404" pitchFamily="49" charset="0"/>
+              </a:rPr>
+              <a:t>for (</a:t>
+            </a:r>
+            <a:r>
+              <a:rPr lang="en-US" dirty="0" err="1" smtClean="0">
+                <a:latin typeface="Courier New" panose="02070309020205020404" pitchFamily="49" charset="0"/>
+                <a:cs typeface="Courier New" panose="02070309020205020404" pitchFamily="49" charset="0"/>
+              </a:rPr>
+              <a:t>i</a:t>
+            </a:r>
+            <a:r>
+              <a:rPr lang="en-US" dirty="0" smtClean="0">
+                <a:latin typeface="Courier New" panose="02070309020205020404" pitchFamily="49" charset="0"/>
+                <a:cs typeface="Courier New" panose="02070309020205020404" pitchFamily="49" charset="0"/>
+              </a:rPr>
+              <a:t> = 0; </a:t>
+            </a:r>
+            <a:r>
+              <a:rPr lang="en-US" dirty="0" err="1" smtClean="0">
+                <a:latin typeface="Courier New" panose="02070309020205020404" pitchFamily="49" charset="0"/>
+                <a:cs typeface="Courier New" panose="02070309020205020404" pitchFamily="49" charset="0"/>
+              </a:rPr>
+              <a:t>i</a:t>
+            </a:r>
+            <a:r>
+              <a:rPr lang="en-US" dirty="0" smtClean="0">
+                <a:latin typeface="Courier New" panose="02070309020205020404" pitchFamily="49" charset="0"/>
+                <a:cs typeface="Courier New" panose="02070309020205020404" pitchFamily="49" charset="0"/>
+              </a:rPr>
+              <a:t> &lt; 10; </a:t>
+            </a:r>
+            <a:r>
+              <a:rPr lang="en-US" dirty="0" err="1" smtClean="0">
+                <a:latin typeface="Courier New" panose="02070309020205020404" pitchFamily="49" charset="0"/>
+                <a:cs typeface="Courier New" panose="02070309020205020404" pitchFamily="49" charset="0"/>
+              </a:rPr>
+              <a:t>i</a:t>
+            </a:r>
+            <a:r>
+              <a:rPr lang="en-US" dirty="0" smtClean="0">
+                <a:latin typeface="Courier New" panose="02070309020205020404" pitchFamily="49" charset="0"/>
+                <a:cs typeface="Courier New" panose="02070309020205020404" pitchFamily="49" charset="0"/>
+              </a:rPr>
+              <a:t>++)</a:t>
+            </a:r>
+          </a:p>
+          <a:p>
+            <a:r>
+              <a:rPr lang="en-US" dirty="0">
+                <a:latin typeface="Courier New" panose="02070309020205020404" pitchFamily="49" charset="0"/>
+                <a:cs typeface="Courier New" panose="02070309020205020404" pitchFamily="49" charset="0"/>
+              </a:rPr>
+              <a:t> </a:t>
+            </a:r>
+            <a:r>
+              <a:rPr lang="en-US" dirty="0" smtClean="0">
+                <a:latin typeface="Courier New" panose="02070309020205020404" pitchFamily="49" charset="0"/>
+                <a:cs typeface="Courier New" panose="02070309020205020404" pitchFamily="49" charset="0"/>
+              </a:rPr>
+              <a:t>   </a:t>
+            </a:r>
+            <a:r>
+              <a:rPr lang="en-US" dirty="0" err="1" smtClean="0">
+                <a:latin typeface="Courier New" panose="02070309020205020404" pitchFamily="49" charset="0"/>
+                <a:cs typeface="Courier New" panose="02070309020205020404" pitchFamily="49" charset="0"/>
+              </a:rPr>
+              <a:t>q.push</a:t>
+            </a:r>
+            <a:r>
+              <a:rPr lang="en-US" dirty="0" smtClean="0">
+                <a:latin typeface="Courier New" panose="02070309020205020404" pitchFamily="49" charset="0"/>
+                <a:cs typeface="Courier New" panose="02070309020205020404" pitchFamily="49" charset="0"/>
+              </a:rPr>
+              <a:t>(</a:t>
+            </a:r>
+            <a:r>
+              <a:rPr lang="en-US" dirty="0" err="1" smtClean="0">
+                <a:latin typeface="Courier New" panose="02070309020205020404" pitchFamily="49" charset="0"/>
+                <a:cs typeface="Courier New" panose="02070309020205020404" pitchFamily="49" charset="0"/>
+              </a:rPr>
+              <a:t>i</a:t>
+            </a:r>
+            <a:r>
+              <a:rPr lang="en-US" dirty="0" smtClean="0">
+                <a:latin typeface="Courier New" panose="02070309020205020404" pitchFamily="49" charset="0"/>
+                <a:cs typeface="Courier New" panose="02070309020205020404" pitchFamily="49" charset="0"/>
+              </a:rPr>
+              <a:t>);</a:t>
+            </a:r>
+          </a:p>
+          <a:p>
+            <a:r>
+              <a:rPr lang="en-US" dirty="0" smtClean="0">
+                <a:latin typeface="Courier New" panose="02070309020205020404" pitchFamily="49" charset="0"/>
+                <a:cs typeface="Courier New" panose="02070309020205020404" pitchFamily="49" charset="0"/>
+              </a:rPr>
+              <a:t>while (!</a:t>
+            </a:r>
+            <a:r>
+              <a:rPr lang="en-US" dirty="0" err="1" smtClean="0">
+                <a:latin typeface="Courier New" panose="02070309020205020404" pitchFamily="49" charset="0"/>
+                <a:cs typeface="Courier New" panose="02070309020205020404" pitchFamily="49" charset="0"/>
+              </a:rPr>
+              <a:t>q.empty</a:t>
+            </a:r>
+            <a:r>
+              <a:rPr lang="en-US" dirty="0" smtClean="0">
+                <a:latin typeface="Courier New" panose="02070309020205020404" pitchFamily="49" charset="0"/>
+                <a:cs typeface="Courier New" panose="02070309020205020404" pitchFamily="49" charset="0"/>
+              </a:rPr>
+              <a:t>()) {</a:t>
+            </a:r>
+            <a:endParaRPr lang="en-US" dirty="0">
+              <a:latin typeface="Courier New" panose="02070309020205020404" pitchFamily="49" charset="0"/>
+              <a:cs typeface="Courier New" panose="02070309020205020404" pitchFamily="49" charset="0"/>
+            </a:endParaRPr>
+          </a:p>
+          <a:p>
+            <a:r>
+              <a:rPr lang="en-US" dirty="0" smtClean="0">
+                <a:latin typeface="Courier New" panose="02070309020205020404" pitchFamily="49" charset="0"/>
+                <a:cs typeface="Courier New" panose="02070309020205020404" pitchFamily="49" charset="0"/>
+              </a:rPr>
+              <a:t>    </a:t>
+            </a:r>
+            <a:r>
+              <a:rPr lang="en-US" dirty="0" err="1">
+                <a:latin typeface="Courier New" panose="02070309020205020404" pitchFamily="49" charset="0"/>
+                <a:cs typeface="Courier New" panose="02070309020205020404" pitchFamily="49" charset="0"/>
+              </a:rPr>
+              <a:t>std</a:t>
+            </a:r>
+            <a:r>
+              <a:rPr lang="en-US" dirty="0">
+                <a:latin typeface="Courier New" panose="02070309020205020404" pitchFamily="49" charset="0"/>
+                <a:cs typeface="Courier New" panose="02070309020205020404" pitchFamily="49" charset="0"/>
+              </a:rPr>
+              <a:t>::</a:t>
+            </a:r>
+            <a:r>
+              <a:rPr lang="en-US" dirty="0" err="1">
+                <a:latin typeface="Courier New" panose="02070309020205020404" pitchFamily="49" charset="0"/>
+                <a:cs typeface="Courier New" panose="02070309020205020404" pitchFamily="49" charset="0"/>
+              </a:rPr>
+              <a:t>cout</a:t>
+            </a:r>
+            <a:r>
+              <a:rPr lang="en-US" dirty="0">
+                <a:latin typeface="Courier New" panose="02070309020205020404" pitchFamily="49" charset="0"/>
+                <a:cs typeface="Courier New" panose="02070309020205020404" pitchFamily="49" charset="0"/>
+              </a:rPr>
+              <a:t> &lt;&lt; </a:t>
+            </a:r>
+            <a:r>
+              <a:rPr lang="en-US" dirty="0" err="1">
+                <a:latin typeface="Courier New" panose="02070309020205020404" pitchFamily="49" charset="0"/>
+                <a:cs typeface="Courier New" panose="02070309020205020404" pitchFamily="49" charset="0"/>
+              </a:rPr>
+              <a:t>q</a:t>
+            </a:r>
+            <a:r>
+              <a:rPr lang="en-US" dirty="0" err="1" smtClean="0">
+                <a:latin typeface="Courier New" panose="02070309020205020404" pitchFamily="49" charset="0"/>
+                <a:cs typeface="Courier New" panose="02070309020205020404" pitchFamily="49" charset="0"/>
+              </a:rPr>
+              <a:t>.front</a:t>
+            </a:r>
+            <a:r>
+              <a:rPr lang="en-US" dirty="0" smtClean="0">
+                <a:latin typeface="Courier New" panose="02070309020205020404" pitchFamily="49" charset="0"/>
+                <a:cs typeface="Courier New" panose="02070309020205020404" pitchFamily="49" charset="0"/>
+              </a:rPr>
+              <a:t>()</a:t>
+            </a:r>
+            <a:r>
+              <a:rPr lang="en-US" dirty="0" smtClean="0">
+                <a:latin typeface="Courier New" panose="02070309020205020404" pitchFamily="49" charset="0"/>
+                <a:cs typeface="Courier New" panose="02070309020205020404" pitchFamily="49" charset="0"/>
+              </a:rPr>
+              <a:t> </a:t>
+            </a:r>
+            <a:r>
+              <a:rPr lang="en-US" dirty="0">
+                <a:latin typeface="Courier New" panose="02070309020205020404" pitchFamily="49" charset="0"/>
+                <a:cs typeface="Courier New" panose="02070309020205020404" pitchFamily="49" charset="0"/>
+              </a:rPr>
+              <a:t>&lt;&lt; </a:t>
+            </a:r>
+            <a:r>
+              <a:rPr lang="en-US" dirty="0" err="1">
+                <a:latin typeface="Courier New" panose="02070309020205020404" pitchFamily="49" charset="0"/>
+                <a:cs typeface="Courier New" panose="02070309020205020404" pitchFamily="49" charset="0"/>
+              </a:rPr>
+              <a:t>std</a:t>
+            </a:r>
+            <a:r>
+              <a:rPr lang="en-US" dirty="0">
+                <a:latin typeface="Courier New" panose="02070309020205020404" pitchFamily="49" charset="0"/>
+                <a:cs typeface="Courier New" panose="02070309020205020404" pitchFamily="49" charset="0"/>
+              </a:rPr>
+              <a:t>::</a:t>
+            </a:r>
+            <a:r>
+              <a:rPr lang="en-US" dirty="0" err="1">
+                <a:latin typeface="Courier New" panose="02070309020205020404" pitchFamily="49" charset="0"/>
+                <a:cs typeface="Courier New" panose="02070309020205020404" pitchFamily="49" charset="0"/>
+              </a:rPr>
+              <a:t>endl</a:t>
+            </a:r>
+            <a:r>
+              <a:rPr lang="en-US" dirty="0" smtClean="0">
+                <a:latin typeface="Courier New" panose="02070309020205020404" pitchFamily="49" charset="0"/>
+                <a:cs typeface="Courier New" panose="02070309020205020404" pitchFamily="49" charset="0"/>
+              </a:rPr>
+              <a:t>;</a:t>
+            </a:r>
+          </a:p>
+          <a:p>
+            <a:r>
+              <a:rPr lang="en-US" dirty="0">
+                <a:latin typeface="Courier New" panose="02070309020205020404" pitchFamily="49" charset="0"/>
+                <a:cs typeface="Courier New" panose="02070309020205020404" pitchFamily="49" charset="0"/>
+              </a:rPr>
+              <a:t> </a:t>
+            </a:r>
+            <a:r>
+              <a:rPr lang="en-US" dirty="0" smtClean="0">
+                <a:latin typeface="Courier New" panose="02070309020205020404" pitchFamily="49" charset="0"/>
+                <a:cs typeface="Courier New" panose="02070309020205020404" pitchFamily="49" charset="0"/>
+              </a:rPr>
+              <a:t>   </a:t>
+            </a:r>
+            <a:r>
+              <a:rPr lang="en-US" dirty="0" err="1">
+                <a:latin typeface="Courier New" panose="02070309020205020404" pitchFamily="49" charset="0"/>
+                <a:cs typeface="Courier New" panose="02070309020205020404" pitchFamily="49" charset="0"/>
+              </a:rPr>
+              <a:t>q</a:t>
+            </a:r>
+            <a:r>
+              <a:rPr lang="en-US" dirty="0" err="1" smtClean="0">
+                <a:latin typeface="Courier New" panose="02070309020205020404" pitchFamily="49" charset="0"/>
+                <a:cs typeface="Courier New" panose="02070309020205020404" pitchFamily="49" charset="0"/>
+              </a:rPr>
+              <a:t>.pop</a:t>
+            </a:r>
+            <a:r>
+              <a:rPr lang="en-US" dirty="0" smtClean="0">
+                <a:latin typeface="Courier New" panose="02070309020205020404" pitchFamily="49" charset="0"/>
+                <a:cs typeface="Courier New" panose="02070309020205020404" pitchFamily="49" charset="0"/>
+              </a:rPr>
+              <a:t>();</a:t>
+            </a:r>
+          </a:p>
+          <a:p>
+            <a:r>
+              <a:rPr lang="en-US" dirty="0">
+                <a:latin typeface="Courier New" panose="02070309020205020404" pitchFamily="49" charset="0"/>
+                <a:cs typeface="Courier New" panose="02070309020205020404" pitchFamily="49" charset="0"/>
+              </a:rPr>
+              <a:t>}</a:t>
+            </a:r>
+            <a:endParaRPr lang="en-US" dirty="0">
+              <a:latin typeface="Courier New" panose="02070309020205020404" pitchFamily="49" charset="0"/>
+              <a:cs typeface="Courier New" panose="02070309020205020404" pitchFamily="49" charset="0"/>
+            </a:endParaRPr>
+          </a:p>
+        </p:txBody>
+      </p:sp>
+      <p:sp>
+        <p:nvSpPr>
+          <p:cNvPr id="6" name="TextBox 5"/>
+          <p:cNvSpPr txBox="1"/>
+          <p:nvPr/>
+        </p:nvSpPr>
+        <p:spPr>
+          <a:xfrm>
+            <a:off x="628650" y="4562823"/>
+            <a:ext cx="6665768" cy="1477328"/>
+          </a:xfrm>
+          <a:prstGeom prst="rect">
+            <a:avLst/>
+          </a:prstGeom>
+          <a:solidFill>
+            <a:schemeClr val="accent4">
+              <a:lumMod val="40000"/>
+              <a:lumOff val="60000"/>
+            </a:schemeClr>
+          </a:solidFill>
+          <a:ln>
+            <a:solidFill>
+              <a:schemeClr val="tx1"/>
+            </a:solidFill>
+          </a:ln>
+        </p:spPr>
+        <p:txBody>
+          <a:bodyPr wrap="square" rtlCol="0">
+            <a:spAutoFit/>
+          </a:bodyPr>
+          <a:lstStyle/>
+          <a:p>
+            <a:r>
+              <a:rPr lang="en-US" dirty="0" smtClean="0">
+                <a:latin typeface="Courier New" panose="02070309020205020404" pitchFamily="49" charset="0"/>
+                <a:cs typeface="Courier New" panose="02070309020205020404" pitchFamily="49" charset="0"/>
+              </a:rPr>
+              <a:t>q </a:t>
+            </a:r>
+            <a:r>
+              <a:rPr lang="en-US" dirty="0" smtClean="0">
+                <a:latin typeface="Courier New" panose="02070309020205020404" pitchFamily="49" charset="0"/>
+                <a:cs typeface="Courier New" panose="02070309020205020404" pitchFamily="49" charset="0"/>
+              </a:rPr>
+              <a:t>= list()</a:t>
+            </a:r>
+          </a:p>
+          <a:p>
+            <a:r>
+              <a:rPr lang="en-US" dirty="0" smtClean="0">
+                <a:latin typeface="Courier New" panose="02070309020205020404" pitchFamily="49" charset="0"/>
+                <a:cs typeface="Courier New" panose="02070309020205020404" pitchFamily="49" charset="0"/>
+              </a:rPr>
+              <a:t>for x in range(10):</a:t>
+            </a:r>
+          </a:p>
+          <a:p>
+            <a:r>
+              <a:rPr lang="en-US" dirty="0">
+                <a:latin typeface="Courier New" panose="02070309020205020404" pitchFamily="49" charset="0"/>
+                <a:cs typeface="Courier New" panose="02070309020205020404" pitchFamily="49" charset="0"/>
+              </a:rPr>
+              <a:t> </a:t>
+            </a:r>
+            <a:r>
+              <a:rPr lang="en-US" dirty="0" smtClean="0">
+                <a:latin typeface="Courier New" panose="02070309020205020404" pitchFamily="49" charset="0"/>
+                <a:cs typeface="Courier New" panose="02070309020205020404" pitchFamily="49" charset="0"/>
+              </a:rPr>
+              <a:t>   </a:t>
+            </a:r>
+            <a:r>
+              <a:rPr lang="en-US" dirty="0" err="1">
+                <a:latin typeface="Courier New" panose="02070309020205020404" pitchFamily="49" charset="0"/>
+                <a:cs typeface="Courier New" panose="02070309020205020404" pitchFamily="49" charset="0"/>
+              </a:rPr>
+              <a:t>q</a:t>
+            </a:r>
+            <a:r>
+              <a:rPr lang="en-US" dirty="0" err="1" smtClean="0">
+                <a:latin typeface="Courier New" panose="02070309020205020404" pitchFamily="49" charset="0"/>
+                <a:cs typeface="Courier New" panose="02070309020205020404" pitchFamily="49" charset="0"/>
+              </a:rPr>
+              <a:t>.append</a:t>
+            </a:r>
+            <a:r>
+              <a:rPr lang="en-US" dirty="0" smtClean="0">
+                <a:latin typeface="Courier New" panose="02070309020205020404" pitchFamily="49" charset="0"/>
+                <a:cs typeface="Courier New" panose="02070309020205020404" pitchFamily="49" charset="0"/>
+              </a:rPr>
+              <a:t>(x</a:t>
+            </a:r>
+            <a:r>
+              <a:rPr lang="en-US" dirty="0" smtClean="0">
+                <a:latin typeface="Courier New" panose="02070309020205020404" pitchFamily="49" charset="0"/>
+                <a:cs typeface="Courier New" panose="02070309020205020404" pitchFamily="49" charset="0"/>
+              </a:rPr>
+              <a:t>)</a:t>
+            </a:r>
+            <a:endParaRPr lang="en-US" dirty="0">
+              <a:latin typeface="Courier New" panose="02070309020205020404" pitchFamily="49" charset="0"/>
+              <a:cs typeface="Courier New" panose="02070309020205020404" pitchFamily="49" charset="0"/>
+            </a:endParaRPr>
+          </a:p>
+          <a:p>
+            <a:r>
+              <a:rPr lang="en-US" dirty="0" smtClean="0">
+                <a:latin typeface="Courier New" panose="02070309020205020404" pitchFamily="49" charset="0"/>
+                <a:cs typeface="Courier New" panose="02070309020205020404" pitchFamily="49" charset="0"/>
+              </a:rPr>
+              <a:t>while s:</a:t>
+            </a:r>
+            <a:endParaRPr lang="en-US" dirty="0" smtClean="0">
+              <a:latin typeface="Courier New" panose="02070309020205020404" pitchFamily="49" charset="0"/>
+              <a:cs typeface="Courier New" panose="02070309020205020404" pitchFamily="49" charset="0"/>
+            </a:endParaRPr>
+          </a:p>
+          <a:p>
+            <a:r>
+              <a:rPr lang="en-US" dirty="0">
+                <a:latin typeface="Courier New" panose="02070309020205020404" pitchFamily="49" charset="0"/>
+                <a:cs typeface="Courier New" panose="02070309020205020404" pitchFamily="49" charset="0"/>
+              </a:rPr>
+              <a:t> </a:t>
+            </a:r>
+            <a:r>
+              <a:rPr lang="en-US" dirty="0" smtClean="0">
+                <a:latin typeface="Courier New" panose="02070309020205020404" pitchFamily="49" charset="0"/>
+                <a:cs typeface="Courier New" panose="02070309020205020404" pitchFamily="49" charset="0"/>
+              </a:rPr>
+              <a:t>   print('{0:d}'.</a:t>
+            </a:r>
+            <a:r>
+              <a:rPr lang="en-US" dirty="0" smtClean="0">
+                <a:latin typeface="Courier New" panose="02070309020205020404" pitchFamily="49" charset="0"/>
+                <a:cs typeface="Courier New" panose="02070309020205020404" pitchFamily="49" charset="0"/>
+              </a:rPr>
+              <a:t>format(</a:t>
+            </a:r>
+            <a:r>
+              <a:rPr lang="en-US" dirty="0" err="1" smtClean="0">
+                <a:latin typeface="Courier New" panose="02070309020205020404" pitchFamily="49" charset="0"/>
+                <a:cs typeface="Courier New" panose="02070309020205020404" pitchFamily="49" charset="0"/>
+              </a:rPr>
+              <a:t>s.pop</a:t>
+            </a:r>
+            <a:r>
+              <a:rPr lang="en-US" smtClean="0">
+                <a:latin typeface="Courier New" panose="02070309020205020404" pitchFamily="49" charset="0"/>
+                <a:cs typeface="Courier New" panose="02070309020205020404" pitchFamily="49" charset="0"/>
+              </a:rPr>
+              <a:t>(0)))</a:t>
+            </a:r>
+            <a:endParaRPr lang="en-US" dirty="0" smtClean="0">
+              <a:latin typeface="Courier New" panose="02070309020205020404" pitchFamily="49" charset="0"/>
+              <a:cs typeface="Courier New" panose="02070309020205020404" pitchFamily="49" charset="0"/>
+            </a:endParaRPr>
+          </a:p>
+        </p:txBody>
+      </p:sp>
+    </p:spTree>
+    <p:extLst>
+      <p:ext uri="{BB962C8B-B14F-4D97-AF65-F5344CB8AC3E}">
+        <p14:creationId xmlns:p14="http://schemas.microsoft.com/office/powerpoint/2010/main" val="3930827009"/>
       </p:ext>
     </p:extLst>
   </p:cSld>
@@ -10140,7 +12498,7 @@
           <a:graphicData uri="http://schemas.openxmlformats.org/presentationml/2006/ole">
             <mc:AlternateContent xmlns:mc="http://schemas.openxmlformats.org/markup-compatibility/2006">
               <mc:Choice xmlns:v="urn:schemas-microsoft-com:vml" Requires="v">
-                <p:oleObj spid="_x0000_s1055" name="Equation" r:id="rId4" imgW="1841400" imgH="215640" progId="Equation.3">
+                <p:oleObj spid="_x0000_s1057" name="Equation" r:id="rId4" imgW="1841400" imgH="215640" progId="Equation.3">
                   <p:embed/>
                 </p:oleObj>
               </mc:Choice>
@@ -10757,7 +13115,7 @@
             <a:graphicData uri="http://schemas.openxmlformats.org/presentationml/2006/ole">
               <mc:AlternateContent xmlns:mc="http://schemas.openxmlformats.org/markup-compatibility/2006">
                 <mc:Choice xmlns:v="urn:schemas-microsoft-com:vml" Requires="v">
-                  <p:oleObj spid="_x0000_s2075" name="Equation" r:id="rId3" imgW="1358640" imgH="203040" progId="Equation.3">
+                  <p:oleObj spid="_x0000_s2077" name="Equation" r:id="rId3" imgW="1358640" imgH="203040" progId="Equation.3">
                     <p:embed/>
                   </p:oleObj>
                 </mc:Choice>

</xml_diff>

<commit_message>
Added pictures to slides to illustrate concepts
</commit_message>
<xml_diff>
--- a/DataStructures/data_structures.pptx
+++ b/DataStructures/data_structures.pptx
@@ -3740,7 +3740,23 @@
               <a:t>EMPTY_ARRAY(length</a:t>
             </a:r>
             <a:r>
-              <a:rPr lang="en-US" dirty="0"/>
+              <a:rPr lang="en-US" baseline="-25000" dirty="0" smtClean="0"/>
+              <a:t>0</a:t>
+            </a:r>
+            <a:r>
+              <a:rPr lang="en-US" dirty="0" smtClean="0"/>
+              <a:t>, …, length</a:t>
+            </a:r>
+            <a:r>
+              <a:rPr lang="en-US" i="1" baseline="-25000" dirty="0" smtClean="0"/>
+              <a:t>d</a:t>
+            </a:r>
+            <a:r>
+              <a:rPr lang="en-US" baseline="-25000" dirty="0" smtClean="0"/>
+              <a:t>-1</a:t>
+            </a:r>
+            <a:r>
+              <a:rPr lang="en-US" dirty="0" smtClean="0"/>
               <a:t>) </a:t>
             </a:r>
             <a:r>
@@ -3760,16 +3776,60 @@
           <a:p>
             <a:r>
               <a:rPr lang="en-US" dirty="0" smtClean="0"/>
-              <a:t>ARRAY.SET(index, value)</a:t>
-            </a:r>
-          </a:p>
-          <a:p>
-            <a:r>
-              <a:rPr lang="en-US" dirty="0" smtClean="0"/>
+              <a:t>ARRAY.SET(index</a:t>
+            </a:r>
+            <a:r>
+              <a:rPr lang="en-US" baseline="-25000" dirty="0" smtClean="0"/>
+              <a:t>0</a:t>
+            </a:r>
+            <a:r>
+              <a:rPr lang="en-US" dirty="0" smtClean="0"/>
+              <a:t>, </a:t>
+            </a:r>
+            <a:r>
+              <a:rPr lang="en-US" dirty="0" smtClean="0"/>
+              <a:t>…, index</a:t>
+            </a:r>
+            <a:r>
+              <a:rPr lang="en-US" i="1" baseline="-25000" dirty="0" smtClean="0"/>
+              <a:t>d</a:t>
+            </a:r>
+            <a:r>
+              <a:rPr lang="en-US" baseline="-25000" dirty="0" smtClean="0"/>
+              <a:t>-1</a:t>
+            </a:r>
+            <a:r>
+              <a:rPr lang="en-US" dirty="0" smtClean="0"/>
+              <a:t>, </a:t>
+            </a:r>
+            <a:r>
+              <a:rPr lang="en-US" dirty="0" smtClean="0"/>
+              <a:t>value)</a:t>
+            </a:r>
+          </a:p>
+          <a:p>
+            <a:r>
+              <a:rPr lang="en-US" dirty="0"/>
               <a:t>ARRAY.GET(index</a:t>
             </a:r>
             <a:r>
+              <a:rPr lang="en-US" baseline="-25000" dirty="0"/>
+              <a:t>0</a:t>
+            </a:r>
+            <a:r>
               <a:rPr lang="en-US" dirty="0"/>
+              <a:t>, …, index</a:t>
+            </a:r>
+            <a:r>
+              <a:rPr lang="en-US" i="1" baseline="-25000" dirty="0"/>
+              <a:t>d</a:t>
+            </a:r>
+            <a:r>
+              <a:rPr lang="en-US" baseline="-25000" dirty="0"/>
+              <a:t>-1</a:t>
+            </a:r>
+            <a:r>
+              <a:rPr lang="en-US" dirty="0" smtClean="0"/>
               <a:t>) </a:t>
             </a:r>
             <a:r>
@@ -3782,8 +3842,16 @@
           </a:p>
           <a:p>
             <a:r>
-              <a:rPr lang="en-US" dirty="0"/>
-              <a:t>ARRAY.LENGTH </a:t>
+              <a:rPr lang="en-US" dirty="0" smtClean="0"/>
+              <a:t>ARRAY.LENGTH(</a:t>
+            </a:r>
+            <a:r>
+              <a:rPr lang="en-US" i="1" dirty="0" err="1" smtClean="0"/>
+              <a:t>i</a:t>
+            </a:r>
+            <a:r>
+              <a:rPr lang="en-US" dirty="0" smtClean="0"/>
+              <a:t>) </a:t>
             </a:r>
             <a:r>
               <a:rPr lang="en-US" dirty="0">
@@ -3792,12 +3860,18 @@
               <a:t> </a:t>
             </a:r>
             <a:r>
-              <a:rPr lang="en-US" dirty="0" smtClean="0">
+              <a:rPr lang="en-US" dirty="0" err="1" smtClean="0">
                 <a:sym typeface="Symbol" panose="05050102010706020507" pitchFamily="18" charset="2"/>
               </a:rPr>
               <a:t>length</a:t>
             </a:r>
-            <a:endParaRPr lang="en-US" dirty="0"/>
+            <a:r>
+              <a:rPr lang="en-US" i="1" baseline="-25000" dirty="0" err="1" smtClean="0">
+                <a:sym typeface="Symbol" panose="05050102010706020507" pitchFamily="18" charset="2"/>
+              </a:rPr>
+              <a:t>i</a:t>
+            </a:r>
+            <a:endParaRPr lang="en-US" i="1" baseline="-25000" dirty="0"/>
           </a:p>
         </p:txBody>
       </p:sp>
@@ -3821,6 +3895,139 @@
               <a:t>10</a:t>
             </a:fld>
             <a:endParaRPr lang="en-US"/>
+          </a:p>
+        </p:txBody>
+      </p:sp>
+      <p:sp>
+        <p:nvSpPr>
+          <p:cNvPr id="5" name="TextBox 4"/>
+          <p:cNvSpPr txBox="1"/>
+          <p:nvPr/>
+        </p:nvSpPr>
+        <p:spPr>
+          <a:xfrm>
+            <a:off x="1652153" y="4218709"/>
+            <a:ext cx="5588709" cy="523220"/>
+          </a:xfrm>
+          <a:prstGeom prst="rect">
+            <a:avLst/>
+          </a:prstGeom>
+          <a:noFill/>
+          <a:ln>
+            <a:solidFill>
+              <a:schemeClr val="tx1"/>
+            </a:solidFill>
+          </a:ln>
+        </p:spPr>
+        <p:txBody>
+          <a:bodyPr wrap="none" rtlCol="0">
+            <a:spAutoFit/>
+          </a:bodyPr>
+          <a:lstStyle/>
+          <a:p>
+            <a:r>
+              <a:rPr lang="en-US" sz="2800" dirty="0" smtClean="0">
+                <a:sym typeface="Symbol" panose="05050102010706020507" pitchFamily="18" charset="2"/>
+              </a:rPr>
+              <a:t> 0 </a:t>
+            </a:r>
+            <a:r>
+              <a:rPr lang="en-US" sz="2800" dirty="0">
+                <a:sym typeface="Symbol" panose="05050102010706020507" pitchFamily="18" charset="2"/>
+              </a:rPr>
+              <a:t></a:t>
+            </a:r>
+            <a:r>
+              <a:rPr lang="en-US" sz="2800" dirty="0" smtClean="0">
+                <a:sym typeface="Symbol" panose="05050102010706020507" pitchFamily="18" charset="2"/>
+              </a:rPr>
+              <a:t> </a:t>
+            </a:r>
+            <a:r>
+              <a:rPr lang="en-US" sz="2800" i="1" dirty="0" err="1" smtClean="0">
+                <a:sym typeface="Symbol" panose="05050102010706020507" pitchFamily="18" charset="2"/>
+              </a:rPr>
+              <a:t>i</a:t>
+            </a:r>
+            <a:r>
+              <a:rPr lang="en-US" sz="2800" dirty="0" smtClean="0">
+                <a:sym typeface="Symbol" panose="05050102010706020507" pitchFamily="18" charset="2"/>
+              </a:rPr>
+              <a:t> </a:t>
+            </a:r>
+            <a:r>
+              <a:rPr lang="en-US" sz="2800" dirty="0">
+                <a:sym typeface="Symbol" panose="05050102010706020507" pitchFamily="18" charset="2"/>
+              </a:rPr>
+              <a:t></a:t>
+            </a:r>
+            <a:r>
+              <a:rPr lang="en-US" sz="2800" dirty="0" smtClean="0">
+                <a:sym typeface="Symbol" panose="05050102010706020507" pitchFamily="18" charset="2"/>
+              </a:rPr>
+              <a:t> </a:t>
+            </a:r>
+            <a:r>
+              <a:rPr lang="en-US" sz="2800" i="1" dirty="0" smtClean="0">
+                <a:sym typeface="Symbol" panose="05050102010706020507" pitchFamily="18" charset="2"/>
+              </a:rPr>
+              <a:t>d</a:t>
+            </a:r>
+            <a:r>
+              <a:rPr lang="en-US" sz="2800" dirty="0" smtClean="0">
+                <a:sym typeface="Symbol" panose="05050102010706020507" pitchFamily="18" charset="2"/>
+              </a:rPr>
+              <a:t> - 1:  </a:t>
+            </a:r>
+            <a:r>
+              <a:rPr lang="en-US" sz="2800" dirty="0" smtClean="0"/>
+              <a:t>0 </a:t>
+            </a:r>
+            <a:r>
+              <a:rPr lang="en-US" sz="2800" dirty="0" smtClean="0">
+                <a:sym typeface="Symbol" panose="05050102010706020507" pitchFamily="18" charset="2"/>
+              </a:rPr>
+              <a:t></a:t>
+            </a:r>
+            <a:r>
+              <a:rPr lang="en-US" sz="2800" dirty="0" smtClean="0"/>
+              <a:t> </a:t>
+            </a:r>
+            <a:r>
+              <a:rPr lang="en-US" sz="2800" dirty="0" err="1" smtClean="0"/>
+              <a:t>index</a:t>
+            </a:r>
+            <a:r>
+              <a:rPr lang="en-US" sz="2800" i="1" baseline="-25000" dirty="0" err="1" smtClean="0"/>
+              <a:t>i</a:t>
+            </a:r>
+            <a:r>
+              <a:rPr lang="en-US" sz="2800" dirty="0" smtClean="0"/>
+              <a:t> </a:t>
+            </a:r>
+            <a:r>
+              <a:rPr lang="en-US" sz="2800" dirty="0">
+                <a:sym typeface="Symbol" panose="05050102010706020507" pitchFamily="18" charset="2"/>
+              </a:rPr>
+              <a:t></a:t>
+            </a:r>
+            <a:r>
+              <a:rPr lang="en-US" sz="2800" dirty="0" smtClean="0"/>
+              <a:t> </a:t>
+            </a:r>
+            <a:r>
+              <a:rPr lang="en-US" sz="2800" dirty="0" err="1" smtClean="0"/>
+              <a:t>length</a:t>
+            </a:r>
+            <a:r>
+              <a:rPr lang="en-US" sz="2800" i="1" baseline="-25000" dirty="0" err="1" smtClean="0"/>
+              <a:t>i</a:t>
+            </a:r>
+            <a:r>
+              <a:rPr lang="en-US" sz="2800" dirty="0" smtClean="0"/>
+              <a:t> - 1</a:t>
+            </a:r>
+            <a:endParaRPr lang="en-US" sz="2800" dirty="0"/>
           </a:p>
         </p:txBody>
       </p:sp>
@@ -4209,10 +4416,10 @@
         </p:nvGrpSpPr>
         <p:grpSpPr>
           <a:xfrm>
-            <a:off x="4699287" y="3234172"/>
-            <a:ext cx="2659967" cy="797285"/>
+            <a:off x="4699287" y="3234173"/>
+            <a:ext cx="2734976" cy="798078"/>
             <a:chOff x="6307280" y="2566553"/>
-            <a:chExt cx="3546622" cy="1063046"/>
+            <a:chExt cx="3646634" cy="1064103"/>
           </a:xfrm>
         </p:grpSpPr>
         <p:graphicFrame>
@@ -4224,25 +4431,25 @@
             <p:nvPr>
               <p:extLst>
                 <p:ext uri="{D42A27DB-BD31-4B8C-83A1-F6EECF244321}">
-                  <p14:modId xmlns:p14="http://schemas.microsoft.com/office/powerpoint/2010/main" val="872199375"/>
+                  <p14:modId xmlns:p14="http://schemas.microsoft.com/office/powerpoint/2010/main" val="218672160"/>
                 </p:ext>
               </p:extLst>
             </p:nvPr>
           </p:nvGraphicFramePr>
           <p:xfrm>
-            <a:off x="7405977" y="3118424"/>
-            <a:ext cx="2447925" cy="511175"/>
+            <a:off x="7305964" y="3118423"/>
+            <a:ext cx="2647950" cy="512233"/>
           </p:xfrm>
           <a:graphic>
             <a:graphicData uri="http://schemas.openxmlformats.org/presentationml/2006/ole">
               <mc:AlternateContent xmlns:mc="http://schemas.openxmlformats.org/markup-compatibility/2006">
                 <mc:Choice xmlns:v="urn:schemas-microsoft-com:vml" Requires="v">
-                  <p:oleObj spid="_x0000_s3100" name="Equation" r:id="rId3" imgW="1091880" imgH="228600" progId="Equation.3">
+                  <p:oleObj spid="_x0000_s3108" name="Equation" r:id="rId3" imgW="1180800" imgH="228600" progId="Equation.3">
                     <p:embed/>
                   </p:oleObj>
                 </mc:Choice>
                 <mc:Fallback>
-                  <p:oleObj name="Equation" r:id="rId3" imgW="1091880" imgH="228600" progId="Equation.3">
+                  <p:oleObj name="Equation" r:id="rId3" imgW="1180800" imgH="228600" progId="Equation.3">
                     <p:embed/>
                     <p:pic>
                       <p:nvPicPr>
@@ -4258,8 +4465,8 @@
                       </p:blipFill>
                       <p:spPr>
                         <a:xfrm>
-                          <a:off x="7405977" y="3118424"/>
-                          <a:ext cx="2447925" cy="511175"/>
+                          <a:off x="7305964" y="3118423"/>
+                          <a:ext cx="2647950" cy="512233"/>
                         </a:xfrm>
                         <a:prstGeom prst="rect">
                           <a:avLst/>
@@ -4416,7 +4623,7 @@
             </a:r>
             <a:r>
               <a:rPr lang="en-US" baseline="-25000" dirty="0" smtClean="0"/>
-              <a:t>1</a:t>
+              <a:t>0</a:t>
             </a:r>
             <a:r>
               <a:rPr lang="en-US" dirty="0" smtClean="0"/>
@@ -4424,67 +4631,84 @@
             </a:r>
             <a:r>
               <a:rPr lang="en-US" baseline="-25000" dirty="0" smtClean="0"/>
-              <a:t>1</a:t>
-            </a:r>
-            <a:r>
-              <a:rPr lang="en-US" dirty="0" smtClean="0"/>
-              <a:t>,…, </a:t>
-            </a:r>
-            <a:r>
-              <a:rPr lang="en-US" dirty="0" err="1" smtClean="0"/>
-              <a:t>key</a:t>
-            </a:r>
-            <a:r>
-              <a:rPr lang="en-US" i="1" baseline="-25000" dirty="0" err="1" smtClean="0"/>
-              <a:t>d</a:t>
-            </a:r>
-            <a:r>
-              <a:rPr lang="en-US" dirty="0" smtClean="0"/>
-              <a:t> = value</a:t>
+              <a:t>0</a:t>
+            </a:r>
+            <a:r>
+              <a:rPr lang="en-US" dirty="0" smtClean="0"/>
+              <a:t>, …, key</a:t>
             </a:r>
             <a:r>
               <a:rPr lang="en-US" i="1" baseline="-25000" dirty="0" smtClean="0"/>
               <a:t>d</a:t>
             </a:r>
             <a:r>
-              <a:rPr lang="en-US" dirty="0"/>
+              <a:rPr lang="en-US" baseline="-25000" dirty="0" smtClean="0"/>
+              <a:t>-1</a:t>
+            </a:r>
+            <a:r>
+              <a:rPr lang="en-US" dirty="0" smtClean="0"/>
+              <a:t> </a:t>
+            </a:r>
+            <a:r>
+              <a:rPr lang="en-US" dirty="0" smtClean="0"/>
+              <a:t>= </a:t>
+            </a:r>
+            <a:r>
+              <a:rPr lang="en-US" dirty="0" smtClean="0"/>
+              <a:t>value</a:t>
+            </a:r>
+            <a:r>
+              <a:rPr lang="en-US" i="1" baseline="-25000" dirty="0" smtClean="0"/>
+              <a:t>d</a:t>
+            </a:r>
+            <a:r>
+              <a:rPr lang="en-US" baseline="-25000" dirty="0" smtClean="0"/>
+              <a:t>-1</a:t>
+            </a:r>
+            <a:r>
+              <a:rPr lang="en-US" dirty="0" smtClean="0"/>
+              <a:t>)</a:t>
+            </a:r>
+            <a:br>
+              <a:rPr lang="en-US" dirty="0" smtClean="0"/>
+            </a:br>
+            <a:r>
+              <a:rPr lang="en-US" dirty="0" smtClean="0"/>
+              <a:t>                  </a:t>
+            </a:r>
+            <a:r>
+              <a:rPr lang="en-US" dirty="0" smtClean="0">
+                <a:sym typeface="Symbol" panose="05050102010706020507" pitchFamily="18" charset="2"/>
+              </a:rPr>
+              <a:t> tuple</a:t>
+            </a:r>
+            <a:endParaRPr lang="en-US" dirty="0" smtClean="0"/>
+          </a:p>
+          <a:p>
+            <a:r>
+              <a:rPr lang="en-US" dirty="0" smtClean="0"/>
+              <a:t>TUPLE.GET(key</a:t>
+            </a:r>
+            <a:r>
+              <a:rPr lang="en-US" dirty="0" smtClean="0"/>
               <a:t>) </a:t>
             </a:r>
             <a:r>
-              <a:rPr lang="en-US" dirty="0">
+              <a:rPr lang="en-US" dirty="0" smtClean="0">
                 <a:sym typeface="Symbol" panose="05050102010706020507" pitchFamily="18" charset="2"/>
               </a:rPr>
-              <a:t> </a:t>
-            </a:r>
-            <a:r>
-              <a:rPr lang="en-US" dirty="0" smtClean="0">
-                <a:sym typeface="Symbol" panose="05050102010706020507" pitchFamily="18" charset="2"/>
-              </a:rPr>
-              <a:t>tuple</a:t>
+              <a:t> value</a:t>
             </a:r>
             <a:endParaRPr lang="en-US" dirty="0" smtClean="0"/>
           </a:p>
           <a:p>
             <a:r>
               <a:rPr lang="en-US" dirty="0" smtClean="0"/>
-              <a:t>TUPLE.GET(key</a:t>
-            </a:r>
-            <a:r>
-              <a:rPr lang="en-US" dirty="0" smtClean="0"/>
-              <a:t>) </a:t>
-            </a:r>
-            <a:r>
-              <a:rPr lang="en-US" dirty="0" smtClean="0">
-                <a:sym typeface="Symbol" panose="05050102010706020507" pitchFamily="18" charset="2"/>
-              </a:rPr>
-              <a:t> value</a:t>
-            </a:r>
-            <a:endParaRPr lang="en-US" dirty="0" smtClean="0"/>
-          </a:p>
-          <a:p>
-            <a:r>
-              <a:rPr lang="en-US" dirty="0" smtClean="0"/>
-              <a:t>TUPLE.SET(key, value) if key in tuple</a:t>
+              <a:t>TUPLE.SET(key, </a:t>
+            </a:r>
+            <a:r>
+              <a:rPr lang="en-US" dirty="0" smtClean="0"/>
+              <a:t>value)</a:t>
             </a:r>
             <a:endParaRPr lang="en-US" dirty="0"/>
           </a:p>
@@ -4510,6 +4734,75 @@
               <a:t>13</a:t>
             </a:fld>
             <a:endParaRPr lang="en-US"/>
+          </a:p>
+        </p:txBody>
+      </p:sp>
+      <p:sp>
+        <p:nvSpPr>
+          <p:cNvPr id="5" name="TextBox 4"/>
+          <p:cNvSpPr txBox="1"/>
+          <p:nvPr/>
+        </p:nvSpPr>
+        <p:spPr>
+          <a:xfrm>
+            <a:off x="2556165" y="3927761"/>
+            <a:ext cx="3392404" cy="523220"/>
+          </a:xfrm>
+          <a:prstGeom prst="rect">
+            <a:avLst/>
+          </a:prstGeom>
+          <a:noFill/>
+          <a:ln>
+            <a:solidFill>
+              <a:schemeClr val="tx1"/>
+            </a:solidFill>
+          </a:ln>
+        </p:spPr>
+        <p:txBody>
+          <a:bodyPr wrap="none" rtlCol="0">
+            <a:spAutoFit/>
+          </a:bodyPr>
+          <a:lstStyle/>
+          <a:p>
+            <a:r>
+              <a:rPr lang="en-US" sz="2800" dirty="0" smtClean="0"/>
+              <a:t>key</a:t>
+            </a:r>
+            <a:r>
+              <a:rPr lang="en-US" sz="2800" baseline="-25000" dirty="0" smtClean="0"/>
+              <a:t> </a:t>
+            </a:r>
+            <a:r>
+              <a:rPr lang="en-US" sz="2800" dirty="0" smtClean="0">
+                <a:sym typeface="Symbol" panose="05050102010706020507" pitchFamily="18" charset="2"/>
+              </a:rPr>
+              <a:t></a:t>
+            </a:r>
+            <a:r>
+              <a:rPr lang="en-US" sz="2800" dirty="0" smtClean="0"/>
+              <a:t> {key</a:t>
+            </a:r>
+            <a:r>
+              <a:rPr lang="en-US" sz="2800" baseline="-25000" dirty="0" smtClean="0"/>
+              <a:t>0</a:t>
+            </a:r>
+            <a:r>
+              <a:rPr lang="en-US" sz="2800" dirty="0" smtClean="0"/>
+              <a:t>, …, key</a:t>
+            </a:r>
+            <a:r>
+              <a:rPr lang="en-US" sz="2800" i="1" baseline="-25000" dirty="0" smtClean="0"/>
+              <a:t>d</a:t>
+            </a:r>
+            <a:r>
+              <a:rPr lang="en-US" sz="2800" baseline="-25000" dirty="0" smtClean="0"/>
+              <a:t>-1</a:t>
+            </a:r>
+            <a:r>
+              <a:rPr lang="en-US" sz="2800" dirty="0" smtClean="0"/>
+              <a:t>}</a:t>
+            </a:r>
+            <a:endParaRPr lang="en-US" sz="2800" dirty="0"/>
           </a:p>
         </p:txBody>
       </p:sp>
@@ -4973,7 +5266,7 @@
         <p:spPr>
           <a:xfrm>
             <a:off x="6826827" y="5299364"/>
-            <a:ext cx="1319785" cy="646331"/>
+            <a:ext cx="1319785" cy="923330"/>
           </a:xfrm>
           <a:prstGeom prst="rect">
             <a:avLst/>
@@ -5008,6 +5301,13 @@
             <a:r>
               <a:rPr lang="en-US" dirty="0" smtClean="0"/>
               <a:t>immutable</a:t>
+            </a:r>
+            <a:br>
+              <a:rPr lang="en-US" dirty="0" smtClean="0"/>
+            </a:br>
+            <a:r>
+              <a:rPr lang="en-US" dirty="0" smtClean="0"/>
+              <a:t>in Python</a:t>
             </a:r>
             <a:endParaRPr lang="en-US" dirty="0"/>
           </a:p>
@@ -5228,7 +5528,7 @@
             <a:graphicData uri="http://schemas.openxmlformats.org/presentationml/2006/ole">
               <mc:AlternateContent xmlns:mc="http://schemas.openxmlformats.org/markup-compatibility/2006">
                 <mc:Choice xmlns:v="urn:schemas-microsoft-com:vml" Requires="v">
-                  <p:oleObj spid="_x0000_s4119" name="Equation" r:id="rId3" imgW="419040" imgH="241200" progId="Equation.3">
+                  <p:oleObj spid="_x0000_s4127" name="Equation" r:id="rId3" imgW="419040" imgH="241200" progId="Equation.3">
                     <p:embed/>
                   </p:oleObj>
                 </mc:Choice>
@@ -5322,6 +5622,833 @@
           </a:p>
         </p:txBody>
       </p:sp>
+      <p:grpSp>
+        <p:nvGrpSpPr>
+          <p:cNvPr id="40" name="Group 39"/>
+          <p:cNvGrpSpPr/>
+          <p:nvPr/>
+        </p:nvGrpSpPr>
+        <p:grpSpPr>
+          <a:xfrm>
+            <a:off x="5268191" y="4873328"/>
+            <a:ext cx="2732816" cy="817426"/>
+            <a:chOff x="5268191" y="4873328"/>
+            <a:chExt cx="2732816" cy="817426"/>
+          </a:xfrm>
+        </p:grpSpPr>
+        <p:grpSp>
+          <p:nvGrpSpPr>
+            <p:cNvPr id="12" name="Group 11"/>
+            <p:cNvGrpSpPr/>
+            <p:nvPr/>
+          </p:nvGrpSpPr>
+          <p:grpSpPr>
+            <a:xfrm>
+              <a:off x="5268191" y="5070761"/>
+              <a:ext cx="311727" cy="467593"/>
+              <a:chOff x="5268191" y="5070761"/>
+              <a:chExt cx="311727" cy="467593"/>
+            </a:xfrm>
+          </p:grpSpPr>
+          <p:sp>
+            <p:nvSpPr>
+              <p:cNvPr id="8" name="Rectangle 7"/>
+              <p:cNvSpPr/>
+              <p:nvPr/>
+            </p:nvSpPr>
+            <p:spPr>
+              <a:xfrm>
+                <a:off x="5278475" y="5070761"/>
+                <a:ext cx="301443" cy="467593"/>
+              </a:xfrm>
+              <a:prstGeom prst="rect">
+                <a:avLst/>
+              </a:prstGeom>
+              <a:noFill/>
+              <a:ln>
+                <a:solidFill>
+                  <a:schemeClr val="tx1"/>
+                </a:solidFill>
+              </a:ln>
+            </p:spPr>
+            <p:style>
+              <a:lnRef idx="2">
+                <a:schemeClr val="accent1">
+                  <a:shade val="50000"/>
+                </a:schemeClr>
+              </a:lnRef>
+              <a:fillRef idx="1">
+                <a:schemeClr val="accent1"/>
+              </a:fillRef>
+              <a:effectRef idx="0">
+                <a:schemeClr val="accent1"/>
+              </a:effectRef>
+              <a:fontRef idx="minor">
+                <a:schemeClr val="lt1"/>
+              </a:fontRef>
+            </p:style>
+            <p:txBody>
+              <a:bodyPr rtlCol="0" anchor="ctr"/>
+              <a:lstStyle/>
+              <a:p>
+                <a:pPr algn="ctr"/>
+                <a:endParaRPr lang="en-US"/>
+              </a:p>
+            </p:txBody>
+          </p:sp>
+          <p:sp>
+            <p:nvSpPr>
+              <p:cNvPr id="9" name="Oval 8"/>
+              <p:cNvSpPr/>
+              <p:nvPr/>
+            </p:nvSpPr>
+            <p:spPr>
+              <a:xfrm>
+                <a:off x="5394507" y="5140685"/>
+                <a:ext cx="83127" cy="83127"/>
+              </a:xfrm>
+              <a:prstGeom prst="ellipse">
+                <a:avLst/>
+              </a:prstGeom>
+              <a:solidFill>
+                <a:schemeClr val="tx1"/>
+              </a:solidFill>
+              <a:ln>
+                <a:solidFill>
+                  <a:schemeClr val="tx1"/>
+                </a:solidFill>
+              </a:ln>
+            </p:spPr>
+            <p:style>
+              <a:lnRef idx="2">
+                <a:schemeClr val="accent1">
+                  <a:shade val="50000"/>
+                </a:schemeClr>
+              </a:lnRef>
+              <a:fillRef idx="1">
+                <a:schemeClr val="accent1"/>
+              </a:fillRef>
+              <a:effectRef idx="0">
+                <a:schemeClr val="accent1"/>
+              </a:effectRef>
+              <a:fontRef idx="minor">
+                <a:schemeClr val="lt1"/>
+              </a:fontRef>
+            </p:style>
+            <p:txBody>
+              <a:bodyPr rtlCol="0" anchor="ctr"/>
+              <a:lstStyle/>
+              <a:p>
+                <a:pPr algn="ctr"/>
+                <a:endParaRPr lang="en-US"/>
+              </a:p>
+            </p:txBody>
+          </p:sp>
+          <p:cxnSp>
+            <p:nvCxnSpPr>
+              <p:cNvPr id="11" name="Straight Connector 10"/>
+              <p:cNvCxnSpPr>
+                <a:endCxn id="8" idx="3"/>
+              </p:cNvCxnSpPr>
+              <p:nvPr/>
+            </p:nvCxnSpPr>
+            <p:spPr>
+              <a:xfrm>
+                <a:off x="5268191" y="5299364"/>
+                <a:ext cx="311727" cy="5194"/>
+              </a:xfrm>
+              <a:prstGeom prst="line">
+                <a:avLst/>
+              </a:prstGeom>
+              <a:ln>
+                <a:solidFill>
+                  <a:schemeClr val="tx1"/>
+                </a:solidFill>
+              </a:ln>
+            </p:spPr>
+            <p:style>
+              <a:lnRef idx="1">
+                <a:schemeClr val="accent1"/>
+              </a:lnRef>
+              <a:fillRef idx="0">
+                <a:schemeClr val="accent1"/>
+              </a:fillRef>
+              <a:effectRef idx="0">
+                <a:schemeClr val="accent1"/>
+              </a:effectRef>
+              <a:fontRef idx="minor">
+                <a:schemeClr val="tx1"/>
+              </a:fontRef>
+            </p:style>
+          </p:cxnSp>
+        </p:grpSp>
+        <p:grpSp>
+          <p:nvGrpSpPr>
+            <p:cNvPr id="13" name="Group 12"/>
+            <p:cNvGrpSpPr/>
+            <p:nvPr/>
+          </p:nvGrpSpPr>
+          <p:grpSpPr>
+            <a:xfrm>
+              <a:off x="6044047" y="5223161"/>
+              <a:ext cx="311727" cy="467593"/>
+              <a:chOff x="5268191" y="5070761"/>
+              <a:chExt cx="311727" cy="467593"/>
+            </a:xfrm>
+          </p:grpSpPr>
+          <p:sp>
+            <p:nvSpPr>
+              <p:cNvPr id="14" name="Rectangle 13"/>
+              <p:cNvSpPr/>
+              <p:nvPr/>
+            </p:nvSpPr>
+            <p:spPr>
+              <a:xfrm>
+                <a:off x="5278475" y="5070761"/>
+                <a:ext cx="301443" cy="467593"/>
+              </a:xfrm>
+              <a:prstGeom prst="rect">
+                <a:avLst/>
+              </a:prstGeom>
+              <a:noFill/>
+              <a:ln>
+                <a:solidFill>
+                  <a:schemeClr val="tx1"/>
+                </a:solidFill>
+              </a:ln>
+            </p:spPr>
+            <p:style>
+              <a:lnRef idx="2">
+                <a:schemeClr val="accent1">
+                  <a:shade val="50000"/>
+                </a:schemeClr>
+              </a:lnRef>
+              <a:fillRef idx="1">
+                <a:schemeClr val="accent1"/>
+              </a:fillRef>
+              <a:effectRef idx="0">
+                <a:schemeClr val="accent1"/>
+              </a:effectRef>
+              <a:fontRef idx="minor">
+                <a:schemeClr val="lt1"/>
+              </a:fontRef>
+            </p:style>
+            <p:txBody>
+              <a:bodyPr rtlCol="0" anchor="ctr"/>
+              <a:lstStyle/>
+              <a:p>
+                <a:pPr algn="ctr"/>
+                <a:endParaRPr lang="en-US"/>
+              </a:p>
+            </p:txBody>
+          </p:sp>
+          <p:sp>
+            <p:nvSpPr>
+              <p:cNvPr id="15" name="Oval 14"/>
+              <p:cNvSpPr/>
+              <p:nvPr/>
+            </p:nvSpPr>
+            <p:spPr>
+              <a:xfrm>
+                <a:off x="5394507" y="5140685"/>
+                <a:ext cx="83127" cy="83127"/>
+              </a:xfrm>
+              <a:prstGeom prst="ellipse">
+                <a:avLst/>
+              </a:prstGeom>
+              <a:solidFill>
+                <a:schemeClr val="tx1"/>
+              </a:solidFill>
+              <a:ln>
+                <a:solidFill>
+                  <a:schemeClr val="tx1"/>
+                </a:solidFill>
+              </a:ln>
+            </p:spPr>
+            <p:style>
+              <a:lnRef idx="2">
+                <a:schemeClr val="accent1">
+                  <a:shade val="50000"/>
+                </a:schemeClr>
+              </a:lnRef>
+              <a:fillRef idx="1">
+                <a:schemeClr val="accent1"/>
+              </a:fillRef>
+              <a:effectRef idx="0">
+                <a:schemeClr val="accent1"/>
+              </a:effectRef>
+              <a:fontRef idx="minor">
+                <a:schemeClr val="lt1"/>
+              </a:fontRef>
+            </p:style>
+            <p:txBody>
+              <a:bodyPr rtlCol="0" anchor="ctr"/>
+              <a:lstStyle/>
+              <a:p>
+                <a:pPr algn="ctr"/>
+                <a:endParaRPr lang="en-US"/>
+              </a:p>
+            </p:txBody>
+          </p:sp>
+          <p:cxnSp>
+            <p:nvCxnSpPr>
+              <p:cNvPr id="16" name="Straight Connector 15"/>
+              <p:cNvCxnSpPr>
+                <a:endCxn id="14" idx="3"/>
+              </p:cNvCxnSpPr>
+              <p:nvPr/>
+            </p:nvCxnSpPr>
+            <p:spPr>
+              <a:xfrm>
+                <a:off x="5268191" y="5299364"/>
+                <a:ext cx="311727" cy="5194"/>
+              </a:xfrm>
+              <a:prstGeom prst="line">
+                <a:avLst/>
+              </a:prstGeom>
+              <a:ln>
+                <a:solidFill>
+                  <a:schemeClr val="tx1"/>
+                </a:solidFill>
+              </a:ln>
+            </p:spPr>
+            <p:style>
+              <a:lnRef idx="1">
+                <a:schemeClr val="accent1"/>
+              </a:lnRef>
+              <a:fillRef idx="0">
+                <a:schemeClr val="accent1"/>
+              </a:fillRef>
+              <a:effectRef idx="0">
+                <a:schemeClr val="accent1"/>
+              </a:effectRef>
+              <a:fontRef idx="minor">
+                <a:schemeClr val="tx1"/>
+              </a:fontRef>
+            </p:style>
+          </p:cxnSp>
+        </p:grpSp>
+        <p:grpSp>
+          <p:nvGrpSpPr>
+            <p:cNvPr id="17" name="Group 16"/>
+            <p:cNvGrpSpPr/>
+            <p:nvPr/>
+          </p:nvGrpSpPr>
+          <p:grpSpPr>
+            <a:xfrm>
+              <a:off x="6799123" y="5053440"/>
+              <a:ext cx="311727" cy="467593"/>
+              <a:chOff x="5268191" y="5070761"/>
+              <a:chExt cx="311727" cy="467593"/>
+            </a:xfrm>
+          </p:grpSpPr>
+          <p:sp>
+            <p:nvSpPr>
+              <p:cNvPr id="18" name="Rectangle 17"/>
+              <p:cNvSpPr/>
+              <p:nvPr/>
+            </p:nvSpPr>
+            <p:spPr>
+              <a:xfrm>
+                <a:off x="5278475" y="5070761"/>
+                <a:ext cx="301443" cy="467593"/>
+              </a:xfrm>
+              <a:prstGeom prst="rect">
+                <a:avLst/>
+              </a:prstGeom>
+              <a:noFill/>
+              <a:ln>
+                <a:solidFill>
+                  <a:schemeClr val="tx1"/>
+                </a:solidFill>
+              </a:ln>
+            </p:spPr>
+            <p:style>
+              <a:lnRef idx="2">
+                <a:schemeClr val="accent1">
+                  <a:shade val="50000"/>
+                </a:schemeClr>
+              </a:lnRef>
+              <a:fillRef idx="1">
+                <a:schemeClr val="accent1"/>
+              </a:fillRef>
+              <a:effectRef idx="0">
+                <a:schemeClr val="accent1"/>
+              </a:effectRef>
+              <a:fontRef idx="minor">
+                <a:schemeClr val="lt1"/>
+              </a:fontRef>
+            </p:style>
+            <p:txBody>
+              <a:bodyPr rtlCol="0" anchor="ctr"/>
+              <a:lstStyle/>
+              <a:p>
+                <a:pPr algn="ctr"/>
+                <a:endParaRPr lang="en-US"/>
+              </a:p>
+            </p:txBody>
+          </p:sp>
+          <p:sp>
+            <p:nvSpPr>
+              <p:cNvPr id="19" name="Oval 18"/>
+              <p:cNvSpPr/>
+              <p:nvPr/>
+            </p:nvSpPr>
+            <p:spPr>
+              <a:xfrm>
+                <a:off x="5394507" y="5140685"/>
+                <a:ext cx="83127" cy="83127"/>
+              </a:xfrm>
+              <a:prstGeom prst="ellipse">
+                <a:avLst/>
+              </a:prstGeom>
+              <a:solidFill>
+                <a:schemeClr val="tx1"/>
+              </a:solidFill>
+              <a:ln>
+                <a:solidFill>
+                  <a:schemeClr val="tx1"/>
+                </a:solidFill>
+              </a:ln>
+            </p:spPr>
+            <p:style>
+              <a:lnRef idx="2">
+                <a:schemeClr val="accent1">
+                  <a:shade val="50000"/>
+                </a:schemeClr>
+              </a:lnRef>
+              <a:fillRef idx="1">
+                <a:schemeClr val="accent1"/>
+              </a:fillRef>
+              <a:effectRef idx="0">
+                <a:schemeClr val="accent1"/>
+              </a:effectRef>
+              <a:fontRef idx="minor">
+                <a:schemeClr val="lt1"/>
+              </a:fontRef>
+            </p:style>
+            <p:txBody>
+              <a:bodyPr rtlCol="0" anchor="ctr"/>
+              <a:lstStyle/>
+              <a:p>
+                <a:pPr algn="ctr"/>
+                <a:endParaRPr lang="en-US"/>
+              </a:p>
+            </p:txBody>
+          </p:sp>
+          <p:cxnSp>
+            <p:nvCxnSpPr>
+              <p:cNvPr id="20" name="Straight Connector 19"/>
+              <p:cNvCxnSpPr>
+                <a:endCxn id="18" idx="3"/>
+              </p:cNvCxnSpPr>
+              <p:nvPr/>
+            </p:nvCxnSpPr>
+            <p:spPr>
+              <a:xfrm>
+                <a:off x="5268191" y="5299364"/>
+                <a:ext cx="311727" cy="5194"/>
+              </a:xfrm>
+              <a:prstGeom prst="line">
+                <a:avLst/>
+              </a:prstGeom>
+              <a:ln>
+                <a:solidFill>
+                  <a:schemeClr val="tx1"/>
+                </a:solidFill>
+              </a:ln>
+            </p:spPr>
+            <p:style>
+              <a:lnRef idx="1">
+                <a:schemeClr val="accent1"/>
+              </a:lnRef>
+              <a:fillRef idx="0">
+                <a:schemeClr val="accent1"/>
+              </a:fillRef>
+              <a:effectRef idx="0">
+                <a:schemeClr val="accent1"/>
+              </a:effectRef>
+              <a:fontRef idx="minor">
+                <a:schemeClr val="tx1"/>
+              </a:fontRef>
+            </p:style>
+          </p:cxnSp>
+        </p:grpSp>
+        <p:grpSp>
+          <p:nvGrpSpPr>
+            <p:cNvPr id="21" name="Group 20"/>
+            <p:cNvGrpSpPr/>
+            <p:nvPr/>
+          </p:nvGrpSpPr>
+          <p:grpSpPr>
+            <a:xfrm>
+              <a:off x="7689280" y="4873328"/>
+              <a:ext cx="311727" cy="467593"/>
+              <a:chOff x="5268191" y="5070761"/>
+              <a:chExt cx="311727" cy="467593"/>
+            </a:xfrm>
+          </p:grpSpPr>
+          <p:sp>
+            <p:nvSpPr>
+              <p:cNvPr id="22" name="Rectangle 21"/>
+              <p:cNvSpPr/>
+              <p:nvPr/>
+            </p:nvSpPr>
+            <p:spPr>
+              <a:xfrm>
+                <a:off x="5278475" y="5070761"/>
+                <a:ext cx="301443" cy="467593"/>
+              </a:xfrm>
+              <a:prstGeom prst="rect">
+                <a:avLst/>
+              </a:prstGeom>
+              <a:noFill/>
+              <a:ln>
+                <a:solidFill>
+                  <a:schemeClr val="tx1"/>
+                </a:solidFill>
+              </a:ln>
+            </p:spPr>
+            <p:style>
+              <a:lnRef idx="2">
+                <a:schemeClr val="accent1">
+                  <a:shade val="50000"/>
+                </a:schemeClr>
+              </a:lnRef>
+              <a:fillRef idx="1">
+                <a:schemeClr val="accent1"/>
+              </a:fillRef>
+              <a:effectRef idx="0">
+                <a:schemeClr val="accent1"/>
+              </a:effectRef>
+              <a:fontRef idx="minor">
+                <a:schemeClr val="lt1"/>
+              </a:fontRef>
+            </p:style>
+            <p:txBody>
+              <a:bodyPr rtlCol="0" anchor="ctr"/>
+              <a:lstStyle/>
+              <a:p>
+                <a:pPr algn="ctr"/>
+                <a:endParaRPr lang="en-US"/>
+              </a:p>
+            </p:txBody>
+          </p:sp>
+          <p:sp>
+            <p:nvSpPr>
+              <p:cNvPr id="23" name="Oval 22"/>
+              <p:cNvSpPr/>
+              <p:nvPr/>
+            </p:nvSpPr>
+            <p:spPr>
+              <a:xfrm>
+                <a:off x="5394507" y="5140685"/>
+                <a:ext cx="83127" cy="83127"/>
+              </a:xfrm>
+              <a:prstGeom prst="ellipse">
+                <a:avLst/>
+              </a:prstGeom>
+              <a:solidFill>
+                <a:schemeClr val="tx1"/>
+              </a:solidFill>
+              <a:ln>
+                <a:solidFill>
+                  <a:schemeClr val="tx1"/>
+                </a:solidFill>
+              </a:ln>
+            </p:spPr>
+            <p:style>
+              <a:lnRef idx="2">
+                <a:schemeClr val="accent1">
+                  <a:shade val="50000"/>
+                </a:schemeClr>
+              </a:lnRef>
+              <a:fillRef idx="1">
+                <a:schemeClr val="accent1"/>
+              </a:fillRef>
+              <a:effectRef idx="0">
+                <a:schemeClr val="accent1"/>
+              </a:effectRef>
+              <a:fontRef idx="minor">
+                <a:schemeClr val="lt1"/>
+              </a:fontRef>
+            </p:style>
+            <p:txBody>
+              <a:bodyPr rtlCol="0" anchor="ctr"/>
+              <a:lstStyle/>
+              <a:p>
+                <a:pPr algn="ctr"/>
+                <a:endParaRPr lang="en-US"/>
+              </a:p>
+            </p:txBody>
+          </p:sp>
+          <p:cxnSp>
+            <p:nvCxnSpPr>
+              <p:cNvPr id="24" name="Straight Connector 23"/>
+              <p:cNvCxnSpPr>
+                <a:endCxn id="22" idx="3"/>
+              </p:cNvCxnSpPr>
+              <p:nvPr/>
+            </p:nvCxnSpPr>
+            <p:spPr>
+              <a:xfrm>
+                <a:off x="5268191" y="5299364"/>
+                <a:ext cx="311727" cy="5194"/>
+              </a:xfrm>
+              <a:prstGeom prst="line">
+                <a:avLst/>
+              </a:prstGeom>
+              <a:ln>
+                <a:solidFill>
+                  <a:schemeClr val="tx1"/>
+                </a:solidFill>
+              </a:ln>
+            </p:spPr>
+            <p:style>
+              <a:lnRef idx="1">
+                <a:schemeClr val="accent1"/>
+              </a:lnRef>
+              <a:fillRef idx="0">
+                <a:schemeClr val="accent1"/>
+              </a:fillRef>
+              <a:effectRef idx="0">
+                <a:schemeClr val="accent1"/>
+              </a:effectRef>
+              <a:fontRef idx="minor">
+                <a:schemeClr val="tx1"/>
+              </a:fontRef>
+            </p:style>
+          </p:cxnSp>
+        </p:grpSp>
+        <p:cxnSp>
+          <p:nvCxnSpPr>
+            <p:cNvPr id="26" name="Straight Arrow Connector 25"/>
+            <p:cNvCxnSpPr/>
+            <p:nvPr/>
+          </p:nvCxnSpPr>
+          <p:spPr>
+            <a:xfrm flipV="1">
+              <a:off x="5394507" y="5376212"/>
+              <a:ext cx="649540" cy="75552"/>
+            </a:xfrm>
+            <a:prstGeom prst="straightConnector1">
+              <a:avLst/>
+            </a:prstGeom>
+            <a:ln>
+              <a:solidFill>
+                <a:schemeClr val="tx1"/>
+              </a:solidFill>
+              <a:tailEnd type="stealth" w="lg" len="lg"/>
+            </a:ln>
+          </p:spPr>
+          <p:style>
+            <a:lnRef idx="1">
+              <a:schemeClr val="accent1"/>
+            </a:lnRef>
+            <a:fillRef idx="0">
+              <a:schemeClr val="accent1"/>
+            </a:fillRef>
+            <a:effectRef idx="0">
+              <a:schemeClr val="accent1"/>
+            </a:effectRef>
+            <a:fontRef idx="minor">
+              <a:schemeClr val="tx1"/>
+            </a:fontRef>
+          </p:style>
+        </p:cxnSp>
+        <p:cxnSp>
+          <p:nvCxnSpPr>
+            <p:cNvPr id="28" name="Straight Arrow Connector 27"/>
+            <p:cNvCxnSpPr/>
+            <p:nvPr/>
+          </p:nvCxnSpPr>
+          <p:spPr>
+            <a:xfrm flipV="1">
+              <a:off x="6180647" y="5154573"/>
+              <a:ext cx="628760" cy="404777"/>
+            </a:xfrm>
+            <a:prstGeom prst="straightConnector1">
+              <a:avLst/>
+            </a:prstGeom>
+            <a:ln>
+              <a:solidFill>
+                <a:schemeClr val="tx1"/>
+              </a:solidFill>
+              <a:tailEnd type="stealth" w="lg" len="lg"/>
+            </a:ln>
+          </p:spPr>
+          <p:style>
+            <a:lnRef idx="1">
+              <a:schemeClr val="accent1"/>
+            </a:lnRef>
+            <a:fillRef idx="0">
+              <a:schemeClr val="accent1"/>
+            </a:fillRef>
+            <a:effectRef idx="0">
+              <a:schemeClr val="accent1"/>
+            </a:effectRef>
+            <a:fontRef idx="minor">
+              <a:schemeClr val="tx1"/>
+            </a:fontRef>
+          </p:style>
+        </p:cxnSp>
+        <p:cxnSp>
+          <p:nvCxnSpPr>
+            <p:cNvPr id="30" name="Straight Arrow Connector 29"/>
+            <p:cNvCxnSpPr/>
+            <p:nvPr/>
+          </p:nvCxnSpPr>
+          <p:spPr>
+            <a:xfrm flipV="1">
+              <a:off x="6956503" y="4938352"/>
+              <a:ext cx="756809" cy="492805"/>
+            </a:xfrm>
+            <a:prstGeom prst="straightConnector1">
+              <a:avLst/>
+            </a:prstGeom>
+            <a:ln>
+              <a:solidFill>
+                <a:schemeClr val="tx1"/>
+              </a:solidFill>
+              <a:tailEnd type="stealth" w="lg" len="lg"/>
+            </a:ln>
+          </p:spPr>
+          <p:style>
+            <a:lnRef idx="1">
+              <a:schemeClr val="accent1"/>
+            </a:lnRef>
+            <a:fillRef idx="0">
+              <a:schemeClr val="accent1"/>
+            </a:fillRef>
+            <a:effectRef idx="0">
+              <a:schemeClr val="accent1"/>
+            </a:effectRef>
+            <a:fontRef idx="minor">
+              <a:schemeClr val="tx1"/>
+            </a:fontRef>
+          </p:style>
+        </p:cxnSp>
+        <p:grpSp>
+          <p:nvGrpSpPr>
+            <p:cNvPr id="39" name="Group 38"/>
+            <p:cNvGrpSpPr/>
+            <p:nvPr/>
+          </p:nvGrpSpPr>
+          <p:grpSpPr>
+            <a:xfrm>
+              <a:off x="7763641" y="5223161"/>
+              <a:ext cx="185411" cy="377535"/>
+              <a:chOff x="7763641" y="5223161"/>
+              <a:chExt cx="185411" cy="377535"/>
+            </a:xfrm>
+          </p:grpSpPr>
+          <p:cxnSp>
+            <p:nvCxnSpPr>
+              <p:cNvPr id="33" name="Straight Connector 32"/>
+              <p:cNvCxnSpPr/>
+              <p:nvPr/>
+            </p:nvCxnSpPr>
+            <p:spPr>
+              <a:xfrm>
+                <a:off x="7856346" y="5223161"/>
+                <a:ext cx="0" cy="297872"/>
+              </a:xfrm>
+              <a:prstGeom prst="line">
+                <a:avLst/>
+              </a:prstGeom>
+              <a:ln>
+                <a:solidFill>
+                  <a:schemeClr val="tx1"/>
+                </a:solidFill>
+              </a:ln>
+            </p:spPr>
+            <p:style>
+              <a:lnRef idx="1">
+                <a:schemeClr val="accent1"/>
+              </a:lnRef>
+              <a:fillRef idx="0">
+                <a:schemeClr val="accent1"/>
+              </a:fillRef>
+              <a:effectRef idx="0">
+                <a:schemeClr val="accent1"/>
+              </a:effectRef>
+              <a:fontRef idx="minor">
+                <a:schemeClr val="tx1"/>
+              </a:fontRef>
+            </p:style>
+          </p:cxnSp>
+          <p:cxnSp>
+            <p:nvCxnSpPr>
+              <p:cNvPr id="35" name="Straight Connector 34"/>
+              <p:cNvCxnSpPr/>
+              <p:nvPr/>
+            </p:nvCxnSpPr>
+            <p:spPr>
+              <a:xfrm>
+                <a:off x="7763641" y="5521033"/>
+                <a:ext cx="185411" cy="0"/>
+              </a:xfrm>
+              <a:prstGeom prst="line">
+                <a:avLst/>
+              </a:prstGeom>
+              <a:ln>
+                <a:solidFill>
+                  <a:schemeClr val="tx1"/>
+                </a:solidFill>
+              </a:ln>
+            </p:spPr>
+            <p:style>
+              <a:lnRef idx="1">
+                <a:schemeClr val="accent1"/>
+              </a:lnRef>
+              <a:fillRef idx="0">
+                <a:schemeClr val="accent1"/>
+              </a:fillRef>
+              <a:effectRef idx="0">
+                <a:schemeClr val="accent1"/>
+              </a:effectRef>
+              <a:fontRef idx="minor">
+                <a:schemeClr val="tx1"/>
+              </a:fontRef>
+            </p:style>
+          </p:cxnSp>
+          <p:cxnSp>
+            <p:nvCxnSpPr>
+              <p:cNvPr id="36" name="Straight Connector 35"/>
+              <p:cNvCxnSpPr/>
+              <p:nvPr/>
+            </p:nvCxnSpPr>
+            <p:spPr>
+              <a:xfrm>
+                <a:off x="7806124" y="5590054"/>
+                <a:ext cx="100444" cy="10642"/>
+              </a:xfrm>
+              <a:prstGeom prst="line">
+                <a:avLst/>
+              </a:prstGeom>
+              <a:ln>
+                <a:solidFill>
+                  <a:schemeClr val="tx1"/>
+                </a:solidFill>
+              </a:ln>
+            </p:spPr>
+            <p:style>
+              <a:lnRef idx="1">
+                <a:schemeClr val="accent1"/>
+              </a:lnRef>
+              <a:fillRef idx="0">
+                <a:schemeClr val="accent1"/>
+              </a:fillRef>
+              <a:effectRef idx="0">
+                <a:schemeClr val="accent1"/>
+              </a:effectRef>
+              <a:fontRef idx="minor">
+                <a:schemeClr val="tx1"/>
+              </a:fontRef>
+            </p:style>
+          </p:cxnSp>
+        </p:grpSp>
+      </p:grpSp>
     </p:spTree>
     <p:extLst>
       <p:ext uri="{BB962C8B-B14F-4D97-AF65-F5344CB8AC3E}">
@@ -5392,16 +6519,25 @@
             <p:ph idx="1"/>
           </p:nvPr>
         </p:nvSpPr>
-        <p:spPr/>
+        <p:spPr>
+          <a:xfrm>
+            <a:off x="618259" y="1825625"/>
+            <a:ext cx="7886700" cy="4351338"/>
+          </a:xfrm>
+        </p:spPr>
         <p:txBody>
           <a:bodyPr>
-            <a:normAutofit/>
+            <a:normAutofit lnSpcReduction="10000"/>
           </a:bodyPr>
           <a:lstStyle/>
           <a:p>
             <a:r>
+              <a:rPr lang="en-US" dirty="0" smtClean="0"/>
+              <a:t>EMPTY_LIST</a:t>
+            </a:r>
+            <a:r>
               <a:rPr lang="en-US" dirty="0"/>
-              <a:t>NEW_LIST() </a:t>
+              <a:t>() </a:t>
             </a:r>
             <a:r>
               <a:rPr lang="en-US" dirty="0">
@@ -5422,6 +6558,18 @@
               <a:rPr lang="en-US" dirty="0" smtClean="0"/>
               <a:t>LIST.INSERT(index, value)</a:t>
             </a:r>
+          </a:p>
+          <a:p>
+            <a:r>
+              <a:rPr lang="en-US" dirty="0" smtClean="0"/>
+              <a:t>LIST.APPEND(value)</a:t>
+            </a:r>
+          </a:p>
+          <a:p>
+            <a:r>
+              <a:rPr lang="en-US" dirty="0" smtClean="0"/>
+              <a:t>LIST.REMOVE(index)</a:t>
+            </a:r>
             <a:endParaRPr lang="en-US" dirty="0" smtClean="0"/>
           </a:p>
           <a:p>
@@ -5493,6 +6641,17 @@
                 <a:sym typeface="Symbol" panose="05050102010706020507" pitchFamily="18" charset="2"/>
               </a:rPr>
               <a:t>length</a:t>
+            </a:r>
+            <a:br>
+              <a:rPr lang="en-US" dirty="0" smtClean="0">
+                <a:sym typeface="Symbol" panose="05050102010706020507" pitchFamily="18" charset="2"/>
+              </a:rPr>
+            </a:br>
+            <a:r>
+              <a:rPr lang="en-US" dirty="0" smtClean="0">
+                <a:sym typeface="Symbol" panose="05050102010706020507" pitchFamily="18" charset="2"/>
+              </a:rPr>
+              <a:t>         = #append + #insert - #remove</a:t>
             </a:r>
             <a:endParaRPr lang="en-US" dirty="0"/>
           </a:p>
@@ -5518,6 +6677,61 @@
               <a:t>16</a:t>
             </a:fld>
             <a:endParaRPr lang="en-US"/>
+          </a:p>
+        </p:txBody>
+      </p:sp>
+      <p:sp>
+        <p:nvSpPr>
+          <p:cNvPr id="6" name="TextBox 5"/>
+          <p:cNvSpPr txBox="1"/>
+          <p:nvPr/>
+        </p:nvSpPr>
+        <p:spPr>
+          <a:xfrm>
+            <a:off x="2795154" y="6047512"/>
+            <a:ext cx="4421082" cy="523220"/>
+          </a:xfrm>
+          <a:prstGeom prst="rect">
+            <a:avLst/>
+          </a:prstGeom>
+          <a:noFill/>
+          <a:ln>
+            <a:solidFill>
+              <a:schemeClr val="tx1"/>
+            </a:solidFill>
+          </a:ln>
+        </p:spPr>
+        <p:txBody>
+          <a:bodyPr wrap="none" rtlCol="0">
+            <a:spAutoFit/>
+          </a:bodyPr>
+          <a:lstStyle/>
+          <a:p>
+            <a:r>
+              <a:rPr lang="en-US" sz="2800" dirty="0" smtClean="0"/>
+              <a:t>0 </a:t>
+            </a:r>
+            <a:r>
+              <a:rPr lang="en-US" sz="2800" dirty="0" smtClean="0">
+                <a:sym typeface="Symbol" panose="05050102010706020507" pitchFamily="18" charset="2"/>
+              </a:rPr>
+              <a:t></a:t>
+            </a:r>
+            <a:r>
+              <a:rPr lang="en-US" sz="2800" dirty="0" smtClean="0"/>
+              <a:t> index </a:t>
+            </a:r>
+            <a:r>
+              <a:rPr lang="en-US" sz="2800" dirty="0">
+                <a:sym typeface="Symbol" panose="05050102010706020507" pitchFamily="18" charset="2"/>
+              </a:rPr>
+              <a:t></a:t>
+            </a:r>
+            <a:r>
+              <a:rPr lang="en-US" sz="2800" dirty="0" smtClean="0"/>
+              <a:t> LIST.LENGTH() - 1</a:t>
+            </a:r>
+            <a:endParaRPr lang="en-US" sz="2800" dirty="0"/>
           </a:p>
         </p:txBody>
       </p:sp>
@@ -6254,7 +7468,7 @@
             <a:graphicData uri="http://schemas.openxmlformats.org/presentationml/2006/ole">
               <mc:AlternateContent xmlns:mc="http://schemas.openxmlformats.org/markup-compatibility/2006">
                 <mc:Choice xmlns:v="urn:schemas-microsoft-com:vml" Requires="v">
-                  <p:oleObj spid="_x0000_s5142" name="Equation" r:id="rId3" imgW="444240" imgH="203040" progId="Equation.3">
+                  <p:oleObj spid="_x0000_s5159" name="Equation" r:id="rId3" imgW="444240" imgH="203040" progId="Equation.3">
                     <p:embed/>
                   </p:oleObj>
                 </mc:Choice>
@@ -6348,6 +7562,273 @@
           </a:p>
         </p:txBody>
       </p:sp>
+      <p:grpSp>
+        <p:nvGrpSpPr>
+          <p:cNvPr id="13" name="Group 12"/>
+          <p:cNvGrpSpPr/>
+          <p:nvPr/>
+        </p:nvGrpSpPr>
+        <p:grpSpPr>
+          <a:xfrm>
+            <a:off x="5746177" y="4861936"/>
+            <a:ext cx="1479407" cy="1684337"/>
+            <a:chOff x="5268191" y="4861936"/>
+            <a:chExt cx="1479407" cy="1684337"/>
+          </a:xfrm>
+        </p:grpSpPr>
+        <p:sp>
+          <p:nvSpPr>
+            <p:cNvPr id="8" name="Oval 7"/>
+            <p:cNvSpPr/>
+            <p:nvPr/>
+          </p:nvSpPr>
+          <p:spPr>
+            <a:xfrm>
+              <a:off x="5268191" y="5258955"/>
+              <a:ext cx="892756" cy="1287318"/>
+            </a:xfrm>
+            <a:prstGeom prst="ellipse">
+              <a:avLst/>
+            </a:prstGeom>
+            <a:noFill/>
+            <a:ln>
+              <a:solidFill>
+                <a:schemeClr val="tx1"/>
+              </a:solidFill>
+            </a:ln>
+          </p:spPr>
+          <p:style>
+            <a:lnRef idx="2">
+              <a:schemeClr val="accent1">
+                <a:shade val="50000"/>
+              </a:schemeClr>
+            </a:lnRef>
+            <a:fillRef idx="1">
+              <a:schemeClr val="accent1"/>
+            </a:fillRef>
+            <a:effectRef idx="0">
+              <a:schemeClr val="accent1"/>
+            </a:effectRef>
+            <a:fontRef idx="minor">
+              <a:schemeClr val="lt1"/>
+            </a:fontRef>
+          </p:style>
+          <p:txBody>
+            <a:bodyPr rot="0" spcFirstLastPara="0" vertOverflow="overflow" horzOverflow="overflow" vert="horz" wrap="square" lIns="68580" tIns="34290" rIns="68580" bIns="34290" numCol="1" spcCol="0" rtlCol="0" fromWordArt="0" anchor="ctr" anchorCtr="0" forceAA="0" compatLnSpc="1">
+              <a:prstTxWarp prst="textNoShape">
+                <a:avLst/>
+              </a:prstTxWarp>
+              <a:noAutofit/>
+            </a:bodyPr>
+            <a:lstStyle/>
+            <a:p>
+              <a:pPr algn="ctr"/>
+              <a:endParaRPr lang="en-US" sz="1350"/>
+            </a:p>
+          </p:txBody>
+        </p:sp>
+        <p:graphicFrame>
+          <p:nvGraphicFramePr>
+            <p:cNvPr id="9" name="Object 8"/>
+            <p:cNvGraphicFramePr>
+              <a:graphicFrameLocks noChangeAspect="1"/>
+            </p:cNvGraphicFramePr>
+            <p:nvPr>
+              <p:extLst>
+                <p:ext uri="{D42A27DB-BD31-4B8C-83A1-F6EECF244321}">
+                  <p14:modId xmlns:p14="http://schemas.microsoft.com/office/powerpoint/2010/main" val="1301431003"/>
+                </p:ext>
+              </p:extLst>
+            </p:nvPr>
+          </p:nvGraphicFramePr>
+          <p:xfrm>
+            <a:off x="6041160" y="4861936"/>
+            <a:ext cx="706438" cy="363537"/>
+          </p:xfrm>
+          <a:graphic>
+            <a:graphicData uri="http://schemas.openxmlformats.org/presentationml/2006/ole">
+              <mc:AlternateContent xmlns:mc="http://schemas.openxmlformats.org/markup-compatibility/2006">
+                <mc:Choice xmlns:v="urn:schemas-microsoft-com:vml" Requires="v">
+                  <p:oleObj spid="_x0000_s5160" name="Equation" r:id="rId5" imgW="419040" imgH="215640" progId="Equation.3">
+                    <p:embed/>
+                  </p:oleObj>
+                </mc:Choice>
+                <mc:Fallback>
+                  <p:oleObj name="Equation" r:id="rId5" imgW="419040" imgH="215640" progId="Equation.3">
+                    <p:embed/>
+                    <p:pic>
+                      <p:nvPicPr>
+                        <p:cNvPr id="0" name=""/>
+                        <p:cNvPicPr/>
+                        <p:nvPr/>
+                      </p:nvPicPr>
+                      <p:blipFill>
+                        <a:blip r:embed="rId6"/>
+                        <a:stretch>
+                          <a:fillRect/>
+                        </a:stretch>
+                      </p:blipFill>
+                      <p:spPr>
+                        <a:xfrm>
+                          <a:off x="6041160" y="4861936"/>
+                          <a:ext cx="706438" cy="363537"/>
+                        </a:xfrm>
+                        <a:prstGeom prst="rect">
+                          <a:avLst/>
+                        </a:prstGeom>
+                      </p:spPr>
+                    </p:pic>
+                  </p:oleObj>
+                </mc:Fallback>
+              </mc:AlternateContent>
+            </a:graphicData>
+          </a:graphic>
+        </p:graphicFrame>
+        <p:sp>
+          <p:nvSpPr>
+            <p:cNvPr id="10" name="Oval 9"/>
+            <p:cNvSpPr/>
+            <p:nvPr/>
+          </p:nvSpPr>
+          <p:spPr>
+            <a:xfrm>
+              <a:off x="5779077" y="6155893"/>
+              <a:ext cx="83127" cy="83127"/>
+            </a:xfrm>
+            <a:prstGeom prst="ellipse">
+              <a:avLst/>
+            </a:prstGeom>
+            <a:solidFill>
+              <a:schemeClr val="tx1"/>
+            </a:solidFill>
+            <a:ln>
+              <a:solidFill>
+                <a:schemeClr val="tx1"/>
+              </a:solidFill>
+            </a:ln>
+          </p:spPr>
+          <p:style>
+            <a:lnRef idx="2">
+              <a:schemeClr val="accent1">
+                <a:shade val="50000"/>
+              </a:schemeClr>
+            </a:lnRef>
+            <a:fillRef idx="1">
+              <a:schemeClr val="accent1"/>
+            </a:fillRef>
+            <a:effectRef idx="0">
+              <a:schemeClr val="accent1"/>
+            </a:effectRef>
+            <a:fontRef idx="minor">
+              <a:schemeClr val="lt1"/>
+            </a:fontRef>
+          </p:style>
+          <p:txBody>
+            <a:bodyPr rtlCol="0" anchor="ctr"/>
+            <a:lstStyle/>
+            <a:p>
+              <a:pPr algn="ctr"/>
+              <a:endParaRPr lang="en-US"/>
+            </a:p>
+          </p:txBody>
+        </p:sp>
+        <p:sp>
+          <p:nvSpPr>
+            <p:cNvPr id="11" name="Oval 10"/>
+            <p:cNvSpPr/>
+            <p:nvPr/>
+          </p:nvSpPr>
+          <p:spPr>
+            <a:xfrm>
+              <a:off x="5931477" y="5601709"/>
+              <a:ext cx="83127" cy="83127"/>
+            </a:xfrm>
+            <a:prstGeom prst="ellipse">
+              <a:avLst/>
+            </a:prstGeom>
+            <a:solidFill>
+              <a:schemeClr val="tx1"/>
+            </a:solidFill>
+            <a:ln>
+              <a:solidFill>
+                <a:schemeClr val="tx1"/>
+              </a:solidFill>
+            </a:ln>
+          </p:spPr>
+          <p:style>
+            <a:lnRef idx="2">
+              <a:schemeClr val="accent1">
+                <a:shade val="50000"/>
+              </a:schemeClr>
+            </a:lnRef>
+            <a:fillRef idx="1">
+              <a:schemeClr val="accent1"/>
+            </a:fillRef>
+            <a:effectRef idx="0">
+              <a:schemeClr val="accent1"/>
+            </a:effectRef>
+            <a:fontRef idx="minor">
+              <a:schemeClr val="lt1"/>
+            </a:fontRef>
+          </p:style>
+          <p:txBody>
+            <a:bodyPr rtlCol="0" anchor="ctr"/>
+            <a:lstStyle/>
+            <a:p>
+              <a:pPr algn="ctr"/>
+              <a:endParaRPr lang="en-US"/>
+            </a:p>
+          </p:txBody>
+        </p:sp>
+        <p:sp>
+          <p:nvSpPr>
+            <p:cNvPr id="12" name="Oval 11"/>
+            <p:cNvSpPr/>
+            <p:nvPr/>
+          </p:nvSpPr>
+          <p:spPr>
+            <a:xfrm>
+              <a:off x="5429248" y="5774891"/>
+              <a:ext cx="83127" cy="83127"/>
+            </a:xfrm>
+            <a:prstGeom prst="ellipse">
+              <a:avLst/>
+            </a:prstGeom>
+            <a:solidFill>
+              <a:schemeClr val="tx1"/>
+            </a:solidFill>
+            <a:ln>
+              <a:solidFill>
+                <a:schemeClr val="tx1"/>
+              </a:solidFill>
+            </a:ln>
+          </p:spPr>
+          <p:style>
+            <a:lnRef idx="2">
+              <a:schemeClr val="accent1">
+                <a:shade val="50000"/>
+              </a:schemeClr>
+            </a:lnRef>
+            <a:fillRef idx="1">
+              <a:schemeClr val="accent1"/>
+            </a:fillRef>
+            <a:effectRef idx="0">
+              <a:schemeClr val="accent1"/>
+            </a:effectRef>
+            <a:fontRef idx="minor">
+              <a:schemeClr val="lt1"/>
+            </a:fontRef>
+          </p:style>
+          <p:txBody>
+            <a:bodyPr rtlCol="0" anchor="ctr"/>
+            <a:lstStyle/>
+            <a:p>
+              <a:pPr algn="ctr"/>
+              <a:endParaRPr lang="en-US"/>
+            </a:p>
+          </p:txBody>
+        </p:sp>
+      </p:grpSp>
     </p:spTree>
     <p:extLst>
       <p:ext uri="{BB962C8B-B14F-4D97-AF65-F5344CB8AC3E}">
@@ -6524,6 +8005,17 @@
               </a:rPr>
               <a:t>size</a:t>
             </a:r>
+            <a:br>
+              <a:rPr lang="en-US" dirty="0" smtClean="0">
+                <a:sym typeface="Symbol" panose="05050102010706020507" pitchFamily="18" charset="2"/>
+              </a:rPr>
+            </a:br>
+            <a:r>
+              <a:rPr lang="en-US" dirty="0" smtClean="0">
+                <a:sym typeface="Symbol" panose="05050102010706020507" pitchFamily="18" charset="2"/>
+              </a:rPr>
+              <a:t>      = #add - #remove</a:t>
+            </a:r>
             <a:endParaRPr lang="en-US" dirty="0"/>
           </a:p>
         </p:txBody>
@@ -7538,7 +9030,7 @@
             <a:graphicData uri="http://schemas.openxmlformats.org/presentationml/2006/ole">
               <mc:AlternateContent xmlns:mc="http://schemas.openxmlformats.org/markup-compatibility/2006">
                 <mc:Choice xmlns:v="urn:schemas-microsoft-com:vml" Requires="v">
-                  <p:oleObj spid="_x0000_s6204" name="Equation" r:id="rId3" imgW="774360" imgH="215640" progId="Equation.3">
+                  <p:oleObj spid="_x0000_s6228" name="Equation" r:id="rId3" imgW="774360" imgH="215640" progId="Equation.3">
                     <p:embed/>
                   </p:oleObj>
                 </mc:Choice>
@@ -7770,7 +9262,7 @@
             <a:graphicData uri="http://schemas.openxmlformats.org/presentationml/2006/ole">
               <mc:AlternateContent xmlns:mc="http://schemas.openxmlformats.org/markup-compatibility/2006">
                 <mc:Choice xmlns:v="urn:schemas-microsoft-com:vml" Requires="v">
-                  <p:oleObj spid="_x0000_s6205" name="Equation" r:id="rId5" imgW="622080" imgH="215640" progId="Equation.3">
+                  <p:oleObj spid="_x0000_s6229" name="Equation" r:id="rId5" imgW="622080" imgH="215640" progId="Equation.3">
                     <p:embed/>
                   </p:oleObj>
                 </mc:Choice>
@@ -7827,7 +9319,7 @@
             <a:graphicData uri="http://schemas.openxmlformats.org/presentationml/2006/ole">
               <mc:AlternateContent xmlns:mc="http://schemas.openxmlformats.org/markup-compatibility/2006">
                 <mc:Choice xmlns:v="urn:schemas-microsoft-com:vml" Requires="v">
-                  <p:oleObj spid="_x0000_s6206" name="Equation" r:id="rId7" imgW="749160" imgH="215640" progId="Equation.3">
+                  <p:oleObj spid="_x0000_s6230" name="Equation" r:id="rId7" imgW="749160" imgH="215640" progId="Equation.3">
                     <p:embed/>
                   </p:oleObj>
                 </mc:Choice>
@@ -8372,66 +9864,16 @@
               <a:t> </a:t>
             </a:r>
             <a:r>
-              <a:rPr lang="en-US" dirty="0" smtClean="0">
+              <a:rPr lang="en-US" dirty="0" err="1">
                 <a:sym typeface="Symbol" panose="05050102010706020507" pitchFamily="18" charset="2"/>
               </a:rPr>
-              <a:t>Boolean</a:t>
-            </a:r>
-          </a:p>
-          <a:p>
-            <a:r>
-              <a:rPr lang="en-US" dirty="0" smtClean="0">
-                <a:sym typeface="Symbol" panose="05050102010706020507" pitchFamily="18" charset="2"/>
-              </a:rPr>
-              <a:t>DICT.GET(key)</a:t>
-            </a:r>
-            <a:r>
-              <a:rPr lang="en-US" dirty="0"/>
-              <a:t> </a:t>
-            </a:r>
-            <a:r>
-              <a:rPr lang="en-US" dirty="0">
-                <a:sym typeface="Symbol" panose="05050102010706020507" pitchFamily="18" charset="2"/>
-              </a:rPr>
-              <a:t> </a:t>
-            </a:r>
-            <a:r>
-              <a:rPr lang="en-US" dirty="0" smtClean="0">
-                <a:sym typeface="Symbol" panose="05050102010706020507" pitchFamily="18" charset="2"/>
-              </a:rPr>
-              <a:t>value if DICT.HAS_KEY(key)</a:t>
-            </a:r>
-          </a:p>
-          <a:p>
-            <a:r>
-              <a:rPr lang="en-US" dirty="0" smtClean="0">
-                <a:sym typeface="Symbol" panose="05050102010706020507" pitchFamily="18" charset="2"/>
-              </a:rPr>
-              <a:t>DICT.REMOVE(key)</a:t>
-            </a:r>
-          </a:p>
-          <a:p>
-            <a:r>
-              <a:rPr lang="en-US" dirty="0" smtClean="0">
-                <a:sym typeface="Symbol" panose="05050102010706020507" pitchFamily="18" charset="2"/>
-              </a:rPr>
-              <a:t>DICT.IS_EMPTY()</a:t>
-            </a:r>
-            <a:r>
-              <a:rPr lang="en-US" dirty="0"/>
-              <a:t> </a:t>
-            </a:r>
-            <a:r>
-              <a:rPr lang="en-US" dirty="0">
-                <a:sym typeface="Symbol" panose="05050102010706020507" pitchFamily="18" charset="2"/>
-              </a:rPr>
-              <a:t> </a:t>
+              <a:t>b</a:t>
             </a:r>
             <a:r>
               <a:rPr lang="en-US" dirty="0" err="1" smtClean="0">
                 <a:sym typeface="Symbol" panose="05050102010706020507" pitchFamily="18" charset="2"/>
               </a:rPr>
-              <a:t>boolean</a:t>
+              <a:t>oolean</a:t>
             </a:r>
             <a:endParaRPr lang="en-US" dirty="0" smtClean="0">
               <a:sym typeface="Symbol" panose="05050102010706020507" pitchFamily="18" charset="2"/>
@@ -8442,10 +9884,10 @@
               <a:rPr lang="en-US" dirty="0" smtClean="0">
                 <a:sym typeface="Symbol" panose="05050102010706020507" pitchFamily="18" charset="2"/>
               </a:rPr>
-              <a:t>DICT.SIZE()</a:t>
-            </a:r>
-            <a:r>
-              <a:rPr lang="en-US" dirty="0" smtClean="0"/>
+              <a:t>DICT.GET(key)</a:t>
+            </a:r>
+            <a:r>
+              <a:rPr lang="en-US" dirty="0"/>
               <a:t> </a:t>
             </a:r>
             <a:r>
@@ -8458,9 +9900,90 @@
               <a:rPr lang="en-US" dirty="0" smtClean="0">
                 <a:sym typeface="Symbol" panose="05050102010706020507" pitchFamily="18" charset="2"/>
               </a:rPr>
+              <a:t>value if DICT.HAS_KEY(key)</a:t>
+            </a:r>
+          </a:p>
+          <a:p>
+            <a:r>
+              <a:rPr lang="en-US" dirty="0" smtClean="0">
+                <a:sym typeface="Symbol" panose="05050102010706020507" pitchFamily="18" charset="2"/>
+              </a:rPr>
+              <a:t>DICT.REMOVE(key)</a:t>
+            </a:r>
+            <a:r>
+              <a:rPr lang="en-US" dirty="0">
+                <a:sym typeface="Symbol" panose="05050102010706020507" pitchFamily="18" charset="2"/>
+              </a:rPr>
+              <a:t> if DICT.HAS_KEY(key</a:t>
+            </a:r>
+            <a:r>
+              <a:rPr lang="en-US" dirty="0" smtClean="0">
+                <a:sym typeface="Symbol" panose="05050102010706020507" pitchFamily="18" charset="2"/>
+              </a:rPr>
+              <a:t>)</a:t>
+            </a:r>
+          </a:p>
+          <a:p>
+            <a:r>
+              <a:rPr lang="en-US" dirty="0" smtClean="0">
+                <a:sym typeface="Symbol" panose="05050102010706020507" pitchFamily="18" charset="2"/>
+              </a:rPr>
+              <a:t>DICT.IS_EMPTY()</a:t>
+            </a:r>
+            <a:r>
+              <a:rPr lang="en-US" dirty="0"/>
+              <a:t> </a:t>
+            </a:r>
+            <a:r>
+              <a:rPr lang="en-US" dirty="0">
+                <a:sym typeface="Symbol" panose="05050102010706020507" pitchFamily="18" charset="2"/>
+              </a:rPr>
+              <a:t> </a:t>
+            </a:r>
+            <a:r>
+              <a:rPr lang="en-US" dirty="0" err="1" smtClean="0">
+                <a:sym typeface="Symbol" panose="05050102010706020507" pitchFamily="18" charset="2"/>
+              </a:rPr>
+              <a:t>boolean</a:t>
+            </a:r>
+            <a:endParaRPr lang="en-US" dirty="0" smtClean="0">
+              <a:sym typeface="Symbol" panose="05050102010706020507" pitchFamily="18" charset="2"/>
+            </a:endParaRPr>
+          </a:p>
+          <a:p>
+            <a:r>
+              <a:rPr lang="en-US" dirty="0" smtClean="0">
+                <a:sym typeface="Symbol" panose="05050102010706020507" pitchFamily="18" charset="2"/>
+              </a:rPr>
+              <a:t>DICT.SIZE()</a:t>
+            </a:r>
+            <a:r>
+              <a:rPr lang="en-US" dirty="0" smtClean="0"/>
+              <a:t> </a:t>
+            </a:r>
+            <a:r>
+              <a:rPr lang="en-US" dirty="0">
+                <a:sym typeface="Symbol" panose="05050102010706020507" pitchFamily="18" charset="2"/>
+              </a:rPr>
+              <a:t> </a:t>
+            </a:r>
+            <a:r>
+              <a:rPr lang="en-US" dirty="0" smtClean="0">
+                <a:sym typeface="Symbol" panose="05050102010706020507" pitchFamily="18" charset="2"/>
+              </a:rPr>
               <a:t>size</a:t>
             </a:r>
-            <a:endParaRPr lang="en-US" dirty="0"/>
+            <a:br>
+              <a:rPr lang="en-US" dirty="0" smtClean="0">
+                <a:sym typeface="Symbol" panose="05050102010706020507" pitchFamily="18" charset="2"/>
+              </a:rPr>
+            </a:br>
+            <a:r>
+              <a:rPr lang="en-US" dirty="0" smtClean="0">
+                <a:sym typeface="Symbol" panose="05050102010706020507" pitchFamily="18" charset="2"/>
+              </a:rPr>
+              <a:t>      = #set - #remove</a:t>
+            </a:r>
           </a:p>
         </p:txBody>
       </p:sp>
@@ -9418,7 +10941,7 @@
         <p:spPr/>
         <p:txBody>
           <a:bodyPr>
-            <a:normAutofit/>
+            <a:normAutofit lnSpcReduction="10000"/>
           </a:bodyPr>
           <a:lstStyle/>
           <a:p>
@@ -9463,16 +10986,27 @@
             </a:r>
           </a:p>
           <a:p>
+            <a:endParaRPr lang="en-US" dirty="0" smtClean="0"/>
+          </a:p>
+          <a:p>
+            <a:endParaRPr lang="en-US" dirty="0"/>
+          </a:p>
+          <a:p>
             <a:r>
               <a:rPr lang="en-US" dirty="0" smtClean="0"/>
               <a:t>Implementations</a:t>
             </a:r>
+            <a:endParaRPr lang="en-US" dirty="0" smtClean="0"/>
           </a:p>
           <a:p>
             <a:pPr lvl="1"/>
             <a:r>
               <a:rPr lang="en-US" dirty="0" smtClean="0"/>
-              <a:t>as list</a:t>
+              <a:t>e.g., as </a:t>
+            </a:r>
+            <a:r>
+              <a:rPr lang="en-US" dirty="0" smtClean="0"/>
+              <a:t>list</a:t>
             </a:r>
           </a:p>
           <a:p>
@@ -9504,6 +11038,190 @@
           </a:p>
         </p:txBody>
       </p:sp>
+      <p:sp>
+        <p:nvSpPr>
+          <p:cNvPr id="5" name="TextBox 4"/>
+          <p:cNvSpPr txBox="1"/>
+          <p:nvPr/>
+        </p:nvSpPr>
+        <p:spPr>
+          <a:xfrm>
+            <a:off x="1652154" y="4209184"/>
+            <a:ext cx="2746073" cy="584775"/>
+          </a:xfrm>
+          <a:prstGeom prst="rect">
+            <a:avLst/>
+          </a:prstGeom>
+          <a:noFill/>
+          <a:ln>
+            <a:solidFill>
+              <a:schemeClr val="tx1"/>
+            </a:solidFill>
+          </a:ln>
+        </p:spPr>
+        <p:txBody>
+          <a:bodyPr wrap="none" rtlCol="0">
+            <a:spAutoFit/>
+          </a:bodyPr>
+          <a:lstStyle/>
+          <a:p>
+            <a:r>
+              <a:rPr lang="en-US" sz="3200" dirty="0" smtClean="0"/>
+              <a:t>First in, last out</a:t>
+            </a:r>
+            <a:endParaRPr lang="en-US" sz="3200" dirty="0"/>
+          </a:p>
+        </p:txBody>
+      </p:sp>
+      <p:grpSp>
+        <p:nvGrpSpPr>
+          <p:cNvPr id="6" name="Group 5"/>
+          <p:cNvGrpSpPr/>
+          <p:nvPr/>
+        </p:nvGrpSpPr>
+        <p:grpSpPr>
+          <a:xfrm>
+            <a:off x="6457950" y="3296518"/>
+            <a:ext cx="1185863" cy="808757"/>
+            <a:chOff x="6307280" y="2566553"/>
+            <a:chExt cx="1581151" cy="1078342"/>
+          </a:xfrm>
+        </p:grpSpPr>
+        <p:graphicFrame>
+          <p:nvGraphicFramePr>
+            <p:cNvPr id="8" name="Object 7"/>
+            <p:cNvGraphicFramePr>
+              <a:graphicFrameLocks noChangeAspect="1"/>
+            </p:cNvGraphicFramePr>
+            <p:nvPr>
+              <p:extLst>
+                <p:ext uri="{D42A27DB-BD31-4B8C-83A1-F6EECF244321}">
+                  <p14:modId xmlns:p14="http://schemas.microsoft.com/office/powerpoint/2010/main" val="1015001398"/>
+                </p:ext>
+              </p:extLst>
+            </p:nvPr>
+          </p:nvGraphicFramePr>
+          <p:xfrm>
+            <a:off x="6918997" y="3105146"/>
+            <a:ext cx="969434" cy="539749"/>
+          </p:xfrm>
+          <a:graphic>
+            <a:graphicData uri="http://schemas.openxmlformats.org/presentationml/2006/ole">
+              <mc:AlternateContent xmlns:mc="http://schemas.openxmlformats.org/markup-compatibility/2006">
+                <mc:Choice xmlns:v="urn:schemas-microsoft-com:vml" Requires="v">
+                  <p:oleObj spid="_x0000_s7178" name="Equation" r:id="rId3" imgW="431640" imgH="241200" progId="Equation.3">
+                    <p:embed/>
+                  </p:oleObj>
+                </mc:Choice>
+                <mc:Fallback>
+                  <p:oleObj name="Equation" r:id="rId3" imgW="431640" imgH="241200" progId="Equation.3">
+                    <p:embed/>
+                    <p:pic>
+                      <p:nvPicPr>
+                        <p:cNvPr id="0" name=""/>
+                        <p:cNvPicPr/>
+                        <p:nvPr/>
+                      </p:nvPicPr>
+                      <p:blipFill>
+                        <a:blip r:embed="rId4"/>
+                        <a:stretch>
+                          <a:fillRect/>
+                        </a:stretch>
+                      </p:blipFill>
+                      <p:spPr>
+                        <a:xfrm>
+                          <a:off x="6918997" y="3105146"/>
+                          <a:ext cx="969434" cy="539749"/>
+                        </a:xfrm>
+                        <a:prstGeom prst="rect">
+                          <a:avLst/>
+                        </a:prstGeom>
+                      </p:spPr>
+                    </p:pic>
+                  </p:oleObj>
+                </mc:Fallback>
+              </mc:AlternateContent>
+            </a:graphicData>
+          </a:graphic>
+        </p:graphicFrame>
+        <p:sp>
+          <p:nvSpPr>
+            <p:cNvPr id="9" name="TextBox 8"/>
+            <p:cNvSpPr txBox="1"/>
+            <p:nvPr/>
+          </p:nvSpPr>
+          <p:spPr>
+            <a:xfrm>
+              <a:off x="6307280" y="2566553"/>
+              <a:ext cx="1203919" cy="553997"/>
+            </a:xfrm>
+            <a:prstGeom prst="rect">
+              <a:avLst/>
+            </a:prstGeom>
+            <a:noFill/>
+          </p:spPr>
+          <p:txBody>
+            <a:bodyPr wrap="none" rtlCol="0">
+              <a:spAutoFit/>
+            </a:bodyPr>
+            <a:lstStyle/>
+            <a:p>
+              <a:r>
+                <a:rPr lang="en-US" sz="2100" dirty="0" smtClean="0"/>
+                <a:t>stack </a:t>
+              </a:r>
+              <a:r>
+                <a:rPr lang="en-US" sz="2100" i="1" dirty="0" smtClean="0">
+                  <a:latin typeface="Palatino Linotype" panose="02040502050505030304" pitchFamily="18" charset="0"/>
+                </a:rPr>
+                <a:t>s</a:t>
+              </a:r>
+              <a:endParaRPr lang="en-US" sz="2100" i="1" dirty="0">
+                <a:latin typeface="Palatino Linotype" panose="02040502050505030304" pitchFamily="18" charset="0"/>
+              </a:endParaRPr>
+            </a:p>
+          </p:txBody>
+        </p:sp>
+      </p:grpSp>
+      <p:pic>
+        <p:nvPicPr>
+          <p:cNvPr id="7174" name="Picture 6" descr="http://www.clipartkid.com/images/357/stack-of-books-teach-yourself-latin-books-LQk2ox-clipart.jpg"/>
+          <p:cNvPicPr>
+            <a:picLocks noChangeAspect="1" noChangeArrowheads="1"/>
+          </p:cNvPicPr>
+          <p:nvPr/>
+        </p:nvPicPr>
+        <p:blipFill rotWithShape="1">
+          <a:blip r:embed="rId5" cstate="print">
+            <a:extLst>
+              <a:ext uri="{28A0092B-C50C-407E-A947-70E740481C1C}">
+                <a14:useLocalDpi xmlns:a14="http://schemas.microsoft.com/office/drawing/2010/main" val="0"/>
+              </a:ext>
+            </a:extLst>
+          </a:blip>
+          <a:srcRect l="19012" r="17971"/>
+          <a:stretch/>
+        </p:blipFill>
+        <p:spPr bwMode="auto">
+          <a:xfrm>
+            <a:off x="5237018" y="4395296"/>
+            <a:ext cx="1496291" cy="1575225"/>
+          </a:xfrm>
+          <a:prstGeom prst="rect">
+            <a:avLst/>
+          </a:prstGeom>
+          <a:noFill/>
+          <a:extLst>
+            <a:ext uri="{909E8E84-426E-40DD-AFC4-6F175D3DCCD1}">
+              <a14:hiddenFill xmlns:a14="http://schemas.microsoft.com/office/drawing/2010/main">
+                <a:solidFill>
+                  <a:srgbClr val="FFFFFF"/>
+                </a:solidFill>
+              </a14:hiddenFill>
+            </a:ext>
+          </a:extLst>
+        </p:spPr>
+      </p:pic>
     </p:spTree>
     <p:extLst>
       <p:ext uri="{BB962C8B-B14F-4D97-AF65-F5344CB8AC3E}">
@@ -9658,11 +11376,20 @@
               <a:t> </a:t>
             </a:r>
             <a:r>
-              <a:rPr lang="en-US" dirty="0" smtClean="0">
+              <a:rPr lang="en-US" dirty="0" err="1">
                 <a:sym typeface="Symbol" panose="05050102010706020507" pitchFamily="18" charset="2"/>
               </a:rPr>
-              <a:t>Boolean</a:t>
-            </a:r>
+              <a:t>b</a:t>
+            </a:r>
+            <a:r>
+              <a:rPr lang="en-US" dirty="0" err="1" smtClean="0">
+                <a:sym typeface="Symbol" panose="05050102010706020507" pitchFamily="18" charset="2"/>
+              </a:rPr>
+              <a:t>oolean</a:t>
+            </a:r>
+            <a:endParaRPr lang="en-US" dirty="0" smtClean="0">
+              <a:sym typeface="Symbol" panose="05050102010706020507" pitchFamily="18" charset="2"/>
+            </a:endParaRPr>
           </a:p>
           <a:p>
             <a:r>
@@ -9686,6 +11413,17 @@
                 <a:sym typeface="Symbol" panose="05050102010706020507" pitchFamily="18" charset="2"/>
               </a:rPr>
               <a:t>size</a:t>
+            </a:r>
+            <a:br>
+              <a:rPr lang="en-US" dirty="0" smtClean="0">
+                <a:sym typeface="Symbol" panose="05050102010706020507" pitchFamily="18" charset="2"/>
+              </a:rPr>
+            </a:br>
+            <a:r>
+              <a:rPr lang="en-US" dirty="0" smtClean="0">
+                <a:sym typeface="Symbol" panose="05050102010706020507" pitchFamily="18" charset="2"/>
+              </a:rPr>
+              <a:t>      = #push - #pop</a:t>
             </a:r>
             <a:endParaRPr lang="en-US" dirty="0"/>
           </a:p>
@@ -10455,8 +12193,20 @@
             <a:pPr lvl="1"/>
             <a:r>
               <a:rPr lang="en-US" dirty="0" smtClean="0"/>
-              <a:t>element type: any</a:t>
-            </a:r>
+              <a:t>element type: </a:t>
+            </a:r>
+            <a:r>
+              <a:rPr lang="en-US" dirty="0" smtClean="0"/>
+              <a:t>any</a:t>
+            </a:r>
+          </a:p>
+          <a:p>
+            <a:pPr lvl="1"/>
+            <a:endParaRPr lang="en-US" dirty="0"/>
+          </a:p>
+          <a:p>
+            <a:pPr lvl="1"/>
+            <a:endParaRPr lang="en-US" dirty="0" smtClean="0"/>
           </a:p>
           <a:p>
             <a:r>
@@ -10468,7 +12218,11 @@
             <a:pPr lvl="1"/>
             <a:r>
               <a:rPr lang="en-US" dirty="0" smtClean="0"/>
-              <a:t>as list</a:t>
+              <a:t>e.g., as </a:t>
+            </a:r>
+            <a:r>
+              <a:rPr lang="en-US" dirty="0" smtClean="0"/>
+              <a:t>list</a:t>
             </a:r>
           </a:p>
           <a:p>
@@ -10500,6 +12254,446 @@
           </a:p>
         </p:txBody>
       </p:sp>
+      <p:sp>
+        <p:nvSpPr>
+          <p:cNvPr id="4" name="TextBox 3"/>
+          <p:cNvSpPr txBox="1"/>
+          <p:nvPr/>
+        </p:nvSpPr>
+        <p:spPr>
+          <a:xfrm>
+            <a:off x="1666153" y="4405168"/>
+            <a:ext cx="2852564" cy="584775"/>
+          </a:xfrm>
+          <a:prstGeom prst="rect">
+            <a:avLst/>
+          </a:prstGeom>
+          <a:noFill/>
+          <a:ln>
+            <a:solidFill>
+              <a:schemeClr val="tx1"/>
+            </a:solidFill>
+          </a:ln>
+        </p:spPr>
+        <p:txBody>
+          <a:bodyPr wrap="square" rtlCol="0">
+            <a:spAutoFit/>
+          </a:bodyPr>
+          <a:lstStyle/>
+          <a:p>
+            <a:r>
+              <a:rPr lang="en-US" sz="3200" dirty="0" smtClean="0"/>
+              <a:t>First in, first out</a:t>
+            </a:r>
+            <a:endParaRPr lang="en-US" sz="3200" dirty="0"/>
+          </a:p>
+        </p:txBody>
+      </p:sp>
+      <p:grpSp>
+        <p:nvGrpSpPr>
+          <p:cNvPr id="8" name="Group 7"/>
+          <p:cNvGrpSpPr/>
+          <p:nvPr/>
+        </p:nvGrpSpPr>
+        <p:grpSpPr>
+          <a:xfrm>
+            <a:off x="6457950" y="3296518"/>
+            <a:ext cx="1196975" cy="808757"/>
+            <a:chOff x="6307280" y="2566553"/>
+            <a:chExt cx="1595967" cy="1078342"/>
+          </a:xfrm>
+        </p:grpSpPr>
+        <p:graphicFrame>
+          <p:nvGraphicFramePr>
+            <p:cNvPr id="9" name="Object 8"/>
+            <p:cNvGraphicFramePr>
+              <a:graphicFrameLocks noChangeAspect="1"/>
+            </p:cNvGraphicFramePr>
+            <p:nvPr>
+              <p:extLst>
+                <p:ext uri="{D42A27DB-BD31-4B8C-83A1-F6EECF244321}">
+                  <p14:modId xmlns:p14="http://schemas.microsoft.com/office/powerpoint/2010/main" val="2590999549"/>
+                </p:ext>
+              </p:extLst>
+            </p:nvPr>
+          </p:nvGraphicFramePr>
+          <p:xfrm>
+            <a:off x="6904180" y="3105146"/>
+            <a:ext cx="999067" cy="539749"/>
+          </p:xfrm>
+          <a:graphic>
+            <a:graphicData uri="http://schemas.openxmlformats.org/presentationml/2006/ole">
+              <mc:AlternateContent xmlns:mc="http://schemas.openxmlformats.org/markup-compatibility/2006">
+                <mc:Choice xmlns:v="urn:schemas-microsoft-com:vml" Requires="v">
+                  <p:oleObj spid="_x0000_s8209" name="Equation" r:id="rId3" imgW="444240" imgH="241200" progId="Equation.3">
+                    <p:embed/>
+                  </p:oleObj>
+                </mc:Choice>
+                <mc:Fallback>
+                  <p:oleObj name="Equation" r:id="rId3" imgW="444240" imgH="241200" progId="Equation.3">
+                    <p:embed/>
+                    <p:pic>
+                      <p:nvPicPr>
+                        <p:cNvPr id="0" name=""/>
+                        <p:cNvPicPr/>
+                        <p:nvPr/>
+                      </p:nvPicPr>
+                      <p:blipFill>
+                        <a:blip r:embed="rId4"/>
+                        <a:stretch>
+                          <a:fillRect/>
+                        </a:stretch>
+                      </p:blipFill>
+                      <p:spPr>
+                        <a:xfrm>
+                          <a:off x="6904180" y="3105146"/>
+                          <a:ext cx="999067" cy="539749"/>
+                        </a:xfrm>
+                        <a:prstGeom prst="rect">
+                          <a:avLst/>
+                        </a:prstGeom>
+                      </p:spPr>
+                    </p:pic>
+                  </p:oleObj>
+                </mc:Fallback>
+              </mc:AlternateContent>
+            </a:graphicData>
+          </a:graphic>
+        </p:graphicFrame>
+        <p:sp>
+          <p:nvSpPr>
+            <p:cNvPr id="10" name="TextBox 9"/>
+            <p:cNvSpPr txBox="1"/>
+            <p:nvPr/>
+          </p:nvSpPr>
+          <p:spPr>
+            <a:xfrm>
+              <a:off x="6307280" y="2566553"/>
+              <a:ext cx="1417483" cy="553997"/>
+            </a:xfrm>
+            <a:prstGeom prst="rect">
+              <a:avLst/>
+            </a:prstGeom>
+            <a:noFill/>
+          </p:spPr>
+          <p:txBody>
+            <a:bodyPr wrap="none" rtlCol="0">
+              <a:spAutoFit/>
+            </a:bodyPr>
+            <a:lstStyle/>
+            <a:p>
+              <a:r>
+                <a:rPr lang="en-US" sz="2100" dirty="0" smtClean="0"/>
+                <a:t>queue </a:t>
+              </a:r>
+              <a:r>
+                <a:rPr lang="en-US" sz="2100" i="1" dirty="0" smtClean="0">
+                  <a:latin typeface="Palatino Linotype" panose="02040502050505030304" pitchFamily="18" charset="0"/>
+                </a:rPr>
+                <a:t>q</a:t>
+              </a:r>
+              <a:endParaRPr lang="en-US" sz="2100" i="1" dirty="0">
+                <a:latin typeface="Palatino Linotype" panose="02040502050505030304" pitchFamily="18" charset="0"/>
+              </a:endParaRPr>
+            </a:p>
+          </p:txBody>
+        </p:sp>
+      </p:grpSp>
+      <p:sp>
+        <p:nvSpPr>
+          <p:cNvPr id="5" name="AutoShape 9" descr="Stockfoto: Kassa · machine · icon · witte · geld · kaart"/>
+          <p:cNvSpPr>
+            <a:spLocks noChangeAspect="1" noChangeArrowheads="1"/>
+          </p:cNvSpPr>
+          <p:nvPr/>
+        </p:nvSpPr>
+        <p:spPr bwMode="auto">
+          <a:xfrm>
+            <a:off x="155575" y="-144463"/>
+            <a:ext cx="304800" cy="304801"/>
+          </a:xfrm>
+          <a:prstGeom prst="rect">
+            <a:avLst/>
+          </a:prstGeom>
+          <a:noFill/>
+          <a:extLst>
+            <a:ext uri="{909E8E84-426E-40DD-AFC4-6F175D3DCCD1}">
+              <a14:hiddenFill xmlns:a14="http://schemas.microsoft.com/office/drawing/2010/main">
+                <a:solidFill>
+                  <a:srgbClr val="FFFFFF"/>
+                </a:solidFill>
+              </a14:hiddenFill>
+            </a:ext>
+          </a:extLst>
+        </p:spPr>
+        <p:txBody>
+          <a:bodyPr vert="horz" wrap="square" lIns="91440" tIns="45720" rIns="91440" bIns="45720" numCol="1" anchor="t" anchorCtr="0" compatLnSpc="1">
+            <a:prstTxWarp prst="textNoShape">
+              <a:avLst/>
+            </a:prstTxWarp>
+          </a:bodyPr>
+          <a:lstStyle/>
+          <a:p>
+            <a:endParaRPr lang="en-US"/>
+          </a:p>
+        </p:txBody>
+      </p:sp>
+      <p:grpSp>
+        <p:nvGrpSpPr>
+          <p:cNvPr id="21" name="Group 20"/>
+          <p:cNvGrpSpPr/>
+          <p:nvPr/>
+        </p:nvGrpSpPr>
+        <p:grpSpPr>
+          <a:xfrm>
+            <a:off x="3831385" y="5128420"/>
+            <a:ext cx="5058454" cy="1016990"/>
+            <a:chOff x="3831385" y="5159593"/>
+            <a:chExt cx="5058454" cy="1016990"/>
+          </a:xfrm>
+        </p:grpSpPr>
+        <p:pic>
+          <p:nvPicPr>
+            <p:cNvPr id="8199" name="Picture 7" descr="https://d30y9cdsu7xlg0.cloudfront.net/png/16757-200.png"/>
+            <p:cNvPicPr>
+              <a:picLocks noChangeAspect="1" noChangeArrowheads="1"/>
+            </p:cNvPicPr>
+            <p:nvPr/>
+          </p:nvPicPr>
+          <p:blipFill>
+            <a:blip r:embed="rId5">
+              <a:extLst>
+                <a:ext uri="{28A0092B-C50C-407E-A947-70E740481C1C}">
+                  <a14:useLocalDpi xmlns:a14="http://schemas.microsoft.com/office/drawing/2010/main" val="0"/>
+                </a:ext>
+              </a:extLst>
+            </a:blip>
+            <a:srcRect/>
+            <a:stretch>
+              <a:fillRect/>
+            </a:stretch>
+          </p:blipFill>
+          <p:spPr bwMode="auto">
+            <a:xfrm>
+              <a:off x="7173999" y="5551281"/>
+              <a:ext cx="625302" cy="625302"/>
+            </a:xfrm>
+            <a:prstGeom prst="rect">
+              <a:avLst/>
+            </a:prstGeom>
+            <a:noFill/>
+            <a:extLst>
+              <a:ext uri="{909E8E84-426E-40DD-AFC4-6F175D3DCCD1}">
+                <a14:hiddenFill xmlns:a14="http://schemas.microsoft.com/office/drawing/2010/main">
+                  <a:solidFill>
+                    <a:srgbClr val="FFFFFF"/>
+                  </a:solidFill>
+                </a14:hiddenFill>
+              </a:ext>
+            </a:extLst>
+          </p:spPr>
+        </p:pic>
+        <p:pic>
+          <p:nvPicPr>
+            <p:cNvPr id="8205" name="Picture 13" descr="http://justintm.com/programming/img/POS.png"/>
+            <p:cNvPicPr>
+              <a:picLocks noChangeAspect="1" noChangeArrowheads="1"/>
+            </p:cNvPicPr>
+            <p:nvPr/>
+          </p:nvPicPr>
+          <p:blipFill>
+            <a:blip r:embed="rId6">
+              <a:extLst>
+                <a:ext uri="{28A0092B-C50C-407E-A947-70E740481C1C}">
+                  <a14:useLocalDpi xmlns:a14="http://schemas.microsoft.com/office/drawing/2010/main" val="0"/>
+                </a:ext>
+              </a:extLst>
+            </a:blip>
+            <a:srcRect/>
+            <a:stretch>
+              <a:fillRect/>
+            </a:stretch>
+          </p:blipFill>
+          <p:spPr bwMode="auto">
+            <a:xfrm flipH="1">
+              <a:off x="7825684" y="5159593"/>
+              <a:ext cx="1064155" cy="738043"/>
+            </a:xfrm>
+            <a:prstGeom prst="rect">
+              <a:avLst/>
+            </a:prstGeom>
+            <a:noFill/>
+            <a:extLst>
+              <a:ext uri="{909E8E84-426E-40DD-AFC4-6F175D3DCCD1}">
+                <a14:hiddenFill xmlns:a14="http://schemas.microsoft.com/office/drawing/2010/main">
+                  <a:solidFill>
+                    <a:srgbClr val="FFFFFF"/>
+                  </a:solidFill>
+                </a14:hiddenFill>
+              </a:ext>
+            </a:extLst>
+          </p:spPr>
+        </p:pic>
+        <p:pic>
+          <p:nvPicPr>
+            <p:cNvPr id="18" name="Picture 7" descr="https://d30y9cdsu7xlg0.cloudfront.net/png/16757-200.png"/>
+            <p:cNvPicPr>
+              <a:picLocks noChangeAspect="1" noChangeArrowheads="1"/>
+            </p:cNvPicPr>
+            <p:nvPr/>
+          </p:nvPicPr>
+          <p:blipFill>
+            <a:blip r:embed="rId5">
+              <a:extLst>
+                <a:ext uri="{28A0092B-C50C-407E-A947-70E740481C1C}">
+                  <a14:useLocalDpi xmlns:a14="http://schemas.microsoft.com/office/drawing/2010/main" val="0"/>
+                </a:ext>
+              </a:extLst>
+            </a:blip>
+            <a:srcRect/>
+            <a:stretch>
+              <a:fillRect/>
+            </a:stretch>
+          </p:blipFill>
+          <p:spPr bwMode="auto">
+            <a:xfrm>
+              <a:off x="6280323" y="5528614"/>
+              <a:ext cx="625302" cy="625302"/>
+            </a:xfrm>
+            <a:prstGeom prst="rect">
+              <a:avLst/>
+            </a:prstGeom>
+            <a:noFill/>
+            <a:extLst>
+              <a:ext uri="{909E8E84-426E-40DD-AFC4-6F175D3DCCD1}">
+                <a14:hiddenFill xmlns:a14="http://schemas.microsoft.com/office/drawing/2010/main">
+                  <a:solidFill>
+                    <a:srgbClr val="FFFFFF"/>
+                  </a:solidFill>
+                </a14:hiddenFill>
+              </a:ext>
+            </a:extLst>
+          </p:spPr>
+        </p:pic>
+        <p:pic>
+          <p:nvPicPr>
+            <p:cNvPr id="19" name="Picture 7" descr="https://d30y9cdsu7xlg0.cloudfront.net/png/16757-200.png"/>
+            <p:cNvPicPr>
+              <a:picLocks noChangeAspect="1" noChangeArrowheads="1"/>
+            </p:cNvPicPr>
+            <p:nvPr/>
+          </p:nvPicPr>
+          <p:blipFill>
+            <a:blip r:embed="rId5">
+              <a:extLst>
+                <a:ext uri="{28A0092B-C50C-407E-A947-70E740481C1C}">
+                  <a14:useLocalDpi xmlns:a14="http://schemas.microsoft.com/office/drawing/2010/main" val="0"/>
+                </a:ext>
+              </a:extLst>
+            </a:blip>
+            <a:srcRect/>
+            <a:stretch>
+              <a:fillRect/>
+            </a:stretch>
+          </p:blipFill>
+          <p:spPr bwMode="auto">
+            <a:xfrm>
+              <a:off x="5386647" y="5551281"/>
+              <a:ext cx="625302" cy="625302"/>
+            </a:xfrm>
+            <a:prstGeom prst="rect">
+              <a:avLst/>
+            </a:prstGeom>
+            <a:noFill/>
+            <a:extLst>
+              <a:ext uri="{909E8E84-426E-40DD-AFC4-6F175D3DCCD1}">
+                <a14:hiddenFill xmlns:a14="http://schemas.microsoft.com/office/drawing/2010/main">
+                  <a:solidFill>
+                    <a:srgbClr val="FFFFFF"/>
+                  </a:solidFill>
+                </a14:hiddenFill>
+              </a:ext>
+            </a:extLst>
+          </p:spPr>
+        </p:pic>
+        <p:pic>
+          <p:nvPicPr>
+            <p:cNvPr id="20" name="Picture 7" descr="https://d30y9cdsu7xlg0.cloudfront.net/png/16757-200.png"/>
+            <p:cNvPicPr>
+              <a:picLocks noChangeAspect="1" noChangeArrowheads="1"/>
+            </p:cNvPicPr>
+            <p:nvPr/>
+          </p:nvPicPr>
+          <p:blipFill>
+            <a:blip r:embed="rId5">
+              <a:extLst>
+                <a:ext uri="{28A0092B-C50C-407E-A947-70E740481C1C}">
+                  <a14:useLocalDpi xmlns:a14="http://schemas.microsoft.com/office/drawing/2010/main" val="0"/>
+                </a:ext>
+              </a:extLst>
+            </a:blip>
+            <a:srcRect/>
+            <a:stretch>
+              <a:fillRect/>
+            </a:stretch>
+          </p:blipFill>
+          <p:spPr bwMode="auto">
+            <a:xfrm>
+              <a:off x="3831385" y="5528614"/>
+              <a:ext cx="625302" cy="625302"/>
+            </a:xfrm>
+            <a:prstGeom prst="rect">
+              <a:avLst/>
+            </a:prstGeom>
+            <a:noFill/>
+            <a:extLst>
+              <a:ext uri="{909E8E84-426E-40DD-AFC4-6F175D3DCCD1}">
+                <a14:hiddenFill xmlns:a14="http://schemas.microsoft.com/office/drawing/2010/main">
+                  <a:solidFill>
+                    <a:srgbClr val="FFFFFF"/>
+                  </a:solidFill>
+                </a14:hiddenFill>
+              </a:ext>
+            </a:extLst>
+          </p:spPr>
+        </p:pic>
+        <p:cxnSp>
+          <p:nvCxnSpPr>
+            <p:cNvPr id="17" name="Straight Arrow Connector 16"/>
+            <p:cNvCxnSpPr/>
+            <p:nvPr/>
+          </p:nvCxnSpPr>
+          <p:spPr>
+            <a:xfrm>
+              <a:off x="4634344" y="5863932"/>
+              <a:ext cx="627611" cy="0"/>
+            </a:xfrm>
+            <a:prstGeom prst="straightConnector1">
+              <a:avLst/>
+            </a:prstGeom>
+            <a:ln w="31750">
+              <a:solidFill>
+                <a:schemeClr val="tx1"/>
+              </a:solidFill>
+              <a:tailEnd type="stealth" w="lg" len="lg"/>
+            </a:ln>
+          </p:spPr>
+          <p:style>
+            <a:lnRef idx="1">
+              <a:schemeClr val="accent1"/>
+            </a:lnRef>
+            <a:fillRef idx="0">
+              <a:schemeClr val="accent1"/>
+            </a:fillRef>
+            <a:effectRef idx="0">
+              <a:schemeClr val="accent1"/>
+            </a:effectRef>
+            <a:fontRef idx="minor">
+              <a:schemeClr val="tx1"/>
+            </a:fontRef>
+          </p:style>
+        </p:cxnSp>
+      </p:grpSp>
     </p:spTree>
     <p:extLst>
       <p:ext uri="{BB962C8B-B14F-4D97-AF65-F5344CB8AC3E}">
@@ -10616,7 +12810,13 @@
               <a:rPr lang="en-US" dirty="0">
                 <a:sym typeface="Symbol" panose="05050102010706020507" pitchFamily="18" charset="2"/>
               </a:rPr>
-              <a:t> queue</a:t>
+              <a:t> </a:t>
+            </a:r>
+            <a:r>
+              <a:rPr lang="en-US" dirty="0" smtClean="0">
+                <a:sym typeface="Symbol" panose="05050102010706020507" pitchFamily="18" charset="2"/>
+              </a:rPr>
+              <a:t>value</a:t>
             </a:r>
             <a:endParaRPr lang="en-US" dirty="0"/>
           </a:p>
@@ -10646,11 +12846,7 @@
           <a:p>
             <a:r>
               <a:rPr lang="en-US" dirty="0" smtClean="0"/>
-              <a:t>QUEUE.LENGTH</a:t>
-            </a:r>
-            <a:r>
-              <a:rPr lang="en-US" dirty="0"/>
-              <a:t> </a:t>
+              <a:t>QUEUE.LENGTH() </a:t>
             </a:r>
             <a:r>
               <a:rPr lang="en-US" dirty="0">
@@ -10663,6 +12859,17 @@
                 <a:sym typeface="Symbol" panose="05050102010706020507" pitchFamily="18" charset="2"/>
               </a:rPr>
               <a:t>length</a:t>
+            </a:r>
+            <a:br>
+              <a:rPr lang="en-US" dirty="0" smtClean="0">
+                <a:sym typeface="Symbol" panose="05050102010706020507" pitchFamily="18" charset="2"/>
+              </a:rPr>
+            </a:br>
+            <a:r>
+              <a:rPr lang="en-US" dirty="0" smtClean="0">
+                <a:sym typeface="Symbol" panose="05050102010706020507" pitchFamily="18" charset="2"/>
+              </a:rPr>
+              <a:t>      = #push - #pop</a:t>
             </a:r>
             <a:endParaRPr lang="en-US" dirty="0"/>
           </a:p>
@@ -11524,7 +13731,7 @@
               <a:t>s.pop</a:t>
             </a:r>
             <a:r>
-              <a:rPr lang="en-US" smtClean="0">
+              <a:rPr lang="en-US" dirty="0" smtClean="0">
                 <a:latin typeface="Courier New" panose="02070309020205020404" pitchFamily="49" charset="0"/>
                 <a:cs typeface="Courier New" panose="02070309020205020404" pitchFamily="49" charset="0"/>
               </a:rPr>
@@ -12498,7 +14705,7 @@
           <a:graphicData uri="http://schemas.openxmlformats.org/presentationml/2006/ole">
             <mc:AlternateContent xmlns:mc="http://schemas.openxmlformats.org/markup-compatibility/2006">
               <mc:Choice xmlns:v="urn:schemas-microsoft-com:vml" Requires="v">
-                <p:oleObj spid="_x0000_s1057" name="Equation" r:id="rId4" imgW="1841400" imgH="215640" progId="Equation.3">
+                <p:oleObj spid="_x0000_s1064" name="Equation" r:id="rId4" imgW="1841400" imgH="215640" progId="Equation.3">
                   <p:embed/>
                 </p:oleObj>
               </mc:Choice>
@@ -13087,10 +15294,10 @@
         </p:nvGrpSpPr>
         <p:grpSpPr>
           <a:xfrm>
-            <a:off x="4730462" y="2782167"/>
-            <a:ext cx="2883587" cy="776614"/>
+            <a:off x="4730462" y="2782168"/>
+            <a:ext cx="2926051" cy="777009"/>
             <a:chOff x="6307280" y="2566553"/>
-            <a:chExt cx="3844783" cy="1035485"/>
+            <a:chExt cx="3901402" cy="1036011"/>
           </a:xfrm>
         </p:grpSpPr>
         <p:graphicFrame>
@@ -13102,25 +15309,25 @@
             <p:nvPr>
               <p:extLst>
                 <p:ext uri="{D42A27DB-BD31-4B8C-83A1-F6EECF244321}">
-                  <p14:modId xmlns:p14="http://schemas.microsoft.com/office/powerpoint/2010/main" val="3037646371"/>
+                  <p14:modId xmlns:p14="http://schemas.microsoft.com/office/powerpoint/2010/main" val="1231410013"/>
                 </p:ext>
               </p:extLst>
             </p:nvPr>
           </p:nvGraphicFramePr>
           <p:xfrm>
-            <a:off x="7107238" y="3148013"/>
-            <a:ext cx="3044825" cy="454025"/>
+            <a:off x="7052731" y="3147481"/>
+            <a:ext cx="3155951" cy="455083"/>
           </p:xfrm>
           <a:graphic>
             <a:graphicData uri="http://schemas.openxmlformats.org/presentationml/2006/ole">
               <mc:AlternateContent xmlns:mc="http://schemas.openxmlformats.org/markup-compatibility/2006">
                 <mc:Choice xmlns:v="urn:schemas-microsoft-com:vml" Requires="v">
-                  <p:oleObj spid="_x0000_s2077" name="Equation" r:id="rId3" imgW="1358640" imgH="203040" progId="Equation.3">
+                  <p:oleObj spid="_x0000_s2087" name="Equation" r:id="rId3" imgW="1409400" imgH="203040" progId="Equation.3">
                     <p:embed/>
                   </p:oleObj>
                 </mc:Choice>
                 <mc:Fallback>
-                  <p:oleObj name="Equation" r:id="rId3" imgW="1358640" imgH="203040" progId="Equation.3">
+                  <p:oleObj name="Equation" r:id="rId3" imgW="1409400" imgH="203040" progId="Equation.3">
                     <p:embed/>
                     <p:pic>
                       <p:nvPicPr>
@@ -13136,8 +15343,8 @@
                       </p:blipFill>
                       <p:spPr>
                         <a:xfrm>
-                          <a:off x="7107238" y="3148013"/>
-                          <a:ext cx="3044825" cy="454025"/>
+                          <a:off x="7052731" y="3147481"/>
+                          <a:ext cx="3155951" cy="455083"/>
                         </a:xfrm>
                         <a:prstGeom prst="rect">
                           <a:avLst/>
@@ -13213,6 +15420,585 @@
           </a:p>
         </p:txBody>
       </p:sp>
+      <p:grpSp>
+        <p:nvGrpSpPr>
+          <p:cNvPr id="20" name="Group 19"/>
+          <p:cNvGrpSpPr/>
+          <p:nvPr/>
+        </p:nvGrpSpPr>
+        <p:grpSpPr>
+          <a:xfrm>
+            <a:off x="5330430" y="5953991"/>
+            <a:ext cx="1839304" cy="222972"/>
+            <a:chOff x="5330430" y="5953991"/>
+            <a:chExt cx="1839304" cy="222972"/>
+          </a:xfrm>
+        </p:grpSpPr>
+        <p:sp>
+          <p:nvSpPr>
+            <p:cNvPr id="8" name="Rectangle 7"/>
+            <p:cNvSpPr/>
+            <p:nvPr/>
+          </p:nvSpPr>
+          <p:spPr>
+            <a:xfrm>
+              <a:off x="5330430" y="5953991"/>
+              <a:ext cx="301443" cy="222972"/>
+            </a:xfrm>
+            <a:prstGeom prst="rect">
+              <a:avLst/>
+            </a:prstGeom>
+            <a:noFill/>
+            <a:ln>
+              <a:solidFill>
+                <a:schemeClr val="tx1"/>
+              </a:solidFill>
+            </a:ln>
+          </p:spPr>
+          <p:style>
+            <a:lnRef idx="2">
+              <a:schemeClr val="accent1">
+                <a:shade val="50000"/>
+              </a:schemeClr>
+            </a:lnRef>
+            <a:fillRef idx="1">
+              <a:schemeClr val="accent1"/>
+            </a:fillRef>
+            <a:effectRef idx="0">
+              <a:schemeClr val="accent1"/>
+            </a:effectRef>
+            <a:fontRef idx="minor">
+              <a:schemeClr val="lt1"/>
+            </a:fontRef>
+          </p:style>
+          <p:txBody>
+            <a:bodyPr rtlCol="0" anchor="ctr"/>
+            <a:lstStyle/>
+            <a:p>
+              <a:pPr algn="ctr"/>
+              <a:endParaRPr lang="en-US"/>
+            </a:p>
+          </p:txBody>
+        </p:sp>
+        <p:sp>
+          <p:nvSpPr>
+            <p:cNvPr id="9" name="Rectangle 8"/>
+            <p:cNvSpPr/>
+            <p:nvPr/>
+          </p:nvSpPr>
+          <p:spPr>
+            <a:xfrm>
+              <a:off x="5638695" y="5953991"/>
+              <a:ext cx="301443" cy="222972"/>
+            </a:xfrm>
+            <a:prstGeom prst="rect">
+              <a:avLst/>
+            </a:prstGeom>
+            <a:noFill/>
+            <a:ln>
+              <a:solidFill>
+                <a:schemeClr val="tx1"/>
+              </a:solidFill>
+            </a:ln>
+          </p:spPr>
+          <p:style>
+            <a:lnRef idx="2">
+              <a:schemeClr val="accent1">
+                <a:shade val="50000"/>
+              </a:schemeClr>
+            </a:lnRef>
+            <a:fillRef idx="1">
+              <a:schemeClr val="accent1"/>
+            </a:fillRef>
+            <a:effectRef idx="0">
+              <a:schemeClr val="accent1"/>
+            </a:effectRef>
+            <a:fontRef idx="minor">
+              <a:schemeClr val="lt1"/>
+            </a:fontRef>
+          </p:style>
+          <p:txBody>
+            <a:bodyPr rtlCol="0" anchor="ctr"/>
+            <a:lstStyle/>
+            <a:p>
+              <a:pPr algn="ctr"/>
+              <a:endParaRPr lang="en-US"/>
+            </a:p>
+          </p:txBody>
+        </p:sp>
+        <p:sp>
+          <p:nvSpPr>
+            <p:cNvPr id="10" name="Rectangle 9"/>
+            <p:cNvSpPr/>
+            <p:nvPr/>
+          </p:nvSpPr>
+          <p:spPr>
+            <a:xfrm>
+              <a:off x="5940034" y="5953991"/>
+              <a:ext cx="301443" cy="222972"/>
+            </a:xfrm>
+            <a:prstGeom prst="rect">
+              <a:avLst/>
+            </a:prstGeom>
+            <a:noFill/>
+            <a:ln>
+              <a:solidFill>
+                <a:schemeClr val="tx1"/>
+              </a:solidFill>
+            </a:ln>
+          </p:spPr>
+          <p:style>
+            <a:lnRef idx="2">
+              <a:schemeClr val="accent1">
+                <a:shade val="50000"/>
+              </a:schemeClr>
+            </a:lnRef>
+            <a:fillRef idx="1">
+              <a:schemeClr val="accent1"/>
+            </a:fillRef>
+            <a:effectRef idx="0">
+              <a:schemeClr val="accent1"/>
+            </a:effectRef>
+            <a:fontRef idx="minor">
+              <a:schemeClr val="lt1"/>
+            </a:fontRef>
+          </p:style>
+          <p:txBody>
+            <a:bodyPr rtlCol="0" anchor="ctr"/>
+            <a:lstStyle/>
+            <a:p>
+              <a:pPr algn="ctr"/>
+              <a:endParaRPr lang="en-US"/>
+            </a:p>
+          </p:txBody>
+        </p:sp>
+        <p:sp>
+          <p:nvSpPr>
+            <p:cNvPr id="11" name="Rectangle 10"/>
+            <p:cNvSpPr/>
+            <p:nvPr/>
+          </p:nvSpPr>
+          <p:spPr>
+            <a:xfrm>
+              <a:off x="6248299" y="5953991"/>
+              <a:ext cx="301443" cy="222972"/>
+            </a:xfrm>
+            <a:prstGeom prst="rect">
+              <a:avLst/>
+            </a:prstGeom>
+            <a:noFill/>
+            <a:ln>
+              <a:solidFill>
+                <a:schemeClr val="tx1"/>
+              </a:solidFill>
+            </a:ln>
+          </p:spPr>
+          <p:style>
+            <a:lnRef idx="2">
+              <a:schemeClr val="accent1">
+                <a:shade val="50000"/>
+              </a:schemeClr>
+            </a:lnRef>
+            <a:fillRef idx="1">
+              <a:schemeClr val="accent1"/>
+            </a:fillRef>
+            <a:effectRef idx="0">
+              <a:schemeClr val="accent1"/>
+            </a:effectRef>
+            <a:fontRef idx="minor">
+              <a:schemeClr val="lt1"/>
+            </a:fontRef>
+          </p:style>
+          <p:txBody>
+            <a:bodyPr rtlCol="0" anchor="ctr"/>
+            <a:lstStyle/>
+            <a:p>
+              <a:pPr algn="ctr"/>
+              <a:endParaRPr lang="en-US"/>
+            </a:p>
+          </p:txBody>
+        </p:sp>
+        <p:sp>
+          <p:nvSpPr>
+            <p:cNvPr id="12" name="Rectangle 11"/>
+            <p:cNvSpPr/>
+            <p:nvPr/>
+          </p:nvSpPr>
+          <p:spPr>
+            <a:xfrm>
+              <a:off x="6560026" y="5953991"/>
+              <a:ext cx="301443" cy="222972"/>
+            </a:xfrm>
+            <a:prstGeom prst="rect">
+              <a:avLst/>
+            </a:prstGeom>
+            <a:noFill/>
+            <a:ln>
+              <a:solidFill>
+                <a:schemeClr val="tx1"/>
+              </a:solidFill>
+            </a:ln>
+          </p:spPr>
+          <p:style>
+            <a:lnRef idx="2">
+              <a:schemeClr val="accent1">
+                <a:shade val="50000"/>
+              </a:schemeClr>
+            </a:lnRef>
+            <a:fillRef idx="1">
+              <a:schemeClr val="accent1"/>
+            </a:fillRef>
+            <a:effectRef idx="0">
+              <a:schemeClr val="accent1"/>
+            </a:effectRef>
+            <a:fontRef idx="minor">
+              <a:schemeClr val="lt1"/>
+            </a:fontRef>
+          </p:style>
+          <p:txBody>
+            <a:bodyPr rtlCol="0" anchor="ctr"/>
+            <a:lstStyle/>
+            <a:p>
+              <a:pPr algn="ctr"/>
+              <a:endParaRPr lang="en-US"/>
+            </a:p>
+          </p:txBody>
+        </p:sp>
+        <p:sp>
+          <p:nvSpPr>
+            <p:cNvPr id="13" name="Rectangle 12"/>
+            <p:cNvSpPr/>
+            <p:nvPr/>
+          </p:nvSpPr>
+          <p:spPr>
+            <a:xfrm>
+              <a:off x="6868291" y="5953991"/>
+              <a:ext cx="301443" cy="222972"/>
+            </a:xfrm>
+            <a:prstGeom prst="rect">
+              <a:avLst/>
+            </a:prstGeom>
+            <a:noFill/>
+            <a:ln>
+              <a:solidFill>
+                <a:schemeClr val="tx1"/>
+              </a:solidFill>
+            </a:ln>
+          </p:spPr>
+          <p:style>
+            <a:lnRef idx="2">
+              <a:schemeClr val="accent1">
+                <a:shade val="50000"/>
+              </a:schemeClr>
+            </a:lnRef>
+            <a:fillRef idx="1">
+              <a:schemeClr val="accent1"/>
+            </a:fillRef>
+            <a:effectRef idx="0">
+              <a:schemeClr val="accent1"/>
+            </a:effectRef>
+            <a:fontRef idx="minor">
+              <a:schemeClr val="lt1"/>
+            </a:fontRef>
+          </p:style>
+          <p:txBody>
+            <a:bodyPr rtlCol="0" anchor="ctr"/>
+            <a:lstStyle/>
+            <a:p>
+              <a:pPr algn="ctr"/>
+              <a:endParaRPr lang="en-US"/>
+            </a:p>
+          </p:txBody>
+        </p:sp>
+        <p:sp>
+          <p:nvSpPr>
+            <p:cNvPr id="14" name="Oval 13"/>
+            <p:cNvSpPr/>
+            <p:nvPr/>
+          </p:nvSpPr>
+          <p:spPr>
+            <a:xfrm>
+              <a:off x="5446462" y="6023914"/>
+              <a:ext cx="83127" cy="83127"/>
+            </a:xfrm>
+            <a:prstGeom prst="ellipse">
+              <a:avLst/>
+            </a:prstGeom>
+            <a:solidFill>
+              <a:schemeClr val="tx1"/>
+            </a:solidFill>
+            <a:ln>
+              <a:solidFill>
+                <a:schemeClr val="tx1"/>
+              </a:solidFill>
+            </a:ln>
+          </p:spPr>
+          <p:style>
+            <a:lnRef idx="2">
+              <a:schemeClr val="accent1">
+                <a:shade val="50000"/>
+              </a:schemeClr>
+            </a:lnRef>
+            <a:fillRef idx="1">
+              <a:schemeClr val="accent1"/>
+            </a:fillRef>
+            <a:effectRef idx="0">
+              <a:schemeClr val="accent1"/>
+            </a:effectRef>
+            <a:fontRef idx="minor">
+              <a:schemeClr val="lt1"/>
+            </a:fontRef>
+          </p:style>
+          <p:txBody>
+            <a:bodyPr rtlCol="0" anchor="ctr"/>
+            <a:lstStyle/>
+            <a:p>
+              <a:pPr algn="ctr"/>
+              <a:endParaRPr lang="en-US"/>
+            </a:p>
+          </p:txBody>
+        </p:sp>
+        <p:sp>
+          <p:nvSpPr>
+            <p:cNvPr id="15" name="Oval 14"/>
+            <p:cNvSpPr/>
+            <p:nvPr/>
+          </p:nvSpPr>
+          <p:spPr>
+            <a:xfrm>
+              <a:off x="5740979" y="6023914"/>
+              <a:ext cx="83127" cy="83127"/>
+            </a:xfrm>
+            <a:prstGeom prst="ellipse">
+              <a:avLst/>
+            </a:prstGeom>
+            <a:solidFill>
+              <a:schemeClr val="tx1"/>
+            </a:solidFill>
+            <a:ln>
+              <a:solidFill>
+                <a:schemeClr val="tx1"/>
+              </a:solidFill>
+            </a:ln>
+          </p:spPr>
+          <p:style>
+            <a:lnRef idx="2">
+              <a:schemeClr val="accent1">
+                <a:shade val="50000"/>
+              </a:schemeClr>
+            </a:lnRef>
+            <a:fillRef idx="1">
+              <a:schemeClr val="accent1"/>
+            </a:fillRef>
+            <a:effectRef idx="0">
+              <a:schemeClr val="accent1"/>
+            </a:effectRef>
+            <a:fontRef idx="minor">
+              <a:schemeClr val="lt1"/>
+            </a:fontRef>
+          </p:style>
+          <p:txBody>
+            <a:bodyPr rtlCol="0" anchor="ctr"/>
+            <a:lstStyle/>
+            <a:p>
+              <a:pPr algn="ctr"/>
+              <a:endParaRPr lang="en-US"/>
+            </a:p>
+          </p:txBody>
+        </p:sp>
+        <p:sp>
+          <p:nvSpPr>
+            <p:cNvPr id="16" name="Oval 15"/>
+            <p:cNvSpPr/>
+            <p:nvPr/>
+          </p:nvSpPr>
+          <p:spPr>
+            <a:xfrm>
+              <a:off x="6059582" y="6023914"/>
+              <a:ext cx="83127" cy="83127"/>
+            </a:xfrm>
+            <a:prstGeom prst="ellipse">
+              <a:avLst/>
+            </a:prstGeom>
+            <a:solidFill>
+              <a:schemeClr val="tx1"/>
+            </a:solidFill>
+            <a:ln>
+              <a:solidFill>
+                <a:schemeClr val="tx1"/>
+              </a:solidFill>
+            </a:ln>
+          </p:spPr>
+          <p:style>
+            <a:lnRef idx="2">
+              <a:schemeClr val="accent1">
+                <a:shade val="50000"/>
+              </a:schemeClr>
+            </a:lnRef>
+            <a:fillRef idx="1">
+              <a:schemeClr val="accent1"/>
+            </a:fillRef>
+            <a:effectRef idx="0">
+              <a:schemeClr val="accent1"/>
+            </a:effectRef>
+            <a:fontRef idx="minor">
+              <a:schemeClr val="lt1"/>
+            </a:fontRef>
+          </p:style>
+          <p:txBody>
+            <a:bodyPr rtlCol="0" anchor="ctr"/>
+            <a:lstStyle/>
+            <a:p>
+              <a:pPr algn="ctr"/>
+              <a:endParaRPr lang="en-US"/>
+            </a:p>
+          </p:txBody>
+        </p:sp>
+        <p:sp>
+          <p:nvSpPr>
+            <p:cNvPr id="17" name="Oval 16"/>
+            <p:cNvSpPr/>
+            <p:nvPr/>
+          </p:nvSpPr>
+          <p:spPr>
+            <a:xfrm>
+              <a:off x="6357456" y="6023914"/>
+              <a:ext cx="83127" cy="83127"/>
+            </a:xfrm>
+            <a:prstGeom prst="ellipse">
+              <a:avLst/>
+            </a:prstGeom>
+            <a:solidFill>
+              <a:schemeClr val="tx1"/>
+            </a:solidFill>
+            <a:ln>
+              <a:solidFill>
+                <a:schemeClr val="tx1"/>
+              </a:solidFill>
+            </a:ln>
+          </p:spPr>
+          <p:style>
+            <a:lnRef idx="2">
+              <a:schemeClr val="accent1">
+                <a:shade val="50000"/>
+              </a:schemeClr>
+            </a:lnRef>
+            <a:fillRef idx="1">
+              <a:schemeClr val="accent1"/>
+            </a:fillRef>
+            <a:effectRef idx="0">
+              <a:schemeClr val="accent1"/>
+            </a:effectRef>
+            <a:fontRef idx="minor">
+              <a:schemeClr val="lt1"/>
+            </a:fontRef>
+          </p:style>
+          <p:txBody>
+            <a:bodyPr rtlCol="0" anchor="ctr"/>
+            <a:lstStyle/>
+            <a:p>
+              <a:pPr algn="ctr"/>
+              <a:endParaRPr lang="en-US"/>
+            </a:p>
+          </p:txBody>
+        </p:sp>
+        <p:sp>
+          <p:nvSpPr>
+            <p:cNvPr id="18" name="Oval 17"/>
+            <p:cNvSpPr/>
+            <p:nvPr/>
+          </p:nvSpPr>
+          <p:spPr>
+            <a:xfrm>
+              <a:off x="6651870" y="6023914"/>
+              <a:ext cx="83127" cy="83127"/>
+            </a:xfrm>
+            <a:prstGeom prst="ellipse">
+              <a:avLst/>
+            </a:prstGeom>
+            <a:solidFill>
+              <a:schemeClr val="tx1"/>
+            </a:solidFill>
+            <a:ln>
+              <a:solidFill>
+                <a:schemeClr val="tx1"/>
+              </a:solidFill>
+            </a:ln>
+          </p:spPr>
+          <p:style>
+            <a:lnRef idx="2">
+              <a:schemeClr val="accent1">
+                <a:shade val="50000"/>
+              </a:schemeClr>
+            </a:lnRef>
+            <a:fillRef idx="1">
+              <a:schemeClr val="accent1"/>
+            </a:fillRef>
+            <a:effectRef idx="0">
+              <a:schemeClr val="accent1"/>
+            </a:effectRef>
+            <a:fontRef idx="minor">
+              <a:schemeClr val="lt1"/>
+            </a:fontRef>
+          </p:style>
+          <p:txBody>
+            <a:bodyPr rtlCol="0" anchor="ctr"/>
+            <a:lstStyle/>
+            <a:p>
+              <a:pPr algn="ctr"/>
+              <a:endParaRPr lang="en-US"/>
+            </a:p>
+          </p:txBody>
+        </p:sp>
+        <p:sp>
+          <p:nvSpPr>
+            <p:cNvPr id="19" name="Oval 18"/>
+            <p:cNvSpPr/>
+            <p:nvPr/>
+          </p:nvSpPr>
+          <p:spPr>
+            <a:xfrm>
+              <a:off x="6971387" y="6023914"/>
+              <a:ext cx="83127" cy="83127"/>
+            </a:xfrm>
+            <a:prstGeom prst="ellipse">
+              <a:avLst/>
+            </a:prstGeom>
+            <a:solidFill>
+              <a:schemeClr val="tx1"/>
+            </a:solidFill>
+            <a:ln>
+              <a:solidFill>
+                <a:schemeClr val="tx1"/>
+              </a:solidFill>
+            </a:ln>
+          </p:spPr>
+          <p:style>
+            <a:lnRef idx="2">
+              <a:schemeClr val="accent1">
+                <a:shade val="50000"/>
+              </a:schemeClr>
+            </a:lnRef>
+            <a:fillRef idx="1">
+              <a:schemeClr val="accent1"/>
+            </a:fillRef>
+            <a:effectRef idx="0">
+              <a:schemeClr val="accent1"/>
+            </a:effectRef>
+            <a:fontRef idx="minor">
+              <a:schemeClr val="lt1"/>
+            </a:fontRef>
+          </p:style>
+          <p:txBody>
+            <a:bodyPr rtlCol="0" anchor="ctr"/>
+            <a:lstStyle/>
+            <a:p>
+              <a:pPr algn="ctr"/>
+              <a:endParaRPr lang="en-US"/>
+            </a:p>
+          </p:txBody>
+        </p:sp>
+      </p:grpSp>
     </p:spTree>
     <p:extLst>
       <p:ext uri="{BB962C8B-B14F-4D97-AF65-F5344CB8AC3E}">

</xml_diff>

<commit_message>
Array picture now 2D
</commit_message>
<xml_diff>
--- a/DataStructures/data_structures.pptx
+++ b/DataStructures/data_structures.pptx
@@ -226,7 +226,7 @@
           <a:p>
             <a:fld id="{D3AF4CC3-573B-48A2-BA19-C88E9EEB8008}" type="datetimeFigureOut">
               <a:rPr lang="en-US" smtClean="0"/>
-              <a:t>2016-08-22</a:t>
+              <a:t>2016-08-23</a:t>
             </a:fld>
             <a:endParaRPr lang="en-US"/>
           </a:p>
@@ -793,7 +793,7 @@
           <a:p>
             <a:fld id="{E7395A51-B5B5-44D7-85E1-1556CCB9180F}" type="datetime1">
               <a:rPr lang="en-US" smtClean="0"/>
-              <a:t>2016-08-22</a:t>
+              <a:t>2016-08-23</a:t>
             </a:fld>
             <a:endParaRPr lang="en-US"/>
           </a:p>
@@ -963,7 +963,7 @@
           <a:p>
             <a:fld id="{BEDB066D-DA80-4992-B507-A911EFD1878C}" type="datetime1">
               <a:rPr lang="en-US" smtClean="0"/>
-              <a:t>2016-08-22</a:t>
+              <a:t>2016-08-23</a:t>
             </a:fld>
             <a:endParaRPr lang="en-US"/>
           </a:p>
@@ -1143,7 +1143,7 @@
           <a:p>
             <a:fld id="{21259CBD-682A-4ABE-AFE9-CACFF55FE875}" type="datetime1">
               <a:rPr lang="en-US" smtClean="0"/>
-              <a:t>2016-08-22</a:t>
+              <a:t>2016-08-23</a:t>
             </a:fld>
             <a:endParaRPr lang="en-US"/>
           </a:p>
@@ -1313,7 +1313,7 @@
           <a:p>
             <a:fld id="{5F76F78E-A200-421E-B0AA-A6018E81E55E}" type="datetime1">
               <a:rPr lang="en-US" smtClean="0"/>
-              <a:t>2016-08-22</a:t>
+              <a:t>2016-08-23</a:t>
             </a:fld>
             <a:endParaRPr lang="en-US"/>
           </a:p>
@@ -1557,7 +1557,7 @@
           <a:p>
             <a:fld id="{EBEC21EE-ED62-44E3-A586-FF0104F19B99}" type="datetime1">
               <a:rPr lang="en-US" smtClean="0"/>
-              <a:t>2016-08-22</a:t>
+              <a:t>2016-08-23</a:t>
             </a:fld>
             <a:endParaRPr lang="en-US"/>
           </a:p>
@@ -1789,7 +1789,7 @@
           <a:p>
             <a:fld id="{30049BC0-4C66-4CED-BC8E-7AF0BD49C9B5}" type="datetime1">
               <a:rPr lang="en-US" smtClean="0"/>
-              <a:t>2016-08-22</a:t>
+              <a:t>2016-08-23</a:t>
             </a:fld>
             <a:endParaRPr lang="en-US"/>
           </a:p>
@@ -2156,7 +2156,7 @@
           <a:p>
             <a:fld id="{C7C90E0A-53F1-4115-8AB2-2E28E481FF48}" type="datetime1">
               <a:rPr lang="en-US" smtClean="0"/>
-              <a:t>2016-08-22</a:t>
+              <a:t>2016-08-23</a:t>
             </a:fld>
             <a:endParaRPr lang="en-US"/>
           </a:p>
@@ -2274,7 +2274,7 @@
           <a:p>
             <a:fld id="{AF79CAB3-789B-4117-A859-FC7082686441}" type="datetime1">
               <a:rPr lang="en-US" smtClean="0"/>
-              <a:t>2016-08-22</a:t>
+              <a:t>2016-08-23</a:t>
             </a:fld>
             <a:endParaRPr lang="en-US"/>
           </a:p>
@@ -2369,7 +2369,7 @@
           <a:p>
             <a:fld id="{82AE2AC5-51ED-46C8-8F1B-788630EE802E}" type="datetime1">
               <a:rPr lang="en-US" smtClean="0"/>
-              <a:t>2016-08-22</a:t>
+              <a:t>2016-08-23</a:t>
             </a:fld>
             <a:endParaRPr lang="en-US"/>
           </a:p>
@@ -2646,7 +2646,7 @@
           <a:p>
             <a:fld id="{49D0F6DD-6796-44CA-AF4C-1B2A2288F444}" type="datetime1">
               <a:rPr lang="en-US" smtClean="0"/>
-              <a:t>2016-08-22</a:t>
+              <a:t>2016-08-23</a:t>
             </a:fld>
             <a:endParaRPr lang="en-US"/>
           </a:p>
@@ -2903,7 +2903,7 @@
           <a:p>
             <a:fld id="{57F6808E-F05D-421A-97B7-12B728993E3B}" type="datetime1">
               <a:rPr lang="en-US" smtClean="0"/>
-              <a:t>2016-08-22</a:t>
+              <a:t>2016-08-23</a:t>
             </a:fld>
             <a:endParaRPr lang="en-US"/>
           </a:p>
@@ -3116,7 +3116,7 @@
           <a:p>
             <a:fld id="{7B995810-2FB7-4DE8-B622-97729F9C53CB}" type="datetime1">
               <a:rPr lang="en-US" smtClean="0"/>
-              <a:t>2016-08-22</a:t>
+              <a:t>2016-08-23</a:t>
             </a:fld>
             <a:endParaRPr lang="en-US"/>
           </a:p>
@@ -3784,11 +3784,7 @@
             </a:r>
             <a:r>
               <a:rPr lang="en-US" dirty="0" smtClean="0"/>
-              <a:t>, </a:t>
-            </a:r>
-            <a:r>
-              <a:rPr lang="en-US" dirty="0" smtClean="0"/>
-              <a:t>…, index</a:t>
+              <a:t>, …, index</a:t>
             </a:r>
             <a:r>
               <a:rPr lang="en-US" i="1" baseline="-25000" dirty="0" smtClean="0"/>
@@ -3800,11 +3796,7 @@
             </a:r>
             <a:r>
               <a:rPr lang="en-US" dirty="0" smtClean="0"/>
-              <a:t>, </a:t>
-            </a:r>
-            <a:r>
-              <a:rPr lang="en-US" dirty="0" smtClean="0"/>
-              <a:t>value)</a:t>
+              <a:t>, value)</a:t>
             </a:r>
           </a:p>
           <a:p>
@@ -4444,7 +4436,7 @@
             <a:graphicData uri="http://schemas.openxmlformats.org/presentationml/2006/ole">
               <mc:AlternateContent xmlns:mc="http://schemas.openxmlformats.org/markup-compatibility/2006">
                 <mc:Choice xmlns:v="urn:schemas-microsoft-com:vml" Requires="v">
-                  <p:oleObj spid="_x0000_s3108" name="Equation" r:id="rId3" imgW="1180800" imgH="228600" progId="Equation.3">
+                  <p:oleObj spid="_x0000_s3109" name="Equation" r:id="rId3" imgW="1180800" imgH="228600" progId="Equation.3">
                     <p:embed/>
                   </p:oleObj>
                 </mc:Choice>
@@ -4647,15 +4639,7 @@
             </a:r>
             <a:r>
               <a:rPr lang="en-US" dirty="0" smtClean="0"/>
-              <a:t> </a:t>
-            </a:r>
-            <a:r>
-              <a:rPr lang="en-US" dirty="0" smtClean="0"/>
-              <a:t>= </a:t>
-            </a:r>
-            <a:r>
-              <a:rPr lang="en-US" dirty="0" smtClean="0"/>
-              <a:t>value</a:t>
+              <a:t> = value</a:t>
             </a:r>
             <a:r>
               <a:rPr lang="en-US" i="1" baseline="-25000" dirty="0" smtClean="0"/>
@@ -4687,11 +4671,7 @@
           <a:p>
             <a:r>
               <a:rPr lang="en-US" dirty="0" smtClean="0"/>
-              <a:t>TUPLE.GET(key</a:t>
-            </a:r>
-            <a:r>
-              <a:rPr lang="en-US" dirty="0" smtClean="0"/>
-              <a:t>) </a:t>
+              <a:t>TUPLE.GET(key) </a:t>
             </a:r>
             <a:r>
               <a:rPr lang="en-US" dirty="0" smtClean="0">
@@ -4704,11 +4684,7 @@
           <a:p>
             <a:r>
               <a:rPr lang="en-US" dirty="0" smtClean="0"/>
-              <a:t>TUPLE.SET(key, </a:t>
-            </a:r>
-            <a:r>
-              <a:rPr lang="en-US" dirty="0" smtClean="0"/>
-              <a:t>value)</a:t>
+              <a:t>TUPLE.SET(key, value)</a:t>
             </a:r>
             <a:endParaRPr lang="en-US" dirty="0"/>
           </a:p>
@@ -5528,7 +5504,7 @@
             <a:graphicData uri="http://schemas.openxmlformats.org/presentationml/2006/ole">
               <mc:AlternateContent xmlns:mc="http://schemas.openxmlformats.org/markup-compatibility/2006">
                 <mc:Choice xmlns:v="urn:schemas-microsoft-com:vml" Requires="v">
-                  <p:oleObj spid="_x0000_s4127" name="Equation" r:id="rId3" imgW="419040" imgH="241200" progId="Equation.3">
+                  <p:oleObj spid="_x0000_s4128" name="Equation" r:id="rId3" imgW="419040" imgH="241200" progId="Equation.3">
                     <p:embed/>
                   </p:oleObj>
                 </mc:Choice>
@@ -6570,7 +6546,6 @@
               <a:rPr lang="en-US" dirty="0" smtClean="0"/>
               <a:t>LIST.REMOVE(index)</a:t>
             </a:r>
-            <a:endParaRPr lang="en-US" dirty="0" smtClean="0"/>
           </a:p>
           <a:p>
             <a:r>
@@ -7468,7 +7443,7 @@
             <a:graphicData uri="http://schemas.openxmlformats.org/presentationml/2006/ole">
               <mc:AlternateContent xmlns:mc="http://schemas.openxmlformats.org/markup-compatibility/2006">
                 <mc:Choice xmlns:v="urn:schemas-microsoft-com:vml" Requires="v">
-                  <p:oleObj spid="_x0000_s5159" name="Equation" r:id="rId3" imgW="444240" imgH="203040" progId="Equation.3">
+                  <p:oleObj spid="_x0000_s5161" name="Equation" r:id="rId3" imgW="444240" imgH="203040" progId="Equation.3">
                     <p:embed/>
                   </p:oleObj>
                 </mc:Choice>
@@ -7649,7 +7624,7 @@
             <a:graphicData uri="http://schemas.openxmlformats.org/presentationml/2006/ole">
               <mc:AlternateContent xmlns:mc="http://schemas.openxmlformats.org/markup-compatibility/2006">
                 <mc:Choice xmlns:v="urn:schemas-microsoft-com:vml" Requires="v">
-                  <p:oleObj spid="_x0000_s5160" name="Equation" r:id="rId5" imgW="419040" imgH="215640" progId="Equation.3">
+                  <p:oleObj spid="_x0000_s5162" name="Equation" r:id="rId5" imgW="419040" imgH="215640" progId="Equation.3">
                     <p:embed/>
                   </p:oleObj>
                 </mc:Choice>
@@ -7981,11 +7956,7 @@
           <a:p>
             <a:r>
               <a:rPr lang="en-US" dirty="0" smtClean="0"/>
-              <a:t>SET.REMOVE(value</a:t>
-            </a:r>
-            <a:r>
-              <a:rPr lang="en-US" dirty="0" smtClean="0"/>
-              <a:t>)</a:t>
+              <a:t>SET.REMOVE(value)</a:t>
             </a:r>
           </a:p>
           <a:p>
@@ -9030,7 +9001,7 @@
             <a:graphicData uri="http://schemas.openxmlformats.org/presentationml/2006/ole">
               <mc:AlternateContent xmlns:mc="http://schemas.openxmlformats.org/markup-compatibility/2006">
                 <mc:Choice xmlns:v="urn:schemas-microsoft-com:vml" Requires="v">
-                  <p:oleObj spid="_x0000_s6228" name="Equation" r:id="rId3" imgW="774360" imgH="215640" progId="Equation.3">
+                  <p:oleObj spid="_x0000_s6231" name="Equation" r:id="rId3" imgW="774360" imgH="215640" progId="Equation.3">
                     <p:embed/>
                   </p:oleObj>
                 </mc:Choice>
@@ -9262,7 +9233,7 @@
             <a:graphicData uri="http://schemas.openxmlformats.org/presentationml/2006/ole">
               <mc:AlternateContent xmlns:mc="http://schemas.openxmlformats.org/markup-compatibility/2006">
                 <mc:Choice xmlns:v="urn:schemas-microsoft-com:vml" Requires="v">
-                  <p:oleObj spid="_x0000_s6229" name="Equation" r:id="rId5" imgW="622080" imgH="215640" progId="Equation.3">
+                  <p:oleObj spid="_x0000_s6232" name="Equation" r:id="rId5" imgW="622080" imgH="215640" progId="Equation.3">
                     <p:embed/>
                   </p:oleObj>
                 </mc:Choice>
@@ -9319,7 +9290,7 @@
             <a:graphicData uri="http://schemas.openxmlformats.org/presentationml/2006/ole">
               <mc:AlternateContent xmlns:mc="http://schemas.openxmlformats.org/markup-compatibility/2006">
                 <mc:Choice xmlns:v="urn:schemas-microsoft-com:vml" Requires="v">
-                  <p:oleObj spid="_x0000_s6230" name="Equation" r:id="rId7" imgW="749160" imgH="215640" progId="Equation.3">
+                  <p:oleObj spid="_x0000_s6233" name="Equation" r:id="rId7" imgW="749160" imgH="215640" progId="Equation.3">
                     <p:embed/>
                   </p:oleObj>
                 </mc:Choice>
@@ -10996,17 +10967,12 @@
               <a:rPr lang="en-US" dirty="0" smtClean="0"/>
               <a:t>Implementations</a:t>
             </a:r>
-            <a:endParaRPr lang="en-US" dirty="0" smtClean="0"/>
           </a:p>
           <a:p>
             <a:pPr lvl="1"/>
             <a:r>
               <a:rPr lang="en-US" dirty="0" smtClean="0"/>
-              <a:t>e.g., as </a:t>
-            </a:r>
-            <a:r>
-              <a:rPr lang="en-US" dirty="0" smtClean="0"/>
-              <a:t>list</a:t>
+              <a:t>e.g., as list</a:t>
             </a:r>
           </a:p>
           <a:p>
@@ -11109,7 +11075,7 @@
             <a:graphicData uri="http://schemas.openxmlformats.org/presentationml/2006/ole">
               <mc:AlternateContent xmlns:mc="http://schemas.openxmlformats.org/markup-compatibility/2006">
                 <mc:Choice xmlns:v="urn:schemas-microsoft-com:vml" Requires="v">
-                  <p:oleObj spid="_x0000_s7178" name="Equation" r:id="rId3" imgW="431640" imgH="241200" progId="Equation.3">
+                  <p:oleObj spid="_x0000_s7179" name="Equation" r:id="rId3" imgW="431640" imgH="241200" progId="Equation.3">
                     <p:embed/>
                   </p:oleObj>
                 </mc:Choice>
@@ -11595,19 +11561,8 @@
                 <a:latin typeface="Courier New" panose="02070309020205020404" pitchFamily="49" charset="0"/>
                 <a:cs typeface="Courier New" panose="02070309020205020404" pitchFamily="49" charset="0"/>
               </a:rPr>
-              <a:t>#include </a:t>
-            </a:r>
-            <a:r>
-              <a:rPr lang="en-US" dirty="0" smtClean="0">
-                <a:latin typeface="Courier New" panose="02070309020205020404" pitchFamily="49" charset="0"/>
-                <a:cs typeface="Courier New" panose="02070309020205020404" pitchFamily="49" charset="0"/>
-              </a:rPr>
-              <a:t>&lt;stack&gt;</a:t>
-            </a:r>
-            <a:endParaRPr lang="en-US" dirty="0" smtClean="0">
-              <a:latin typeface="Courier New" panose="02070309020205020404" pitchFamily="49" charset="0"/>
-              <a:cs typeface="Courier New" panose="02070309020205020404" pitchFamily="49" charset="0"/>
-            </a:endParaRPr>
+              <a:t>#include &lt;stack&gt;</a:t>
+            </a:r>
           </a:p>
           <a:p>
             <a:r>
@@ -11636,19 +11591,8 @@
                 <a:latin typeface="Courier New" panose="02070309020205020404" pitchFamily="49" charset="0"/>
                 <a:cs typeface="Courier New" panose="02070309020205020404" pitchFamily="49" charset="0"/>
               </a:rPr>
-              <a:t>&gt; </a:t>
-            </a:r>
-            <a:r>
-              <a:rPr lang="en-US" dirty="0" smtClean="0">
-                <a:latin typeface="Courier New" panose="02070309020205020404" pitchFamily="49" charset="0"/>
-                <a:cs typeface="Courier New" panose="02070309020205020404" pitchFamily="49" charset="0"/>
-              </a:rPr>
-              <a:t>s;</a:t>
-            </a:r>
-            <a:endParaRPr lang="en-US" dirty="0" smtClean="0">
-              <a:latin typeface="Courier New" panose="02070309020205020404" pitchFamily="49" charset="0"/>
-              <a:cs typeface="Courier New" panose="02070309020205020404" pitchFamily="49" charset="0"/>
-            </a:endParaRPr>
+              <a:t>&gt; s;</a:t>
+            </a:r>
           </a:p>
           <a:p>
             <a:r>
@@ -11721,14 +11665,7 @@
                 <a:latin typeface="Courier New" panose="02070309020205020404" pitchFamily="49" charset="0"/>
                 <a:cs typeface="Courier New" panose="02070309020205020404" pitchFamily="49" charset="0"/>
               </a:rPr>
-              <a:t>s</a:t>
-            </a:r>
-            <a:r>
-              <a:rPr lang="en-US" dirty="0" err="1" smtClean="0">
-                <a:latin typeface="Courier New" panose="02070309020205020404" pitchFamily="49" charset="0"/>
-                <a:cs typeface="Courier New" panose="02070309020205020404" pitchFamily="49" charset="0"/>
-              </a:rPr>
-              <a:t>.push</a:t>
+              <a:t>s.push</a:t>
             </a:r>
             <a:r>
               <a:rPr lang="en-US" dirty="0" smtClean="0">
@@ -11827,93 +11764,82 @@
                 <a:latin typeface="Courier New" panose="02070309020205020404" pitchFamily="49" charset="0"/>
                 <a:cs typeface="Courier New" panose="02070309020205020404" pitchFamily="49" charset="0"/>
               </a:rPr>
-              <a:t>()</a:t>
-            </a:r>
-            <a:r>
-              <a:rPr lang="en-US" dirty="0" smtClean="0">
+              <a:t>() </a:t>
+            </a:r>
+            <a:r>
+              <a:rPr lang="en-US" dirty="0">
+                <a:latin typeface="Courier New" panose="02070309020205020404" pitchFamily="49" charset="0"/>
+                <a:cs typeface="Courier New" panose="02070309020205020404" pitchFamily="49" charset="0"/>
+              </a:rPr>
+              <a:t>&lt;&lt; </a:t>
+            </a:r>
+            <a:r>
+              <a:rPr lang="en-US" dirty="0" err="1">
+                <a:latin typeface="Courier New" panose="02070309020205020404" pitchFamily="49" charset="0"/>
+                <a:cs typeface="Courier New" panose="02070309020205020404" pitchFamily="49" charset="0"/>
+              </a:rPr>
+              <a:t>std</a:t>
+            </a:r>
+            <a:r>
+              <a:rPr lang="en-US" dirty="0">
+                <a:latin typeface="Courier New" panose="02070309020205020404" pitchFamily="49" charset="0"/>
+                <a:cs typeface="Courier New" panose="02070309020205020404" pitchFamily="49" charset="0"/>
+              </a:rPr>
+              <a:t>::</a:t>
+            </a:r>
+            <a:r>
+              <a:rPr lang="en-US" dirty="0" err="1">
+                <a:latin typeface="Courier New" panose="02070309020205020404" pitchFamily="49" charset="0"/>
+                <a:cs typeface="Courier New" panose="02070309020205020404" pitchFamily="49" charset="0"/>
+              </a:rPr>
+              <a:t>endl</a:t>
+            </a:r>
+            <a:r>
+              <a:rPr lang="en-US" dirty="0" smtClean="0">
+                <a:latin typeface="Courier New" panose="02070309020205020404" pitchFamily="49" charset="0"/>
+                <a:cs typeface="Courier New" panose="02070309020205020404" pitchFamily="49" charset="0"/>
+              </a:rPr>
+              <a:t>;</a:t>
+            </a:r>
+          </a:p>
+          <a:p>
+            <a:r>
+              <a:rPr lang="en-US" dirty="0">
                 <a:latin typeface="Courier New" panose="02070309020205020404" pitchFamily="49" charset="0"/>
                 <a:cs typeface="Courier New" panose="02070309020205020404" pitchFamily="49" charset="0"/>
               </a:rPr>
               <a:t> </a:t>
             </a:r>
             <a:r>
+              <a:rPr lang="en-US" dirty="0" smtClean="0">
+                <a:latin typeface="Courier New" panose="02070309020205020404" pitchFamily="49" charset="0"/>
+                <a:cs typeface="Courier New" panose="02070309020205020404" pitchFamily="49" charset="0"/>
+              </a:rPr>
+              <a:t>   </a:t>
+            </a:r>
+            <a:r>
+              <a:rPr lang="en-US" dirty="0" err="1" smtClean="0">
+                <a:latin typeface="Courier New" panose="02070309020205020404" pitchFamily="49" charset="0"/>
+                <a:cs typeface="Courier New" panose="02070309020205020404" pitchFamily="49" charset="0"/>
+              </a:rPr>
+              <a:t>s.pop</a:t>
+            </a:r>
+            <a:r>
+              <a:rPr lang="en-US" dirty="0" smtClean="0">
+                <a:latin typeface="Courier New" panose="02070309020205020404" pitchFamily="49" charset="0"/>
+                <a:cs typeface="Courier New" panose="02070309020205020404" pitchFamily="49" charset="0"/>
+              </a:rPr>
+              <a:t>();</a:t>
+            </a:r>
+          </a:p>
+          <a:p>
+            <a:r>
               <a:rPr lang="en-US" dirty="0">
                 <a:latin typeface="Courier New" panose="02070309020205020404" pitchFamily="49" charset="0"/>
                 <a:cs typeface="Courier New" panose="02070309020205020404" pitchFamily="49" charset="0"/>
               </a:rPr>
-              <a:t>&lt;&lt; </a:t>
-            </a:r>
-            <a:r>
-              <a:rPr lang="en-US" dirty="0" err="1">
-                <a:latin typeface="Courier New" panose="02070309020205020404" pitchFamily="49" charset="0"/>
-                <a:cs typeface="Courier New" panose="02070309020205020404" pitchFamily="49" charset="0"/>
-              </a:rPr>
-              <a:t>std</a:t>
-            </a:r>
-            <a:r>
-              <a:rPr lang="en-US" dirty="0">
-                <a:latin typeface="Courier New" panose="02070309020205020404" pitchFamily="49" charset="0"/>
-                <a:cs typeface="Courier New" panose="02070309020205020404" pitchFamily="49" charset="0"/>
-              </a:rPr>
-              <a:t>::</a:t>
-            </a:r>
-            <a:r>
-              <a:rPr lang="en-US" dirty="0" err="1">
-                <a:latin typeface="Courier New" panose="02070309020205020404" pitchFamily="49" charset="0"/>
-                <a:cs typeface="Courier New" panose="02070309020205020404" pitchFamily="49" charset="0"/>
-              </a:rPr>
-              <a:t>endl</a:t>
-            </a:r>
-            <a:r>
-              <a:rPr lang="en-US" dirty="0" smtClean="0">
-                <a:latin typeface="Courier New" panose="02070309020205020404" pitchFamily="49" charset="0"/>
-                <a:cs typeface="Courier New" panose="02070309020205020404" pitchFamily="49" charset="0"/>
-              </a:rPr>
-              <a:t>;</a:t>
-            </a:r>
-          </a:p>
-          <a:p>
-            <a:r>
-              <a:rPr lang="en-US" dirty="0">
-                <a:latin typeface="Courier New" panose="02070309020205020404" pitchFamily="49" charset="0"/>
-                <a:cs typeface="Courier New" panose="02070309020205020404" pitchFamily="49" charset="0"/>
-              </a:rPr>
-              <a:t> </a:t>
-            </a:r>
-            <a:r>
-              <a:rPr lang="en-US" dirty="0" smtClean="0">
-                <a:latin typeface="Courier New" panose="02070309020205020404" pitchFamily="49" charset="0"/>
-                <a:cs typeface="Courier New" panose="02070309020205020404" pitchFamily="49" charset="0"/>
-              </a:rPr>
-              <a:t>   </a:t>
-            </a:r>
-            <a:r>
-              <a:rPr lang="en-US" dirty="0" err="1" smtClean="0">
-                <a:latin typeface="Courier New" panose="02070309020205020404" pitchFamily="49" charset="0"/>
-                <a:cs typeface="Courier New" panose="02070309020205020404" pitchFamily="49" charset="0"/>
-              </a:rPr>
-              <a:t>s.pop</a:t>
-            </a:r>
-            <a:r>
-              <a:rPr lang="en-US" dirty="0" smtClean="0">
-                <a:latin typeface="Courier New" panose="02070309020205020404" pitchFamily="49" charset="0"/>
-                <a:cs typeface="Courier New" panose="02070309020205020404" pitchFamily="49" charset="0"/>
-              </a:rPr>
-              <a:t>();</a:t>
-            </a:r>
-          </a:p>
-          <a:p>
-            <a:r>
-              <a:rPr lang="en-US" dirty="0">
-                <a:latin typeface="Courier New" panose="02070309020205020404" pitchFamily="49" charset="0"/>
-                <a:cs typeface="Courier New" panose="02070309020205020404" pitchFamily="49" charset="0"/>
-              </a:rPr>
               <a:t>}</a:t>
             </a:r>
-            <a:endParaRPr lang="en-US" dirty="0">
-              <a:latin typeface="Courier New" panose="02070309020205020404" pitchFamily="49" charset="0"/>
-              <a:cs typeface="Courier New" panose="02070309020205020404" pitchFamily="49" charset="0"/>
-            </a:endParaRPr>
           </a:p>
         </p:txBody>
       </p:sp>
@@ -11961,14 +11887,7 @@
                 <a:latin typeface="Courier New" panose="02070309020205020404" pitchFamily="49" charset="0"/>
                 <a:cs typeface="Courier New" panose="02070309020205020404" pitchFamily="49" charset="0"/>
               </a:rPr>
-              <a:t> </a:t>
-            </a:r>
-            <a:r>
-              <a:rPr lang="en-US" dirty="0" smtClean="0">
-                <a:latin typeface="Courier New" panose="02070309020205020404" pitchFamily="49" charset="0"/>
-                <a:cs typeface="Courier New" panose="02070309020205020404" pitchFamily="49" charset="0"/>
-              </a:rPr>
-              <a:t>= list()</a:t>
+              <a:t> = list()</a:t>
             </a:r>
           </a:p>
           <a:p>
@@ -12022,10 +11941,6 @@
               </a:rPr>
               <a:t>while s:</a:t>
             </a:r>
-            <a:endParaRPr lang="en-US" dirty="0" smtClean="0">
-              <a:latin typeface="Courier New" panose="02070309020205020404" pitchFamily="49" charset="0"/>
-              <a:cs typeface="Courier New" panose="02070309020205020404" pitchFamily="49" charset="0"/>
-            </a:endParaRPr>
           </a:p>
           <a:p>
             <a:r>
@@ -12040,14 +11955,7 @@
                 <a:latin typeface="Courier New" panose="02070309020205020404" pitchFamily="49" charset="0"/>
                 <a:cs typeface="Courier New" panose="02070309020205020404" pitchFamily="49" charset="0"/>
               </a:rPr>
-              <a:t>   print('{0:d}'.</a:t>
-            </a:r>
-            <a:r>
-              <a:rPr lang="en-US" dirty="0" smtClean="0">
-                <a:latin typeface="Courier New" panose="02070309020205020404" pitchFamily="49" charset="0"/>
-                <a:cs typeface="Courier New" panose="02070309020205020404" pitchFamily="49" charset="0"/>
-              </a:rPr>
-              <a:t>format(</a:t>
+              <a:t>   print('{0:d}'.format(</a:t>
             </a:r>
             <a:r>
               <a:rPr lang="en-US" dirty="0" err="1" smtClean="0">
@@ -12063,10 +11971,6 @@
               </a:rPr>
               <a:t>()))</a:t>
             </a:r>
-            <a:endParaRPr lang="en-US" dirty="0" smtClean="0">
-              <a:latin typeface="Courier New" panose="02070309020205020404" pitchFamily="49" charset="0"/>
-              <a:cs typeface="Courier New" panose="02070309020205020404" pitchFamily="49" charset="0"/>
-            </a:endParaRPr>
           </a:p>
         </p:txBody>
       </p:sp>
@@ -12156,13 +12060,8 @@
             <a:pPr lvl="1"/>
             <a:r>
               <a:rPr lang="en-US" dirty="0" smtClean="0"/>
-              <a:t>access: only </a:t>
-            </a:r>
-            <a:r>
-              <a:rPr lang="en-US" dirty="0" smtClean="0"/>
-              <a:t>front</a:t>
-            </a:r>
-            <a:endParaRPr lang="en-US" dirty="0" smtClean="0"/>
+              <a:t>access: only front</a:t>
+            </a:r>
           </a:p>
           <a:p>
             <a:pPr lvl="1"/>
@@ -12182,22 +12081,14 @@
             <a:pPr lvl="1"/>
             <a:r>
               <a:rPr lang="en-US" dirty="0" smtClean="0"/>
-              <a:t>push/front/pop: </a:t>
-            </a:r>
-            <a:r>
-              <a:rPr lang="en-US" dirty="0" smtClean="0"/>
-              <a:t>O(1)</a:t>
+              <a:t>push/front/pop: O(1)</a:t>
             </a:r>
           </a:p>
           <a:p>
             <a:pPr lvl="1"/>
             <a:r>
               <a:rPr lang="en-US" dirty="0" smtClean="0"/>
-              <a:t>element type: </a:t>
-            </a:r>
-            <a:r>
-              <a:rPr lang="en-US" dirty="0" smtClean="0"/>
-              <a:t>any</a:t>
+              <a:t>element type: any</a:t>
             </a:r>
           </a:p>
           <a:p>
@@ -12218,11 +12109,7 @@
             <a:pPr lvl="1"/>
             <a:r>
               <a:rPr lang="en-US" dirty="0" smtClean="0"/>
-              <a:t>e.g., as </a:t>
-            </a:r>
-            <a:r>
-              <a:rPr lang="en-US" dirty="0" smtClean="0"/>
-              <a:t>list</a:t>
+              <a:t>e.g., as list</a:t>
             </a:r>
           </a:p>
           <a:p>
@@ -12325,7 +12212,7 @@
             <a:graphicData uri="http://schemas.openxmlformats.org/presentationml/2006/ole">
               <mc:AlternateContent xmlns:mc="http://schemas.openxmlformats.org/markup-compatibility/2006">
                 <mc:Choice xmlns:v="urn:schemas-microsoft-com:vml" Requires="v">
-                  <p:oleObj spid="_x0000_s8209" name="Equation" r:id="rId3" imgW="444240" imgH="241200" progId="Equation.3">
+                  <p:oleObj spid="_x0000_s8210" name="Equation" r:id="rId3" imgW="444240" imgH="241200" progId="Equation.3">
                     <p:embed/>
                   </p:oleObj>
                 </mc:Choice>
@@ -12461,7 +12348,7 @@
             <p:nvPr/>
           </p:nvPicPr>
           <p:blipFill>
-            <a:blip r:embed="rId5">
+            <a:blip r:embed="rId5" cstate="print">
               <a:extLst>
                 <a:ext uri="{28A0092B-C50C-407E-A947-70E740481C1C}">
                   <a14:useLocalDpi xmlns:a14="http://schemas.microsoft.com/office/drawing/2010/main" val="0"/>
@@ -12502,7 +12389,7 @@
             <p:nvPr/>
           </p:nvPicPr>
           <p:blipFill>
-            <a:blip r:embed="rId6">
+            <a:blip r:embed="rId6" cstate="print">
               <a:extLst>
                 <a:ext uri="{28A0092B-C50C-407E-A947-70E740481C1C}">
                   <a14:useLocalDpi xmlns:a14="http://schemas.microsoft.com/office/drawing/2010/main" val="0"/>
@@ -12543,7 +12430,7 @@
             <p:nvPr/>
           </p:nvPicPr>
           <p:blipFill>
-            <a:blip r:embed="rId5">
+            <a:blip r:embed="rId5" cstate="print">
               <a:extLst>
                 <a:ext uri="{28A0092B-C50C-407E-A947-70E740481C1C}">
                   <a14:useLocalDpi xmlns:a14="http://schemas.microsoft.com/office/drawing/2010/main" val="0"/>
@@ -12584,7 +12471,7 @@
             <p:nvPr/>
           </p:nvPicPr>
           <p:blipFill>
-            <a:blip r:embed="rId5">
+            <a:blip r:embed="rId5" cstate="print">
               <a:extLst>
                 <a:ext uri="{28A0092B-C50C-407E-A947-70E740481C1C}">
                   <a14:useLocalDpi xmlns:a14="http://schemas.microsoft.com/office/drawing/2010/main" val="0"/>
@@ -12625,7 +12512,7 @@
             <p:nvPr/>
           </p:nvPicPr>
           <p:blipFill>
-            <a:blip r:embed="rId5">
+            <a:blip r:embed="rId5" cstate="print">
               <a:extLst>
                 <a:ext uri="{28A0092B-C50C-407E-A947-70E740481C1C}">
                   <a14:useLocalDpi xmlns:a14="http://schemas.microsoft.com/office/drawing/2010/main" val="0"/>
@@ -13255,19 +13142,8 @@
                 <a:latin typeface="Courier New" panose="02070309020205020404" pitchFamily="49" charset="0"/>
                 <a:cs typeface="Courier New" panose="02070309020205020404" pitchFamily="49" charset="0"/>
               </a:rPr>
-              <a:t>#include </a:t>
-            </a:r>
-            <a:r>
-              <a:rPr lang="en-US" dirty="0" smtClean="0">
-                <a:latin typeface="Courier New" panose="02070309020205020404" pitchFamily="49" charset="0"/>
-                <a:cs typeface="Courier New" panose="02070309020205020404" pitchFamily="49" charset="0"/>
-              </a:rPr>
-              <a:t>&lt;queue&gt;</a:t>
-            </a:r>
-            <a:endParaRPr lang="en-US" dirty="0" smtClean="0">
-              <a:latin typeface="Courier New" panose="02070309020205020404" pitchFamily="49" charset="0"/>
-              <a:cs typeface="Courier New" panose="02070309020205020404" pitchFamily="49" charset="0"/>
-            </a:endParaRPr>
+              <a:t>#include &lt;queue&gt;</a:t>
+            </a:r>
           </a:p>
           <a:p>
             <a:r>
@@ -13296,19 +13172,8 @@
                 <a:latin typeface="Courier New" panose="02070309020205020404" pitchFamily="49" charset="0"/>
                 <a:cs typeface="Courier New" panose="02070309020205020404" pitchFamily="49" charset="0"/>
               </a:rPr>
-              <a:t>&gt; </a:t>
-            </a:r>
-            <a:r>
-              <a:rPr lang="en-US" dirty="0" smtClean="0">
-                <a:latin typeface="Courier New" panose="02070309020205020404" pitchFamily="49" charset="0"/>
-                <a:cs typeface="Courier New" panose="02070309020205020404" pitchFamily="49" charset="0"/>
-              </a:rPr>
-              <a:t>q;</a:t>
-            </a:r>
-            <a:endParaRPr lang="en-US" dirty="0" smtClean="0">
-              <a:latin typeface="Courier New" panose="02070309020205020404" pitchFamily="49" charset="0"/>
-              <a:cs typeface="Courier New" panose="02070309020205020404" pitchFamily="49" charset="0"/>
-            </a:endParaRPr>
+              <a:t>&gt; q;</a:t>
+            </a:r>
           </a:p>
           <a:p>
             <a:r>
@@ -13487,100 +13352,89 @@
                 <a:latin typeface="Courier New" panose="02070309020205020404" pitchFamily="49" charset="0"/>
                 <a:cs typeface="Courier New" panose="02070309020205020404" pitchFamily="49" charset="0"/>
               </a:rPr>
-              <a:t>()</a:t>
-            </a:r>
-            <a:r>
-              <a:rPr lang="en-US" dirty="0" smtClean="0">
+              <a:t>() </a:t>
+            </a:r>
+            <a:r>
+              <a:rPr lang="en-US" dirty="0">
+                <a:latin typeface="Courier New" panose="02070309020205020404" pitchFamily="49" charset="0"/>
+                <a:cs typeface="Courier New" panose="02070309020205020404" pitchFamily="49" charset="0"/>
+              </a:rPr>
+              <a:t>&lt;&lt; </a:t>
+            </a:r>
+            <a:r>
+              <a:rPr lang="en-US" dirty="0" err="1">
+                <a:latin typeface="Courier New" panose="02070309020205020404" pitchFamily="49" charset="0"/>
+                <a:cs typeface="Courier New" panose="02070309020205020404" pitchFamily="49" charset="0"/>
+              </a:rPr>
+              <a:t>std</a:t>
+            </a:r>
+            <a:r>
+              <a:rPr lang="en-US" dirty="0">
+                <a:latin typeface="Courier New" panose="02070309020205020404" pitchFamily="49" charset="0"/>
+                <a:cs typeface="Courier New" panose="02070309020205020404" pitchFamily="49" charset="0"/>
+              </a:rPr>
+              <a:t>::</a:t>
+            </a:r>
+            <a:r>
+              <a:rPr lang="en-US" dirty="0" err="1">
+                <a:latin typeface="Courier New" panose="02070309020205020404" pitchFamily="49" charset="0"/>
+                <a:cs typeface="Courier New" panose="02070309020205020404" pitchFamily="49" charset="0"/>
+              </a:rPr>
+              <a:t>endl</a:t>
+            </a:r>
+            <a:r>
+              <a:rPr lang="en-US" dirty="0" smtClean="0">
+                <a:latin typeface="Courier New" panose="02070309020205020404" pitchFamily="49" charset="0"/>
+                <a:cs typeface="Courier New" panose="02070309020205020404" pitchFamily="49" charset="0"/>
+              </a:rPr>
+              <a:t>;</a:t>
+            </a:r>
+          </a:p>
+          <a:p>
+            <a:r>
+              <a:rPr lang="en-US" dirty="0">
                 <a:latin typeface="Courier New" panose="02070309020205020404" pitchFamily="49" charset="0"/>
                 <a:cs typeface="Courier New" panose="02070309020205020404" pitchFamily="49" charset="0"/>
               </a:rPr>
               <a:t> </a:t>
             </a:r>
             <a:r>
+              <a:rPr lang="en-US" dirty="0" smtClean="0">
+                <a:latin typeface="Courier New" panose="02070309020205020404" pitchFamily="49" charset="0"/>
+                <a:cs typeface="Courier New" panose="02070309020205020404" pitchFamily="49" charset="0"/>
+              </a:rPr>
+              <a:t>   </a:t>
+            </a:r>
+            <a:r>
+              <a:rPr lang="en-US" dirty="0" err="1">
+                <a:latin typeface="Courier New" panose="02070309020205020404" pitchFamily="49" charset="0"/>
+                <a:cs typeface="Courier New" panose="02070309020205020404" pitchFamily="49" charset="0"/>
+              </a:rPr>
+              <a:t>q</a:t>
+            </a:r>
+            <a:r>
+              <a:rPr lang="en-US" dirty="0" err="1" smtClean="0">
+                <a:latin typeface="Courier New" panose="02070309020205020404" pitchFamily="49" charset="0"/>
+                <a:cs typeface="Courier New" panose="02070309020205020404" pitchFamily="49" charset="0"/>
+              </a:rPr>
+              <a:t>.pop</a:t>
+            </a:r>
+            <a:r>
+              <a:rPr lang="en-US" dirty="0" smtClean="0">
+                <a:latin typeface="Courier New" panose="02070309020205020404" pitchFamily="49" charset="0"/>
+                <a:cs typeface="Courier New" panose="02070309020205020404" pitchFamily="49" charset="0"/>
+              </a:rPr>
+              <a:t>();</a:t>
+            </a:r>
+          </a:p>
+          <a:p>
+            <a:r>
               <a:rPr lang="en-US" dirty="0">
                 <a:latin typeface="Courier New" panose="02070309020205020404" pitchFamily="49" charset="0"/>
                 <a:cs typeface="Courier New" panose="02070309020205020404" pitchFamily="49" charset="0"/>
               </a:rPr>
-              <a:t>&lt;&lt; </a:t>
-            </a:r>
-            <a:r>
-              <a:rPr lang="en-US" dirty="0" err="1">
-                <a:latin typeface="Courier New" panose="02070309020205020404" pitchFamily="49" charset="0"/>
-                <a:cs typeface="Courier New" panose="02070309020205020404" pitchFamily="49" charset="0"/>
-              </a:rPr>
-              <a:t>std</a:t>
-            </a:r>
-            <a:r>
-              <a:rPr lang="en-US" dirty="0">
-                <a:latin typeface="Courier New" panose="02070309020205020404" pitchFamily="49" charset="0"/>
-                <a:cs typeface="Courier New" panose="02070309020205020404" pitchFamily="49" charset="0"/>
-              </a:rPr>
-              <a:t>::</a:t>
-            </a:r>
-            <a:r>
-              <a:rPr lang="en-US" dirty="0" err="1">
-                <a:latin typeface="Courier New" panose="02070309020205020404" pitchFamily="49" charset="0"/>
-                <a:cs typeface="Courier New" panose="02070309020205020404" pitchFamily="49" charset="0"/>
-              </a:rPr>
-              <a:t>endl</a:t>
-            </a:r>
-            <a:r>
-              <a:rPr lang="en-US" dirty="0" smtClean="0">
-                <a:latin typeface="Courier New" panose="02070309020205020404" pitchFamily="49" charset="0"/>
-                <a:cs typeface="Courier New" panose="02070309020205020404" pitchFamily="49" charset="0"/>
-              </a:rPr>
-              <a:t>;</a:t>
-            </a:r>
-          </a:p>
-          <a:p>
-            <a:r>
-              <a:rPr lang="en-US" dirty="0">
-                <a:latin typeface="Courier New" panose="02070309020205020404" pitchFamily="49" charset="0"/>
-                <a:cs typeface="Courier New" panose="02070309020205020404" pitchFamily="49" charset="0"/>
-              </a:rPr>
-              <a:t> </a:t>
-            </a:r>
-            <a:r>
-              <a:rPr lang="en-US" dirty="0" smtClean="0">
-                <a:latin typeface="Courier New" panose="02070309020205020404" pitchFamily="49" charset="0"/>
-                <a:cs typeface="Courier New" panose="02070309020205020404" pitchFamily="49" charset="0"/>
-              </a:rPr>
-              <a:t>   </a:t>
-            </a:r>
-            <a:r>
-              <a:rPr lang="en-US" dirty="0" err="1">
-                <a:latin typeface="Courier New" panose="02070309020205020404" pitchFamily="49" charset="0"/>
-                <a:cs typeface="Courier New" panose="02070309020205020404" pitchFamily="49" charset="0"/>
-              </a:rPr>
-              <a:t>q</a:t>
-            </a:r>
-            <a:r>
-              <a:rPr lang="en-US" dirty="0" err="1" smtClean="0">
-                <a:latin typeface="Courier New" panose="02070309020205020404" pitchFamily="49" charset="0"/>
-                <a:cs typeface="Courier New" panose="02070309020205020404" pitchFamily="49" charset="0"/>
-              </a:rPr>
-              <a:t>.pop</a:t>
-            </a:r>
-            <a:r>
-              <a:rPr lang="en-US" dirty="0" smtClean="0">
-                <a:latin typeface="Courier New" panose="02070309020205020404" pitchFamily="49" charset="0"/>
-                <a:cs typeface="Courier New" panose="02070309020205020404" pitchFamily="49" charset="0"/>
-              </a:rPr>
-              <a:t>();</a:t>
-            </a:r>
-          </a:p>
-          <a:p>
-            <a:r>
-              <a:rPr lang="en-US" dirty="0">
-                <a:latin typeface="Courier New" panose="02070309020205020404" pitchFamily="49" charset="0"/>
-                <a:cs typeface="Courier New" panose="02070309020205020404" pitchFamily="49" charset="0"/>
-              </a:rPr>
               <a:t>}</a:t>
             </a:r>
-            <a:endParaRPr lang="en-US" dirty="0">
-              <a:latin typeface="Courier New" panose="02070309020205020404" pitchFamily="49" charset="0"/>
-              <a:cs typeface="Courier New" panose="02070309020205020404" pitchFamily="49" charset="0"/>
-            </a:endParaRPr>
           </a:p>
         </p:txBody>
       </p:sp>
@@ -13621,14 +13475,7 @@
                 <a:latin typeface="Courier New" panose="02070309020205020404" pitchFamily="49" charset="0"/>
                 <a:cs typeface="Courier New" panose="02070309020205020404" pitchFamily="49" charset="0"/>
               </a:rPr>
-              <a:t>q </a:t>
-            </a:r>
-            <a:r>
-              <a:rPr lang="en-US" dirty="0" smtClean="0">
-                <a:latin typeface="Courier New" panose="02070309020205020404" pitchFamily="49" charset="0"/>
-                <a:cs typeface="Courier New" panose="02070309020205020404" pitchFamily="49" charset="0"/>
-              </a:rPr>
-              <a:t>= list()</a:t>
+              <a:t>q = list()</a:t>
             </a:r>
           </a:p>
           <a:p>
@@ -13674,14 +13521,7 @@
                 <a:latin typeface="Courier New" panose="02070309020205020404" pitchFamily="49" charset="0"/>
                 <a:cs typeface="Courier New" panose="02070309020205020404" pitchFamily="49" charset="0"/>
               </a:rPr>
-              <a:t>(x</a:t>
-            </a:r>
-            <a:r>
-              <a:rPr lang="en-US" dirty="0" smtClean="0">
-                <a:latin typeface="Courier New" panose="02070309020205020404" pitchFamily="49" charset="0"/>
-                <a:cs typeface="Courier New" panose="02070309020205020404" pitchFamily="49" charset="0"/>
-              </a:rPr>
-              <a:t>)</a:t>
+              <a:t>(x)</a:t>
             </a:r>
             <a:endParaRPr lang="en-US" dirty="0">
               <a:latin typeface="Courier New" panose="02070309020205020404" pitchFamily="49" charset="0"/>
@@ -13696,10 +13536,6 @@
               </a:rPr>
               <a:t>while s:</a:t>
             </a:r>
-            <a:endParaRPr lang="en-US" dirty="0" smtClean="0">
-              <a:latin typeface="Courier New" panose="02070309020205020404" pitchFamily="49" charset="0"/>
-              <a:cs typeface="Courier New" panose="02070309020205020404" pitchFamily="49" charset="0"/>
-            </a:endParaRPr>
           </a:p>
           <a:p>
             <a:r>
@@ -13714,14 +13550,7 @@
                 <a:latin typeface="Courier New" panose="02070309020205020404" pitchFamily="49" charset="0"/>
                 <a:cs typeface="Courier New" panose="02070309020205020404" pitchFamily="49" charset="0"/>
               </a:rPr>
-              <a:t>   print('{0:d}'.</a:t>
-            </a:r>
-            <a:r>
-              <a:rPr lang="en-US" dirty="0" smtClean="0">
-                <a:latin typeface="Courier New" panose="02070309020205020404" pitchFamily="49" charset="0"/>
-                <a:cs typeface="Courier New" panose="02070309020205020404" pitchFamily="49" charset="0"/>
-              </a:rPr>
-              <a:t>format(</a:t>
+              <a:t>   print('{0:d}'.format(</a:t>
             </a:r>
             <a:r>
               <a:rPr lang="en-US" dirty="0" err="1" smtClean="0">
@@ -13737,10 +13566,6 @@
               </a:rPr>
               <a:t>(0)))</a:t>
             </a:r>
-            <a:endParaRPr lang="en-US" dirty="0" smtClean="0">
-              <a:latin typeface="Courier New" panose="02070309020205020404" pitchFamily="49" charset="0"/>
-              <a:cs typeface="Courier New" panose="02070309020205020404" pitchFamily="49" charset="0"/>
-            </a:endParaRPr>
           </a:p>
         </p:txBody>
       </p:sp>
@@ -14705,7 +14530,7 @@
           <a:graphicData uri="http://schemas.openxmlformats.org/presentationml/2006/ole">
             <mc:AlternateContent xmlns:mc="http://schemas.openxmlformats.org/markup-compatibility/2006">
               <mc:Choice xmlns:v="urn:schemas-microsoft-com:vml" Requires="v">
-                <p:oleObj spid="_x0000_s1064" name="Equation" r:id="rId4" imgW="1841400" imgH="215640" progId="Equation.3">
+                <p:oleObj spid="_x0000_s1065" name="Equation" r:id="rId4" imgW="1841400" imgH="215640" progId="Equation.3">
                   <p:embed/>
                 </p:oleObj>
               </mc:Choice>
@@ -15322,7 +15147,7 @@
             <a:graphicData uri="http://schemas.openxmlformats.org/presentationml/2006/ole">
               <mc:AlternateContent xmlns:mc="http://schemas.openxmlformats.org/markup-compatibility/2006">
                 <mc:Choice xmlns:v="urn:schemas-microsoft-com:vml" Requires="v">
-                  <p:oleObj spid="_x0000_s2087" name="Equation" r:id="rId3" imgW="1409400" imgH="203040" progId="Equation.3">
+                  <p:oleObj spid="_x0000_s2088" name="Equation" r:id="rId3" imgW="1409400" imgH="203040" progId="Equation.3">
                     <p:embed/>
                   </p:oleObj>
                 </mc:Choice>
@@ -15422,582 +15247,1755 @@
       </p:sp>
       <p:grpSp>
         <p:nvGrpSpPr>
-          <p:cNvPr id="20" name="Group 19"/>
+          <p:cNvPr id="47" name="Group 46"/>
           <p:cNvGrpSpPr/>
           <p:nvPr/>
         </p:nvGrpSpPr>
         <p:grpSpPr>
           <a:xfrm>
-            <a:off x="5330430" y="5953991"/>
-            <a:ext cx="1839304" cy="222972"/>
-            <a:chOff x="5330430" y="5953991"/>
-            <a:chExt cx="1839304" cy="222972"/>
+            <a:off x="5414024" y="5693496"/>
+            <a:ext cx="1856621" cy="662855"/>
+            <a:chOff x="5326965" y="5953991"/>
+            <a:chExt cx="1856621" cy="662855"/>
           </a:xfrm>
         </p:grpSpPr>
-        <p:sp>
-          <p:nvSpPr>
-            <p:cNvPr id="8" name="Rectangle 7"/>
-            <p:cNvSpPr/>
+        <p:grpSp>
+          <p:nvGrpSpPr>
+            <p:cNvPr id="20" name="Group 19"/>
+            <p:cNvGrpSpPr/>
             <p:nvPr/>
-          </p:nvSpPr>
-          <p:spPr>
+          </p:nvGrpSpPr>
+          <p:grpSpPr>
             <a:xfrm>
               <a:off x="5330430" y="5953991"/>
-              <a:ext cx="301443" cy="222972"/>
+              <a:ext cx="1839304" cy="222972"/>
+              <a:chOff x="5330430" y="5953991"/>
+              <a:chExt cx="1839304" cy="222972"/>
             </a:xfrm>
-            <a:prstGeom prst="rect">
-              <a:avLst/>
-            </a:prstGeom>
-            <a:noFill/>
-            <a:ln>
+          </p:grpSpPr>
+          <p:sp>
+            <p:nvSpPr>
+              <p:cNvPr id="8" name="Rectangle 7"/>
+              <p:cNvSpPr/>
+              <p:nvPr/>
+            </p:nvSpPr>
+            <p:spPr>
+              <a:xfrm>
+                <a:off x="5330430" y="5953991"/>
+                <a:ext cx="301443" cy="222972"/>
+              </a:xfrm>
+              <a:prstGeom prst="rect">
+                <a:avLst/>
+              </a:prstGeom>
+              <a:noFill/>
+              <a:ln>
+                <a:solidFill>
+                  <a:schemeClr val="tx1"/>
+                </a:solidFill>
+              </a:ln>
+            </p:spPr>
+            <p:style>
+              <a:lnRef idx="2">
+                <a:schemeClr val="accent1">
+                  <a:shade val="50000"/>
+                </a:schemeClr>
+              </a:lnRef>
+              <a:fillRef idx="1">
+                <a:schemeClr val="accent1"/>
+              </a:fillRef>
+              <a:effectRef idx="0">
+                <a:schemeClr val="accent1"/>
+              </a:effectRef>
+              <a:fontRef idx="minor">
+                <a:schemeClr val="lt1"/>
+              </a:fontRef>
+            </p:style>
+            <p:txBody>
+              <a:bodyPr rtlCol="0" anchor="ctr"/>
+              <a:lstStyle/>
+              <a:p>
+                <a:pPr algn="ctr"/>
+                <a:endParaRPr lang="en-US"/>
+              </a:p>
+            </p:txBody>
+          </p:sp>
+          <p:sp>
+            <p:nvSpPr>
+              <p:cNvPr id="9" name="Rectangle 8"/>
+              <p:cNvSpPr/>
+              <p:nvPr/>
+            </p:nvSpPr>
+            <p:spPr>
+              <a:xfrm>
+                <a:off x="5638695" y="5953991"/>
+                <a:ext cx="301443" cy="222972"/>
+              </a:xfrm>
+              <a:prstGeom prst="rect">
+                <a:avLst/>
+              </a:prstGeom>
+              <a:noFill/>
+              <a:ln>
+                <a:solidFill>
+                  <a:schemeClr val="tx1"/>
+                </a:solidFill>
+              </a:ln>
+            </p:spPr>
+            <p:style>
+              <a:lnRef idx="2">
+                <a:schemeClr val="accent1">
+                  <a:shade val="50000"/>
+                </a:schemeClr>
+              </a:lnRef>
+              <a:fillRef idx="1">
+                <a:schemeClr val="accent1"/>
+              </a:fillRef>
+              <a:effectRef idx="0">
+                <a:schemeClr val="accent1"/>
+              </a:effectRef>
+              <a:fontRef idx="minor">
+                <a:schemeClr val="lt1"/>
+              </a:fontRef>
+            </p:style>
+            <p:txBody>
+              <a:bodyPr rtlCol="0" anchor="ctr"/>
+              <a:lstStyle/>
+              <a:p>
+                <a:pPr algn="ctr"/>
+                <a:endParaRPr lang="en-US"/>
+              </a:p>
+            </p:txBody>
+          </p:sp>
+          <p:sp>
+            <p:nvSpPr>
+              <p:cNvPr id="10" name="Rectangle 9"/>
+              <p:cNvSpPr/>
+              <p:nvPr/>
+            </p:nvSpPr>
+            <p:spPr>
+              <a:xfrm>
+                <a:off x="5940034" y="5953991"/>
+                <a:ext cx="301443" cy="222972"/>
+              </a:xfrm>
+              <a:prstGeom prst="rect">
+                <a:avLst/>
+              </a:prstGeom>
+              <a:noFill/>
+              <a:ln>
+                <a:solidFill>
+                  <a:schemeClr val="tx1"/>
+                </a:solidFill>
+              </a:ln>
+            </p:spPr>
+            <p:style>
+              <a:lnRef idx="2">
+                <a:schemeClr val="accent1">
+                  <a:shade val="50000"/>
+                </a:schemeClr>
+              </a:lnRef>
+              <a:fillRef idx="1">
+                <a:schemeClr val="accent1"/>
+              </a:fillRef>
+              <a:effectRef idx="0">
+                <a:schemeClr val="accent1"/>
+              </a:effectRef>
+              <a:fontRef idx="minor">
+                <a:schemeClr val="lt1"/>
+              </a:fontRef>
+            </p:style>
+            <p:txBody>
+              <a:bodyPr rtlCol="0" anchor="ctr"/>
+              <a:lstStyle/>
+              <a:p>
+                <a:pPr algn="ctr"/>
+                <a:endParaRPr lang="en-US"/>
+              </a:p>
+            </p:txBody>
+          </p:sp>
+          <p:sp>
+            <p:nvSpPr>
+              <p:cNvPr id="11" name="Rectangle 10"/>
+              <p:cNvSpPr/>
+              <p:nvPr/>
+            </p:nvSpPr>
+            <p:spPr>
+              <a:xfrm>
+                <a:off x="6248299" y="5953991"/>
+                <a:ext cx="301443" cy="222972"/>
+              </a:xfrm>
+              <a:prstGeom prst="rect">
+                <a:avLst/>
+              </a:prstGeom>
+              <a:noFill/>
+              <a:ln>
+                <a:solidFill>
+                  <a:schemeClr val="tx1"/>
+                </a:solidFill>
+              </a:ln>
+            </p:spPr>
+            <p:style>
+              <a:lnRef idx="2">
+                <a:schemeClr val="accent1">
+                  <a:shade val="50000"/>
+                </a:schemeClr>
+              </a:lnRef>
+              <a:fillRef idx="1">
+                <a:schemeClr val="accent1"/>
+              </a:fillRef>
+              <a:effectRef idx="0">
+                <a:schemeClr val="accent1"/>
+              </a:effectRef>
+              <a:fontRef idx="minor">
+                <a:schemeClr val="lt1"/>
+              </a:fontRef>
+            </p:style>
+            <p:txBody>
+              <a:bodyPr rtlCol="0" anchor="ctr"/>
+              <a:lstStyle/>
+              <a:p>
+                <a:pPr algn="ctr"/>
+                <a:endParaRPr lang="en-US"/>
+              </a:p>
+            </p:txBody>
+          </p:sp>
+          <p:sp>
+            <p:nvSpPr>
+              <p:cNvPr id="12" name="Rectangle 11"/>
+              <p:cNvSpPr/>
+              <p:nvPr/>
+            </p:nvSpPr>
+            <p:spPr>
+              <a:xfrm>
+                <a:off x="6560026" y="5953991"/>
+                <a:ext cx="301443" cy="222972"/>
+              </a:xfrm>
+              <a:prstGeom prst="rect">
+                <a:avLst/>
+              </a:prstGeom>
+              <a:noFill/>
+              <a:ln>
+                <a:solidFill>
+                  <a:schemeClr val="tx1"/>
+                </a:solidFill>
+              </a:ln>
+            </p:spPr>
+            <p:style>
+              <a:lnRef idx="2">
+                <a:schemeClr val="accent1">
+                  <a:shade val="50000"/>
+                </a:schemeClr>
+              </a:lnRef>
+              <a:fillRef idx="1">
+                <a:schemeClr val="accent1"/>
+              </a:fillRef>
+              <a:effectRef idx="0">
+                <a:schemeClr val="accent1"/>
+              </a:effectRef>
+              <a:fontRef idx="minor">
+                <a:schemeClr val="lt1"/>
+              </a:fontRef>
+            </p:style>
+            <p:txBody>
+              <a:bodyPr rtlCol="0" anchor="ctr"/>
+              <a:lstStyle/>
+              <a:p>
+                <a:pPr algn="ctr"/>
+                <a:endParaRPr lang="en-US"/>
+              </a:p>
+            </p:txBody>
+          </p:sp>
+          <p:sp>
+            <p:nvSpPr>
+              <p:cNvPr id="13" name="Rectangle 12"/>
+              <p:cNvSpPr/>
+              <p:nvPr/>
+            </p:nvSpPr>
+            <p:spPr>
+              <a:xfrm>
+                <a:off x="6868291" y="5953991"/>
+                <a:ext cx="301443" cy="222972"/>
+              </a:xfrm>
+              <a:prstGeom prst="rect">
+                <a:avLst/>
+              </a:prstGeom>
+              <a:noFill/>
+              <a:ln>
+                <a:solidFill>
+                  <a:schemeClr val="tx1"/>
+                </a:solidFill>
+              </a:ln>
+            </p:spPr>
+            <p:style>
+              <a:lnRef idx="2">
+                <a:schemeClr val="accent1">
+                  <a:shade val="50000"/>
+                </a:schemeClr>
+              </a:lnRef>
+              <a:fillRef idx="1">
+                <a:schemeClr val="accent1"/>
+              </a:fillRef>
+              <a:effectRef idx="0">
+                <a:schemeClr val="accent1"/>
+              </a:effectRef>
+              <a:fontRef idx="minor">
+                <a:schemeClr val="lt1"/>
+              </a:fontRef>
+            </p:style>
+            <p:txBody>
+              <a:bodyPr rtlCol="0" anchor="ctr"/>
+              <a:lstStyle/>
+              <a:p>
+                <a:pPr algn="ctr"/>
+                <a:endParaRPr lang="en-US"/>
+              </a:p>
+            </p:txBody>
+          </p:sp>
+          <p:sp>
+            <p:nvSpPr>
+              <p:cNvPr id="14" name="Oval 13"/>
+              <p:cNvSpPr/>
+              <p:nvPr/>
+            </p:nvSpPr>
+            <p:spPr>
+              <a:xfrm>
+                <a:off x="5446462" y="6023914"/>
+                <a:ext cx="83127" cy="83127"/>
+              </a:xfrm>
+              <a:prstGeom prst="ellipse">
+                <a:avLst/>
+              </a:prstGeom>
               <a:solidFill>
                 <a:schemeClr val="tx1"/>
               </a:solidFill>
-            </a:ln>
-          </p:spPr>
-          <p:style>
-            <a:lnRef idx="2">
-              <a:schemeClr val="accent1">
-                <a:shade val="50000"/>
-              </a:schemeClr>
-            </a:lnRef>
-            <a:fillRef idx="1">
-              <a:schemeClr val="accent1"/>
-            </a:fillRef>
-            <a:effectRef idx="0">
-              <a:schemeClr val="accent1"/>
-            </a:effectRef>
-            <a:fontRef idx="minor">
-              <a:schemeClr val="lt1"/>
-            </a:fontRef>
-          </p:style>
-          <p:txBody>
-            <a:bodyPr rtlCol="0" anchor="ctr"/>
-            <a:lstStyle/>
-            <a:p>
-              <a:pPr algn="ctr"/>
-              <a:endParaRPr lang="en-US"/>
-            </a:p>
-          </p:txBody>
-        </p:sp>
-        <p:sp>
-          <p:nvSpPr>
-            <p:cNvPr id="9" name="Rectangle 8"/>
-            <p:cNvSpPr/>
-            <p:nvPr/>
-          </p:nvSpPr>
-          <p:spPr>
-            <a:xfrm>
-              <a:off x="5638695" y="5953991"/>
-              <a:ext cx="301443" cy="222972"/>
-            </a:xfrm>
-            <a:prstGeom prst="rect">
-              <a:avLst/>
-            </a:prstGeom>
-            <a:noFill/>
-            <a:ln>
+              <a:ln>
+                <a:solidFill>
+                  <a:schemeClr val="tx1"/>
+                </a:solidFill>
+              </a:ln>
+            </p:spPr>
+            <p:style>
+              <a:lnRef idx="2">
+                <a:schemeClr val="accent1">
+                  <a:shade val="50000"/>
+                </a:schemeClr>
+              </a:lnRef>
+              <a:fillRef idx="1">
+                <a:schemeClr val="accent1"/>
+              </a:fillRef>
+              <a:effectRef idx="0">
+                <a:schemeClr val="accent1"/>
+              </a:effectRef>
+              <a:fontRef idx="minor">
+                <a:schemeClr val="lt1"/>
+              </a:fontRef>
+            </p:style>
+            <p:txBody>
+              <a:bodyPr rtlCol="0" anchor="ctr"/>
+              <a:lstStyle/>
+              <a:p>
+                <a:pPr algn="ctr"/>
+                <a:endParaRPr lang="en-US"/>
+              </a:p>
+            </p:txBody>
+          </p:sp>
+          <p:sp>
+            <p:nvSpPr>
+              <p:cNvPr id="15" name="Oval 14"/>
+              <p:cNvSpPr/>
+              <p:nvPr/>
+            </p:nvSpPr>
+            <p:spPr>
+              <a:xfrm>
+                <a:off x="5740979" y="6023914"/>
+                <a:ext cx="83127" cy="83127"/>
+              </a:xfrm>
+              <a:prstGeom prst="ellipse">
+                <a:avLst/>
+              </a:prstGeom>
               <a:solidFill>
                 <a:schemeClr val="tx1"/>
               </a:solidFill>
-            </a:ln>
-          </p:spPr>
-          <p:style>
-            <a:lnRef idx="2">
-              <a:schemeClr val="accent1">
-                <a:shade val="50000"/>
-              </a:schemeClr>
-            </a:lnRef>
-            <a:fillRef idx="1">
-              <a:schemeClr val="accent1"/>
-            </a:fillRef>
-            <a:effectRef idx="0">
-              <a:schemeClr val="accent1"/>
-            </a:effectRef>
-            <a:fontRef idx="minor">
-              <a:schemeClr val="lt1"/>
-            </a:fontRef>
-          </p:style>
-          <p:txBody>
-            <a:bodyPr rtlCol="0" anchor="ctr"/>
-            <a:lstStyle/>
-            <a:p>
-              <a:pPr algn="ctr"/>
-              <a:endParaRPr lang="en-US"/>
-            </a:p>
-          </p:txBody>
-        </p:sp>
-        <p:sp>
-          <p:nvSpPr>
-            <p:cNvPr id="10" name="Rectangle 9"/>
-            <p:cNvSpPr/>
-            <p:nvPr/>
-          </p:nvSpPr>
-          <p:spPr>
-            <a:xfrm>
-              <a:off x="5940034" y="5953991"/>
-              <a:ext cx="301443" cy="222972"/>
-            </a:xfrm>
-            <a:prstGeom prst="rect">
-              <a:avLst/>
-            </a:prstGeom>
-            <a:noFill/>
-            <a:ln>
+              <a:ln>
+                <a:solidFill>
+                  <a:schemeClr val="tx1"/>
+                </a:solidFill>
+              </a:ln>
+            </p:spPr>
+            <p:style>
+              <a:lnRef idx="2">
+                <a:schemeClr val="accent1">
+                  <a:shade val="50000"/>
+                </a:schemeClr>
+              </a:lnRef>
+              <a:fillRef idx="1">
+                <a:schemeClr val="accent1"/>
+              </a:fillRef>
+              <a:effectRef idx="0">
+                <a:schemeClr val="accent1"/>
+              </a:effectRef>
+              <a:fontRef idx="minor">
+                <a:schemeClr val="lt1"/>
+              </a:fontRef>
+            </p:style>
+            <p:txBody>
+              <a:bodyPr rtlCol="0" anchor="ctr"/>
+              <a:lstStyle/>
+              <a:p>
+                <a:pPr algn="ctr"/>
+                <a:endParaRPr lang="en-US"/>
+              </a:p>
+            </p:txBody>
+          </p:sp>
+          <p:sp>
+            <p:nvSpPr>
+              <p:cNvPr id="16" name="Oval 15"/>
+              <p:cNvSpPr/>
+              <p:nvPr/>
+            </p:nvSpPr>
+            <p:spPr>
+              <a:xfrm>
+                <a:off x="6059582" y="6023914"/>
+                <a:ext cx="83127" cy="83127"/>
+              </a:xfrm>
+              <a:prstGeom prst="ellipse">
+                <a:avLst/>
+              </a:prstGeom>
               <a:solidFill>
                 <a:schemeClr val="tx1"/>
               </a:solidFill>
-            </a:ln>
-          </p:spPr>
-          <p:style>
-            <a:lnRef idx="2">
-              <a:schemeClr val="accent1">
-                <a:shade val="50000"/>
-              </a:schemeClr>
-            </a:lnRef>
-            <a:fillRef idx="1">
-              <a:schemeClr val="accent1"/>
-            </a:fillRef>
-            <a:effectRef idx="0">
-              <a:schemeClr val="accent1"/>
-            </a:effectRef>
-            <a:fontRef idx="minor">
-              <a:schemeClr val="lt1"/>
-            </a:fontRef>
-          </p:style>
-          <p:txBody>
-            <a:bodyPr rtlCol="0" anchor="ctr"/>
-            <a:lstStyle/>
-            <a:p>
-              <a:pPr algn="ctr"/>
-              <a:endParaRPr lang="en-US"/>
-            </a:p>
-          </p:txBody>
-        </p:sp>
-        <p:sp>
-          <p:nvSpPr>
-            <p:cNvPr id="11" name="Rectangle 10"/>
-            <p:cNvSpPr/>
-            <p:nvPr/>
-          </p:nvSpPr>
-          <p:spPr>
-            <a:xfrm>
-              <a:off x="6248299" y="5953991"/>
-              <a:ext cx="301443" cy="222972"/>
-            </a:xfrm>
-            <a:prstGeom prst="rect">
-              <a:avLst/>
-            </a:prstGeom>
-            <a:noFill/>
-            <a:ln>
+              <a:ln>
+                <a:solidFill>
+                  <a:schemeClr val="tx1"/>
+                </a:solidFill>
+              </a:ln>
+            </p:spPr>
+            <p:style>
+              <a:lnRef idx="2">
+                <a:schemeClr val="accent1">
+                  <a:shade val="50000"/>
+                </a:schemeClr>
+              </a:lnRef>
+              <a:fillRef idx="1">
+                <a:schemeClr val="accent1"/>
+              </a:fillRef>
+              <a:effectRef idx="0">
+                <a:schemeClr val="accent1"/>
+              </a:effectRef>
+              <a:fontRef idx="minor">
+                <a:schemeClr val="lt1"/>
+              </a:fontRef>
+            </p:style>
+            <p:txBody>
+              <a:bodyPr rtlCol="0" anchor="ctr"/>
+              <a:lstStyle/>
+              <a:p>
+                <a:pPr algn="ctr"/>
+                <a:endParaRPr lang="en-US"/>
+              </a:p>
+            </p:txBody>
+          </p:sp>
+          <p:sp>
+            <p:nvSpPr>
+              <p:cNvPr id="17" name="Oval 16"/>
+              <p:cNvSpPr/>
+              <p:nvPr/>
+            </p:nvSpPr>
+            <p:spPr>
+              <a:xfrm>
+                <a:off x="6357456" y="6023914"/>
+                <a:ext cx="83127" cy="83127"/>
+              </a:xfrm>
+              <a:prstGeom prst="ellipse">
+                <a:avLst/>
+              </a:prstGeom>
               <a:solidFill>
                 <a:schemeClr val="tx1"/>
               </a:solidFill>
-            </a:ln>
-          </p:spPr>
-          <p:style>
-            <a:lnRef idx="2">
-              <a:schemeClr val="accent1">
-                <a:shade val="50000"/>
-              </a:schemeClr>
-            </a:lnRef>
-            <a:fillRef idx="1">
-              <a:schemeClr val="accent1"/>
-            </a:fillRef>
-            <a:effectRef idx="0">
-              <a:schemeClr val="accent1"/>
-            </a:effectRef>
-            <a:fontRef idx="minor">
-              <a:schemeClr val="lt1"/>
-            </a:fontRef>
-          </p:style>
-          <p:txBody>
-            <a:bodyPr rtlCol="0" anchor="ctr"/>
-            <a:lstStyle/>
-            <a:p>
-              <a:pPr algn="ctr"/>
-              <a:endParaRPr lang="en-US"/>
-            </a:p>
-          </p:txBody>
-        </p:sp>
-        <p:sp>
-          <p:nvSpPr>
-            <p:cNvPr id="12" name="Rectangle 11"/>
-            <p:cNvSpPr/>
-            <p:nvPr/>
-          </p:nvSpPr>
-          <p:spPr>
-            <a:xfrm>
-              <a:off x="6560026" y="5953991"/>
-              <a:ext cx="301443" cy="222972"/>
-            </a:xfrm>
-            <a:prstGeom prst="rect">
-              <a:avLst/>
-            </a:prstGeom>
-            <a:noFill/>
-            <a:ln>
+              <a:ln>
+                <a:solidFill>
+                  <a:schemeClr val="tx1"/>
+                </a:solidFill>
+              </a:ln>
+            </p:spPr>
+            <p:style>
+              <a:lnRef idx="2">
+                <a:schemeClr val="accent1">
+                  <a:shade val="50000"/>
+                </a:schemeClr>
+              </a:lnRef>
+              <a:fillRef idx="1">
+                <a:schemeClr val="accent1"/>
+              </a:fillRef>
+              <a:effectRef idx="0">
+                <a:schemeClr val="accent1"/>
+              </a:effectRef>
+              <a:fontRef idx="minor">
+                <a:schemeClr val="lt1"/>
+              </a:fontRef>
+            </p:style>
+            <p:txBody>
+              <a:bodyPr rtlCol="0" anchor="ctr"/>
+              <a:lstStyle/>
+              <a:p>
+                <a:pPr algn="ctr"/>
+                <a:endParaRPr lang="en-US"/>
+              </a:p>
+            </p:txBody>
+          </p:sp>
+          <p:sp>
+            <p:nvSpPr>
+              <p:cNvPr id="18" name="Oval 17"/>
+              <p:cNvSpPr/>
+              <p:nvPr/>
+            </p:nvSpPr>
+            <p:spPr>
+              <a:xfrm>
+                <a:off x="6651870" y="6023914"/>
+                <a:ext cx="83127" cy="83127"/>
+              </a:xfrm>
+              <a:prstGeom prst="ellipse">
+                <a:avLst/>
+              </a:prstGeom>
               <a:solidFill>
                 <a:schemeClr val="tx1"/>
               </a:solidFill>
-            </a:ln>
-          </p:spPr>
-          <p:style>
-            <a:lnRef idx="2">
-              <a:schemeClr val="accent1">
-                <a:shade val="50000"/>
-              </a:schemeClr>
-            </a:lnRef>
-            <a:fillRef idx="1">
-              <a:schemeClr val="accent1"/>
-            </a:fillRef>
-            <a:effectRef idx="0">
-              <a:schemeClr val="accent1"/>
-            </a:effectRef>
-            <a:fontRef idx="minor">
-              <a:schemeClr val="lt1"/>
-            </a:fontRef>
-          </p:style>
-          <p:txBody>
-            <a:bodyPr rtlCol="0" anchor="ctr"/>
-            <a:lstStyle/>
-            <a:p>
-              <a:pPr algn="ctr"/>
-              <a:endParaRPr lang="en-US"/>
-            </a:p>
-          </p:txBody>
-        </p:sp>
-        <p:sp>
-          <p:nvSpPr>
-            <p:cNvPr id="13" name="Rectangle 12"/>
-            <p:cNvSpPr/>
-            <p:nvPr/>
-          </p:nvSpPr>
-          <p:spPr>
-            <a:xfrm>
-              <a:off x="6868291" y="5953991"/>
-              <a:ext cx="301443" cy="222972"/>
-            </a:xfrm>
-            <a:prstGeom prst="rect">
-              <a:avLst/>
-            </a:prstGeom>
-            <a:noFill/>
-            <a:ln>
+              <a:ln>
+                <a:solidFill>
+                  <a:schemeClr val="tx1"/>
+                </a:solidFill>
+              </a:ln>
+            </p:spPr>
+            <p:style>
+              <a:lnRef idx="2">
+                <a:schemeClr val="accent1">
+                  <a:shade val="50000"/>
+                </a:schemeClr>
+              </a:lnRef>
+              <a:fillRef idx="1">
+                <a:schemeClr val="accent1"/>
+              </a:fillRef>
+              <a:effectRef idx="0">
+                <a:schemeClr val="accent1"/>
+              </a:effectRef>
+              <a:fontRef idx="minor">
+                <a:schemeClr val="lt1"/>
+              </a:fontRef>
+            </p:style>
+            <p:txBody>
+              <a:bodyPr rtlCol="0" anchor="ctr"/>
+              <a:lstStyle/>
+              <a:p>
+                <a:pPr algn="ctr"/>
+                <a:endParaRPr lang="en-US"/>
+              </a:p>
+            </p:txBody>
+          </p:sp>
+          <p:sp>
+            <p:nvSpPr>
+              <p:cNvPr id="19" name="Oval 18"/>
+              <p:cNvSpPr/>
+              <p:nvPr/>
+            </p:nvSpPr>
+            <p:spPr>
+              <a:xfrm>
+                <a:off x="6971387" y="6023914"/>
+                <a:ext cx="83127" cy="83127"/>
+              </a:xfrm>
+              <a:prstGeom prst="ellipse">
+                <a:avLst/>
+              </a:prstGeom>
               <a:solidFill>
                 <a:schemeClr val="tx1"/>
               </a:solidFill>
-            </a:ln>
-          </p:spPr>
-          <p:style>
-            <a:lnRef idx="2">
-              <a:schemeClr val="accent1">
-                <a:shade val="50000"/>
-              </a:schemeClr>
-            </a:lnRef>
-            <a:fillRef idx="1">
-              <a:schemeClr val="accent1"/>
-            </a:fillRef>
-            <a:effectRef idx="0">
-              <a:schemeClr val="accent1"/>
-            </a:effectRef>
-            <a:fontRef idx="minor">
-              <a:schemeClr val="lt1"/>
-            </a:fontRef>
-          </p:style>
-          <p:txBody>
-            <a:bodyPr rtlCol="0" anchor="ctr"/>
-            <a:lstStyle/>
-            <a:p>
-              <a:pPr algn="ctr"/>
-              <a:endParaRPr lang="en-US"/>
-            </a:p>
-          </p:txBody>
-        </p:sp>
-        <p:sp>
-          <p:nvSpPr>
-            <p:cNvPr id="14" name="Oval 13"/>
-            <p:cNvSpPr/>
+              <a:ln>
+                <a:solidFill>
+                  <a:schemeClr val="tx1"/>
+                </a:solidFill>
+              </a:ln>
+            </p:spPr>
+            <p:style>
+              <a:lnRef idx="2">
+                <a:schemeClr val="accent1">
+                  <a:shade val="50000"/>
+                </a:schemeClr>
+              </a:lnRef>
+              <a:fillRef idx="1">
+                <a:schemeClr val="accent1"/>
+              </a:fillRef>
+              <a:effectRef idx="0">
+                <a:schemeClr val="accent1"/>
+              </a:effectRef>
+              <a:fontRef idx="minor">
+                <a:schemeClr val="lt1"/>
+              </a:fontRef>
+            </p:style>
+            <p:txBody>
+              <a:bodyPr rtlCol="0" anchor="ctr"/>
+              <a:lstStyle/>
+              <a:p>
+                <a:pPr algn="ctr"/>
+                <a:endParaRPr lang="en-US"/>
+              </a:p>
+            </p:txBody>
+          </p:sp>
+        </p:grpSp>
+        <p:grpSp>
+          <p:nvGrpSpPr>
+            <p:cNvPr id="21" name="Group 20"/>
+            <p:cNvGrpSpPr/>
             <p:nvPr/>
-          </p:nvSpPr>
-          <p:spPr>
+          </p:nvGrpSpPr>
+          <p:grpSpPr>
             <a:xfrm>
-              <a:off x="5446462" y="6023914"/>
-              <a:ext cx="83127" cy="83127"/>
+              <a:off x="5326965" y="6168737"/>
+              <a:ext cx="1839304" cy="222972"/>
+              <a:chOff x="5330430" y="5953991"/>
+              <a:chExt cx="1839304" cy="222972"/>
             </a:xfrm>
-            <a:prstGeom prst="ellipse">
-              <a:avLst/>
-            </a:prstGeom>
-            <a:solidFill>
-              <a:schemeClr val="tx1"/>
-            </a:solidFill>
-            <a:ln>
+          </p:grpSpPr>
+          <p:sp>
+            <p:nvSpPr>
+              <p:cNvPr id="22" name="Rectangle 21"/>
+              <p:cNvSpPr/>
+              <p:nvPr/>
+            </p:nvSpPr>
+            <p:spPr>
+              <a:xfrm>
+                <a:off x="5330430" y="5953991"/>
+                <a:ext cx="301443" cy="222972"/>
+              </a:xfrm>
+              <a:prstGeom prst="rect">
+                <a:avLst/>
+              </a:prstGeom>
+              <a:noFill/>
+              <a:ln>
+                <a:solidFill>
+                  <a:schemeClr val="tx1"/>
+                </a:solidFill>
+              </a:ln>
+            </p:spPr>
+            <p:style>
+              <a:lnRef idx="2">
+                <a:schemeClr val="accent1">
+                  <a:shade val="50000"/>
+                </a:schemeClr>
+              </a:lnRef>
+              <a:fillRef idx="1">
+                <a:schemeClr val="accent1"/>
+              </a:fillRef>
+              <a:effectRef idx="0">
+                <a:schemeClr val="accent1"/>
+              </a:effectRef>
+              <a:fontRef idx="minor">
+                <a:schemeClr val="lt1"/>
+              </a:fontRef>
+            </p:style>
+            <p:txBody>
+              <a:bodyPr rtlCol="0" anchor="ctr"/>
+              <a:lstStyle/>
+              <a:p>
+                <a:pPr algn="ctr"/>
+                <a:endParaRPr lang="en-US"/>
+              </a:p>
+            </p:txBody>
+          </p:sp>
+          <p:sp>
+            <p:nvSpPr>
+              <p:cNvPr id="23" name="Rectangle 22"/>
+              <p:cNvSpPr/>
+              <p:nvPr/>
+            </p:nvSpPr>
+            <p:spPr>
+              <a:xfrm>
+                <a:off x="5638695" y="5953991"/>
+                <a:ext cx="301443" cy="222972"/>
+              </a:xfrm>
+              <a:prstGeom prst="rect">
+                <a:avLst/>
+              </a:prstGeom>
+              <a:noFill/>
+              <a:ln>
+                <a:solidFill>
+                  <a:schemeClr val="tx1"/>
+                </a:solidFill>
+              </a:ln>
+            </p:spPr>
+            <p:style>
+              <a:lnRef idx="2">
+                <a:schemeClr val="accent1">
+                  <a:shade val="50000"/>
+                </a:schemeClr>
+              </a:lnRef>
+              <a:fillRef idx="1">
+                <a:schemeClr val="accent1"/>
+              </a:fillRef>
+              <a:effectRef idx="0">
+                <a:schemeClr val="accent1"/>
+              </a:effectRef>
+              <a:fontRef idx="minor">
+                <a:schemeClr val="lt1"/>
+              </a:fontRef>
+            </p:style>
+            <p:txBody>
+              <a:bodyPr rtlCol="0" anchor="ctr"/>
+              <a:lstStyle/>
+              <a:p>
+                <a:pPr algn="ctr"/>
+                <a:endParaRPr lang="en-US"/>
+              </a:p>
+            </p:txBody>
+          </p:sp>
+          <p:sp>
+            <p:nvSpPr>
+              <p:cNvPr id="24" name="Rectangle 23"/>
+              <p:cNvSpPr/>
+              <p:nvPr/>
+            </p:nvSpPr>
+            <p:spPr>
+              <a:xfrm>
+                <a:off x="5940034" y="5953991"/>
+                <a:ext cx="301443" cy="222972"/>
+              </a:xfrm>
+              <a:prstGeom prst="rect">
+                <a:avLst/>
+              </a:prstGeom>
+              <a:noFill/>
+              <a:ln>
+                <a:solidFill>
+                  <a:schemeClr val="tx1"/>
+                </a:solidFill>
+              </a:ln>
+            </p:spPr>
+            <p:style>
+              <a:lnRef idx="2">
+                <a:schemeClr val="accent1">
+                  <a:shade val="50000"/>
+                </a:schemeClr>
+              </a:lnRef>
+              <a:fillRef idx="1">
+                <a:schemeClr val="accent1"/>
+              </a:fillRef>
+              <a:effectRef idx="0">
+                <a:schemeClr val="accent1"/>
+              </a:effectRef>
+              <a:fontRef idx="minor">
+                <a:schemeClr val="lt1"/>
+              </a:fontRef>
+            </p:style>
+            <p:txBody>
+              <a:bodyPr rtlCol="0" anchor="ctr"/>
+              <a:lstStyle/>
+              <a:p>
+                <a:pPr algn="ctr"/>
+                <a:endParaRPr lang="en-US"/>
+              </a:p>
+            </p:txBody>
+          </p:sp>
+          <p:sp>
+            <p:nvSpPr>
+              <p:cNvPr id="25" name="Rectangle 24"/>
+              <p:cNvSpPr/>
+              <p:nvPr/>
+            </p:nvSpPr>
+            <p:spPr>
+              <a:xfrm>
+                <a:off x="6248299" y="5953991"/>
+                <a:ext cx="301443" cy="222972"/>
+              </a:xfrm>
+              <a:prstGeom prst="rect">
+                <a:avLst/>
+              </a:prstGeom>
+              <a:noFill/>
+              <a:ln>
+                <a:solidFill>
+                  <a:schemeClr val="tx1"/>
+                </a:solidFill>
+              </a:ln>
+            </p:spPr>
+            <p:style>
+              <a:lnRef idx="2">
+                <a:schemeClr val="accent1">
+                  <a:shade val="50000"/>
+                </a:schemeClr>
+              </a:lnRef>
+              <a:fillRef idx="1">
+                <a:schemeClr val="accent1"/>
+              </a:fillRef>
+              <a:effectRef idx="0">
+                <a:schemeClr val="accent1"/>
+              </a:effectRef>
+              <a:fontRef idx="minor">
+                <a:schemeClr val="lt1"/>
+              </a:fontRef>
+            </p:style>
+            <p:txBody>
+              <a:bodyPr rtlCol="0" anchor="ctr"/>
+              <a:lstStyle/>
+              <a:p>
+                <a:pPr algn="ctr"/>
+                <a:endParaRPr lang="en-US"/>
+              </a:p>
+            </p:txBody>
+          </p:sp>
+          <p:sp>
+            <p:nvSpPr>
+              <p:cNvPr id="26" name="Rectangle 25"/>
+              <p:cNvSpPr/>
+              <p:nvPr/>
+            </p:nvSpPr>
+            <p:spPr>
+              <a:xfrm>
+                <a:off x="6560026" y="5953991"/>
+                <a:ext cx="301443" cy="222972"/>
+              </a:xfrm>
+              <a:prstGeom prst="rect">
+                <a:avLst/>
+              </a:prstGeom>
+              <a:noFill/>
+              <a:ln>
+                <a:solidFill>
+                  <a:schemeClr val="tx1"/>
+                </a:solidFill>
+              </a:ln>
+            </p:spPr>
+            <p:style>
+              <a:lnRef idx="2">
+                <a:schemeClr val="accent1">
+                  <a:shade val="50000"/>
+                </a:schemeClr>
+              </a:lnRef>
+              <a:fillRef idx="1">
+                <a:schemeClr val="accent1"/>
+              </a:fillRef>
+              <a:effectRef idx="0">
+                <a:schemeClr val="accent1"/>
+              </a:effectRef>
+              <a:fontRef idx="minor">
+                <a:schemeClr val="lt1"/>
+              </a:fontRef>
+            </p:style>
+            <p:txBody>
+              <a:bodyPr rtlCol="0" anchor="ctr"/>
+              <a:lstStyle/>
+              <a:p>
+                <a:pPr algn="ctr"/>
+                <a:endParaRPr lang="en-US"/>
+              </a:p>
+            </p:txBody>
+          </p:sp>
+          <p:sp>
+            <p:nvSpPr>
+              <p:cNvPr id="27" name="Rectangle 26"/>
+              <p:cNvSpPr/>
+              <p:nvPr/>
+            </p:nvSpPr>
+            <p:spPr>
+              <a:xfrm>
+                <a:off x="6868291" y="5953991"/>
+                <a:ext cx="301443" cy="222972"/>
+              </a:xfrm>
+              <a:prstGeom prst="rect">
+                <a:avLst/>
+              </a:prstGeom>
+              <a:noFill/>
+              <a:ln>
+                <a:solidFill>
+                  <a:schemeClr val="tx1"/>
+                </a:solidFill>
+              </a:ln>
+            </p:spPr>
+            <p:style>
+              <a:lnRef idx="2">
+                <a:schemeClr val="accent1">
+                  <a:shade val="50000"/>
+                </a:schemeClr>
+              </a:lnRef>
+              <a:fillRef idx="1">
+                <a:schemeClr val="accent1"/>
+              </a:fillRef>
+              <a:effectRef idx="0">
+                <a:schemeClr val="accent1"/>
+              </a:effectRef>
+              <a:fontRef idx="minor">
+                <a:schemeClr val="lt1"/>
+              </a:fontRef>
+            </p:style>
+            <p:txBody>
+              <a:bodyPr rtlCol="0" anchor="ctr"/>
+              <a:lstStyle/>
+              <a:p>
+                <a:pPr algn="ctr"/>
+                <a:endParaRPr lang="en-US"/>
+              </a:p>
+            </p:txBody>
+          </p:sp>
+          <p:sp>
+            <p:nvSpPr>
+              <p:cNvPr id="28" name="Oval 27"/>
+              <p:cNvSpPr/>
+              <p:nvPr/>
+            </p:nvSpPr>
+            <p:spPr>
+              <a:xfrm>
+                <a:off x="5446462" y="6023914"/>
+                <a:ext cx="83127" cy="83127"/>
+              </a:xfrm>
+              <a:prstGeom prst="ellipse">
+                <a:avLst/>
+              </a:prstGeom>
               <a:solidFill>
                 <a:schemeClr val="tx1"/>
               </a:solidFill>
-            </a:ln>
-          </p:spPr>
-          <p:style>
-            <a:lnRef idx="2">
-              <a:schemeClr val="accent1">
-                <a:shade val="50000"/>
-              </a:schemeClr>
-            </a:lnRef>
-            <a:fillRef idx="1">
-              <a:schemeClr val="accent1"/>
-            </a:fillRef>
-            <a:effectRef idx="0">
-              <a:schemeClr val="accent1"/>
-            </a:effectRef>
-            <a:fontRef idx="minor">
-              <a:schemeClr val="lt1"/>
-            </a:fontRef>
-          </p:style>
-          <p:txBody>
-            <a:bodyPr rtlCol="0" anchor="ctr"/>
-            <a:lstStyle/>
-            <a:p>
-              <a:pPr algn="ctr"/>
-              <a:endParaRPr lang="en-US"/>
-            </a:p>
-          </p:txBody>
-        </p:sp>
-        <p:sp>
-          <p:nvSpPr>
-            <p:cNvPr id="15" name="Oval 14"/>
-            <p:cNvSpPr/>
-            <p:nvPr/>
-          </p:nvSpPr>
-          <p:spPr>
-            <a:xfrm>
-              <a:off x="5740979" y="6023914"/>
-              <a:ext cx="83127" cy="83127"/>
-            </a:xfrm>
-            <a:prstGeom prst="ellipse">
-              <a:avLst/>
-            </a:prstGeom>
-            <a:solidFill>
-              <a:schemeClr val="tx1"/>
-            </a:solidFill>
-            <a:ln>
+              <a:ln>
+                <a:solidFill>
+                  <a:schemeClr val="tx1"/>
+                </a:solidFill>
+              </a:ln>
+            </p:spPr>
+            <p:style>
+              <a:lnRef idx="2">
+                <a:schemeClr val="accent1">
+                  <a:shade val="50000"/>
+                </a:schemeClr>
+              </a:lnRef>
+              <a:fillRef idx="1">
+                <a:schemeClr val="accent1"/>
+              </a:fillRef>
+              <a:effectRef idx="0">
+                <a:schemeClr val="accent1"/>
+              </a:effectRef>
+              <a:fontRef idx="minor">
+                <a:schemeClr val="lt1"/>
+              </a:fontRef>
+            </p:style>
+            <p:txBody>
+              <a:bodyPr rtlCol="0" anchor="ctr"/>
+              <a:lstStyle/>
+              <a:p>
+                <a:pPr algn="ctr"/>
+                <a:endParaRPr lang="en-US"/>
+              </a:p>
+            </p:txBody>
+          </p:sp>
+          <p:sp>
+            <p:nvSpPr>
+              <p:cNvPr id="29" name="Oval 28"/>
+              <p:cNvSpPr/>
+              <p:nvPr/>
+            </p:nvSpPr>
+            <p:spPr>
+              <a:xfrm>
+                <a:off x="5740979" y="6023914"/>
+                <a:ext cx="83127" cy="83127"/>
+              </a:xfrm>
+              <a:prstGeom prst="ellipse">
+                <a:avLst/>
+              </a:prstGeom>
               <a:solidFill>
                 <a:schemeClr val="tx1"/>
               </a:solidFill>
-            </a:ln>
-          </p:spPr>
-          <p:style>
-            <a:lnRef idx="2">
-              <a:schemeClr val="accent1">
-                <a:shade val="50000"/>
-              </a:schemeClr>
-            </a:lnRef>
-            <a:fillRef idx="1">
-              <a:schemeClr val="accent1"/>
-            </a:fillRef>
-            <a:effectRef idx="0">
-              <a:schemeClr val="accent1"/>
-            </a:effectRef>
-            <a:fontRef idx="minor">
-              <a:schemeClr val="lt1"/>
-            </a:fontRef>
-          </p:style>
-          <p:txBody>
-            <a:bodyPr rtlCol="0" anchor="ctr"/>
-            <a:lstStyle/>
-            <a:p>
-              <a:pPr algn="ctr"/>
-              <a:endParaRPr lang="en-US"/>
-            </a:p>
-          </p:txBody>
-        </p:sp>
-        <p:sp>
-          <p:nvSpPr>
-            <p:cNvPr id="16" name="Oval 15"/>
-            <p:cNvSpPr/>
-            <p:nvPr/>
-          </p:nvSpPr>
-          <p:spPr>
-            <a:xfrm>
-              <a:off x="6059582" y="6023914"/>
-              <a:ext cx="83127" cy="83127"/>
-            </a:xfrm>
-            <a:prstGeom prst="ellipse">
-              <a:avLst/>
-            </a:prstGeom>
-            <a:solidFill>
-              <a:schemeClr val="tx1"/>
-            </a:solidFill>
-            <a:ln>
+              <a:ln>
+                <a:solidFill>
+                  <a:schemeClr val="tx1"/>
+                </a:solidFill>
+              </a:ln>
+            </p:spPr>
+            <p:style>
+              <a:lnRef idx="2">
+                <a:schemeClr val="accent1">
+                  <a:shade val="50000"/>
+                </a:schemeClr>
+              </a:lnRef>
+              <a:fillRef idx="1">
+                <a:schemeClr val="accent1"/>
+              </a:fillRef>
+              <a:effectRef idx="0">
+                <a:schemeClr val="accent1"/>
+              </a:effectRef>
+              <a:fontRef idx="minor">
+                <a:schemeClr val="lt1"/>
+              </a:fontRef>
+            </p:style>
+            <p:txBody>
+              <a:bodyPr rtlCol="0" anchor="ctr"/>
+              <a:lstStyle/>
+              <a:p>
+                <a:pPr algn="ctr"/>
+                <a:endParaRPr lang="en-US"/>
+              </a:p>
+            </p:txBody>
+          </p:sp>
+          <p:sp>
+            <p:nvSpPr>
+              <p:cNvPr id="30" name="Oval 29"/>
+              <p:cNvSpPr/>
+              <p:nvPr/>
+            </p:nvSpPr>
+            <p:spPr>
+              <a:xfrm>
+                <a:off x="6059582" y="6023914"/>
+                <a:ext cx="83127" cy="83127"/>
+              </a:xfrm>
+              <a:prstGeom prst="ellipse">
+                <a:avLst/>
+              </a:prstGeom>
               <a:solidFill>
                 <a:schemeClr val="tx1"/>
               </a:solidFill>
-            </a:ln>
-          </p:spPr>
-          <p:style>
-            <a:lnRef idx="2">
-              <a:schemeClr val="accent1">
-                <a:shade val="50000"/>
-              </a:schemeClr>
-            </a:lnRef>
-            <a:fillRef idx="1">
-              <a:schemeClr val="accent1"/>
-            </a:fillRef>
-            <a:effectRef idx="0">
-              <a:schemeClr val="accent1"/>
-            </a:effectRef>
-            <a:fontRef idx="minor">
-              <a:schemeClr val="lt1"/>
-            </a:fontRef>
-          </p:style>
-          <p:txBody>
-            <a:bodyPr rtlCol="0" anchor="ctr"/>
-            <a:lstStyle/>
-            <a:p>
-              <a:pPr algn="ctr"/>
-              <a:endParaRPr lang="en-US"/>
-            </a:p>
-          </p:txBody>
-        </p:sp>
-        <p:sp>
-          <p:nvSpPr>
-            <p:cNvPr id="17" name="Oval 16"/>
-            <p:cNvSpPr/>
-            <p:nvPr/>
-          </p:nvSpPr>
-          <p:spPr>
-            <a:xfrm>
-              <a:off x="6357456" y="6023914"/>
-              <a:ext cx="83127" cy="83127"/>
-            </a:xfrm>
-            <a:prstGeom prst="ellipse">
-              <a:avLst/>
-            </a:prstGeom>
-            <a:solidFill>
-              <a:schemeClr val="tx1"/>
-            </a:solidFill>
-            <a:ln>
+              <a:ln>
+                <a:solidFill>
+                  <a:schemeClr val="tx1"/>
+                </a:solidFill>
+              </a:ln>
+            </p:spPr>
+            <p:style>
+              <a:lnRef idx="2">
+                <a:schemeClr val="accent1">
+                  <a:shade val="50000"/>
+                </a:schemeClr>
+              </a:lnRef>
+              <a:fillRef idx="1">
+                <a:schemeClr val="accent1"/>
+              </a:fillRef>
+              <a:effectRef idx="0">
+                <a:schemeClr val="accent1"/>
+              </a:effectRef>
+              <a:fontRef idx="minor">
+                <a:schemeClr val="lt1"/>
+              </a:fontRef>
+            </p:style>
+            <p:txBody>
+              <a:bodyPr rtlCol="0" anchor="ctr"/>
+              <a:lstStyle/>
+              <a:p>
+                <a:pPr algn="ctr"/>
+                <a:endParaRPr lang="en-US"/>
+              </a:p>
+            </p:txBody>
+          </p:sp>
+          <p:sp>
+            <p:nvSpPr>
+              <p:cNvPr id="31" name="Oval 30"/>
+              <p:cNvSpPr/>
+              <p:nvPr/>
+            </p:nvSpPr>
+            <p:spPr>
+              <a:xfrm>
+                <a:off x="6357456" y="6023914"/>
+                <a:ext cx="83127" cy="83127"/>
+              </a:xfrm>
+              <a:prstGeom prst="ellipse">
+                <a:avLst/>
+              </a:prstGeom>
               <a:solidFill>
                 <a:schemeClr val="tx1"/>
               </a:solidFill>
-            </a:ln>
-          </p:spPr>
-          <p:style>
-            <a:lnRef idx="2">
-              <a:schemeClr val="accent1">
-                <a:shade val="50000"/>
-              </a:schemeClr>
-            </a:lnRef>
-            <a:fillRef idx="1">
-              <a:schemeClr val="accent1"/>
-            </a:fillRef>
-            <a:effectRef idx="0">
-              <a:schemeClr val="accent1"/>
-            </a:effectRef>
-            <a:fontRef idx="minor">
-              <a:schemeClr val="lt1"/>
-            </a:fontRef>
-          </p:style>
-          <p:txBody>
-            <a:bodyPr rtlCol="0" anchor="ctr"/>
-            <a:lstStyle/>
-            <a:p>
-              <a:pPr algn="ctr"/>
-              <a:endParaRPr lang="en-US"/>
-            </a:p>
-          </p:txBody>
-        </p:sp>
-        <p:sp>
-          <p:nvSpPr>
-            <p:cNvPr id="18" name="Oval 17"/>
-            <p:cNvSpPr/>
-            <p:nvPr/>
-          </p:nvSpPr>
-          <p:spPr>
-            <a:xfrm>
-              <a:off x="6651870" y="6023914"/>
-              <a:ext cx="83127" cy="83127"/>
-            </a:xfrm>
-            <a:prstGeom prst="ellipse">
-              <a:avLst/>
-            </a:prstGeom>
-            <a:solidFill>
-              <a:schemeClr val="tx1"/>
-            </a:solidFill>
-            <a:ln>
+              <a:ln>
+                <a:solidFill>
+                  <a:schemeClr val="tx1"/>
+                </a:solidFill>
+              </a:ln>
+            </p:spPr>
+            <p:style>
+              <a:lnRef idx="2">
+                <a:schemeClr val="accent1">
+                  <a:shade val="50000"/>
+                </a:schemeClr>
+              </a:lnRef>
+              <a:fillRef idx="1">
+                <a:schemeClr val="accent1"/>
+              </a:fillRef>
+              <a:effectRef idx="0">
+                <a:schemeClr val="accent1"/>
+              </a:effectRef>
+              <a:fontRef idx="minor">
+                <a:schemeClr val="lt1"/>
+              </a:fontRef>
+            </p:style>
+            <p:txBody>
+              <a:bodyPr rtlCol="0" anchor="ctr"/>
+              <a:lstStyle/>
+              <a:p>
+                <a:pPr algn="ctr"/>
+                <a:endParaRPr lang="en-US"/>
+              </a:p>
+            </p:txBody>
+          </p:sp>
+          <p:sp>
+            <p:nvSpPr>
+              <p:cNvPr id="32" name="Oval 31"/>
+              <p:cNvSpPr/>
+              <p:nvPr/>
+            </p:nvSpPr>
+            <p:spPr>
+              <a:xfrm>
+                <a:off x="6651870" y="6023914"/>
+                <a:ext cx="83127" cy="83127"/>
+              </a:xfrm>
+              <a:prstGeom prst="ellipse">
+                <a:avLst/>
+              </a:prstGeom>
               <a:solidFill>
                 <a:schemeClr val="tx1"/>
               </a:solidFill>
-            </a:ln>
-          </p:spPr>
-          <p:style>
-            <a:lnRef idx="2">
-              <a:schemeClr val="accent1">
-                <a:shade val="50000"/>
-              </a:schemeClr>
-            </a:lnRef>
-            <a:fillRef idx="1">
-              <a:schemeClr val="accent1"/>
-            </a:fillRef>
-            <a:effectRef idx="0">
-              <a:schemeClr val="accent1"/>
-            </a:effectRef>
-            <a:fontRef idx="minor">
-              <a:schemeClr val="lt1"/>
-            </a:fontRef>
-          </p:style>
-          <p:txBody>
-            <a:bodyPr rtlCol="0" anchor="ctr"/>
-            <a:lstStyle/>
-            <a:p>
-              <a:pPr algn="ctr"/>
-              <a:endParaRPr lang="en-US"/>
-            </a:p>
-          </p:txBody>
-        </p:sp>
-        <p:sp>
-          <p:nvSpPr>
-            <p:cNvPr id="19" name="Oval 18"/>
-            <p:cNvSpPr/>
-            <p:nvPr/>
-          </p:nvSpPr>
-          <p:spPr>
-            <a:xfrm>
-              <a:off x="6971387" y="6023914"/>
-              <a:ext cx="83127" cy="83127"/>
-            </a:xfrm>
-            <a:prstGeom prst="ellipse">
-              <a:avLst/>
-            </a:prstGeom>
-            <a:solidFill>
-              <a:schemeClr val="tx1"/>
-            </a:solidFill>
-            <a:ln>
+              <a:ln>
+                <a:solidFill>
+                  <a:schemeClr val="tx1"/>
+                </a:solidFill>
+              </a:ln>
+            </p:spPr>
+            <p:style>
+              <a:lnRef idx="2">
+                <a:schemeClr val="accent1">
+                  <a:shade val="50000"/>
+                </a:schemeClr>
+              </a:lnRef>
+              <a:fillRef idx="1">
+                <a:schemeClr val="accent1"/>
+              </a:fillRef>
+              <a:effectRef idx="0">
+                <a:schemeClr val="accent1"/>
+              </a:effectRef>
+              <a:fontRef idx="minor">
+                <a:schemeClr val="lt1"/>
+              </a:fontRef>
+            </p:style>
+            <p:txBody>
+              <a:bodyPr rtlCol="0" anchor="ctr"/>
+              <a:lstStyle/>
+              <a:p>
+                <a:pPr algn="ctr"/>
+                <a:endParaRPr lang="en-US"/>
+              </a:p>
+            </p:txBody>
+          </p:sp>
+          <p:sp>
+            <p:nvSpPr>
+              <p:cNvPr id="33" name="Oval 32"/>
+              <p:cNvSpPr/>
+              <p:nvPr/>
+            </p:nvSpPr>
+            <p:spPr>
+              <a:xfrm>
+                <a:off x="6971387" y="6023914"/>
+                <a:ext cx="83127" cy="83127"/>
+              </a:xfrm>
+              <a:prstGeom prst="ellipse">
+                <a:avLst/>
+              </a:prstGeom>
               <a:solidFill>
                 <a:schemeClr val="tx1"/>
               </a:solidFill>
-            </a:ln>
-          </p:spPr>
-          <p:style>
-            <a:lnRef idx="2">
-              <a:schemeClr val="accent1">
-                <a:shade val="50000"/>
-              </a:schemeClr>
-            </a:lnRef>
-            <a:fillRef idx="1">
-              <a:schemeClr val="accent1"/>
-            </a:fillRef>
-            <a:effectRef idx="0">
-              <a:schemeClr val="accent1"/>
-            </a:effectRef>
-            <a:fontRef idx="minor">
-              <a:schemeClr val="lt1"/>
-            </a:fontRef>
-          </p:style>
-          <p:txBody>
-            <a:bodyPr rtlCol="0" anchor="ctr"/>
-            <a:lstStyle/>
-            <a:p>
-              <a:pPr algn="ctr"/>
-              <a:endParaRPr lang="en-US"/>
-            </a:p>
-          </p:txBody>
-        </p:sp>
+              <a:ln>
+                <a:solidFill>
+                  <a:schemeClr val="tx1"/>
+                </a:solidFill>
+              </a:ln>
+            </p:spPr>
+            <p:style>
+              <a:lnRef idx="2">
+                <a:schemeClr val="accent1">
+                  <a:shade val="50000"/>
+                </a:schemeClr>
+              </a:lnRef>
+              <a:fillRef idx="1">
+                <a:schemeClr val="accent1"/>
+              </a:fillRef>
+              <a:effectRef idx="0">
+                <a:schemeClr val="accent1"/>
+              </a:effectRef>
+              <a:fontRef idx="minor">
+                <a:schemeClr val="lt1"/>
+              </a:fontRef>
+            </p:style>
+            <p:txBody>
+              <a:bodyPr rtlCol="0" anchor="ctr"/>
+              <a:lstStyle/>
+              <a:p>
+                <a:pPr algn="ctr"/>
+                <a:endParaRPr lang="en-US"/>
+              </a:p>
+            </p:txBody>
+          </p:sp>
+        </p:grpSp>
+        <p:grpSp>
+          <p:nvGrpSpPr>
+            <p:cNvPr id="34" name="Group 33"/>
+            <p:cNvGrpSpPr/>
+            <p:nvPr/>
+          </p:nvGrpSpPr>
+          <p:grpSpPr>
+            <a:xfrm>
+              <a:off x="5344282" y="6393874"/>
+              <a:ext cx="1839304" cy="222972"/>
+              <a:chOff x="5330430" y="5953991"/>
+              <a:chExt cx="1839304" cy="222972"/>
+            </a:xfrm>
+          </p:grpSpPr>
+          <p:sp>
+            <p:nvSpPr>
+              <p:cNvPr id="35" name="Rectangle 34"/>
+              <p:cNvSpPr/>
+              <p:nvPr/>
+            </p:nvSpPr>
+            <p:spPr>
+              <a:xfrm>
+                <a:off x="5330430" y="5953991"/>
+                <a:ext cx="301443" cy="222972"/>
+              </a:xfrm>
+              <a:prstGeom prst="rect">
+                <a:avLst/>
+              </a:prstGeom>
+              <a:noFill/>
+              <a:ln>
+                <a:solidFill>
+                  <a:schemeClr val="tx1"/>
+                </a:solidFill>
+              </a:ln>
+            </p:spPr>
+            <p:style>
+              <a:lnRef idx="2">
+                <a:schemeClr val="accent1">
+                  <a:shade val="50000"/>
+                </a:schemeClr>
+              </a:lnRef>
+              <a:fillRef idx="1">
+                <a:schemeClr val="accent1"/>
+              </a:fillRef>
+              <a:effectRef idx="0">
+                <a:schemeClr val="accent1"/>
+              </a:effectRef>
+              <a:fontRef idx="minor">
+                <a:schemeClr val="lt1"/>
+              </a:fontRef>
+            </p:style>
+            <p:txBody>
+              <a:bodyPr rtlCol="0" anchor="ctr"/>
+              <a:lstStyle/>
+              <a:p>
+                <a:pPr algn="ctr"/>
+                <a:endParaRPr lang="en-US"/>
+              </a:p>
+            </p:txBody>
+          </p:sp>
+          <p:sp>
+            <p:nvSpPr>
+              <p:cNvPr id="36" name="Rectangle 35"/>
+              <p:cNvSpPr/>
+              <p:nvPr/>
+            </p:nvSpPr>
+            <p:spPr>
+              <a:xfrm>
+                <a:off x="5638695" y="5953991"/>
+                <a:ext cx="301443" cy="222972"/>
+              </a:xfrm>
+              <a:prstGeom prst="rect">
+                <a:avLst/>
+              </a:prstGeom>
+              <a:noFill/>
+              <a:ln>
+                <a:solidFill>
+                  <a:schemeClr val="tx1"/>
+                </a:solidFill>
+              </a:ln>
+            </p:spPr>
+            <p:style>
+              <a:lnRef idx="2">
+                <a:schemeClr val="accent1">
+                  <a:shade val="50000"/>
+                </a:schemeClr>
+              </a:lnRef>
+              <a:fillRef idx="1">
+                <a:schemeClr val="accent1"/>
+              </a:fillRef>
+              <a:effectRef idx="0">
+                <a:schemeClr val="accent1"/>
+              </a:effectRef>
+              <a:fontRef idx="minor">
+                <a:schemeClr val="lt1"/>
+              </a:fontRef>
+            </p:style>
+            <p:txBody>
+              <a:bodyPr rtlCol="0" anchor="ctr"/>
+              <a:lstStyle/>
+              <a:p>
+                <a:pPr algn="ctr"/>
+                <a:endParaRPr lang="en-US"/>
+              </a:p>
+            </p:txBody>
+          </p:sp>
+          <p:sp>
+            <p:nvSpPr>
+              <p:cNvPr id="37" name="Rectangle 36"/>
+              <p:cNvSpPr/>
+              <p:nvPr/>
+            </p:nvSpPr>
+            <p:spPr>
+              <a:xfrm>
+                <a:off x="5940034" y="5953991"/>
+                <a:ext cx="301443" cy="222972"/>
+              </a:xfrm>
+              <a:prstGeom prst="rect">
+                <a:avLst/>
+              </a:prstGeom>
+              <a:noFill/>
+              <a:ln>
+                <a:solidFill>
+                  <a:schemeClr val="tx1"/>
+                </a:solidFill>
+              </a:ln>
+            </p:spPr>
+            <p:style>
+              <a:lnRef idx="2">
+                <a:schemeClr val="accent1">
+                  <a:shade val="50000"/>
+                </a:schemeClr>
+              </a:lnRef>
+              <a:fillRef idx="1">
+                <a:schemeClr val="accent1"/>
+              </a:fillRef>
+              <a:effectRef idx="0">
+                <a:schemeClr val="accent1"/>
+              </a:effectRef>
+              <a:fontRef idx="minor">
+                <a:schemeClr val="lt1"/>
+              </a:fontRef>
+            </p:style>
+            <p:txBody>
+              <a:bodyPr rtlCol="0" anchor="ctr"/>
+              <a:lstStyle/>
+              <a:p>
+                <a:pPr algn="ctr"/>
+                <a:endParaRPr lang="en-US"/>
+              </a:p>
+            </p:txBody>
+          </p:sp>
+          <p:sp>
+            <p:nvSpPr>
+              <p:cNvPr id="38" name="Rectangle 37"/>
+              <p:cNvSpPr/>
+              <p:nvPr/>
+            </p:nvSpPr>
+            <p:spPr>
+              <a:xfrm>
+                <a:off x="6248299" y="5953991"/>
+                <a:ext cx="301443" cy="222972"/>
+              </a:xfrm>
+              <a:prstGeom prst="rect">
+                <a:avLst/>
+              </a:prstGeom>
+              <a:noFill/>
+              <a:ln>
+                <a:solidFill>
+                  <a:schemeClr val="tx1"/>
+                </a:solidFill>
+              </a:ln>
+            </p:spPr>
+            <p:style>
+              <a:lnRef idx="2">
+                <a:schemeClr val="accent1">
+                  <a:shade val="50000"/>
+                </a:schemeClr>
+              </a:lnRef>
+              <a:fillRef idx="1">
+                <a:schemeClr val="accent1"/>
+              </a:fillRef>
+              <a:effectRef idx="0">
+                <a:schemeClr val="accent1"/>
+              </a:effectRef>
+              <a:fontRef idx="minor">
+                <a:schemeClr val="lt1"/>
+              </a:fontRef>
+            </p:style>
+            <p:txBody>
+              <a:bodyPr rtlCol="0" anchor="ctr"/>
+              <a:lstStyle/>
+              <a:p>
+                <a:pPr algn="ctr"/>
+                <a:endParaRPr lang="en-US"/>
+              </a:p>
+            </p:txBody>
+          </p:sp>
+          <p:sp>
+            <p:nvSpPr>
+              <p:cNvPr id="39" name="Rectangle 38"/>
+              <p:cNvSpPr/>
+              <p:nvPr/>
+            </p:nvSpPr>
+            <p:spPr>
+              <a:xfrm>
+                <a:off x="6560026" y="5953991"/>
+                <a:ext cx="301443" cy="222972"/>
+              </a:xfrm>
+              <a:prstGeom prst="rect">
+                <a:avLst/>
+              </a:prstGeom>
+              <a:noFill/>
+              <a:ln>
+                <a:solidFill>
+                  <a:schemeClr val="tx1"/>
+                </a:solidFill>
+              </a:ln>
+            </p:spPr>
+            <p:style>
+              <a:lnRef idx="2">
+                <a:schemeClr val="accent1">
+                  <a:shade val="50000"/>
+                </a:schemeClr>
+              </a:lnRef>
+              <a:fillRef idx="1">
+                <a:schemeClr val="accent1"/>
+              </a:fillRef>
+              <a:effectRef idx="0">
+                <a:schemeClr val="accent1"/>
+              </a:effectRef>
+              <a:fontRef idx="minor">
+                <a:schemeClr val="lt1"/>
+              </a:fontRef>
+            </p:style>
+            <p:txBody>
+              <a:bodyPr rtlCol="0" anchor="ctr"/>
+              <a:lstStyle/>
+              <a:p>
+                <a:pPr algn="ctr"/>
+                <a:endParaRPr lang="en-US"/>
+              </a:p>
+            </p:txBody>
+          </p:sp>
+          <p:sp>
+            <p:nvSpPr>
+              <p:cNvPr id="40" name="Rectangle 39"/>
+              <p:cNvSpPr/>
+              <p:nvPr/>
+            </p:nvSpPr>
+            <p:spPr>
+              <a:xfrm>
+                <a:off x="6868291" y="5953991"/>
+                <a:ext cx="301443" cy="222972"/>
+              </a:xfrm>
+              <a:prstGeom prst="rect">
+                <a:avLst/>
+              </a:prstGeom>
+              <a:noFill/>
+              <a:ln>
+                <a:solidFill>
+                  <a:schemeClr val="tx1"/>
+                </a:solidFill>
+              </a:ln>
+            </p:spPr>
+            <p:style>
+              <a:lnRef idx="2">
+                <a:schemeClr val="accent1">
+                  <a:shade val="50000"/>
+                </a:schemeClr>
+              </a:lnRef>
+              <a:fillRef idx="1">
+                <a:schemeClr val="accent1"/>
+              </a:fillRef>
+              <a:effectRef idx="0">
+                <a:schemeClr val="accent1"/>
+              </a:effectRef>
+              <a:fontRef idx="minor">
+                <a:schemeClr val="lt1"/>
+              </a:fontRef>
+            </p:style>
+            <p:txBody>
+              <a:bodyPr rtlCol="0" anchor="ctr"/>
+              <a:lstStyle/>
+              <a:p>
+                <a:pPr algn="ctr"/>
+                <a:endParaRPr lang="en-US"/>
+              </a:p>
+            </p:txBody>
+          </p:sp>
+          <p:sp>
+            <p:nvSpPr>
+              <p:cNvPr id="41" name="Oval 40"/>
+              <p:cNvSpPr/>
+              <p:nvPr/>
+            </p:nvSpPr>
+            <p:spPr>
+              <a:xfrm>
+                <a:off x="5446462" y="6023914"/>
+                <a:ext cx="83127" cy="83127"/>
+              </a:xfrm>
+              <a:prstGeom prst="ellipse">
+                <a:avLst/>
+              </a:prstGeom>
+              <a:solidFill>
+                <a:schemeClr val="tx1"/>
+              </a:solidFill>
+              <a:ln>
+                <a:solidFill>
+                  <a:schemeClr val="tx1"/>
+                </a:solidFill>
+              </a:ln>
+            </p:spPr>
+            <p:style>
+              <a:lnRef idx="2">
+                <a:schemeClr val="accent1">
+                  <a:shade val="50000"/>
+                </a:schemeClr>
+              </a:lnRef>
+              <a:fillRef idx="1">
+                <a:schemeClr val="accent1"/>
+              </a:fillRef>
+              <a:effectRef idx="0">
+                <a:schemeClr val="accent1"/>
+              </a:effectRef>
+              <a:fontRef idx="minor">
+                <a:schemeClr val="lt1"/>
+              </a:fontRef>
+            </p:style>
+            <p:txBody>
+              <a:bodyPr rtlCol="0" anchor="ctr"/>
+              <a:lstStyle/>
+              <a:p>
+                <a:pPr algn="ctr"/>
+                <a:endParaRPr lang="en-US"/>
+              </a:p>
+            </p:txBody>
+          </p:sp>
+          <p:sp>
+            <p:nvSpPr>
+              <p:cNvPr id="42" name="Oval 41"/>
+              <p:cNvSpPr/>
+              <p:nvPr/>
+            </p:nvSpPr>
+            <p:spPr>
+              <a:xfrm>
+                <a:off x="5740979" y="6023914"/>
+                <a:ext cx="83127" cy="83127"/>
+              </a:xfrm>
+              <a:prstGeom prst="ellipse">
+                <a:avLst/>
+              </a:prstGeom>
+              <a:solidFill>
+                <a:schemeClr val="tx1"/>
+              </a:solidFill>
+              <a:ln>
+                <a:solidFill>
+                  <a:schemeClr val="tx1"/>
+                </a:solidFill>
+              </a:ln>
+            </p:spPr>
+            <p:style>
+              <a:lnRef idx="2">
+                <a:schemeClr val="accent1">
+                  <a:shade val="50000"/>
+                </a:schemeClr>
+              </a:lnRef>
+              <a:fillRef idx="1">
+                <a:schemeClr val="accent1"/>
+              </a:fillRef>
+              <a:effectRef idx="0">
+                <a:schemeClr val="accent1"/>
+              </a:effectRef>
+              <a:fontRef idx="minor">
+                <a:schemeClr val="lt1"/>
+              </a:fontRef>
+            </p:style>
+            <p:txBody>
+              <a:bodyPr rtlCol="0" anchor="ctr"/>
+              <a:lstStyle/>
+              <a:p>
+                <a:pPr algn="ctr"/>
+                <a:endParaRPr lang="en-US"/>
+              </a:p>
+            </p:txBody>
+          </p:sp>
+          <p:sp>
+            <p:nvSpPr>
+              <p:cNvPr id="43" name="Oval 42"/>
+              <p:cNvSpPr/>
+              <p:nvPr/>
+            </p:nvSpPr>
+            <p:spPr>
+              <a:xfrm>
+                <a:off x="6059582" y="6023914"/>
+                <a:ext cx="83127" cy="83127"/>
+              </a:xfrm>
+              <a:prstGeom prst="ellipse">
+                <a:avLst/>
+              </a:prstGeom>
+              <a:solidFill>
+                <a:schemeClr val="tx1"/>
+              </a:solidFill>
+              <a:ln>
+                <a:solidFill>
+                  <a:schemeClr val="tx1"/>
+                </a:solidFill>
+              </a:ln>
+            </p:spPr>
+            <p:style>
+              <a:lnRef idx="2">
+                <a:schemeClr val="accent1">
+                  <a:shade val="50000"/>
+                </a:schemeClr>
+              </a:lnRef>
+              <a:fillRef idx="1">
+                <a:schemeClr val="accent1"/>
+              </a:fillRef>
+              <a:effectRef idx="0">
+                <a:schemeClr val="accent1"/>
+              </a:effectRef>
+              <a:fontRef idx="minor">
+                <a:schemeClr val="lt1"/>
+              </a:fontRef>
+            </p:style>
+            <p:txBody>
+              <a:bodyPr rtlCol="0" anchor="ctr"/>
+              <a:lstStyle/>
+              <a:p>
+                <a:pPr algn="ctr"/>
+                <a:endParaRPr lang="en-US"/>
+              </a:p>
+            </p:txBody>
+          </p:sp>
+          <p:sp>
+            <p:nvSpPr>
+              <p:cNvPr id="44" name="Oval 43"/>
+              <p:cNvSpPr/>
+              <p:nvPr/>
+            </p:nvSpPr>
+            <p:spPr>
+              <a:xfrm>
+                <a:off x="6357456" y="6023914"/>
+                <a:ext cx="83127" cy="83127"/>
+              </a:xfrm>
+              <a:prstGeom prst="ellipse">
+                <a:avLst/>
+              </a:prstGeom>
+              <a:solidFill>
+                <a:schemeClr val="tx1"/>
+              </a:solidFill>
+              <a:ln>
+                <a:solidFill>
+                  <a:schemeClr val="tx1"/>
+                </a:solidFill>
+              </a:ln>
+            </p:spPr>
+            <p:style>
+              <a:lnRef idx="2">
+                <a:schemeClr val="accent1">
+                  <a:shade val="50000"/>
+                </a:schemeClr>
+              </a:lnRef>
+              <a:fillRef idx="1">
+                <a:schemeClr val="accent1"/>
+              </a:fillRef>
+              <a:effectRef idx="0">
+                <a:schemeClr val="accent1"/>
+              </a:effectRef>
+              <a:fontRef idx="minor">
+                <a:schemeClr val="lt1"/>
+              </a:fontRef>
+            </p:style>
+            <p:txBody>
+              <a:bodyPr rtlCol="0" anchor="ctr"/>
+              <a:lstStyle/>
+              <a:p>
+                <a:pPr algn="ctr"/>
+                <a:endParaRPr lang="en-US"/>
+              </a:p>
+            </p:txBody>
+          </p:sp>
+          <p:sp>
+            <p:nvSpPr>
+              <p:cNvPr id="45" name="Oval 44"/>
+              <p:cNvSpPr/>
+              <p:nvPr/>
+            </p:nvSpPr>
+            <p:spPr>
+              <a:xfrm>
+                <a:off x="6651870" y="6023914"/>
+                <a:ext cx="83127" cy="83127"/>
+              </a:xfrm>
+              <a:prstGeom prst="ellipse">
+                <a:avLst/>
+              </a:prstGeom>
+              <a:solidFill>
+                <a:schemeClr val="tx1"/>
+              </a:solidFill>
+              <a:ln>
+                <a:solidFill>
+                  <a:schemeClr val="tx1"/>
+                </a:solidFill>
+              </a:ln>
+            </p:spPr>
+            <p:style>
+              <a:lnRef idx="2">
+                <a:schemeClr val="accent1">
+                  <a:shade val="50000"/>
+                </a:schemeClr>
+              </a:lnRef>
+              <a:fillRef idx="1">
+                <a:schemeClr val="accent1"/>
+              </a:fillRef>
+              <a:effectRef idx="0">
+                <a:schemeClr val="accent1"/>
+              </a:effectRef>
+              <a:fontRef idx="minor">
+                <a:schemeClr val="lt1"/>
+              </a:fontRef>
+            </p:style>
+            <p:txBody>
+              <a:bodyPr rtlCol="0" anchor="ctr"/>
+              <a:lstStyle/>
+              <a:p>
+                <a:pPr algn="ctr"/>
+                <a:endParaRPr lang="en-US"/>
+              </a:p>
+            </p:txBody>
+          </p:sp>
+          <p:sp>
+            <p:nvSpPr>
+              <p:cNvPr id="46" name="Oval 45"/>
+              <p:cNvSpPr/>
+              <p:nvPr/>
+            </p:nvSpPr>
+            <p:spPr>
+              <a:xfrm>
+                <a:off x="6971387" y="6023914"/>
+                <a:ext cx="83127" cy="83127"/>
+              </a:xfrm>
+              <a:prstGeom prst="ellipse">
+                <a:avLst/>
+              </a:prstGeom>
+              <a:solidFill>
+                <a:schemeClr val="tx1"/>
+              </a:solidFill>
+              <a:ln>
+                <a:solidFill>
+                  <a:schemeClr val="tx1"/>
+                </a:solidFill>
+              </a:ln>
+            </p:spPr>
+            <p:style>
+              <a:lnRef idx="2">
+                <a:schemeClr val="accent1">
+                  <a:shade val="50000"/>
+                </a:schemeClr>
+              </a:lnRef>
+              <a:fillRef idx="1">
+                <a:schemeClr val="accent1"/>
+              </a:fillRef>
+              <a:effectRef idx="0">
+                <a:schemeClr val="accent1"/>
+              </a:effectRef>
+              <a:fontRef idx="minor">
+                <a:schemeClr val="lt1"/>
+              </a:fontRef>
+            </p:style>
+            <p:txBody>
+              <a:bodyPr rtlCol="0" anchor="ctr"/>
+              <a:lstStyle/>
+              <a:p>
+                <a:pPr algn="ctr"/>
+                <a:endParaRPr lang="en-US"/>
+              </a:p>
+            </p:txBody>
+          </p:sp>
+        </p:grpSp>
       </p:grpSp>
     </p:spTree>
     <p:extLst>

</xml_diff>

<commit_message>
Added lside on priority queue; fixed typo on queue slide
</commit_message>
<xml_diff>
--- a/DataStructures/data_structures.pptx
+++ b/DataStructures/data_structures.pptx
@@ -5,7 +5,7 @@
     <p:sldMasterId id="2147483660" r:id="rId1"/>
   </p:sldMasterIdLst>
   <p:notesMasterIdLst>
-    <p:notesMasterId r:id="rId37"/>
+    <p:notesMasterId r:id="rId39"/>
   </p:notesMasterIdLst>
   <p:sldIdLst>
     <p:sldId id="256" r:id="rId2"/>
@@ -39,10 +39,12 @@
     <p:sldId id="284" r:id="rId30"/>
     <p:sldId id="283" r:id="rId31"/>
     <p:sldId id="285" r:id="rId32"/>
-    <p:sldId id="286" r:id="rId33"/>
-    <p:sldId id="287" r:id="rId34"/>
-    <p:sldId id="289" r:id="rId35"/>
-    <p:sldId id="288" r:id="rId36"/>
+    <p:sldId id="292" r:id="rId33"/>
+    <p:sldId id="293" r:id="rId34"/>
+    <p:sldId id="286" r:id="rId35"/>
+    <p:sldId id="287" r:id="rId36"/>
+    <p:sldId id="289" r:id="rId37"/>
+    <p:sldId id="288" r:id="rId38"/>
   </p:sldIdLst>
   <p:sldSz cx="9144000" cy="6858000" type="screen4x3"/>
   <p:notesSz cx="6858000" cy="9144000"/>
@@ -231,7 +233,7 @@
           <a:p>
             <a:fld id="{D3AF4CC3-573B-48A2-BA19-C88E9EEB8008}" type="datetimeFigureOut">
               <a:rPr lang="en-US" smtClean="0"/>
-              <a:t>2016-09-27</a:t>
+              <a:t>2016-09-30</a:t>
             </a:fld>
             <a:endParaRPr lang="en-US"/>
           </a:p>
@@ -798,7 +800,7 @@
           <a:p>
             <a:fld id="{E7395A51-B5B5-44D7-85E1-1556CCB9180F}" type="datetime1">
               <a:rPr lang="en-US" smtClean="0"/>
-              <a:t>2016-09-27</a:t>
+              <a:t>2016-09-30</a:t>
             </a:fld>
             <a:endParaRPr lang="en-US"/>
           </a:p>
@@ -968,7 +970,7 @@
           <a:p>
             <a:fld id="{BEDB066D-DA80-4992-B507-A911EFD1878C}" type="datetime1">
               <a:rPr lang="en-US" smtClean="0"/>
-              <a:t>2016-09-27</a:t>
+              <a:t>2016-09-30</a:t>
             </a:fld>
             <a:endParaRPr lang="en-US"/>
           </a:p>
@@ -1148,7 +1150,7 @@
           <a:p>
             <a:fld id="{21259CBD-682A-4ABE-AFE9-CACFF55FE875}" type="datetime1">
               <a:rPr lang="en-US" smtClean="0"/>
-              <a:t>2016-09-27</a:t>
+              <a:t>2016-09-30</a:t>
             </a:fld>
             <a:endParaRPr lang="en-US"/>
           </a:p>
@@ -1318,7 +1320,7 @@
           <a:p>
             <a:fld id="{5F76F78E-A200-421E-B0AA-A6018E81E55E}" type="datetime1">
               <a:rPr lang="en-US" smtClean="0"/>
-              <a:t>2016-09-27</a:t>
+              <a:t>2016-09-30</a:t>
             </a:fld>
             <a:endParaRPr lang="en-US"/>
           </a:p>
@@ -1562,7 +1564,7 @@
           <a:p>
             <a:fld id="{EBEC21EE-ED62-44E3-A586-FF0104F19B99}" type="datetime1">
               <a:rPr lang="en-US" smtClean="0"/>
-              <a:t>2016-09-27</a:t>
+              <a:t>2016-09-30</a:t>
             </a:fld>
             <a:endParaRPr lang="en-US"/>
           </a:p>
@@ -1794,7 +1796,7 @@
           <a:p>
             <a:fld id="{30049BC0-4C66-4CED-BC8E-7AF0BD49C9B5}" type="datetime1">
               <a:rPr lang="en-US" smtClean="0"/>
-              <a:t>2016-09-27</a:t>
+              <a:t>2016-09-30</a:t>
             </a:fld>
             <a:endParaRPr lang="en-US"/>
           </a:p>
@@ -2161,7 +2163,7 @@
           <a:p>
             <a:fld id="{C7C90E0A-53F1-4115-8AB2-2E28E481FF48}" type="datetime1">
               <a:rPr lang="en-US" smtClean="0"/>
-              <a:t>2016-09-27</a:t>
+              <a:t>2016-09-30</a:t>
             </a:fld>
             <a:endParaRPr lang="en-US"/>
           </a:p>
@@ -2279,7 +2281,7 @@
           <a:p>
             <a:fld id="{AF79CAB3-789B-4117-A859-FC7082686441}" type="datetime1">
               <a:rPr lang="en-US" smtClean="0"/>
-              <a:t>2016-09-27</a:t>
+              <a:t>2016-09-30</a:t>
             </a:fld>
             <a:endParaRPr lang="en-US"/>
           </a:p>
@@ -2374,7 +2376,7 @@
           <a:p>
             <a:fld id="{82AE2AC5-51ED-46C8-8F1B-788630EE802E}" type="datetime1">
               <a:rPr lang="en-US" smtClean="0"/>
-              <a:t>2016-09-27</a:t>
+              <a:t>2016-09-30</a:t>
             </a:fld>
             <a:endParaRPr lang="en-US"/>
           </a:p>
@@ -2651,7 +2653,7 @@
           <a:p>
             <a:fld id="{49D0F6DD-6796-44CA-AF4C-1B2A2288F444}" type="datetime1">
               <a:rPr lang="en-US" smtClean="0"/>
-              <a:t>2016-09-27</a:t>
+              <a:t>2016-09-30</a:t>
             </a:fld>
             <a:endParaRPr lang="en-US"/>
           </a:p>
@@ -2908,7 +2910,7 @@
           <a:p>
             <a:fld id="{57F6808E-F05D-421A-97B7-12B728993E3B}" type="datetime1">
               <a:rPr lang="en-US" smtClean="0"/>
-              <a:t>2016-09-27</a:t>
+              <a:t>2016-09-30</a:t>
             </a:fld>
             <a:endParaRPr lang="en-US"/>
           </a:p>
@@ -3121,7 +3123,7 @@
           <a:p>
             <a:fld id="{7B995810-2FB7-4DE8-B622-97729F9C53CB}" type="datetime1">
               <a:rPr lang="en-US" smtClean="0"/>
-              <a:t>2016-09-27</a:t>
+              <a:t>2016-09-30</a:t>
             </a:fld>
             <a:endParaRPr lang="en-US"/>
           </a:p>
@@ -4712,7 +4714,7 @@
             <a:graphicData uri="http://schemas.openxmlformats.org/presentationml/2006/ole">
               <mc:AlternateContent xmlns:mc="http://schemas.openxmlformats.org/markup-compatibility/2006">
                 <mc:Choice xmlns:v="urn:schemas-microsoft-com:vml" Requires="v">
-                  <p:oleObj spid="_x0000_s3128" name="Equation" r:id="rId3" imgW="1180800" imgH="228600" progId="Equation.3">
+                  <p:oleObj spid="_x0000_s3131" name="Equation" r:id="rId3" imgW="1180800" imgH="228600" progId="Equation.3">
                     <p:embed/>
                   </p:oleObj>
                 </mc:Choice>
@@ -6796,7 +6798,7 @@
             <a:graphicData uri="http://schemas.openxmlformats.org/presentationml/2006/ole">
               <mc:AlternateContent xmlns:mc="http://schemas.openxmlformats.org/markup-compatibility/2006">
                 <mc:Choice xmlns:v="urn:schemas-microsoft-com:vml" Requires="v">
-                  <p:oleObj spid="_x0000_s4145" name="Equation" r:id="rId3" imgW="419040" imgH="241200" progId="Equation.3">
+                  <p:oleObj spid="_x0000_s4148" name="Equation" r:id="rId3" imgW="419040" imgH="241200" progId="Equation.3">
                     <p:embed/>
                   </p:oleObj>
                 </mc:Choice>
@@ -9940,7 +9942,7 @@
             <a:graphicData uri="http://schemas.openxmlformats.org/presentationml/2006/ole">
               <mc:AlternateContent xmlns:mc="http://schemas.openxmlformats.org/markup-compatibility/2006">
                 <mc:Choice xmlns:v="urn:schemas-microsoft-com:vml" Requires="v">
-                  <p:oleObj spid="_x0000_s5191" name="Equation" r:id="rId3" imgW="444240" imgH="203040" progId="Equation.3">
+                  <p:oleObj spid="_x0000_s5197" name="Equation" r:id="rId3" imgW="444240" imgH="203040" progId="Equation.3">
                     <p:embed/>
                   </p:oleObj>
                 </mc:Choice>
@@ -10121,7 +10123,7 @@
             <a:graphicData uri="http://schemas.openxmlformats.org/presentationml/2006/ole">
               <mc:AlternateContent xmlns:mc="http://schemas.openxmlformats.org/markup-compatibility/2006">
                 <mc:Choice xmlns:v="urn:schemas-microsoft-com:vml" Requires="v">
-                  <p:oleObj spid="_x0000_s5192" name="Equation" r:id="rId5" imgW="419040" imgH="215640" progId="Equation.3">
+                  <p:oleObj spid="_x0000_s5198" name="Equation" r:id="rId5" imgW="419040" imgH="215640" progId="Equation.3">
                     <p:embed/>
                   </p:oleObj>
                 </mc:Choice>
@@ -12510,7 +12512,7 @@
             <a:graphicData uri="http://schemas.openxmlformats.org/presentationml/2006/ole">
               <mc:AlternateContent xmlns:mc="http://schemas.openxmlformats.org/markup-compatibility/2006">
                 <mc:Choice xmlns:v="urn:schemas-microsoft-com:vml" Requires="v">
-                  <p:oleObj spid="_x0000_s6276" name="Equation" r:id="rId3" imgW="774360" imgH="215640" progId="Equation.3">
+                  <p:oleObj spid="_x0000_s6285" name="Equation" r:id="rId3" imgW="774360" imgH="215640" progId="Equation.3">
                     <p:embed/>
                   </p:oleObj>
                 </mc:Choice>
@@ -12742,7 +12744,7 @@
             <a:graphicData uri="http://schemas.openxmlformats.org/presentationml/2006/ole">
               <mc:AlternateContent xmlns:mc="http://schemas.openxmlformats.org/markup-compatibility/2006">
                 <mc:Choice xmlns:v="urn:schemas-microsoft-com:vml" Requires="v">
-                  <p:oleObj spid="_x0000_s6277" name="Equation" r:id="rId5" imgW="622080" imgH="215640" progId="Equation.3">
+                  <p:oleObj spid="_x0000_s6286" name="Equation" r:id="rId5" imgW="622080" imgH="215640" progId="Equation.3">
                     <p:embed/>
                   </p:oleObj>
                 </mc:Choice>
@@ -12799,7 +12801,7 @@
             <a:graphicData uri="http://schemas.openxmlformats.org/presentationml/2006/ole">
               <mc:AlternateContent xmlns:mc="http://schemas.openxmlformats.org/markup-compatibility/2006">
                 <mc:Choice xmlns:v="urn:schemas-microsoft-com:vml" Requires="v">
-                  <p:oleObj spid="_x0000_s6278" name="Equation" r:id="rId7" imgW="749160" imgH="215640" progId="Equation.3">
+                  <p:oleObj spid="_x0000_s6287" name="Equation" r:id="rId7" imgW="749160" imgH="215640" progId="Equation.3">
                     <p:embed/>
                   </p:oleObj>
                 </mc:Choice>
@@ -15558,11 +15560,7 @@
           <a:p>
             <a:r>
               <a:rPr lang="en-US" dirty="0" smtClean="0"/>
-              <a:t>Specialized data </a:t>
-            </a:r>
-            <a:r>
-              <a:rPr lang="en-US" dirty="0" smtClean="0"/>
-              <a:t>structures</a:t>
+              <a:t>Specialized data structures</a:t>
             </a:r>
             <a:endParaRPr lang="en-US" dirty="0"/>
           </a:p>
@@ -15603,34 +15601,17 @@
               <a:rPr lang="en-US" dirty="0" smtClean="0"/>
               <a:t>third-party libraries</a:t>
             </a:r>
-            <a:endParaRPr lang="en-US" dirty="0" smtClean="0"/>
           </a:p>
           <a:p>
             <a:r>
               <a:rPr lang="en-US" dirty="0" smtClean="0"/>
-              <a:t>Often implemented on top of basic </a:t>
-            </a:r>
+              <a:t>Often implemented on top of basic data structures</a:t>
+            </a:r>
+          </a:p>
+          <a:p>
             <a:r>
               <a:rPr lang="en-US" dirty="0" smtClean="0"/>
-              <a:t>data </a:t>
-            </a:r>
-            <a:r>
-              <a:rPr lang="en-US" dirty="0" smtClean="0"/>
-              <a:t>structures</a:t>
-            </a:r>
-          </a:p>
-          <a:p>
-            <a:r>
-              <a:rPr lang="en-US" dirty="0" smtClean="0"/>
-              <a:t>Other data structures</a:t>
-            </a:r>
-            <a:r>
-              <a:rPr lang="en-US" dirty="0" smtClean="0"/>
-              <a:t> </a:t>
-            </a:r>
-            <a:r>
-              <a:rPr lang="en-US" dirty="0" smtClean="0"/>
-              <a:t>can be implemented on top</a:t>
+              <a:t>Other data structures can be implemented on top</a:t>
             </a:r>
           </a:p>
           <a:p>
@@ -15645,13 +15626,12 @@
               <a:rPr lang="en-US" dirty="0" smtClean="0"/>
               <a:t>stack</a:t>
             </a:r>
-            <a:endParaRPr lang="en-US" dirty="0" smtClean="0"/>
           </a:p>
           <a:p>
             <a:pPr lvl="1"/>
             <a:r>
               <a:rPr lang="en-US" dirty="0" smtClean="0"/>
-              <a:t>queue</a:t>
+              <a:t>queue, priority queue</a:t>
             </a:r>
             <a:endParaRPr lang="en-US" dirty="0" smtClean="0"/>
           </a:p>
@@ -15661,7 +15641,6 @@
               <a:rPr lang="en-US" dirty="0" smtClean="0"/>
               <a:t>graph, DAG, tree</a:t>
             </a:r>
-            <a:endParaRPr lang="en-US" dirty="0" smtClean="0"/>
           </a:p>
         </p:txBody>
       </p:sp>
@@ -15924,7 +15903,7 @@
             <a:graphicData uri="http://schemas.openxmlformats.org/presentationml/2006/ole">
               <mc:AlternateContent xmlns:mc="http://schemas.openxmlformats.org/markup-compatibility/2006">
                 <mc:Choice xmlns:v="urn:schemas-microsoft-com:vml" Requires="v">
-                  <p:oleObj spid="_x0000_s7194" name="Equation" r:id="rId3" imgW="431640" imgH="241200" progId="Equation.3">
+                  <p:oleObj spid="_x0000_s7197" name="Equation" r:id="rId3" imgW="431640" imgH="241200" progId="Equation.3">
                     <p:embed/>
                   </p:oleObj>
                 </mc:Choice>
@@ -16909,8 +16888,13 @@
             <a:pPr lvl="1"/>
             <a:r>
               <a:rPr lang="en-US" dirty="0" smtClean="0"/>
-              <a:t>access: only front</a:t>
-            </a:r>
+              <a:t>access: </a:t>
+            </a:r>
+            <a:r>
+              <a:rPr lang="en-US" dirty="0" smtClean="0"/>
+              <a:t>front to pop and back to push</a:t>
+            </a:r>
+            <a:endParaRPr lang="en-US" dirty="0" smtClean="0"/>
           </a:p>
           <a:p>
             <a:pPr lvl="1"/>
@@ -17061,7 +17045,7 @@
             <a:graphicData uri="http://schemas.openxmlformats.org/presentationml/2006/ole">
               <mc:AlternateContent xmlns:mc="http://schemas.openxmlformats.org/markup-compatibility/2006">
                 <mc:Choice xmlns:v="urn:schemas-microsoft-com:vml" Requires="v">
-                  <p:oleObj spid="_x0000_s8225" name="Equation" r:id="rId3" imgW="444240" imgH="241200" progId="Equation.3">
+                  <p:oleObj spid="_x0000_s8229" name="Equation" r:id="rId3" imgW="444240" imgH="241200" progId="Equation.3">
                     <p:embed/>
                   </p:oleObj>
                 </mc:Choice>
@@ -18874,6 +18858,1123 @@
       </p:grpSpPr>
       <p:sp>
         <p:nvSpPr>
+          <p:cNvPr id="3" name="Content Placeholder 2"/>
+          <p:cNvSpPr>
+            <a:spLocks noGrp="1"/>
+          </p:cNvSpPr>
+          <p:nvPr>
+            <p:ph idx="1"/>
+          </p:nvPr>
+        </p:nvSpPr>
+        <p:spPr/>
+        <p:txBody>
+          <a:bodyPr>
+            <a:normAutofit/>
+          </a:bodyPr>
+          <a:lstStyle/>
+          <a:p>
+            <a:r>
+              <a:rPr lang="en-US" dirty="0" smtClean="0"/>
+              <a:t>Characteristics</a:t>
+            </a:r>
+          </a:p>
+          <a:p>
+            <a:pPr lvl="1"/>
+            <a:r>
+              <a:rPr lang="en-US" dirty="0" smtClean="0"/>
+              <a:t>access: only </a:t>
+            </a:r>
+            <a:r>
+              <a:rPr lang="en-US" dirty="0" smtClean="0"/>
+              <a:t>front to pop, push inserts in order</a:t>
+            </a:r>
+            <a:endParaRPr lang="en-US" dirty="0" smtClean="0"/>
+          </a:p>
+          <a:p>
+            <a:pPr lvl="1"/>
+            <a:r>
+              <a:rPr lang="en-US" dirty="0" smtClean="0"/>
+              <a:t>ordered according to priority</a:t>
+            </a:r>
+            <a:endParaRPr lang="en-US" dirty="0" smtClean="0"/>
+          </a:p>
+          <a:p>
+            <a:pPr lvl="1"/>
+            <a:r>
+              <a:rPr lang="en-US" dirty="0" smtClean="0"/>
+              <a:t>length can vary</a:t>
+            </a:r>
+          </a:p>
+          <a:p>
+            <a:pPr lvl="1"/>
+            <a:r>
+              <a:rPr lang="en-US" dirty="0" smtClean="0"/>
+              <a:t>front: </a:t>
+            </a:r>
+            <a:r>
+              <a:rPr lang="en-US" dirty="0" smtClean="0"/>
+              <a:t>O(1</a:t>
+            </a:r>
+            <a:r>
+              <a:rPr lang="en-US" dirty="0" smtClean="0"/>
+              <a:t>), pop/push: O(log n)</a:t>
+            </a:r>
+            <a:endParaRPr lang="en-US" dirty="0" smtClean="0"/>
+          </a:p>
+          <a:p>
+            <a:pPr lvl="1"/>
+            <a:r>
+              <a:rPr lang="en-US" dirty="0" smtClean="0"/>
+              <a:t>element type: any</a:t>
+            </a:r>
+          </a:p>
+          <a:p>
+            <a:pPr lvl="1"/>
+            <a:endParaRPr lang="en-US" dirty="0"/>
+          </a:p>
+          <a:p>
+            <a:pPr lvl="1"/>
+            <a:endParaRPr lang="en-US" dirty="0" smtClean="0"/>
+          </a:p>
+          <a:p>
+            <a:r>
+              <a:rPr lang="en-US" dirty="0" smtClean="0"/>
+              <a:t>Implementations</a:t>
+            </a:r>
+          </a:p>
+          <a:p>
+            <a:pPr lvl="1"/>
+            <a:r>
+              <a:rPr lang="en-US" dirty="0" smtClean="0"/>
+              <a:t>as heap</a:t>
+            </a:r>
+            <a:endParaRPr lang="en-US" dirty="0" smtClean="0"/>
+          </a:p>
+          <a:p>
+            <a:pPr lvl="1"/>
+            <a:endParaRPr lang="en-US" dirty="0"/>
+          </a:p>
+        </p:txBody>
+      </p:sp>
+      <p:sp>
+        <p:nvSpPr>
+          <p:cNvPr id="2" name="Title 1"/>
+          <p:cNvSpPr>
+            <a:spLocks noGrp="1"/>
+          </p:cNvSpPr>
+          <p:nvPr>
+            <p:ph type="title"/>
+          </p:nvPr>
+        </p:nvSpPr>
+        <p:spPr/>
+        <p:txBody>
+          <a:bodyPr/>
+          <a:lstStyle/>
+          <a:p>
+            <a:r>
+              <a:rPr lang="en-US" dirty="0" smtClean="0"/>
+              <a:t>Priority q</a:t>
+            </a:r>
+            <a:r>
+              <a:rPr lang="en-US" dirty="0" smtClean="0"/>
+              <a:t>ueue</a:t>
+            </a:r>
+            <a:endParaRPr lang="en-US" dirty="0"/>
+          </a:p>
+        </p:txBody>
+      </p:sp>
+      <p:sp>
+        <p:nvSpPr>
+          <p:cNvPr id="7" name="Slide Number Placeholder 6"/>
+          <p:cNvSpPr>
+            <a:spLocks noGrp="1"/>
+          </p:cNvSpPr>
+          <p:nvPr>
+            <p:ph type="sldNum" sz="quarter" idx="12"/>
+          </p:nvPr>
+        </p:nvSpPr>
+        <p:spPr/>
+        <p:txBody>
+          <a:bodyPr/>
+          <a:lstStyle/>
+          <a:p>
+            <a:fld id="{11AD1F4E-1E51-402E-B221-310F004E7D3B}" type="slidenum">
+              <a:rPr lang="en-US" smtClean="0"/>
+              <a:t>32</a:t>
+            </a:fld>
+            <a:endParaRPr lang="en-US"/>
+          </a:p>
+        </p:txBody>
+      </p:sp>
+      <p:grpSp>
+        <p:nvGrpSpPr>
+          <p:cNvPr id="8" name="Group 7"/>
+          <p:cNvGrpSpPr/>
+          <p:nvPr/>
+        </p:nvGrpSpPr>
+        <p:grpSpPr>
+          <a:xfrm>
+            <a:off x="6457950" y="3296518"/>
+            <a:ext cx="1196975" cy="808757"/>
+            <a:chOff x="6307280" y="2566553"/>
+            <a:chExt cx="1595967" cy="1078342"/>
+          </a:xfrm>
+        </p:grpSpPr>
+        <p:graphicFrame>
+          <p:nvGraphicFramePr>
+            <p:cNvPr id="9" name="Object 8"/>
+            <p:cNvGraphicFramePr>
+              <a:graphicFrameLocks noChangeAspect="1"/>
+            </p:cNvGraphicFramePr>
+            <p:nvPr>
+              <p:extLst/>
+            </p:nvPr>
+          </p:nvGraphicFramePr>
+          <p:xfrm>
+            <a:off x="6904180" y="3105146"/>
+            <a:ext cx="999067" cy="539749"/>
+          </p:xfrm>
+          <a:graphic>
+            <a:graphicData uri="http://schemas.openxmlformats.org/presentationml/2006/ole">
+              <mc:AlternateContent xmlns:mc="http://schemas.openxmlformats.org/markup-compatibility/2006">
+                <mc:Choice xmlns:v="urn:schemas-microsoft-com:vml" Requires="v">
+                  <p:oleObj spid="_x0000_s10246" name="Equation" r:id="rId3" imgW="444240" imgH="241200" progId="Equation.3">
+                    <p:embed/>
+                  </p:oleObj>
+                </mc:Choice>
+                <mc:Fallback>
+                  <p:oleObj name="Equation" r:id="rId3" imgW="444240" imgH="241200" progId="Equation.3">
+                    <p:embed/>
+                    <p:pic>
+                      <p:nvPicPr>
+                        <p:cNvPr id="0" name=""/>
+                        <p:cNvPicPr/>
+                        <p:nvPr/>
+                      </p:nvPicPr>
+                      <p:blipFill>
+                        <a:blip r:embed="rId4"/>
+                        <a:stretch>
+                          <a:fillRect/>
+                        </a:stretch>
+                      </p:blipFill>
+                      <p:spPr>
+                        <a:xfrm>
+                          <a:off x="6904180" y="3105146"/>
+                          <a:ext cx="999067" cy="539749"/>
+                        </a:xfrm>
+                        <a:prstGeom prst="rect">
+                          <a:avLst/>
+                        </a:prstGeom>
+                      </p:spPr>
+                    </p:pic>
+                  </p:oleObj>
+                </mc:Fallback>
+              </mc:AlternateContent>
+            </a:graphicData>
+          </a:graphic>
+        </p:graphicFrame>
+        <p:sp>
+          <p:nvSpPr>
+            <p:cNvPr id="10" name="TextBox 9"/>
+            <p:cNvSpPr txBox="1"/>
+            <p:nvPr/>
+          </p:nvSpPr>
+          <p:spPr>
+            <a:xfrm>
+              <a:off x="6307280" y="2566553"/>
+              <a:ext cx="1417483" cy="553997"/>
+            </a:xfrm>
+            <a:prstGeom prst="rect">
+              <a:avLst/>
+            </a:prstGeom>
+            <a:noFill/>
+          </p:spPr>
+          <p:txBody>
+            <a:bodyPr wrap="none" rtlCol="0">
+              <a:spAutoFit/>
+            </a:bodyPr>
+            <a:lstStyle/>
+            <a:p>
+              <a:r>
+                <a:rPr lang="en-US" sz="2100" dirty="0" smtClean="0"/>
+                <a:t>queue </a:t>
+              </a:r>
+              <a:r>
+                <a:rPr lang="en-US" sz="2100" i="1" dirty="0" smtClean="0">
+                  <a:latin typeface="Palatino Linotype" panose="02040502050505030304" pitchFamily="18" charset="0"/>
+                </a:rPr>
+                <a:t>q</a:t>
+              </a:r>
+              <a:endParaRPr lang="en-US" sz="2100" i="1" dirty="0">
+                <a:latin typeface="Palatino Linotype" panose="02040502050505030304" pitchFamily="18" charset="0"/>
+              </a:endParaRPr>
+            </a:p>
+          </p:txBody>
+        </p:sp>
+      </p:grpSp>
+      <p:sp>
+        <p:nvSpPr>
+          <p:cNvPr id="5" name="AutoShape 9" descr="Stockfoto: Kassa · machine · icon · witte · geld · kaart"/>
+          <p:cNvSpPr>
+            <a:spLocks noChangeAspect="1" noChangeArrowheads="1"/>
+          </p:cNvSpPr>
+          <p:nvPr/>
+        </p:nvSpPr>
+        <p:spPr bwMode="auto">
+          <a:xfrm>
+            <a:off x="155575" y="-144463"/>
+            <a:ext cx="304800" cy="304801"/>
+          </a:xfrm>
+          <a:prstGeom prst="rect">
+            <a:avLst/>
+          </a:prstGeom>
+          <a:noFill/>
+          <a:extLst>
+            <a:ext uri="{909E8E84-426E-40DD-AFC4-6F175D3DCCD1}">
+              <a14:hiddenFill xmlns:a14="http://schemas.microsoft.com/office/drawing/2010/main">
+                <a:solidFill>
+                  <a:srgbClr val="FFFFFF"/>
+                </a:solidFill>
+              </a14:hiddenFill>
+            </a:ext>
+          </a:extLst>
+        </p:spPr>
+        <p:txBody>
+          <a:bodyPr vert="horz" wrap="square" lIns="91440" tIns="45720" rIns="91440" bIns="45720" numCol="1" anchor="t" anchorCtr="0" compatLnSpc="1">
+            <a:prstTxWarp prst="textNoShape">
+              <a:avLst/>
+            </a:prstTxWarp>
+          </a:bodyPr>
+          <a:lstStyle/>
+          <a:p>
+            <a:endParaRPr lang="en-US"/>
+          </a:p>
+        </p:txBody>
+      </p:sp>
+      <p:grpSp>
+        <p:nvGrpSpPr>
+          <p:cNvPr id="27" name="Group 26"/>
+          <p:cNvGrpSpPr/>
+          <p:nvPr/>
+        </p:nvGrpSpPr>
+        <p:grpSpPr>
+          <a:xfrm>
+            <a:off x="4437411" y="4031720"/>
+            <a:ext cx="4452428" cy="2113690"/>
+            <a:chOff x="4437411" y="4031720"/>
+            <a:chExt cx="4452428" cy="2113690"/>
+          </a:xfrm>
+        </p:grpSpPr>
+        <p:pic>
+          <p:nvPicPr>
+            <p:cNvPr id="8199" name="Picture 7" descr="https://d30y9cdsu7xlg0.cloudfront.net/png/16757-200.png"/>
+            <p:cNvPicPr>
+              <a:picLocks noChangeAspect="1" noChangeArrowheads="1"/>
+            </p:cNvPicPr>
+            <p:nvPr/>
+          </p:nvPicPr>
+          <p:blipFill>
+            <a:blip r:embed="rId5" cstate="print">
+              <a:extLst>
+                <a:ext uri="{28A0092B-C50C-407E-A947-70E740481C1C}">
+                  <a14:useLocalDpi xmlns:a14="http://schemas.microsoft.com/office/drawing/2010/main" val="0"/>
+                </a:ext>
+              </a:extLst>
+            </a:blip>
+            <a:srcRect/>
+            <a:stretch>
+              <a:fillRect/>
+            </a:stretch>
+          </p:blipFill>
+          <p:spPr bwMode="auto">
+            <a:xfrm>
+              <a:off x="7173999" y="5520108"/>
+              <a:ext cx="625302" cy="625302"/>
+            </a:xfrm>
+            <a:prstGeom prst="rect">
+              <a:avLst/>
+            </a:prstGeom>
+            <a:noFill/>
+            <a:extLst>
+              <a:ext uri="{909E8E84-426E-40DD-AFC4-6F175D3DCCD1}">
+                <a14:hiddenFill xmlns:a14="http://schemas.microsoft.com/office/drawing/2010/main">
+                  <a:solidFill>
+                    <a:srgbClr val="FFFFFF"/>
+                  </a:solidFill>
+                </a14:hiddenFill>
+              </a:ext>
+            </a:extLst>
+          </p:spPr>
+        </p:pic>
+        <p:pic>
+          <p:nvPicPr>
+            <p:cNvPr id="8205" name="Picture 13" descr="http://justintm.com/programming/img/POS.png"/>
+            <p:cNvPicPr>
+              <a:picLocks noChangeAspect="1" noChangeArrowheads="1"/>
+            </p:cNvPicPr>
+            <p:nvPr/>
+          </p:nvPicPr>
+          <p:blipFill>
+            <a:blip r:embed="rId6" cstate="print">
+              <a:extLst>
+                <a:ext uri="{28A0092B-C50C-407E-A947-70E740481C1C}">
+                  <a14:useLocalDpi xmlns:a14="http://schemas.microsoft.com/office/drawing/2010/main" val="0"/>
+                </a:ext>
+              </a:extLst>
+            </a:blip>
+            <a:srcRect/>
+            <a:stretch>
+              <a:fillRect/>
+            </a:stretch>
+          </p:blipFill>
+          <p:spPr bwMode="auto">
+            <a:xfrm flipH="1">
+              <a:off x="7825684" y="5128420"/>
+              <a:ext cx="1064155" cy="738043"/>
+            </a:xfrm>
+            <a:prstGeom prst="rect">
+              <a:avLst/>
+            </a:prstGeom>
+            <a:noFill/>
+            <a:extLst>
+              <a:ext uri="{909E8E84-426E-40DD-AFC4-6F175D3DCCD1}">
+                <a14:hiddenFill xmlns:a14="http://schemas.microsoft.com/office/drawing/2010/main">
+                  <a:solidFill>
+                    <a:srgbClr val="FFFFFF"/>
+                  </a:solidFill>
+                </a14:hiddenFill>
+              </a:ext>
+            </a:extLst>
+          </p:spPr>
+        </p:pic>
+        <p:pic>
+          <p:nvPicPr>
+            <p:cNvPr id="18" name="Picture 7" descr="https://d30y9cdsu7xlg0.cloudfront.net/png/16757-200.png"/>
+            <p:cNvPicPr>
+              <a:picLocks noChangeAspect="1" noChangeArrowheads="1"/>
+            </p:cNvPicPr>
+            <p:nvPr/>
+          </p:nvPicPr>
+          <p:blipFill>
+            <a:blip r:embed="rId5" cstate="print">
+              <a:extLst>
+                <a:ext uri="{28A0092B-C50C-407E-A947-70E740481C1C}">
+                  <a14:useLocalDpi xmlns:a14="http://schemas.microsoft.com/office/drawing/2010/main" val="0"/>
+                </a:ext>
+              </a:extLst>
+            </a:blip>
+            <a:srcRect/>
+            <a:stretch>
+              <a:fillRect/>
+            </a:stretch>
+          </p:blipFill>
+          <p:spPr bwMode="auto">
+            <a:xfrm>
+              <a:off x="5331087" y="5497441"/>
+              <a:ext cx="625302" cy="625302"/>
+            </a:xfrm>
+            <a:prstGeom prst="rect">
+              <a:avLst/>
+            </a:prstGeom>
+            <a:noFill/>
+            <a:extLst>
+              <a:ext uri="{909E8E84-426E-40DD-AFC4-6F175D3DCCD1}">
+                <a14:hiddenFill xmlns:a14="http://schemas.microsoft.com/office/drawing/2010/main">
+                  <a:solidFill>
+                    <a:srgbClr val="FFFFFF"/>
+                  </a:solidFill>
+                </a14:hiddenFill>
+              </a:ext>
+            </a:extLst>
+          </p:spPr>
+        </p:pic>
+        <p:pic>
+          <p:nvPicPr>
+            <p:cNvPr id="19" name="Picture 7" descr="https://d30y9cdsu7xlg0.cloudfront.net/png/16757-200.png"/>
+            <p:cNvPicPr>
+              <a:picLocks noChangeAspect="1" noChangeArrowheads="1"/>
+            </p:cNvPicPr>
+            <p:nvPr/>
+          </p:nvPicPr>
+          <p:blipFill>
+            <a:blip r:embed="rId5" cstate="print">
+              <a:extLst>
+                <a:ext uri="{28A0092B-C50C-407E-A947-70E740481C1C}">
+                  <a14:useLocalDpi xmlns:a14="http://schemas.microsoft.com/office/drawing/2010/main" val="0"/>
+                </a:ext>
+              </a:extLst>
+            </a:blip>
+            <a:srcRect/>
+            <a:stretch>
+              <a:fillRect/>
+            </a:stretch>
+          </p:blipFill>
+          <p:spPr bwMode="auto">
+            <a:xfrm>
+              <a:off x="4437411" y="5520108"/>
+              <a:ext cx="625302" cy="625302"/>
+            </a:xfrm>
+            <a:prstGeom prst="rect">
+              <a:avLst/>
+            </a:prstGeom>
+            <a:noFill/>
+            <a:extLst>
+              <a:ext uri="{909E8E84-426E-40DD-AFC4-6F175D3DCCD1}">
+                <a14:hiddenFill xmlns:a14="http://schemas.microsoft.com/office/drawing/2010/main">
+                  <a:solidFill>
+                    <a:srgbClr val="FFFFFF"/>
+                  </a:solidFill>
+                </a14:hiddenFill>
+              </a:ext>
+            </a:extLst>
+          </p:spPr>
+        </p:pic>
+        <p:pic>
+          <p:nvPicPr>
+            <p:cNvPr id="20" name="Picture 7" descr="https://d30y9cdsu7xlg0.cloudfront.net/png/16757-200.png"/>
+            <p:cNvPicPr>
+              <a:picLocks noChangeAspect="1" noChangeArrowheads="1"/>
+            </p:cNvPicPr>
+            <p:nvPr/>
+          </p:nvPicPr>
+          <p:blipFill>
+            <a:blip r:embed="rId5" cstate="print">
+              <a:extLst>
+                <a:ext uri="{28A0092B-C50C-407E-A947-70E740481C1C}">
+                  <a14:useLocalDpi xmlns:a14="http://schemas.microsoft.com/office/drawing/2010/main" val="0"/>
+                </a:ext>
+              </a:extLst>
+            </a:blip>
+            <a:srcRect/>
+            <a:stretch>
+              <a:fillRect/>
+            </a:stretch>
+          </p:blipFill>
+          <p:spPr bwMode="auto">
+            <a:xfrm>
+              <a:off x="4761345" y="4397489"/>
+              <a:ext cx="625302" cy="625302"/>
+            </a:xfrm>
+            <a:prstGeom prst="rect">
+              <a:avLst/>
+            </a:prstGeom>
+            <a:noFill/>
+            <a:extLst>
+              <a:ext uri="{909E8E84-426E-40DD-AFC4-6F175D3DCCD1}">
+                <a14:hiddenFill xmlns:a14="http://schemas.microsoft.com/office/drawing/2010/main">
+                  <a:solidFill>
+                    <a:srgbClr val="FFFFFF"/>
+                  </a:solidFill>
+                </a14:hiddenFill>
+              </a:ext>
+            </a:extLst>
+          </p:spPr>
+        </p:pic>
+        <p:sp>
+          <p:nvSpPr>
+            <p:cNvPr id="6" name="TextBox 5"/>
+            <p:cNvSpPr txBox="1"/>
+            <p:nvPr/>
+          </p:nvSpPr>
+          <p:spPr>
+            <a:xfrm>
+              <a:off x="7339302" y="5150776"/>
+              <a:ext cx="588623" cy="461665"/>
+            </a:xfrm>
+            <a:prstGeom prst="rect">
+              <a:avLst/>
+            </a:prstGeom>
+            <a:noFill/>
+          </p:spPr>
+          <p:txBody>
+            <a:bodyPr wrap="none" rtlCol="0">
+              <a:spAutoFit/>
+            </a:bodyPr>
+            <a:lstStyle/>
+            <a:p>
+              <a:r>
+                <a:rPr lang="en-US" sz="2400" b="1" i="1" dirty="0" smtClean="0">
+                  <a:solidFill>
+                    <a:srgbClr val="C00000"/>
+                  </a:solidFill>
+                </a:rPr>
+                <a:t>!!!!</a:t>
+              </a:r>
+              <a:endParaRPr lang="en-US" sz="2400" b="1" i="1" dirty="0">
+                <a:solidFill>
+                  <a:srgbClr val="C00000"/>
+                </a:solidFill>
+              </a:endParaRPr>
+            </a:p>
+          </p:txBody>
+        </p:sp>
+        <p:sp>
+          <p:nvSpPr>
+            <p:cNvPr id="22" name="TextBox 21"/>
+            <p:cNvSpPr txBox="1"/>
+            <p:nvPr/>
+          </p:nvSpPr>
+          <p:spPr>
+            <a:xfrm>
+              <a:off x="5519816" y="5131672"/>
+              <a:ext cx="386644" cy="461665"/>
+            </a:xfrm>
+            <a:prstGeom prst="rect">
+              <a:avLst/>
+            </a:prstGeom>
+            <a:noFill/>
+          </p:spPr>
+          <p:txBody>
+            <a:bodyPr wrap="none" rtlCol="0">
+              <a:spAutoFit/>
+            </a:bodyPr>
+            <a:lstStyle/>
+            <a:p>
+              <a:r>
+                <a:rPr lang="en-US" sz="2400" b="1" i="1" dirty="0" smtClean="0">
+                  <a:solidFill>
+                    <a:srgbClr val="C00000"/>
+                  </a:solidFill>
+                </a:rPr>
+                <a:t>!!</a:t>
+              </a:r>
+              <a:endParaRPr lang="en-US" sz="2400" b="1" i="1" dirty="0">
+                <a:solidFill>
+                  <a:srgbClr val="C00000"/>
+                </a:solidFill>
+              </a:endParaRPr>
+            </a:p>
+          </p:txBody>
+        </p:sp>
+        <p:sp>
+          <p:nvSpPr>
+            <p:cNvPr id="23" name="TextBox 22"/>
+            <p:cNvSpPr txBox="1"/>
+            <p:nvPr/>
+          </p:nvSpPr>
+          <p:spPr>
+            <a:xfrm>
+              <a:off x="4696659" y="5150775"/>
+              <a:ext cx="285656" cy="461665"/>
+            </a:xfrm>
+            <a:prstGeom prst="rect">
+              <a:avLst/>
+            </a:prstGeom>
+            <a:noFill/>
+          </p:spPr>
+          <p:txBody>
+            <a:bodyPr wrap="none" rtlCol="0">
+              <a:spAutoFit/>
+            </a:bodyPr>
+            <a:lstStyle/>
+            <a:p>
+              <a:r>
+                <a:rPr lang="en-US" sz="2400" b="1" i="1" dirty="0" smtClean="0">
+                  <a:solidFill>
+                    <a:srgbClr val="C00000"/>
+                  </a:solidFill>
+                </a:rPr>
+                <a:t>!</a:t>
+              </a:r>
+              <a:endParaRPr lang="en-US" sz="2400" b="1" i="1" dirty="0">
+                <a:solidFill>
+                  <a:srgbClr val="C00000"/>
+                </a:solidFill>
+              </a:endParaRPr>
+            </a:p>
+          </p:txBody>
+        </p:sp>
+        <p:sp>
+          <p:nvSpPr>
+            <p:cNvPr id="24" name="TextBox 23"/>
+            <p:cNvSpPr txBox="1"/>
+            <p:nvPr/>
+          </p:nvSpPr>
+          <p:spPr>
+            <a:xfrm>
+              <a:off x="4905187" y="4031720"/>
+              <a:ext cx="487634" cy="461665"/>
+            </a:xfrm>
+            <a:prstGeom prst="rect">
+              <a:avLst/>
+            </a:prstGeom>
+            <a:noFill/>
+          </p:spPr>
+          <p:txBody>
+            <a:bodyPr wrap="none" rtlCol="0">
+              <a:spAutoFit/>
+            </a:bodyPr>
+            <a:lstStyle/>
+            <a:p>
+              <a:r>
+                <a:rPr lang="en-US" sz="2400" b="1" i="1" dirty="0" smtClean="0">
+                  <a:solidFill>
+                    <a:srgbClr val="C00000"/>
+                  </a:solidFill>
+                </a:rPr>
+                <a:t>!!!</a:t>
+              </a:r>
+              <a:endParaRPr lang="en-US" sz="2400" b="1" i="1" dirty="0">
+                <a:solidFill>
+                  <a:srgbClr val="C00000"/>
+                </a:solidFill>
+              </a:endParaRPr>
+            </a:p>
+          </p:txBody>
+        </p:sp>
+        <p:cxnSp>
+          <p:nvCxnSpPr>
+            <p:cNvPr id="25" name="Straight Arrow Connector 24"/>
+            <p:cNvCxnSpPr/>
+            <p:nvPr/>
+          </p:nvCxnSpPr>
+          <p:spPr>
+            <a:xfrm flipV="1">
+              <a:off x="7063257" y="4666777"/>
+              <a:ext cx="211" cy="2"/>
+            </a:xfrm>
+            <a:prstGeom prst="straightConnector1">
+              <a:avLst/>
+            </a:prstGeom>
+            <a:ln w="31750">
+              <a:solidFill>
+                <a:schemeClr val="tx1"/>
+              </a:solidFill>
+              <a:tailEnd type="none" w="lg" len="lg"/>
+            </a:ln>
+          </p:spPr>
+          <p:style>
+            <a:lnRef idx="1">
+              <a:schemeClr val="accent1"/>
+            </a:lnRef>
+            <a:fillRef idx="0">
+              <a:schemeClr val="accent1"/>
+            </a:fillRef>
+            <a:effectRef idx="0">
+              <a:schemeClr val="accent1"/>
+            </a:effectRef>
+            <a:fontRef idx="minor">
+              <a:schemeClr val="tx1"/>
+            </a:fontRef>
+          </p:style>
+        </p:cxnSp>
+        <p:grpSp>
+          <p:nvGrpSpPr>
+            <p:cNvPr id="26" name="Group 25"/>
+            <p:cNvGrpSpPr/>
+            <p:nvPr/>
+          </p:nvGrpSpPr>
+          <p:grpSpPr>
+            <a:xfrm>
+              <a:off x="5699298" y="4666777"/>
+              <a:ext cx="1363958" cy="945665"/>
+              <a:chOff x="5699298" y="4666777"/>
+              <a:chExt cx="1363958" cy="945665"/>
+            </a:xfrm>
+          </p:grpSpPr>
+          <p:cxnSp>
+            <p:nvCxnSpPr>
+              <p:cNvPr id="17" name="Straight Arrow Connector 16"/>
+              <p:cNvCxnSpPr/>
+              <p:nvPr/>
+            </p:nvCxnSpPr>
+            <p:spPr>
+              <a:xfrm>
+                <a:off x="7063256" y="4666777"/>
+                <a:ext cx="0" cy="945665"/>
+              </a:xfrm>
+              <a:prstGeom prst="straightConnector1">
+                <a:avLst/>
+              </a:prstGeom>
+              <a:ln w="31750">
+                <a:solidFill>
+                  <a:schemeClr val="tx1"/>
+                </a:solidFill>
+                <a:tailEnd type="stealth" w="lg" len="lg"/>
+              </a:ln>
+            </p:spPr>
+            <p:style>
+              <a:lnRef idx="1">
+                <a:schemeClr val="accent1"/>
+              </a:lnRef>
+              <a:fillRef idx="0">
+                <a:schemeClr val="accent1"/>
+              </a:fillRef>
+              <a:effectRef idx="0">
+                <a:schemeClr val="accent1"/>
+              </a:effectRef>
+              <a:fontRef idx="minor">
+                <a:schemeClr val="tx1"/>
+              </a:fontRef>
+            </p:style>
+          </p:cxnSp>
+          <p:cxnSp>
+            <p:nvCxnSpPr>
+              <p:cNvPr id="16" name="Straight Connector 15"/>
+              <p:cNvCxnSpPr/>
+              <p:nvPr/>
+            </p:nvCxnSpPr>
+            <p:spPr>
+              <a:xfrm flipH="1">
+                <a:off x="5699298" y="4677804"/>
+                <a:ext cx="1363958" cy="0"/>
+              </a:xfrm>
+              <a:prstGeom prst="line">
+                <a:avLst/>
+              </a:prstGeom>
+              <a:ln w="34925">
+                <a:solidFill>
+                  <a:schemeClr val="tx1"/>
+                </a:solidFill>
+              </a:ln>
+            </p:spPr>
+            <p:style>
+              <a:lnRef idx="1">
+                <a:schemeClr val="accent1"/>
+              </a:lnRef>
+              <a:fillRef idx="0">
+                <a:schemeClr val="accent1"/>
+              </a:fillRef>
+              <a:effectRef idx="0">
+                <a:schemeClr val="accent1"/>
+              </a:effectRef>
+              <a:fontRef idx="minor">
+                <a:schemeClr val="tx1"/>
+              </a:fontRef>
+            </p:style>
+          </p:cxnSp>
+        </p:grpSp>
+        <p:pic>
+          <p:nvPicPr>
+            <p:cNvPr id="29" name="Picture 7" descr="https://d30y9cdsu7xlg0.cloudfront.net/png/16757-200.png"/>
+            <p:cNvPicPr>
+              <a:picLocks noChangeAspect="1" noChangeArrowheads="1"/>
+            </p:cNvPicPr>
+            <p:nvPr/>
+          </p:nvPicPr>
+          <p:blipFill>
+            <a:blip r:embed="rId5" cstate="print">
+              <a:extLst>
+                <a:ext uri="{28A0092B-C50C-407E-A947-70E740481C1C}">
+                  <a14:useLocalDpi xmlns:a14="http://schemas.microsoft.com/office/drawing/2010/main" val="0"/>
+                </a:ext>
+              </a:extLst>
+            </a:blip>
+            <a:srcRect/>
+            <a:stretch>
+              <a:fillRect/>
+            </a:stretch>
+          </p:blipFill>
+          <p:spPr bwMode="auto">
+            <a:xfrm>
+              <a:off x="6171465" y="5501788"/>
+              <a:ext cx="625302" cy="625302"/>
+            </a:xfrm>
+            <a:prstGeom prst="rect">
+              <a:avLst/>
+            </a:prstGeom>
+            <a:noFill/>
+            <a:extLst>
+              <a:ext uri="{909E8E84-426E-40DD-AFC4-6F175D3DCCD1}">
+                <a14:hiddenFill xmlns:a14="http://schemas.microsoft.com/office/drawing/2010/main">
+                  <a:solidFill>
+                    <a:srgbClr val="FFFFFF"/>
+                  </a:solidFill>
+                </a14:hiddenFill>
+              </a:ext>
+            </a:extLst>
+          </p:spPr>
+        </p:pic>
+        <p:sp>
+          <p:nvSpPr>
+            <p:cNvPr id="30" name="TextBox 29"/>
+            <p:cNvSpPr txBox="1"/>
+            <p:nvPr/>
+          </p:nvSpPr>
+          <p:spPr>
+            <a:xfrm>
+              <a:off x="6360194" y="5136019"/>
+              <a:ext cx="386644" cy="461665"/>
+            </a:xfrm>
+            <a:prstGeom prst="rect">
+              <a:avLst/>
+            </a:prstGeom>
+            <a:noFill/>
+          </p:spPr>
+          <p:txBody>
+            <a:bodyPr wrap="none" rtlCol="0">
+              <a:spAutoFit/>
+            </a:bodyPr>
+            <a:lstStyle/>
+            <a:p>
+              <a:r>
+                <a:rPr lang="en-US" sz="2400" b="1" i="1" dirty="0" smtClean="0">
+                  <a:solidFill>
+                    <a:srgbClr val="C00000"/>
+                  </a:solidFill>
+                </a:rPr>
+                <a:t>!!</a:t>
+              </a:r>
+              <a:endParaRPr lang="en-US" sz="2400" b="1" i="1" dirty="0">
+                <a:solidFill>
+                  <a:srgbClr val="C00000"/>
+                </a:solidFill>
+              </a:endParaRPr>
+            </a:p>
+          </p:txBody>
+        </p:sp>
+      </p:grpSp>
+    </p:spTree>
+    <p:extLst>
+      <p:ext uri="{BB962C8B-B14F-4D97-AF65-F5344CB8AC3E}">
+        <p14:creationId xmlns:p14="http://schemas.microsoft.com/office/powerpoint/2010/main" val="2283756152"/>
+      </p:ext>
+    </p:extLst>
+  </p:cSld>
+  <p:clrMapOvr>
+    <a:masterClrMapping/>
+  </p:clrMapOvr>
+  <p:timing>
+    <p:tnLst>
+      <p:par>
+        <p:cTn id="1" dur="indefinite" restart="never" nodeType="tmRoot"/>
+      </p:par>
+    </p:tnLst>
+  </p:timing>
+</p:sld>
+</file>
+
+<file path=ppt/slides/slide33.xml><?xml version="1.0" encoding="utf-8"?>
+<p:sld xmlns:a="http://schemas.openxmlformats.org/drawingml/2006/main" xmlns:r="http://schemas.openxmlformats.org/officeDocument/2006/relationships" xmlns:p="http://schemas.openxmlformats.org/presentationml/2006/main">
+  <p:cSld>
+    <p:spTree>
+      <p:nvGrpSpPr>
+        <p:cNvPr id="1" name=""/>
+        <p:cNvGrpSpPr/>
+        <p:nvPr/>
+      </p:nvGrpSpPr>
+      <p:grpSpPr>
+        <a:xfrm>
+          <a:off x="0" y="0"/>
+          <a:ext cx="0" cy="0"/>
+          <a:chOff x="0" y="0"/>
+          <a:chExt cx="0" cy="0"/>
+        </a:xfrm>
+      </p:grpSpPr>
+      <p:sp>
+        <p:nvSpPr>
+          <p:cNvPr id="2" name="Title 1"/>
+          <p:cNvSpPr>
+            <a:spLocks noGrp="1"/>
+          </p:cNvSpPr>
+          <p:nvPr>
+            <p:ph type="title"/>
+          </p:nvPr>
+        </p:nvSpPr>
+        <p:spPr/>
+        <p:txBody>
+          <a:bodyPr/>
+          <a:lstStyle/>
+          <a:p>
+            <a:r>
+              <a:rPr lang="en-US" dirty="0" smtClean="0"/>
+              <a:t>Priority q</a:t>
+            </a:r>
+            <a:r>
+              <a:rPr lang="en-US" dirty="0" smtClean="0"/>
+              <a:t>ueue </a:t>
+            </a:r>
+            <a:r>
+              <a:rPr lang="en-US" dirty="0" smtClean="0"/>
+              <a:t>ADT</a:t>
+            </a:r>
+            <a:endParaRPr lang="en-US" dirty="0"/>
+          </a:p>
+        </p:txBody>
+      </p:sp>
+      <p:sp>
+        <p:nvSpPr>
+          <p:cNvPr id="3" name="Content Placeholder 2"/>
+          <p:cNvSpPr>
+            <a:spLocks noGrp="1"/>
+          </p:cNvSpPr>
+          <p:nvPr>
+            <p:ph idx="1"/>
+          </p:nvPr>
+        </p:nvSpPr>
+        <p:spPr/>
+        <p:txBody>
+          <a:bodyPr/>
+          <a:lstStyle/>
+          <a:p>
+            <a:r>
+              <a:rPr lang="en-US" dirty="0" smtClean="0"/>
+              <a:t>EMPTY_QUEUE() </a:t>
+            </a:r>
+            <a:r>
+              <a:rPr lang="en-US" dirty="0" smtClean="0">
+                <a:sym typeface="Symbol" panose="05050102010706020507" pitchFamily="18" charset="2"/>
+              </a:rPr>
+              <a:t> queue</a:t>
+            </a:r>
+            <a:endParaRPr lang="en-US" dirty="0" smtClean="0"/>
+          </a:p>
+          <a:p>
+            <a:r>
+              <a:rPr lang="en-US" dirty="0" smtClean="0"/>
+              <a:t>QUEUE.PUSH(value</a:t>
+            </a:r>
+            <a:r>
+              <a:rPr lang="en-US" dirty="0"/>
+              <a:t>)</a:t>
+            </a:r>
+          </a:p>
+          <a:p>
+            <a:r>
+              <a:rPr lang="en-US" dirty="0" smtClean="0"/>
+              <a:t>QUEUE.POP()</a:t>
+            </a:r>
+          </a:p>
+          <a:p>
+            <a:r>
+              <a:rPr lang="en-US" dirty="0" smtClean="0"/>
+              <a:t>QUEUE.FRONT()</a:t>
+            </a:r>
+            <a:r>
+              <a:rPr lang="en-US" dirty="0"/>
+              <a:t> </a:t>
+            </a:r>
+            <a:r>
+              <a:rPr lang="en-US" dirty="0">
+                <a:sym typeface="Symbol" panose="05050102010706020507" pitchFamily="18" charset="2"/>
+              </a:rPr>
+              <a:t> </a:t>
+            </a:r>
+            <a:r>
+              <a:rPr lang="en-US" dirty="0" smtClean="0">
+                <a:sym typeface="Symbol" panose="05050102010706020507" pitchFamily="18" charset="2"/>
+              </a:rPr>
+              <a:t>value</a:t>
+            </a:r>
+            <a:endParaRPr lang="en-US" dirty="0"/>
+          </a:p>
+          <a:p>
+            <a:r>
+              <a:rPr lang="en-US" dirty="0" smtClean="0"/>
+              <a:t>QUEUE.IS_EMPTY()</a:t>
+            </a:r>
+            <a:r>
+              <a:rPr lang="en-US" dirty="0"/>
+              <a:t> </a:t>
+            </a:r>
+            <a:r>
+              <a:rPr lang="en-US" dirty="0">
+                <a:sym typeface="Symbol" panose="05050102010706020507" pitchFamily="18" charset="2"/>
+              </a:rPr>
+              <a:t> </a:t>
+            </a:r>
+            <a:r>
+              <a:rPr lang="en-US" dirty="0" err="1" smtClean="0">
+                <a:sym typeface="Symbol" panose="05050102010706020507" pitchFamily="18" charset="2"/>
+              </a:rPr>
+              <a:t>boolean</a:t>
+            </a:r>
+            <a:endParaRPr lang="en-US" dirty="0" smtClean="0"/>
+          </a:p>
+          <a:p>
+            <a:r>
+              <a:rPr lang="en-US" dirty="0" smtClean="0"/>
+              <a:t>QUEUE.LENGTH() </a:t>
+            </a:r>
+            <a:r>
+              <a:rPr lang="en-US" dirty="0">
+                <a:sym typeface="Symbol" panose="05050102010706020507" pitchFamily="18" charset="2"/>
+              </a:rPr>
+              <a:t> </a:t>
+            </a:r>
+            <a:r>
+              <a:rPr lang="en-US" dirty="0" smtClean="0">
+                <a:sym typeface="Symbol" panose="05050102010706020507" pitchFamily="18" charset="2"/>
+              </a:rPr>
+              <a:t>length</a:t>
+            </a:r>
+            <a:br>
+              <a:rPr lang="en-US" dirty="0" smtClean="0">
+                <a:sym typeface="Symbol" panose="05050102010706020507" pitchFamily="18" charset="2"/>
+              </a:rPr>
+            </a:br>
+            <a:r>
+              <a:rPr lang="en-US" dirty="0" smtClean="0">
+                <a:sym typeface="Symbol" panose="05050102010706020507" pitchFamily="18" charset="2"/>
+              </a:rPr>
+              <a:t>      = #push - #pop</a:t>
+            </a:r>
+            <a:endParaRPr lang="en-US" dirty="0"/>
+          </a:p>
+        </p:txBody>
+      </p:sp>
+      <p:sp>
+        <p:nvSpPr>
+          <p:cNvPr id="4" name="Slide Number Placeholder 3"/>
+          <p:cNvSpPr>
+            <a:spLocks noGrp="1"/>
+          </p:cNvSpPr>
+          <p:nvPr>
+            <p:ph type="sldNum" sz="quarter" idx="12"/>
+          </p:nvPr>
+        </p:nvSpPr>
+        <p:spPr/>
+        <p:txBody>
+          <a:bodyPr/>
+          <a:lstStyle/>
+          <a:p>
+            <a:fld id="{11AD1F4E-1E51-402E-B221-310F004E7D3B}" type="slidenum">
+              <a:rPr lang="en-US" smtClean="0"/>
+              <a:t>33</a:t>
+            </a:fld>
+            <a:endParaRPr lang="en-US"/>
+          </a:p>
+        </p:txBody>
+      </p:sp>
+    </p:spTree>
+    <p:extLst>
+      <p:ext uri="{BB962C8B-B14F-4D97-AF65-F5344CB8AC3E}">
+        <p14:creationId xmlns:p14="http://schemas.microsoft.com/office/powerpoint/2010/main" val="2510982706"/>
+      </p:ext>
+    </p:extLst>
+  </p:cSld>
+  <p:clrMapOvr>
+    <a:masterClrMapping/>
+  </p:clrMapOvr>
+  <p:timing>
+    <p:tnLst>
+      <p:par>
+        <p:cTn id="1" dur="indefinite" restart="never" nodeType="tmRoot"/>
+      </p:par>
+    </p:tnLst>
+  </p:timing>
+</p:sld>
+</file>
+
+<file path=ppt/slides/slide34.xml><?xml version="1.0" encoding="utf-8"?>
+<p:sld xmlns:a="http://schemas.openxmlformats.org/drawingml/2006/main" xmlns:r="http://schemas.openxmlformats.org/officeDocument/2006/relationships" xmlns:p="http://schemas.openxmlformats.org/presentationml/2006/main">
+  <p:cSld>
+    <p:spTree>
+      <p:nvGrpSpPr>
+        <p:cNvPr id="1" name=""/>
+        <p:cNvGrpSpPr/>
+        <p:nvPr/>
+      </p:nvGrpSpPr>
+      <p:grpSpPr>
+        <a:xfrm>
+          <a:off x="0" y="0"/>
+          <a:ext cx="0" cy="0"/>
+          <a:chOff x="0" y="0"/>
+          <a:chExt cx="0" cy="0"/>
+        </a:xfrm>
+      </p:grpSpPr>
+      <p:sp>
+        <p:nvSpPr>
           <p:cNvPr id="2" name="Title 1"/>
           <p:cNvSpPr>
             <a:spLocks noGrp="1"/>
@@ -18935,22 +20036,14 @@
             <a:pPr lvl="1"/>
             <a:r>
               <a:rPr lang="en-US" dirty="0" smtClean="0"/>
-              <a:t>ordered (directed </a:t>
-            </a:r>
-            <a:r>
-              <a:rPr lang="en-US" dirty="0" smtClean="0"/>
-              <a:t>graph or digraph),</a:t>
+              <a:t>ordered (directed graph or digraph),</a:t>
             </a:r>
             <a:br>
               <a:rPr lang="en-US" dirty="0" smtClean="0"/>
             </a:br>
             <a:r>
               <a:rPr lang="en-US" dirty="0" smtClean="0"/>
-              <a:t>unordered </a:t>
-            </a:r>
-            <a:r>
-              <a:rPr lang="en-US" dirty="0" smtClean="0"/>
-              <a:t>(undirected graph)</a:t>
+              <a:t>unordered (undirected graph)</a:t>
             </a:r>
           </a:p>
           <a:p>
@@ -19023,7 +20116,7 @@
           <a:p>
             <a:fld id="{11AD1F4E-1E51-402E-B221-310F004E7D3B}" type="slidenum">
               <a:rPr lang="en-US" smtClean="0"/>
-              <a:t>32</a:t>
+              <a:t>34</a:t>
             </a:fld>
             <a:endParaRPr lang="en-US"/>
           </a:p>
@@ -19065,7 +20158,7 @@
             <a:graphicData uri="http://schemas.openxmlformats.org/presentationml/2006/ole">
               <mc:AlternateContent xmlns:mc="http://schemas.openxmlformats.org/markup-compatibility/2006">
                 <mc:Choice xmlns:v="urn:schemas-microsoft-com:vml" Requires="v">
-                  <p:oleObj spid="_x0000_s9240" name="Equation" r:id="rId3" imgW="1104840" imgH="215640" progId="Equation.3">
+                  <p:oleObj spid="_x0000_s9243" name="Equation" r:id="rId3" imgW="1104840" imgH="215640" progId="Equation.3">
                     <p:embed/>
                   </p:oleObj>
                 </mc:Choice>
@@ -20157,7 +21250,7 @@
 </p:sld>
 </file>
 
-<file path=ppt/slides/slide33.xml><?xml version="1.0" encoding="utf-8"?>
+<file path=ppt/slides/slide35.xml><?xml version="1.0" encoding="utf-8"?>
 <p:sld xmlns:a="http://schemas.openxmlformats.org/drawingml/2006/main" xmlns:r="http://schemas.openxmlformats.org/officeDocument/2006/relationships" xmlns:p="http://schemas.openxmlformats.org/presentationml/2006/main">
   <p:cSld>
     <p:spTree>
@@ -20480,7 +21573,7 @@
           <a:p>
             <a:fld id="{11AD1F4E-1E51-402E-B221-310F004E7D3B}" type="slidenum">
               <a:rPr lang="en-US" smtClean="0"/>
-              <a:t>33</a:t>
+              <a:t>35</a:t>
             </a:fld>
             <a:endParaRPr lang="en-US"/>
           </a:p>
@@ -20506,7 +21599,7 @@
 </p:sld>
 </file>
 
-<file path=ppt/slides/slide34.xml><?xml version="1.0" encoding="utf-8"?>
+<file path=ppt/slides/slide36.xml><?xml version="1.0" encoding="utf-8"?>
 <p:sld xmlns:a="http://schemas.openxmlformats.org/drawingml/2006/main" xmlns:r="http://schemas.openxmlformats.org/officeDocument/2006/relationships" xmlns:p="http://schemas.openxmlformats.org/presentationml/2006/main">
   <p:cSld>
     <p:spTree>
@@ -20656,7 +21749,7 @@
           <a:p>
             <a:fld id="{11AD1F4E-1E51-402E-B221-310F004E7D3B}" type="slidenum">
               <a:rPr lang="en-US" smtClean="0"/>
-              <a:t>34</a:t>
+              <a:t>36</a:t>
             </a:fld>
             <a:endParaRPr lang="en-US"/>
           </a:p>
@@ -22853,7 +23946,7 @@
 </p:sld>
 </file>
 
-<file path=ppt/slides/slide35.xml><?xml version="1.0" encoding="utf-8"?>
+<file path=ppt/slides/slide37.xml><?xml version="1.0" encoding="utf-8"?>
 <p:sld xmlns:a="http://schemas.openxmlformats.org/drawingml/2006/main" xmlns:r="http://schemas.openxmlformats.org/officeDocument/2006/relationships" xmlns:p="http://schemas.openxmlformats.org/presentationml/2006/main">
   <p:cSld>
     <p:spTree>
@@ -22916,11 +24009,7 @@
           <a:p>
             <a:r>
               <a:rPr lang="en-US" dirty="0" smtClean="0"/>
-              <a:t>Shortest path: find shortest path </a:t>
-            </a:r>
-            <a:r>
-              <a:rPr lang="en-US" dirty="0" smtClean="0"/>
-              <a:t>between source and destination in graph weighted with distances</a:t>
+              <a:t>Shortest path: find shortest path between source and destination in graph weighted with distances</a:t>
             </a:r>
           </a:p>
           <a:p>
@@ -22949,7 +24038,7 @@
           <a:p>
             <a:fld id="{11AD1F4E-1E51-402E-B221-310F004E7D3B}" type="slidenum">
               <a:rPr lang="en-US" smtClean="0"/>
-              <a:t>35</a:t>
+              <a:t>37</a:t>
             </a:fld>
             <a:endParaRPr lang="en-US"/>
           </a:p>
@@ -24483,11 +25572,7 @@
             <a:pPr lvl="1"/>
             <a:r>
               <a:rPr lang="en-US" dirty="0" smtClean="0"/>
-              <a:t>specific </a:t>
-            </a:r>
-            <a:r>
-              <a:rPr lang="en-US" dirty="0" smtClean="0"/>
-              <a:t>applications</a:t>
+              <a:t>specific applications</a:t>
             </a:r>
           </a:p>
           <a:p>
@@ -24496,7 +25581,6 @@
               <a:rPr lang="en-US" dirty="0" smtClean="0"/>
               <a:t>relationship to algorithms!</a:t>
             </a:r>
-            <a:endParaRPr lang="en-US" dirty="0" smtClean="0"/>
           </a:p>
           <a:p>
             <a:r>
@@ -24612,11 +25696,7 @@
           <a:p>
             <a:r>
               <a:rPr lang="en-US" sz="2100" dirty="0" smtClean="0"/>
-              <a:t>Which data structure to </a:t>
-            </a:r>
-            <a:r>
-              <a:rPr lang="en-US" sz="2100" dirty="0" smtClean="0"/>
-              <a:t>choose for algorithm?</a:t>
+              <a:t>Which data structure to choose for algorithm?</a:t>
             </a:r>
             <a:endParaRPr lang="en-US" sz="2100" dirty="0"/>
           </a:p>
@@ -25796,7 +26876,7 @@
           <a:graphicData uri="http://schemas.openxmlformats.org/presentationml/2006/ole">
             <mc:AlternateContent xmlns:mc="http://schemas.openxmlformats.org/markup-compatibility/2006">
               <mc:Choice xmlns:v="urn:schemas-microsoft-com:vml" Requires="v">
-                <p:oleObj spid="_x0000_s1081" name="Equation" r:id="rId4" imgW="1841400" imgH="215640" progId="Equation.3">
+                <p:oleObj spid="_x0000_s1084" name="Equation" r:id="rId4" imgW="1841400" imgH="215640" progId="Equation.3">
                   <p:embed/>
                 </p:oleObj>
               </mc:Choice>
@@ -27398,7 +28478,7 @@
             <a:graphicData uri="http://schemas.openxmlformats.org/presentationml/2006/ole">
               <mc:AlternateContent xmlns:mc="http://schemas.openxmlformats.org/markup-compatibility/2006">
                 <mc:Choice xmlns:v="urn:schemas-microsoft-com:vml" Requires="v">
-                  <p:oleObj spid="_x0000_s2104" name="Equation" r:id="rId3" imgW="1409400" imgH="203040" progId="Equation.3">
+                  <p:oleObj spid="_x0000_s2107" name="Equation" r:id="rId3" imgW="1409400" imgH="203040" progId="Equation.3">
                     <p:embed/>
                   </p:oleObj>
                 </mc:Choice>

</xml_diff>

<commit_message>
Added remarks on set and dictionary size
</commit_message>
<xml_diff>
--- a/DataStructures/data_structures.pptx
+++ b/DataStructures/data_structures.pptx
@@ -233,7 +233,7 @@
           <a:p>
             <a:fld id="{D3AF4CC3-573B-48A2-BA19-C88E9EEB8008}" type="datetimeFigureOut">
               <a:rPr lang="en-US" smtClean="0"/>
-              <a:t>2016-09-30</a:t>
+              <a:t>2016-11-23</a:t>
             </a:fld>
             <a:endParaRPr lang="en-US"/>
           </a:p>
@@ -800,7 +800,7 @@
           <a:p>
             <a:fld id="{E7395A51-B5B5-44D7-85E1-1556CCB9180F}" type="datetime1">
               <a:rPr lang="en-US" smtClean="0"/>
-              <a:t>2016-09-30</a:t>
+              <a:t>2016-11-23</a:t>
             </a:fld>
             <a:endParaRPr lang="en-US"/>
           </a:p>
@@ -970,7 +970,7 @@
           <a:p>
             <a:fld id="{BEDB066D-DA80-4992-B507-A911EFD1878C}" type="datetime1">
               <a:rPr lang="en-US" smtClean="0"/>
-              <a:t>2016-09-30</a:t>
+              <a:t>2016-11-23</a:t>
             </a:fld>
             <a:endParaRPr lang="en-US"/>
           </a:p>
@@ -1150,7 +1150,7 @@
           <a:p>
             <a:fld id="{21259CBD-682A-4ABE-AFE9-CACFF55FE875}" type="datetime1">
               <a:rPr lang="en-US" smtClean="0"/>
-              <a:t>2016-09-30</a:t>
+              <a:t>2016-11-23</a:t>
             </a:fld>
             <a:endParaRPr lang="en-US"/>
           </a:p>
@@ -1320,7 +1320,7 @@
           <a:p>
             <a:fld id="{5F76F78E-A200-421E-B0AA-A6018E81E55E}" type="datetime1">
               <a:rPr lang="en-US" smtClean="0"/>
-              <a:t>2016-09-30</a:t>
+              <a:t>2016-11-23</a:t>
             </a:fld>
             <a:endParaRPr lang="en-US"/>
           </a:p>
@@ -1564,7 +1564,7 @@
           <a:p>
             <a:fld id="{EBEC21EE-ED62-44E3-A586-FF0104F19B99}" type="datetime1">
               <a:rPr lang="en-US" smtClean="0"/>
-              <a:t>2016-09-30</a:t>
+              <a:t>2016-11-23</a:t>
             </a:fld>
             <a:endParaRPr lang="en-US"/>
           </a:p>
@@ -1796,7 +1796,7 @@
           <a:p>
             <a:fld id="{30049BC0-4C66-4CED-BC8E-7AF0BD49C9B5}" type="datetime1">
               <a:rPr lang="en-US" smtClean="0"/>
-              <a:t>2016-09-30</a:t>
+              <a:t>2016-11-23</a:t>
             </a:fld>
             <a:endParaRPr lang="en-US"/>
           </a:p>
@@ -2163,7 +2163,7 @@
           <a:p>
             <a:fld id="{C7C90E0A-53F1-4115-8AB2-2E28E481FF48}" type="datetime1">
               <a:rPr lang="en-US" smtClean="0"/>
-              <a:t>2016-09-30</a:t>
+              <a:t>2016-11-23</a:t>
             </a:fld>
             <a:endParaRPr lang="en-US"/>
           </a:p>
@@ -2281,7 +2281,7 @@
           <a:p>
             <a:fld id="{AF79CAB3-789B-4117-A859-FC7082686441}" type="datetime1">
               <a:rPr lang="en-US" smtClean="0"/>
-              <a:t>2016-09-30</a:t>
+              <a:t>2016-11-23</a:t>
             </a:fld>
             <a:endParaRPr lang="en-US"/>
           </a:p>
@@ -2376,7 +2376,7 @@
           <a:p>
             <a:fld id="{82AE2AC5-51ED-46C8-8F1B-788630EE802E}" type="datetime1">
               <a:rPr lang="en-US" smtClean="0"/>
-              <a:t>2016-09-30</a:t>
+              <a:t>2016-11-23</a:t>
             </a:fld>
             <a:endParaRPr lang="en-US"/>
           </a:p>
@@ -2653,7 +2653,7 @@
           <a:p>
             <a:fld id="{49D0F6DD-6796-44CA-AF4C-1B2A2288F444}" type="datetime1">
               <a:rPr lang="en-US" smtClean="0"/>
-              <a:t>2016-09-30</a:t>
+              <a:t>2016-11-23</a:t>
             </a:fld>
             <a:endParaRPr lang="en-US"/>
           </a:p>
@@ -2910,7 +2910,7 @@
           <a:p>
             <a:fld id="{57F6808E-F05D-421A-97B7-12B728993E3B}" type="datetime1">
               <a:rPr lang="en-US" smtClean="0"/>
-              <a:t>2016-09-30</a:t>
+              <a:t>2016-11-23</a:t>
             </a:fld>
             <a:endParaRPr lang="en-US"/>
           </a:p>
@@ -3123,7 +3123,7 @@
           <a:p>
             <a:fld id="{7B995810-2FB7-4DE8-B622-97729F9C53CB}" type="datetime1">
               <a:rPr lang="en-US" smtClean="0"/>
-              <a:t>2016-09-30</a:t>
+              <a:t>2016-11-23</a:t>
             </a:fld>
             <a:endParaRPr lang="en-US"/>
           </a:p>
@@ -4714,7 +4714,7 @@
             <a:graphicData uri="http://schemas.openxmlformats.org/presentationml/2006/ole">
               <mc:AlternateContent xmlns:mc="http://schemas.openxmlformats.org/markup-compatibility/2006">
                 <mc:Choice xmlns:v="urn:schemas-microsoft-com:vml" Requires="v">
-                  <p:oleObj spid="_x0000_s3131" name="Equation" r:id="rId3" imgW="1180800" imgH="228600" progId="Equation.3">
+                  <p:oleObj spid="_x0000_s3132" name="Equation" r:id="rId3" imgW="1180800" imgH="228600" progId="Equation.3">
                     <p:embed/>
                   </p:oleObj>
                 </mc:Choice>
@@ -6798,7 +6798,7 @@
             <a:graphicData uri="http://schemas.openxmlformats.org/presentationml/2006/ole">
               <mc:AlternateContent xmlns:mc="http://schemas.openxmlformats.org/markup-compatibility/2006">
                 <mc:Choice xmlns:v="urn:schemas-microsoft-com:vml" Requires="v">
-                  <p:oleObj spid="_x0000_s4148" name="Equation" r:id="rId3" imgW="419040" imgH="241200" progId="Equation.3">
+                  <p:oleObj spid="_x0000_s4149" name="Equation" r:id="rId3" imgW="419040" imgH="241200" progId="Equation.3">
                     <p:embed/>
                   </p:oleObj>
                 </mc:Choice>
@@ -9942,7 +9942,7 @@
             <a:graphicData uri="http://schemas.openxmlformats.org/presentationml/2006/ole">
               <mc:AlternateContent xmlns:mc="http://schemas.openxmlformats.org/markup-compatibility/2006">
                 <mc:Choice xmlns:v="urn:schemas-microsoft-com:vml" Requires="v">
-                  <p:oleObj spid="_x0000_s5197" name="Equation" r:id="rId3" imgW="444240" imgH="203040" progId="Equation.3">
+                  <p:oleObj spid="_x0000_s5199" name="Equation" r:id="rId3" imgW="444240" imgH="203040" progId="Equation.3">
                     <p:embed/>
                   </p:oleObj>
                 </mc:Choice>
@@ -10123,7 +10123,7 @@
             <a:graphicData uri="http://schemas.openxmlformats.org/presentationml/2006/ole">
               <mc:AlternateContent xmlns:mc="http://schemas.openxmlformats.org/markup-compatibility/2006">
                 <mc:Choice xmlns:v="urn:schemas-microsoft-com:vml" Requires="v">
-                  <p:oleObj spid="_x0000_s5198" name="Equation" r:id="rId5" imgW="419040" imgH="215640" progId="Equation.3">
+                  <p:oleObj spid="_x0000_s5200" name="Equation" r:id="rId5" imgW="419040" imgH="215640" progId="Equation.3">
                     <p:embed/>
                   </p:oleObj>
                 </mc:Choice>
@@ -11202,6 +11202,182 @@
           </a:p>
         </p:txBody>
       </p:sp>
+      <p:grpSp>
+        <p:nvGrpSpPr>
+          <p:cNvPr id="12" name="Group 11"/>
+          <p:cNvGrpSpPr/>
+          <p:nvPr/>
+        </p:nvGrpSpPr>
+        <p:grpSpPr>
+          <a:xfrm>
+            <a:off x="987137" y="5195455"/>
+            <a:ext cx="1508683" cy="639495"/>
+            <a:chOff x="987137" y="5195455"/>
+            <a:chExt cx="1508683" cy="639495"/>
+          </a:xfrm>
+        </p:grpSpPr>
+        <p:sp>
+          <p:nvSpPr>
+            <p:cNvPr id="5" name="TextBox 4"/>
+            <p:cNvSpPr txBox="1"/>
+            <p:nvPr/>
+          </p:nvSpPr>
+          <p:spPr>
+            <a:xfrm>
+              <a:off x="987137" y="5465618"/>
+              <a:ext cx="1508683" cy="369332"/>
+            </a:xfrm>
+            <a:prstGeom prst="rect">
+              <a:avLst/>
+            </a:prstGeom>
+            <a:noFill/>
+            <a:ln>
+              <a:solidFill>
+                <a:schemeClr val="tx1"/>
+              </a:solidFill>
+            </a:ln>
+          </p:spPr>
+          <p:txBody>
+            <a:bodyPr wrap="none" rtlCol="0">
+              <a:spAutoFit/>
+            </a:bodyPr>
+            <a:lstStyle/>
+            <a:p>
+              <a:r>
+                <a:rPr lang="en-US" dirty="0" smtClean="0"/>
+                <a:t>new elements</a:t>
+              </a:r>
+              <a:endParaRPr lang="en-US" dirty="0"/>
+            </a:p>
+          </p:txBody>
+        </p:sp>
+        <p:cxnSp>
+          <p:nvCxnSpPr>
+            <p:cNvPr id="8" name="Straight Arrow Connector 7"/>
+            <p:cNvCxnSpPr>
+              <a:stCxn id="5" idx="0"/>
+            </p:cNvCxnSpPr>
+            <p:nvPr/>
+          </p:nvCxnSpPr>
+          <p:spPr>
+            <a:xfrm flipV="1">
+              <a:off x="1741479" y="5195455"/>
+              <a:ext cx="263966" cy="270163"/>
+            </a:xfrm>
+            <a:prstGeom prst="straightConnector1">
+              <a:avLst/>
+            </a:prstGeom>
+            <a:ln>
+              <a:solidFill>
+                <a:schemeClr val="tx1"/>
+              </a:solidFill>
+              <a:tailEnd type="stealth" w="lg" len="lg"/>
+            </a:ln>
+          </p:spPr>
+          <p:style>
+            <a:lnRef idx="1">
+              <a:schemeClr val="accent1"/>
+            </a:lnRef>
+            <a:fillRef idx="0">
+              <a:schemeClr val="accent1"/>
+            </a:fillRef>
+            <a:effectRef idx="0">
+              <a:schemeClr val="accent1"/>
+            </a:effectRef>
+            <a:fontRef idx="minor">
+              <a:schemeClr val="tx1"/>
+            </a:fontRef>
+          </p:style>
+        </p:cxnSp>
+      </p:grpSp>
+      <p:grpSp>
+        <p:nvGrpSpPr>
+          <p:cNvPr id="13" name="Group 12"/>
+          <p:cNvGrpSpPr/>
+          <p:nvPr/>
+        </p:nvGrpSpPr>
+        <p:grpSpPr>
+          <a:xfrm>
+            <a:off x="3248890" y="5195456"/>
+            <a:ext cx="1819601" cy="639494"/>
+            <a:chOff x="3248890" y="5195456"/>
+            <a:chExt cx="1819601" cy="639494"/>
+          </a:xfrm>
+        </p:grpSpPr>
+        <p:sp>
+          <p:nvSpPr>
+            <p:cNvPr id="6" name="TextBox 5"/>
+            <p:cNvSpPr txBox="1"/>
+            <p:nvPr/>
+          </p:nvSpPr>
+          <p:spPr>
+            <a:xfrm>
+              <a:off x="3248890" y="5465618"/>
+              <a:ext cx="1819601" cy="369332"/>
+            </a:xfrm>
+            <a:prstGeom prst="rect">
+              <a:avLst/>
+            </a:prstGeom>
+            <a:noFill/>
+            <a:ln>
+              <a:solidFill>
+                <a:schemeClr val="tx1"/>
+              </a:solidFill>
+            </a:ln>
+          </p:spPr>
+          <p:txBody>
+            <a:bodyPr wrap="none" rtlCol="0">
+              <a:spAutoFit/>
+            </a:bodyPr>
+            <a:lstStyle/>
+            <a:p>
+              <a:r>
+                <a:rPr lang="en-US" dirty="0" smtClean="0"/>
+                <a:t>existing elements</a:t>
+              </a:r>
+              <a:endParaRPr lang="en-US" dirty="0"/>
+            </a:p>
+          </p:txBody>
+        </p:sp>
+        <p:cxnSp>
+          <p:nvCxnSpPr>
+            <p:cNvPr id="9" name="Straight Arrow Connector 8"/>
+            <p:cNvCxnSpPr>
+              <a:stCxn id="6" idx="0"/>
+            </p:cNvCxnSpPr>
+            <p:nvPr/>
+          </p:nvCxnSpPr>
+          <p:spPr>
+            <a:xfrm flipH="1" flipV="1">
+              <a:off x="3608651" y="5195456"/>
+              <a:ext cx="550040" cy="270162"/>
+            </a:xfrm>
+            <a:prstGeom prst="straightConnector1">
+              <a:avLst/>
+            </a:prstGeom>
+            <a:ln>
+              <a:solidFill>
+                <a:schemeClr val="tx1"/>
+              </a:solidFill>
+              <a:tailEnd type="stealth" w="lg" len="lg"/>
+            </a:ln>
+          </p:spPr>
+          <p:style>
+            <a:lnRef idx="1">
+              <a:schemeClr val="accent1"/>
+            </a:lnRef>
+            <a:fillRef idx="0">
+              <a:schemeClr val="accent1"/>
+            </a:fillRef>
+            <a:effectRef idx="0">
+              <a:schemeClr val="accent1"/>
+            </a:effectRef>
+            <a:fontRef idx="minor">
+              <a:schemeClr val="tx1"/>
+            </a:fontRef>
+          </p:style>
+        </p:cxnSp>
+      </p:grpSp>
     </p:spTree>
     <p:extLst>
       <p:ext uri="{BB962C8B-B14F-4D97-AF65-F5344CB8AC3E}">
@@ -11517,6 +11693,78 @@
                       </p:childTnLst>
                     </p:cTn>
                   </p:par>
+                  <p:par>
+                    <p:cTn id="27" fill="hold">
+                      <p:stCondLst>
+                        <p:cond delay="indefinite"/>
+                      </p:stCondLst>
+                      <p:childTnLst>
+                        <p:par>
+                          <p:cTn id="28" fill="hold">
+                            <p:stCondLst>
+                              <p:cond delay="0"/>
+                            </p:stCondLst>
+                            <p:childTnLst>
+                              <p:par>
+                                <p:cTn id="29" presetID="1" presetClass="entr" presetSubtype="0" fill="hold" nodeType="clickEffect">
+                                  <p:stCondLst>
+                                    <p:cond delay="0"/>
+                                  </p:stCondLst>
+                                  <p:childTnLst>
+                                    <p:set>
+                                      <p:cBhvr>
+                                        <p:cTn id="30" dur="1" fill="hold">
+                                          <p:stCondLst>
+                                            <p:cond delay="0"/>
+                                          </p:stCondLst>
+                                        </p:cTn>
+                                        <p:tgtEl>
+                                          <p:spTgt spid="12"/>
+                                        </p:tgtEl>
+                                        <p:attrNameLst>
+                                          <p:attrName>style.visibility</p:attrName>
+                                        </p:attrNameLst>
+                                      </p:cBhvr>
+                                      <p:to>
+                                        <p:strVal val="visible"/>
+                                      </p:to>
+                                    </p:set>
+                                  </p:childTnLst>
+                                </p:cTn>
+                              </p:par>
+                              <p:par>
+                                <p:cTn id="31" presetID="1" presetClass="entr" presetSubtype="0" fill="hold" nodeType="withEffect">
+                                  <p:stCondLst>
+                                    <p:cond delay="0"/>
+                                  </p:stCondLst>
+                                  <p:childTnLst>
+                                    <p:set>
+                                      <p:cBhvr>
+                                        <p:cTn id="32" dur="1" fill="hold">
+                                          <p:stCondLst>
+                                            <p:cond delay="0"/>
+                                          </p:stCondLst>
+                                        </p:cTn>
+                                        <p:tgtEl>
+                                          <p:spTgt spid="13"/>
+                                        </p:tgtEl>
+                                        <p:attrNameLst>
+                                          <p:attrName>style.visibility</p:attrName>
+                                        </p:attrNameLst>
+                                      </p:cBhvr>
+                                      <p:to>
+                                        <p:strVal val="visible"/>
+                                      </p:to>
+                                    </p:set>
+                                  </p:childTnLst>
+                                </p:cTn>
+                              </p:par>
+                            </p:childTnLst>
+                          </p:cTn>
+                        </p:par>
+                      </p:childTnLst>
+                    </p:cTn>
+                  </p:par>
                 </p:childTnLst>
               </p:cTn>
               <p:prevCondLst>
@@ -12512,7 +12760,7 @@
             <a:graphicData uri="http://schemas.openxmlformats.org/presentationml/2006/ole">
               <mc:AlternateContent xmlns:mc="http://schemas.openxmlformats.org/markup-compatibility/2006">
                 <mc:Choice xmlns:v="urn:schemas-microsoft-com:vml" Requires="v">
-                  <p:oleObj spid="_x0000_s6285" name="Equation" r:id="rId3" imgW="774360" imgH="215640" progId="Equation.3">
+                  <p:oleObj spid="_x0000_s6288" name="Equation" r:id="rId3" imgW="774360" imgH="215640" progId="Equation.3">
                     <p:embed/>
                   </p:oleObj>
                 </mc:Choice>
@@ -12744,7 +12992,7 @@
             <a:graphicData uri="http://schemas.openxmlformats.org/presentationml/2006/ole">
               <mc:AlternateContent xmlns:mc="http://schemas.openxmlformats.org/markup-compatibility/2006">
                 <mc:Choice xmlns:v="urn:schemas-microsoft-com:vml" Requires="v">
-                  <p:oleObj spid="_x0000_s6286" name="Equation" r:id="rId5" imgW="622080" imgH="215640" progId="Equation.3">
+                  <p:oleObj spid="_x0000_s6289" name="Equation" r:id="rId5" imgW="622080" imgH="215640" progId="Equation.3">
                     <p:embed/>
                   </p:oleObj>
                 </mc:Choice>
@@ -12801,7 +13049,7 @@
             <a:graphicData uri="http://schemas.openxmlformats.org/presentationml/2006/ole">
               <mc:AlternateContent xmlns:mc="http://schemas.openxmlformats.org/markup-compatibility/2006">
                 <mc:Choice xmlns:v="urn:schemas-microsoft-com:vml" Requires="v">
-                  <p:oleObj spid="_x0000_s6287" name="Equation" r:id="rId7" imgW="749160" imgH="215640" progId="Equation.3">
+                  <p:oleObj spid="_x0000_s6290" name="Equation" r:id="rId7" imgW="749160" imgH="215640" progId="Equation.3">
                     <p:embed/>
                   </p:oleObj>
                 </mc:Choice>
@@ -14276,6 +14524,182 @@
           </a:p>
         </p:txBody>
       </p:sp>
+      <p:grpSp>
+        <p:nvGrpSpPr>
+          <p:cNvPr id="5" name="Group 4"/>
+          <p:cNvGrpSpPr/>
+          <p:nvPr/>
+        </p:nvGrpSpPr>
+        <p:grpSpPr>
+          <a:xfrm>
+            <a:off x="924791" y="5746178"/>
+            <a:ext cx="1041311" cy="639494"/>
+            <a:chOff x="987137" y="5195456"/>
+            <a:chExt cx="1041311" cy="639494"/>
+          </a:xfrm>
+        </p:grpSpPr>
+        <p:sp>
+          <p:nvSpPr>
+            <p:cNvPr id="6" name="TextBox 5"/>
+            <p:cNvSpPr txBox="1"/>
+            <p:nvPr/>
+          </p:nvSpPr>
+          <p:spPr>
+            <a:xfrm>
+              <a:off x="987137" y="5465618"/>
+              <a:ext cx="1041311" cy="369332"/>
+            </a:xfrm>
+            <a:prstGeom prst="rect">
+              <a:avLst/>
+            </a:prstGeom>
+            <a:noFill/>
+            <a:ln>
+              <a:solidFill>
+                <a:schemeClr val="tx1"/>
+              </a:solidFill>
+            </a:ln>
+          </p:spPr>
+          <p:txBody>
+            <a:bodyPr wrap="none" rtlCol="0">
+              <a:spAutoFit/>
+            </a:bodyPr>
+            <a:lstStyle/>
+            <a:p>
+              <a:r>
+                <a:rPr lang="en-US" dirty="0" smtClean="0"/>
+                <a:t>new keys</a:t>
+              </a:r>
+              <a:endParaRPr lang="en-US" dirty="0"/>
+            </a:p>
+          </p:txBody>
+        </p:sp>
+        <p:cxnSp>
+          <p:nvCxnSpPr>
+            <p:cNvPr id="7" name="Straight Arrow Connector 6"/>
+            <p:cNvCxnSpPr>
+              <a:stCxn id="6" idx="0"/>
+            </p:cNvCxnSpPr>
+            <p:nvPr/>
+          </p:nvCxnSpPr>
+          <p:spPr>
+            <a:xfrm flipV="1">
+              <a:off x="1507793" y="5195456"/>
+              <a:ext cx="497652" cy="270162"/>
+            </a:xfrm>
+            <a:prstGeom prst="straightConnector1">
+              <a:avLst/>
+            </a:prstGeom>
+            <a:ln>
+              <a:solidFill>
+                <a:schemeClr val="tx1"/>
+              </a:solidFill>
+              <a:tailEnd type="stealth" w="lg" len="lg"/>
+            </a:ln>
+          </p:spPr>
+          <p:style>
+            <a:lnRef idx="1">
+              <a:schemeClr val="accent1"/>
+            </a:lnRef>
+            <a:fillRef idx="0">
+              <a:schemeClr val="accent1"/>
+            </a:fillRef>
+            <a:effectRef idx="0">
+              <a:schemeClr val="accent1"/>
+            </a:effectRef>
+            <a:fontRef idx="minor">
+              <a:schemeClr val="tx1"/>
+            </a:fontRef>
+          </p:style>
+        </p:cxnSp>
+      </p:grpSp>
+      <p:grpSp>
+        <p:nvGrpSpPr>
+          <p:cNvPr id="8" name="Group 7"/>
+          <p:cNvGrpSpPr/>
+          <p:nvPr/>
+        </p:nvGrpSpPr>
+        <p:grpSpPr>
+          <a:xfrm>
+            <a:off x="3186544" y="5746178"/>
+            <a:ext cx="1352230" cy="639494"/>
+            <a:chOff x="3248890" y="5195456"/>
+            <a:chExt cx="1352230" cy="639494"/>
+          </a:xfrm>
+        </p:grpSpPr>
+        <p:sp>
+          <p:nvSpPr>
+            <p:cNvPr id="9" name="TextBox 8"/>
+            <p:cNvSpPr txBox="1"/>
+            <p:nvPr/>
+          </p:nvSpPr>
+          <p:spPr>
+            <a:xfrm>
+              <a:off x="3248890" y="5465618"/>
+              <a:ext cx="1352230" cy="369332"/>
+            </a:xfrm>
+            <a:prstGeom prst="rect">
+              <a:avLst/>
+            </a:prstGeom>
+            <a:noFill/>
+            <a:ln>
+              <a:solidFill>
+                <a:schemeClr val="tx1"/>
+              </a:solidFill>
+            </a:ln>
+          </p:spPr>
+          <p:txBody>
+            <a:bodyPr wrap="none" rtlCol="0">
+              <a:spAutoFit/>
+            </a:bodyPr>
+            <a:lstStyle/>
+            <a:p>
+              <a:r>
+                <a:rPr lang="en-US" dirty="0" smtClean="0"/>
+                <a:t>existing keys</a:t>
+              </a:r>
+              <a:endParaRPr lang="en-US" dirty="0"/>
+            </a:p>
+          </p:txBody>
+        </p:sp>
+        <p:cxnSp>
+          <p:nvCxnSpPr>
+            <p:cNvPr id="10" name="Straight Arrow Connector 9"/>
+            <p:cNvCxnSpPr>
+              <a:stCxn id="9" idx="0"/>
+            </p:cNvCxnSpPr>
+            <p:nvPr/>
+          </p:nvCxnSpPr>
+          <p:spPr>
+            <a:xfrm flipH="1" flipV="1">
+              <a:off x="3608651" y="5195456"/>
+              <a:ext cx="316354" cy="270162"/>
+            </a:xfrm>
+            <a:prstGeom prst="straightConnector1">
+              <a:avLst/>
+            </a:prstGeom>
+            <a:ln>
+              <a:solidFill>
+                <a:schemeClr val="tx1"/>
+              </a:solidFill>
+              <a:tailEnd type="stealth" w="lg" len="lg"/>
+            </a:ln>
+          </p:spPr>
+          <p:style>
+            <a:lnRef idx="1">
+              <a:schemeClr val="accent1"/>
+            </a:lnRef>
+            <a:fillRef idx="0">
+              <a:schemeClr val="accent1"/>
+            </a:fillRef>
+            <a:effectRef idx="0">
+              <a:schemeClr val="accent1"/>
+            </a:effectRef>
+            <a:fontRef idx="minor">
+              <a:schemeClr val="tx1"/>
+            </a:fontRef>
+          </p:style>
+        </p:cxnSp>
+      </p:grpSp>
     </p:spTree>
     <p:extLst>
       <p:ext uri="{BB962C8B-B14F-4D97-AF65-F5344CB8AC3E}">
@@ -14640,6 +15064,78 @@
                       </p:childTnLst>
                     </p:cTn>
                   </p:par>
+                  <p:par>
+                    <p:cTn id="31" fill="hold">
+                      <p:stCondLst>
+                        <p:cond delay="indefinite"/>
+                      </p:stCondLst>
+                      <p:childTnLst>
+                        <p:par>
+                          <p:cTn id="32" fill="hold">
+                            <p:stCondLst>
+                              <p:cond delay="0"/>
+                            </p:stCondLst>
+                            <p:childTnLst>
+                              <p:par>
+                                <p:cTn id="33" presetID="1" presetClass="entr" presetSubtype="0" fill="hold" nodeType="clickEffect">
+                                  <p:stCondLst>
+                                    <p:cond delay="0"/>
+                                  </p:stCondLst>
+                                  <p:childTnLst>
+                                    <p:set>
+                                      <p:cBhvr>
+                                        <p:cTn id="34" dur="1" fill="hold">
+                                          <p:stCondLst>
+                                            <p:cond delay="0"/>
+                                          </p:stCondLst>
+                                        </p:cTn>
+                                        <p:tgtEl>
+                                          <p:spTgt spid="5"/>
+                                        </p:tgtEl>
+                                        <p:attrNameLst>
+                                          <p:attrName>style.visibility</p:attrName>
+                                        </p:attrNameLst>
+                                      </p:cBhvr>
+                                      <p:to>
+                                        <p:strVal val="visible"/>
+                                      </p:to>
+                                    </p:set>
+                                  </p:childTnLst>
+                                </p:cTn>
+                              </p:par>
+                              <p:par>
+                                <p:cTn id="35" presetID="1" presetClass="entr" presetSubtype="0" fill="hold" nodeType="withEffect">
+                                  <p:stCondLst>
+                                    <p:cond delay="0"/>
+                                  </p:stCondLst>
+                                  <p:childTnLst>
+                                    <p:set>
+                                      <p:cBhvr>
+                                        <p:cTn id="36" dur="1" fill="hold">
+                                          <p:stCondLst>
+                                            <p:cond delay="0"/>
+                                          </p:stCondLst>
+                                        </p:cTn>
+                                        <p:tgtEl>
+                                          <p:spTgt spid="8"/>
+                                        </p:tgtEl>
+                                        <p:attrNameLst>
+                                          <p:attrName>style.visibility</p:attrName>
+                                        </p:attrNameLst>
+                                      </p:cBhvr>
+                                      <p:to>
+                                        <p:strVal val="visible"/>
+                                      </p:to>
+                                    </p:set>
+                                  </p:childTnLst>
+                                </p:cTn>
+                              </p:par>
+                            </p:childTnLst>
+                          </p:cTn>
+                        </p:par>
+                      </p:childTnLst>
+                    </p:cTn>
+                  </p:par>
                 </p:childTnLst>
               </p:cTn>
               <p:prevCondLst>
@@ -15633,7 +16129,6 @@
               <a:rPr lang="en-US" dirty="0" smtClean="0"/>
               <a:t>queue, priority queue</a:t>
             </a:r>
-            <a:endParaRPr lang="en-US" dirty="0" smtClean="0"/>
           </a:p>
           <a:p>
             <a:pPr lvl="1"/>
@@ -15903,7 +16398,7 @@
             <a:graphicData uri="http://schemas.openxmlformats.org/presentationml/2006/ole">
               <mc:AlternateContent xmlns:mc="http://schemas.openxmlformats.org/markup-compatibility/2006">
                 <mc:Choice xmlns:v="urn:schemas-microsoft-com:vml" Requires="v">
-                  <p:oleObj spid="_x0000_s7197" name="Equation" r:id="rId3" imgW="431640" imgH="241200" progId="Equation.3">
+                  <p:oleObj spid="_x0000_s7198" name="Equation" r:id="rId3" imgW="431640" imgH="241200" progId="Equation.3">
                     <p:embed/>
                   </p:oleObj>
                 </mc:Choice>
@@ -16888,13 +17383,8 @@
             <a:pPr lvl="1"/>
             <a:r>
               <a:rPr lang="en-US" dirty="0" smtClean="0"/>
-              <a:t>access: </a:t>
-            </a:r>
-            <a:r>
-              <a:rPr lang="en-US" dirty="0" smtClean="0"/>
-              <a:t>front to pop and back to push</a:t>
-            </a:r>
-            <a:endParaRPr lang="en-US" dirty="0" smtClean="0"/>
+              <a:t>access: front to pop and back to push</a:t>
+            </a:r>
           </a:p>
           <a:p>
             <a:pPr lvl="1"/>
@@ -17045,7 +17535,7 @@
             <a:graphicData uri="http://schemas.openxmlformats.org/presentationml/2006/ole">
               <mc:AlternateContent xmlns:mc="http://schemas.openxmlformats.org/markup-compatibility/2006">
                 <mc:Choice xmlns:v="urn:schemas-microsoft-com:vml" Requires="v">
-                  <p:oleObj spid="_x0000_s8229" name="Equation" r:id="rId3" imgW="444240" imgH="241200" progId="Equation.3">
+                  <p:oleObj spid="_x0000_s8230" name="Equation" r:id="rId3" imgW="444240" imgH="241200" progId="Equation.3">
                     <p:embed/>
                   </p:oleObj>
                 </mc:Choice>
@@ -18882,13 +19372,8 @@
             <a:pPr lvl="1"/>
             <a:r>
               <a:rPr lang="en-US" dirty="0" smtClean="0"/>
-              <a:t>access: only </a:t>
-            </a:r>
-            <a:r>
-              <a:rPr lang="en-US" dirty="0" smtClean="0"/>
-              <a:t>front to pop, push inserts in order</a:t>
-            </a:r>
-            <a:endParaRPr lang="en-US" dirty="0" smtClean="0"/>
+              <a:t>access: only front to pop, push inserts in order</a:t>
+            </a:r>
           </a:p>
           <a:p>
             <a:pPr lvl="1"/>
@@ -18896,7 +19381,6 @@
               <a:rPr lang="en-US" dirty="0" smtClean="0"/>
               <a:t>ordered according to priority</a:t>
             </a:r>
-            <a:endParaRPr lang="en-US" dirty="0" smtClean="0"/>
           </a:p>
           <a:p>
             <a:pPr lvl="1"/>
@@ -18909,17 +19393,8 @@
             <a:pPr lvl="1"/>
             <a:r>
               <a:rPr lang="en-US" dirty="0" smtClean="0"/>
-              <a:t>front: </a:t>
-            </a:r>
-            <a:r>
-              <a:rPr lang="en-US" dirty="0" smtClean="0"/>
-              <a:t>O(1</a:t>
-            </a:r>
-            <a:r>
-              <a:rPr lang="en-US" dirty="0" smtClean="0"/>
-              <a:t>), pop/push: O(log n)</a:t>
-            </a:r>
-            <a:endParaRPr lang="en-US" dirty="0" smtClean="0"/>
+              <a:t>front: O(1), pop/push: O(log n)</a:t>
+            </a:r>
           </a:p>
           <a:p>
             <a:pPr lvl="1"/>
@@ -18948,7 +19423,6 @@
               <a:rPr lang="en-US" dirty="0" smtClean="0"/>
               <a:t>as heap</a:t>
             </a:r>
-            <a:endParaRPr lang="en-US" dirty="0" smtClean="0"/>
           </a:p>
           <a:p>
             <a:pPr lvl="1"/>
@@ -18973,11 +19447,7 @@
           <a:p>
             <a:r>
               <a:rPr lang="en-US" dirty="0" smtClean="0"/>
-              <a:t>Priority q</a:t>
-            </a:r>
-            <a:r>
-              <a:rPr lang="en-US" dirty="0" smtClean="0"/>
-              <a:t>ueue</a:t>
+              <a:t>Priority queue</a:t>
             </a:r>
             <a:endParaRPr lang="en-US" dirty="0"/>
           </a:p>
@@ -19038,7 +19508,7 @@
             <a:graphicData uri="http://schemas.openxmlformats.org/presentationml/2006/ole">
               <mc:AlternateContent xmlns:mc="http://schemas.openxmlformats.org/markup-compatibility/2006">
                 <mc:Choice xmlns:v="urn:schemas-microsoft-com:vml" Requires="v">
-                  <p:oleObj spid="_x0000_s10246" name="Equation" r:id="rId3" imgW="444240" imgH="241200" progId="Equation.3">
+                  <p:oleObj spid="_x0000_s10247" name="Equation" r:id="rId3" imgW="444240" imgH="241200" progId="Equation.3">
                     <p:embed/>
                   </p:oleObj>
                 </mc:Choice>
@@ -19778,15 +20248,7 @@
           <a:p>
             <a:r>
               <a:rPr lang="en-US" dirty="0" smtClean="0"/>
-              <a:t>Priority q</a:t>
-            </a:r>
-            <a:r>
-              <a:rPr lang="en-US" dirty="0" smtClean="0"/>
-              <a:t>ueue </a:t>
-            </a:r>
-            <a:r>
-              <a:rPr lang="en-US" dirty="0" smtClean="0"/>
-              <a:t>ADT</a:t>
+              <a:t>Priority queue ADT</a:t>
             </a:r>
             <a:endParaRPr lang="en-US" dirty="0"/>
           </a:p>
@@ -20158,7 +20620,7 @@
             <a:graphicData uri="http://schemas.openxmlformats.org/presentationml/2006/ole">
               <mc:AlternateContent xmlns:mc="http://schemas.openxmlformats.org/markup-compatibility/2006">
                 <mc:Choice xmlns:v="urn:schemas-microsoft-com:vml" Requires="v">
-                  <p:oleObj spid="_x0000_s9243" name="Equation" r:id="rId3" imgW="1104840" imgH="215640" progId="Equation.3">
+                  <p:oleObj spid="_x0000_s9244" name="Equation" r:id="rId3" imgW="1104840" imgH="215640" progId="Equation.3">
                     <p:embed/>
                   </p:oleObj>
                 </mc:Choice>
@@ -26876,7 +27338,7 @@
           <a:graphicData uri="http://schemas.openxmlformats.org/presentationml/2006/ole">
             <mc:AlternateContent xmlns:mc="http://schemas.openxmlformats.org/markup-compatibility/2006">
               <mc:Choice xmlns:v="urn:schemas-microsoft-com:vml" Requires="v">
-                <p:oleObj spid="_x0000_s1084" name="Equation" r:id="rId4" imgW="1841400" imgH="215640" progId="Equation.3">
+                <p:oleObj spid="_x0000_s1085" name="Equation" r:id="rId4" imgW="1841400" imgH="215640" progId="Equation.3">
                   <p:embed/>
                 </p:oleObj>
               </mc:Choice>
@@ -28478,7 +28940,7 @@
             <a:graphicData uri="http://schemas.openxmlformats.org/presentationml/2006/ole">
               <mc:AlternateContent xmlns:mc="http://schemas.openxmlformats.org/markup-compatibility/2006">
                 <mc:Choice xmlns:v="urn:schemas-microsoft-com:vml" Requires="v">
-                  <p:oleObj spid="_x0000_s2107" name="Equation" r:id="rId3" imgW="1409400" imgH="203040" progId="Equation.3">
+                  <p:oleObj spid="_x0000_s2108" name="Equation" r:id="rId3" imgW="1409400" imgH="203040" progId="Equation.3">
                     <p:embed/>
                   </p:oleObj>
                 </mc:Choice>

</xml_diff>

<commit_message>
Added Java data structure examples
</commit_message>
<xml_diff>
--- a/DataStructures/data_structures.pptx
+++ b/DataStructures/data_structures.pptx
@@ -4803,7 +4803,7 @@
             <a:graphicData uri="http://schemas.openxmlformats.org/presentationml/2006/ole">
               <mc:AlternateContent xmlns:mc="http://schemas.openxmlformats.org/markup-compatibility/2006">
                 <mc:Choice xmlns:v="urn:schemas-microsoft-com:vml" Requires="v">
-                  <p:oleObj spid="_x0000_s3145" name="Equation" r:id="rId3" imgW="1180800" imgH="228600" progId="Equation.3">
+                  <p:oleObj spid="_x0000_s3146" name="Equation" r:id="rId3" imgW="1180800" imgH="228600" progId="Equation.3">
                     <p:embed/>
                   </p:oleObj>
                 </mc:Choice>
@@ -7320,7 +7320,7 @@
             <a:graphicData uri="http://schemas.openxmlformats.org/presentationml/2006/ole">
               <mc:AlternateContent xmlns:mc="http://schemas.openxmlformats.org/markup-compatibility/2006">
                 <mc:Choice xmlns:v="urn:schemas-microsoft-com:vml" Requires="v">
-                  <p:oleObj spid="_x0000_s4162" name="Equation" r:id="rId3" imgW="419040" imgH="241200" progId="Equation.3">
+                  <p:oleObj spid="_x0000_s4163" name="Equation" r:id="rId3" imgW="419040" imgH="241200" progId="Equation.3">
                     <p:embed/>
                   </p:oleObj>
                 </mc:Choice>
@@ -10928,7 +10928,7 @@
             <a:graphicData uri="http://schemas.openxmlformats.org/presentationml/2006/ole">
               <mc:AlternateContent xmlns:mc="http://schemas.openxmlformats.org/markup-compatibility/2006">
                 <mc:Choice xmlns:v="urn:schemas-microsoft-com:vml" Requires="v">
-                  <p:oleObj spid="_x0000_s5225" name="Equation" r:id="rId3" imgW="444240" imgH="203040" progId="Equation.3">
+                  <p:oleObj spid="_x0000_s5227" name="Equation" r:id="rId3" imgW="444240" imgH="203040" progId="Equation.3">
                     <p:embed/>
                   </p:oleObj>
                 </mc:Choice>
@@ -11109,7 +11109,7 @@
             <a:graphicData uri="http://schemas.openxmlformats.org/presentationml/2006/ole">
               <mc:AlternateContent xmlns:mc="http://schemas.openxmlformats.org/markup-compatibility/2006">
                 <mc:Choice xmlns:v="urn:schemas-microsoft-com:vml" Requires="v">
-                  <p:oleObj spid="_x0000_s5226" name="Equation" r:id="rId5" imgW="419040" imgH="215640" progId="Equation.3">
+                  <p:oleObj spid="_x0000_s5228" name="Equation" r:id="rId5" imgW="419040" imgH="215640" progId="Equation.3">
                     <p:embed/>
                   </p:oleObj>
                 </mc:Choice>
@@ -14000,7 +14000,7 @@
             <a:graphicData uri="http://schemas.openxmlformats.org/presentationml/2006/ole">
               <mc:AlternateContent xmlns:mc="http://schemas.openxmlformats.org/markup-compatibility/2006">
                 <mc:Choice xmlns:v="urn:schemas-microsoft-com:vml" Requires="v">
-                  <p:oleObj spid="_x0000_s6327" name="Equation" r:id="rId3" imgW="774360" imgH="215640" progId="Equation.3">
+                  <p:oleObj spid="_x0000_s6330" name="Equation" r:id="rId3" imgW="774360" imgH="215640" progId="Equation.3">
                     <p:embed/>
                   </p:oleObj>
                 </mc:Choice>
@@ -14232,7 +14232,7 @@
             <a:graphicData uri="http://schemas.openxmlformats.org/presentationml/2006/ole">
               <mc:AlternateContent xmlns:mc="http://schemas.openxmlformats.org/markup-compatibility/2006">
                 <mc:Choice xmlns:v="urn:schemas-microsoft-com:vml" Requires="v">
-                  <p:oleObj spid="_x0000_s6328" name="Equation" r:id="rId5" imgW="622080" imgH="215640" progId="Equation.3">
+                  <p:oleObj spid="_x0000_s6331" name="Equation" r:id="rId5" imgW="622080" imgH="215640" progId="Equation.3">
                     <p:embed/>
                   </p:oleObj>
                 </mc:Choice>
@@ -14289,7 +14289,7 @@
             <a:graphicData uri="http://schemas.openxmlformats.org/presentationml/2006/ole">
               <mc:AlternateContent xmlns:mc="http://schemas.openxmlformats.org/markup-compatibility/2006">
                 <mc:Choice xmlns:v="urn:schemas-microsoft-com:vml" Requires="v">
-                  <p:oleObj spid="_x0000_s6329" name="Equation" r:id="rId7" imgW="749160" imgH="215640" progId="Equation.3">
+                  <p:oleObj spid="_x0000_s6332" name="Equation" r:id="rId7" imgW="749160" imgH="215640" progId="Equation.3">
                     <p:embed/>
                   </p:oleObj>
                 </mc:Choice>
@@ -18649,7 +18649,7 @@
             <a:graphicData uri="http://schemas.openxmlformats.org/presentationml/2006/ole">
               <mc:AlternateContent xmlns:mc="http://schemas.openxmlformats.org/markup-compatibility/2006">
                 <mc:Choice xmlns:v="urn:schemas-microsoft-com:vml" Requires="v">
-                  <p:oleObj spid="_x0000_s7211" name="Equation" r:id="rId3" imgW="431640" imgH="241200" progId="Equation.3">
+                  <p:oleObj spid="_x0000_s7212" name="Equation" r:id="rId3" imgW="431640" imgH="241200" progId="Equation.3">
                     <p:embed/>
                   </p:oleObj>
                 </mc:Choice>
@@ -19786,7 +19786,7 @@
             <a:graphicData uri="http://schemas.openxmlformats.org/presentationml/2006/ole">
               <mc:AlternateContent xmlns:mc="http://schemas.openxmlformats.org/markup-compatibility/2006">
                 <mc:Choice xmlns:v="urn:schemas-microsoft-com:vml" Requires="v">
-                  <p:oleObj spid="_x0000_s8243" name="Equation" r:id="rId3" imgW="444240" imgH="241200" progId="Equation.3">
+                  <p:oleObj spid="_x0000_s8244" name="Equation" r:id="rId3" imgW="444240" imgH="241200" progId="Equation.3">
                     <p:embed/>
                   </p:oleObj>
                 </mc:Choice>
@@ -21128,7 +21128,7 @@
             <a:graphicData uri="http://schemas.openxmlformats.org/presentationml/2006/ole">
               <mc:AlternateContent xmlns:mc="http://schemas.openxmlformats.org/markup-compatibility/2006">
                 <mc:Choice xmlns:v="urn:schemas-microsoft-com:vml" Requires="v">
-                  <p:oleObj spid="_x0000_s10260" name="Equation" r:id="rId3" imgW="444240" imgH="241200" progId="Equation.3">
+                  <p:oleObj spid="_x0000_s10261" name="Equation" r:id="rId3" imgW="444240" imgH="241200" progId="Equation.3">
                     <p:embed/>
                   </p:oleObj>
                 </mc:Choice>
@@ -22240,7 +22240,7 @@
             <a:graphicData uri="http://schemas.openxmlformats.org/presentationml/2006/ole">
               <mc:AlternateContent xmlns:mc="http://schemas.openxmlformats.org/markup-compatibility/2006">
                 <mc:Choice xmlns:v="urn:schemas-microsoft-com:vml" Requires="v">
-                  <p:oleObj spid="_x0000_s9257" name="Equation" r:id="rId3" imgW="1104840" imgH="215640" progId="Equation.3">
+                  <p:oleObj spid="_x0000_s9258" name="Equation" r:id="rId3" imgW="1104840" imgH="215640" progId="Equation.3">
                     <p:embed/>
                   </p:oleObj>
                 </mc:Choice>
@@ -29071,7 +29071,7 @@
           <a:graphicData uri="http://schemas.openxmlformats.org/presentationml/2006/ole">
             <mc:AlternateContent xmlns:mc="http://schemas.openxmlformats.org/markup-compatibility/2006">
               <mc:Choice xmlns:v="urn:schemas-microsoft-com:vml" Requires="v">
-                <p:oleObj spid="_x0000_s1098" name="Equation" r:id="rId4" imgW="1841400" imgH="215640" progId="Equation.3">
+                <p:oleObj spid="_x0000_s1099" name="Equation" r:id="rId4" imgW="1841400" imgH="215640" progId="Equation.3">
                   <p:embed/>
                 </p:oleObj>
               </mc:Choice>
@@ -30673,7 +30673,7 @@
             <a:graphicData uri="http://schemas.openxmlformats.org/presentationml/2006/ole">
               <mc:AlternateContent xmlns:mc="http://schemas.openxmlformats.org/markup-compatibility/2006">
                 <mc:Choice xmlns:v="urn:schemas-microsoft-com:vml" Requires="v">
-                  <p:oleObj spid="_x0000_s2121" name="Equation" r:id="rId3" imgW="1409400" imgH="203040" progId="Equation.3">
+                  <p:oleObj spid="_x0000_s2122" name="Equation" r:id="rId3" imgW="1409400" imgH="203040" progId="Equation.3">
                     <p:embed/>
                   </p:oleObj>
                 </mc:Choice>

</xml_diff>

<commit_message>
Added Java code samples for stack and queue
</commit_message>
<xml_diff>
--- a/DataStructures/data_structures.pptx
+++ b/DataStructures/data_structures.pptx
@@ -5,7 +5,7 @@
     <p:sldMasterId id="2147483660" r:id="rId1"/>
   </p:sldMasterIdLst>
   <p:notesMasterIdLst>
-    <p:notesMasterId r:id="rId43"/>
+    <p:notesMasterId r:id="rId45"/>
   </p:notesMasterIdLst>
   <p:sldIdLst>
     <p:sldId id="256" r:id="rId2"/>
@@ -40,15 +40,17 @@
     <p:sldId id="275" r:id="rId31"/>
     <p:sldId id="281" r:id="rId32"/>
     <p:sldId id="282" r:id="rId33"/>
-    <p:sldId id="284" r:id="rId34"/>
-    <p:sldId id="283" r:id="rId35"/>
-    <p:sldId id="285" r:id="rId36"/>
-    <p:sldId id="292" r:id="rId37"/>
-    <p:sldId id="293" r:id="rId38"/>
-    <p:sldId id="286" r:id="rId39"/>
-    <p:sldId id="287" r:id="rId40"/>
-    <p:sldId id="289" r:id="rId41"/>
-    <p:sldId id="288" r:id="rId42"/>
+    <p:sldId id="298" r:id="rId34"/>
+    <p:sldId id="284" r:id="rId35"/>
+    <p:sldId id="283" r:id="rId36"/>
+    <p:sldId id="285" r:id="rId37"/>
+    <p:sldId id="299" r:id="rId38"/>
+    <p:sldId id="292" r:id="rId39"/>
+    <p:sldId id="293" r:id="rId40"/>
+    <p:sldId id="286" r:id="rId41"/>
+    <p:sldId id="287" r:id="rId42"/>
+    <p:sldId id="289" r:id="rId43"/>
+    <p:sldId id="288" r:id="rId44"/>
   </p:sldIdLst>
   <p:sldSz cx="9144000" cy="6858000" type="screen4x3"/>
   <p:notesSz cx="6858000" cy="9144000"/>
@@ -4803,7 +4805,7 @@
             <a:graphicData uri="http://schemas.openxmlformats.org/presentationml/2006/ole">
               <mc:AlternateContent xmlns:mc="http://schemas.openxmlformats.org/markup-compatibility/2006">
                 <mc:Choice xmlns:v="urn:schemas-microsoft-com:vml" Requires="v">
-                  <p:oleObj spid="_x0000_s3146" name="Equation" r:id="rId3" imgW="1180800" imgH="228600" progId="Equation.3">
+                  <p:oleObj spid="_x0000_s3152" name="Equation" r:id="rId3" imgW="1180800" imgH="228600" progId="Equation.3">
                     <p:embed/>
                   </p:oleObj>
                 </mc:Choice>
@@ -7320,7 +7322,7 @@
             <a:graphicData uri="http://schemas.openxmlformats.org/presentationml/2006/ole">
               <mc:AlternateContent xmlns:mc="http://schemas.openxmlformats.org/markup-compatibility/2006">
                 <mc:Choice xmlns:v="urn:schemas-microsoft-com:vml" Requires="v">
-                  <p:oleObj spid="_x0000_s4163" name="Equation" r:id="rId3" imgW="419040" imgH="241200" progId="Equation.3">
+                  <p:oleObj spid="_x0000_s4169" name="Equation" r:id="rId3" imgW="419040" imgH="241200" progId="Equation.3">
                     <p:embed/>
                   </p:oleObj>
                 </mc:Choice>
@@ -9922,13 +9924,34 @@
                 <a:latin typeface="Courier New" panose="02070309020205020404" pitchFamily="49" charset="0"/>
                 <a:cs typeface="Courier New" panose="02070309020205020404" pitchFamily="49" charset="0"/>
               </a:rPr>
-              <a:t>for (</a:t>
+              <a:t>for </a:t>
+            </a:r>
+            <a:r>
+              <a:rPr lang="en-US" dirty="0" smtClean="0">
+                <a:latin typeface="Courier New" panose="02070309020205020404" pitchFamily="49" charset="0"/>
+                <a:cs typeface="Courier New" panose="02070309020205020404" pitchFamily="49" charset="0"/>
+              </a:rPr>
+              <a:t>(</a:t>
             </a:r>
             <a:r>
               <a:rPr lang="en-US" dirty="0" err="1" smtClean="0">
                 <a:latin typeface="Courier New" panose="02070309020205020404" pitchFamily="49" charset="0"/>
                 <a:cs typeface="Courier New" panose="02070309020205020404" pitchFamily="49" charset="0"/>
               </a:rPr>
+              <a:t>int</a:t>
+            </a:r>
+            <a:r>
+              <a:rPr lang="en-US" dirty="0" smtClean="0">
+                <a:latin typeface="Courier New" panose="02070309020205020404" pitchFamily="49" charset="0"/>
+                <a:cs typeface="Courier New" panose="02070309020205020404" pitchFamily="49" charset="0"/>
+              </a:rPr>
+              <a:t> </a:t>
+            </a:r>
+            <a:r>
+              <a:rPr lang="en-US" dirty="0" err="1" smtClean="0">
+                <a:latin typeface="Courier New" panose="02070309020205020404" pitchFamily="49" charset="0"/>
+                <a:cs typeface="Courier New" panose="02070309020205020404" pitchFamily="49" charset="0"/>
+              </a:rPr>
               <a:t>i</a:t>
             </a:r>
             <a:r>
@@ -9936,7 +9959,14 @@
                 <a:latin typeface="Courier New" panose="02070309020205020404" pitchFamily="49" charset="0"/>
                 <a:cs typeface="Courier New" panose="02070309020205020404" pitchFamily="49" charset="0"/>
               </a:rPr>
-              <a:t> = 0; </a:t>
+              <a:t> </a:t>
+            </a:r>
+            <a:r>
+              <a:rPr lang="en-US" dirty="0" smtClean="0">
+                <a:latin typeface="Courier New" panose="02070309020205020404" pitchFamily="49" charset="0"/>
+                <a:cs typeface="Courier New" panose="02070309020205020404" pitchFamily="49" charset="0"/>
+              </a:rPr>
+              <a:t>= 0; </a:t>
             </a:r>
             <a:r>
               <a:rPr lang="en-US" dirty="0" err="1" smtClean="0">
@@ -10928,7 +10958,7 @@
             <a:graphicData uri="http://schemas.openxmlformats.org/presentationml/2006/ole">
               <mc:AlternateContent xmlns:mc="http://schemas.openxmlformats.org/markup-compatibility/2006">
                 <mc:Choice xmlns:v="urn:schemas-microsoft-com:vml" Requires="v">
-                  <p:oleObj spid="_x0000_s5227" name="Equation" r:id="rId3" imgW="444240" imgH="203040" progId="Equation.3">
+                  <p:oleObj spid="_x0000_s5239" name="Equation" r:id="rId3" imgW="444240" imgH="203040" progId="Equation.3">
                     <p:embed/>
                   </p:oleObj>
                 </mc:Choice>
@@ -11109,7 +11139,7 @@
             <a:graphicData uri="http://schemas.openxmlformats.org/presentationml/2006/ole">
               <mc:AlternateContent xmlns:mc="http://schemas.openxmlformats.org/markup-compatibility/2006">
                 <mc:Choice xmlns:v="urn:schemas-microsoft-com:vml" Requires="v">
-                  <p:oleObj spid="_x0000_s5228" name="Equation" r:id="rId5" imgW="419040" imgH="215640" progId="Equation.3">
+                  <p:oleObj spid="_x0000_s5240" name="Equation" r:id="rId5" imgW="419040" imgH="215640" progId="Equation.3">
                     <p:embed/>
                   </p:oleObj>
                 </mc:Choice>
@@ -14000,7 +14030,7 @@
             <a:graphicData uri="http://schemas.openxmlformats.org/presentationml/2006/ole">
               <mc:AlternateContent xmlns:mc="http://schemas.openxmlformats.org/markup-compatibility/2006">
                 <mc:Choice xmlns:v="urn:schemas-microsoft-com:vml" Requires="v">
-                  <p:oleObj spid="_x0000_s6330" name="Equation" r:id="rId3" imgW="774360" imgH="215640" progId="Equation.3">
+                  <p:oleObj spid="_x0000_s6348" name="Equation" r:id="rId3" imgW="774360" imgH="215640" progId="Equation.3">
                     <p:embed/>
                   </p:oleObj>
                 </mc:Choice>
@@ -14232,7 +14262,7 @@
             <a:graphicData uri="http://schemas.openxmlformats.org/presentationml/2006/ole">
               <mc:AlternateContent xmlns:mc="http://schemas.openxmlformats.org/markup-compatibility/2006">
                 <mc:Choice xmlns:v="urn:schemas-microsoft-com:vml" Requires="v">
-                  <p:oleObj spid="_x0000_s6331" name="Equation" r:id="rId5" imgW="622080" imgH="215640" progId="Equation.3">
+                  <p:oleObj spid="_x0000_s6349" name="Equation" r:id="rId5" imgW="622080" imgH="215640" progId="Equation.3">
                     <p:embed/>
                   </p:oleObj>
                 </mc:Choice>
@@ -14289,7 +14319,7 @@
             <a:graphicData uri="http://schemas.openxmlformats.org/presentationml/2006/ole">
               <mc:AlternateContent xmlns:mc="http://schemas.openxmlformats.org/markup-compatibility/2006">
                 <mc:Choice xmlns:v="urn:schemas-microsoft-com:vml" Requires="v">
-                  <p:oleObj spid="_x0000_s6332" name="Equation" r:id="rId7" imgW="749160" imgH="215640" progId="Equation.3">
+                  <p:oleObj spid="_x0000_s6350" name="Equation" r:id="rId7" imgW="749160" imgH="215640" progId="Equation.3">
                     <p:embed/>
                   </p:oleObj>
                 </mc:Choice>
@@ -18649,7 +18679,7 @@
             <a:graphicData uri="http://schemas.openxmlformats.org/presentationml/2006/ole">
               <mc:AlternateContent xmlns:mc="http://schemas.openxmlformats.org/markup-compatibility/2006">
                 <mc:Choice xmlns:v="urn:schemas-microsoft-com:vml" Requires="v">
-                  <p:oleObj spid="_x0000_s7212" name="Equation" r:id="rId3" imgW="431640" imgH="241200" progId="Equation.3">
+                  <p:oleObj spid="_x0000_s7218" name="Equation" r:id="rId3" imgW="431640" imgH="241200" progId="Equation.3">
                     <p:embed/>
                   </p:oleObj>
                 </mc:Choice>
@@ -19174,13 +19204,34 @@
                 <a:latin typeface="Courier New" panose="02070309020205020404" pitchFamily="49" charset="0"/>
                 <a:cs typeface="Courier New" panose="02070309020205020404" pitchFamily="49" charset="0"/>
               </a:rPr>
-              <a:t>for (</a:t>
+              <a:t>for </a:t>
+            </a:r>
+            <a:r>
+              <a:rPr lang="en-US" dirty="0" smtClean="0">
+                <a:latin typeface="Courier New" panose="02070309020205020404" pitchFamily="49" charset="0"/>
+                <a:cs typeface="Courier New" panose="02070309020205020404" pitchFamily="49" charset="0"/>
+              </a:rPr>
+              <a:t>(</a:t>
             </a:r>
             <a:r>
               <a:rPr lang="en-US" dirty="0" err="1" smtClean="0">
                 <a:latin typeface="Courier New" panose="02070309020205020404" pitchFamily="49" charset="0"/>
                 <a:cs typeface="Courier New" panose="02070309020205020404" pitchFamily="49" charset="0"/>
               </a:rPr>
+              <a:t>int</a:t>
+            </a:r>
+            <a:r>
+              <a:rPr lang="en-US" dirty="0" smtClean="0">
+                <a:latin typeface="Courier New" panose="02070309020205020404" pitchFamily="49" charset="0"/>
+                <a:cs typeface="Courier New" panose="02070309020205020404" pitchFamily="49" charset="0"/>
+              </a:rPr>
+              <a:t> </a:t>
+            </a:r>
+            <a:r>
+              <a:rPr lang="en-US" dirty="0" err="1" smtClean="0">
+                <a:latin typeface="Courier New" panose="02070309020205020404" pitchFamily="49" charset="0"/>
+                <a:cs typeface="Courier New" panose="02070309020205020404" pitchFamily="49" charset="0"/>
+              </a:rPr>
               <a:t>i</a:t>
             </a:r>
             <a:r>
@@ -19188,7 +19239,14 @@
                 <a:latin typeface="Courier New" panose="02070309020205020404" pitchFamily="49" charset="0"/>
                 <a:cs typeface="Courier New" panose="02070309020205020404" pitchFamily="49" charset="0"/>
               </a:rPr>
-              <a:t> = 0; </a:t>
+              <a:t> </a:t>
+            </a:r>
+            <a:r>
+              <a:rPr lang="en-US" dirty="0" smtClean="0">
+                <a:latin typeface="Courier New" panose="02070309020205020404" pitchFamily="49" charset="0"/>
+                <a:cs typeface="Courier New" panose="02070309020205020404" pitchFamily="49" charset="0"/>
+              </a:rPr>
+              <a:t>= 0; </a:t>
             </a:r>
             <a:r>
               <a:rPr lang="en-US" dirty="0" err="1" smtClean="0">
@@ -19602,6 +19660,362 @@
           <a:p>
             <a:r>
               <a:rPr lang="en-US" dirty="0" smtClean="0"/>
+              <a:t>Stack examples</a:t>
+            </a:r>
+            <a:endParaRPr lang="en-US" dirty="0"/>
+          </a:p>
+        </p:txBody>
+      </p:sp>
+      <p:sp>
+        <p:nvSpPr>
+          <p:cNvPr id="4" name="Slide Number Placeholder 3"/>
+          <p:cNvSpPr>
+            <a:spLocks noGrp="1"/>
+          </p:cNvSpPr>
+          <p:nvPr>
+            <p:ph type="sldNum" sz="quarter" idx="12"/>
+          </p:nvPr>
+        </p:nvSpPr>
+        <p:spPr/>
+        <p:txBody>
+          <a:bodyPr/>
+          <a:lstStyle/>
+          <a:p>
+            <a:fld id="{11AD1F4E-1E51-402E-B221-310F004E7D3B}" type="slidenum">
+              <a:rPr lang="en-US" smtClean="0"/>
+              <a:t>33</a:t>
+            </a:fld>
+            <a:endParaRPr lang="en-US"/>
+          </a:p>
+        </p:txBody>
+      </p:sp>
+      <p:sp>
+        <p:nvSpPr>
+          <p:cNvPr id="5" name="TextBox 4"/>
+          <p:cNvSpPr txBox="1"/>
+          <p:nvPr/>
+        </p:nvSpPr>
+        <p:spPr>
+          <a:xfrm>
+            <a:off x="628650" y="1704105"/>
+            <a:ext cx="6665768" cy="2031325"/>
+          </a:xfrm>
+          <a:prstGeom prst="rect">
+            <a:avLst/>
+          </a:prstGeom>
+          <a:solidFill>
+            <a:schemeClr val="accent6">
+              <a:lumMod val="60000"/>
+              <a:lumOff val="40000"/>
+            </a:schemeClr>
+          </a:solidFill>
+          <a:ln>
+            <a:solidFill>
+              <a:schemeClr val="tx1"/>
+            </a:solidFill>
+          </a:ln>
+        </p:spPr>
+        <p:txBody>
+          <a:bodyPr wrap="square" rtlCol="0">
+            <a:spAutoFit/>
+          </a:bodyPr>
+          <a:lstStyle/>
+          <a:p>
+            <a:r>
+              <a:rPr lang="en-US" dirty="0" smtClean="0">
+                <a:latin typeface="Courier New" panose="02070309020205020404" pitchFamily="49" charset="0"/>
+                <a:cs typeface="Courier New" panose="02070309020205020404" pitchFamily="49" charset="0"/>
+              </a:rPr>
+              <a:t>import </a:t>
+            </a:r>
+            <a:r>
+              <a:rPr lang="en-US" dirty="0" err="1" smtClean="0">
+                <a:latin typeface="Courier New" panose="02070309020205020404" pitchFamily="49" charset="0"/>
+                <a:cs typeface="Courier New" panose="02070309020205020404" pitchFamily="49" charset="0"/>
+              </a:rPr>
+              <a:t>java.util.Stack</a:t>
+            </a:r>
+            <a:r>
+              <a:rPr lang="en-US" dirty="0" smtClean="0">
+                <a:latin typeface="Courier New" panose="02070309020205020404" pitchFamily="49" charset="0"/>
+                <a:cs typeface="Courier New" panose="02070309020205020404" pitchFamily="49" charset="0"/>
+              </a:rPr>
+              <a:t>;</a:t>
+            </a:r>
+          </a:p>
+          <a:p>
+            <a:r>
+              <a:rPr lang="en-US" dirty="0" smtClean="0">
+                <a:latin typeface="Courier New" panose="02070309020205020404" pitchFamily="49" charset="0"/>
+                <a:cs typeface="Courier New" panose="02070309020205020404" pitchFamily="49" charset="0"/>
+              </a:rPr>
+              <a:t>…</a:t>
+            </a:r>
+            <a:endParaRPr lang="en-US" dirty="0" smtClean="0">
+              <a:latin typeface="Courier New" panose="02070309020205020404" pitchFamily="49" charset="0"/>
+              <a:cs typeface="Courier New" panose="02070309020205020404" pitchFamily="49" charset="0"/>
+            </a:endParaRPr>
+          </a:p>
+          <a:p>
+            <a:r>
+              <a:rPr lang="en-US" dirty="0" smtClean="0">
+                <a:latin typeface="Courier New" panose="02070309020205020404" pitchFamily="49" charset="0"/>
+                <a:cs typeface="Courier New" panose="02070309020205020404" pitchFamily="49" charset="0"/>
+              </a:rPr>
+              <a:t>Stack&lt;Integer&gt; s = new Stack&lt;Integer&gt;();</a:t>
+            </a:r>
+            <a:endParaRPr lang="en-US" dirty="0" smtClean="0">
+              <a:latin typeface="Courier New" panose="02070309020205020404" pitchFamily="49" charset="0"/>
+              <a:cs typeface="Courier New" panose="02070309020205020404" pitchFamily="49" charset="0"/>
+            </a:endParaRPr>
+          </a:p>
+          <a:p>
+            <a:r>
+              <a:rPr lang="en-US" dirty="0" smtClean="0">
+                <a:latin typeface="Courier New" panose="02070309020205020404" pitchFamily="49" charset="0"/>
+                <a:cs typeface="Courier New" panose="02070309020205020404" pitchFamily="49" charset="0"/>
+              </a:rPr>
+              <a:t>for </a:t>
+            </a:r>
+            <a:r>
+              <a:rPr lang="en-US" dirty="0" smtClean="0">
+                <a:latin typeface="Courier New" panose="02070309020205020404" pitchFamily="49" charset="0"/>
+                <a:cs typeface="Courier New" panose="02070309020205020404" pitchFamily="49" charset="0"/>
+              </a:rPr>
+              <a:t>(</a:t>
+            </a:r>
+            <a:r>
+              <a:rPr lang="en-US" dirty="0" err="1" smtClean="0">
+                <a:latin typeface="Courier New" panose="02070309020205020404" pitchFamily="49" charset="0"/>
+                <a:cs typeface="Courier New" panose="02070309020205020404" pitchFamily="49" charset="0"/>
+              </a:rPr>
+              <a:t>int</a:t>
+            </a:r>
+            <a:r>
+              <a:rPr lang="en-US" dirty="0" smtClean="0">
+                <a:latin typeface="Courier New" panose="02070309020205020404" pitchFamily="49" charset="0"/>
+                <a:cs typeface="Courier New" panose="02070309020205020404" pitchFamily="49" charset="0"/>
+              </a:rPr>
+              <a:t> </a:t>
+            </a:r>
+            <a:r>
+              <a:rPr lang="en-US" dirty="0" err="1" smtClean="0">
+                <a:latin typeface="Courier New" panose="02070309020205020404" pitchFamily="49" charset="0"/>
+                <a:cs typeface="Courier New" panose="02070309020205020404" pitchFamily="49" charset="0"/>
+              </a:rPr>
+              <a:t>i</a:t>
+            </a:r>
+            <a:r>
+              <a:rPr lang="en-US" dirty="0" smtClean="0">
+                <a:latin typeface="Courier New" panose="02070309020205020404" pitchFamily="49" charset="0"/>
+                <a:cs typeface="Courier New" panose="02070309020205020404" pitchFamily="49" charset="0"/>
+              </a:rPr>
+              <a:t> </a:t>
+            </a:r>
+            <a:r>
+              <a:rPr lang="en-US" dirty="0" smtClean="0">
+                <a:latin typeface="Courier New" panose="02070309020205020404" pitchFamily="49" charset="0"/>
+                <a:cs typeface="Courier New" panose="02070309020205020404" pitchFamily="49" charset="0"/>
+              </a:rPr>
+              <a:t>= 0; </a:t>
+            </a:r>
+            <a:r>
+              <a:rPr lang="en-US" dirty="0" err="1" smtClean="0">
+                <a:latin typeface="Courier New" panose="02070309020205020404" pitchFamily="49" charset="0"/>
+                <a:cs typeface="Courier New" panose="02070309020205020404" pitchFamily="49" charset="0"/>
+              </a:rPr>
+              <a:t>i</a:t>
+            </a:r>
+            <a:r>
+              <a:rPr lang="en-US" dirty="0" smtClean="0">
+                <a:latin typeface="Courier New" panose="02070309020205020404" pitchFamily="49" charset="0"/>
+                <a:cs typeface="Courier New" panose="02070309020205020404" pitchFamily="49" charset="0"/>
+              </a:rPr>
+              <a:t> &lt; 10; </a:t>
+            </a:r>
+            <a:r>
+              <a:rPr lang="en-US" dirty="0" err="1" smtClean="0">
+                <a:latin typeface="Courier New" panose="02070309020205020404" pitchFamily="49" charset="0"/>
+                <a:cs typeface="Courier New" panose="02070309020205020404" pitchFamily="49" charset="0"/>
+              </a:rPr>
+              <a:t>i</a:t>
+            </a:r>
+            <a:r>
+              <a:rPr lang="en-US" dirty="0" smtClean="0">
+                <a:latin typeface="Courier New" panose="02070309020205020404" pitchFamily="49" charset="0"/>
+                <a:cs typeface="Courier New" panose="02070309020205020404" pitchFamily="49" charset="0"/>
+              </a:rPr>
+              <a:t>++)</a:t>
+            </a:r>
+          </a:p>
+          <a:p>
+            <a:r>
+              <a:rPr lang="en-US" dirty="0">
+                <a:latin typeface="Courier New" panose="02070309020205020404" pitchFamily="49" charset="0"/>
+                <a:cs typeface="Courier New" panose="02070309020205020404" pitchFamily="49" charset="0"/>
+              </a:rPr>
+              <a:t> </a:t>
+            </a:r>
+            <a:r>
+              <a:rPr lang="en-US" dirty="0" smtClean="0">
+                <a:latin typeface="Courier New" panose="02070309020205020404" pitchFamily="49" charset="0"/>
+                <a:cs typeface="Courier New" panose="02070309020205020404" pitchFamily="49" charset="0"/>
+              </a:rPr>
+              <a:t>   </a:t>
+            </a:r>
+            <a:r>
+              <a:rPr lang="en-US" dirty="0" err="1" smtClean="0">
+                <a:latin typeface="Courier New" panose="02070309020205020404" pitchFamily="49" charset="0"/>
+                <a:cs typeface="Courier New" panose="02070309020205020404" pitchFamily="49" charset="0"/>
+              </a:rPr>
+              <a:t>s.push</a:t>
+            </a:r>
+            <a:r>
+              <a:rPr lang="en-US" dirty="0" smtClean="0">
+                <a:latin typeface="Courier New" panose="02070309020205020404" pitchFamily="49" charset="0"/>
+                <a:cs typeface="Courier New" panose="02070309020205020404" pitchFamily="49" charset="0"/>
+              </a:rPr>
+              <a:t>(</a:t>
+            </a:r>
+            <a:r>
+              <a:rPr lang="en-US" dirty="0" err="1" smtClean="0">
+                <a:latin typeface="Courier New" panose="02070309020205020404" pitchFamily="49" charset="0"/>
+                <a:cs typeface="Courier New" panose="02070309020205020404" pitchFamily="49" charset="0"/>
+              </a:rPr>
+              <a:t>i</a:t>
+            </a:r>
+            <a:r>
+              <a:rPr lang="en-US" dirty="0" smtClean="0">
+                <a:latin typeface="Courier New" panose="02070309020205020404" pitchFamily="49" charset="0"/>
+                <a:cs typeface="Courier New" panose="02070309020205020404" pitchFamily="49" charset="0"/>
+              </a:rPr>
+              <a:t>);</a:t>
+            </a:r>
+          </a:p>
+          <a:p>
+            <a:r>
+              <a:rPr lang="en-US" dirty="0" smtClean="0">
+                <a:latin typeface="Courier New" panose="02070309020205020404" pitchFamily="49" charset="0"/>
+                <a:cs typeface="Courier New" panose="02070309020205020404" pitchFamily="49" charset="0"/>
+              </a:rPr>
+              <a:t>while (!</a:t>
+            </a:r>
+            <a:r>
+              <a:rPr lang="en-US" dirty="0" err="1" smtClean="0">
+                <a:latin typeface="Courier New" panose="02070309020205020404" pitchFamily="49" charset="0"/>
+                <a:cs typeface="Courier New" panose="02070309020205020404" pitchFamily="49" charset="0"/>
+              </a:rPr>
+              <a:t>s.isEmpty</a:t>
+            </a:r>
+            <a:r>
+              <a:rPr lang="en-US" dirty="0" smtClean="0">
+                <a:latin typeface="Courier New" panose="02070309020205020404" pitchFamily="49" charset="0"/>
+                <a:cs typeface="Courier New" panose="02070309020205020404" pitchFamily="49" charset="0"/>
+              </a:rPr>
+              <a:t>())</a:t>
+            </a:r>
+            <a:endParaRPr lang="en-US" dirty="0">
+              <a:latin typeface="Courier New" panose="02070309020205020404" pitchFamily="49" charset="0"/>
+              <a:cs typeface="Courier New" panose="02070309020205020404" pitchFamily="49" charset="0"/>
+            </a:endParaRPr>
+          </a:p>
+          <a:p>
+            <a:r>
+              <a:rPr lang="en-US" dirty="0" smtClean="0">
+                <a:latin typeface="Courier New" panose="02070309020205020404" pitchFamily="49" charset="0"/>
+                <a:cs typeface="Courier New" panose="02070309020205020404" pitchFamily="49" charset="0"/>
+              </a:rPr>
+              <a:t>    </a:t>
+            </a:r>
+            <a:r>
+              <a:rPr lang="en-US" dirty="0" err="1" smtClean="0">
+                <a:latin typeface="Courier New" panose="02070309020205020404" pitchFamily="49" charset="0"/>
+                <a:cs typeface="Courier New" panose="02070309020205020404" pitchFamily="49" charset="0"/>
+              </a:rPr>
+              <a:t>System.out.println</a:t>
+            </a:r>
+            <a:r>
+              <a:rPr lang="en-US" dirty="0" smtClean="0">
+                <a:latin typeface="Courier New" panose="02070309020205020404" pitchFamily="49" charset="0"/>
+                <a:cs typeface="Courier New" panose="02070309020205020404" pitchFamily="49" charset="0"/>
+              </a:rPr>
+              <a:t>(</a:t>
+            </a:r>
+            <a:r>
+              <a:rPr lang="en-US" dirty="0" err="1" smtClean="0">
+                <a:latin typeface="Courier New" panose="02070309020205020404" pitchFamily="49" charset="0"/>
+                <a:cs typeface="Courier New" panose="02070309020205020404" pitchFamily="49" charset="0"/>
+              </a:rPr>
+              <a:t>s.pop</a:t>
+            </a:r>
+            <a:r>
+              <a:rPr lang="en-US" dirty="0" smtClean="0">
+                <a:latin typeface="Courier New" panose="02070309020205020404" pitchFamily="49" charset="0"/>
+                <a:cs typeface="Courier New" panose="02070309020205020404" pitchFamily="49" charset="0"/>
+              </a:rPr>
+              <a:t>());</a:t>
+            </a:r>
+            <a:endParaRPr lang="en-US" dirty="0" smtClean="0">
+              <a:latin typeface="Courier New" panose="02070309020205020404" pitchFamily="49" charset="0"/>
+              <a:cs typeface="Courier New" panose="02070309020205020404" pitchFamily="49" charset="0"/>
+            </a:endParaRPr>
+          </a:p>
+        </p:txBody>
+      </p:sp>
+    </p:spTree>
+    <p:extLst>
+      <p:ext uri="{BB962C8B-B14F-4D97-AF65-F5344CB8AC3E}">
+        <p14:creationId xmlns:p14="http://schemas.microsoft.com/office/powerpoint/2010/main" val="3681926828"/>
+      </p:ext>
+    </p:extLst>
+  </p:cSld>
+  <p:clrMapOvr>
+    <a:masterClrMapping/>
+  </p:clrMapOvr>
+  <p:timing>
+    <p:tnLst>
+      <p:par>
+        <p:cTn id="1" dur="indefinite" restart="never" nodeType="tmRoot"/>
+      </p:par>
+    </p:tnLst>
+  </p:timing>
+</p:sld>
+</file>
+
+<file path=ppt/slides/slide34.xml><?xml version="1.0" encoding="utf-8"?>
+<p:sld xmlns:a="http://schemas.openxmlformats.org/drawingml/2006/main" xmlns:r="http://schemas.openxmlformats.org/officeDocument/2006/relationships" xmlns:p="http://schemas.openxmlformats.org/presentationml/2006/main">
+  <p:cSld>
+    <p:spTree>
+      <p:nvGrpSpPr>
+        <p:cNvPr id="1" name=""/>
+        <p:cNvGrpSpPr/>
+        <p:nvPr/>
+      </p:nvGrpSpPr>
+      <p:grpSpPr>
+        <a:xfrm>
+          <a:off x="0" y="0"/>
+          <a:ext cx="0" cy="0"/>
+          <a:chOff x="0" y="0"/>
+          <a:chExt cx="0" cy="0"/>
+        </a:xfrm>
+      </p:grpSpPr>
+      <p:sp>
+        <p:nvSpPr>
+          <p:cNvPr id="2" name="Title 1"/>
+          <p:cNvSpPr>
+            <a:spLocks noGrp="1"/>
+          </p:cNvSpPr>
+          <p:nvPr>
+            <p:ph type="title"/>
+          </p:nvPr>
+        </p:nvSpPr>
+        <p:spPr/>
+        <p:txBody>
+          <a:bodyPr/>
+          <a:lstStyle/>
+          <a:p>
+            <a:r>
+              <a:rPr lang="en-US" dirty="0" smtClean="0"/>
               <a:t>Queue</a:t>
             </a:r>
             <a:endParaRPr lang="en-US" dirty="0"/>
@@ -19709,7 +20123,7 @@
           <a:p>
             <a:fld id="{11AD1F4E-1E51-402E-B221-310F004E7D3B}" type="slidenum">
               <a:rPr lang="en-US" smtClean="0"/>
-              <a:t>33</a:t>
+              <a:t>34</a:t>
             </a:fld>
             <a:endParaRPr lang="en-US"/>
           </a:p>
@@ -19786,7 +20200,7 @@
             <a:graphicData uri="http://schemas.openxmlformats.org/presentationml/2006/ole">
               <mc:AlternateContent xmlns:mc="http://schemas.openxmlformats.org/markup-compatibility/2006">
                 <mc:Choice xmlns:v="urn:schemas-microsoft-com:vml" Requires="v">
-                  <p:oleObj spid="_x0000_s8244" name="Equation" r:id="rId3" imgW="444240" imgH="241200" progId="Equation.3">
+                  <p:oleObj spid="_x0000_s8250" name="Equation" r:id="rId3" imgW="444240" imgH="241200" progId="Equation.3">
                     <p:embed/>
                   </p:oleObj>
                 </mc:Choice>
@@ -20175,210 +20589,6 @@
 </p:sld>
 </file>
 
-<file path=ppt/slides/slide34.xml><?xml version="1.0" encoding="utf-8"?>
-<p:sld xmlns:a="http://schemas.openxmlformats.org/drawingml/2006/main" xmlns:r="http://schemas.openxmlformats.org/officeDocument/2006/relationships" xmlns:p="http://schemas.openxmlformats.org/presentationml/2006/main">
-  <p:cSld>
-    <p:spTree>
-      <p:nvGrpSpPr>
-        <p:cNvPr id="1" name=""/>
-        <p:cNvGrpSpPr/>
-        <p:nvPr/>
-      </p:nvGrpSpPr>
-      <p:grpSpPr>
-        <a:xfrm>
-          <a:off x="0" y="0"/>
-          <a:ext cx="0" cy="0"/>
-          <a:chOff x="0" y="0"/>
-          <a:chExt cx="0" cy="0"/>
-        </a:xfrm>
-      </p:grpSpPr>
-      <p:sp>
-        <p:nvSpPr>
-          <p:cNvPr id="2" name="Title 1"/>
-          <p:cNvSpPr>
-            <a:spLocks noGrp="1"/>
-          </p:cNvSpPr>
-          <p:nvPr>
-            <p:ph type="title"/>
-          </p:nvPr>
-        </p:nvSpPr>
-        <p:spPr/>
-        <p:txBody>
-          <a:bodyPr/>
-          <a:lstStyle/>
-          <a:p>
-            <a:r>
-              <a:rPr lang="en-US" dirty="0" smtClean="0"/>
-              <a:t>Queue ADT</a:t>
-            </a:r>
-            <a:endParaRPr lang="en-US" dirty="0"/>
-          </a:p>
-        </p:txBody>
-      </p:sp>
-      <p:sp>
-        <p:nvSpPr>
-          <p:cNvPr id="3" name="Content Placeholder 2"/>
-          <p:cNvSpPr>
-            <a:spLocks noGrp="1"/>
-          </p:cNvSpPr>
-          <p:nvPr>
-            <p:ph idx="1"/>
-          </p:nvPr>
-        </p:nvSpPr>
-        <p:spPr/>
-        <p:txBody>
-          <a:bodyPr/>
-          <a:lstStyle/>
-          <a:p>
-            <a:r>
-              <a:rPr lang="en-US" dirty="0" smtClean="0"/>
-              <a:t>EMPTY_QUEUE() </a:t>
-            </a:r>
-            <a:r>
-              <a:rPr lang="en-US" dirty="0" smtClean="0">
-                <a:sym typeface="Symbol" panose="05050102010706020507" pitchFamily="18" charset="2"/>
-              </a:rPr>
-              <a:t> queue</a:t>
-            </a:r>
-            <a:endParaRPr lang="en-US" dirty="0" smtClean="0"/>
-          </a:p>
-          <a:p>
-            <a:r>
-              <a:rPr lang="en-US" dirty="0" smtClean="0"/>
-              <a:t>QUEUE.PUSH(value</a:t>
-            </a:r>
-            <a:r>
-              <a:rPr lang="en-US" dirty="0"/>
-              <a:t>)</a:t>
-            </a:r>
-          </a:p>
-          <a:p>
-            <a:r>
-              <a:rPr lang="en-US" dirty="0" smtClean="0"/>
-              <a:t>QUEUE.POP()</a:t>
-            </a:r>
-          </a:p>
-          <a:p>
-            <a:r>
-              <a:rPr lang="en-US" dirty="0" smtClean="0"/>
-              <a:t>QUEUE.FRONT()</a:t>
-            </a:r>
-            <a:r>
-              <a:rPr lang="en-US" dirty="0"/>
-              <a:t> </a:t>
-            </a:r>
-            <a:r>
-              <a:rPr lang="en-US" dirty="0">
-                <a:sym typeface="Symbol" panose="05050102010706020507" pitchFamily="18" charset="2"/>
-              </a:rPr>
-              <a:t> </a:t>
-            </a:r>
-            <a:r>
-              <a:rPr lang="en-US" dirty="0" smtClean="0">
-                <a:sym typeface="Symbol" panose="05050102010706020507" pitchFamily="18" charset="2"/>
-              </a:rPr>
-              <a:t>value</a:t>
-            </a:r>
-            <a:endParaRPr lang="en-US" dirty="0"/>
-          </a:p>
-          <a:p>
-            <a:r>
-              <a:rPr lang="en-US" dirty="0" smtClean="0"/>
-              <a:t>QUEUE.IS_EMPTY()</a:t>
-            </a:r>
-            <a:r>
-              <a:rPr lang="en-US" dirty="0"/>
-              <a:t> </a:t>
-            </a:r>
-            <a:r>
-              <a:rPr lang="en-US" dirty="0">
-                <a:sym typeface="Symbol" panose="05050102010706020507" pitchFamily="18" charset="2"/>
-              </a:rPr>
-              <a:t> </a:t>
-            </a:r>
-            <a:r>
-              <a:rPr lang="en-US" dirty="0" err="1" smtClean="0">
-                <a:sym typeface="Symbol" panose="05050102010706020507" pitchFamily="18" charset="2"/>
-              </a:rPr>
-              <a:t>boolean</a:t>
-            </a:r>
-            <a:endParaRPr lang="en-US" dirty="0" smtClean="0"/>
-          </a:p>
-          <a:p>
-            <a:r>
-              <a:rPr lang="en-US" dirty="0" smtClean="0"/>
-              <a:t>QUEUE.LENGTH() </a:t>
-            </a:r>
-            <a:r>
-              <a:rPr lang="en-US" dirty="0">
-                <a:sym typeface="Symbol" panose="05050102010706020507" pitchFamily="18" charset="2"/>
-              </a:rPr>
-              <a:t> </a:t>
-            </a:r>
-            <a:r>
-              <a:rPr lang="en-US" dirty="0" smtClean="0">
-                <a:sym typeface="Symbol" panose="05050102010706020507" pitchFamily="18" charset="2"/>
-              </a:rPr>
-              <a:t>length</a:t>
-            </a:r>
-            <a:br>
-              <a:rPr lang="en-US" dirty="0" smtClean="0">
-                <a:sym typeface="Symbol" panose="05050102010706020507" pitchFamily="18" charset="2"/>
-              </a:rPr>
-            </a:br>
-            <a:r>
-              <a:rPr lang="en-US" dirty="0" smtClean="0">
-                <a:sym typeface="Symbol" panose="05050102010706020507" pitchFamily="18" charset="2"/>
-              </a:rPr>
-              <a:t>      = #push - #pop</a:t>
-            </a:r>
-            <a:endParaRPr lang="en-US" dirty="0"/>
-          </a:p>
-        </p:txBody>
-      </p:sp>
-      <p:sp>
-        <p:nvSpPr>
-          <p:cNvPr id="4" name="Slide Number Placeholder 3"/>
-          <p:cNvSpPr>
-            <a:spLocks noGrp="1"/>
-          </p:cNvSpPr>
-          <p:nvPr>
-            <p:ph type="sldNum" sz="quarter" idx="12"/>
-          </p:nvPr>
-        </p:nvSpPr>
-        <p:spPr/>
-        <p:txBody>
-          <a:bodyPr/>
-          <a:lstStyle/>
-          <a:p>
-            <a:fld id="{11AD1F4E-1E51-402E-B221-310F004E7D3B}" type="slidenum">
-              <a:rPr lang="en-US" smtClean="0"/>
-              <a:t>34</a:t>
-            </a:fld>
-            <a:endParaRPr lang="en-US"/>
-          </a:p>
-        </p:txBody>
-      </p:sp>
-    </p:spTree>
-    <p:extLst>
-      <p:ext uri="{BB962C8B-B14F-4D97-AF65-F5344CB8AC3E}">
-        <p14:creationId xmlns:p14="http://schemas.microsoft.com/office/powerpoint/2010/main" val="1534393266"/>
-      </p:ext>
-    </p:extLst>
-  </p:cSld>
-  <p:clrMapOvr>
-    <a:masterClrMapping/>
-  </p:clrMapOvr>
-  <p:timing>
-    <p:tnLst>
-      <p:par>
-        <p:cTn id="1" dur="indefinite" restart="never" nodeType="tmRoot"/>
-      </p:par>
-    </p:tnLst>
-  </p:timing>
-</p:sld>
-</file>
-
 <file path=ppt/slides/slide35.xml><?xml version="1.0" encoding="utf-8"?>
 <p:sld xmlns:a="http://schemas.openxmlformats.org/drawingml/2006/main" xmlns:r="http://schemas.openxmlformats.org/officeDocument/2006/relationships" xmlns:p="http://schemas.openxmlformats.org/presentationml/2006/main">
   <p:cSld>
@@ -20413,7 +20623,128 @@
           <a:p>
             <a:r>
               <a:rPr lang="en-US" dirty="0" smtClean="0"/>
-              <a:t>Queue examples</a:t>
+              <a:t>Queue ADT</a:t>
+            </a:r>
+            <a:endParaRPr lang="en-US" dirty="0"/>
+          </a:p>
+        </p:txBody>
+      </p:sp>
+      <p:sp>
+        <p:nvSpPr>
+          <p:cNvPr id="3" name="Content Placeholder 2"/>
+          <p:cNvSpPr>
+            <a:spLocks noGrp="1"/>
+          </p:cNvSpPr>
+          <p:nvPr>
+            <p:ph idx="1"/>
+          </p:nvPr>
+        </p:nvSpPr>
+        <p:spPr/>
+        <p:txBody>
+          <a:bodyPr/>
+          <a:lstStyle/>
+          <a:p>
+            <a:r>
+              <a:rPr lang="en-US" dirty="0" smtClean="0"/>
+              <a:t>EMPTY_QUEUE() </a:t>
+            </a:r>
+            <a:r>
+              <a:rPr lang="en-US" dirty="0" smtClean="0">
+                <a:sym typeface="Symbol" panose="05050102010706020507" pitchFamily="18" charset="2"/>
+              </a:rPr>
+              <a:t> queue</a:t>
+            </a:r>
+            <a:endParaRPr lang="en-US" dirty="0" smtClean="0"/>
+          </a:p>
+          <a:p>
+            <a:r>
+              <a:rPr lang="en-US" dirty="0" smtClean="0"/>
+              <a:t>QUEUE.PUSH(value</a:t>
+            </a:r>
+            <a:r>
+              <a:rPr lang="en-US" dirty="0"/>
+              <a:t>)</a:t>
+            </a:r>
+          </a:p>
+          <a:p>
+            <a:r>
+              <a:rPr lang="en-US" dirty="0" smtClean="0"/>
+              <a:t>QUEUE.POP()</a:t>
+            </a:r>
+          </a:p>
+          <a:p>
+            <a:r>
+              <a:rPr lang="en-US" dirty="0" smtClean="0"/>
+              <a:t>QUEUE.FRONT()</a:t>
+            </a:r>
+            <a:r>
+              <a:rPr lang="en-US" dirty="0"/>
+              <a:t> </a:t>
+            </a:r>
+            <a:r>
+              <a:rPr lang="en-US" dirty="0">
+                <a:sym typeface="Symbol" panose="05050102010706020507" pitchFamily="18" charset="2"/>
+              </a:rPr>
+              <a:t> </a:t>
+            </a:r>
+            <a:r>
+              <a:rPr lang="en-US" dirty="0" smtClean="0">
+                <a:sym typeface="Symbol" panose="05050102010706020507" pitchFamily="18" charset="2"/>
+              </a:rPr>
+              <a:t>value</a:t>
+            </a:r>
+            <a:endParaRPr lang="en-US" dirty="0"/>
+          </a:p>
+          <a:p>
+            <a:r>
+              <a:rPr lang="en-US" dirty="0" smtClean="0"/>
+              <a:t>QUEUE.IS_EMPTY()</a:t>
+            </a:r>
+            <a:r>
+              <a:rPr lang="en-US" dirty="0"/>
+              <a:t> </a:t>
+            </a:r>
+            <a:r>
+              <a:rPr lang="en-US" dirty="0">
+                <a:sym typeface="Symbol" panose="05050102010706020507" pitchFamily="18" charset="2"/>
+              </a:rPr>
+              <a:t> </a:t>
+            </a:r>
+            <a:r>
+              <a:rPr lang="en-US" dirty="0" err="1" smtClean="0">
+                <a:sym typeface="Symbol" panose="05050102010706020507" pitchFamily="18" charset="2"/>
+              </a:rPr>
+              <a:t>boolean</a:t>
+            </a:r>
+            <a:endParaRPr lang="en-US" dirty="0" smtClean="0"/>
+          </a:p>
+          <a:p>
+            <a:r>
+              <a:rPr lang="en-US" dirty="0" smtClean="0"/>
+              <a:t>QUEUE.LENGTH() </a:t>
+            </a:r>
+            <a:r>
+              <a:rPr lang="en-US" dirty="0">
+                <a:sym typeface="Symbol" panose="05050102010706020507" pitchFamily="18" charset="2"/>
+              </a:rPr>
+              <a:t> </a:t>
+            </a:r>
+            <a:r>
+              <a:rPr lang="en-US" dirty="0" smtClean="0">
+                <a:sym typeface="Symbol" panose="05050102010706020507" pitchFamily="18" charset="2"/>
+              </a:rPr>
+              <a:t>length</a:t>
+            </a:r>
+            <a:br>
+              <a:rPr lang="en-US" dirty="0" smtClean="0">
+                <a:sym typeface="Symbol" panose="05050102010706020507" pitchFamily="18" charset="2"/>
+              </a:rPr>
+            </a:br>
+            <a:r>
+              <a:rPr lang="en-US" dirty="0" smtClean="0">
+                <a:sym typeface="Symbol" panose="05050102010706020507" pitchFamily="18" charset="2"/>
+              </a:rPr>
+              <a:t>      = #push - #pop</a:t>
             </a:r>
             <a:endParaRPr lang="en-US" dirty="0"/>
           </a:p>
@@ -20442,497 +20773,10 @@
           </a:p>
         </p:txBody>
       </p:sp>
-      <p:sp>
-        <p:nvSpPr>
-          <p:cNvPr id="5" name="TextBox 4"/>
-          <p:cNvSpPr txBox="1"/>
-          <p:nvPr/>
-        </p:nvSpPr>
-        <p:spPr>
-          <a:xfrm>
-            <a:off x="628650" y="1704105"/>
-            <a:ext cx="6665768" cy="2585323"/>
-          </a:xfrm>
-          <a:prstGeom prst="rect">
-            <a:avLst/>
-          </a:prstGeom>
-          <a:solidFill>
-            <a:schemeClr val="tx2">
-              <a:lumMod val="40000"/>
-              <a:lumOff val="60000"/>
-            </a:schemeClr>
-          </a:solidFill>
-          <a:ln>
-            <a:solidFill>
-              <a:schemeClr val="tx1"/>
-            </a:solidFill>
-          </a:ln>
-        </p:spPr>
-        <p:txBody>
-          <a:bodyPr wrap="square" rtlCol="0">
-            <a:spAutoFit/>
-          </a:bodyPr>
-          <a:lstStyle/>
-          <a:p>
-            <a:r>
-              <a:rPr lang="en-US" dirty="0" smtClean="0">
-                <a:latin typeface="Courier New" panose="02070309020205020404" pitchFamily="49" charset="0"/>
-                <a:cs typeface="Courier New" panose="02070309020205020404" pitchFamily="49" charset="0"/>
-              </a:rPr>
-              <a:t>#include &lt;</a:t>
-            </a:r>
-            <a:r>
-              <a:rPr lang="en-US" dirty="0" err="1" smtClean="0">
-                <a:latin typeface="Courier New" panose="02070309020205020404" pitchFamily="49" charset="0"/>
-                <a:cs typeface="Courier New" panose="02070309020205020404" pitchFamily="49" charset="0"/>
-              </a:rPr>
-              <a:t>iostream</a:t>
-            </a:r>
-            <a:r>
-              <a:rPr lang="en-US" dirty="0" smtClean="0">
-                <a:latin typeface="Courier New" panose="02070309020205020404" pitchFamily="49" charset="0"/>
-                <a:cs typeface="Courier New" panose="02070309020205020404" pitchFamily="49" charset="0"/>
-              </a:rPr>
-              <a:t>&gt;</a:t>
-            </a:r>
-          </a:p>
-          <a:p>
-            <a:r>
-              <a:rPr lang="en-US" dirty="0" smtClean="0">
-                <a:latin typeface="Courier New" panose="02070309020205020404" pitchFamily="49" charset="0"/>
-                <a:cs typeface="Courier New" panose="02070309020205020404" pitchFamily="49" charset="0"/>
-              </a:rPr>
-              <a:t>#include &lt;queue&gt;</a:t>
-            </a:r>
-          </a:p>
-          <a:p>
-            <a:r>
-              <a:rPr lang="en-US" dirty="0" err="1" smtClean="0">
-                <a:latin typeface="Courier New" panose="02070309020205020404" pitchFamily="49" charset="0"/>
-                <a:cs typeface="Courier New" panose="02070309020205020404" pitchFamily="49" charset="0"/>
-              </a:rPr>
-              <a:t>std</a:t>
-            </a:r>
-            <a:r>
-              <a:rPr lang="en-US" dirty="0" smtClean="0">
-                <a:latin typeface="Courier New" panose="02070309020205020404" pitchFamily="49" charset="0"/>
-                <a:cs typeface="Courier New" panose="02070309020205020404" pitchFamily="49" charset="0"/>
-              </a:rPr>
-              <a:t>::queue&lt;</a:t>
-            </a:r>
-            <a:r>
-              <a:rPr lang="en-US" dirty="0" err="1" smtClean="0">
-                <a:latin typeface="Courier New" panose="02070309020205020404" pitchFamily="49" charset="0"/>
-                <a:cs typeface="Courier New" panose="02070309020205020404" pitchFamily="49" charset="0"/>
-              </a:rPr>
-              <a:t>int</a:t>
-            </a:r>
-            <a:r>
-              <a:rPr lang="en-US" dirty="0" smtClean="0">
-                <a:latin typeface="Courier New" panose="02070309020205020404" pitchFamily="49" charset="0"/>
-                <a:cs typeface="Courier New" panose="02070309020205020404" pitchFamily="49" charset="0"/>
-              </a:rPr>
-              <a:t>&gt; q;</a:t>
-            </a:r>
-          </a:p>
-          <a:p>
-            <a:r>
-              <a:rPr lang="en-US" dirty="0" smtClean="0">
-                <a:latin typeface="Courier New" panose="02070309020205020404" pitchFamily="49" charset="0"/>
-                <a:cs typeface="Courier New" panose="02070309020205020404" pitchFamily="49" charset="0"/>
-              </a:rPr>
-              <a:t>for (</a:t>
-            </a:r>
-            <a:r>
-              <a:rPr lang="en-US" dirty="0" err="1" smtClean="0">
-                <a:latin typeface="Courier New" panose="02070309020205020404" pitchFamily="49" charset="0"/>
-                <a:cs typeface="Courier New" panose="02070309020205020404" pitchFamily="49" charset="0"/>
-              </a:rPr>
-              <a:t>i</a:t>
-            </a:r>
-            <a:r>
-              <a:rPr lang="en-US" dirty="0" smtClean="0">
-                <a:latin typeface="Courier New" panose="02070309020205020404" pitchFamily="49" charset="0"/>
-                <a:cs typeface="Courier New" panose="02070309020205020404" pitchFamily="49" charset="0"/>
-              </a:rPr>
-              <a:t> = 0; </a:t>
-            </a:r>
-            <a:r>
-              <a:rPr lang="en-US" dirty="0" err="1" smtClean="0">
-                <a:latin typeface="Courier New" panose="02070309020205020404" pitchFamily="49" charset="0"/>
-                <a:cs typeface="Courier New" panose="02070309020205020404" pitchFamily="49" charset="0"/>
-              </a:rPr>
-              <a:t>i</a:t>
-            </a:r>
-            <a:r>
-              <a:rPr lang="en-US" dirty="0" smtClean="0">
-                <a:latin typeface="Courier New" panose="02070309020205020404" pitchFamily="49" charset="0"/>
-                <a:cs typeface="Courier New" panose="02070309020205020404" pitchFamily="49" charset="0"/>
-              </a:rPr>
-              <a:t> &lt; 10; </a:t>
-            </a:r>
-            <a:r>
-              <a:rPr lang="en-US" dirty="0" err="1" smtClean="0">
-                <a:latin typeface="Courier New" panose="02070309020205020404" pitchFamily="49" charset="0"/>
-                <a:cs typeface="Courier New" panose="02070309020205020404" pitchFamily="49" charset="0"/>
-              </a:rPr>
-              <a:t>i</a:t>
-            </a:r>
-            <a:r>
-              <a:rPr lang="en-US" dirty="0" smtClean="0">
-                <a:latin typeface="Courier New" panose="02070309020205020404" pitchFamily="49" charset="0"/>
-                <a:cs typeface="Courier New" panose="02070309020205020404" pitchFamily="49" charset="0"/>
-              </a:rPr>
-              <a:t>++)</a:t>
-            </a:r>
-          </a:p>
-          <a:p>
-            <a:r>
-              <a:rPr lang="en-US" dirty="0">
-                <a:latin typeface="Courier New" panose="02070309020205020404" pitchFamily="49" charset="0"/>
-                <a:cs typeface="Courier New" panose="02070309020205020404" pitchFamily="49" charset="0"/>
-              </a:rPr>
-              <a:t> </a:t>
-            </a:r>
-            <a:r>
-              <a:rPr lang="en-US" dirty="0" smtClean="0">
-                <a:latin typeface="Courier New" panose="02070309020205020404" pitchFamily="49" charset="0"/>
-                <a:cs typeface="Courier New" panose="02070309020205020404" pitchFamily="49" charset="0"/>
-              </a:rPr>
-              <a:t>   </a:t>
-            </a:r>
-            <a:r>
-              <a:rPr lang="en-US" dirty="0" err="1" smtClean="0">
-                <a:latin typeface="Courier New" panose="02070309020205020404" pitchFamily="49" charset="0"/>
-                <a:cs typeface="Courier New" panose="02070309020205020404" pitchFamily="49" charset="0"/>
-              </a:rPr>
-              <a:t>q.push</a:t>
-            </a:r>
-            <a:r>
-              <a:rPr lang="en-US" dirty="0" smtClean="0">
-                <a:latin typeface="Courier New" panose="02070309020205020404" pitchFamily="49" charset="0"/>
-                <a:cs typeface="Courier New" panose="02070309020205020404" pitchFamily="49" charset="0"/>
-              </a:rPr>
-              <a:t>(</a:t>
-            </a:r>
-            <a:r>
-              <a:rPr lang="en-US" dirty="0" err="1" smtClean="0">
-                <a:latin typeface="Courier New" panose="02070309020205020404" pitchFamily="49" charset="0"/>
-                <a:cs typeface="Courier New" panose="02070309020205020404" pitchFamily="49" charset="0"/>
-              </a:rPr>
-              <a:t>i</a:t>
-            </a:r>
-            <a:r>
-              <a:rPr lang="en-US" dirty="0" smtClean="0">
-                <a:latin typeface="Courier New" panose="02070309020205020404" pitchFamily="49" charset="0"/>
-                <a:cs typeface="Courier New" panose="02070309020205020404" pitchFamily="49" charset="0"/>
-              </a:rPr>
-              <a:t>);</a:t>
-            </a:r>
-          </a:p>
-          <a:p>
-            <a:r>
-              <a:rPr lang="en-US" dirty="0" smtClean="0">
-                <a:latin typeface="Courier New" panose="02070309020205020404" pitchFamily="49" charset="0"/>
-                <a:cs typeface="Courier New" panose="02070309020205020404" pitchFamily="49" charset="0"/>
-              </a:rPr>
-              <a:t>while (!</a:t>
-            </a:r>
-            <a:r>
-              <a:rPr lang="en-US" dirty="0" err="1" smtClean="0">
-                <a:latin typeface="Courier New" panose="02070309020205020404" pitchFamily="49" charset="0"/>
-                <a:cs typeface="Courier New" panose="02070309020205020404" pitchFamily="49" charset="0"/>
-              </a:rPr>
-              <a:t>q.empty</a:t>
-            </a:r>
-            <a:r>
-              <a:rPr lang="en-US" dirty="0" smtClean="0">
-                <a:latin typeface="Courier New" panose="02070309020205020404" pitchFamily="49" charset="0"/>
-                <a:cs typeface="Courier New" panose="02070309020205020404" pitchFamily="49" charset="0"/>
-              </a:rPr>
-              <a:t>()) {</a:t>
-            </a:r>
-            <a:endParaRPr lang="en-US" dirty="0">
-              <a:latin typeface="Courier New" panose="02070309020205020404" pitchFamily="49" charset="0"/>
-              <a:cs typeface="Courier New" panose="02070309020205020404" pitchFamily="49" charset="0"/>
-            </a:endParaRPr>
-          </a:p>
-          <a:p>
-            <a:r>
-              <a:rPr lang="en-US" dirty="0" smtClean="0">
-                <a:latin typeface="Courier New" panose="02070309020205020404" pitchFamily="49" charset="0"/>
-                <a:cs typeface="Courier New" panose="02070309020205020404" pitchFamily="49" charset="0"/>
-              </a:rPr>
-              <a:t>    </a:t>
-            </a:r>
-            <a:r>
-              <a:rPr lang="en-US" dirty="0" err="1">
-                <a:latin typeface="Courier New" panose="02070309020205020404" pitchFamily="49" charset="0"/>
-                <a:cs typeface="Courier New" panose="02070309020205020404" pitchFamily="49" charset="0"/>
-              </a:rPr>
-              <a:t>std</a:t>
-            </a:r>
-            <a:r>
-              <a:rPr lang="en-US" dirty="0">
-                <a:latin typeface="Courier New" panose="02070309020205020404" pitchFamily="49" charset="0"/>
-                <a:cs typeface="Courier New" panose="02070309020205020404" pitchFamily="49" charset="0"/>
-              </a:rPr>
-              <a:t>::</a:t>
-            </a:r>
-            <a:r>
-              <a:rPr lang="en-US" dirty="0" err="1">
-                <a:latin typeface="Courier New" panose="02070309020205020404" pitchFamily="49" charset="0"/>
-                <a:cs typeface="Courier New" panose="02070309020205020404" pitchFamily="49" charset="0"/>
-              </a:rPr>
-              <a:t>cout</a:t>
-            </a:r>
-            <a:r>
-              <a:rPr lang="en-US" dirty="0">
-                <a:latin typeface="Courier New" panose="02070309020205020404" pitchFamily="49" charset="0"/>
-                <a:cs typeface="Courier New" panose="02070309020205020404" pitchFamily="49" charset="0"/>
-              </a:rPr>
-              <a:t> &lt;&lt; </a:t>
-            </a:r>
-            <a:r>
-              <a:rPr lang="en-US" dirty="0" err="1">
-                <a:latin typeface="Courier New" panose="02070309020205020404" pitchFamily="49" charset="0"/>
-                <a:cs typeface="Courier New" panose="02070309020205020404" pitchFamily="49" charset="0"/>
-              </a:rPr>
-              <a:t>q</a:t>
-            </a:r>
-            <a:r>
-              <a:rPr lang="en-US" dirty="0" err="1" smtClean="0">
-                <a:latin typeface="Courier New" panose="02070309020205020404" pitchFamily="49" charset="0"/>
-                <a:cs typeface="Courier New" panose="02070309020205020404" pitchFamily="49" charset="0"/>
-              </a:rPr>
-              <a:t>.front</a:t>
-            </a:r>
-            <a:r>
-              <a:rPr lang="en-US" dirty="0" smtClean="0">
-                <a:latin typeface="Courier New" panose="02070309020205020404" pitchFamily="49" charset="0"/>
-                <a:cs typeface="Courier New" panose="02070309020205020404" pitchFamily="49" charset="0"/>
-              </a:rPr>
-              <a:t>() </a:t>
-            </a:r>
-            <a:r>
-              <a:rPr lang="en-US" dirty="0">
-                <a:latin typeface="Courier New" panose="02070309020205020404" pitchFamily="49" charset="0"/>
-                <a:cs typeface="Courier New" panose="02070309020205020404" pitchFamily="49" charset="0"/>
-              </a:rPr>
-              <a:t>&lt;&lt; </a:t>
-            </a:r>
-            <a:r>
-              <a:rPr lang="en-US" dirty="0" err="1">
-                <a:latin typeface="Courier New" panose="02070309020205020404" pitchFamily="49" charset="0"/>
-                <a:cs typeface="Courier New" panose="02070309020205020404" pitchFamily="49" charset="0"/>
-              </a:rPr>
-              <a:t>std</a:t>
-            </a:r>
-            <a:r>
-              <a:rPr lang="en-US" dirty="0">
-                <a:latin typeface="Courier New" panose="02070309020205020404" pitchFamily="49" charset="0"/>
-                <a:cs typeface="Courier New" panose="02070309020205020404" pitchFamily="49" charset="0"/>
-              </a:rPr>
-              <a:t>::</a:t>
-            </a:r>
-            <a:r>
-              <a:rPr lang="en-US" dirty="0" err="1">
-                <a:latin typeface="Courier New" panose="02070309020205020404" pitchFamily="49" charset="0"/>
-                <a:cs typeface="Courier New" panose="02070309020205020404" pitchFamily="49" charset="0"/>
-              </a:rPr>
-              <a:t>endl</a:t>
-            </a:r>
-            <a:r>
-              <a:rPr lang="en-US" dirty="0" smtClean="0">
-                <a:latin typeface="Courier New" panose="02070309020205020404" pitchFamily="49" charset="0"/>
-                <a:cs typeface="Courier New" panose="02070309020205020404" pitchFamily="49" charset="0"/>
-              </a:rPr>
-              <a:t>;</a:t>
-            </a:r>
-          </a:p>
-          <a:p>
-            <a:r>
-              <a:rPr lang="en-US" dirty="0">
-                <a:latin typeface="Courier New" panose="02070309020205020404" pitchFamily="49" charset="0"/>
-                <a:cs typeface="Courier New" panose="02070309020205020404" pitchFamily="49" charset="0"/>
-              </a:rPr>
-              <a:t> </a:t>
-            </a:r>
-            <a:r>
-              <a:rPr lang="en-US" dirty="0" smtClean="0">
-                <a:latin typeface="Courier New" panose="02070309020205020404" pitchFamily="49" charset="0"/>
-                <a:cs typeface="Courier New" panose="02070309020205020404" pitchFamily="49" charset="0"/>
-              </a:rPr>
-              <a:t>   </a:t>
-            </a:r>
-            <a:r>
-              <a:rPr lang="en-US" dirty="0" err="1">
-                <a:latin typeface="Courier New" panose="02070309020205020404" pitchFamily="49" charset="0"/>
-                <a:cs typeface="Courier New" panose="02070309020205020404" pitchFamily="49" charset="0"/>
-              </a:rPr>
-              <a:t>q</a:t>
-            </a:r>
-            <a:r>
-              <a:rPr lang="en-US" dirty="0" err="1" smtClean="0">
-                <a:latin typeface="Courier New" panose="02070309020205020404" pitchFamily="49" charset="0"/>
-                <a:cs typeface="Courier New" panose="02070309020205020404" pitchFamily="49" charset="0"/>
-              </a:rPr>
-              <a:t>.pop</a:t>
-            </a:r>
-            <a:r>
-              <a:rPr lang="en-US" dirty="0" smtClean="0">
-                <a:latin typeface="Courier New" panose="02070309020205020404" pitchFamily="49" charset="0"/>
-                <a:cs typeface="Courier New" panose="02070309020205020404" pitchFamily="49" charset="0"/>
-              </a:rPr>
-              <a:t>();</a:t>
-            </a:r>
-          </a:p>
-          <a:p>
-            <a:r>
-              <a:rPr lang="en-US" dirty="0">
-                <a:latin typeface="Courier New" panose="02070309020205020404" pitchFamily="49" charset="0"/>
-                <a:cs typeface="Courier New" panose="02070309020205020404" pitchFamily="49" charset="0"/>
-              </a:rPr>
-              <a:t>}</a:t>
-            </a:r>
-          </a:p>
-        </p:txBody>
-      </p:sp>
-      <p:sp>
-        <p:nvSpPr>
-          <p:cNvPr id="6" name="TextBox 5"/>
-          <p:cNvSpPr txBox="1"/>
-          <p:nvPr/>
-        </p:nvSpPr>
-        <p:spPr>
-          <a:xfrm>
-            <a:off x="628650" y="4562823"/>
-            <a:ext cx="6665768" cy="1477328"/>
-          </a:xfrm>
-          <a:prstGeom prst="rect">
-            <a:avLst/>
-          </a:prstGeom>
-          <a:solidFill>
-            <a:schemeClr val="accent4">
-              <a:lumMod val="40000"/>
-              <a:lumOff val="60000"/>
-            </a:schemeClr>
-          </a:solidFill>
-          <a:ln>
-            <a:solidFill>
-              <a:schemeClr val="tx1"/>
-            </a:solidFill>
-          </a:ln>
-        </p:spPr>
-        <p:txBody>
-          <a:bodyPr wrap="square" rtlCol="0">
-            <a:spAutoFit/>
-          </a:bodyPr>
-          <a:lstStyle/>
-          <a:p>
-            <a:r>
-              <a:rPr lang="en-US" dirty="0" smtClean="0">
-                <a:latin typeface="Courier New" panose="02070309020205020404" pitchFamily="49" charset="0"/>
-                <a:cs typeface="Courier New" panose="02070309020205020404" pitchFamily="49" charset="0"/>
-              </a:rPr>
-              <a:t>q = list()</a:t>
-            </a:r>
-          </a:p>
-          <a:p>
-            <a:r>
-              <a:rPr lang="en-US" dirty="0" smtClean="0">
-                <a:latin typeface="Courier New" panose="02070309020205020404" pitchFamily="49" charset="0"/>
-                <a:cs typeface="Courier New" panose="02070309020205020404" pitchFamily="49" charset="0"/>
-              </a:rPr>
-              <a:t>for x in range(10):</a:t>
-            </a:r>
-          </a:p>
-          <a:p>
-            <a:r>
-              <a:rPr lang="en-US" dirty="0">
-                <a:latin typeface="Courier New" panose="02070309020205020404" pitchFamily="49" charset="0"/>
-                <a:cs typeface="Courier New" panose="02070309020205020404" pitchFamily="49" charset="0"/>
-              </a:rPr>
-              <a:t> </a:t>
-            </a:r>
-            <a:r>
-              <a:rPr lang="en-US" dirty="0" smtClean="0">
-                <a:latin typeface="Courier New" panose="02070309020205020404" pitchFamily="49" charset="0"/>
-                <a:cs typeface="Courier New" panose="02070309020205020404" pitchFamily="49" charset="0"/>
-              </a:rPr>
-              <a:t>   </a:t>
-            </a:r>
-            <a:r>
-              <a:rPr lang="en-US" dirty="0" err="1">
-                <a:latin typeface="Courier New" panose="02070309020205020404" pitchFamily="49" charset="0"/>
-                <a:cs typeface="Courier New" panose="02070309020205020404" pitchFamily="49" charset="0"/>
-              </a:rPr>
-              <a:t>q</a:t>
-            </a:r>
-            <a:r>
-              <a:rPr lang="en-US" dirty="0" err="1" smtClean="0">
-                <a:latin typeface="Courier New" panose="02070309020205020404" pitchFamily="49" charset="0"/>
-                <a:cs typeface="Courier New" panose="02070309020205020404" pitchFamily="49" charset="0"/>
-              </a:rPr>
-              <a:t>.append</a:t>
-            </a:r>
-            <a:r>
-              <a:rPr lang="en-US" dirty="0" smtClean="0">
-                <a:latin typeface="Courier New" panose="02070309020205020404" pitchFamily="49" charset="0"/>
-                <a:cs typeface="Courier New" panose="02070309020205020404" pitchFamily="49" charset="0"/>
-              </a:rPr>
-              <a:t>(x)</a:t>
-            </a:r>
-            <a:endParaRPr lang="en-US" dirty="0">
-              <a:latin typeface="Courier New" panose="02070309020205020404" pitchFamily="49" charset="0"/>
-              <a:cs typeface="Courier New" panose="02070309020205020404" pitchFamily="49" charset="0"/>
-            </a:endParaRPr>
-          </a:p>
-          <a:p>
-            <a:r>
-              <a:rPr lang="en-US" dirty="0" smtClean="0">
-                <a:latin typeface="Courier New" panose="02070309020205020404" pitchFamily="49" charset="0"/>
-                <a:cs typeface="Courier New" panose="02070309020205020404" pitchFamily="49" charset="0"/>
-              </a:rPr>
-              <a:t>while s:</a:t>
-            </a:r>
-          </a:p>
-          <a:p>
-            <a:r>
-              <a:rPr lang="en-US" dirty="0">
-                <a:latin typeface="Courier New" panose="02070309020205020404" pitchFamily="49" charset="0"/>
-                <a:cs typeface="Courier New" panose="02070309020205020404" pitchFamily="49" charset="0"/>
-              </a:rPr>
-              <a:t> </a:t>
-            </a:r>
-            <a:r>
-              <a:rPr lang="en-US" dirty="0" smtClean="0">
-                <a:latin typeface="Courier New" panose="02070309020205020404" pitchFamily="49" charset="0"/>
-                <a:cs typeface="Courier New" panose="02070309020205020404" pitchFamily="49" charset="0"/>
-              </a:rPr>
-              <a:t>   print('{0:d}'.format(</a:t>
-            </a:r>
-            <a:r>
-              <a:rPr lang="en-US" dirty="0" err="1" smtClean="0">
-                <a:latin typeface="Courier New" panose="02070309020205020404" pitchFamily="49" charset="0"/>
-                <a:cs typeface="Courier New" panose="02070309020205020404" pitchFamily="49" charset="0"/>
-              </a:rPr>
-              <a:t>s.pop</a:t>
-            </a:r>
-            <a:r>
-              <a:rPr lang="en-US" dirty="0" smtClean="0">
-                <a:latin typeface="Courier New" panose="02070309020205020404" pitchFamily="49" charset="0"/>
-                <a:cs typeface="Courier New" panose="02070309020205020404" pitchFamily="49" charset="0"/>
-              </a:rPr>
-              <a:t>(0)))</a:t>
-            </a:r>
-          </a:p>
-        </p:txBody>
-      </p:sp>
     </p:spTree>
     <p:extLst>
       <p:ext uri="{BB962C8B-B14F-4D97-AF65-F5344CB8AC3E}">
-        <p14:creationId xmlns:p14="http://schemas.microsoft.com/office/powerpoint/2010/main" val="3930827009"/>
+        <p14:creationId xmlns:p14="http://schemas.microsoft.com/office/powerpoint/2010/main" val="1534393266"/>
       </p:ext>
     </p:extLst>
   </p:cSld>
@@ -20968,6 +20812,1011 @@
       </p:grpSpPr>
       <p:sp>
         <p:nvSpPr>
+          <p:cNvPr id="2" name="Title 1"/>
+          <p:cNvSpPr>
+            <a:spLocks noGrp="1"/>
+          </p:cNvSpPr>
+          <p:nvPr>
+            <p:ph type="title"/>
+          </p:nvPr>
+        </p:nvSpPr>
+        <p:spPr/>
+        <p:txBody>
+          <a:bodyPr/>
+          <a:lstStyle/>
+          <a:p>
+            <a:r>
+              <a:rPr lang="en-US" dirty="0" smtClean="0"/>
+              <a:t>Queue examples</a:t>
+            </a:r>
+            <a:endParaRPr lang="en-US" dirty="0"/>
+          </a:p>
+        </p:txBody>
+      </p:sp>
+      <p:sp>
+        <p:nvSpPr>
+          <p:cNvPr id="4" name="Slide Number Placeholder 3"/>
+          <p:cNvSpPr>
+            <a:spLocks noGrp="1"/>
+          </p:cNvSpPr>
+          <p:nvPr>
+            <p:ph type="sldNum" sz="quarter" idx="12"/>
+          </p:nvPr>
+        </p:nvSpPr>
+        <p:spPr/>
+        <p:txBody>
+          <a:bodyPr/>
+          <a:lstStyle/>
+          <a:p>
+            <a:fld id="{11AD1F4E-1E51-402E-B221-310F004E7D3B}" type="slidenum">
+              <a:rPr lang="en-US" smtClean="0"/>
+              <a:t>36</a:t>
+            </a:fld>
+            <a:endParaRPr lang="en-US"/>
+          </a:p>
+        </p:txBody>
+      </p:sp>
+      <p:sp>
+        <p:nvSpPr>
+          <p:cNvPr id="5" name="TextBox 4"/>
+          <p:cNvSpPr txBox="1"/>
+          <p:nvPr/>
+        </p:nvSpPr>
+        <p:spPr>
+          <a:xfrm>
+            <a:off x="628650" y="1704105"/>
+            <a:ext cx="6665768" cy="2585323"/>
+          </a:xfrm>
+          <a:prstGeom prst="rect">
+            <a:avLst/>
+          </a:prstGeom>
+          <a:solidFill>
+            <a:schemeClr val="tx2">
+              <a:lumMod val="40000"/>
+              <a:lumOff val="60000"/>
+            </a:schemeClr>
+          </a:solidFill>
+          <a:ln>
+            <a:solidFill>
+              <a:schemeClr val="tx1"/>
+            </a:solidFill>
+          </a:ln>
+        </p:spPr>
+        <p:txBody>
+          <a:bodyPr wrap="square" rtlCol="0">
+            <a:spAutoFit/>
+          </a:bodyPr>
+          <a:lstStyle/>
+          <a:p>
+            <a:r>
+              <a:rPr lang="en-US" dirty="0" smtClean="0">
+                <a:latin typeface="Courier New" panose="02070309020205020404" pitchFamily="49" charset="0"/>
+                <a:cs typeface="Courier New" panose="02070309020205020404" pitchFamily="49" charset="0"/>
+              </a:rPr>
+              <a:t>#include &lt;</a:t>
+            </a:r>
+            <a:r>
+              <a:rPr lang="en-US" dirty="0" err="1" smtClean="0">
+                <a:latin typeface="Courier New" panose="02070309020205020404" pitchFamily="49" charset="0"/>
+                <a:cs typeface="Courier New" panose="02070309020205020404" pitchFamily="49" charset="0"/>
+              </a:rPr>
+              <a:t>iostream</a:t>
+            </a:r>
+            <a:r>
+              <a:rPr lang="en-US" dirty="0" smtClean="0">
+                <a:latin typeface="Courier New" panose="02070309020205020404" pitchFamily="49" charset="0"/>
+                <a:cs typeface="Courier New" panose="02070309020205020404" pitchFamily="49" charset="0"/>
+              </a:rPr>
+              <a:t>&gt;</a:t>
+            </a:r>
+          </a:p>
+          <a:p>
+            <a:r>
+              <a:rPr lang="en-US" dirty="0" smtClean="0">
+                <a:latin typeface="Courier New" panose="02070309020205020404" pitchFamily="49" charset="0"/>
+                <a:cs typeface="Courier New" panose="02070309020205020404" pitchFamily="49" charset="0"/>
+              </a:rPr>
+              <a:t>#include &lt;queue&gt;</a:t>
+            </a:r>
+          </a:p>
+          <a:p>
+            <a:r>
+              <a:rPr lang="en-US" dirty="0" err="1" smtClean="0">
+                <a:latin typeface="Courier New" panose="02070309020205020404" pitchFamily="49" charset="0"/>
+                <a:cs typeface="Courier New" panose="02070309020205020404" pitchFamily="49" charset="0"/>
+              </a:rPr>
+              <a:t>std</a:t>
+            </a:r>
+            <a:r>
+              <a:rPr lang="en-US" dirty="0" smtClean="0">
+                <a:latin typeface="Courier New" panose="02070309020205020404" pitchFamily="49" charset="0"/>
+                <a:cs typeface="Courier New" panose="02070309020205020404" pitchFamily="49" charset="0"/>
+              </a:rPr>
+              <a:t>::queue&lt;</a:t>
+            </a:r>
+            <a:r>
+              <a:rPr lang="en-US" dirty="0" err="1" smtClean="0">
+                <a:latin typeface="Courier New" panose="02070309020205020404" pitchFamily="49" charset="0"/>
+                <a:cs typeface="Courier New" panose="02070309020205020404" pitchFamily="49" charset="0"/>
+              </a:rPr>
+              <a:t>int</a:t>
+            </a:r>
+            <a:r>
+              <a:rPr lang="en-US" dirty="0" smtClean="0">
+                <a:latin typeface="Courier New" panose="02070309020205020404" pitchFamily="49" charset="0"/>
+                <a:cs typeface="Courier New" panose="02070309020205020404" pitchFamily="49" charset="0"/>
+              </a:rPr>
+              <a:t>&gt; q;</a:t>
+            </a:r>
+          </a:p>
+          <a:p>
+            <a:r>
+              <a:rPr lang="en-US" dirty="0" smtClean="0">
+                <a:latin typeface="Courier New" panose="02070309020205020404" pitchFamily="49" charset="0"/>
+                <a:cs typeface="Courier New" panose="02070309020205020404" pitchFamily="49" charset="0"/>
+              </a:rPr>
+              <a:t>for </a:t>
+            </a:r>
+            <a:r>
+              <a:rPr lang="en-US" dirty="0" smtClean="0">
+                <a:latin typeface="Courier New" panose="02070309020205020404" pitchFamily="49" charset="0"/>
+                <a:cs typeface="Courier New" panose="02070309020205020404" pitchFamily="49" charset="0"/>
+              </a:rPr>
+              <a:t>(</a:t>
+            </a:r>
+            <a:r>
+              <a:rPr lang="en-US" dirty="0" err="1" smtClean="0">
+                <a:latin typeface="Courier New" panose="02070309020205020404" pitchFamily="49" charset="0"/>
+                <a:cs typeface="Courier New" panose="02070309020205020404" pitchFamily="49" charset="0"/>
+              </a:rPr>
+              <a:t>int</a:t>
+            </a:r>
+            <a:r>
+              <a:rPr lang="en-US" dirty="0" smtClean="0">
+                <a:latin typeface="Courier New" panose="02070309020205020404" pitchFamily="49" charset="0"/>
+                <a:cs typeface="Courier New" panose="02070309020205020404" pitchFamily="49" charset="0"/>
+              </a:rPr>
+              <a:t> </a:t>
+            </a:r>
+            <a:r>
+              <a:rPr lang="en-US" dirty="0" err="1" smtClean="0">
+                <a:latin typeface="Courier New" panose="02070309020205020404" pitchFamily="49" charset="0"/>
+                <a:cs typeface="Courier New" panose="02070309020205020404" pitchFamily="49" charset="0"/>
+              </a:rPr>
+              <a:t>i</a:t>
+            </a:r>
+            <a:r>
+              <a:rPr lang="en-US" dirty="0" smtClean="0">
+                <a:latin typeface="Courier New" panose="02070309020205020404" pitchFamily="49" charset="0"/>
+                <a:cs typeface="Courier New" panose="02070309020205020404" pitchFamily="49" charset="0"/>
+              </a:rPr>
+              <a:t> </a:t>
+            </a:r>
+            <a:r>
+              <a:rPr lang="en-US" dirty="0" smtClean="0">
+                <a:latin typeface="Courier New" panose="02070309020205020404" pitchFamily="49" charset="0"/>
+                <a:cs typeface="Courier New" panose="02070309020205020404" pitchFamily="49" charset="0"/>
+              </a:rPr>
+              <a:t>= 0; </a:t>
+            </a:r>
+            <a:r>
+              <a:rPr lang="en-US" dirty="0" err="1" smtClean="0">
+                <a:latin typeface="Courier New" panose="02070309020205020404" pitchFamily="49" charset="0"/>
+                <a:cs typeface="Courier New" panose="02070309020205020404" pitchFamily="49" charset="0"/>
+              </a:rPr>
+              <a:t>i</a:t>
+            </a:r>
+            <a:r>
+              <a:rPr lang="en-US" dirty="0" smtClean="0">
+                <a:latin typeface="Courier New" panose="02070309020205020404" pitchFamily="49" charset="0"/>
+                <a:cs typeface="Courier New" panose="02070309020205020404" pitchFamily="49" charset="0"/>
+              </a:rPr>
+              <a:t> &lt; 10; </a:t>
+            </a:r>
+            <a:r>
+              <a:rPr lang="en-US" dirty="0" err="1" smtClean="0">
+                <a:latin typeface="Courier New" panose="02070309020205020404" pitchFamily="49" charset="0"/>
+                <a:cs typeface="Courier New" panose="02070309020205020404" pitchFamily="49" charset="0"/>
+              </a:rPr>
+              <a:t>i</a:t>
+            </a:r>
+            <a:r>
+              <a:rPr lang="en-US" dirty="0" smtClean="0">
+                <a:latin typeface="Courier New" panose="02070309020205020404" pitchFamily="49" charset="0"/>
+                <a:cs typeface="Courier New" panose="02070309020205020404" pitchFamily="49" charset="0"/>
+              </a:rPr>
+              <a:t>++)</a:t>
+            </a:r>
+          </a:p>
+          <a:p>
+            <a:r>
+              <a:rPr lang="en-US" dirty="0">
+                <a:latin typeface="Courier New" panose="02070309020205020404" pitchFamily="49" charset="0"/>
+                <a:cs typeface="Courier New" panose="02070309020205020404" pitchFamily="49" charset="0"/>
+              </a:rPr>
+              <a:t> </a:t>
+            </a:r>
+            <a:r>
+              <a:rPr lang="en-US" dirty="0" smtClean="0">
+                <a:latin typeface="Courier New" panose="02070309020205020404" pitchFamily="49" charset="0"/>
+                <a:cs typeface="Courier New" panose="02070309020205020404" pitchFamily="49" charset="0"/>
+              </a:rPr>
+              <a:t>   </a:t>
+            </a:r>
+            <a:r>
+              <a:rPr lang="en-US" dirty="0" err="1" smtClean="0">
+                <a:latin typeface="Courier New" panose="02070309020205020404" pitchFamily="49" charset="0"/>
+                <a:cs typeface="Courier New" panose="02070309020205020404" pitchFamily="49" charset="0"/>
+              </a:rPr>
+              <a:t>q.push</a:t>
+            </a:r>
+            <a:r>
+              <a:rPr lang="en-US" dirty="0" smtClean="0">
+                <a:latin typeface="Courier New" panose="02070309020205020404" pitchFamily="49" charset="0"/>
+                <a:cs typeface="Courier New" panose="02070309020205020404" pitchFamily="49" charset="0"/>
+              </a:rPr>
+              <a:t>(</a:t>
+            </a:r>
+            <a:r>
+              <a:rPr lang="en-US" dirty="0" err="1" smtClean="0">
+                <a:latin typeface="Courier New" panose="02070309020205020404" pitchFamily="49" charset="0"/>
+                <a:cs typeface="Courier New" panose="02070309020205020404" pitchFamily="49" charset="0"/>
+              </a:rPr>
+              <a:t>i</a:t>
+            </a:r>
+            <a:r>
+              <a:rPr lang="en-US" dirty="0" smtClean="0">
+                <a:latin typeface="Courier New" panose="02070309020205020404" pitchFamily="49" charset="0"/>
+                <a:cs typeface="Courier New" panose="02070309020205020404" pitchFamily="49" charset="0"/>
+              </a:rPr>
+              <a:t>);</a:t>
+            </a:r>
+          </a:p>
+          <a:p>
+            <a:r>
+              <a:rPr lang="en-US" dirty="0" smtClean="0">
+                <a:latin typeface="Courier New" panose="02070309020205020404" pitchFamily="49" charset="0"/>
+                <a:cs typeface="Courier New" panose="02070309020205020404" pitchFamily="49" charset="0"/>
+              </a:rPr>
+              <a:t>while (!</a:t>
+            </a:r>
+            <a:r>
+              <a:rPr lang="en-US" dirty="0" err="1" smtClean="0">
+                <a:latin typeface="Courier New" panose="02070309020205020404" pitchFamily="49" charset="0"/>
+                <a:cs typeface="Courier New" panose="02070309020205020404" pitchFamily="49" charset="0"/>
+              </a:rPr>
+              <a:t>q.empty</a:t>
+            </a:r>
+            <a:r>
+              <a:rPr lang="en-US" dirty="0" smtClean="0">
+                <a:latin typeface="Courier New" panose="02070309020205020404" pitchFamily="49" charset="0"/>
+                <a:cs typeface="Courier New" panose="02070309020205020404" pitchFamily="49" charset="0"/>
+              </a:rPr>
+              <a:t>()) {</a:t>
+            </a:r>
+            <a:endParaRPr lang="en-US" dirty="0">
+              <a:latin typeface="Courier New" panose="02070309020205020404" pitchFamily="49" charset="0"/>
+              <a:cs typeface="Courier New" panose="02070309020205020404" pitchFamily="49" charset="0"/>
+            </a:endParaRPr>
+          </a:p>
+          <a:p>
+            <a:r>
+              <a:rPr lang="en-US" dirty="0" smtClean="0">
+                <a:latin typeface="Courier New" panose="02070309020205020404" pitchFamily="49" charset="0"/>
+                <a:cs typeface="Courier New" panose="02070309020205020404" pitchFamily="49" charset="0"/>
+              </a:rPr>
+              <a:t>    </a:t>
+            </a:r>
+            <a:r>
+              <a:rPr lang="en-US" dirty="0" err="1">
+                <a:latin typeface="Courier New" panose="02070309020205020404" pitchFamily="49" charset="0"/>
+                <a:cs typeface="Courier New" panose="02070309020205020404" pitchFamily="49" charset="0"/>
+              </a:rPr>
+              <a:t>std</a:t>
+            </a:r>
+            <a:r>
+              <a:rPr lang="en-US" dirty="0">
+                <a:latin typeface="Courier New" panose="02070309020205020404" pitchFamily="49" charset="0"/>
+                <a:cs typeface="Courier New" panose="02070309020205020404" pitchFamily="49" charset="0"/>
+              </a:rPr>
+              <a:t>::</a:t>
+            </a:r>
+            <a:r>
+              <a:rPr lang="en-US" dirty="0" err="1">
+                <a:latin typeface="Courier New" panose="02070309020205020404" pitchFamily="49" charset="0"/>
+                <a:cs typeface="Courier New" panose="02070309020205020404" pitchFamily="49" charset="0"/>
+              </a:rPr>
+              <a:t>cout</a:t>
+            </a:r>
+            <a:r>
+              <a:rPr lang="en-US" dirty="0">
+                <a:latin typeface="Courier New" panose="02070309020205020404" pitchFamily="49" charset="0"/>
+                <a:cs typeface="Courier New" panose="02070309020205020404" pitchFamily="49" charset="0"/>
+              </a:rPr>
+              <a:t> &lt;&lt; </a:t>
+            </a:r>
+            <a:r>
+              <a:rPr lang="en-US" dirty="0" err="1">
+                <a:latin typeface="Courier New" panose="02070309020205020404" pitchFamily="49" charset="0"/>
+                <a:cs typeface="Courier New" panose="02070309020205020404" pitchFamily="49" charset="0"/>
+              </a:rPr>
+              <a:t>q</a:t>
+            </a:r>
+            <a:r>
+              <a:rPr lang="en-US" dirty="0" err="1" smtClean="0">
+                <a:latin typeface="Courier New" panose="02070309020205020404" pitchFamily="49" charset="0"/>
+                <a:cs typeface="Courier New" panose="02070309020205020404" pitchFamily="49" charset="0"/>
+              </a:rPr>
+              <a:t>.front</a:t>
+            </a:r>
+            <a:r>
+              <a:rPr lang="en-US" dirty="0" smtClean="0">
+                <a:latin typeface="Courier New" panose="02070309020205020404" pitchFamily="49" charset="0"/>
+                <a:cs typeface="Courier New" panose="02070309020205020404" pitchFamily="49" charset="0"/>
+              </a:rPr>
+              <a:t>() </a:t>
+            </a:r>
+            <a:r>
+              <a:rPr lang="en-US" dirty="0">
+                <a:latin typeface="Courier New" panose="02070309020205020404" pitchFamily="49" charset="0"/>
+                <a:cs typeface="Courier New" panose="02070309020205020404" pitchFamily="49" charset="0"/>
+              </a:rPr>
+              <a:t>&lt;&lt; </a:t>
+            </a:r>
+            <a:r>
+              <a:rPr lang="en-US" dirty="0" err="1">
+                <a:latin typeface="Courier New" panose="02070309020205020404" pitchFamily="49" charset="0"/>
+                <a:cs typeface="Courier New" panose="02070309020205020404" pitchFamily="49" charset="0"/>
+              </a:rPr>
+              <a:t>std</a:t>
+            </a:r>
+            <a:r>
+              <a:rPr lang="en-US" dirty="0">
+                <a:latin typeface="Courier New" panose="02070309020205020404" pitchFamily="49" charset="0"/>
+                <a:cs typeface="Courier New" panose="02070309020205020404" pitchFamily="49" charset="0"/>
+              </a:rPr>
+              <a:t>::</a:t>
+            </a:r>
+            <a:r>
+              <a:rPr lang="en-US" dirty="0" err="1">
+                <a:latin typeface="Courier New" panose="02070309020205020404" pitchFamily="49" charset="0"/>
+                <a:cs typeface="Courier New" panose="02070309020205020404" pitchFamily="49" charset="0"/>
+              </a:rPr>
+              <a:t>endl</a:t>
+            </a:r>
+            <a:r>
+              <a:rPr lang="en-US" dirty="0" smtClean="0">
+                <a:latin typeface="Courier New" panose="02070309020205020404" pitchFamily="49" charset="0"/>
+                <a:cs typeface="Courier New" panose="02070309020205020404" pitchFamily="49" charset="0"/>
+              </a:rPr>
+              <a:t>;</a:t>
+            </a:r>
+          </a:p>
+          <a:p>
+            <a:r>
+              <a:rPr lang="en-US" dirty="0">
+                <a:latin typeface="Courier New" panose="02070309020205020404" pitchFamily="49" charset="0"/>
+                <a:cs typeface="Courier New" panose="02070309020205020404" pitchFamily="49" charset="0"/>
+              </a:rPr>
+              <a:t> </a:t>
+            </a:r>
+            <a:r>
+              <a:rPr lang="en-US" dirty="0" smtClean="0">
+                <a:latin typeface="Courier New" panose="02070309020205020404" pitchFamily="49" charset="0"/>
+                <a:cs typeface="Courier New" panose="02070309020205020404" pitchFamily="49" charset="0"/>
+              </a:rPr>
+              <a:t>   </a:t>
+            </a:r>
+            <a:r>
+              <a:rPr lang="en-US" dirty="0" err="1">
+                <a:latin typeface="Courier New" panose="02070309020205020404" pitchFamily="49" charset="0"/>
+                <a:cs typeface="Courier New" panose="02070309020205020404" pitchFamily="49" charset="0"/>
+              </a:rPr>
+              <a:t>q</a:t>
+            </a:r>
+            <a:r>
+              <a:rPr lang="en-US" dirty="0" err="1" smtClean="0">
+                <a:latin typeface="Courier New" panose="02070309020205020404" pitchFamily="49" charset="0"/>
+                <a:cs typeface="Courier New" panose="02070309020205020404" pitchFamily="49" charset="0"/>
+              </a:rPr>
+              <a:t>.pop</a:t>
+            </a:r>
+            <a:r>
+              <a:rPr lang="en-US" dirty="0" smtClean="0">
+                <a:latin typeface="Courier New" panose="02070309020205020404" pitchFamily="49" charset="0"/>
+                <a:cs typeface="Courier New" panose="02070309020205020404" pitchFamily="49" charset="0"/>
+              </a:rPr>
+              <a:t>();</a:t>
+            </a:r>
+          </a:p>
+          <a:p>
+            <a:r>
+              <a:rPr lang="en-US" dirty="0">
+                <a:latin typeface="Courier New" panose="02070309020205020404" pitchFamily="49" charset="0"/>
+                <a:cs typeface="Courier New" panose="02070309020205020404" pitchFamily="49" charset="0"/>
+              </a:rPr>
+              <a:t>}</a:t>
+            </a:r>
+          </a:p>
+        </p:txBody>
+      </p:sp>
+      <p:sp>
+        <p:nvSpPr>
+          <p:cNvPr id="6" name="TextBox 5"/>
+          <p:cNvSpPr txBox="1"/>
+          <p:nvPr/>
+        </p:nvSpPr>
+        <p:spPr>
+          <a:xfrm>
+            <a:off x="628650" y="4562823"/>
+            <a:ext cx="6665768" cy="1477328"/>
+          </a:xfrm>
+          <a:prstGeom prst="rect">
+            <a:avLst/>
+          </a:prstGeom>
+          <a:solidFill>
+            <a:schemeClr val="accent4">
+              <a:lumMod val="40000"/>
+              <a:lumOff val="60000"/>
+            </a:schemeClr>
+          </a:solidFill>
+          <a:ln>
+            <a:solidFill>
+              <a:schemeClr val="tx1"/>
+            </a:solidFill>
+          </a:ln>
+        </p:spPr>
+        <p:txBody>
+          <a:bodyPr wrap="square" rtlCol="0">
+            <a:spAutoFit/>
+          </a:bodyPr>
+          <a:lstStyle/>
+          <a:p>
+            <a:r>
+              <a:rPr lang="en-US" dirty="0" smtClean="0">
+                <a:latin typeface="Courier New" panose="02070309020205020404" pitchFamily="49" charset="0"/>
+                <a:cs typeface="Courier New" panose="02070309020205020404" pitchFamily="49" charset="0"/>
+              </a:rPr>
+              <a:t>q = list()</a:t>
+            </a:r>
+          </a:p>
+          <a:p>
+            <a:r>
+              <a:rPr lang="en-US" dirty="0" smtClean="0">
+                <a:latin typeface="Courier New" panose="02070309020205020404" pitchFamily="49" charset="0"/>
+                <a:cs typeface="Courier New" panose="02070309020205020404" pitchFamily="49" charset="0"/>
+              </a:rPr>
+              <a:t>for x in range(10):</a:t>
+            </a:r>
+          </a:p>
+          <a:p>
+            <a:r>
+              <a:rPr lang="en-US" dirty="0">
+                <a:latin typeface="Courier New" panose="02070309020205020404" pitchFamily="49" charset="0"/>
+                <a:cs typeface="Courier New" panose="02070309020205020404" pitchFamily="49" charset="0"/>
+              </a:rPr>
+              <a:t> </a:t>
+            </a:r>
+            <a:r>
+              <a:rPr lang="en-US" dirty="0" smtClean="0">
+                <a:latin typeface="Courier New" panose="02070309020205020404" pitchFamily="49" charset="0"/>
+                <a:cs typeface="Courier New" panose="02070309020205020404" pitchFamily="49" charset="0"/>
+              </a:rPr>
+              <a:t>   </a:t>
+            </a:r>
+            <a:r>
+              <a:rPr lang="en-US" dirty="0" err="1">
+                <a:latin typeface="Courier New" panose="02070309020205020404" pitchFamily="49" charset="0"/>
+                <a:cs typeface="Courier New" panose="02070309020205020404" pitchFamily="49" charset="0"/>
+              </a:rPr>
+              <a:t>q</a:t>
+            </a:r>
+            <a:r>
+              <a:rPr lang="en-US" dirty="0" err="1" smtClean="0">
+                <a:latin typeface="Courier New" panose="02070309020205020404" pitchFamily="49" charset="0"/>
+                <a:cs typeface="Courier New" panose="02070309020205020404" pitchFamily="49" charset="0"/>
+              </a:rPr>
+              <a:t>.append</a:t>
+            </a:r>
+            <a:r>
+              <a:rPr lang="en-US" dirty="0" smtClean="0">
+                <a:latin typeface="Courier New" panose="02070309020205020404" pitchFamily="49" charset="0"/>
+                <a:cs typeface="Courier New" panose="02070309020205020404" pitchFamily="49" charset="0"/>
+              </a:rPr>
+              <a:t>(x)</a:t>
+            </a:r>
+            <a:endParaRPr lang="en-US" dirty="0">
+              <a:latin typeface="Courier New" panose="02070309020205020404" pitchFamily="49" charset="0"/>
+              <a:cs typeface="Courier New" panose="02070309020205020404" pitchFamily="49" charset="0"/>
+            </a:endParaRPr>
+          </a:p>
+          <a:p>
+            <a:r>
+              <a:rPr lang="en-US" dirty="0" smtClean="0">
+                <a:latin typeface="Courier New" panose="02070309020205020404" pitchFamily="49" charset="0"/>
+                <a:cs typeface="Courier New" panose="02070309020205020404" pitchFamily="49" charset="0"/>
+              </a:rPr>
+              <a:t>while s:</a:t>
+            </a:r>
+          </a:p>
+          <a:p>
+            <a:r>
+              <a:rPr lang="en-US" dirty="0">
+                <a:latin typeface="Courier New" panose="02070309020205020404" pitchFamily="49" charset="0"/>
+                <a:cs typeface="Courier New" panose="02070309020205020404" pitchFamily="49" charset="0"/>
+              </a:rPr>
+              <a:t> </a:t>
+            </a:r>
+            <a:r>
+              <a:rPr lang="en-US" dirty="0" smtClean="0">
+                <a:latin typeface="Courier New" panose="02070309020205020404" pitchFamily="49" charset="0"/>
+                <a:cs typeface="Courier New" panose="02070309020205020404" pitchFamily="49" charset="0"/>
+              </a:rPr>
+              <a:t>   print('{0:d}'.format(</a:t>
+            </a:r>
+            <a:r>
+              <a:rPr lang="en-US" dirty="0" err="1" smtClean="0">
+                <a:latin typeface="Courier New" panose="02070309020205020404" pitchFamily="49" charset="0"/>
+                <a:cs typeface="Courier New" panose="02070309020205020404" pitchFamily="49" charset="0"/>
+              </a:rPr>
+              <a:t>s.pop</a:t>
+            </a:r>
+            <a:r>
+              <a:rPr lang="en-US" dirty="0" smtClean="0">
+                <a:latin typeface="Courier New" panose="02070309020205020404" pitchFamily="49" charset="0"/>
+                <a:cs typeface="Courier New" panose="02070309020205020404" pitchFamily="49" charset="0"/>
+              </a:rPr>
+              <a:t>(0)))</a:t>
+            </a:r>
+          </a:p>
+        </p:txBody>
+      </p:sp>
+    </p:spTree>
+    <p:extLst>
+      <p:ext uri="{BB962C8B-B14F-4D97-AF65-F5344CB8AC3E}">
+        <p14:creationId xmlns:p14="http://schemas.microsoft.com/office/powerpoint/2010/main" val="3930827009"/>
+      </p:ext>
+    </p:extLst>
+  </p:cSld>
+  <p:clrMapOvr>
+    <a:masterClrMapping/>
+  </p:clrMapOvr>
+  <p:timing>
+    <p:tnLst>
+      <p:par>
+        <p:cTn id="1" dur="indefinite" restart="never" nodeType="tmRoot"/>
+      </p:par>
+    </p:tnLst>
+  </p:timing>
+</p:sld>
+</file>
+
+<file path=ppt/slides/slide37.xml><?xml version="1.0" encoding="utf-8"?>
+<p:sld xmlns:a="http://schemas.openxmlformats.org/drawingml/2006/main" xmlns:r="http://schemas.openxmlformats.org/officeDocument/2006/relationships" xmlns:p="http://schemas.openxmlformats.org/presentationml/2006/main">
+  <p:cSld>
+    <p:spTree>
+      <p:nvGrpSpPr>
+        <p:cNvPr id="1" name=""/>
+        <p:cNvGrpSpPr/>
+        <p:nvPr/>
+      </p:nvGrpSpPr>
+      <p:grpSpPr>
+        <a:xfrm>
+          <a:off x="0" y="0"/>
+          <a:ext cx="0" cy="0"/>
+          <a:chOff x="0" y="0"/>
+          <a:chExt cx="0" cy="0"/>
+        </a:xfrm>
+      </p:grpSpPr>
+      <p:sp>
+        <p:nvSpPr>
+          <p:cNvPr id="2" name="Title 1"/>
+          <p:cNvSpPr>
+            <a:spLocks noGrp="1"/>
+          </p:cNvSpPr>
+          <p:nvPr>
+            <p:ph type="title"/>
+          </p:nvPr>
+        </p:nvSpPr>
+        <p:spPr/>
+        <p:txBody>
+          <a:bodyPr/>
+          <a:lstStyle/>
+          <a:p>
+            <a:r>
+              <a:rPr lang="en-US" dirty="0" smtClean="0"/>
+              <a:t>Queue examples</a:t>
+            </a:r>
+            <a:endParaRPr lang="en-US" dirty="0"/>
+          </a:p>
+        </p:txBody>
+      </p:sp>
+      <p:sp>
+        <p:nvSpPr>
+          <p:cNvPr id="4" name="Slide Number Placeholder 3"/>
+          <p:cNvSpPr>
+            <a:spLocks noGrp="1"/>
+          </p:cNvSpPr>
+          <p:nvPr>
+            <p:ph type="sldNum" sz="quarter" idx="12"/>
+          </p:nvPr>
+        </p:nvSpPr>
+        <p:spPr/>
+        <p:txBody>
+          <a:bodyPr/>
+          <a:lstStyle/>
+          <a:p>
+            <a:fld id="{11AD1F4E-1E51-402E-B221-310F004E7D3B}" type="slidenum">
+              <a:rPr lang="en-US" smtClean="0"/>
+              <a:t>37</a:t>
+            </a:fld>
+            <a:endParaRPr lang="en-US"/>
+          </a:p>
+        </p:txBody>
+      </p:sp>
+      <p:sp>
+        <p:nvSpPr>
+          <p:cNvPr id="5" name="TextBox 4"/>
+          <p:cNvSpPr txBox="1"/>
+          <p:nvPr/>
+        </p:nvSpPr>
+        <p:spPr>
+          <a:xfrm>
+            <a:off x="628650" y="1704105"/>
+            <a:ext cx="6665768" cy="2308324"/>
+          </a:xfrm>
+          <a:prstGeom prst="rect">
+            <a:avLst/>
+          </a:prstGeom>
+          <a:solidFill>
+            <a:schemeClr val="accent6">
+              <a:lumMod val="60000"/>
+              <a:lumOff val="40000"/>
+            </a:schemeClr>
+          </a:solidFill>
+          <a:ln>
+            <a:solidFill>
+              <a:schemeClr val="tx1"/>
+            </a:solidFill>
+          </a:ln>
+        </p:spPr>
+        <p:txBody>
+          <a:bodyPr wrap="square" rtlCol="0">
+            <a:spAutoFit/>
+          </a:bodyPr>
+          <a:lstStyle/>
+          <a:p>
+            <a:r>
+              <a:rPr lang="en-US" dirty="0" smtClean="0">
+                <a:latin typeface="Courier New" panose="02070309020205020404" pitchFamily="49" charset="0"/>
+                <a:cs typeface="Courier New" panose="02070309020205020404" pitchFamily="49" charset="0"/>
+              </a:rPr>
+              <a:t>import </a:t>
+            </a:r>
+            <a:r>
+              <a:rPr lang="en-US" dirty="0" err="1" smtClean="0">
+                <a:latin typeface="Courier New" panose="02070309020205020404" pitchFamily="49" charset="0"/>
+                <a:cs typeface="Courier New" panose="02070309020205020404" pitchFamily="49" charset="0"/>
+              </a:rPr>
+              <a:t>java.util.ArrayDeque</a:t>
+            </a:r>
+            <a:r>
+              <a:rPr lang="en-US" dirty="0" smtClean="0">
+                <a:latin typeface="Courier New" panose="02070309020205020404" pitchFamily="49" charset="0"/>
+                <a:cs typeface="Courier New" panose="02070309020205020404" pitchFamily="49" charset="0"/>
+              </a:rPr>
+              <a:t>;</a:t>
+            </a:r>
+          </a:p>
+          <a:p>
+            <a:r>
+              <a:rPr lang="en-US" dirty="0" smtClean="0">
+                <a:latin typeface="Courier New" panose="02070309020205020404" pitchFamily="49" charset="0"/>
+                <a:cs typeface="Courier New" panose="02070309020205020404" pitchFamily="49" charset="0"/>
+              </a:rPr>
+              <a:t>import </a:t>
+            </a:r>
+            <a:r>
+              <a:rPr lang="en-US" dirty="0" err="1" smtClean="0">
+                <a:latin typeface="Courier New" panose="02070309020205020404" pitchFamily="49" charset="0"/>
+                <a:cs typeface="Courier New" panose="02070309020205020404" pitchFamily="49" charset="0"/>
+              </a:rPr>
+              <a:t>java.util.Queue</a:t>
+            </a:r>
+            <a:r>
+              <a:rPr lang="en-US" dirty="0" smtClean="0">
+                <a:latin typeface="Courier New" panose="02070309020205020404" pitchFamily="49" charset="0"/>
+                <a:cs typeface="Courier New" panose="02070309020205020404" pitchFamily="49" charset="0"/>
+              </a:rPr>
+              <a:t>;</a:t>
+            </a:r>
+          </a:p>
+          <a:p>
+            <a:r>
+              <a:rPr lang="en-US" dirty="0" smtClean="0">
+                <a:latin typeface="Courier New" panose="02070309020205020404" pitchFamily="49" charset="0"/>
+                <a:cs typeface="Courier New" panose="02070309020205020404" pitchFamily="49" charset="0"/>
+              </a:rPr>
+              <a:t>…</a:t>
+            </a:r>
+            <a:endParaRPr lang="en-US" dirty="0" smtClean="0">
+              <a:latin typeface="Courier New" panose="02070309020205020404" pitchFamily="49" charset="0"/>
+              <a:cs typeface="Courier New" panose="02070309020205020404" pitchFamily="49" charset="0"/>
+            </a:endParaRPr>
+          </a:p>
+          <a:p>
+            <a:r>
+              <a:rPr lang="en-US" dirty="0" smtClean="0">
+                <a:latin typeface="Courier New" panose="02070309020205020404" pitchFamily="49" charset="0"/>
+                <a:cs typeface="Courier New" panose="02070309020205020404" pitchFamily="49" charset="0"/>
+              </a:rPr>
+              <a:t>Queue&lt;</a:t>
+            </a:r>
+            <a:r>
+              <a:rPr lang="en-US" dirty="0" smtClean="0">
+                <a:latin typeface="Courier New" panose="02070309020205020404" pitchFamily="49" charset="0"/>
+                <a:cs typeface="Courier New" panose="02070309020205020404" pitchFamily="49" charset="0"/>
+              </a:rPr>
+              <a:t>I</a:t>
+            </a:r>
+            <a:r>
+              <a:rPr lang="en-US" dirty="0" smtClean="0">
+                <a:latin typeface="Courier New" panose="02070309020205020404" pitchFamily="49" charset="0"/>
+                <a:cs typeface="Courier New" panose="02070309020205020404" pitchFamily="49" charset="0"/>
+              </a:rPr>
+              <a:t>nteger&gt; q = new </a:t>
+            </a:r>
+            <a:r>
+              <a:rPr lang="en-US" dirty="0" err="1" smtClean="0">
+                <a:latin typeface="Courier New" panose="02070309020205020404" pitchFamily="49" charset="0"/>
+                <a:cs typeface="Courier New" panose="02070309020205020404" pitchFamily="49" charset="0"/>
+              </a:rPr>
+              <a:t>ArrayDeque</a:t>
+            </a:r>
+            <a:r>
+              <a:rPr lang="en-US" dirty="0" smtClean="0">
+                <a:latin typeface="Courier New" panose="02070309020205020404" pitchFamily="49" charset="0"/>
+                <a:cs typeface="Courier New" panose="02070309020205020404" pitchFamily="49" charset="0"/>
+              </a:rPr>
+              <a:t>&lt;Integer&gt;();</a:t>
+            </a:r>
+            <a:endParaRPr lang="en-US" dirty="0" smtClean="0">
+              <a:latin typeface="Courier New" panose="02070309020205020404" pitchFamily="49" charset="0"/>
+              <a:cs typeface="Courier New" panose="02070309020205020404" pitchFamily="49" charset="0"/>
+            </a:endParaRPr>
+          </a:p>
+          <a:p>
+            <a:r>
+              <a:rPr lang="en-US" dirty="0" smtClean="0">
+                <a:latin typeface="Courier New" panose="02070309020205020404" pitchFamily="49" charset="0"/>
+                <a:cs typeface="Courier New" panose="02070309020205020404" pitchFamily="49" charset="0"/>
+              </a:rPr>
+              <a:t>for </a:t>
+            </a:r>
+            <a:r>
+              <a:rPr lang="en-US" dirty="0" smtClean="0">
+                <a:latin typeface="Courier New" panose="02070309020205020404" pitchFamily="49" charset="0"/>
+                <a:cs typeface="Courier New" panose="02070309020205020404" pitchFamily="49" charset="0"/>
+              </a:rPr>
+              <a:t>(</a:t>
+            </a:r>
+            <a:r>
+              <a:rPr lang="en-US" dirty="0" err="1" smtClean="0">
+                <a:latin typeface="Courier New" panose="02070309020205020404" pitchFamily="49" charset="0"/>
+                <a:cs typeface="Courier New" panose="02070309020205020404" pitchFamily="49" charset="0"/>
+              </a:rPr>
+              <a:t>int</a:t>
+            </a:r>
+            <a:r>
+              <a:rPr lang="en-US" dirty="0" smtClean="0">
+                <a:latin typeface="Courier New" panose="02070309020205020404" pitchFamily="49" charset="0"/>
+                <a:cs typeface="Courier New" panose="02070309020205020404" pitchFamily="49" charset="0"/>
+              </a:rPr>
+              <a:t> </a:t>
+            </a:r>
+            <a:r>
+              <a:rPr lang="en-US" dirty="0" err="1" smtClean="0">
+                <a:latin typeface="Courier New" panose="02070309020205020404" pitchFamily="49" charset="0"/>
+                <a:cs typeface="Courier New" panose="02070309020205020404" pitchFamily="49" charset="0"/>
+              </a:rPr>
+              <a:t>i</a:t>
+            </a:r>
+            <a:r>
+              <a:rPr lang="en-US" dirty="0" smtClean="0">
+                <a:latin typeface="Courier New" panose="02070309020205020404" pitchFamily="49" charset="0"/>
+                <a:cs typeface="Courier New" panose="02070309020205020404" pitchFamily="49" charset="0"/>
+              </a:rPr>
+              <a:t> </a:t>
+            </a:r>
+            <a:r>
+              <a:rPr lang="en-US" dirty="0" smtClean="0">
+                <a:latin typeface="Courier New" panose="02070309020205020404" pitchFamily="49" charset="0"/>
+                <a:cs typeface="Courier New" panose="02070309020205020404" pitchFamily="49" charset="0"/>
+              </a:rPr>
+              <a:t>= 0; </a:t>
+            </a:r>
+            <a:r>
+              <a:rPr lang="en-US" dirty="0" err="1" smtClean="0">
+                <a:latin typeface="Courier New" panose="02070309020205020404" pitchFamily="49" charset="0"/>
+                <a:cs typeface="Courier New" panose="02070309020205020404" pitchFamily="49" charset="0"/>
+              </a:rPr>
+              <a:t>i</a:t>
+            </a:r>
+            <a:r>
+              <a:rPr lang="en-US" dirty="0" smtClean="0">
+                <a:latin typeface="Courier New" panose="02070309020205020404" pitchFamily="49" charset="0"/>
+                <a:cs typeface="Courier New" panose="02070309020205020404" pitchFamily="49" charset="0"/>
+              </a:rPr>
+              <a:t> &lt; 10; </a:t>
+            </a:r>
+            <a:r>
+              <a:rPr lang="en-US" dirty="0" err="1" smtClean="0">
+                <a:latin typeface="Courier New" panose="02070309020205020404" pitchFamily="49" charset="0"/>
+                <a:cs typeface="Courier New" panose="02070309020205020404" pitchFamily="49" charset="0"/>
+              </a:rPr>
+              <a:t>i</a:t>
+            </a:r>
+            <a:r>
+              <a:rPr lang="en-US" dirty="0" smtClean="0">
+                <a:latin typeface="Courier New" panose="02070309020205020404" pitchFamily="49" charset="0"/>
+                <a:cs typeface="Courier New" panose="02070309020205020404" pitchFamily="49" charset="0"/>
+              </a:rPr>
+              <a:t>++)</a:t>
+            </a:r>
+          </a:p>
+          <a:p>
+            <a:r>
+              <a:rPr lang="en-US" dirty="0">
+                <a:latin typeface="Courier New" panose="02070309020205020404" pitchFamily="49" charset="0"/>
+                <a:cs typeface="Courier New" panose="02070309020205020404" pitchFamily="49" charset="0"/>
+              </a:rPr>
+              <a:t> </a:t>
+            </a:r>
+            <a:r>
+              <a:rPr lang="en-US" dirty="0" smtClean="0">
+                <a:latin typeface="Courier New" panose="02070309020205020404" pitchFamily="49" charset="0"/>
+                <a:cs typeface="Courier New" panose="02070309020205020404" pitchFamily="49" charset="0"/>
+              </a:rPr>
+              <a:t>   </a:t>
+            </a:r>
+            <a:r>
+              <a:rPr lang="en-US" dirty="0" err="1" smtClean="0">
+                <a:latin typeface="Courier New" panose="02070309020205020404" pitchFamily="49" charset="0"/>
+                <a:cs typeface="Courier New" panose="02070309020205020404" pitchFamily="49" charset="0"/>
+              </a:rPr>
+              <a:t>q.add</a:t>
+            </a:r>
+            <a:r>
+              <a:rPr lang="en-US" dirty="0" smtClean="0">
+                <a:latin typeface="Courier New" panose="02070309020205020404" pitchFamily="49" charset="0"/>
+                <a:cs typeface="Courier New" panose="02070309020205020404" pitchFamily="49" charset="0"/>
+              </a:rPr>
+              <a:t>(</a:t>
+            </a:r>
+            <a:r>
+              <a:rPr lang="en-US" dirty="0" err="1" smtClean="0">
+                <a:latin typeface="Courier New" panose="02070309020205020404" pitchFamily="49" charset="0"/>
+                <a:cs typeface="Courier New" panose="02070309020205020404" pitchFamily="49" charset="0"/>
+              </a:rPr>
+              <a:t>i</a:t>
+            </a:r>
+            <a:r>
+              <a:rPr lang="en-US" dirty="0" smtClean="0">
+                <a:latin typeface="Courier New" panose="02070309020205020404" pitchFamily="49" charset="0"/>
+                <a:cs typeface="Courier New" panose="02070309020205020404" pitchFamily="49" charset="0"/>
+              </a:rPr>
+              <a:t>);</a:t>
+            </a:r>
+          </a:p>
+          <a:p>
+            <a:r>
+              <a:rPr lang="en-US" dirty="0" smtClean="0">
+                <a:latin typeface="Courier New" panose="02070309020205020404" pitchFamily="49" charset="0"/>
+                <a:cs typeface="Courier New" panose="02070309020205020404" pitchFamily="49" charset="0"/>
+              </a:rPr>
+              <a:t>while (!</a:t>
+            </a:r>
+            <a:r>
+              <a:rPr lang="en-US" dirty="0" err="1" smtClean="0">
+                <a:latin typeface="Courier New" panose="02070309020205020404" pitchFamily="49" charset="0"/>
+                <a:cs typeface="Courier New" panose="02070309020205020404" pitchFamily="49" charset="0"/>
+              </a:rPr>
+              <a:t>q.isEmpty</a:t>
+            </a:r>
+            <a:r>
+              <a:rPr lang="en-US" dirty="0" smtClean="0">
+                <a:latin typeface="Courier New" panose="02070309020205020404" pitchFamily="49" charset="0"/>
+                <a:cs typeface="Courier New" panose="02070309020205020404" pitchFamily="49" charset="0"/>
+              </a:rPr>
+              <a:t>())</a:t>
+            </a:r>
+            <a:endParaRPr lang="en-US" dirty="0">
+              <a:latin typeface="Courier New" panose="02070309020205020404" pitchFamily="49" charset="0"/>
+              <a:cs typeface="Courier New" panose="02070309020205020404" pitchFamily="49" charset="0"/>
+            </a:endParaRPr>
+          </a:p>
+          <a:p>
+            <a:r>
+              <a:rPr lang="en-US" dirty="0" smtClean="0">
+                <a:latin typeface="Courier New" panose="02070309020205020404" pitchFamily="49" charset="0"/>
+                <a:cs typeface="Courier New" panose="02070309020205020404" pitchFamily="49" charset="0"/>
+              </a:rPr>
+              <a:t>    </a:t>
+            </a:r>
+            <a:r>
+              <a:rPr lang="en-US" dirty="0" err="1" smtClean="0">
+                <a:latin typeface="Courier New" panose="02070309020205020404" pitchFamily="49" charset="0"/>
+                <a:cs typeface="Courier New" panose="02070309020205020404" pitchFamily="49" charset="0"/>
+              </a:rPr>
+              <a:t>System.out.println</a:t>
+            </a:r>
+            <a:r>
+              <a:rPr lang="en-US" dirty="0" smtClean="0">
+                <a:latin typeface="Courier New" panose="02070309020205020404" pitchFamily="49" charset="0"/>
+                <a:cs typeface="Courier New" panose="02070309020205020404" pitchFamily="49" charset="0"/>
+              </a:rPr>
+              <a:t>(</a:t>
+            </a:r>
+            <a:r>
+              <a:rPr lang="en-US" dirty="0" err="1" smtClean="0">
+                <a:latin typeface="Courier New" panose="02070309020205020404" pitchFamily="49" charset="0"/>
+                <a:cs typeface="Courier New" panose="02070309020205020404" pitchFamily="49" charset="0"/>
+              </a:rPr>
+              <a:t>q.remove</a:t>
+            </a:r>
+            <a:r>
+              <a:rPr lang="en-US" dirty="0" smtClean="0">
+                <a:latin typeface="Courier New" panose="02070309020205020404" pitchFamily="49" charset="0"/>
+                <a:cs typeface="Courier New" panose="02070309020205020404" pitchFamily="49" charset="0"/>
+              </a:rPr>
+              <a:t>());</a:t>
+            </a:r>
+            <a:endParaRPr lang="en-US" dirty="0" smtClean="0">
+              <a:latin typeface="Courier New" panose="02070309020205020404" pitchFamily="49" charset="0"/>
+              <a:cs typeface="Courier New" panose="02070309020205020404" pitchFamily="49" charset="0"/>
+            </a:endParaRPr>
+          </a:p>
+        </p:txBody>
+      </p:sp>
+    </p:spTree>
+    <p:extLst>
+      <p:ext uri="{BB962C8B-B14F-4D97-AF65-F5344CB8AC3E}">
+        <p14:creationId xmlns:p14="http://schemas.microsoft.com/office/powerpoint/2010/main" val="2265450609"/>
+      </p:ext>
+    </p:extLst>
+  </p:cSld>
+  <p:clrMapOvr>
+    <a:masterClrMapping/>
+  </p:clrMapOvr>
+  <p:timing>
+    <p:tnLst>
+      <p:par>
+        <p:cTn id="1" dur="indefinite" restart="never" nodeType="tmRoot"/>
+      </p:par>
+    </p:tnLst>
+  </p:timing>
+</p:sld>
+</file>
+
+<file path=ppt/slides/slide38.xml><?xml version="1.0" encoding="utf-8"?>
+<p:sld xmlns:a="http://schemas.openxmlformats.org/drawingml/2006/main" xmlns:r="http://schemas.openxmlformats.org/officeDocument/2006/relationships" xmlns:p="http://schemas.openxmlformats.org/presentationml/2006/main">
+  <p:cSld>
+    <p:spTree>
+      <p:nvGrpSpPr>
+        <p:cNvPr id="1" name=""/>
+        <p:cNvGrpSpPr/>
+        <p:nvPr/>
+      </p:nvGrpSpPr>
+      <p:grpSpPr>
+        <a:xfrm>
+          <a:off x="0" y="0"/>
+          <a:ext cx="0" cy="0"/>
+          <a:chOff x="0" y="0"/>
+          <a:chExt cx="0" cy="0"/>
+        </a:xfrm>
+      </p:grpSpPr>
+      <p:sp>
+        <p:nvSpPr>
           <p:cNvPr id="3" name="Content Placeholder 2"/>
           <p:cNvSpPr>
             <a:spLocks noGrp="1"/>
@@ -21090,7 +21939,7 @@
           <a:p>
             <a:fld id="{11AD1F4E-1E51-402E-B221-310F004E7D3B}" type="slidenum">
               <a:rPr lang="en-US" smtClean="0"/>
-              <a:t>36</a:t>
+              <a:t>38</a:t>
             </a:fld>
             <a:endParaRPr lang="en-US"/>
           </a:p>
@@ -21128,7 +21977,7 @@
             <a:graphicData uri="http://schemas.openxmlformats.org/presentationml/2006/ole">
               <mc:AlternateContent xmlns:mc="http://schemas.openxmlformats.org/markup-compatibility/2006">
                 <mc:Choice xmlns:v="urn:schemas-microsoft-com:vml" Requires="v">
-                  <p:oleObj spid="_x0000_s10261" name="Equation" r:id="rId3" imgW="444240" imgH="241200" progId="Equation.3">
+                  <p:oleObj spid="_x0000_s10267" name="Equation" r:id="rId3" imgW="444240" imgH="241200" progId="Equation.3">
                     <p:embed/>
                   </p:oleObj>
                 </mc:Choice>
@@ -21834,7 +22683,7 @@
 </p:sld>
 </file>
 
-<file path=ppt/slides/slide37.xml><?xml version="1.0" encoding="utf-8"?>
+<file path=ppt/slides/slide39.xml><?xml version="1.0" encoding="utf-8"?>
 <p:sld xmlns:a="http://schemas.openxmlformats.org/drawingml/2006/main" xmlns:r="http://schemas.openxmlformats.org/officeDocument/2006/relationships" xmlns:p="http://schemas.openxmlformats.org/presentationml/2006/main">
   <p:cSld>
     <p:spTree>
@@ -22012,7 +22861,7 @@
           <a:p>
             <a:fld id="{11AD1F4E-1E51-402E-B221-310F004E7D3B}" type="slidenum">
               <a:rPr lang="en-US" smtClean="0"/>
-              <a:t>37</a:t>
+              <a:t>39</a:t>
             </a:fld>
             <a:endParaRPr lang="en-US"/>
           </a:p>
@@ -22038,7 +22887,7 @@
 </p:sld>
 </file>
 
-<file path=ppt/slides/slide38.xml><?xml version="1.0" encoding="utf-8"?>
+<file path=ppt/slides/slide4.xml><?xml version="1.0" encoding="utf-8"?>
 <p:sld xmlns:a="http://schemas.openxmlformats.org/drawingml/2006/main" xmlns:r="http://schemas.openxmlformats.org/officeDocument/2006/relationships" xmlns:p="http://schemas.openxmlformats.org/presentationml/2006/main">
   <p:cSld>
     <p:spTree>
@@ -22072,6 +22921,619 @@
           <a:p>
             <a:r>
               <a:rPr lang="en-US" dirty="0" smtClean="0"/>
+              <a:t>It's a zoo…</a:t>
+            </a:r>
+            <a:endParaRPr lang="en-US" dirty="0"/>
+          </a:p>
+        </p:txBody>
+      </p:sp>
+      <p:sp>
+        <p:nvSpPr>
+          <p:cNvPr id="3" name="Content Placeholder 2"/>
+          <p:cNvSpPr>
+            <a:spLocks noGrp="1"/>
+          </p:cNvSpPr>
+          <p:nvPr>
+            <p:ph idx="1"/>
+          </p:nvPr>
+        </p:nvSpPr>
+        <p:spPr/>
+        <p:txBody>
+          <a:bodyPr/>
+          <a:lstStyle/>
+          <a:p>
+            <a:r>
+              <a:rPr lang="en-US" dirty="0" smtClean="0"/>
+              <a:t>Many data structures</a:t>
+            </a:r>
+          </a:p>
+          <a:p>
+            <a:pPr lvl="1"/>
+            <a:r>
+              <a:rPr lang="en-US" dirty="0" smtClean="0"/>
+              <a:t>specific properties</a:t>
+            </a:r>
+          </a:p>
+          <a:p>
+            <a:pPr lvl="1"/>
+            <a:r>
+              <a:rPr lang="en-US" dirty="0" smtClean="0"/>
+              <a:t>specific applications</a:t>
+            </a:r>
+          </a:p>
+          <a:p>
+            <a:pPr lvl="1"/>
+            <a:r>
+              <a:rPr lang="en-US" dirty="0" smtClean="0"/>
+              <a:t>relationship to algorithms!</a:t>
+            </a:r>
+          </a:p>
+          <a:p>
+            <a:r>
+              <a:rPr lang="en-US" dirty="0" smtClean="0"/>
+              <a:t>Important to have an overview</a:t>
+            </a:r>
+          </a:p>
+          <a:p>
+            <a:endParaRPr lang="en-US" dirty="0"/>
+          </a:p>
+          <a:p>
+            <a:endParaRPr lang="en-US" dirty="0" smtClean="0"/>
+          </a:p>
+          <a:p>
+            <a:r>
+              <a:rPr lang="en-US" dirty="0" smtClean="0"/>
+              <a:t>Programming language independent</a:t>
+            </a:r>
+          </a:p>
+          <a:p>
+            <a:pPr lvl="1"/>
+            <a:r>
+              <a:rPr lang="en-US" dirty="0" smtClean="0"/>
+              <a:t>conceptual, mathematical level</a:t>
+            </a:r>
+          </a:p>
+        </p:txBody>
+      </p:sp>
+      <p:sp>
+        <p:nvSpPr>
+          <p:cNvPr id="5" name="Slide Number Placeholder 4"/>
+          <p:cNvSpPr>
+            <a:spLocks noGrp="1"/>
+          </p:cNvSpPr>
+          <p:nvPr>
+            <p:ph type="sldNum" sz="quarter" idx="12"/>
+          </p:nvPr>
+        </p:nvSpPr>
+        <p:spPr/>
+        <p:txBody>
+          <a:bodyPr/>
+          <a:lstStyle/>
+          <a:p>
+            <a:fld id="{11AD1F4E-1E51-402E-B221-310F004E7D3B}" type="slidenum">
+              <a:rPr lang="en-US" smtClean="0"/>
+              <a:t>4</a:t>
+            </a:fld>
+            <a:endParaRPr lang="en-US"/>
+          </a:p>
+        </p:txBody>
+      </p:sp>
+      <p:sp>
+        <p:nvSpPr>
+          <p:cNvPr id="6" name="TextBox 5"/>
+          <p:cNvSpPr txBox="1"/>
+          <p:nvPr/>
+        </p:nvSpPr>
+        <p:spPr>
+          <a:xfrm>
+            <a:off x="1205347" y="4021281"/>
+            <a:ext cx="4468980" cy="415498"/>
+          </a:xfrm>
+          <a:prstGeom prst="rect">
+            <a:avLst/>
+          </a:prstGeom>
+          <a:noFill/>
+          <a:ln>
+            <a:solidFill>
+              <a:schemeClr val="tx1"/>
+            </a:solidFill>
+          </a:ln>
+        </p:spPr>
+        <p:txBody>
+          <a:bodyPr wrap="none" rtlCol="0">
+            <a:spAutoFit/>
+          </a:bodyPr>
+          <a:lstStyle/>
+          <a:p>
+            <a:r>
+              <a:rPr lang="en-US" sz="2100" dirty="0" smtClean="0"/>
+              <a:t>Which data structure to use in models?</a:t>
+            </a:r>
+            <a:endParaRPr lang="en-US" sz="2100" dirty="0"/>
+          </a:p>
+        </p:txBody>
+      </p:sp>
+      <p:sp>
+        <p:nvSpPr>
+          <p:cNvPr id="7" name="TextBox 6"/>
+          <p:cNvSpPr txBox="1"/>
+          <p:nvPr/>
+        </p:nvSpPr>
+        <p:spPr>
+          <a:xfrm>
+            <a:off x="1748272" y="4592781"/>
+            <a:ext cx="5237331" cy="415498"/>
+          </a:xfrm>
+          <a:prstGeom prst="rect">
+            <a:avLst/>
+          </a:prstGeom>
+          <a:noFill/>
+          <a:ln>
+            <a:solidFill>
+              <a:schemeClr val="tx1"/>
+            </a:solidFill>
+          </a:ln>
+        </p:spPr>
+        <p:txBody>
+          <a:bodyPr wrap="none" rtlCol="0">
+            <a:spAutoFit/>
+          </a:bodyPr>
+          <a:lstStyle/>
+          <a:p>
+            <a:r>
+              <a:rPr lang="en-US" sz="2100" dirty="0" smtClean="0"/>
+              <a:t>Which data structure to choose for algorithm?</a:t>
+            </a:r>
+            <a:endParaRPr lang="en-US" sz="2100" dirty="0"/>
+          </a:p>
+        </p:txBody>
+      </p:sp>
+    </p:spTree>
+    <p:extLst>
+      <p:ext uri="{BB962C8B-B14F-4D97-AF65-F5344CB8AC3E}">
+        <p14:creationId xmlns:p14="http://schemas.microsoft.com/office/powerpoint/2010/main" val="2147413834"/>
+      </p:ext>
+    </p:extLst>
+  </p:cSld>
+  <p:clrMapOvr>
+    <a:masterClrMapping/>
+  </p:clrMapOvr>
+  <p:timing>
+    <p:tnLst>
+      <p:par>
+        <p:cTn id="1" dur="indefinite" restart="never" nodeType="tmRoot">
+          <p:childTnLst>
+            <p:seq concurrent="1" nextAc="seek">
+              <p:cTn id="2" dur="indefinite" nodeType="mainSeq">
+                <p:childTnLst>
+                  <p:par>
+                    <p:cTn id="3" fill="hold">
+                      <p:stCondLst>
+                        <p:cond delay="indefinite"/>
+                        <p:cond evt="onBegin" delay="0">
+                          <p:tn val="2"/>
+                        </p:cond>
+                      </p:stCondLst>
+                      <p:childTnLst>
+                        <p:par>
+                          <p:cTn id="4" fill="hold">
+                            <p:stCondLst>
+                              <p:cond delay="0"/>
+                            </p:stCondLst>
+                            <p:childTnLst>
+                              <p:par>
+                                <p:cTn id="5" presetID="1" presetClass="entr" presetSubtype="0" fill="hold" grpId="0" nodeType="withEffect">
+                                  <p:stCondLst>
+                                    <p:cond delay="0"/>
+                                  </p:stCondLst>
+                                  <p:childTnLst>
+                                    <p:set>
+                                      <p:cBhvr>
+                                        <p:cTn id="6" dur="1" fill="hold">
+                                          <p:stCondLst>
+                                            <p:cond delay="0"/>
+                                          </p:stCondLst>
+                                        </p:cTn>
+                                        <p:tgtEl>
+                                          <p:spTgt spid="3">
+                                            <p:txEl>
+                                              <p:pRg st="0" end="0"/>
+                                            </p:txEl>
+                                          </p:spTgt>
+                                        </p:tgtEl>
+                                        <p:attrNameLst>
+                                          <p:attrName>style.visibility</p:attrName>
+                                        </p:attrNameLst>
+                                      </p:cBhvr>
+                                      <p:to>
+                                        <p:strVal val="visible"/>
+                                      </p:to>
+                                    </p:set>
+                                  </p:childTnLst>
+                                </p:cTn>
+                              </p:par>
+                              <p:par>
+                                <p:cTn id="7" presetID="1" presetClass="entr" presetSubtype="0" fill="hold" grpId="0" nodeType="withEffect">
+                                  <p:stCondLst>
+                                    <p:cond delay="0"/>
+                                  </p:stCondLst>
+                                  <p:childTnLst>
+                                    <p:set>
+                                      <p:cBhvr>
+                                        <p:cTn id="8" dur="1" fill="hold">
+                                          <p:stCondLst>
+                                            <p:cond delay="0"/>
+                                          </p:stCondLst>
+                                        </p:cTn>
+                                        <p:tgtEl>
+                                          <p:spTgt spid="3">
+                                            <p:txEl>
+                                              <p:pRg st="1" end="1"/>
+                                            </p:txEl>
+                                          </p:spTgt>
+                                        </p:tgtEl>
+                                        <p:attrNameLst>
+                                          <p:attrName>style.visibility</p:attrName>
+                                        </p:attrNameLst>
+                                      </p:cBhvr>
+                                      <p:to>
+                                        <p:strVal val="visible"/>
+                                      </p:to>
+                                    </p:set>
+                                  </p:childTnLst>
+                                </p:cTn>
+                              </p:par>
+                              <p:par>
+                                <p:cTn id="9" presetID="1" presetClass="entr" presetSubtype="0" fill="hold" grpId="0" nodeType="withEffect">
+                                  <p:stCondLst>
+                                    <p:cond delay="0"/>
+                                  </p:stCondLst>
+                                  <p:childTnLst>
+                                    <p:set>
+                                      <p:cBhvr>
+                                        <p:cTn id="10" dur="1" fill="hold">
+                                          <p:stCondLst>
+                                            <p:cond delay="0"/>
+                                          </p:stCondLst>
+                                        </p:cTn>
+                                        <p:tgtEl>
+                                          <p:spTgt spid="3">
+                                            <p:txEl>
+                                              <p:pRg st="2" end="2"/>
+                                            </p:txEl>
+                                          </p:spTgt>
+                                        </p:tgtEl>
+                                        <p:attrNameLst>
+                                          <p:attrName>style.visibility</p:attrName>
+                                        </p:attrNameLst>
+                                      </p:cBhvr>
+                                      <p:to>
+                                        <p:strVal val="visible"/>
+                                      </p:to>
+                                    </p:set>
+                                  </p:childTnLst>
+                                </p:cTn>
+                              </p:par>
+                              <p:par>
+                                <p:cTn id="11" presetID="1" presetClass="entr" presetSubtype="0" fill="hold" grpId="0" nodeType="withEffect">
+                                  <p:stCondLst>
+                                    <p:cond delay="0"/>
+                                  </p:stCondLst>
+                                  <p:childTnLst>
+                                    <p:set>
+                                      <p:cBhvr>
+                                        <p:cTn id="12" dur="1" fill="hold">
+                                          <p:stCondLst>
+                                            <p:cond delay="0"/>
+                                          </p:stCondLst>
+                                        </p:cTn>
+                                        <p:tgtEl>
+                                          <p:spTgt spid="3">
+                                            <p:txEl>
+                                              <p:pRg st="3" end="3"/>
+                                            </p:txEl>
+                                          </p:spTgt>
+                                        </p:tgtEl>
+                                        <p:attrNameLst>
+                                          <p:attrName>style.visibility</p:attrName>
+                                        </p:attrNameLst>
+                                      </p:cBhvr>
+                                      <p:to>
+                                        <p:strVal val="visible"/>
+                                      </p:to>
+                                    </p:set>
+                                  </p:childTnLst>
+                                </p:cTn>
+                              </p:par>
+                            </p:childTnLst>
+                          </p:cTn>
+                        </p:par>
+                      </p:childTnLst>
+                    </p:cTn>
+                  </p:par>
+                  <p:par>
+                    <p:cTn id="13" fill="hold">
+                      <p:stCondLst>
+                        <p:cond delay="indefinite"/>
+                      </p:stCondLst>
+                      <p:childTnLst>
+                        <p:par>
+                          <p:cTn id="14" fill="hold">
+                            <p:stCondLst>
+                              <p:cond delay="0"/>
+                            </p:stCondLst>
+                            <p:childTnLst>
+                              <p:par>
+                                <p:cTn id="15" presetID="1" presetClass="entr" presetSubtype="0" fill="hold" grpId="0" nodeType="clickEffect">
+                                  <p:stCondLst>
+                                    <p:cond delay="0"/>
+                                  </p:stCondLst>
+                                  <p:childTnLst>
+                                    <p:set>
+                                      <p:cBhvr>
+                                        <p:cTn id="16" dur="1" fill="hold">
+                                          <p:stCondLst>
+                                            <p:cond delay="0"/>
+                                          </p:stCondLst>
+                                        </p:cTn>
+                                        <p:tgtEl>
+                                          <p:spTgt spid="3">
+                                            <p:txEl>
+                                              <p:pRg st="4" end="4"/>
+                                            </p:txEl>
+                                          </p:spTgt>
+                                        </p:tgtEl>
+                                        <p:attrNameLst>
+                                          <p:attrName>style.visibility</p:attrName>
+                                        </p:attrNameLst>
+                                      </p:cBhvr>
+                                      <p:to>
+                                        <p:strVal val="visible"/>
+                                      </p:to>
+                                    </p:set>
+                                  </p:childTnLst>
+                                </p:cTn>
+                              </p:par>
+                            </p:childTnLst>
+                          </p:cTn>
+                        </p:par>
+                      </p:childTnLst>
+                    </p:cTn>
+                  </p:par>
+                  <p:par>
+                    <p:cTn id="17" fill="hold">
+                      <p:stCondLst>
+                        <p:cond delay="indefinite"/>
+                      </p:stCondLst>
+                      <p:childTnLst>
+                        <p:par>
+                          <p:cTn id="18" fill="hold">
+                            <p:stCondLst>
+                              <p:cond delay="0"/>
+                            </p:stCondLst>
+                            <p:childTnLst>
+                              <p:par>
+                                <p:cTn id="19" presetID="1" presetClass="entr" presetSubtype="0" fill="hold" grpId="0" nodeType="clickEffect">
+                                  <p:stCondLst>
+                                    <p:cond delay="0"/>
+                                  </p:stCondLst>
+                                  <p:childTnLst>
+                                    <p:set>
+                                      <p:cBhvr>
+                                        <p:cTn id="20" dur="1" fill="hold">
+                                          <p:stCondLst>
+                                            <p:cond delay="0"/>
+                                          </p:stCondLst>
+                                        </p:cTn>
+                                        <p:tgtEl>
+                                          <p:spTgt spid="6"/>
+                                        </p:tgtEl>
+                                        <p:attrNameLst>
+                                          <p:attrName>style.visibility</p:attrName>
+                                        </p:attrNameLst>
+                                      </p:cBhvr>
+                                      <p:to>
+                                        <p:strVal val="visible"/>
+                                      </p:to>
+                                    </p:set>
+                                  </p:childTnLst>
+                                </p:cTn>
+                              </p:par>
+                            </p:childTnLst>
+                          </p:cTn>
+                        </p:par>
+                      </p:childTnLst>
+                    </p:cTn>
+                  </p:par>
+                  <p:par>
+                    <p:cTn id="21" fill="hold">
+                      <p:stCondLst>
+                        <p:cond delay="indefinite"/>
+                      </p:stCondLst>
+                      <p:childTnLst>
+                        <p:par>
+                          <p:cTn id="22" fill="hold">
+                            <p:stCondLst>
+                              <p:cond delay="0"/>
+                            </p:stCondLst>
+                            <p:childTnLst>
+                              <p:par>
+                                <p:cTn id="23" presetID="1" presetClass="entr" presetSubtype="0" fill="hold" grpId="0" nodeType="clickEffect">
+                                  <p:stCondLst>
+                                    <p:cond delay="0"/>
+                                  </p:stCondLst>
+                                  <p:childTnLst>
+                                    <p:set>
+                                      <p:cBhvr>
+                                        <p:cTn id="24" dur="1" fill="hold">
+                                          <p:stCondLst>
+                                            <p:cond delay="0"/>
+                                          </p:stCondLst>
+                                        </p:cTn>
+                                        <p:tgtEl>
+                                          <p:spTgt spid="7"/>
+                                        </p:tgtEl>
+                                        <p:attrNameLst>
+                                          <p:attrName>style.visibility</p:attrName>
+                                        </p:attrNameLst>
+                                      </p:cBhvr>
+                                      <p:to>
+                                        <p:strVal val="visible"/>
+                                      </p:to>
+                                    </p:set>
+                                  </p:childTnLst>
+                                </p:cTn>
+                              </p:par>
+                            </p:childTnLst>
+                          </p:cTn>
+                        </p:par>
+                      </p:childTnLst>
+                    </p:cTn>
+                  </p:par>
+                  <p:par>
+                    <p:cTn id="25" fill="hold">
+                      <p:stCondLst>
+                        <p:cond delay="indefinite"/>
+                      </p:stCondLst>
+                      <p:childTnLst>
+                        <p:par>
+                          <p:cTn id="26" fill="hold">
+                            <p:stCondLst>
+                              <p:cond delay="0"/>
+                            </p:stCondLst>
+                            <p:childTnLst>
+                              <p:par>
+                                <p:cTn id="27" presetID="1" presetClass="entr" presetSubtype="0" fill="hold" grpId="0" nodeType="clickEffect">
+                                  <p:stCondLst>
+                                    <p:cond delay="0"/>
+                                  </p:stCondLst>
+                                  <p:childTnLst>
+                                    <p:set>
+                                      <p:cBhvr>
+                                        <p:cTn id="28" dur="1" fill="hold">
+                                          <p:stCondLst>
+                                            <p:cond delay="0"/>
+                                          </p:stCondLst>
+                                        </p:cTn>
+                                        <p:tgtEl>
+                                          <p:spTgt spid="3">
+                                            <p:txEl>
+                                              <p:pRg st="7" end="7"/>
+                                            </p:txEl>
+                                          </p:spTgt>
+                                        </p:tgtEl>
+                                        <p:attrNameLst>
+                                          <p:attrName>style.visibility</p:attrName>
+                                        </p:attrNameLst>
+                                      </p:cBhvr>
+                                      <p:to>
+                                        <p:strVal val="visible"/>
+                                      </p:to>
+                                    </p:set>
+                                  </p:childTnLst>
+                                </p:cTn>
+                              </p:par>
+                              <p:par>
+                                <p:cTn id="29" presetID="1" presetClass="entr" presetSubtype="0" fill="hold" grpId="0" nodeType="withEffect">
+                                  <p:stCondLst>
+                                    <p:cond delay="0"/>
+                                  </p:stCondLst>
+                                  <p:childTnLst>
+                                    <p:set>
+                                      <p:cBhvr>
+                                        <p:cTn id="30" dur="1" fill="hold">
+                                          <p:stCondLst>
+                                            <p:cond delay="0"/>
+                                          </p:stCondLst>
+                                        </p:cTn>
+                                        <p:tgtEl>
+                                          <p:spTgt spid="3">
+                                            <p:txEl>
+                                              <p:pRg st="8" end="8"/>
+                                            </p:txEl>
+                                          </p:spTgt>
+                                        </p:tgtEl>
+                                        <p:attrNameLst>
+                                          <p:attrName>style.visibility</p:attrName>
+                                        </p:attrNameLst>
+                                      </p:cBhvr>
+                                      <p:to>
+                                        <p:strVal val="visible"/>
+                                      </p:to>
+                                    </p:set>
+                                  </p:childTnLst>
+                                </p:cTn>
+                              </p:par>
+                            </p:childTnLst>
+                          </p:cTn>
+                        </p:par>
+                      </p:childTnLst>
+                    </p:cTn>
+                  </p:par>
+                </p:childTnLst>
+              </p:cTn>
+              <p:prevCondLst>
+                <p:cond evt="onPrev" delay="0">
+                  <p:tgtEl>
+                    <p:sldTgt/>
+                  </p:tgtEl>
+                </p:cond>
+              </p:prevCondLst>
+              <p:nextCondLst>
+                <p:cond evt="onNext" delay="0">
+                  <p:tgtEl>
+                    <p:sldTgt/>
+                  </p:tgtEl>
+                </p:cond>
+              </p:nextCondLst>
+            </p:seq>
+          </p:childTnLst>
+        </p:cTn>
+      </p:par>
+    </p:tnLst>
+    <p:bldLst>
+      <p:bldP spid="3" grpId="0" uiExpand="1" build="p"/>
+      <p:bldP spid="6" grpId="0" animBg="1"/>
+      <p:bldP spid="7" grpId="0" animBg="1"/>
+    </p:bldLst>
+  </p:timing>
+</p:sld>
+</file>
+
+<file path=ppt/slides/slide40.xml><?xml version="1.0" encoding="utf-8"?>
+<p:sld xmlns:a="http://schemas.openxmlformats.org/drawingml/2006/main" xmlns:r="http://schemas.openxmlformats.org/officeDocument/2006/relationships" xmlns:p="http://schemas.openxmlformats.org/presentationml/2006/main">
+  <p:cSld>
+    <p:spTree>
+      <p:nvGrpSpPr>
+        <p:cNvPr id="1" name=""/>
+        <p:cNvGrpSpPr/>
+        <p:nvPr/>
+      </p:nvGrpSpPr>
+      <p:grpSpPr>
+        <a:xfrm>
+          <a:off x="0" y="0"/>
+          <a:ext cx="0" cy="0"/>
+          <a:chOff x="0" y="0"/>
+          <a:chExt cx="0" cy="0"/>
+        </a:xfrm>
+      </p:grpSpPr>
+      <p:sp>
+        <p:nvSpPr>
+          <p:cNvPr id="2" name="Title 1"/>
+          <p:cNvSpPr>
+            <a:spLocks noGrp="1"/>
+          </p:cNvSpPr>
+          <p:nvPr>
+            <p:ph type="title"/>
+          </p:nvPr>
+        </p:nvSpPr>
+        <p:spPr/>
+        <p:txBody>
+          <a:bodyPr/>
+          <a:lstStyle/>
+          <a:p>
+            <a:r>
+              <a:rPr lang="en-US" dirty="0" smtClean="0"/>
               <a:t>Graph</a:t>
             </a:r>
             <a:endParaRPr lang="en-US" dirty="0"/>
@@ -22198,7 +23660,7 @@
           <a:p>
             <a:fld id="{11AD1F4E-1E51-402E-B221-310F004E7D3B}" type="slidenum">
               <a:rPr lang="en-US" smtClean="0"/>
-              <a:t>38</a:t>
+              <a:t>40</a:t>
             </a:fld>
             <a:endParaRPr lang="en-US"/>
           </a:p>
@@ -22240,7 +23702,7 @@
             <a:graphicData uri="http://schemas.openxmlformats.org/presentationml/2006/ole">
               <mc:AlternateContent xmlns:mc="http://schemas.openxmlformats.org/markup-compatibility/2006">
                 <mc:Choice xmlns:v="urn:schemas-microsoft-com:vml" Requires="v">
-                  <p:oleObj spid="_x0000_s9258" name="Equation" r:id="rId3" imgW="1104840" imgH="215640" progId="Equation.3">
+                  <p:oleObj spid="_x0000_s9264" name="Equation" r:id="rId3" imgW="1104840" imgH="215640" progId="Equation.3">
                     <p:embed/>
                   </p:oleObj>
                 </mc:Choice>
@@ -23332,7 +24794,7 @@
 </p:sld>
 </file>
 
-<file path=ppt/slides/slide39.xml><?xml version="1.0" encoding="utf-8"?>
+<file path=ppt/slides/slide41.xml><?xml version="1.0" encoding="utf-8"?>
 <p:sld xmlns:a="http://schemas.openxmlformats.org/drawingml/2006/main" xmlns:r="http://schemas.openxmlformats.org/officeDocument/2006/relationships" xmlns:p="http://schemas.openxmlformats.org/presentationml/2006/main">
   <p:cSld>
     <p:spTree>
@@ -23655,7 +25117,7 @@
           <a:p>
             <a:fld id="{11AD1F4E-1E51-402E-B221-310F004E7D3B}" type="slidenum">
               <a:rPr lang="en-US" smtClean="0"/>
-              <a:t>39</a:t>
+              <a:t>41</a:t>
             </a:fld>
             <a:endParaRPr lang="en-US"/>
           </a:p>
@@ -23681,7 +25143,7 @@
 </p:sld>
 </file>
 
-<file path=ppt/slides/slide4.xml><?xml version="1.0" encoding="utf-8"?>
+<file path=ppt/slides/slide42.xml><?xml version="1.0" encoding="utf-8"?>
 <p:sld xmlns:a="http://schemas.openxmlformats.org/drawingml/2006/main" xmlns:r="http://schemas.openxmlformats.org/officeDocument/2006/relationships" xmlns:p="http://schemas.openxmlformats.org/presentationml/2006/main">
   <p:cSld>
     <p:spTree>
@@ -23715,7 +25177,7 @@
           <a:p>
             <a:r>
               <a:rPr lang="en-US" dirty="0" smtClean="0"/>
-              <a:t>It's a zoo…</a:t>
+              <a:t>Some special graph types</a:t>
             </a:r>
             <a:endParaRPr lang="en-US" dirty="0"/>
           </a:p>
@@ -23738,619 +25200,6 @@
           <a:p>
             <a:r>
               <a:rPr lang="en-US" dirty="0" smtClean="0"/>
-              <a:t>Many data structures</a:t>
-            </a:r>
-          </a:p>
-          <a:p>
-            <a:pPr lvl="1"/>
-            <a:r>
-              <a:rPr lang="en-US" dirty="0" smtClean="0"/>
-              <a:t>specific properties</a:t>
-            </a:r>
-          </a:p>
-          <a:p>
-            <a:pPr lvl="1"/>
-            <a:r>
-              <a:rPr lang="en-US" dirty="0" smtClean="0"/>
-              <a:t>specific applications</a:t>
-            </a:r>
-          </a:p>
-          <a:p>
-            <a:pPr lvl="1"/>
-            <a:r>
-              <a:rPr lang="en-US" dirty="0" smtClean="0"/>
-              <a:t>relationship to algorithms!</a:t>
-            </a:r>
-          </a:p>
-          <a:p>
-            <a:r>
-              <a:rPr lang="en-US" dirty="0" smtClean="0"/>
-              <a:t>Important to have an overview</a:t>
-            </a:r>
-          </a:p>
-          <a:p>
-            <a:endParaRPr lang="en-US" dirty="0"/>
-          </a:p>
-          <a:p>
-            <a:endParaRPr lang="en-US" dirty="0" smtClean="0"/>
-          </a:p>
-          <a:p>
-            <a:r>
-              <a:rPr lang="en-US" dirty="0" smtClean="0"/>
-              <a:t>Programming language independent</a:t>
-            </a:r>
-          </a:p>
-          <a:p>
-            <a:pPr lvl="1"/>
-            <a:r>
-              <a:rPr lang="en-US" dirty="0" smtClean="0"/>
-              <a:t>conceptual, mathematical level</a:t>
-            </a:r>
-          </a:p>
-        </p:txBody>
-      </p:sp>
-      <p:sp>
-        <p:nvSpPr>
-          <p:cNvPr id="5" name="Slide Number Placeholder 4"/>
-          <p:cNvSpPr>
-            <a:spLocks noGrp="1"/>
-          </p:cNvSpPr>
-          <p:nvPr>
-            <p:ph type="sldNum" sz="quarter" idx="12"/>
-          </p:nvPr>
-        </p:nvSpPr>
-        <p:spPr/>
-        <p:txBody>
-          <a:bodyPr/>
-          <a:lstStyle/>
-          <a:p>
-            <a:fld id="{11AD1F4E-1E51-402E-B221-310F004E7D3B}" type="slidenum">
-              <a:rPr lang="en-US" smtClean="0"/>
-              <a:t>4</a:t>
-            </a:fld>
-            <a:endParaRPr lang="en-US"/>
-          </a:p>
-        </p:txBody>
-      </p:sp>
-      <p:sp>
-        <p:nvSpPr>
-          <p:cNvPr id="6" name="TextBox 5"/>
-          <p:cNvSpPr txBox="1"/>
-          <p:nvPr/>
-        </p:nvSpPr>
-        <p:spPr>
-          <a:xfrm>
-            <a:off x="1205347" y="4021281"/>
-            <a:ext cx="4468980" cy="415498"/>
-          </a:xfrm>
-          <a:prstGeom prst="rect">
-            <a:avLst/>
-          </a:prstGeom>
-          <a:noFill/>
-          <a:ln>
-            <a:solidFill>
-              <a:schemeClr val="tx1"/>
-            </a:solidFill>
-          </a:ln>
-        </p:spPr>
-        <p:txBody>
-          <a:bodyPr wrap="none" rtlCol="0">
-            <a:spAutoFit/>
-          </a:bodyPr>
-          <a:lstStyle/>
-          <a:p>
-            <a:r>
-              <a:rPr lang="en-US" sz="2100" dirty="0" smtClean="0"/>
-              <a:t>Which data structure to use in models?</a:t>
-            </a:r>
-            <a:endParaRPr lang="en-US" sz="2100" dirty="0"/>
-          </a:p>
-        </p:txBody>
-      </p:sp>
-      <p:sp>
-        <p:nvSpPr>
-          <p:cNvPr id="7" name="TextBox 6"/>
-          <p:cNvSpPr txBox="1"/>
-          <p:nvPr/>
-        </p:nvSpPr>
-        <p:spPr>
-          <a:xfrm>
-            <a:off x="1748272" y="4592781"/>
-            <a:ext cx="5237331" cy="415498"/>
-          </a:xfrm>
-          <a:prstGeom prst="rect">
-            <a:avLst/>
-          </a:prstGeom>
-          <a:noFill/>
-          <a:ln>
-            <a:solidFill>
-              <a:schemeClr val="tx1"/>
-            </a:solidFill>
-          </a:ln>
-        </p:spPr>
-        <p:txBody>
-          <a:bodyPr wrap="none" rtlCol="0">
-            <a:spAutoFit/>
-          </a:bodyPr>
-          <a:lstStyle/>
-          <a:p>
-            <a:r>
-              <a:rPr lang="en-US" sz="2100" dirty="0" smtClean="0"/>
-              <a:t>Which data structure to choose for algorithm?</a:t>
-            </a:r>
-            <a:endParaRPr lang="en-US" sz="2100" dirty="0"/>
-          </a:p>
-        </p:txBody>
-      </p:sp>
-    </p:spTree>
-    <p:extLst>
-      <p:ext uri="{BB962C8B-B14F-4D97-AF65-F5344CB8AC3E}">
-        <p14:creationId xmlns:p14="http://schemas.microsoft.com/office/powerpoint/2010/main" val="2147413834"/>
-      </p:ext>
-    </p:extLst>
-  </p:cSld>
-  <p:clrMapOvr>
-    <a:masterClrMapping/>
-  </p:clrMapOvr>
-  <p:timing>
-    <p:tnLst>
-      <p:par>
-        <p:cTn id="1" dur="indefinite" restart="never" nodeType="tmRoot">
-          <p:childTnLst>
-            <p:seq concurrent="1" nextAc="seek">
-              <p:cTn id="2" dur="indefinite" nodeType="mainSeq">
-                <p:childTnLst>
-                  <p:par>
-                    <p:cTn id="3" fill="hold">
-                      <p:stCondLst>
-                        <p:cond delay="indefinite"/>
-                        <p:cond evt="onBegin" delay="0">
-                          <p:tn val="2"/>
-                        </p:cond>
-                      </p:stCondLst>
-                      <p:childTnLst>
-                        <p:par>
-                          <p:cTn id="4" fill="hold">
-                            <p:stCondLst>
-                              <p:cond delay="0"/>
-                            </p:stCondLst>
-                            <p:childTnLst>
-                              <p:par>
-                                <p:cTn id="5" presetID="1" presetClass="entr" presetSubtype="0" fill="hold" grpId="0" nodeType="withEffect">
-                                  <p:stCondLst>
-                                    <p:cond delay="0"/>
-                                  </p:stCondLst>
-                                  <p:childTnLst>
-                                    <p:set>
-                                      <p:cBhvr>
-                                        <p:cTn id="6" dur="1" fill="hold">
-                                          <p:stCondLst>
-                                            <p:cond delay="0"/>
-                                          </p:stCondLst>
-                                        </p:cTn>
-                                        <p:tgtEl>
-                                          <p:spTgt spid="3">
-                                            <p:txEl>
-                                              <p:pRg st="0" end="0"/>
-                                            </p:txEl>
-                                          </p:spTgt>
-                                        </p:tgtEl>
-                                        <p:attrNameLst>
-                                          <p:attrName>style.visibility</p:attrName>
-                                        </p:attrNameLst>
-                                      </p:cBhvr>
-                                      <p:to>
-                                        <p:strVal val="visible"/>
-                                      </p:to>
-                                    </p:set>
-                                  </p:childTnLst>
-                                </p:cTn>
-                              </p:par>
-                              <p:par>
-                                <p:cTn id="7" presetID="1" presetClass="entr" presetSubtype="0" fill="hold" grpId="0" nodeType="withEffect">
-                                  <p:stCondLst>
-                                    <p:cond delay="0"/>
-                                  </p:stCondLst>
-                                  <p:childTnLst>
-                                    <p:set>
-                                      <p:cBhvr>
-                                        <p:cTn id="8" dur="1" fill="hold">
-                                          <p:stCondLst>
-                                            <p:cond delay="0"/>
-                                          </p:stCondLst>
-                                        </p:cTn>
-                                        <p:tgtEl>
-                                          <p:spTgt spid="3">
-                                            <p:txEl>
-                                              <p:pRg st="1" end="1"/>
-                                            </p:txEl>
-                                          </p:spTgt>
-                                        </p:tgtEl>
-                                        <p:attrNameLst>
-                                          <p:attrName>style.visibility</p:attrName>
-                                        </p:attrNameLst>
-                                      </p:cBhvr>
-                                      <p:to>
-                                        <p:strVal val="visible"/>
-                                      </p:to>
-                                    </p:set>
-                                  </p:childTnLst>
-                                </p:cTn>
-                              </p:par>
-                              <p:par>
-                                <p:cTn id="9" presetID="1" presetClass="entr" presetSubtype="0" fill="hold" grpId="0" nodeType="withEffect">
-                                  <p:stCondLst>
-                                    <p:cond delay="0"/>
-                                  </p:stCondLst>
-                                  <p:childTnLst>
-                                    <p:set>
-                                      <p:cBhvr>
-                                        <p:cTn id="10" dur="1" fill="hold">
-                                          <p:stCondLst>
-                                            <p:cond delay="0"/>
-                                          </p:stCondLst>
-                                        </p:cTn>
-                                        <p:tgtEl>
-                                          <p:spTgt spid="3">
-                                            <p:txEl>
-                                              <p:pRg st="2" end="2"/>
-                                            </p:txEl>
-                                          </p:spTgt>
-                                        </p:tgtEl>
-                                        <p:attrNameLst>
-                                          <p:attrName>style.visibility</p:attrName>
-                                        </p:attrNameLst>
-                                      </p:cBhvr>
-                                      <p:to>
-                                        <p:strVal val="visible"/>
-                                      </p:to>
-                                    </p:set>
-                                  </p:childTnLst>
-                                </p:cTn>
-                              </p:par>
-                              <p:par>
-                                <p:cTn id="11" presetID="1" presetClass="entr" presetSubtype="0" fill="hold" grpId="0" nodeType="withEffect">
-                                  <p:stCondLst>
-                                    <p:cond delay="0"/>
-                                  </p:stCondLst>
-                                  <p:childTnLst>
-                                    <p:set>
-                                      <p:cBhvr>
-                                        <p:cTn id="12" dur="1" fill="hold">
-                                          <p:stCondLst>
-                                            <p:cond delay="0"/>
-                                          </p:stCondLst>
-                                        </p:cTn>
-                                        <p:tgtEl>
-                                          <p:spTgt spid="3">
-                                            <p:txEl>
-                                              <p:pRg st="3" end="3"/>
-                                            </p:txEl>
-                                          </p:spTgt>
-                                        </p:tgtEl>
-                                        <p:attrNameLst>
-                                          <p:attrName>style.visibility</p:attrName>
-                                        </p:attrNameLst>
-                                      </p:cBhvr>
-                                      <p:to>
-                                        <p:strVal val="visible"/>
-                                      </p:to>
-                                    </p:set>
-                                  </p:childTnLst>
-                                </p:cTn>
-                              </p:par>
-                            </p:childTnLst>
-                          </p:cTn>
-                        </p:par>
-                      </p:childTnLst>
-                    </p:cTn>
-                  </p:par>
-                  <p:par>
-                    <p:cTn id="13" fill="hold">
-                      <p:stCondLst>
-                        <p:cond delay="indefinite"/>
-                      </p:stCondLst>
-                      <p:childTnLst>
-                        <p:par>
-                          <p:cTn id="14" fill="hold">
-                            <p:stCondLst>
-                              <p:cond delay="0"/>
-                            </p:stCondLst>
-                            <p:childTnLst>
-                              <p:par>
-                                <p:cTn id="15" presetID="1" presetClass="entr" presetSubtype="0" fill="hold" grpId="0" nodeType="clickEffect">
-                                  <p:stCondLst>
-                                    <p:cond delay="0"/>
-                                  </p:stCondLst>
-                                  <p:childTnLst>
-                                    <p:set>
-                                      <p:cBhvr>
-                                        <p:cTn id="16" dur="1" fill="hold">
-                                          <p:stCondLst>
-                                            <p:cond delay="0"/>
-                                          </p:stCondLst>
-                                        </p:cTn>
-                                        <p:tgtEl>
-                                          <p:spTgt spid="3">
-                                            <p:txEl>
-                                              <p:pRg st="4" end="4"/>
-                                            </p:txEl>
-                                          </p:spTgt>
-                                        </p:tgtEl>
-                                        <p:attrNameLst>
-                                          <p:attrName>style.visibility</p:attrName>
-                                        </p:attrNameLst>
-                                      </p:cBhvr>
-                                      <p:to>
-                                        <p:strVal val="visible"/>
-                                      </p:to>
-                                    </p:set>
-                                  </p:childTnLst>
-                                </p:cTn>
-                              </p:par>
-                            </p:childTnLst>
-                          </p:cTn>
-                        </p:par>
-                      </p:childTnLst>
-                    </p:cTn>
-                  </p:par>
-                  <p:par>
-                    <p:cTn id="17" fill="hold">
-                      <p:stCondLst>
-                        <p:cond delay="indefinite"/>
-                      </p:stCondLst>
-                      <p:childTnLst>
-                        <p:par>
-                          <p:cTn id="18" fill="hold">
-                            <p:stCondLst>
-                              <p:cond delay="0"/>
-                            </p:stCondLst>
-                            <p:childTnLst>
-                              <p:par>
-                                <p:cTn id="19" presetID="1" presetClass="entr" presetSubtype="0" fill="hold" grpId="0" nodeType="clickEffect">
-                                  <p:stCondLst>
-                                    <p:cond delay="0"/>
-                                  </p:stCondLst>
-                                  <p:childTnLst>
-                                    <p:set>
-                                      <p:cBhvr>
-                                        <p:cTn id="20" dur="1" fill="hold">
-                                          <p:stCondLst>
-                                            <p:cond delay="0"/>
-                                          </p:stCondLst>
-                                        </p:cTn>
-                                        <p:tgtEl>
-                                          <p:spTgt spid="6"/>
-                                        </p:tgtEl>
-                                        <p:attrNameLst>
-                                          <p:attrName>style.visibility</p:attrName>
-                                        </p:attrNameLst>
-                                      </p:cBhvr>
-                                      <p:to>
-                                        <p:strVal val="visible"/>
-                                      </p:to>
-                                    </p:set>
-                                  </p:childTnLst>
-                                </p:cTn>
-                              </p:par>
-                            </p:childTnLst>
-                          </p:cTn>
-                        </p:par>
-                      </p:childTnLst>
-                    </p:cTn>
-                  </p:par>
-                  <p:par>
-                    <p:cTn id="21" fill="hold">
-                      <p:stCondLst>
-                        <p:cond delay="indefinite"/>
-                      </p:stCondLst>
-                      <p:childTnLst>
-                        <p:par>
-                          <p:cTn id="22" fill="hold">
-                            <p:stCondLst>
-                              <p:cond delay="0"/>
-                            </p:stCondLst>
-                            <p:childTnLst>
-                              <p:par>
-                                <p:cTn id="23" presetID="1" presetClass="entr" presetSubtype="0" fill="hold" grpId="0" nodeType="clickEffect">
-                                  <p:stCondLst>
-                                    <p:cond delay="0"/>
-                                  </p:stCondLst>
-                                  <p:childTnLst>
-                                    <p:set>
-                                      <p:cBhvr>
-                                        <p:cTn id="24" dur="1" fill="hold">
-                                          <p:stCondLst>
-                                            <p:cond delay="0"/>
-                                          </p:stCondLst>
-                                        </p:cTn>
-                                        <p:tgtEl>
-                                          <p:spTgt spid="7"/>
-                                        </p:tgtEl>
-                                        <p:attrNameLst>
-                                          <p:attrName>style.visibility</p:attrName>
-                                        </p:attrNameLst>
-                                      </p:cBhvr>
-                                      <p:to>
-                                        <p:strVal val="visible"/>
-                                      </p:to>
-                                    </p:set>
-                                  </p:childTnLst>
-                                </p:cTn>
-                              </p:par>
-                            </p:childTnLst>
-                          </p:cTn>
-                        </p:par>
-                      </p:childTnLst>
-                    </p:cTn>
-                  </p:par>
-                  <p:par>
-                    <p:cTn id="25" fill="hold">
-                      <p:stCondLst>
-                        <p:cond delay="indefinite"/>
-                      </p:stCondLst>
-                      <p:childTnLst>
-                        <p:par>
-                          <p:cTn id="26" fill="hold">
-                            <p:stCondLst>
-                              <p:cond delay="0"/>
-                            </p:stCondLst>
-                            <p:childTnLst>
-                              <p:par>
-                                <p:cTn id="27" presetID="1" presetClass="entr" presetSubtype="0" fill="hold" grpId="0" nodeType="clickEffect">
-                                  <p:stCondLst>
-                                    <p:cond delay="0"/>
-                                  </p:stCondLst>
-                                  <p:childTnLst>
-                                    <p:set>
-                                      <p:cBhvr>
-                                        <p:cTn id="28" dur="1" fill="hold">
-                                          <p:stCondLst>
-                                            <p:cond delay="0"/>
-                                          </p:stCondLst>
-                                        </p:cTn>
-                                        <p:tgtEl>
-                                          <p:spTgt spid="3">
-                                            <p:txEl>
-                                              <p:pRg st="7" end="7"/>
-                                            </p:txEl>
-                                          </p:spTgt>
-                                        </p:tgtEl>
-                                        <p:attrNameLst>
-                                          <p:attrName>style.visibility</p:attrName>
-                                        </p:attrNameLst>
-                                      </p:cBhvr>
-                                      <p:to>
-                                        <p:strVal val="visible"/>
-                                      </p:to>
-                                    </p:set>
-                                  </p:childTnLst>
-                                </p:cTn>
-                              </p:par>
-                              <p:par>
-                                <p:cTn id="29" presetID="1" presetClass="entr" presetSubtype="0" fill="hold" grpId="0" nodeType="withEffect">
-                                  <p:stCondLst>
-                                    <p:cond delay="0"/>
-                                  </p:stCondLst>
-                                  <p:childTnLst>
-                                    <p:set>
-                                      <p:cBhvr>
-                                        <p:cTn id="30" dur="1" fill="hold">
-                                          <p:stCondLst>
-                                            <p:cond delay="0"/>
-                                          </p:stCondLst>
-                                        </p:cTn>
-                                        <p:tgtEl>
-                                          <p:spTgt spid="3">
-                                            <p:txEl>
-                                              <p:pRg st="8" end="8"/>
-                                            </p:txEl>
-                                          </p:spTgt>
-                                        </p:tgtEl>
-                                        <p:attrNameLst>
-                                          <p:attrName>style.visibility</p:attrName>
-                                        </p:attrNameLst>
-                                      </p:cBhvr>
-                                      <p:to>
-                                        <p:strVal val="visible"/>
-                                      </p:to>
-                                    </p:set>
-                                  </p:childTnLst>
-                                </p:cTn>
-                              </p:par>
-                            </p:childTnLst>
-                          </p:cTn>
-                        </p:par>
-                      </p:childTnLst>
-                    </p:cTn>
-                  </p:par>
-                </p:childTnLst>
-              </p:cTn>
-              <p:prevCondLst>
-                <p:cond evt="onPrev" delay="0">
-                  <p:tgtEl>
-                    <p:sldTgt/>
-                  </p:tgtEl>
-                </p:cond>
-              </p:prevCondLst>
-              <p:nextCondLst>
-                <p:cond evt="onNext" delay="0">
-                  <p:tgtEl>
-                    <p:sldTgt/>
-                  </p:tgtEl>
-                </p:cond>
-              </p:nextCondLst>
-            </p:seq>
-          </p:childTnLst>
-        </p:cTn>
-      </p:par>
-    </p:tnLst>
-    <p:bldLst>
-      <p:bldP spid="3" grpId="0" uiExpand="1" build="p"/>
-      <p:bldP spid="6" grpId="0" animBg="1"/>
-      <p:bldP spid="7" grpId="0" animBg="1"/>
-    </p:bldLst>
-  </p:timing>
-</p:sld>
-</file>
-
-<file path=ppt/slides/slide40.xml><?xml version="1.0" encoding="utf-8"?>
-<p:sld xmlns:a="http://schemas.openxmlformats.org/drawingml/2006/main" xmlns:r="http://schemas.openxmlformats.org/officeDocument/2006/relationships" xmlns:p="http://schemas.openxmlformats.org/presentationml/2006/main">
-  <p:cSld>
-    <p:spTree>
-      <p:nvGrpSpPr>
-        <p:cNvPr id="1" name=""/>
-        <p:cNvGrpSpPr/>
-        <p:nvPr/>
-      </p:nvGrpSpPr>
-      <p:grpSpPr>
-        <a:xfrm>
-          <a:off x="0" y="0"/>
-          <a:ext cx="0" cy="0"/>
-          <a:chOff x="0" y="0"/>
-          <a:chExt cx="0" cy="0"/>
-        </a:xfrm>
-      </p:grpSpPr>
-      <p:sp>
-        <p:nvSpPr>
-          <p:cNvPr id="2" name="Title 1"/>
-          <p:cNvSpPr>
-            <a:spLocks noGrp="1"/>
-          </p:cNvSpPr>
-          <p:nvPr>
-            <p:ph type="title"/>
-          </p:nvPr>
-        </p:nvSpPr>
-        <p:spPr/>
-        <p:txBody>
-          <a:bodyPr/>
-          <a:lstStyle/>
-          <a:p>
-            <a:r>
-              <a:rPr lang="en-US" dirty="0" smtClean="0"/>
-              <a:t>Some special graph types</a:t>
-            </a:r>
-            <a:endParaRPr lang="en-US" dirty="0"/>
-          </a:p>
-        </p:txBody>
-      </p:sp>
-      <p:sp>
-        <p:nvSpPr>
-          <p:cNvPr id="3" name="Content Placeholder 2"/>
-          <p:cNvSpPr>
-            <a:spLocks noGrp="1"/>
-          </p:cNvSpPr>
-          <p:nvPr>
-            <p:ph idx="1"/>
-          </p:nvPr>
-        </p:nvSpPr>
-        <p:spPr/>
-        <p:txBody>
-          <a:bodyPr/>
-          <a:lstStyle/>
-          <a:p>
-            <a:r>
-              <a:rPr lang="en-US" dirty="0" smtClean="0"/>
               <a:t>Directed Acyclic Graph (DAG)</a:t>
             </a:r>
           </a:p>
@@ -24444,7 +25293,7 @@
           <a:p>
             <a:fld id="{11AD1F4E-1E51-402E-B221-310F004E7D3B}" type="slidenum">
               <a:rPr lang="en-US" smtClean="0"/>
-              <a:t>40</a:t>
+              <a:t>42</a:t>
             </a:fld>
             <a:endParaRPr lang="en-US"/>
           </a:p>
@@ -26641,7 +27490,7 @@
 </p:sld>
 </file>
 
-<file path=ppt/slides/slide41.xml><?xml version="1.0" encoding="utf-8"?>
+<file path=ppt/slides/slide43.xml><?xml version="1.0" encoding="utf-8"?>
 <p:sld xmlns:a="http://schemas.openxmlformats.org/drawingml/2006/main" xmlns:r="http://schemas.openxmlformats.org/officeDocument/2006/relationships" xmlns:p="http://schemas.openxmlformats.org/presentationml/2006/main">
   <p:cSld>
     <p:spTree>
@@ -26733,7 +27582,7 @@
           <a:p>
             <a:fld id="{11AD1F4E-1E51-402E-B221-310F004E7D3B}" type="slidenum">
               <a:rPr lang="en-US" smtClean="0"/>
-              <a:t>41</a:t>
+              <a:t>43</a:t>
             </a:fld>
             <a:endParaRPr lang="en-US"/>
           </a:p>
@@ -29071,7 +29920,7 @@
           <a:graphicData uri="http://schemas.openxmlformats.org/presentationml/2006/ole">
             <mc:AlternateContent xmlns:mc="http://schemas.openxmlformats.org/markup-compatibility/2006">
               <mc:Choice xmlns:v="urn:schemas-microsoft-com:vml" Requires="v">
-                <p:oleObj spid="_x0000_s1099" name="Equation" r:id="rId4" imgW="1841400" imgH="215640" progId="Equation.3">
+                <p:oleObj spid="_x0000_s1105" name="Equation" r:id="rId4" imgW="1841400" imgH="215640" progId="Equation.3">
                   <p:embed/>
                 </p:oleObj>
               </mc:Choice>
@@ -30673,7 +31522,7 @@
             <a:graphicData uri="http://schemas.openxmlformats.org/presentationml/2006/ole">
               <mc:AlternateContent xmlns:mc="http://schemas.openxmlformats.org/markup-compatibility/2006">
                 <mc:Choice xmlns:v="urn:schemas-microsoft-com:vml" Requires="v">
-                  <p:oleObj spid="_x0000_s2122" name="Equation" r:id="rId3" imgW="1409400" imgH="203040" progId="Equation.3">
+                  <p:oleObj spid="_x0000_s2128" name="Equation" r:id="rId3" imgW="1409400" imgH="203040" progId="Equation.3">
                     <p:embed/>
                   </p:oleObj>
                 </mc:Choice>

</xml_diff>